<commit_message>
add slides showing what happens on commit
</commit_message>
<xml_diff>
--- a/GIT Presentation.pptx
+++ b/GIT Presentation.pptx
@@ -6,7 +6,7 @@
     <p:sldMasterId id="2147483665" r:id="rId2"/>
   </p:sldMasterIdLst>
   <p:notesMasterIdLst>
-    <p:notesMasterId r:id="rId18"/>
+    <p:notesMasterId r:id="rId19"/>
   </p:notesMasterIdLst>
   <p:sldIdLst>
     <p:sldId id="257" r:id="rId3"/>
@@ -17,13 +17,14 @@
     <p:sldId id="274" r:id="rId8"/>
     <p:sldId id="266" r:id="rId9"/>
     <p:sldId id="267" r:id="rId10"/>
-    <p:sldId id="268" r:id="rId11"/>
-    <p:sldId id="269" r:id="rId12"/>
-    <p:sldId id="270" r:id="rId13"/>
-    <p:sldId id="271" r:id="rId14"/>
-    <p:sldId id="272" r:id="rId15"/>
-    <p:sldId id="273" r:id="rId16"/>
-    <p:sldId id="275" r:id="rId17"/>
+    <p:sldId id="276" r:id="rId11"/>
+    <p:sldId id="268" r:id="rId12"/>
+    <p:sldId id="269" r:id="rId13"/>
+    <p:sldId id="270" r:id="rId14"/>
+    <p:sldId id="271" r:id="rId15"/>
+    <p:sldId id="272" r:id="rId16"/>
+    <p:sldId id="273" r:id="rId17"/>
+    <p:sldId id="275" r:id="rId18"/>
   </p:sldIdLst>
   <p:sldSz cx="9144000" cy="6858000" type="screen4x3"/>
   <p:notesSz cx="6858000" cy="9144000"/>
@@ -685,7 +686,7 @@
     </p:spTree>
     <p:extLst>
       <p:ext uri="{BB962C8B-B14F-4D97-AF65-F5344CB8AC3E}">
-        <p14:creationId xmlns:p14="http://schemas.microsoft.com/office/powerpoint/2010/main" val="1650745352"/>
+        <p14:creationId xmlns:p14="http://schemas.microsoft.com/office/powerpoint/2010/main" val="1408504777"/>
       </p:ext>
     </p:extLst>
   </p:cSld>
@@ -789,7 +790,7 @@
     </p:spTree>
     <p:extLst>
       <p:ext uri="{BB962C8B-B14F-4D97-AF65-F5344CB8AC3E}">
-        <p14:creationId xmlns:p14="http://schemas.microsoft.com/office/powerpoint/2010/main" val="979907960"/>
+        <p14:creationId xmlns:p14="http://schemas.microsoft.com/office/powerpoint/2010/main" val="1650745352"/>
       </p:ext>
     </p:extLst>
   </p:cSld>
@@ -893,7 +894,7 @@
     </p:spTree>
     <p:extLst>
       <p:ext uri="{BB962C8B-B14F-4D97-AF65-F5344CB8AC3E}">
-        <p14:creationId xmlns:p14="http://schemas.microsoft.com/office/powerpoint/2010/main" val="2667286518"/>
+        <p14:creationId xmlns:p14="http://schemas.microsoft.com/office/powerpoint/2010/main" val="979907960"/>
       </p:ext>
     </p:extLst>
   </p:cSld>
@@ -997,7 +998,7 @@
     </p:spTree>
     <p:extLst>
       <p:ext uri="{BB962C8B-B14F-4D97-AF65-F5344CB8AC3E}">
-        <p14:creationId xmlns:p14="http://schemas.microsoft.com/office/powerpoint/2010/main" val="890929024"/>
+        <p14:creationId xmlns:p14="http://schemas.microsoft.com/office/powerpoint/2010/main" val="2667286518"/>
       </p:ext>
     </p:extLst>
   </p:cSld>
@@ -1053,46 +1054,6 @@
               <a:buFontTx/>
               <a:buChar char="-"/>
             </a:pPr>
-            <a:r>
-              <a:rPr lang="en-US" baseline="0" dirty="0" smtClean="0"/>
-              <a:t>install GIT</a:t>
-            </a:r>
-          </a:p>
-          <a:p>
-            <a:pPr marL="628650" lvl="1" indent="-171450">
-              <a:buFontTx/>
-              <a:buChar char="-"/>
-            </a:pPr>
-            <a:r>
-              <a:rPr lang="en-US" baseline="0" dirty="0" smtClean="0"/>
-              <a:t>Windows</a:t>
-            </a:r>
-          </a:p>
-          <a:p>
-            <a:pPr marL="628650" lvl="1" indent="-171450">
-              <a:buFontTx/>
-              <a:buChar char="-"/>
-            </a:pPr>
-            <a:r>
-              <a:rPr lang="en-US" baseline="0" dirty="0" smtClean="0"/>
-              <a:t>Mac</a:t>
-            </a:r>
-          </a:p>
-          <a:p>
-            <a:pPr marL="171450" lvl="0" indent="-171450">
-              <a:buFontTx/>
-              <a:buChar char="-"/>
-            </a:pPr>
-            <a:r>
-              <a:rPr lang="en-US" baseline="0" dirty="0" smtClean="0"/>
-              <a:t>setup username and email</a:t>
-            </a:r>
-          </a:p>
-          <a:p>
-            <a:pPr marL="171450" lvl="0" indent="-171450">
-              <a:buFontTx/>
-              <a:buChar char="-"/>
-            </a:pPr>
             <a:endParaRPr dirty="0"/>
           </a:p>
         </p:txBody>
@@ -1141,7 +1102,7 @@
     </p:spTree>
     <p:extLst>
       <p:ext uri="{BB962C8B-B14F-4D97-AF65-F5344CB8AC3E}">
-        <p14:creationId xmlns:p14="http://schemas.microsoft.com/office/powerpoint/2010/main" val="2666093823"/>
+        <p14:creationId xmlns:p14="http://schemas.microsoft.com/office/powerpoint/2010/main" val="890929024"/>
       </p:ext>
     </p:extLst>
   </p:cSld>
@@ -1228,16 +1189,152 @@
               <a:buChar char="-"/>
             </a:pPr>
             <a:r>
-              <a:rPr lang="en-US" baseline="0" smtClean="0"/>
-              <a:t>setup </a:t>
-            </a:r>
-            <a:r>
               <a:rPr lang="en-US" baseline="0" dirty="0" smtClean="0"/>
-              <a:t>username </a:t>
-            </a:r>
-            <a:r>
-              <a:rPr lang="en-US" baseline="0" smtClean="0"/>
-              <a:t>and email</a:t>
+              <a:t>setup username and email</a:t>
+            </a:r>
+          </a:p>
+          <a:p>
+            <a:pPr marL="171450" lvl="0" indent="-171450">
+              <a:buFontTx/>
+              <a:buChar char="-"/>
+            </a:pPr>
+            <a:endParaRPr dirty="0"/>
+          </a:p>
+        </p:txBody>
+      </p:sp>
+      <p:sp>
+        <p:nvSpPr>
+          <p:cNvPr id="100" name="Shape 100"/>
+          <p:cNvSpPr>
+            <a:spLocks noGrp="1" noRot="1" noChangeAspect="1"/>
+          </p:cNvSpPr>
+          <p:nvPr>
+            <p:ph type="sldImg" idx="2"/>
+          </p:nvPr>
+        </p:nvSpPr>
+        <p:spPr>
+          <a:xfrm>
+            <a:off x="1143000" y="685800"/>
+            <a:ext cx="4572000" cy="3429000"/>
+          </a:xfrm>
+          <a:custGeom>
+            <a:avLst/>
+            <a:gdLst/>
+            <a:ahLst/>
+            <a:cxnLst/>
+            <a:rect l="0" t="0" r="0" b="0"/>
+            <a:pathLst>
+              <a:path w="120000" h="120000" extrusionOk="0">
+                <a:moveTo>
+                  <a:pt x="0" y="0"/>
+                </a:moveTo>
+                <a:lnTo>
+                  <a:pt x="120000" y="0"/>
+                </a:lnTo>
+                <a:lnTo>
+                  <a:pt x="120000" y="120000"/>
+                </a:lnTo>
+                <a:lnTo>
+                  <a:pt x="0" y="120000"/>
+                </a:lnTo>
+                <a:close/>
+              </a:path>
+            </a:pathLst>
+          </a:custGeom>
+        </p:spPr>
+      </p:sp>
+    </p:spTree>
+    <p:extLst>
+      <p:ext uri="{BB962C8B-B14F-4D97-AF65-F5344CB8AC3E}">
+        <p14:creationId xmlns:p14="http://schemas.microsoft.com/office/powerpoint/2010/main" val="2666093823"/>
+      </p:ext>
+    </p:extLst>
+  </p:cSld>
+  <p:clrMapOvr>
+    <a:masterClrMapping/>
+  </p:clrMapOvr>
+</p:notes>
+</file>
+
+<file path=ppt/notesSlides/notesSlide16.xml><?xml version="1.0" encoding="utf-8"?>
+<p:notes xmlns:a="http://schemas.openxmlformats.org/drawingml/2006/main" xmlns:r="http://schemas.openxmlformats.org/officeDocument/2006/relationships" xmlns:p="http://schemas.openxmlformats.org/presentationml/2006/main" showMasterSp="0" showMasterPhAnim="0">
+  <p:cSld>
+    <p:spTree>
+      <p:nvGrpSpPr>
+        <p:cNvPr id="1" name="Shape 98"/>
+        <p:cNvGrpSpPr/>
+        <p:nvPr/>
+      </p:nvGrpSpPr>
+      <p:grpSpPr>
+        <a:xfrm>
+          <a:off x="0" y="0"/>
+          <a:ext cx="0" cy="0"/>
+          <a:chOff x="0" y="0"/>
+          <a:chExt cx="0" cy="0"/>
+        </a:xfrm>
+      </p:grpSpPr>
+      <p:sp>
+        <p:nvSpPr>
+          <p:cNvPr id="99" name="Shape 99"/>
+          <p:cNvSpPr txBox="1">
+            <a:spLocks noGrp="1"/>
+          </p:cNvSpPr>
+          <p:nvPr>
+            <p:ph type="body" idx="1"/>
+          </p:nvPr>
+        </p:nvSpPr>
+        <p:spPr>
+          <a:xfrm>
+            <a:off x="685800" y="4343400"/>
+            <a:ext cx="5486399" cy="4114800"/>
+          </a:xfrm>
+          <a:prstGeom prst="rect">
+            <a:avLst/>
+          </a:prstGeom>
+        </p:spPr>
+        <p:txBody>
+          <a:bodyPr lIns="91425" tIns="91425" rIns="91425" bIns="91425" anchor="ctr" anchorCtr="0">
+            <a:noAutofit/>
+          </a:bodyPr>
+          <a:lstStyle/>
+          <a:p>
+            <a:pPr marL="171450" indent="-171450">
+              <a:buFontTx/>
+              <a:buChar char="-"/>
+            </a:pPr>
+            <a:r>
+              <a:rPr lang="en-US" baseline="0" dirty="0" smtClean="0"/>
+              <a:t>install GIT</a:t>
+            </a:r>
+          </a:p>
+          <a:p>
+            <a:pPr marL="628650" lvl="1" indent="-171450">
+              <a:buFontTx/>
+              <a:buChar char="-"/>
+            </a:pPr>
+            <a:r>
+              <a:rPr lang="en-US" baseline="0" dirty="0" smtClean="0"/>
+              <a:t>Windows</a:t>
+            </a:r>
+          </a:p>
+          <a:p>
+            <a:pPr marL="628650" lvl="1" indent="-171450">
+              <a:buFontTx/>
+              <a:buChar char="-"/>
+            </a:pPr>
+            <a:r>
+              <a:rPr lang="en-US" baseline="0" dirty="0" smtClean="0"/>
+              <a:t>Mac</a:t>
+            </a:r>
+          </a:p>
+          <a:p>
+            <a:pPr marL="171450" lvl="0" indent="-171450">
+              <a:buFontTx/>
+              <a:buChar char="-"/>
+            </a:pPr>
+            <a:r>
+              <a:rPr lang="en-US" baseline="0" dirty="0" smtClean="0"/>
+              <a:t>setup username and email</a:t>
             </a:r>
           </a:p>
           <a:p>
@@ -1972,8 +2069,23 @@
             </a:pPr>
             <a:r>
               <a:rPr lang="en-US" baseline="0" dirty="0" smtClean="0"/>
-              <a:t>a branch is a label pointing to a particular node in the graph</a:t>
-            </a:r>
+              <a:t>a branch is a label pointing to a particular node in the </a:t>
+            </a:r>
+            <a:r>
+              <a:rPr lang="en-US" baseline="0" dirty="0" smtClean="0"/>
+              <a:t>graph</a:t>
+            </a:r>
+          </a:p>
+          <a:p>
+            <a:pPr marL="628650" lvl="1" indent="-171450">
+              <a:buFontTx/>
+              <a:buChar char="-"/>
+            </a:pPr>
+            <a:r>
+              <a:rPr lang="en-US" baseline="0" dirty="0" smtClean="0"/>
+              <a:t>because of the parent-child link between commits, we say that “commit E is on branch my-branch” because it’s reachable from my-branch. Commits A and B are on both branches (my-branch and master)</a:t>
+            </a:r>
+            <a:endParaRPr lang="en-US" baseline="0" dirty="0" smtClean="0"/>
           </a:p>
           <a:p>
             <a:pPr marL="171450" indent="-171450">
@@ -2105,6 +2217,14 @@
               <a:buFontTx/>
               <a:buChar char="-"/>
             </a:pPr>
+            <a:r>
+              <a:rPr lang="en-US" dirty="0" smtClean="0"/>
+              <a:t>first a commit is added with</a:t>
+            </a:r>
+            <a:r>
+              <a:rPr lang="en-US" baseline="0" dirty="0" smtClean="0"/>
+              <a:t> its parent pointing to the current commit (which is HEAD)</a:t>
+            </a:r>
             <a:endParaRPr dirty="0"/>
           </a:p>
         </p:txBody>
@@ -2209,6 +2329,24 @@
               <a:buFontTx/>
               <a:buChar char="-"/>
             </a:pPr>
+            <a:r>
+              <a:rPr lang="en-US" dirty="0" smtClean="0"/>
+              <a:t>after that the</a:t>
+            </a:r>
+            <a:r>
+              <a:rPr lang="en-US" baseline="0" dirty="0" smtClean="0"/>
+              <a:t> master branch is modified to point to the new commit</a:t>
+            </a:r>
+          </a:p>
+          <a:p>
+            <a:pPr marL="171450" indent="-171450">
+              <a:buFontTx/>
+              <a:buChar char="-"/>
+            </a:pPr>
+            <a:r>
+              <a:rPr lang="en-US" baseline="0" dirty="0" smtClean="0"/>
+              <a:t>notice that HEAD did not change – it still points to the master branch, because we didn’t changed branches</a:t>
+            </a:r>
             <a:endParaRPr dirty="0"/>
           </a:p>
         </p:txBody>
@@ -2257,7 +2395,7 @@
     </p:spTree>
     <p:extLst>
       <p:ext uri="{BB962C8B-B14F-4D97-AF65-F5344CB8AC3E}">
-        <p14:creationId xmlns:p14="http://schemas.microsoft.com/office/powerpoint/2010/main" val="1408504777"/>
+        <p14:creationId xmlns:p14="http://schemas.microsoft.com/office/powerpoint/2010/main" val="789771486"/>
       </p:ext>
     </p:extLst>
   </p:cSld>
@@ -7495,7 +7633,7 @@
     </p:spTree>
     <p:extLst>
       <p:ext uri="{BB962C8B-B14F-4D97-AF65-F5344CB8AC3E}">
-        <p14:creationId xmlns:p14="http://schemas.microsoft.com/office/powerpoint/2010/main" val="893865620"/>
+        <p14:creationId xmlns:p14="http://schemas.microsoft.com/office/powerpoint/2010/main" val="264915446"/>
       </p:ext>
     </p:extLst>
   </p:cSld>
@@ -7694,7 +7832,7 @@
     </p:spTree>
     <p:extLst>
       <p:ext uri="{BB962C8B-B14F-4D97-AF65-F5344CB8AC3E}">
-        <p14:creationId xmlns:p14="http://schemas.microsoft.com/office/powerpoint/2010/main" val="2176611703"/>
+        <p14:creationId xmlns:p14="http://schemas.microsoft.com/office/powerpoint/2010/main" val="893865620"/>
       </p:ext>
     </p:extLst>
   </p:cSld>
@@ -7893,7 +8031,7 @@
     </p:spTree>
     <p:extLst>
       <p:ext uri="{BB962C8B-B14F-4D97-AF65-F5344CB8AC3E}">
-        <p14:creationId xmlns:p14="http://schemas.microsoft.com/office/powerpoint/2010/main" val="2978980850"/>
+        <p14:creationId xmlns:p14="http://schemas.microsoft.com/office/powerpoint/2010/main" val="2176611703"/>
       </p:ext>
     </p:extLst>
   </p:cSld>
@@ -8092,7 +8230,7 @@
     </p:spTree>
     <p:extLst>
       <p:ext uri="{BB962C8B-B14F-4D97-AF65-F5344CB8AC3E}">
-        <p14:creationId xmlns:p14="http://schemas.microsoft.com/office/powerpoint/2010/main" val="2675765428"/>
+        <p14:creationId xmlns:p14="http://schemas.microsoft.com/office/powerpoint/2010/main" val="2978980850"/>
       </p:ext>
     </p:extLst>
   </p:cSld>
@@ -8211,11 +8349,7 @@
             </a:pPr>
             <a:r>
               <a:rPr lang="en-US" sz="2400" dirty="0" smtClean="0"/>
-              <a:t>Time to ge</a:t>
-            </a:r>
-            <a:r>
-              <a:rPr lang="en-US" sz="2400" dirty="0" smtClean="0"/>
-              <a:t>t the hands dirty</a:t>
+              <a:t>stuff</a:t>
             </a:r>
             <a:endParaRPr lang="en-US" sz="2400" dirty="0" smtClean="0">
               <a:sym typeface="Wingdings" panose="05000000000000000000" pitchFamily="2" charset="2"/>
@@ -8286,11 +8420,7 @@
             </a:pPr>
             <a:r>
               <a:rPr lang="en-US" sz="3600" dirty="0" smtClean="0"/>
-              <a:t>Hands-on </a:t>
-            </a:r>
-            <a:r>
-              <a:rPr lang="en-US" sz="3600" dirty="0" err="1" smtClean="0"/>
-              <a:t>Workshow</a:t>
+              <a:t>Title</a:t>
             </a:r>
             <a:endParaRPr lang="en-US" sz="3600" dirty="0"/>
           </a:p>
@@ -8299,7 +8429,7 @@
     </p:spTree>
     <p:extLst>
       <p:ext uri="{BB962C8B-B14F-4D97-AF65-F5344CB8AC3E}">
-        <p14:creationId xmlns:p14="http://schemas.microsoft.com/office/powerpoint/2010/main" val="2075129891"/>
+        <p14:creationId xmlns:p14="http://schemas.microsoft.com/office/powerpoint/2010/main" val="2675765428"/>
       </p:ext>
     </p:extLst>
   </p:cSld>
@@ -8418,9 +8548,194 @@
             </a:pPr>
             <a:r>
               <a:rPr lang="en-US" sz="2400" dirty="0" smtClean="0"/>
-              <a:t>install GIT</a:t>
-            </a:r>
-          </a:p>
+              <a:t>Time to get the hands dirty</a:t>
+            </a:r>
+            <a:endParaRPr lang="en-US" sz="2400" dirty="0" smtClean="0">
+              <a:sym typeface="Wingdings" panose="05000000000000000000" pitchFamily="2" charset="2"/>
+            </a:endParaRPr>
+          </a:p>
+          <a:p>
+            <a:pPr>
+              <a:lnSpc>
+                <a:spcPct val="90000"/>
+              </a:lnSpc>
+              <a:buClr>
+                <a:srgbClr val="2E3640"/>
+              </a:buClr>
+              <a:buSzPct val="100000"/>
+            </a:pPr>
+            <a:endParaRPr lang="en-US" sz="2400" dirty="0">
+              <a:sym typeface="Wingdings" panose="05000000000000000000" pitchFamily="2" charset="2"/>
+            </a:endParaRPr>
+          </a:p>
+          <a:p>
+            <a:pPr>
+              <a:lnSpc>
+                <a:spcPct val="90000"/>
+              </a:lnSpc>
+              <a:buClr>
+                <a:srgbClr val="2E3640"/>
+              </a:buClr>
+              <a:buSzPct val="100000"/>
+            </a:pPr>
+            <a:endParaRPr lang="en-US" sz="2400" dirty="0" smtClean="0"/>
+          </a:p>
+        </p:txBody>
+      </p:sp>
+      <p:sp>
+        <p:nvSpPr>
+          <p:cNvPr id="97" name="Shape 97"/>
+          <p:cNvSpPr txBox="1">
+            <a:spLocks noGrp="1"/>
+          </p:cNvSpPr>
+          <p:nvPr>
+            <p:ph type="body" idx="2"/>
+          </p:nvPr>
+        </p:nvSpPr>
+        <p:spPr>
+          <a:xfrm>
+            <a:off x="341168" y="228026"/>
+            <a:ext cx="8498032" cy="457199"/>
+          </a:xfrm>
+          <a:prstGeom prst="rect">
+            <a:avLst/>
+          </a:prstGeom>
+          <a:noFill/>
+          <a:ln>
+            <a:noFill/>
+          </a:ln>
+        </p:spPr>
+        <p:txBody>
+          <a:bodyPr lIns="68569" tIns="34275" rIns="68569" bIns="34275" anchor="t" anchorCtr="0">
+            <a:noAutofit/>
+          </a:bodyPr>
+          <a:lstStyle/>
+          <a:p>
+            <a:pPr>
+              <a:buClr>
+                <a:schemeClr val="accent2"/>
+              </a:buClr>
+              <a:buSzPct val="25000"/>
+            </a:pPr>
+            <a:r>
+              <a:rPr lang="en-US" sz="3600" dirty="0" smtClean="0"/>
+              <a:t>Hands-on </a:t>
+            </a:r>
+            <a:r>
+              <a:rPr lang="en-US" sz="3600" dirty="0" err="1" smtClean="0"/>
+              <a:t>Workshow</a:t>
+            </a:r>
+            <a:endParaRPr lang="en-US" sz="3600" dirty="0"/>
+          </a:p>
+        </p:txBody>
+      </p:sp>
+    </p:spTree>
+    <p:extLst>
+      <p:ext uri="{BB962C8B-B14F-4D97-AF65-F5344CB8AC3E}">
+        <p14:creationId xmlns:p14="http://schemas.microsoft.com/office/powerpoint/2010/main" val="2075129891"/>
+      </p:ext>
+    </p:extLst>
+  </p:cSld>
+  <p:clrMapOvr>
+    <a:masterClrMapping/>
+  </p:clrMapOvr>
+  <p:transition spd="slow">
+    <p:cut/>
+  </p:transition>
+  <p:timing>
+    <p:tnLst>
+      <p:par>
+        <p:cTn id="1" dur="indefinite" restart="never" nodeType="tmRoot"/>
+      </p:par>
+    </p:tnLst>
+  </p:timing>
+</p:sld>
+</file>
+
+<file path=ppt/slides/slide16.xml><?xml version="1.0" encoding="utf-8"?>
+<p:sld xmlns:a="http://schemas.openxmlformats.org/drawingml/2006/main" xmlns:r="http://schemas.openxmlformats.org/officeDocument/2006/relationships" xmlns:p="http://schemas.openxmlformats.org/presentationml/2006/main">
+  <p:cSld>
+    <p:spTree>
+      <p:nvGrpSpPr>
+        <p:cNvPr id="1" name="Shape 93"/>
+        <p:cNvGrpSpPr/>
+        <p:nvPr/>
+      </p:nvGrpSpPr>
+      <p:grpSpPr>
+        <a:xfrm>
+          <a:off x="0" y="0"/>
+          <a:ext cx="0" cy="0"/>
+          <a:chOff x="0" y="0"/>
+          <a:chExt cx="0" cy="0"/>
+        </a:xfrm>
+      </p:grpSpPr>
+      <p:sp>
+        <p:nvSpPr>
+          <p:cNvPr id="95" name="Shape 95"/>
+          <p:cNvSpPr txBox="1">
+            <a:spLocks noGrp="1"/>
+          </p:cNvSpPr>
+          <p:nvPr>
+            <p:ph type="sldNum" idx="12"/>
+          </p:nvPr>
+        </p:nvSpPr>
+        <p:spPr>
+          <a:xfrm>
+            <a:off x="7600950" y="5688719"/>
+            <a:ext cx="269142" cy="273844"/>
+          </a:xfrm>
+          <a:prstGeom prst="rect">
+            <a:avLst/>
+          </a:prstGeom>
+          <a:noFill/>
+          <a:ln>
+            <a:noFill/>
+          </a:ln>
+        </p:spPr>
+        <p:txBody>
+          <a:bodyPr lIns="68569" tIns="34275" rIns="68569" bIns="34275" anchor="ctr" anchorCtr="0">
+            <a:noAutofit/>
+          </a:bodyPr>
+          <a:lstStyle/>
+          <a:p>
+            <a:pPr>
+              <a:buSzPct val="25000"/>
+            </a:pPr>
+            <a:r>
+              <a:rPr lang="en-US"/>
+              <a:t> </a:t>
+            </a:r>
+          </a:p>
+        </p:txBody>
+      </p:sp>
+      <p:sp>
+        <p:nvSpPr>
+          <p:cNvPr id="96" name="Shape 96"/>
+          <p:cNvSpPr txBox="1">
+            <a:spLocks noGrp="1"/>
+          </p:cNvSpPr>
+          <p:nvPr>
+            <p:ph type="body" idx="1"/>
+          </p:nvPr>
+        </p:nvSpPr>
+        <p:spPr>
+          <a:xfrm>
+            <a:off x="341167" y="937873"/>
+            <a:ext cx="8498033" cy="5024690"/>
+          </a:xfrm>
+          <a:prstGeom prst="rect">
+            <a:avLst/>
+          </a:prstGeom>
+          <a:noFill/>
+          <a:ln>
+            <a:noFill/>
+          </a:ln>
+        </p:spPr>
+        <p:txBody>
+          <a:bodyPr lIns="68569" tIns="34275" rIns="68569" bIns="34275" anchor="t" anchorCtr="0">
+            <a:noAutofit/>
+          </a:bodyPr>
+          <a:lstStyle/>
           <a:p>
             <a:pPr marL="355600" indent="-355600">
               <a:lnSpc>
@@ -8435,10 +8750,8 @@
               </a:buBlip>
             </a:pPr>
             <a:r>
-              <a:rPr lang="en-US" sz="2400" dirty="0" smtClean="0">
-                <a:sym typeface="Wingdings" panose="05000000000000000000" pitchFamily="2" charset="2"/>
-              </a:rPr>
-              <a:t>setup username, password, editor</a:t>
+              <a:rPr lang="en-US" sz="2000" dirty="0" smtClean="0"/>
+              <a:t>install GIT</a:t>
             </a:r>
           </a:p>
           <a:p>
@@ -8455,7 +8768,27 @@
               </a:buBlip>
             </a:pPr>
             <a:r>
-              <a:rPr lang="en-US" sz="2400" dirty="0" smtClean="0">
+              <a:rPr lang="en-US" sz="2000" dirty="0" smtClean="0">
+                <a:sym typeface="Wingdings" panose="05000000000000000000" pitchFamily="2" charset="2"/>
+              </a:rPr>
+              <a:t>setup username, password, editor</a:t>
+            </a:r>
+          </a:p>
+          <a:p>
+            <a:pPr marL="355600" indent="-355600">
+              <a:lnSpc>
+                <a:spcPct val="90000"/>
+              </a:lnSpc>
+              <a:buClr>
+                <a:srgbClr val="2E3640"/>
+              </a:buClr>
+              <a:buSzPct val="100000"/>
+              <a:buBlip>
+                <a:blip r:embed="rId3"/>
+              </a:buBlip>
+            </a:pPr>
+            <a:r>
+              <a:rPr lang="en-US" sz="2000" dirty="0" smtClean="0">
                 <a:sym typeface="Wingdings" panose="05000000000000000000" pitchFamily="2" charset="2"/>
               </a:rPr>
               <a:t>commands</a:t>
@@ -8475,26 +8808,17 @@
               </a:buBlip>
             </a:pPr>
             <a:r>
-              <a:rPr lang="en-US" sz="2400" dirty="0" err="1" smtClean="0">
+              <a:rPr lang="en-US" sz="2000" dirty="0" err="1" smtClean="0">
                 <a:sym typeface="Wingdings" panose="05000000000000000000" pitchFamily="2" charset="2"/>
               </a:rPr>
               <a:t>git</a:t>
             </a:r>
             <a:r>
-              <a:rPr lang="en-US" sz="2400" dirty="0" smtClean="0">
+              <a:rPr lang="en-US" sz="2000" dirty="0" smtClean="0">
                 <a:sym typeface="Wingdings" panose="05000000000000000000" pitchFamily="2" charset="2"/>
               </a:rPr>
-              <a:t> </a:t>
-            </a:r>
-            <a:r>
-              <a:rPr lang="en-US" sz="2400" dirty="0" err="1" smtClean="0">
-                <a:sym typeface="Wingdings" panose="05000000000000000000" pitchFamily="2" charset="2"/>
-              </a:rPr>
-              <a:t>init</a:t>
-            </a:r>
-            <a:endParaRPr lang="en-US" sz="2400" dirty="0" smtClean="0">
-              <a:sym typeface="Wingdings" panose="05000000000000000000" pitchFamily="2" charset="2"/>
-            </a:endParaRPr>
+              <a:t> help [command]</a:t>
+            </a:r>
           </a:p>
           <a:p>
             <a:pPr marL="893763" indent="-355600">
@@ -8510,17 +8834,26 @@
               </a:buBlip>
             </a:pPr>
             <a:r>
-              <a:rPr lang="en-US" sz="2400" dirty="0" err="1" smtClean="0">
+              <a:rPr lang="en-US" sz="2000" dirty="0" err="1" smtClean="0">
                 <a:sym typeface="Wingdings" panose="05000000000000000000" pitchFamily="2" charset="2"/>
               </a:rPr>
               <a:t>git</a:t>
             </a:r>
             <a:r>
-              <a:rPr lang="en-US" sz="2400" dirty="0" smtClean="0">
+              <a:rPr lang="en-US" sz="2000" dirty="0" smtClean="0">
                 <a:sym typeface="Wingdings" panose="05000000000000000000" pitchFamily="2" charset="2"/>
               </a:rPr>
-              <a:t> ignore</a:t>
-            </a:r>
+              <a:t> </a:t>
+            </a:r>
+            <a:r>
+              <a:rPr lang="en-US" sz="2000" dirty="0" err="1" smtClean="0">
+                <a:sym typeface="Wingdings" panose="05000000000000000000" pitchFamily="2" charset="2"/>
+              </a:rPr>
+              <a:t>init</a:t>
+            </a:r>
+            <a:endParaRPr lang="en-US" sz="2000" dirty="0" smtClean="0">
+              <a:sym typeface="Wingdings" panose="05000000000000000000" pitchFamily="2" charset="2"/>
+            </a:endParaRPr>
           </a:p>
           <a:p>
             <a:pPr marL="893763" indent="-355600">
@@ -8536,16 +8869,16 @@
               </a:buBlip>
             </a:pPr>
             <a:r>
-              <a:rPr lang="en-US" sz="2400" dirty="0" err="1" smtClean="0">
+              <a:rPr lang="en-US" sz="2000" dirty="0" err="1" smtClean="0">
                 <a:sym typeface="Wingdings" panose="05000000000000000000" pitchFamily="2" charset="2"/>
               </a:rPr>
               <a:t>git</a:t>
             </a:r>
             <a:r>
-              <a:rPr lang="en-US" sz="2400" dirty="0" smtClean="0">
+              <a:rPr lang="en-US" sz="2000" dirty="0" smtClean="0">
                 <a:sym typeface="Wingdings" panose="05000000000000000000" pitchFamily="2" charset="2"/>
               </a:rPr>
-              <a:t> add</a:t>
+              <a:t> ignore</a:t>
             </a:r>
           </a:p>
           <a:p>
@@ -8562,26 +8895,17 @@
               </a:buBlip>
             </a:pPr>
             <a:r>
-              <a:rPr lang="en-US" sz="2400" dirty="0" err="1" smtClean="0">
+              <a:rPr lang="en-US" sz="2000" dirty="0" err="1" smtClean="0">
                 <a:sym typeface="Wingdings" panose="05000000000000000000" pitchFamily="2" charset="2"/>
               </a:rPr>
               <a:t>git</a:t>
             </a:r>
             <a:r>
-              <a:rPr lang="en-US" sz="2400" dirty="0" smtClean="0">
+              <a:rPr lang="en-US" sz="2000" dirty="0" smtClean="0">
                 <a:sym typeface="Wingdings" panose="05000000000000000000" pitchFamily="2" charset="2"/>
               </a:rPr>
-              <a:t> </a:t>
-            </a:r>
-            <a:r>
-              <a:rPr lang="en-US" sz="2400" dirty="0" err="1" smtClean="0">
-                <a:sym typeface="Wingdings" panose="05000000000000000000" pitchFamily="2" charset="2"/>
-              </a:rPr>
-              <a:t>rm</a:t>
-            </a:r>
-            <a:endParaRPr lang="en-US" sz="2400" dirty="0" smtClean="0">
-              <a:sym typeface="Wingdings" panose="05000000000000000000" pitchFamily="2" charset="2"/>
-            </a:endParaRPr>
+              <a:t> add</a:t>
+            </a:r>
           </a:p>
           <a:p>
             <a:pPr marL="893763" indent="-355600">
@@ -8597,30 +8921,24 @@
               </a:buBlip>
             </a:pPr>
             <a:r>
-              <a:rPr lang="en-US" sz="2400" dirty="0" err="1" smtClean="0">
+              <a:rPr lang="en-US" sz="2000" dirty="0" err="1" smtClean="0">
                 <a:sym typeface="Wingdings" panose="05000000000000000000" pitchFamily="2" charset="2"/>
               </a:rPr>
               <a:t>git</a:t>
             </a:r>
             <a:r>
-              <a:rPr lang="en-US" sz="2400" dirty="0">
+              <a:rPr lang="en-US" sz="2000" dirty="0" smtClean="0">
                 <a:sym typeface="Wingdings" panose="05000000000000000000" pitchFamily="2" charset="2"/>
               </a:rPr>
-              <a:t> commit [--</a:t>
-            </a:r>
-            <a:r>
-              <a:rPr lang="en-US" sz="2400" dirty="0" err="1" smtClean="0">
+              <a:t> </a:t>
+            </a:r>
+            <a:r>
+              <a:rPr lang="en-US" sz="2000" dirty="0" err="1" smtClean="0">
                 <a:sym typeface="Wingdings" panose="05000000000000000000" pitchFamily="2" charset="2"/>
               </a:rPr>
-              <a:t>ammend</a:t>
-            </a:r>
-            <a:r>
-              <a:rPr lang="en-US" sz="2400" dirty="0">
-                <a:sym typeface="Wingdings" panose="05000000000000000000" pitchFamily="2" charset="2"/>
-              </a:rPr>
-              <a:t>]</a:t>
-            </a:r>
-            <a:endParaRPr lang="en-US" sz="2400" dirty="0" smtClean="0">
+              <a:t>rm</a:t>
+            </a:r>
+            <a:endParaRPr lang="en-US" sz="2000" dirty="0" smtClean="0">
               <a:sym typeface="Wingdings" panose="05000000000000000000" pitchFamily="2" charset="2"/>
             </a:endParaRPr>
           </a:p>
@@ -8638,41 +8956,32 @@
               </a:buBlip>
             </a:pPr>
             <a:r>
-              <a:rPr lang="en-US" sz="2400" dirty="0" err="1" smtClean="0">
+              <a:rPr lang="en-US" sz="2000" dirty="0" err="1" smtClean="0">
                 <a:sym typeface="Wingdings" panose="05000000000000000000" pitchFamily="2" charset="2"/>
               </a:rPr>
               <a:t>git</a:t>
             </a:r>
             <a:r>
-              <a:rPr lang="en-US" sz="2400" dirty="0" smtClean="0">
+              <a:rPr lang="en-US" sz="2000" dirty="0">
                 <a:sym typeface="Wingdings" panose="05000000000000000000" pitchFamily="2" charset="2"/>
               </a:rPr>
-              <a:t> merge [--no-</a:t>
-            </a:r>
-            <a:r>
-              <a:rPr lang="en-US" sz="2400" dirty="0" err="1" smtClean="0">
+              <a:t> commit [--</a:t>
+            </a:r>
+            <a:r>
+              <a:rPr lang="en-US" sz="2000" dirty="0" err="1" smtClean="0">
                 <a:sym typeface="Wingdings" panose="05000000000000000000" pitchFamily="2" charset="2"/>
               </a:rPr>
-              <a:t>ff</a:t>
-            </a:r>
-            <a:r>
-              <a:rPr lang="en-US" sz="2400" dirty="0" smtClean="0">
+              <a:t>ammend</a:t>
+            </a:r>
+            <a:r>
+              <a:rPr lang="en-US" sz="2000" dirty="0">
                 <a:sym typeface="Wingdings" panose="05000000000000000000" pitchFamily="2" charset="2"/>
               </a:rPr>
-              <a:t>] [--</a:t>
-            </a:r>
-            <a:r>
-              <a:rPr lang="en-US" sz="2400" dirty="0" err="1" smtClean="0">
-                <a:sym typeface="Wingdings" panose="05000000000000000000" pitchFamily="2" charset="2"/>
-              </a:rPr>
-              <a:t>ff</a:t>
-            </a:r>
-            <a:r>
-              <a:rPr lang="en-US" sz="2400" dirty="0" smtClean="0">
-                <a:sym typeface="Wingdings" panose="05000000000000000000" pitchFamily="2" charset="2"/>
-              </a:rPr>
-              <a:t>-only]</a:t>
-            </a:r>
+              <a:t>]</a:t>
+            </a:r>
+            <a:endParaRPr lang="en-US" sz="2000" dirty="0" smtClean="0">
+              <a:sym typeface="Wingdings" panose="05000000000000000000" pitchFamily="2" charset="2"/>
+            </a:endParaRPr>
           </a:p>
           <a:p>
             <a:pPr marL="893763" indent="-355600">
@@ -8688,16 +8997,40 @@
               </a:buBlip>
             </a:pPr>
             <a:r>
-              <a:rPr lang="en-US" sz="2400" dirty="0" err="1" smtClean="0">
+              <a:rPr lang="en-US" sz="2000" dirty="0" err="1" smtClean="0">
                 <a:sym typeface="Wingdings" panose="05000000000000000000" pitchFamily="2" charset="2"/>
               </a:rPr>
               <a:t>git</a:t>
             </a:r>
             <a:r>
-              <a:rPr lang="en-US" sz="2400" dirty="0" smtClean="0">
+              <a:rPr lang="en-US" sz="2000" dirty="0" smtClean="0">
                 <a:sym typeface="Wingdings" panose="05000000000000000000" pitchFamily="2" charset="2"/>
               </a:rPr>
-              <a:t> rebase [--interactive]</a:t>
+              <a:t> merge [--no-</a:t>
+            </a:r>
+            <a:r>
+              <a:rPr lang="en-US" sz="2000" dirty="0" err="1" smtClean="0">
+                <a:sym typeface="Wingdings" panose="05000000000000000000" pitchFamily="2" charset="2"/>
+              </a:rPr>
+              <a:t>ff</a:t>
+            </a:r>
+            <a:r>
+              <a:rPr lang="en-US" sz="2000" dirty="0" smtClean="0">
+                <a:sym typeface="Wingdings" panose="05000000000000000000" pitchFamily="2" charset="2"/>
+              </a:rPr>
+              <a:t>] [--</a:t>
+            </a:r>
+            <a:r>
+              <a:rPr lang="en-US" sz="2000" dirty="0" err="1" smtClean="0">
+                <a:sym typeface="Wingdings" panose="05000000000000000000" pitchFamily="2" charset="2"/>
+              </a:rPr>
+              <a:t>ff</a:t>
+            </a:r>
+            <a:r>
+              <a:rPr lang="en-US" sz="2000" dirty="0" smtClean="0">
+                <a:sym typeface="Wingdings" panose="05000000000000000000" pitchFamily="2" charset="2"/>
+              </a:rPr>
+              <a:t>-only]</a:t>
             </a:r>
           </a:p>
           <a:p>
@@ -8714,26 +9047,17 @@
               </a:buBlip>
             </a:pPr>
             <a:r>
-              <a:rPr lang="en-US" sz="2400" dirty="0" err="1" smtClean="0">
+              <a:rPr lang="en-US" sz="2000" dirty="0" err="1" smtClean="0">
                 <a:sym typeface="Wingdings" panose="05000000000000000000" pitchFamily="2" charset="2"/>
               </a:rPr>
               <a:t>git</a:t>
             </a:r>
             <a:r>
-              <a:rPr lang="en-US" sz="2400" dirty="0" smtClean="0">
+              <a:rPr lang="en-US" sz="2000" dirty="0" smtClean="0">
                 <a:sym typeface="Wingdings" panose="05000000000000000000" pitchFamily="2" charset="2"/>
               </a:rPr>
-              <a:t> </a:t>
-            </a:r>
-            <a:r>
-              <a:rPr lang="en-US" sz="2400" dirty="0" err="1" smtClean="0">
-                <a:sym typeface="Wingdings" panose="05000000000000000000" pitchFamily="2" charset="2"/>
-              </a:rPr>
-              <a:t>reflog</a:t>
-            </a:r>
-            <a:endParaRPr lang="en-US" sz="2400" dirty="0" smtClean="0">
-              <a:sym typeface="Wingdings" panose="05000000000000000000" pitchFamily="2" charset="2"/>
-            </a:endParaRPr>
+              <a:t> rebase [--interactive]</a:t>
+            </a:r>
           </a:p>
           <a:p>
             <a:pPr marL="893763" indent="-355600">
@@ -8749,17 +9073,26 @@
               </a:buBlip>
             </a:pPr>
             <a:r>
-              <a:rPr lang="en-US" sz="2400" dirty="0" err="1" smtClean="0">
+              <a:rPr lang="en-US" sz="2000" dirty="0" err="1" smtClean="0">
                 <a:sym typeface="Wingdings" panose="05000000000000000000" pitchFamily="2" charset="2"/>
               </a:rPr>
               <a:t>git</a:t>
             </a:r>
             <a:r>
-              <a:rPr lang="en-US" sz="2400" dirty="0" smtClean="0">
+              <a:rPr lang="en-US" sz="2000" dirty="0" smtClean="0">
                 <a:sym typeface="Wingdings" panose="05000000000000000000" pitchFamily="2" charset="2"/>
               </a:rPr>
-              <a:t> fetch</a:t>
-            </a:r>
+              <a:t> </a:t>
+            </a:r>
+            <a:r>
+              <a:rPr lang="en-US" sz="2000" dirty="0" err="1" smtClean="0">
+                <a:sym typeface="Wingdings" panose="05000000000000000000" pitchFamily="2" charset="2"/>
+              </a:rPr>
+              <a:t>reflog</a:t>
+            </a:r>
+            <a:endParaRPr lang="en-US" sz="2000" dirty="0" smtClean="0">
+              <a:sym typeface="Wingdings" panose="05000000000000000000" pitchFamily="2" charset="2"/>
+            </a:endParaRPr>
           </a:p>
           <a:p>
             <a:pPr marL="893763" indent="-355600">
@@ -8775,16 +9108,16 @@
               </a:buBlip>
             </a:pPr>
             <a:r>
-              <a:rPr lang="en-US" sz="2400" dirty="0" err="1" smtClean="0">
+              <a:rPr lang="en-US" sz="2000" dirty="0" err="1" smtClean="0">
                 <a:sym typeface="Wingdings" panose="05000000000000000000" pitchFamily="2" charset="2"/>
               </a:rPr>
               <a:t>git</a:t>
             </a:r>
             <a:r>
-              <a:rPr lang="en-US" sz="2400" dirty="0" smtClean="0">
+              <a:rPr lang="en-US" sz="2000" dirty="0" smtClean="0">
                 <a:sym typeface="Wingdings" panose="05000000000000000000" pitchFamily="2" charset="2"/>
               </a:rPr>
-              <a:t> pull [--rebase]</a:t>
+              <a:t> fetch</a:t>
             </a:r>
           </a:p>
           <a:p>
@@ -8801,16 +9134,16 @@
               </a:buBlip>
             </a:pPr>
             <a:r>
-              <a:rPr lang="en-US" sz="2400" dirty="0" err="1" smtClean="0">
+              <a:rPr lang="en-US" sz="2000" dirty="0" err="1" smtClean="0">
                 <a:sym typeface="Wingdings" panose="05000000000000000000" pitchFamily="2" charset="2"/>
               </a:rPr>
               <a:t>git</a:t>
             </a:r>
             <a:r>
-              <a:rPr lang="en-US" sz="2400" dirty="0" smtClean="0">
+              <a:rPr lang="en-US" sz="2000" dirty="0" smtClean="0">
                 <a:sym typeface="Wingdings" panose="05000000000000000000" pitchFamily="2" charset="2"/>
               </a:rPr>
-              <a:t> push</a:t>
+              <a:t> pull [--rebase]</a:t>
             </a:r>
           </a:p>
           <a:p>
@@ -8827,16 +9160,16 @@
               </a:buBlip>
             </a:pPr>
             <a:r>
-              <a:rPr lang="en-US" sz="2400" dirty="0" err="1" smtClean="0">
+              <a:rPr lang="en-US" sz="2000" dirty="0" err="1" smtClean="0">
                 <a:sym typeface="Wingdings" panose="05000000000000000000" pitchFamily="2" charset="2"/>
               </a:rPr>
               <a:t>git</a:t>
             </a:r>
             <a:r>
-              <a:rPr lang="en-US" sz="2400" dirty="0" smtClean="0">
+              <a:rPr lang="en-US" sz="2000" dirty="0" smtClean="0">
                 <a:sym typeface="Wingdings" panose="05000000000000000000" pitchFamily="2" charset="2"/>
               </a:rPr>
-              <a:t> branch</a:t>
+              <a:t> push</a:t>
             </a:r>
           </a:p>
           <a:p>
@@ -8853,16 +9186,16 @@
               </a:buBlip>
             </a:pPr>
             <a:r>
-              <a:rPr lang="en-US" sz="2400" dirty="0" err="1" smtClean="0">
+              <a:rPr lang="en-US" sz="2000" dirty="0" err="1" smtClean="0">
                 <a:sym typeface="Wingdings" panose="05000000000000000000" pitchFamily="2" charset="2"/>
               </a:rPr>
               <a:t>git</a:t>
             </a:r>
             <a:r>
-              <a:rPr lang="en-US" sz="2400" dirty="0" smtClean="0">
+              <a:rPr lang="en-US" sz="2000" dirty="0" smtClean="0">
                 <a:sym typeface="Wingdings" panose="05000000000000000000" pitchFamily="2" charset="2"/>
               </a:rPr>
-              <a:t> tag</a:t>
+              <a:t> branch</a:t>
             </a:r>
           </a:p>
           <a:p>
@@ -8878,52 +9211,27 @@
                 <a:blip r:embed="rId3"/>
               </a:buBlip>
             </a:pPr>
-            <a:endParaRPr lang="en-US" sz="2400" dirty="0" smtClean="0">
+            <a:r>
+              <a:rPr lang="en-US" sz="2000" dirty="0" err="1" smtClean="0">
+                <a:sym typeface="Wingdings" panose="05000000000000000000" pitchFamily="2" charset="2"/>
+              </a:rPr>
+              <a:t>git</a:t>
+            </a:r>
+            <a:r>
+              <a:rPr lang="en-US" sz="2000" dirty="0" smtClean="0">
+                <a:sym typeface="Wingdings" panose="05000000000000000000" pitchFamily="2" charset="2"/>
+              </a:rPr>
+              <a:t> </a:t>
+            </a:r>
+            <a:r>
+              <a:rPr lang="en-US" sz="2000" dirty="0" smtClean="0">
+                <a:sym typeface="Wingdings" panose="05000000000000000000" pitchFamily="2" charset="2"/>
+              </a:rPr>
+              <a:t>tag</a:t>
+            </a:r>
+            <a:endParaRPr lang="en-US" sz="2000" dirty="0" smtClean="0">
               <a:sym typeface="Wingdings" panose="05000000000000000000" pitchFamily="2" charset="2"/>
             </a:endParaRPr>
-          </a:p>
-          <a:p>
-            <a:pPr marL="355600" indent="-355600">
-              <a:lnSpc>
-                <a:spcPct val="90000"/>
-              </a:lnSpc>
-              <a:buClr>
-                <a:srgbClr val="2E3640"/>
-              </a:buClr>
-              <a:buSzPct val="100000"/>
-              <a:buBlip>
-                <a:blip r:embed="rId3"/>
-              </a:buBlip>
-            </a:pPr>
-            <a:endParaRPr lang="en-US" sz="2400" dirty="0" smtClean="0">
-              <a:sym typeface="Wingdings" panose="05000000000000000000" pitchFamily="2" charset="2"/>
-            </a:endParaRPr>
-          </a:p>
-          <a:p>
-            <a:pPr>
-              <a:lnSpc>
-                <a:spcPct val="90000"/>
-              </a:lnSpc>
-              <a:buClr>
-                <a:srgbClr val="2E3640"/>
-              </a:buClr>
-              <a:buSzPct val="100000"/>
-            </a:pPr>
-            <a:endParaRPr lang="en-US" sz="2400" dirty="0">
-              <a:sym typeface="Wingdings" panose="05000000000000000000" pitchFamily="2" charset="2"/>
-            </a:endParaRPr>
-          </a:p>
-          <a:p>
-            <a:pPr>
-              <a:lnSpc>
-                <a:spcPct val="90000"/>
-              </a:lnSpc>
-              <a:buClr>
-                <a:srgbClr val="2E3640"/>
-              </a:buClr>
-              <a:buSzPct val="100000"/>
-            </a:pPr>
-            <a:endParaRPr lang="en-US" sz="2400" dirty="0" smtClean="0"/>
           </a:p>
         </p:txBody>
       </p:sp>
@@ -9122,11 +9430,7 @@
             </a:pPr>
             <a:r>
               <a:rPr lang="en-US" sz="2400" dirty="0" smtClean="0"/>
-              <a:t> Compared with </a:t>
-            </a:r>
-            <a:r>
-              <a:rPr lang="en-US" sz="2400" dirty="0" smtClean="0"/>
-              <a:t>SVN</a:t>
+              <a:t> Compared with SVN</a:t>
             </a:r>
           </a:p>
           <a:p>
@@ -9150,7 +9454,6 @@
               <a:rPr lang="en-US" sz="2400" dirty="0" smtClean="0"/>
               <a:t>GIT concepts</a:t>
             </a:r>
-            <a:endParaRPr lang="en-US" sz="2400" dirty="0" smtClean="0"/>
           </a:p>
           <a:p>
             <a:pPr marL="285750" indent="-285750">
@@ -9781,15 +10084,7 @@
             </a:pPr>
             <a:r>
               <a:rPr lang="en-US" sz="2400" dirty="0" smtClean="0"/>
-              <a:t>GIT has real </a:t>
-            </a:r>
-            <a:r>
-              <a:rPr lang="en-US" sz="2400" dirty="0" smtClean="0"/>
-              <a:t>branches (DAG), </a:t>
-            </a:r>
-            <a:r>
-              <a:rPr lang="en-US" sz="2400" dirty="0" smtClean="0"/>
-              <a:t>SVN has linear history with simulated branches (just directories)</a:t>
+              <a:t>GIT has real branches (DAG), SVN has linear history with simulated branches (just directories)</a:t>
             </a:r>
             <a:endParaRPr lang="en-US" sz="2400" dirty="0" smtClean="0">
               <a:sym typeface="Wingdings" panose="05000000000000000000" pitchFamily="2" charset="2"/>
@@ -9864,11 +10159,7 @@
             </a:r>
             <a:r>
               <a:rPr lang="en-US" sz="3600" dirty="0" smtClean="0"/>
-              <a:t>SVN / </a:t>
-            </a:r>
-            <a:r>
-              <a:rPr lang="en-US" sz="3600" dirty="0" smtClean="0"/>
-              <a:t>History</a:t>
+              <a:t>SVN / History</a:t>
             </a:r>
             <a:endParaRPr lang="en-US" sz="3600" dirty="0"/>
           </a:p>
@@ -10142,9 +10433,6 @@
               </a:rPr>
               <a:t>in GIT you switch between branches in the same directory</a:t>
             </a:r>
-            <a:endParaRPr lang="en-US" sz="2400" dirty="0" smtClean="0">
-              <a:sym typeface="Wingdings" panose="05000000000000000000" pitchFamily="2" charset="2"/>
-            </a:endParaRPr>
           </a:p>
           <a:p>
             <a:pPr>
@@ -10201,11 +10489,7 @@
             </a:r>
             <a:r>
               <a:rPr lang="en-US" sz="3600" dirty="0" smtClean="0"/>
-              <a:t>SVN / </a:t>
-            </a:r>
-            <a:r>
-              <a:rPr lang="en-US" sz="3600" dirty="0" smtClean="0"/>
-              <a:t>More on Branches</a:t>
+              <a:t>SVN / More on Branches</a:t>
             </a:r>
             <a:endParaRPr lang="en-US" sz="3600" dirty="0"/>
           </a:p>
@@ -10448,83 +10732,6 @@
       </p:sp>
       <p:sp>
         <p:nvSpPr>
-          <p:cNvPr id="96" name="Shape 96"/>
-          <p:cNvSpPr txBox="1">
-            <a:spLocks noGrp="1"/>
-          </p:cNvSpPr>
-          <p:nvPr>
-            <p:ph type="body" idx="1"/>
-          </p:nvPr>
-        </p:nvSpPr>
-        <p:spPr>
-          <a:xfrm>
-            <a:off x="341167" y="937873"/>
-            <a:ext cx="8498033" cy="5024690"/>
-          </a:xfrm>
-          <a:prstGeom prst="rect">
-            <a:avLst/>
-          </a:prstGeom>
-          <a:noFill/>
-          <a:ln>
-            <a:noFill/>
-          </a:ln>
-        </p:spPr>
-        <p:txBody>
-          <a:bodyPr lIns="68569" tIns="34275" rIns="68569" bIns="34275" anchor="t" anchorCtr="0">
-            <a:noAutofit/>
-          </a:bodyPr>
-          <a:lstStyle/>
-          <a:p>
-            <a:pPr marL="355600" indent="-355600">
-              <a:lnSpc>
-                <a:spcPct val="90000"/>
-              </a:lnSpc>
-              <a:buClr>
-                <a:srgbClr val="2E3640"/>
-              </a:buClr>
-              <a:buSzPct val="100000"/>
-              <a:buBlip>
-                <a:blip r:embed="rId3"/>
-              </a:buBlip>
-            </a:pPr>
-            <a:r>
-              <a:rPr lang="en-US" sz="2400" dirty="0" smtClean="0"/>
-              <a:t>stuff</a:t>
-            </a:r>
-            <a:endParaRPr lang="en-US" sz="2400" dirty="0" smtClean="0">
-              <a:sym typeface="Wingdings" panose="05000000000000000000" pitchFamily="2" charset="2"/>
-            </a:endParaRPr>
-          </a:p>
-          <a:p>
-            <a:pPr>
-              <a:lnSpc>
-                <a:spcPct val="90000"/>
-              </a:lnSpc>
-              <a:buClr>
-                <a:srgbClr val="2E3640"/>
-              </a:buClr>
-              <a:buSzPct val="100000"/>
-            </a:pPr>
-            <a:endParaRPr lang="en-US" sz="2400" dirty="0">
-              <a:sym typeface="Wingdings" panose="05000000000000000000" pitchFamily="2" charset="2"/>
-            </a:endParaRPr>
-          </a:p>
-          <a:p>
-            <a:pPr>
-              <a:lnSpc>
-                <a:spcPct val="90000"/>
-              </a:lnSpc>
-              <a:buClr>
-                <a:srgbClr val="2E3640"/>
-              </a:buClr>
-              <a:buSzPct val="100000"/>
-            </a:pPr>
-            <a:endParaRPr lang="en-US" sz="2400" dirty="0" smtClean="0"/>
-          </a:p>
-        </p:txBody>
-      </p:sp>
-      <p:sp>
-        <p:nvSpPr>
           <p:cNvPr id="97" name="Shape 97"/>
           <p:cNvSpPr txBox="1">
             <a:spLocks noGrp="1"/>
@@ -10560,12 +10767,42 @@
             </a:pPr>
             <a:r>
               <a:rPr lang="en-US" sz="3600" dirty="0" smtClean="0"/>
-              <a:t>Title</a:t>
+              <a:t>GIT commit / 1 of 2</a:t>
             </a:r>
             <a:endParaRPr lang="en-US" sz="3600" dirty="0"/>
           </a:p>
         </p:txBody>
       </p:sp>
+      <p:pic>
+        <p:nvPicPr>
+          <p:cNvPr id="3" name="Picture 2"/>
+          <p:cNvPicPr>
+            <a:picLocks noChangeAspect="1"/>
+          </p:cNvPicPr>
+          <p:nvPr/>
+        </p:nvPicPr>
+        <p:blipFill>
+          <a:blip r:embed="rId3">
+            <a:extLst>
+              <a:ext uri="{28A0092B-C50C-407E-A947-70E740481C1C}">
+                <a14:useLocalDpi xmlns:a14="http://schemas.microsoft.com/office/drawing/2010/main" val="0"/>
+              </a:ext>
+            </a:extLst>
+          </a:blip>
+          <a:stretch>
+            <a:fillRect/>
+          </a:stretch>
+        </p:blipFill>
+        <p:spPr>
+          <a:xfrm>
+            <a:off x="852487" y="1552575"/>
+            <a:ext cx="7439025" cy="3752850"/>
+          </a:xfrm>
+          <a:prstGeom prst="rect">
+            <a:avLst/>
+          </a:prstGeom>
+        </p:spPr>
+      </p:pic>
     </p:spTree>
     <p:extLst>
       <p:ext uri="{BB962C8B-B14F-4D97-AF65-F5344CB8AC3E}">
@@ -10647,83 +10884,6 @@
       </p:sp>
       <p:sp>
         <p:nvSpPr>
-          <p:cNvPr id="96" name="Shape 96"/>
-          <p:cNvSpPr txBox="1">
-            <a:spLocks noGrp="1"/>
-          </p:cNvSpPr>
-          <p:nvPr>
-            <p:ph type="body" idx="1"/>
-          </p:nvPr>
-        </p:nvSpPr>
-        <p:spPr>
-          <a:xfrm>
-            <a:off x="341167" y="937873"/>
-            <a:ext cx="8498033" cy="5024690"/>
-          </a:xfrm>
-          <a:prstGeom prst="rect">
-            <a:avLst/>
-          </a:prstGeom>
-          <a:noFill/>
-          <a:ln>
-            <a:noFill/>
-          </a:ln>
-        </p:spPr>
-        <p:txBody>
-          <a:bodyPr lIns="68569" tIns="34275" rIns="68569" bIns="34275" anchor="t" anchorCtr="0">
-            <a:noAutofit/>
-          </a:bodyPr>
-          <a:lstStyle/>
-          <a:p>
-            <a:pPr marL="355600" indent="-355600">
-              <a:lnSpc>
-                <a:spcPct val="90000"/>
-              </a:lnSpc>
-              <a:buClr>
-                <a:srgbClr val="2E3640"/>
-              </a:buClr>
-              <a:buSzPct val="100000"/>
-              <a:buBlip>
-                <a:blip r:embed="rId3"/>
-              </a:buBlip>
-            </a:pPr>
-            <a:r>
-              <a:rPr lang="en-US" sz="2400" dirty="0" smtClean="0"/>
-              <a:t>stuff</a:t>
-            </a:r>
-            <a:endParaRPr lang="en-US" sz="2400" dirty="0" smtClean="0">
-              <a:sym typeface="Wingdings" panose="05000000000000000000" pitchFamily="2" charset="2"/>
-            </a:endParaRPr>
-          </a:p>
-          <a:p>
-            <a:pPr>
-              <a:lnSpc>
-                <a:spcPct val="90000"/>
-              </a:lnSpc>
-              <a:buClr>
-                <a:srgbClr val="2E3640"/>
-              </a:buClr>
-              <a:buSzPct val="100000"/>
-            </a:pPr>
-            <a:endParaRPr lang="en-US" sz="2400" dirty="0">
-              <a:sym typeface="Wingdings" panose="05000000000000000000" pitchFamily="2" charset="2"/>
-            </a:endParaRPr>
-          </a:p>
-          <a:p>
-            <a:pPr>
-              <a:lnSpc>
-                <a:spcPct val="90000"/>
-              </a:lnSpc>
-              <a:buClr>
-                <a:srgbClr val="2E3640"/>
-              </a:buClr>
-              <a:buSzPct val="100000"/>
-            </a:pPr>
-            <a:endParaRPr lang="en-US" sz="2400" dirty="0" smtClean="0"/>
-          </a:p>
-        </p:txBody>
-      </p:sp>
-      <p:sp>
-        <p:nvSpPr>
           <p:cNvPr id="97" name="Shape 97"/>
           <p:cNvSpPr txBox="1">
             <a:spLocks noGrp="1"/>
@@ -10759,16 +10919,46 @@
             </a:pPr>
             <a:r>
               <a:rPr lang="en-US" sz="3600" dirty="0" smtClean="0"/>
-              <a:t>Title</a:t>
+              <a:t>GIT commit / 2 of 2</a:t>
             </a:r>
             <a:endParaRPr lang="en-US" sz="3600" dirty="0"/>
           </a:p>
         </p:txBody>
       </p:sp>
+      <p:pic>
+        <p:nvPicPr>
+          <p:cNvPr id="2" name="Picture 1"/>
+          <p:cNvPicPr>
+            <a:picLocks noChangeAspect="1"/>
+          </p:cNvPicPr>
+          <p:nvPr/>
+        </p:nvPicPr>
+        <p:blipFill>
+          <a:blip r:embed="rId3">
+            <a:extLst>
+              <a:ext uri="{28A0092B-C50C-407E-A947-70E740481C1C}">
+                <a14:useLocalDpi xmlns:a14="http://schemas.microsoft.com/office/drawing/2010/main" val="0"/>
+              </a:ext>
+            </a:extLst>
+          </a:blip>
+          <a:stretch>
+            <a:fillRect/>
+          </a:stretch>
+        </p:blipFill>
+        <p:spPr>
+          <a:xfrm>
+            <a:off x="800100" y="1566862"/>
+            <a:ext cx="7543800" cy="3724275"/>
+          </a:xfrm>
+          <a:prstGeom prst="rect">
+            <a:avLst/>
+          </a:prstGeom>
+        </p:spPr>
+      </p:pic>
     </p:spTree>
     <p:extLst>
       <p:ext uri="{BB962C8B-B14F-4D97-AF65-F5344CB8AC3E}">
-        <p14:creationId xmlns:p14="http://schemas.microsoft.com/office/powerpoint/2010/main" val="264915446"/>
+        <p14:creationId xmlns:p14="http://schemas.microsoft.com/office/powerpoint/2010/main" val="3927573702"/>
       </p:ext>
     </p:extLst>
   </p:cSld>

</xml_diff>

<commit_message>
add gloves ("time to get the hands dirty")
</commit_message>
<xml_diff>
--- a/GIT Presentation.pptx
+++ b/GIT Presentation.pptx
@@ -8629,6 +8629,36 @@
           </a:p>
         </p:txBody>
       </p:sp>
+      <p:pic>
+        <p:nvPicPr>
+          <p:cNvPr id="2" name="Picture 1"/>
+          <p:cNvPicPr>
+            <a:picLocks noChangeAspect="1"/>
+          </p:cNvPicPr>
+          <p:nvPr/>
+        </p:nvPicPr>
+        <p:blipFill>
+          <a:blip r:embed="rId4" cstate="print">
+            <a:extLst>
+              <a:ext uri="{28A0092B-C50C-407E-A947-70E740481C1C}">
+                <a14:useLocalDpi xmlns:a14="http://schemas.microsoft.com/office/drawing/2010/main" val="0"/>
+              </a:ext>
+            </a:extLst>
+          </a:blip>
+          <a:stretch>
+            <a:fillRect/>
+          </a:stretch>
+        </p:blipFill>
+        <p:spPr>
+          <a:xfrm>
+            <a:off x="1744403" y="1514354"/>
+            <a:ext cx="5529699" cy="4479801"/>
+          </a:xfrm>
+          <a:prstGeom prst="rect">
+            <a:avLst/>
+          </a:prstGeom>
+        </p:spPr>
+      </p:pic>
     </p:spTree>
     <p:extLst>
       <p:ext uri="{BB962C8B-B14F-4D97-AF65-F5344CB8AC3E}">

</xml_diff>

<commit_message>
add slide explaining what happens when you switch branches
</commit_message>
<xml_diff>
--- a/GIT Presentation.pptx
+++ b/GIT Presentation.pptx
@@ -6,7 +6,7 @@
     <p:sldMasterId id="2147483665" r:id="rId2"/>
   </p:sldMasterIdLst>
   <p:notesMasterIdLst>
-    <p:notesMasterId r:id="rId19"/>
+    <p:notesMasterId r:id="rId24"/>
   </p:notesMasterIdLst>
   <p:sldIdLst>
     <p:sldId id="257" r:id="rId3"/>
@@ -18,13 +18,18 @@
     <p:sldId id="266" r:id="rId9"/>
     <p:sldId id="267" r:id="rId10"/>
     <p:sldId id="276" r:id="rId11"/>
-    <p:sldId id="268" r:id="rId12"/>
-    <p:sldId id="269" r:id="rId13"/>
-    <p:sldId id="270" r:id="rId14"/>
-    <p:sldId id="271" r:id="rId15"/>
-    <p:sldId id="272" r:id="rId16"/>
-    <p:sldId id="273" r:id="rId17"/>
-    <p:sldId id="275" r:id="rId18"/>
+    <p:sldId id="277" r:id="rId12"/>
+    <p:sldId id="268" r:id="rId13"/>
+    <p:sldId id="278" r:id="rId14"/>
+    <p:sldId id="279" r:id="rId15"/>
+    <p:sldId id="280" r:id="rId16"/>
+    <p:sldId id="281" r:id="rId17"/>
+    <p:sldId id="269" r:id="rId18"/>
+    <p:sldId id="270" r:id="rId19"/>
+    <p:sldId id="271" r:id="rId20"/>
+    <p:sldId id="272" r:id="rId21"/>
+    <p:sldId id="273" r:id="rId22"/>
+    <p:sldId id="275" r:id="rId23"/>
   </p:sldIdLst>
   <p:sldSz cx="9144000" cy="6858000" type="screen4x3"/>
   <p:notesSz cx="6858000" cy="9144000"/>
@@ -638,6 +643,34 @@
               <a:buFontTx/>
               <a:buChar char="-"/>
             </a:pPr>
+            <a:r>
+              <a:rPr lang="en-US" dirty="0" smtClean="0"/>
+              <a:t>2 things happens</a:t>
+            </a:r>
+          </a:p>
+          <a:p>
+            <a:pPr marL="628650" lvl="1" indent="-171450">
+              <a:buFontTx/>
+              <a:buChar char="-"/>
+            </a:pPr>
+            <a:r>
+              <a:rPr lang="en-US" dirty="0" smtClean="0"/>
+              <a:t>the</a:t>
+            </a:r>
+            <a:r>
+              <a:rPr lang="en-US" baseline="0" dirty="0" smtClean="0"/>
+              <a:t> HEAD label changes to point to the new branch (my-branch)</a:t>
+            </a:r>
+          </a:p>
+          <a:p>
+            <a:pPr marL="628650" lvl="1" indent="-171450">
+              <a:buFontTx/>
+              <a:buChar char="-"/>
+            </a:pPr>
+            <a:r>
+              <a:rPr lang="en-US" baseline="0" dirty="0" smtClean="0"/>
+              <a:t>the files in the working directory are changed to reflect the state of the files in my-branch</a:t>
+            </a:r>
             <a:endParaRPr dirty="0"/>
           </a:p>
         </p:txBody>
@@ -686,7 +719,7 @@
     </p:spTree>
     <p:extLst>
       <p:ext uri="{BB962C8B-B14F-4D97-AF65-F5344CB8AC3E}">
-        <p14:creationId xmlns:p14="http://schemas.microsoft.com/office/powerpoint/2010/main" val="1408504777"/>
+        <p14:creationId xmlns:p14="http://schemas.microsoft.com/office/powerpoint/2010/main" val="1129209744"/>
       </p:ext>
     </p:extLst>
   </p:cSld>
@@ -790,7 +823,7 @@
     </p:spTree>
     <p:extLst>
       <p:ext uri="{BB962C8B-B14F-4D97-AF65-F5344CB8AC3E}">
-        <p14:creationId xmlns:p14="http://schemas.microsoft.com/office/powerpoint/2010/main" val="1650745352"/>
+        <p14:creationId xmlns:p14="http://schemas.microsoft.com/office/powerpoint/2010/main" val="1408504777"/>
       </p:ext>
     </p:extLst>
   </p:cSld>
@@ -894,7 +927,7 @@
     </p:spTree>
     <p:extLst>
       <p:ext uri="{BB962C8B-B14F-4D97-AF65-F5344CB8AC3E}">
-        <p14:creationId xmlns:p14="http://schemas.microsoft.com/office/powerpoint/2010/main" val="979907960"/>
+        <p14:creationId xmlns:p14="http://schemas.microsoft.com/office/powerpoint/2010/main" val="4173674627"/>
       </p:ext>
     </p:extLst>
   </p:cSld>
@@ -998,7 +1031,7 @@
     </p:spTree>
     <p:extLst>
       <p:ext uri="{BB962C8B-B14F-4D97-AF65-F5344CB8AC3E}">
-        <p14:creationId xmlns:p14="http://schemas.microsoft.com/office/powerpoint/2010/main" val="2667286518"/>
+        <p14:creationId xmlns:p14="http://schemas.microsoft.com/office/powerpoint/2010/main" val="796577067"/>
       </p:ext>
     </p:extLst>
   </p:cSld>
@@ -1102,7 +1135,7 @@
     </p:spTree>
     <p:extLst>
       <p:ext uri="{BB962C8B-B14F-4D97-AF65-F5344CB8AC3E}">
-        <p14:creationId xmlns:p14="http://schemas.microsoft.com/office/powerpoint/2010/main" val="890929024"/>
+        <p14:creationId xmlns:p14="http://schemas.microsoft.com/office/powerpoint/2010/main" val="2140635485"/>
       </p:ext>
     </p:extLst>
   </p:cSld>
@@ -1158,46 +1191,6 @@
               <a:buFontTx/>
               <a:buChar char="-"/>
             </a:pPr>
-            <a:r>
-              <a:rPr lang="en-US" baseline="0" dirty="0" smtClean="0"/>
-              <a:t>install GIT</a:t>
-            </a:r>
-          </a:p>
-          <a:p>
-            <a:pPr marL="628650" lvl="1" indent="-171450">
-              <a:buFontTx/>
-              <a:buChar char="-"/>
-            </a:pPr>
-            <a:r>
-              <a:rPr lang="en-US" baseline="0" dirty="0" smtClean="0"/>
-              <a:t>Windows</a:t>
-            </a:r>
-          </a:p>
-          <a:p>
-            <a:pPr marL="628650" lvl="1" indent="-171450">
-              <a:buFontTx/>
-              <a:buChar char="-"/>
-            </a:pPr>
-            <a:r>
-              <a:rPr lang="en-US" baseline="0" dirty="0" smtClean="0"/>
-              <a:t>Mac</a:t>
-            </a:r>
-          </a:p>
-          <a:p>
-            <a:pPr marL="171450" lvl="0" indent="-171450">
-              <a:buFontTx/>
-              <a:buChar char="-"/>
-            </a:pPr>
-            <a:r>
-              <a:rPr lang="en-US" baseline="0" dirty="0" smtClean="0"/>
-              <a:t>setup username and email</a:t>
-            </a:r>
-          </a:p>
-          <a:p>
-            <a:pPr marL="171450" lvl="0" indent="-171450">
-              <a:buFontTx/>
-              <a:buChar char="-"/>
-            </a:pPr>
             <a:endParaRPr dirty="0"/>
           </a:p>
         </p:txBody>
@@ -1246,7 +1239,7 @@
     </p:spTree>
     <p:extLst>
       <p:ext uri="{BB962C8B-B14F-4D97-AF65-F5344CB8AC3E}">
-        <p14:creationId xmlns:p14="http://schemas.microsoft.com/office/powerpoint/2010/main" val="2666093823"/>
+        <p14:creationId xmlns:p14="http://schemas.microsoft.com/office/powerpoint/2010/main" val="3219326357"/>
       </p:ext>
     </p:extLst>
   </p:cSld>
@@ -1302,46 +1295,6 @@
               <a:buFontTx/>
               <a:buChar char="-"/>
             </a:pPr>
-            <a:r>
-              <a:rPr lang="en-US" baseline="0" dirty="0" smtClean="0"/>
-              <a:t>install GIT</a:t>
-            </a:r>
-          </a:p>
-          <a:p>
-            <a:pPr marL="628650" lvl="1" indent="-171450">
-              <a:buFontTx/>
-              <a:buChar char="-"/>
-            </a:pPr>
-            <a:r>
-              <a:rPr lang="en-US" baseline="0" dirty="0" smtClean="0"/>
-              <a:t>Windows</a:t>
-            </a:r>
-          </a:p>
-          <a:p>
-            <a:pPr marL="628650" lvl="1" indent="-171450">
-              <a:buFontTx/>
-              <a:buChar char="-"/>
-            </a:pPr>
-            <a:r>
-              <a:rPr lang="en-US" baseline="0" dirty="0" smtClean="0"/>
-              <a:t>Mac</a:t>
-            </a:r>
-          </a:p>
-          <a:p>
-            <a:pPr marL="171450" lvl="0" indent="-171450">
-              <a:buFontTx/>
-              <a:buChar char="-"/>
-            </a:pPr>
-            <a:r>
-              <a:rPr lang="en-US" baseline="0" dirty="0" smtClean="0"/>
-              <a:t>setup username and email</a:t>
-            </a:r>
-          </a:p>
-          <a:p>
-            <a:pPr marL="171450" lvl="0" indent="-171450">
-              <a:buFontTx/>
-              <a:buChar char="-"/>
-            </a:pPr>
             <a:endParaRPr dirty="0"/>
           </a:p>
         </p:txBody>
@@ -1390,7 +1343,319 @@
     </p:spTree>
     <p:extLst>
       <p:ext uri="{BB962C8B-B14F-4D97-AF65-F5344CB8AC3E}">
-        <p14:creationId xmlns:p14="http://schemas.microsoft.com/office/powerpoint/2010/main" val="1567401964"/>
+        <p14:creationId xmlns:p14="http://schemas.microsoft.com/office/powerpoint/2010/main" val="1650745352"/>
+      </p:ext>
+    </p:extLst>
+  </p:cSld>
+  <p:clrMapOvr>
+    <a:masterClrMapping/>
+  </p:clrMapOvr>
+</p:notes>
+</file>
+
+<file path=ppt/notesSlides/notesSlide17.xml><?xml version="1.0" encoding="utf-8"?>
+<p:notes xmlns:a="http://schemas.openxmlformats.org/drawingml/2006/main" xmlns:r="http://schemas.openxmlformats.org/officeDocument/2006/relationships" xmlns:p="http://schemas.openxmlformats.org/presentationml/2006/main" showMasterSp="0" showMasterPhAnim="0">
+  <p:cSld>
+    <p:spTree>
+      <p:nvGrpSpPr>
+        <p:cNvPr id="1" name="Shape 98"/>
+        <p:cNvGrpSpPr/>
+        <p:nvPr/>
+      </p:nvGrpSpPr>
+      <p:grpSpPr>
+        <a:xfrm>
+          <a:off x="0" y="0"/>
+          <a:ext cx="0" cy="0"/>
+          <a:chOff x="0" y="0"/>
+          <a:chExt cx="0" cy="0"/>
+        </a:xfrm>
+      </p:grpSpPr>
+      <p:sp>
+        <p:nvSpPr>
+          <p:cNvPr id="99" name="Shape 99"/>
+          <p:cNvSpPr txBox="1">
+            <a:spLocks noGrp="1"/>
+          </p:cNvSpPr>
+          <p:nvPr>
+            <p:ph type="body" idx="1"/>
+          </p:nvPr>
+        </p:nvSpPr>
+        <p:spPr>
+          <a:xfrm>
+            <a:off x="685800" y="4343400"/>
+            <a:ext cx="5486399" cy="4114800"/>
+          </a:xfrm>
+          <a:prstGeom prst="rect">
+            <a:avLst/>
+          </a:prstGeom>
+        </p:spPr>
+        <p:txBody>
+          <a:bodyPr lIns="91425" tIns="91425" rIns="91425" bIns="91425" anchor="ctr" anchorCtr="0">
+            <a:noAutofit/>
+          </a:bodyPr>
+          <a:lstStyle/>
+          <a:p>
+            <a:pPr marL="171450" indent="-171450">
+              <a:buFontTx/>
+              <a:buChar char="-"/>
+            </a:pPr>
+            <a:endParaRPr dirty="0"/>
+          </a:p>
+        </p:txBody>
+      </p:sp>
+      <p:sp>
+        <p:nvSpPr>
+          <p:cNvPr id="100" name="Shape 100"/>
+          <p:cNvSpPr>
+            <a:spLocks noGrp="1" noRot="1" noChangeAspect="1"/>
+          </p:cNvSpPr>
+          <p:nvPr>
+            <p:ph type="sldImg" idx="2"/>
+          </p:nvPr>
+        </p:nvSpPr>
+        <p:spPr>
+          <a:xfrm>
+            <a:off x="1143000" y="685800"/>
+            <a:ext cx="4572000" cy="3429000"/>
+          </a:xfrm>
+          <a:custGeom>
+            <a:avLst/>
+            <a:gdLst/>
+            <a:ahLst/>
+            <a:cxnLst/>
+            <a:rect l="0" t="0" r="0" b="0"/>
+            <a:pathLst>
+              <a:path w="120000" h="120000" extrusionOk="0">
+                <a:moveTo>
+                  <a:pt x="0" y="0"/>
+                </a:moveTo>
+                <a:lnTo>
+                  <a:pt x="120000" y="0"/>
+                </a:lnTo>
+                <a:lnTo>
+                  <a:pt x="120000" y="120000"/>
+                </a:lnTo>
+                <a:lnTo>
+                  <a:pt x="0" y="120000"/>
+                </a:lnTo>
+                <a:close/>
+              </a:path>
+            </a:pathLst>
+          </a:custGeom>
+        </p:spPr>
+      </p:sp>
+    </p:spTree>
+    <p:extLst>
+      <p:ext uri="{BB962C8B-B14F-4D97-AF65-F5344CB8AC3E}">
+        <p14:creationId xmlns:p14="http://schemas.microsoft.com/office/powerpoint/2010/main" val="979907960"/>
+      </p:ext>
+    </p:extLst>
+  </p:cSld>
+  <p:clrMapOvr>
+    <a:masterClrMapping/>
+  </p:clrMapOvr>
+</p:notes>
+</file>
+
+<file path=ppt/notesSlides/notesSlide18.xml><?xml version="1.0" encoding="utf-8"?>
+<p:notes xmlns:a="http://schemas.openxmlformats.org/drawingml/2006/main" xmlns:r="http://schemas.openxmlformats.org/officeDocument/2006/relationships" xmlns:p="http://schemas.openxmlformats.org/presentationml/2006/main" showMasterSp="0" showMasterPhAnim="0">
+  <p:cSld>
+    <p:spTree>
+      <p:nvGrpSpPr>
+        <p:cNvPr id="1" name="Shape 98"/>
+        <p:cNvGrpSpPr/>
+        <p:nvPr/>
+      </p:nvGrpSpPr>
+      <p:grpSpPr>
+        <a:xfrm>
+          <a:off x="0" y="0"/>
+          <a:ext cx="0" cy="0"/>
+          <a:chOff x="0" y="0"/>
+          <a:chExt cx="0" cy="0"/>
+        </a:xfrm>
+      </p:grpSpPr>
+      <p:sp>
+        <p:nvSpPr>
+          <p:cNvPr id="99" name="Shape 99"/>
+          <p:cNvSpPr txBox="1">
+            <a:spLocks noGrp="1"/>
+          </p:cNvSpPr>
+          <p:nvPr>
+            <p:ph type="body" idx="1"/>
+          </p:nvPr>
+        </p:nvSpPr>
+        <p:spPr>
+          <a:xfrm>
+            <a:off x="685800" y="4343400"/>
+            <a:ext cx="5486399" cy="4114800"/>
+          </a:xfrm>
+          <a:prstGeom prst="rect">
+            <a:avLst/>
+          </a:prstGeom>
+        </p:spPr>
+        <p:txBody>
+          <a:bodyPr lIns="91425" tIns="91425" rIns="91425" bIns="91425" anchor="ctr" anchorCtr="0">
+            <a:noAutofit/>
+          </a:bodyPr>
+          <a:lstStyle/>
+          <a:p>
+            <a:pPr marL="171450" indent="-171450">
+              <a:buFontTx/>
+              <a:buChar char="-"/>
+            </a:pPr>
+            <a:endParaRPr dirty="0"/>
+          </a:p>
+        </p:txBody>
+      </p:sp>
+      <p:sp>
+        <p:nvSpPr>
+          <p:cNvPr id="100" name="Shape 100"/>
+          <p:cNvSpPr>
+            <a:spLocks noGrp="1" noRot="1" noChangeAspect="1"/>
+          </p:cNvSpPr>
+          <p:nvPr>
+            <p:ph type="sldImg" idx="2"/>
+          </p:nvPr>
+        </p:nvSpPr>
+        <p:spPr>
+          <a:xfrm>
+            <a:off x="1143000" y="685800"/>
+            <a:ext cx="4572000" cy="3429000"/>
+          </a:xfrm>
+          <a:custGeom>
+            <a:avLst/>
+            <a:gdLst/>
+            <a:ahLst/>
+            <a:cxnLst/>
+            <a:rect l="0" t="0" r="0" b="0"/>
+            <a:pathLst>
+              <a:path w="120000" h="120000" extrusionOk="0">
+                <a:moveTo>
+                  <a:pt x="0" y="0"/>
+                </a:moveTo>
+                <a:lnTo>
+                  <a:pt x="120000" y="0"/>
+                </a:lnTo>
+                <a:lnTo>
+                  <a:pt x="120000" y="120000"/>
+                </a:lnTo>
+                <a:lnTo>
+                  <a:pt x="0" y="120000"/>
+                </a:lnTo>
+                <a:close/>
+              </a:path>
+            </a:pathLst>
+          </a:custGeom>
+        </p:spPr>
+      </p:sp>
+    </p:spTree>
+    <p:extLst>
+      <p:ext uri="{BB962C8B-B14F-4D97-AF65-F5344CB8AC3E}">
+        <p14:creationId xmlns:p14="http://schemas.microsoft.com/office/powerpoint/2010/main" val="2667286518"/>
+      </p:ext>
+    </p:extLst>
+  </p:cSld>
+  <p:clrMapOvr>
+    <a:masterClrMapping/>
+  </p:clrMapOvr>
+</p:notes>
+</file>
+
+<file path=ppt/notesSlides/notesSlide19.xml><?xml version="1.0" encoding="utf-8"?>
+<p:notes xmlns:a="http://schemas.openxmlformats.org/drawingml/2006/main" xmlns:r="http://schemas.openxmlformats.org/officeDocument/2006/relationships" xmlns:p="http://schemas.openxmlformats.org/presentationml/2006/main" showMasterSp="0" showMasterPhAnim="0">
+  <p:cSld>
+    <p:spTree>
+      <p:nvGrpSpPr>
+        <p:cNvPr id="1" name="Shape 98"/>
+        <p:cNvGrpSpPr/>
+        <p:nvPr/>
+      </p:nvGrpSpPr>
+      <p:grpSpPr>
+        <a:xfrm>
+          <a:off x="0" y="0"/>
+          <a:ext cx="0" cy="0"/>
+          <a:chOff x="0" y="0"/>
+          <a:chExt cx="0" cy="0"/>
+        </a:xfrm>
+      </p:grpSpPr>
+      <p:sp>
+        <p:nvSpPr>
+          <p:cNvPr id="99" name="Shape 99"/>
+          <p:cNvSpPr txBox="1">
+            <a:spLocks noGrp="1"/>
+          </p:cNvSpPr>
+          <p:nvPr>
+            <p:ph type="body" idx="1"/>
+          </p:nvPr>
+        </p:nvSpPr>
+        <p:spPr>
+          <a:xfrm>
+            <a:off x="685800" y="4343400"/>
+            <a:ext cx="5486399" cy="4114800"/>
+          </a:xfrm>
+          <a:prstGeom prst="rect">
+            <a:avLst/>
+          </a:prstGeom>
+        </p:spPr>
+        <p:txBody>
+          <a:bodyPr lIns="91425" tIns="91425" rIns="91425" bIns="91425" anchor="ctr" anchorCtr="0">
+            <a:noAutofit/>
+          </a:bodyPr>
+          <a:lstStyle/>
+          <a:p>
+            <a:pPr marL="171450" indent="-171450">
+              <a:buFontTx/>
+              <a:buChar char="-"/>
+            </a:pPr>
+            <a:endParaRPr dirty="0"/>
+          </a:p>
+        </p:txBody>
+      </p:sp>
+      <p:sp>
+        <p:nvSpPr>
+          <p:cNvPr id="100" name="Shape 100"/>
+          <p:cNvSpPr>
+            <a:spLocks noGrp="1" noRot="1" noChangeAspect="1"/>
+          </p:cNvSpPr>
+          <p:nvPr>
+            <p:ph type="sldImg" idx="2"/>
+          </p:nvPr>
+        </p:nvSpPr>
+        <p:spPr>
+          <a:xfrm>
+            <a:off x="1143000" y="685800"/>
+            <a:ext cx="4572000" cy="3429000"/>
+          </a:xfrm>
+          <a:custGeom>
+            <a:avLst/>
+            <a:gdLst/>
+            <a:ahLst/>
+            <a:cxnLst/>
+            <a:rect l="0" t="0" r="0" b="0"/>
+            <a:pathLst>
+              <a:path w="120000" h="120000" extrusionOk="0">
+                <a:moveTo>
+                  <a:pt x="0" y="0"/>
+                </a:moveTo>
+                <a:lnTo>
+                  <a:pt x="120000" y="0"/>
+                </a:lnTo>
+                <a:lnTo>
+                  <a:pt x="120000" y="120000"/>
+                </a:lnTo>
+                <a:lnTo>
+                  <a:pt x="0" y="120000"/>
+                </a:lnTo>
+                <a:close/>
+              </a:path>
+            </a:pathLst>
+          </a:custGeom>
+        </p:spPr>
+      </p:sp>
+    </p:spTree>
+    <p:extLst>
+      <p:ext uri="{BB962C8B-B14F-4D97-AF65-F5344CB8AC3E}">
+        <p14:creationId xmlns:p14="http://schemas.microsoft.com/office/powerpoint/2010/main" val="890929024"/>
       </p:ext>
     </p:extLst>
   </p:cSld>
@@ -1491,6 +1756,294 @@
     <p:extLst>
       <p:ext uri="{BB962C8B-B14F-4D97-AF65-F5344CB8AC3E}">
         <p14:creationId xmlns:p14="http://schemas.microsoft.com/office/powerpoint/2010/main" val="4111745211"/>
+      </p:ext>
+    </p:extLst>
+  </p:cSld>
+  <p:clrMapOvr>
+    <a:masterClrMapping/>
+  </p:clrMapOvr>
+</p:notes>
+</file>
+
+<file path=ppt/notesSlides/notesSlide20.xml><?xml version="1.0" encoding="utf-8"?>
+<p:notes xmlns:a="http://schemas.openxmlformats.org/drawingml/2006/main" xmlns:r="http://schemas.openxmlformats.org/officeDocument/2006/relationships" xmlns:p="http://schemas.openxmlformats.org/presentationml/2006/main" showMasterSp="0" showMasterPhAnim="0">
+  <p:cSld>
+    <p:spTree>
+      <p:nvGrpSpPr>
+        <p:cNvPr id="1" name="Shape 98"/>
+        <p:cNvGrpSpPr/>
+        <p:nvPr/>
+      </p:nvGrpSpPr>
+      <p:grpSpPr>
+        <a:xfrm>
+          <a:off x="0" y="0"/>
+          <a:ext cx="0" cy="0"/>
+          <a:chOff x="0" y="0"/>
+          <a:chExt cx="0" cy="0"/>
+        </a:xfrm>
+      </p:grpSpPr>
+      <p:sp>
+        <p:nvSpPr>
+          <p:cNvPr id="99" name="Shape 99"/>
+          <p:cNvSpPr txBox="1">
+            <a:spLocks noGrp="1"/>
+          </p:cNvSpPr>
+          <p:nvPr>
+            <p:ph type="body" idx="1"/>
+          </p:nvPr>
+        </p:nvSpPr>
+        <p:spPr>
+          <a:xfrm>
+            <a:off x="685800" y="4343400"/>
+            <a:ext cx="5486399" cy="4114800"/>
+          </a:xfrm>
+          <a:prstGeom prst="rect">
+            <a:avLst/>
+          </a:prstGeom>
+        </p:spPr>
+        <p:txBody>
+          <a:bodyPr lIns="91425" tIns="91425" rIns="91425" bIns="91425" anchor="ctr" anchorCtr="0">
+            <a:noAutofit/>
+          </a:bodyPr>
+          <a:lstStyle/>
+          <a:p>
+            <a:pPr marL="171450" indent="-171450">
+              <a:buFontTx/>
+              <a:buChar char="-"/>
+            </a:pPr>
+            <a:r>
+              <a:rPr lang="en-US" baseline="0" dirty="0" smtClean="0"/>
+              <a:t>install GIT</a:t>
+            </a:r>
+          </a:p>
+          <a:p>
+            <a:pPr marL="628650" lvl="1" indent="-171450">
+              <a:buFontTx/>
+              <a:buChar char="-"/>
+            </a:pPr>
+            <a:r>
+              <a:rPr lang="en-US" baseline="0" dirty="0" smtClean="0"/>
+              <a:t>Windows</a:t>
+            </a:r>
+          </a:p>
+          <a:p>
+            <a:pPr marL="628650" lvl="1" indent="-171450">
+              <a:buFontTx/>
+              <a:buChar char="-"/>
+            </a:pPr>
+            <a:r>
+              <a:rPr lang="en-US" baseline="0" dirty="0" smtClean="0"/>
+              <a:t>Mac</a:t>
+            </a:r>
+          </a:p>
+          <a:p>
+            <a:pPr marL="171450" lvl="0" indent="-171450">
+              <a:buFontTx/>
+              <a:buChar char="-"/>
+            </a:pPr>
+            <a:r>
+              <a:rPr lang="en-US" baseline="0" dirty="0" smtClean="0"/>
+              <a:t>setup username and email</a:t>
+            </a:r>
+          </a:p>
+          <a:p>
+            <a:pPr marL="171450" lvl="0" indent="-171450">
+              <a:buFontTx/>
+              <a:buChar char="-"/>
+            </a:pPr>
+            <a:endParaRPr dirty="0"/>
+          </a:p>
+        </p:txBody>
+      </p:sp>
+      <p:sp>
+        <p:nvSpPr>
+          <p:cNvPr id="100" name="Shape 100"/>
+          <p:cNvSpPr>
+            <a:spLocks noGrp="1" noRot="1" noChangeAspect="1"/>
+          </p:cNvSpPr>
+          <p:nvPr>
+            <p:ph type="sldImg" idx="2"/>
+          </p:nvPr>
+        </p:nvSpPr>
+        <p:spPr>
+          <a:xfrm>
+            <a:off x="1143000" y="685800"/>
+            <a:ext cx="4572000" cy="3429000"/>
+          </a:xfrm>
+          <a:custGeom>
+            <a:avLst/>
+            <a:gdLst/>
+            <a:ahLst/>
+            <a:cxnLst/>
+            <a:rect l="0" t="0" r="0" b="0"/>
+            <a:pathLst>
+              <a:path w="120000" h="120000" extrusionOk="0">
+                <a:moveTo>
+                  <a:pt x="0" y="0"/>
+                </a:moveTo>
+                <a:lnTo>
+                  <a:pt x="120000" y="0"/>
+                </a:lnTo>
+                <a:lnTo>
+                  <a:pt x="120000" y="120000"/>
+                </a:lnTo>
+                <a:lnTo>
+                  <a:pt x="0" y="120000"/>
+                </a:lnTo>
+                <a:close/>
+              </a:path>
+            </a:pathLst>
+          </a:custGeom>
+        </p:spPr>
+      </p:sp>
+    </p:spTree>
+    <p:extLst>
+      <p:ext uri="{BB962C8B-B14F-4D97-AF65-F5344CB8AC3E}">
+        <p14:creationId xmlns:p14="http://schemas.microsoft.com/office/powerpoint/2010/main" val="2666093823"/>
+      </p:ext>
+    </p:extLst>
+  </p:cSld>
+  <p:clrMapOvr>
+    <a:masterClrMapping/>
+  </p:clrMapOvr>
+</p:notes>
+</file>
+
+<file path=ppt/notesSlides/notesSlide21.xml><?xml version="1.0" encoding="utf-8"?>
+<p:notes xmlns:a="http://schemas.openxmlformats.org/drawingml/2006/main" xmlns:r="http://schemas.openxmlformats.org/officeDocument/2006/relationships" xmlns:p="http://schemas.openxmlformats.org/presentationml/2006/main" showMasterSp="0" showMasterPhAnim="0">
+  <p:cSld>
+    <p:spTree>
+      <p:nvGrpSpPr>
+        <p:cNvPr id="1" name="Shape 98"/>
+        <p:cNvGrpSpPr/>
+        <p:nvPr/>
+      </p:nvGrpSpPr>
+      <p:grpSpPr>
+        <a:xfrm>
+          <a:off x="0" y="0"/>
+          <a:ext cx="0" cy="0"/>
+          <a:chOff x="0" y="0"/>
+          <a:chExt cx="0" cy="0"/>
+        </a:xfrm>
+      </p:grpSpPr>
+      <p:sp>
+        <p:nvSpPr>
+          <p:cNvPr id="99" name="Shape 99"/>
+          <p:cNvSpPr txBox="1">
+            <a:spLocks noGrp="1"/>
+          </p:cNvSpPr>
+          <p:nvPr>
+            <p:ph type="body" idx="1"/>
+          </p:nvPr>
+        </p:nvSpPr>
+        <p:spPr>
+          <a:xfrm>
+            <a:off x="685800" y="4343400"/>
+            <a:ext cx="5486399" cy="4114800"/>
+          </a:xfrm>
+          <a:prstGeom prst="rect">
+            <a:avLst/>
+          </a:prstGeom>
+        </p:spPr>
+        <p:txBody>
+          <a:bodyPr lIns="91425" tIns="91425" rIns="91425" bIns="91425" anchor="ctr" anchorCtr="0">
+            <a:noAutofit/>
+          </a:bodyPr>
+          <a:lstStyle/>
+          <a:p>
+            <a:pPr marL="171450" indent="-171450">
+              <a:buFontTx/>
+              <a:buChar char="-"/>
+            </a:pPr>
+            <a:r>
+              <a:rPr lang="en-US" baseline="0" dirty="0" smtClean="0"/>
+              <a:t>install GIT</a:t>
+            </a:r>
+          </a:p>
+          <a:p>
+            <a:pPr marL="628650" lvl="1" indent="-171450">
+              <a:buFontTx/>
+              <a:buChar char="-"/>
+            </a:pPr>
+            <a:r>
+              <a:rPr lang="en-US" baseline="0" dirty="0" smtClean="0"/>
+              <a:t>Windows</a:t>
+            </a:r>
+          </a:p>
+          <a:p>
+            <a:pPr marL="628650" lvl="1" indent="-171450">
+              <a:buFontTx/>
+              <a:buChar char="-"/>
+            </a:pPr>
+            <a:r>
+              <a:rPr lang="en-US" baseline="0" dirty="0" smtClean="0"/>
+              <a:t>Mac</a:t>
+            </a:r>
+          </a:p>
+          <a:p>
+            <a:pPr marL="171450" lvl="0" indent="-171450">
+              <a:buFontTx/>
+              <a:buChar char="-"/>
+            </a:pPr>
+            <a:r>
+              <a:rPr lang="en-US" baseline="0" dirty="0" smtClean="0"/>
+              <a:t>setup username and email</a:t>
+            </a:r>
+          </a:p>
+          <a:p>
+            <a:pPr marL="171450" lvl="0" indent="-171450">
+              <a:buFontTx/>
+              <a:buChar char="-"/>
+            </a:pPr>
+            <a:endParaRPr dirty="0"/>
+          </a:p>
+        </p:txBody>
+      </p:sp>
+      <p:sp>
+        <p:nvSpPr>
+          <p:cNvPr id="100" name="Shape 100"/>
+          <p:cNvSpPr>
+            <a:spLocks noGrp="1" noRot="1" noChangeAspect="1"/>
+          </p:cNvSpPr>
+          <p:nvPr>
+            <p:ph type="sldImg" idx="2"/>
+          </p:nvPr>
+        </p:nvSpPr>
+        <p:spPr>
+          <a:xfrm>
+            <a:off x="1143000" y="685800"/>
+            <a:ext cx="4572000" cy="3429000"/>
+          </a:xfrm>
+          <a:custGeom>
+            <a:avLst/>
+            <a:gdLst/>
+            <a:ahLst/>
+            <a:cxnLst/>
+            <a:rect l="0" t="0" r="0" b="0"/>
+            <a:pathLst>
+              <a:path w="120000" h="120000" extrusionOk="0">
+                <a:moveTo>
+                  <a:pt x="0" y="0"/>
+                </a:moveTo>
+                <a:lnTo>
+                  <a:pt x="120000" y="0"/>
+                </a:lnTo>
+                <a:lnTo>
+                  <a:pt x="120000" y="120000"/>
+                </a:lnTo>
+                <a:lnTo>
+                  <a:pt x="0" y="120000"/>
+                </a:lnTo>
+                <a:close/>
+              </a:path>
+            </a:pathLst>
+          </a:custGeom>
+        </p:spPr>
+      </p:sp>
+    </p:spTree>
+    <p:extLst>
+      <p:ext uri="{BB962C8B-B14F-4D97-AF65-F5344CB8AC3E}">
+        <p14:creationId xmlns:p14="http://schemas.microsoft.com/office/powerpoint/2010/main" val="1567401964"/>
       </p:ext>
     </p:extLst>
   </p:cSld>
@@ -7512,18 +8065,18 @@
       </p:sp>
       <p:sp>
         <p:nvSpPr>
-          <p:cNvPr id="96" name="Shape 96"/>
+          <p:cNvPr id="97" name="Shape 97"/>
           <p:cNvSpPr txBox="1">
             <a:spLocks noGrp="1"/>
           </p:cNvSpPr>
           <p:nvPr>
-            <p:ph type="body" idx="1"/>
-          </p:nvPr>
-        </p:nvSpPr>
-        <p:spPr>
-          <a:xfrm>
-            <a:off x="341167" y="937873"/>
-            <a:ext cx="8498033" cy="5024690"/>
+            <p:ph type="body" idx="2"/>
+          </p:nvPr>
+        </p:nvSpPr>
+        <p:spPr>
+          <a:xfrm>
+            <a:off x="341168" y="228026"/>
+            <a:ext cx="8498032" cy="457199"/>
           </a:xfrm>
           <a:prstGeom prst="rect">
             <a:avLst/>
@@ -7539,83 +8092,6 @@
           </a:bodyPr>
           <a:lstStyle/>
           <a:p>
-            <a:pPr marL="355600" indent="-355600">
-              <a:lnSpc>
-                <a:spcPct val="90000"/>
-              </a:lnSpc>
-              <a:buClr>
-                <a:srgbClr val="2E3640"/>
-              </a:buClr>
-              <a:buSzPct val="100000"/>
-              <a:buBlip>
-                <a:blip r:embed="rId3"/>
-              </a:buBlip>
-            </a:pPr>
-            <a:r>
-              <a:rPr lang="en-US" sz="2400" dirty="0" smtClean="0"/>
-              <a:t>stuff</a:t>
-            </a:r>
-            <a:endParaRPr lang="en-US" sz="2400" dirty="0" smtClean="0">
-              <a:sym typeface="Wingdings" panose="05000000000000000000" pitchFamily="2" charset="2"/>
-            </a:endParaRPr>
-          </a:p>
-          <a:p>
-            <a:pPr>
-              <a:lnSpc>
-                <a:spcPct val="90000"/>
-              </a:lnSpc>
-              <a:buClr>
-                <a:srgbClr val="2E3640"/>
-              </a:buClr>
-              <a:buSzPct val="100000"/>
-            </a:pPr>
-            <a:endParaRPr lang="en-US" sz="2400" dirty="0">
-              <a:sym typeface="Wingdings" panose="05000000000000000000" pitchFamily="2" charset="2"/>
-            </a:endParaRPr>
-          </a:p>
-          <a:p>
-            <a:pPr>
-              <a:lnSpc>
-                <a:spcPct val="90000"/>
-              </a:lnSpc>
-              <a:buClr>
-                <a:srgbClr val="2E3640"/>
-              </a:buClr>
-              <a:buSzPct val="100000"/>
-            </a:pPr>
-            <a:endParaRPr lang="en-US" sz="2400" dirty="0" smtClean="0"/>
-          </a:p>
-        </p:txBody>
-      </p:sp>
-      <p:sp>
-        <p:nvSpPr>
-          <p:cNvPr id="97" name="Shape 97"/>
-          <p:cNvSpPr txBox="1">
-            <a:spLocks noGrp="1"/>
-          </p:cNvSpPr>
-          <p:nvPr>
-            <p:ph type="body" idx="2"/>
-          </p:nvPr>
-        </p:nvSpPr>
-        <p:spPr>
-          <a:xfrm>
-            <a:off x="341168" y="228026"/>
-            <a:ext cx="8498032" cy="457199"/>
-          </a:xfrm>
-          <a:prstGeom prst="rect">
-            <a:avLst/>
-          </a:prstGeom>
-          <a:noFill/>
-          <a:ln>
-            <a:noFill/>
-          </a:ln>
-        </p:spPr>
-        <p:txBody>
-          <a:bodyPr lIns="68569" tIns="34275" rIns="68569" bIns="34275" anchor="t" anchorCtr="0">
-            <a:noAutofit/>
-          </a:bodyPr>
-          <a:lstStyle/>
-          <a:p>
             <a:pPr>
               <a:buClr>
                 <a:schemeClr val="accent2"/>
@@ -7624,16 +8100,46 @@
             </a:pPr>
             <a:r>
               <a:rPr lang="en-US" sz="3600" dirty="0" smtClean="0"/>
-              <a:t>Title</a:t>
+              <a:t>GIT checkout my-branch</a:t>
             </a:r>
             <a:endParaRPr lang="en-US" sz="3600" dirty="0"/>
           </a:p>
         </p:txBody>
       </p:sp>
+      <p:pic>
+        <p:nvPicPr>
+          <p:cNvPr id="3" name="Picture 2"/>
+          <p:cNvPicPr>
+            <a:picLocks noChangeAspect="1"/>
+          </p:cNvPicPr>
+          <p:nvPr/>
+        </p:nvPicPr>
+        <p:blipFill>
+          <a:blip r:embed="rId3">
+            <a:extLst>
+              <a:ext uri="{28A0092B-C50C-407E-A947-70E740481C1C}">
+                <a14:useLocalDpi xmlns:a14="http://schemas.microsoft.com/office/drawing/2010/main" val="0"/>
+              </a:ext>
+            </a:extLst>
+          </a:blip>
+          <a:stretch>
+            <a:fillRect/>
+          </a:stretch>
+        </p:blipFill>
+        <p:spPr>
+          <a:xfrm>
+            <a:off x="818284" y="2215492"/>
+            <a:ext cx="7543800" cy="3695700"/>
+          </a:xfrm>
+          <a:prstGeom prst="rect">
+            <a:avLst/>
+          </a:prstGeom>
+        </p:spPr>
+      </p:pic>
     </p:spTree>
     <p:extLst>
       <p:ext uri="{BB962C8B-B14F-4D97-AF65-F5344CB8AC3E}">
-        <p14:creationId xmlns:p14="http://schemas.microsoft.com/office/powerpoint/2010/main" val="264915446"/>
+        <p14:creationId xmlns:p14="http://schemas.microsoft.com/office/powerpoint/2010/main" val="305243239"/>
       </p:ext>
     </p:extLst>
   </p:cSld>
@@ -7832,7 +8338,7 @@
     </p:spTree>
     <p:extLst>
       <p:ext uri="{BB962C8B-B14F-4D97-AF65-F5344CB8AC3E}">
-        <p14:creationId xmlns:p14="http://schemas.microsoft.com/office/powerpoint/2010/main" val="893865620"/>
+        <p14:creationId xmlns:p14="http://schemas.microsoft.com/office/powerpoint/2010/main" val="264915446"/>
       </p:ext>
     </p:extLst>
   </p:cSld>
@@ -8031,7 +8537,7 @@
     </p:spTree>
     <p:extLst>
       <p:ext uri="{BB962C8B-B14F-4D97-AF65-F5344CB8AC3E}">
-        <p14:creationId xmlns:p14="http://schemas.microsoft.com/office/powerpoint/2010/main" val="2176611703"/>
+        <p14:creationId xmlns:p14="http://schemas.microsoft.com/office/powerpoint/2010/main" val="2519039036"/>
       </p:ext>
     </p:extLst>
   </p:cSld>
@@ -8230,7 +8736,7 @@
     </p:spTree>
     <p:extLst>
       <p:ext uri="{BB962C8B-B14F-4D97-AF65-F5344CB8AC3E}">
-        <p14:creationId xmlns:p14="http://schemas.microsoft.com/office/powerpoint/2010/main" val="2978980850"/>
+        <p14:creationId xmlns:p14="http://schemas.microsoft.com/office/powerpoint/2010/main" val="396525421"/>
       </p:ext>
     </p:extLst>
   </p:cSld>
@@ -8429,7 +8935,7 @@
     </p:spTree>
     <p:extLst>
       <p:ext uri="{BB962C8B-B14F-4D97-AF65-F5344CB8AC3E}">
-        <p14:creationId xmlns:p14="http://schemas.microsoft.com/office/powerpoint/2010/main" val="2675765428"/>
+        <p14:creationId xmlns:p14="http://schemas.microsoft.com/office/powerpoint/2010/main" val="695698909"/>
       </p:ext>
     </p:extLst>
   </p:cSld>
@@ -8548,7 +9054,7 @@
             </a:pPr>
             <a:r>
               <a:rPr lang="en-US" sz="2400" dirty="0" smtClean="0"/>
-              <a:t>Time to get the hands dirty</a:t>
+              <a:t>stuff</a:t>
             </a:r>
             <a:endParaRPr lang="en-US" sz="2400" dirty="0" smtClean="0">
               <a:sym typeface="Wingdings" panose="05000000000000000000" pitchFamily="2" charset="2"/>
@@ -8619,50 +9125,16 @@
             </a:pPr>
             <a:r>
               <a:rPr lang="en-US" sz="3600" dirty="0" smtClean="0"/>
-              <a:t>Hands-on </a:t>
-            </a:r>
-            <a:r>
-              <a:rPr lang="en-US" sz="3600" dirty="0" err="1" smtClean="0"/>
-              <a:t>Workshow</a:t>
+              <a:t>Title</a:t>
             </a:r>
             <a:endParaRPr lang="en-US" sz="3600" dirty="0"/>
           </a:p>
         </p:txBody>
       </p:sp>
-      <p:pic>
-        <p:nvPicPr>
-          <p:cNvPr id="2" name="Picture 1"/>
-          <p:cNvPicPr>
-            <a:picLocks noChangeAspect="1"/>
-          </p:cNvPicPr>
-          <p:nvPr/>
-        </p:nvPicPr>
-        <p:blipFill>
-          <a:blip r:embed="rId4" cstate="print">
-            <a:extLst>
-              <a:ext uri="{28A0092B-C50C-407E-A947-70E740481C1C}">
-                <a14:useLocalDpi xmlns:a14="http://schemas.microsoft.com/office/drawing/2010/main" val="0"/>
-              </a:ext>
-            </a:extLst>
-          </a:blip>
-          <a:stretch>
-            <a:fillRect/>
-          </a:stretch>
-        </p:blipFill>
-        <p:spPr>
-          <a:xfrm>
-            <a:off x="1744403" y="1514354"/>
-            <a:ext cx="5529699" cy="4479801"/>
-          </a:xfrm>
-          <a:prstGeom prst="rect">
-            <a:avLst/>
-          </a:prstGeom>
-        </p:spPr>
-      </p:pic>
     </p:spTree>
     <p:extLst>
       <p:ext uri="{BB962C8B-B14F-4D97-AF65-F5344CB8AC3E}">
-        <p14:creationId xmlns:p14="http://schemas.microsoft.com/office/powerpoint/2010/main" val="2075129891"/>
+        <p14:creationId xmlns:p14="http://schemas.microsoft.com/office/powerpoint/2010/main" val="2915095849"/>
       </p:ext>
     </p:extLst>
   </p:cSld>
@@ -8780,10 +9252,191 @@
               </a:buBlip>
             </a:pPr>
             <a:r>
-              <a:rPr lang="en-US" sz="2000" dirty="0" smtClean="0"/>
-              <a:t>install GIT</a:t>
-            </a:r>
-          </a:p>
+              <a:rPr lang="en-US" sz="2400" dirty="0" smtClean="0"/>
+              <a:t>stuff</a:t>
+            </a:r>
+            <a:endParaRPr lang="en-US" sz="2400" dirty="0" smtClean="0">
+              <a:sym typeface="Wingdings" panose="05000000000000000000" pitchFamily="2" charset="2"/>
+            </a:endParaRPr>
+          </a:p>
+          <a:p>
+            <a:pPr>
+              <a:lnSpc>
+                <a:spcPct val="90000"/>
+              </a:lnSpc>
+              <a:buClr>
+                <a:srgbClr val="2E3640"/>
+              </a:buClr>
+              <a:buSzPct val="100000"/>
+            </a:pPr>
+            <a:endParaRPr lang="en-US" sz="2400" dirty="0">
+              <a:sym typeface="Wingdings" panose="05000000000000000000" pitchFamily="2" charset="2"/>
+            </a:endParaRPr>
+          </a:p>
+          <a:p>
+            <a:pPr>
+              <a:lnSpc>
+                <a:spcPct val="90000"/>
+              </a:lnSpc>
+              <a:buClr>
+                <a:srgbClr val="2E3640"/>
+              </a:buClr>
+              <a:buSzPct val="100000"/>
+            </a:pPr>
+            <a:endParaRPr lang="en-US" sz="2400" dirty="0" smtClean="0"/>
+          </a:p>
+        </p:txBody>
+      </p:sp>
+      <p:sp>
+        <p:nvSpPr>
+          <p:cNvPr id="97" name="Shape 97"/>
+          <p:cNvSpPr txBox="1">
+            <a:spLocks noGrp="1"/>
+          </p:cNvSpPr>
+          <p:nvPr>
+            <p:ph type="body" idx="2"/>
+          </p:nvPr>
+        </p:nvSpPr>
+        <p:spPr>
+          <a:xfrm>
+            <a:off x="341168" y="228026"/>
+            <a:ext cx="8498032" cy="457199"/>
+          </a:xfrm>
+          <a:prstGeom prst="rect">
+            <a:avLst/>
+          </a:prstGeom>
+          <a:noFill/>
+          <a:ln>
+            <a:noFill/>
+          </a:ln>
+        </p:spPr>
+        <p:txBody>
+          <a:bodyPr lIns="68569" tIns="34275" rIns="68569" bIns="34275" anchor="t" anchorCtr="0">
+            <a:noAutofit/>
+          </a:bodyPr>
+          <a:lstStyle/>
+          <a:p>
+            <a:pPr>
+              <a:buClr>
+                <a:schemeClr val="accent2"/>
+              </a:buClr>
+              <a:buSzPct val="25000"/>
+            </a:pPr>
+            <a:r>
+              <a:rPr lang="en-US" sz="3600" dirty="0" smtClean="0"/>
+              <a:t>Title</a:t>
+            </a:r>
+            <a:endParaRPr lang="en-US" sz="3600" dirty="0"/>
+          </a:p>
+        </p:txBody>
+      </p:sp>
+    </p:spTree>
+    <p:extLst>
+      <p:ext uri="{BB962C8B-B14F-4D97-AF65-F5344CB8AC3E}">
+        <p14:creationId xmlns:p14="http://schemas.microsoft.com/office/powerpoint/2010/main" val="893865620"/>
+      </p:ext>
+    </p:extLst>
+  </p:cSld>
+  <p:clrMapOvr>
+    <a:masterClrMapping/>
+  </p:clrMapOvr>
+  <p:transition spd="slow">
+    <p:cut/>
+  </p:transition>
+  <p:timing>
+    <p:tnLst>
+      <p:par>
+        <p:cTn id="1" dur="indefinite" restart="never" nodeType="tmRoot"/>
+      </p:par>
+    </p:tnLst>
+  </p:timing>
+</p:sld>
+</file>
+
+<file path=ppt/slides/slide17.xml><?xml version="1.0" encoding="utf-8"?>
+<p:sld xmlns:a="http://schemas.openxmlformats.org/drawingml/2006/main" xmlns:r="http://schemas.openxmlformats.org/officeDocument/2006/relationships" xmlns:p="http://schemas.openxmlformats.org/presentationml/2006/main">
+  <p:cSld>
+    <p:spTree>
+      <p:nvGrpSpPr>
+        <p:cNvPr id="1" name="Shape 93"/>
+        <p:cNvGrpSpPr/>
+        <p:nvPr/>
+      </p:nvGrpSpPr>
+      <p:grpSpPr>
+        <a:xfrm>
+          <a:off x="0" y="0"/>
+          <a:ext cx="0" cy="0"/>
+          <a:chOff x="0" y="0"/>
+          <a:chExt cx="0" cy="0"/>
+        </a:xfrm>
+      </p:grpSpPr>
+      <p:sp>
+        <p:nvSpPr>
+          <p:cNvPr id="95" name="Shape 95"/>
+          <p:cNvSpPr txBox="1">
+            <a:spLocks noGrp="1"/>
+          </p:cNvSpPr>
+          <p:nvPr>
+            <p:ph type="sldNum" idx="12"/>
+          </p:nvPr>
+        </p:nvSpPr>
+        <p:spPr>
+          <a:xfrm>
+            <a:off x="7600950" y="5688719"/>
+            <a:ext cx="269142" cy="273844"/>
+          </a:xfrm>
+          <a:prstGeom prst="rect">
+            <a:avLst/>
+          </a:prstGeom>
+          <a:noFill/>
+          <a:ln>
+            <a:noFill/>
+          </a:ln>
+        </p:spPr>
+        <p:txBody>
+          <a:bodyPr lIns="68569" tIns="34275" rIns="68569" bIns="34275" anchor="ctr" anchorCtr="0">
+            <a:noAutofit/>
+          </a:bodyPr>
+          <a:lstStyle/>
+          <a:p>
+            <a:pPr>
+              <a:buSzPct val="25000"/>
+            </a:pPr>
+            <a:r>
+              <a:rPr lang="en-US"/>
+              <a:t> </a:t>
+            </a:r>
+          </a:p>
+        </p:txBody>
+      </p:sp>
+      <p:sp>
+        <p:nvSpPr>
+          <p:cNvPr id="96" name="Shape 96"/>
+          <p:cNvSpPr txBox="1">
+            <a:spLocks noGrp="1"/>
+          </p:cNvSpPr>
+          <p:nvPr>
+            <p:ph type="body" idx="1"/>
+          </p:nvPr>
+        </p:nvSpPr>
+        <p:spPr>
+          <a:xfrm>
+            <a:off x="341167" y="937873"/>
+            <a:ext cx="8498033" cy="5024690"/>
+          </a:xfrm>
+          <a:prstGeom prst="rect">
+            <a:avLst/>
+          </a:prstGeom>
+          <a:noFill/>
+          <a:ln>
+            <a:noFill/>
+          </a:ln>
+        </p:spPr>
+        <p:txBody>
+          <a:bodyPr lIns="68569" tIns="34275" rIns="68569" bIns="34275" anchor="t" anchorCtr="0">
+            <a:noAutofit/>
+          </a:bodyPr>
+          <a:lstStyle/>
           <a:p>
             <a:pPr marL="355600" indent="-355600">
               <a:lnSpc>
@@ -8798,12 +9451,191 @@
               </a:buBlip>
             </a:pPr>
             <a:r>
-              <a:rPr lang="en-US" sz="2000" dirty="0" smtClean="0">
-                <a:sym typeface="Wingdings" panose="05000000000000000000" pitchFamily="2" charset="2"/>
-              </a:rPr>
-              <a:t>setup username, password, editor</a:t>
-            </a:r>
-          </a:p>
+              <a:rPr lang="en-US" sz="2400" dirty="0" smtClean="0"/>
+              <a:t>stuff</a:t>
+            </a:r>
+            <a:endParaRPr lang="en-US" sz="2400" dirty="0" smtClean="0">
+              <a:sym typeface="Wingdings" panose="05000000000000000000" pitchFamily="2" charset="2"/>
+            </a:endParaRPr>
+          </a:p>
+          <a:p>
+            <a:pPr>
+              <a:lnSpc>
+                <a:spcPct val="90000"/>
+              </a:lnSpc>
+              <a:buClr>
+                <a:srgbClr val="2E3640"/>
+              </a:buClr>
+              <a:buSzPct val="100000"/>
+            </a:pPr>
+            <a:endParaRPr lang="en-US" sz="2400" dirty="0">
+              <a:sym typeface="Wingdings" panose="05000000000000000000" pitchFamily="2" charset="2"/>
+            </a:endParaRPr>
+          </a:p>
+          <a:p>
+            <a:pPr>
+              <a:lnSpc>
+                <a:spcPct val="90000"/>
+              </a:lnSpc>
+              <a:buClr>
+                <a:srgbClr val="2E3640"/>
+              </a:buClr>
+              <a:buSzPct val="100000"/>
+            </a:pPr>
+            <a:endParaRPr lang="en-US" sz="2400" dirty="0" smtClean="0"/>
+          </a:p>
+        </p:txBody>
+      </p:sp>
+      <p:sp>
+        <p:nvSpPr>
+          <p:cNvPr id="97" name="Shape 97"/>
+          <p:cNvSpPr txBox="1">
+            <a:spLocks noGrp="1"/>
+          </p:cNvSpPr>
+          <p:nvPr>
+            <p:ph type="body" idx="2"/>
+          </p:nvPr>
+        </p:nvSpPr>
+        <p:spPr>
+          <a:xfrm>
+            <a:off x="341168" y="228026"/>
+            <a:ext cx="8498032" cy="457199"/>
+          </a:xfrm>
+          <a:prstGeom prst="rect">
+            <a:avLst/>
+          </a:prstGeom>
+          <a:noFill/>
+          <a:ln>
+            <a:noFill/>
+          </a:ln>
+        </p:spPr>
+        <p:txBody>
+          <a:bodyPr lIns="68569" tIns="34275" rIns="68569" bIns="34275" anchor="t" anchorCtr="0">
+            <a:noAutofit/>
+          </a:bodyPr>
+          <a:lstStyle/>
+          <a:p>
+            <a:pPr>
+              <a:buClr>
+                <a:schemeClr val="accent2"/>
+              </a:buClr>
+              <a:buSzPct val="25000"/>
+            </a:pPr>
+            <a:r>
+              <a:rPr lang="en-US" sz="3600" dirty="0" smtClean="0"/>
+              <a:t>Title</a:t>
+            </a:r>
+            <a:endParaRPr lang="en-US" sz="3600" dirty="0"/>
+          </a:p>
+        </p:txBody>
+      </p:sp>
+    </p:spTree>
+    <p:extLst>
+      <p:ext uri="{BB962C8B-B14F-4D97-AF65-F5344CB8AC3E}">
+        <p14:creationId xmlns:p14="http://schemas.microsoft.com/office/powerpoint/2010/main" val="2176611703"/>
+      </p:ext>
+    </p:extLst>
+  </p:cSld>
+  <p:clrMapOvr>
+    <a:masterClrMapping/>
+  </p:clrMapOvr>
+  <p:transition spd="slow">
+    <p:cut/>
+  </p:transition>
+  <p:timing>
+    <p:tnLst>
+      <p:par>
+        <p:cTn id="1" dur="indefinite" restart="never" nodeType="tmRoot"/>
+      </p:par>
+    </p:tnLst>
+  </p:timing>
+</p:sld>
+</file>
+
+<file path=ppt/slides/slide18.xml><?xml version="1.0" encoding="utf-8"?>
+<p:sld xmlns:a="http://schemas.openxmlformats.org/drawingml/2006/main" xmlns:r="http://schemas.openxmlformats.org/officeDocument/2006/relationships" xmlns:p="http://schemas.openxmlformats.org/presentationml/2006/main">
+  <p:cSld>
+    <p:spTree>
+      <p:nvGrpSpPr>
+        <p:cNvPr id="1" name="Shape 93"/>
+        <p:cNvGrpSpPr/>
+        <p:nvPr/>
+      </p:nvGrpSpPr>
+      <p:grpSpPr>
+        <a:xfrm>
+          <a:off x="0" y="0"/>
+          <a:ext cx="0" cy="0"/>
+          <a:chOff x="0" y="0"/>
+          <a:chExt cx="0" cy="0"/>
+        </a:xfrm>
+      </p:grpSpPr>
+      <p:sp>
+        <p:nvSpPr>
+          <p:cNvPr id="95" name="Shape 95"/>
+          <p:cNvSpPr txBox="1">
+            <a:spLocks noGrp="1"/>
+          </p:cNvSpPr>
+          <p:nvPr>
+            <p:ph type="sldNum" idx="12"/>
+          </p:nvPr>
+        </p:nvSpPr>
+        <p:spPr>
+          <a:xfrm>
+            <a:off x="7600950" y="5688719"/>
+            <a:ext cx="269142" cy="273844"/>
+          </a:xfrm>
+          <a:prstGeom prst="rect">
+            <a:avLst/>
+          </a:prstGeom>
+          <a:noFill/>
+          <a:ln>
+            <a:noFill/>
+          </a:ln>
+        </p:spPr>
+        <p:txBody>
+          <a:bodyPr lIns="68569" tIns="34275" rIns="68569" bIns="34275" anchor="ctr" anchorCtr="0">
+            <a:noAutofit/>
+          </a:bodyPr>
+          <a:lstStyle/>
+          <a:p>
+            <a:pPr>
+              <a:buSzPct val="25000"/>
+            </a:pPr>
+            <a:r>
+              <a:rPr lang="en-US"/>
+              <a:t> </a:t>
+            </a:r>
+          </a:p>
+        </p:txBody>
+      </p:sp>
+      <p:sp>
+        <p:nvSpPr>
+          <p:cNvPr id="96" name="Shape 96"/>
+          <p:cNvSpPr txBox="1">
+            <a:spLocks noGrp="1"/>
+          </p:cNvSpPr>
+          <p:nvPr>
+            <p:ph type="body" idx="1"/>
+          </p:nvPr>
+        </p:nvSpPr>
+        <p:spPr>
+          <a:xfrm>
+            <a:off x="341167" y="937873"/>
+            <a:ext cx="8498033" cy="5024690"/>
+          </a:xfrm>
+          <a:prstGeom prst="rect">
+            <a:avLst/>
+          </a:prstGeom>
+          <a:noFill/>
+          <a:ln>
+            <a:noFill/>
+          </a:ln>
+        </p:spPr>
+        <p:txBody>
+          <a:bodyPr lIns="68569" tIns="34275" rIns="68569" bIns="34275" anchor="t" anchorCtr="0">
+            <a:noAutofit/>
+          </a:bodyPr>
+          <a:lstStyle/>
           <a:p>
             <a:pPr marL="355600" indent="-355600">
               <a:lnSpc>
@@ -8818,14 +9650,193 @@
               </a:buBlip>
             </a:pPr>
             <a:r>
-              <a:rPr lang="en-US" sz="2000" dirty="0" smtClean="0">
-                <a:sym typeface="Wingdings" panose="05000000000000000000" pitchFamily="2" charset="2"/>
-              </a:rPr>
-              <a:t>commands</a:t>
-            </a:r>
-          </a:p>
-          <a:p>
-            <a:pPr marL="893763" indent="-355600">
+              <a:rPr lang="en-US" sz="2400" dirty="0" smtClean="0"/>
+              <a:t>stuff</a:t>
+            </a:r>
+            <a:endParaRPr lang="en-US" sz="2400" dirty="0" smtClean="0">
+              <a:sym typeface="Wingdings" panose="05000000000000000000" pitchFamily="2" charset="2"/>
+            </a:endParaRPr>
+          </a:p>
+          <a:p>
+            <a:pPr>
+              <a:lnSpc>
+                <a:spcPct val="90000"/>
+              </a:lnSpc>
+              <a:buClr>
+                <a:srgbClr val="2E3640"/>
+              </a:buClr>
+              <a:buSzPct val="100000"/>
+            </a:pPr>
+            <a:endParaRPr lang="en-US" sz="2400" dirty="0">
+              <a:sym typeface="Wingdings" panose="05000000000000000000" pitchFamily="2" charset="2"/>
+            </a:endParaRPr>
+          </a:p>
+          <a:p>
+            <a:pPr>
+              <a:lnSpc>
+                <a:spcPct val="90000"/>
+              </a:lnSpc>
+              <a:buClr>
+                <a:srgbClr val="2E3640"/>
+              </a:buClr>
+              <a:buSzPct val="100000"/>
+            </a:pPr>
+            <a:endParaRPr lang="en-US" sz="2400" dirty="0" smtClean="0"/>
+          </a:p>
+        </p:txBody>
+      </p:sp>
+      <p:sp>
+        <p:nvSpPr>
+          <p:cNvPr id="97" name="Shape 97"/>
+          <p:cNvSpPr txBox="1">
+            <a:spLocks noGrp="1"/>
+          </p:cNvSpPr>
+          <p:nvPr>
+            <p:ph type="body" idx="2"/>
+          </p:nvPr>
+        </p:nvSpPr>
+        <p:spPr>
+          <a:xfrm>
+            <a:off x="341168" y="228026"/>
+            <a:ext cx="8498032" cy="457199"/>
+          </a:xfrm>
+          <a:prstGeom prst="rect">
+            <a:avLst/>
+          </a:prstGeom>
+          <a:noFill/>
+          <a:ln>
+            <a:noFill/>
+          </a:ln>
+        </p:spPr>
+        <p:txBody>
+          <a:bodyPr lIns="68569" tIns="34275" rIns="68569" bIns="34275" anchor="t" anchorCtr="0">
+            <a:noAutofit/>
+          </a:bodyPr>
+          <a:lstStyle/>
+          <a:p>
+            <a:pPr>
+              <a:buClr>
+                <a:schemeClr val="accent2"/>
+              </a:buClr>
+              <a:buSzPct val="25000"/>
+            </a:pPr>
+            <a:r>
+              <a:rPr lang="en-US" sz="3600" dirty="0" smtClean="0"/>
+              <a:t>Title</a:t>
+            </a:r>
+            <a:endParaRPr lang="en-US" sz="3600" dirty="0"/>
+          </a:p>
+        </p:txBody>
+      </p:sp>
+    </p:spTree>
+    <p:extLst>
+      <p:ext uri="{BB962C8B-B14F-4D97-AF65-F5344CB8AC3E}">
+        <p14:creationId xmlns:p14="http://schemas.microsoft.com/office/powerpoint/2010/main" val="2978980850"/>
+      </p:ext>
+    </p:extLst>
+  </p:cSld>
+  <p:clrMapOvr>
+    <a:masterClrMapping/>
+  </p:clrMapOvr>
+  <p:transition spd="slow">
+    <p:cut/>
+  </p:transition>
+  <p:timing>
+    <p:tnLst>
+      <p:par>
+        <p:cTn id="1" dur="indefinite" restart="never" nodeType="tmRoot"/>
+      </p:par>
+    </p:tnLst>
+  </p:timing>
+</p:sld>
+</file>
+
+<file path=ppt/slides/slide19.xml><?xml version="1.0" encoding="utf-8"?>
+<p:sld xmlns:a="http://schemas.openxmlformats.org/drawingml/2006/main" xmlns:r="http://schemas.openxmlformats.org/officeDocument/2006/relationships" xmlns:p="http://schemas.openxmlformats.org/presentationml/2006/main">
+  <p:cSld>
+    <p:spTree>
+      <p:nvGrpSpPr>
+        <p:cNvPr id="1" name="Shape 93"/>
+        <p:cNvGrpSpPr/>
+        <p:nvPr/>
+      </p:nvGrpSpPr>
+      <p:grpSpPr>
+        <a:xfrm>
+          <a:off x="0" y="0"/>
+          <a:ext cx="0" cy="0"/>
+          <a:chOff x="0" y="0"/>
+          <a:chExt cx="0" cy="0"/>
+        </a:xfrm>
+      </p:grpSpPr>
+      <p:sp>
+        <p:nvSpPr>
+          <p:cNvPr id="95" name="Shape 95"/>
+          <p:cNvSpPr txBox="1">
+            <a:spLocks noGrp="1"/>
+          </p:cNvSpPr>
+          <p:nvPr>
+            <p:ph type="sldNum" idx="12"/>
+          </p:nvPr>
+        </p:nvSpPr>
+        <p:spPr>
+          <a:xfrm>
+            <a:off x="7600950" y="5688719"/>
+            <a:ext cx="269142" cy="273844"/>
+          </a:xfrm>
+          <a:prstGeom prst="rect">
+            <a:avLst/>
+          </a:prstGeom>
+          <a:noFill/>
+          <a:ln>
+            <a:noFill/>
+          </a:ln>
+        </p:spPr>
+        <p:txBody>
+          <a:bodyPr lIns="68569" tIns="34275" rIns="68569" bIns="34275" anchor="ctr" anchorCtr="0">
+            <a:noAutofit/>
+          </a:bodyPr>
+          <a:lstStyle/>
+          <a:p>
+            <a:pPr>
+              <a:buSzPct val="25000"/>
+            </a:pPr>
+            <a:r>
+              <a:rPr lang="en-US"/>
+              <a:t> </a:t>
+            </a:r>
+          </a:p>
+        </p:txBody>
+      </p:sp>
+      <p:sp>
+        <p:nvSpPr>
+          <p:cNvPr id="96" name="Shape 96"/>
+          <p:cNvSpPr txBox="1">
+            <a:spLocks noGrp="1"/>
+          </p:cNvSpPr>
+          <p:nvPr>
+            <p:ph type="body" idx="1"/>
+          </p:nvPr>
+        </p:nvSpPr>
+        <p:spPr>
+          <a:xfrm>
+            <a:off x="341167" y="937873"/>
+            <a:ext cx="8498033" cy="5024690"/>
+          </a:xfrm>
+          <a:prstGeom prst="rect">
+            <a:avLst/>
+          </a:prstGeom>
+          <a:noFill/>
+          <a:ln>
+            <a:noFill/>
+          </a:ln>
+        </p:spPr>
+        <p:txBody>
+          <a:bodyPr lIns="68569" tIns="34275" rIns="68569" bIns="34275" anchor="t" anchorCtr="0">
+            <a:noAutofit/>
+          </a:bodyPr>
+          <a:lstStyle/>
+          <a:p>
+            <a:pPr marL="355600" indent="-355600">
               <a:lnSpc>
                 <a:spcPct val="90000"/>
               </a:lnSpc>
@@ -8838,20 +9849,15 @@
               </a:buBlip>
             </a:pPr>
             <a:r>
-              <a:rPr lang="en-US" sz="2000" dirty="0" err="1" smtClean="0">
-                <a:sym typeface="Wingdings" panose="05000000000000000000" pitchFamily="2" charset="2"/>
-              </a:rPr>
-              <a:t>git</a:t>
-            </a:r>
-            <a:r>
-              <a:rPr lang="en-US" sz="2000" dirty="0" smtClean="0">
-                <a:sym typeface="Wingdings" panose="05000000000000000000" pitchFamily="2" charset="2"/>
-              </a:rPr>
-              <a:t> help [command]</a:t>
-            </a:r>
-          </a:p>
-          <a:p>
-            <a:pPr marL="893763" indent="-355600">
+              <a:rPr lang="en-US" sz="2400" dirty="0" smtClean="0"/>
+              <a:t>stuff</a:t>
+            </a:r>
+            <a:endParaRPr lang="en-US" sz="2400" dirty="0" smtClean="0">
+              <a:sym typeface="Wingdings" panose="05000000000000000000" pitchFamily="2" charset="2"/>
+            </a:endParaRPr>
+          </a:p>
+          <a:p>
+            <a:pPr>
               <a:lnSpc>
                 <a:spcPct val="90000"/>
               </a:lnSpc>
@@ -8859,34 +9865,13 @@
                 <a:srgbClr val="2E3640"/>
               </a:buClr>
               <a:buSzPct val="100000"/>
-              <a:buBlip>
-                <a:blip r:embed="rId3"/>
-              </a:buBlip>
-            </a:pPr>
-            <a:r>
-              <a:rPr lang="en-US" sz="2000" dirty="0" err="1" smtClean="0">
-                <a:sym typeface="Wingdings" panose="05000000000000000000" pitchFamily="2" charset="2"/>
-              </a:rPr>
-              <a:t>git</a:t>
-            </a:r>
-            <a:r>
-              <a:rPr lang="en-US" sz="2000" dirty="0" smtClean="0">
-                <a:sym typeface="Wingdings" panose="05000000000000000000" pitchFamily="2" charset="2"/>
-              </a:rPr>
-              <a:t> </a:t>
-            </a:r>
-            <a:r>
-              <a:rPr lang="en-US" sz="2000" dirty="0" err="1" smtClean="0">
-                <a:sym typeface="Wingdings" panose="05000000000000000000" pitchFamily="2" charset="2"/>
-              </a:rPr>
-              <a:t>init</a:t>
-            </a:r>
-            <a:endParaRPr lang="en-US" sz="2000" dirty="0" smtClean="0">
+            </a:pPr>
+            <a:endParaRPr lang="en-US" sz="2400" dirty="0">
               <a:sym typeface="Wingdings" panose="05000000000000000000" pitchFamily="2" charset="2"/>
             </a:endParaRPr>
           </a:p>
           <a:p>
-            <a:pPr marL="893763" indent="-355600">
+            <a:pPr>
               <a:lnSpc>
                 <a:spcPct val="90000"/>
               </a:lnSpc>
@@ -8894,374 +9879,8 @@
                 <a:srgbClr val="2E3640"/>
               </a:buClr>
               <a:buSzPct val="100000"/>
-              <a:buBlip>
-                <a:blip r:embed="rId3"/>
-              </a:buBlip>
-            </a:pPr>
-            <a:r>
-              <a:rPr lang="en-US" sz="2000" dirty="0" err="1" smtClean="0">
-                <a:sym typeface="Wingdings" panose="05000000000000000000" pitchFamily="2" charset="2"/>
-              </a:rPr>
-              <a:t>git</a:t>
-            </a:r>
-            <a:r>
-              <a:rPr lang="en-US" sz="2000" dirty="0" smtClean="0">
-                <a:sym typeface="Wingdings" panose="05000000000000000000" pitchFamily="2" charset="2"/>
-              </a:rPr>
-              <a:t> ignore</a:t>
-            </a:r>
-          </a:p>
-          <a:p>
-            <a:pPr marL="893763" indent="-355600">
-              <a:lnSpc>
-                <a:spcPct val="90000"/>
-              </a:lnSpc>
-              <a:buClr>
-                <a:srgbClr val="2E3640"/>
-              </a:buClr>
-              <a:buSzPct val="100000"/>
-              <a:buBlip>
-                <a:blip r:embed="rId3"/>
-              </a:buBlip>
-            </a:pPr>
-            <a:r>
-              <a:rPr lang="en-US" sz="2000" dirty="0" err="1" smtClean="0">
-                <a:sym typeface="Wingdings" panose="05000000000000000000" pitchFamily="2" charset="2"/>
-              </a:rPr>
-              <a:t>git</a:t>
-            </a:r>
-            <a:r>
-              <a:rPr lang="en-US" sz="2000" dirty="0" smtClean="0">
-                <a:sym typeface="Wingdings" panose="05000000000000000000" pitchFamily="2" charset="2"/>
-              </a:rPr>
-              <a:t> add</a:t>
-            </a:r>
-          </a:p>
-          <a:p>
-            <a:pPr marL="893763" indent="-355600">
-              <a:lnSpc>
-                <a:spcPct val="90000"/>
-              </a:lnSpc>
-              <a:buClr>
-                <a:srgbClr val="2E3640"/>
-              </a:buClr>
-              <a:buSzPct val="100000"/>
-              <a:buBlip>
-                <a:blip r:embed="rId3"/>
-              </a:buBlip>
-            </a:pPr>
-            <a:r>
-              <a:rPr lang="en-US" sz="2000" dirty="0" err="1" smtClean="0">
-                <a:sym typeface="Wingdings" panose="05000000000000000000" pitchFamily="2" charset="2"/>
-              </a:rPr>
-              <a:t>git</a:t>
-            </a:r>
-            <a:r>
-              <a:rPr lang="en-US" sz="2000" dirty="0" smtClean="0">
-                <a:sym typeface="Wingdings" panose="05000000000000000000" pitchFamily="2" charset="2"/>
-              </a:rPr>
-              <a:t> </a:t>
-            </a:r>
-            <a:r>
-              <a:rPr lang="en-US" sz="2000" dirty="0" err="1" smtClean="0">
-                <a:sym typeface="Wingdings" panose="05000000000000000000" pitchFamily="2" charset="2"/>
-              </a:rPr>
-              <a:t>rm</a:t>
-            </a:r>
-            <a:endParaRPr lang="en-US" sz="2000" dirty="0" smtClean="0">
-              <a:sym typeface="Wingdings" panose="05000000000000000000" pitchFamily="2" charset="2"/>
-            </a:endParaRPr>
-          </a:p>
-          <a:p>
-            <a:pPr marL="893763" indent="-355600">
-              <a:lnSpc>
-                <a:spcPct val="90000"/>
-              </a:lnSpc>
-              <a:buClr>
-                <a:srgbClr val="2E3640"/>
-              </a:buClr>
-              <a:buSzPct val="100000"/>
-              <a:buBlip>
-                <a:blip r:embed="rId3"/>
-              </a:buBlip>
-            </a:pPr>
-            <a:r>
-              <a:rPr lang="en-US" sz="2000" dirty="0" err="1" smtClean="0">
-                <a:sym typeface="Wingdings" panose="05000000000000000000" pitchFamily="2" charset="2"/>
-              </a:rPr>
-              <a:t>git</a:t>
-            </a:r>
-            <a:r>
-              <a:rPr lang="en-US" sz="2000" dirty="0">
-                <a:sym typeface="Wingdings" panose="05000000000000000000" pitchFamily="2" charset="2"/>
-              </a:rPr>
-              <a:t> commit [--</a:t>
-            </a:r>
-            <a:r>
-              <a:rPr lang="en-US" sz="2000" dirty="0" err="1" smtClean="0">
-                <a:sym typeface="Wingdings" panose="05000000000000000000" pitchFamily="2" charset="2"/>
-              </a:rPr>
-              <a:t>ammend</a:t>
-            </a:r>
-            <a:r>
-              <a:rPr lang="en-US" sz="2000" dirty="0">
-                <a:sym typeface="Wingdings" panose="05000000000000000000" pitchFamily="2" charset="2"/>
-              </a:rPr>
-              <a:t>]</a:t>
-            </a:r>
-            <a:endParaRPr lang="en-US" sz="2000" dirty="0" smtClean="0">
-              <a:sym typeface="Wingdings" panose="05000000000000000000" pitchFamily="2" charset="2"/>
-            </a:endParaRPr>
-          </a:p>
-          <a:p>
-            <a:pPr marL="893763" indent="-355600">
-              <a:lnSpc>
-                <a:spcPct val="90000"/>
-              </a:lnSpc>
-              <a:buClr>
-                <a:srgbClr val="2E3640"/>
-              </a:buClr>
-              <a:buSzPct val="100000"/>
-              <a:buBlip>
-                <a:blip r:embed="rId3"/>
-              </a:buBlip>
-            </a:pPr>
-            <a:r>
-              <a:rPr lang="en-US" sz="2000" dirty="0" err="1" smtClean="0">
-                <a:sym typeface="Wingdings" panose="05000000000000000000" pitchFamily="2" charset="2"/>
-              </a:rPr>
-              <a:t>git</a:t>
-            </a:r>
-            <a:r>
-              <a:rPr lang="en-US" sz="2000" dirty="0" smtClean="0">
-                <a:sym typeface="Wingdings" panose="05000000000000000000" pitchFamily="2" charset="2"/>
-              </a:rPr>
-              <a:t> merge [--no-</a:t>
-            </a:r>
-            <a:r>
-              <a:rPr lang="en-US" sz="2000" dirty="0" err="1" smtClean="0">
-                <a:sym typeface="Wingdings" panose="05000000000000000000" pitchFamily="2" charset="2"/>
-              </a:rPr>
-              <a:t>ff</a:t>
-            </a:r>
-            <a:r>
-              <a:rPr lang="en-US" sz="2000" dirty="0" smtClean="0">
-                <a:sym typeface="Wingdings" panose="05000000000000000000" pitchFamily="2" charset="2"/>
-              </a:rPr>
-              <a:t>] [--</a:t>
-            </a:r>
-            <a:r>
-              <a:rPr lang="en-US" sz="2000" dirty="0" err="1" smtClean="0">
-                <a:sym typeface="Wingdings" panose="05000000000000000000" pitchFamily="2" charset="2"/>
-              </a:rPr>
-              <a:t>ff</a:t>
-            </a:r>
-            <a:r>
-              <a:rPr lang="en-US" sz="2000" dirty="0" smtClean="0">
-                <a:sym typeface="Wingdings" panose="05000000000000000000" pitchFamily="2" charset="2"/>
-              </a:rPr>
-              <a:t>-only]</a:t>
-            </a:r>
-          </a:p>
-          <a:p>
-            <a:pPr marL="893763" indent="-355600">
-              <a:lnSpc>
-                <a:spcPct val="90000"/>
-              </a:lnSpc>
-              <a:buClr>
-                <a:srgbClr val="2E3640"/>
-              </a:buClr>
-              <a:buSzPct val="100000"/>
-              <a:buBlip>
-                <a:blip r:embed="rId3"/>
-              </a:buBlip>
-            </a:pPr>
-            <a:r>
-              <a:rPr lang="en-US" sz="2000" dirty="0" err="1" smtClean="0">
-                <a:sym typeface="Wingdings" panose="05000000000000000000" pitchFamily="2" charset="2"/>
-              </a:rPr>
-              <a:t>git</a:t>
-            </a:r>
-            <a:r>
-              <a:rPr lang="en-US" sz="2000" dirty="0" smtClean="0">
-                <a:sym typeface="Wingdings" panose="05000000000000000000" pitchFamily="2" charset="2"/>
-              </a:rPr>
-              <a:t> rebase [--interactive]</a:t>
-            </a:r>
-          </a:p>
-          <a:p>
-            <a:pPr marL="893763" indent="-355600">
-              <a:lnSpc>
-                <a:spcPct val="90000"/>
-              </a:lnSpc>
-              <a:buClr>
-                <a:srgbClr val="2E3640"/>
-              </a:buClr>
-              <a:buSzPct val="100000"/>
-              <a:buBlip>
-                <a:blip r:embed="rId3"/>
-              </a:buBlip>
-            </a:pPr>
-            <a:r>
-              <a:rPr lang="en-US" sz="2000" dirty="0" err="1" smtClean="0">
-                <a:sym typeface="Wingdings" panose="05000000000000000000" pitchFamily="2" charset="2"/>
-              </a:rPr>
-              <a:t>git</a:t>
-            </a:r>
-            <a:r>
-              <a:rPr lang="en-US" sz="2000" dirty="0" smtClean="0">
-                <a:sym typeface="Wingdings" panose="05000000000000000000" pitchFamily="2" charset="2"/>
-              </a:rPr>
-              <a:t> </a:t>
-            </a:r>
-            <a:r>
-              <a:rPr lang="en-US" sz="2000" dirty="0" err="1" smtClean="0">
-                <a:sym typeface="Wingdings" panose="05000000000000000000" pitchFamily="2" charset="2"/>
-              </a:rPr>
-              <a:t>reflog</a:t>
-            </a:r>
-            <a:endParaRPr lang="en-US" sz="2000" dirty="0" smtClean="0">
-              <a:sym typeface="Wingdings" panose="05000000000000000000" pitchFamily="2" charset="2"/>
-            </a:endParaRPr>
-          </a:p>
-          <a:p>
-            <a:pPr marL="893763" indent="-355600">
-              <a:lnSpc>
-                <a:spcPct val="90000"/>
-              </a:lnSpc>
-              <a:buClr>
-                <a:srgbClr val="2E3640"/>
-              </a:buClr>
-              <a:buSzPct val="100000"/>
-              <a:buBlip>
-                <a:blip r:embed="rId3"/>
-              </a:buBlip>
-            </a:pPr>
-            <a:r>
-              <a:rPr lang="en-US" sz="2000" dirty="0" err="1" smtClean="0">
-                <a:sym typeface="Wingdings" panose="05000000000000000000" pitchFamily="2" charset="2"/>
-              </a:rPr>
-              <a:t>git</a:t>
-            </a:r>
-            <a:r>
-              <a:rPr lang="en-US" sz="2000" dirty="0" smtClean="0">
-                <a:sym typeface="Wingdings" panose="05000000000000000000" pitchFamily="2" charset="2"/>
-              </a:rPr>
-              <a:t> fetch</a:t>
-            </a:r>
-          </a:p>
-          <a:p>
-            <a:pPr marL="893763" indent="-355600">
-              <a:lnSpc>
-                <a:spcPct val="90000"/>
-              </a:lnSpc>
-              <a:buClr>
-                <a:srgbClr val="2E3640"/>
-              </a:buClr>
-              <a:buSzPct val="100000"/>
-              <a:buBlip>
-                <a:blip r:embed="rId3"/>
-              </a:buBlip>
-            </a:pPr>
-            <a:r>
-              <a:rPr lang="en-US" sz="2000" dirty="0" err="1" smtClean="0">
-                <a:sym typeface="Wingdings" panose="05000000000000000000" pitchFamily="2" charset="2"/>
-              </a:rPr>
-              <a:t>git</a:t>
-            </a:r>
-            <a:r>
-              <a:rPr lang="en-US" sz="2000" dirty="0" smtClean="0">
-                <a:sym typeface="Wingdings" panose="05000000000000000000" pitchFamily="2" charset="2"/>
-              </a:rPr>
-              <a:t> pull [--rebase]</a:t>
-            </a:r>
-          </a:p>
-          <a:p>
-            <a:pPr marL="893763" indent="-355600">
-              <a:lnSpc>
-                <a:spcPct val="90000"/>
-              </a:lnSpc>
-              <a:buClr>
-                <a:srgbClr val="2E3640"/>
-              </a:buClr>
-              <a:buSzPct val="100000"/>
-              <a:buBlip>
-                <a:blip r:embed="rId3"/>
-              </a:buBlip>
-            </a:pPr>
-            <a:r>
-              <a:rPr lang="en-US" sz="2000" dirty="0" err="1" smtClean="0">
-                <a:sym typeface="Wingdings" panose="05000000000000000000" pitchFamily="2" charset="2"/>
-              </a:rPr>
-              <a:t>git</a:t>
-            </a:r>
-            <a:r>
-              <a:rPr lang="en-US" sz="2000" dirty="0" smtClean="0">
-                <a:sym typeface="Wingdings" panose="05000000000000000000" pitchFamily="2" charset="2"/>
-              </a:rPr>
-              <a:t> push</a:t>
-            </a:r>
-          </a:p>
-          <a:p>
-            <a:pPr marL="893763" indent="-355600">
-              <a:lnSpc>
-                <a:spcPct val="90000"/>
-              </a:lnSpc>
-              <a:buClr>
-                <a:srgbClr val="2E3640"/>
-              </a:buClr>
-              <a:buSzPct val="100000"/>
-              <a:buBlip>
-                <a:blip r:embed="rId3"/>
-              </a:buBlip>
-            </a:pPr>
-            <a:r>
-              <a:rPr lang="en-US" sz="2000" dirty="0" err="1" smtClean="0">
-                <a:sym typeface="Wingdings" panose="05000000000000000000" pitchFamily="2" charset="2"/>
-              </a:rPr>
-              <a:t>git</a:t>
-            </a:r>
-            <a:r>
-              <a:rPr lang="en-US" sz="2000" dirty="0" smtClean="0">
-                <a:sym typeface="Wingdings" panose="05000000000000000000" pitchFamily="2" charset="2"/>
-              </a:rPr>
-              <a:t> branch</a:t>
-            </a:r>
-          </a:p>
-          <a:p>
-            <a:pPr marL="893763" indent="-355600">
-              <a:lnSpc>
-                <a:spcPct val="90000"/>
-              </a:lnSpc>
-              <a:buClr>
-                <a:srgbClr val="2E3640"/>
-              </a:buClr>
-              <a:buSzPct val="100000"/>
-              <a:buBlip>
-                <a:blip r:embed="rId3"/>
-              </a:buBlip>
-            </a:pPr>
-            <a:r>
-              <a:rPr lang="en-US" sz="2000" dirty="0" err="1" smtClean="0">
-                <a:sym typeface="Wingdings" panose="05000000000000000000" pitchFamily="2" charset="2"/>
-              </a:rPr>
-              <a:t>git</a:t>
-            </a:r>
-            <a:r>
-              <a:rPr lang="en-US" sz="2000" dirty="0" smtClean="0">
-                <a:sym typeface="Wingdings" panose="05000000000000000000" pitchFamily="2" charset="2"/>
-              </a:rPr>
-              <a:t> </a:t>
-            </a:r>
-            <a:r>
-              <a:rPr lang="en-US" sz="2000" dirty="0" smtClean="0">
-                <a:sym typeface="Wingdings" panose="05000000000000000000" pitchFamily="2" charset="2"/>
-              </a:rPr>
-              <a:t>tag</a:t>
-            </a:r>
-            <a:endParaRPr lang="en-US" sz="2000" dirty="0" smtClean="0">
-              <a:sym typeface="Wingdings" panose="05000000000000000000" pitchFamily="2" charset="2"/>
-            </a:endParaRPr>
+            </a:pPr>
+            <a:endParaRPr lang="en-US" sz="2400" dirty="0" smtClean="0"/>
           </a:p>
         </p:txBody>
       </p:sp>
@@ -9302,11 +9921,7 @@
             </a:pPr>
             <a:r>
               <a:rPr lang="en-US" sz="3600" dirty="0" smtClean="0"/>
-              <a:t>Hands-on </a:t>
-            </a:r>
-            <a:r>
-              <a:rPr lang="en-US" sz="3600" dirty="0" err="1" smtClean="0"/>
-              <a:t>Workshow</a:t>
+              <a:t>Title</a:t>
             </a:r>
             <a:endParaRPr lang="en-US" sz="3600" dirty="0"/>
           </a:p>
@@ -9315,7 +9930,7 @@
     </p:spTree>
     <p:extLst>
       <p:ext uri="{BB962C8B-B14F-4D97-AF65-F5344CB8AC3E}">
-        <p14:creationId xmlns:p14="http://schemas.microsoft.com/office/powerpoint/2010/main" val="2935937953"/>
+        <p14:creationId xmlns:p14="http://schemas.microsoft.com/office/powerpoint/2010/main" val="2675765428"/>
       </p:ext>
     </p:extLst>
   </p:cSld>
@@ -9602,6 +10217,892 @@
   </p:cSld>
   <p:clrMapOvr>
     <a:overrideClrMapping bg1="lt1" tx1="dk1" bg2="dk2" tx2="lt2" accent1="accent1" accent2="accent2" accent3="accent3" accent4="accent4" accent5="accent5" accent6="accent6" hlink="hlink" folHlink="folHlink"/>
+  </p:clrMapOvr>
+  <p:transition spd="slow">
+    <p:cut/>
+  </p:transition>
+  <p:timing>
+    <p:tnLst>
+      <p:par>
+        <p:cTn id="1" dur="indefinite" restart="never" nodeType="tmRoot"/>
+      </p:par>
+    </p:tnLst>
+  </p:timing>
+</p:sld>
+</file>
+
+<file path=ppt/slides/slide20.xml><?xml version="1.0" encoding="utf-8"?>
+<p:sld xmlns:a="http://schemas.openxmlformats.org/drawingml/2006/main" xmlns:r="http://schemas.openxmlformats.org/officeDocument/2006/relationships" xmlns:p="http://schemas.openxmlformats.org/presentationml/2006/main">
+  <p:cSld>
+    <p:spTree>
+      <p:nvGrpSpPr>
+        <p:cNvPr id="1" name="Shape 93"/>
+        <p:cNvGrpSpPr/>
+        <p:nvPr/>
+      </p:nvGrpSpPr>
+      <p:grpSpPr>
+        <a:xfrm>
+          <a:off x="0" y="0"/>
+          <a:ext cx="0" cy="0"/>
+          <a:chOff x="0" y="0"/>
+          <a:chExt cx="0" cy="0"/>
+        </a:xfrm>
+      </p:grpSpPr>
+      <p:sp>
+        <p:nvSpPr>
+          <p:cNvPr id="95" name="Shape 95"/>
+          <p:cNvSpPr txBox="1">
+            <a:spLocks noGrp="1"/>
+          </p:cNvSpPr>
+          <p:nvPr>
+            <p:ph type="sldNum" idx="12"/>
+          </p:nvPr>
+        </p:nvSpPr>
+        <p:spPr>
+          <a:xfrm>
+            <a:off x="7600950" y="5688719"/>
+            <a:ext cx="269142" cy="273844"/>
+          </a:xfrm>
+          <a:prstGeom prst="rect">
+            <a:avLst/>
+          </a:prstGeom>
+          <a:noFill/>
+          <a:ln>
+            <a:noFill/>
+          </a:ln>
+        </p:spPr>
+        <p:txBody>
+          <a:bodyPr lIns="68569" tIns="34275" rIns="68569" bIns="34275" anchor="ctr" anchorCtr="0">
+            <a:noAutofit/>
+          </a:bodyPr>
+          <a:lstStyle/>
+          <a:p>
+            <a:pPr>
+              <a:buSzPct val="25000"/>
+            </a:pPr>
+            <a:r>
+              <a:rPr lang="en-US"/>
+              <a:t> </a:t>
+            </a:r>
+          </a:p>
+        </p:txBody>
+      </p:sp>
+      <p:sp>
+        <p:nvSpPr>
+          <p:cNvPr id="96" name="Shape 96"/>
+          <p:cNvSpPr txBox="1">
+            <a:spLocks noGrp="1"/>
+          </p:cNvSpPr>
+          <p:nvPr>
+            <p:ph type="body" idx="1"/>
+          </p:nvPr>
+        </p:nvSpPr>
+        <p:spPr>
+          <a:xfrm>
+            <a:off x="341167" y="937873"/>
+            <a:ext cx="8498033" cy="5024690"/>
+          </a:xfrm>
+          <a:prstGeom prst="rect">
+            <a:avLst/>
+          </a:prstGeom>
+          <a:noFill/>
+          <a:ln>
+            <a:noFill/>
+          </a:ln>
+        </p:spPr>
+        <p:txBody>
+          <a:bodyPr lIns="68569" tIns="34275" rIns="68569" bIns="34275" anchor="t" anchorCtr="0">
+            <a:noAutofit/>
+          </a:bodyPr>
+          <a:lstStyle/>
+          <a:p>
+            <a:pPr marL="355600" indent="-355600">
+              <a:lnSpc>
+                <a:spcPct val="90000"/>
+              </a:lnSpc>
+              <a:buClr>
+                <a:srgbClr val="2E3640"/>
+              </a:buClr>
+              <a:buSzPct val="100000"/>
+              <a:buBlip>
+                <a:blip r:embed="rId3"/>
+              </a:buBlip>
+            </a:pPr>
+            <a:r>
+              <a:rPr lang="en-US" sz="2400" dirty="0" smtClean="0"/>
+              <a:t>Time to get the hands dirty</a:t>
+            </a:r>
+            <a:endParaRPr lang="en-US" sz="2400" dirty="0" smtClean="0">
+              <a:sym typeface="Wingdings" panose="05000000000000000000" pitchFamily="2" charset="2"/>
+            </a:endParaRPr>
+          </a:p>
+          <a:p>
+            <a:pPr>
+              <a:lnSpc>
+                <a:spcPct val="90000"/>
+              </a:lnSpc>
+              <a:buClr>
+                <a:srgbClr val="2E3640"/>
+              </a:buClr>
+              <a:buSzPct val="100000"/>
+            </a:pPr>
+            <a:endParaRPr lang="en-US" sz="2400" dirty="0">
+              <a:sym typeface="Wingdings" panose="05000000000000000000" pitchFamily="2" charset="2"/>
+            </a:endParaRPr>
+          </a:p>
+          <a:p>
+            <a:pPr>
+              <a:lnSpc>
+                <a:spcPct val="90000"/>
+              </a:lnSpc>
+              <a:buClr>
+                <a:srgbClr val="2E3640"/>
+              </a:buClr>
+              <a:buSzPct val="100000"/>
+            </a:pPr>
+            <a:endParaRPr lang="en-US" sz="2400" dirty="0" smtClean="0"/>
+          </a:p>
+        </p:txBody>
+      </p:sp>
+      <p:sp>
+        <p:nvSpPr>
+          <p:cNvPr id="97" name="Shape 97"/>
+          <p:cNvSpPr txBox="1">
+            <a:spLocks noGrp="1"/>
+          </p:cNvSpPr>
+          <p:nvPr>
+            <p:ph type="body" idx="2"/>
+          </p:nvPr>
+        </p:nvSpPr>
+        <p:spPr>
+          <a:xfrm>
+            <a:off x="341168" y="228026"/>
+            <a:ext cx="8498032" cy="457199"/>
+          </a:xfrm>
+          <a:prstGeom prst="rect">
+            <a:avLst/>
+          </a:prstGeom>
+          <a:noFill/>
+          <a:ln>
+            <a:noFill/>
+          </a:ln>
+        </p:spPr>
+        <p:txBody>
+          <a:bodyPr lIns="68569" tIns="34275" rIns="68569" bIns="34275" anchor="t" anchorCtr="0">
+            <a:noAutofit/>
+          </a:bodyPr>
+          <a:lstStyle/>
+          <a:p>
+            <a:pPr>
+              <a:buClr>
+                <a:schemeClr val="accent2"/>
+              </a:buClr>
+              <a:buSzPct val="25000"/>
+            </a:pPr>
+            <a:r>
+              <a:rPr lang="en-US" sz="3600" dirty="0" smtClean="0"/>
+              <a:t>Hands-on </a:t>
+            </a:r>
+            <a:r>
+              <a:rPr lang="en-US" sz="3600" dirty="0" err="1" smtClean="0"/>
+              <a:t>Workshow</a:t>
+            </a:r>
+            <a:endParaRPr lang="en-US" sz="3600" dirty="0"/>
+          </a:p>
+        </p:txBody>
+      </p:sp>
+      <p:pic>
+        <p:nvPicPr>
+          <p:cNvPr id="2" name="Picture 1"/>
+          <p:cNvPicPr>
+            <a:picLocks noChangeAspect="1"/>
+          </p:cNvPicPr>
+          <p:nvPr/>
+        </p:nvPicPr>
+        <p:blipFill>
+          <a:blip r:embed="rId4" cstate="print">
+            <a:extLst>
+              <a:ext uri="{28A0092B-C50C-407E-A947-70E740481C1C}">
+                <a14:useLocalDpi xmlns:a14="http://schemas.microsoft.com/office/drawing/2010/main" val="0"/>
+              </a:ext>
+            </a:extLst>
+          </a:blip>
+          <a:stretch>
+            <a:fillRect/>
+          </a:stretch>
+        </p:blipFill>
+        <p:spPr>
+          <a:xfrm>
+            <a:off x="1744403" y="1514354"/>
+            <a:ext cx="5529699" cy="4479801"/>
+          </a:xfrm>
+          <a:prstGeom prst="rect">
+            <a:avLst/>
+          </a:prstGeom>
+        </p:spPr>
+      </p:pic>
+    </p:spTree>
+    <p:extLst>
+      <p:ext uri="{BB962C8B-B14F-4D97-AF65-F5344CB8AC3E}">
+        <p14:creationId xmlns:p14="http://schemas.microsoft.com/office/powerpoint/2010/main" val="2075129891"/>
+      </p:ext>
+    </p:extLst>
+  </p:cSld>
+  <p:clrMapOvr>
+    <a:masterClrMapping/>
+  </p:clrMapOvr>
+  <p:transition spd="slow">
+    <p:cut/>
+  </p:transition>
+  <p:timing>
+    <p:tnLst>
+      <p:par>
+        <p:cTn id="1" dur="indefinite" restart="never" nodeType="tmRoot"/>
+      </p:par>
+    </p:tnLst>
+  </p:timing>
+</p:sld>
+</file>
+
+<file path=ppt/slides/slide21.xml><?xml version="1.0" encoding="utf-8"?>
+<p:sld xmlns:a="http://schemas.openxmlformats.org/drawingml/2006/main" xmlns:r="http://schemas.openxmlformats.org/officeDocument/2006/relationships" xmlns:p="http://schemas.openxmlformats.org/presentationml/2006/main">
+  <p:cSld>
+    <p:spTree>
+      <p:nvGrpSpPr>
+        <p:cNvPr id="1" name="Shape 93"/>
+        <p:cNvGrpSpPr/>
+        <p:nvPr/>
+      </p:nvGrpSpPr>
+      <p:grpSpPr>
+        <a:xfrm>
+          <a:off x="0" y="0"/>
+          <a:ext cx="0" cy="0"/>
+          <a:chOff x="0" y="0"/>
+          <a:chExt cx="0" cy="0"/>
+        </a:xfrm>
+      </p:grpSpPr>
+      <p:sp>
+        <p:nvSpPr>
+          <p:cNvPr id="95" name="Shape 95"/>
+          <p:cNvSpPr txBox="1">
+            <a:spLocks noGrp="1"/>
+          </p:cNvSpPr>
+          <p:nvPr>
+            <p:ph type="sldNum" idx="12"/>
+          </p:nvPr>
+        </p:nvSpPr>
+        <p:spPr>
+          <a:xfrm>
+            <a:off x="7600950" y="5688719"/>
+            <a:ext cx="269142" cy="273844"/>
+          </a:xfrm>
+          <a:prstGeom prst="rect">
+            <a:avLst/>
+          </a:prstGeom>
+          <a:noFill/>
+          <a:ln>
+            <a:noFill/>
+          </a:ln>
+        </p:spPr>
+        <p:txBody>
+          <a:bodyPr lIns="68569" tIns="34275" rIns="68569" bIns="34275" anchor="ctr" anchorCtr="0">
+            <a:noAutofit/>
+          </a:bodyPr>
+          <a:lstStyle/>
+          <a:p>
+            <a:pPr>
+              <a:buSzPct val="25000"/>
+            </a:pPr>
+            <a:r>
+              <a:rPr lang="en-US"/>
+              <a:t> </a:t>
+            </a:r>
+          </a:p>
+        </p:txBody>
+      </p:sp>
+      <p:sp>
+        <p:nvSpPr>
+          <p:cNvPr id="96" name="Shape 96"/>
+          <p:cNvSpPr txBox="1">
+            <a:spLocks noGrp="1"/>
+          </p:cNvSpPr>
+          <p:nvPr>
+            <p:ph type="body" idx="1"/>
+          </p:nvPr>
+        </p:nvSpPr>
+        <p:spPr>
+          <a:xfrm>
+            <a:off x="341167" y="937873"/>
+            <a:ext cx="8498033" cy="5024690"/>
+          </a:xfrm>
+          <a:prstGeom prst="rect">
+            <a:avLst/>
+          </a:prstGeom>
+          <a:noFill/>
+          <a:ln>
+            <a:noFill/>
+          </a:ln>
+        </p:spPr>
+        <p:txBody>
+          <a:bodyPr lIns="68569" tIns="34275" rIns="68569" bIns="34275" anchor="t" anchorCtr="0">
+            <a:noAutofit/>
+          </a:bodyPr>
+          <a:lstStyle/>
+          <a:p>
+            <a:pPr marL="355600" indent="-355600">
+              <a:lnSpc>
+                <a:spcPct val="90000"/>
+              </a:lnSpc>
+              <a:buClr>
+                <a:srgbClr val="2E3640"/>
+              </a:buClr>
+              <a:buSzPct val="100000"/>
+              <a:buBlip>
+                <a:blip r:embed="rId3"/>
+              </a:buBlip>
+            </a:pPr>
+            <a:r>
+              <a:rPr lang="en-US" sz="2000" dirty="0" smtClean="0"/>
+              <a:t>install GIT</a:t>
+            </a:r>
+          </a:p>
+          <a:p>
+            <a:pPr marL="355600" indent="-355600">
+              <a:lnSpc>
+                <a:spcPct val="90000"/>
+              </a:lnSpc>
+              <a:buClr>
+                <a:srgbClr val="2E3640"/>
+              </a:buClr>
+              <a:buSzPct val="100000"/>
+              <a:buBlip>
+                <a:blip r:embed="rId3"/>
+              </a:buBlip>
+            </a:pPr>
+            <a:r>
+              <a:rPr lang="en-US" sz="2000" dirty="0" smtClean="0">
+                <a:sym typeface="Wingdings" panose="05000000000000000000" pitchFamily="2" charset="2"/>
+              </a:rPr>
+              <a:t>setup username, password, editor</a:t>
+            </a:r>
+          </a:p>
+          <a:p>
+            <a:pPr marL="355600" indent="-355600">
+              <a:lnSpc>
+                <a:spcPct val="90000"/>
+              </a:lnSpc>
+              <a:buClr>
+                <a:srgbClr val="2E3640"/>
+              </a:buClr>
+              <a:buSzPct val="100000"/>
+              <a:buBlip>
+                <a:blip r:embed="rId3"/>
+              </a:buBlip>
+            </a:pPr>
+            <a:r>
+              <a:rPr lang="en-US" sz="2000" dirty="0" smtClean="0">
+                <a:sym typeface="Wingdings" panose="05000000000000000000" pitchFamily="2" charset="2"/>
+              </a:rPr>
+              <a:t>commands</a:t>
+            </a:r>
+          </a:p>
+          <a:p>
+            <a:pPr marL="893763" indent="-355600">
+              <a:lnSpc>
+                <a:spcPct val="90000"/>
+              </a:lnSpc>
+              <a:buClr>
+                <a:srgbClr val="2E3640"/>
+              </a:buClr>
+              <a:buSzPct val="100000"/>
+              <a:buBlip>
+                <a:blip r:embed="rId3"/>
+              </a:buBlip>
+            </a:pPr>
+            <a:r>
+              <a:rPr lang="en-US" sz="2000" dirty="0" err="1" smtClean="0">
+                <a:sym typeface="Wingdings" panose="05000000000000000000" pitchFamily="2" charset="2"/>
+              </a:rPr>
+              <a:t>git</a:t>
+            </a:r>
+            <a:r>
+              <a:rPr lang="en-US" sz="2000" dirty="0" smtClean="0">
+                <a:sym typeface="Wingdings" panose="05000000000000000000" pitchFamily="2" charset="2"/>
+              </a:rPr>
+              <a:t> help [command]</a:t>
+            </a:r>
+          </a:p>
+          <a:p>
+            <a:pPr marL="893763" indent="-355600">
+              <a:lnSpc>
+                <a:spcPct val="90000"/>
+              </a:lnSpc>
+              <a:buClr>
+                <a:srgbClr val="2E3640"/>
+              </a:buClr>
+              <a:buSzPct val="100000"/>
+              <a:buBlip>
+                <a:blip r:embed="rId3"/>
+              </a:buBlip>
+            </a:pPr>
+            <a:r>
+              <a:rPr lang="en-US" sz="2000" dirty="0" err="1" smtClean="0">
+                <a:sym typeface="Wingdings" panose="05000000000000000000" pitchFamily="2" charset="2"/>
+              </a:rPr>
+              <a:t>git</a:t>
+            </a:r>
+            <a:r>
+              <a:rPr lang="en-US" sz="2000" dirty="0" smtClean="0">
+                <a:sym typeface="Wingdings" panose="05000000000000000000" pitchFamily="2" charset="2"/>
+              </a:rPr>
+              <a:t> </a:t>
+            </a:r>
+            <a:r>
+              <a:rPr lang="en-US" sz="2000" dirty="0" err="1" smtClean="0">
+                <a:sym typeface="Wingdings" panose="05000000000000000000" pitchFamily="2" charset="2"/>
+              </a:rPr>
+              <a:t>init</a:t>
+            </a:r>
+            <a:endParaRPr lang="en-US" sz="2000" dirty="0" smtClean="0">
+              <a:sym typeface="Wingdings" panose="05000000000000000000" pitchFamily="2" charset="2"/>
+            </a:endParaRPr>
+          </a:p>
+          <a:p>
+            <a:pPr marL="893763" indent="-355600">
+              <a:lnSpc>
+                <a:spcPct val="90000"/>
+              </a:lnSpc>
+              <a:buClr>
+                <a:srgbClr val="2E3640"/>
+              </a:buClr>
+              <a:buSzPct val="100000"/>
+              <a:buBlip>
+                <a:blip r:embed="rId3"/>
+              </a:buBlip>
+            </a:pPr>
+            <a:r>
+              <a:rPr lang="en-US" sz="2000" dirty="0" err="1" smtClean="0">
+                <a:sym typeface="Wingdings" panose="05000000000000000000" pitchFamily="2" charset="2"/>
+              </a:rPr>
+              <a:t>git</a:t>
+            </a:r>
+            <a:r>
+              <a:rPr lang="en-US" sz="2000" dirty="0" smtClean="0">
+                <a:sym typeface="Wingdings" panose="05000000000000000000" pitchFamily="2" charset="2"/>
+              </a:rPr>
+              <a:t> ignore</a:t>
+            </a:r>
+          </a:p>
+          <a:p>
+            <a:pPr marL="893763" indent="-355600">
+              <a:lnSpc>
+                <a:spcPct val="90000"/>
+              </a:lnSpc>
+              <a:buClr>
+                <a:srgbClr val="2E3640"/>
+              </a:buClr>
+              <a:buSzPct val="100000"/>
+              <a:buBlip>
+                <a:blip r:embed="rId3"/>
+              </a:buBlip>
+            </a:pPr>
+            <a:r>
+              <a:rPr lang="en-US" sz="2000" dirty="0" err="1" smtClean="0">
+                <a:sym typeface="Wingdings" panose="05000000000000000000" pitchFamily="2" charset="2"/>
+              </a:rPr>
+              <a:t>git</a:t>
+            </a:r>
+            <a:r>
+              <a:rPr lang="en-US" sz="2000" dirty="0" smtClean="0">
+                <a:sym typeface="Wingdings" panose="05000000000000000000" pitchFamily="2" charset="2"/>
+              </a:rPr>
+              <a:t> add</a:t>
+            </a:r>
+          </a:p>
+          <a:p>
+            <a:pPr marL="893763" indent="-355600">
+              <a:lnSpc>
+                <a:spcPct val="90000"/>
+              </a:lnSpc>
+              <a:buClr>
+                <a:srgbClr val="2E3640"/>
+              </a:buClr>
+              <a:buSzPct val="100000"/>
+              <a:buBlip>
+                <a:blip r:embed="rId3"/>
+              </a:buBlip>
+            </a:pPr>
+            <a:r>
+              <a:rPr lang="en-US" sz="2000" dirty="0" err="1" smtClean="0">
+                <a:sym typeface="Wingdings" panose="05000000000000000000" pitchFamily="2" charset="2"/>
+              </a:rPr>
+              <a:t>git</a:t>
+            </a:r>
+            <a:r>
+              <a:rPr lang="en-US" sz="2000" dirty="0" smtClean="0">
+                <a:sym typeface="Wingdings" panose="05000000000000000000" pitchFamily="2" charset="2"/>
+              </a:rPr>
+              <a:t> </a:t>
+            </a:r>
+            <a:r>
+              <a:rPr lang="en-US" sz="2000" dirty="0" err="1" smtClean="0">
+                <a:sym typeface="Wingdings" panose="05000000000000000000" pitchFamily="2" charset="2"/>
+              </a:rPr>
+              <a:t>rm</a:t>
+            </a:r>
+            <a:endParaRPr lang="en-US" sz="2000" dirty="0" smtClean="0">
+              <a:sym typeface="Wingdings" panose="05000000000000000000" pitchFamily="2" charset="2"/>
+            </a:endParaRPr>
+          </a:p>
+          <a:p>
+            <a:pPr marL="893763" indent="-355600">
+              <a:lnSpc>
+                <a:spcPct val="90000"/>
+              </a:lnSpc>
+              <a:buClr>
+                <a:srgbClr val="2E3640"/>
+              </a:buClr>
+              <a:buSzPct val="100000"/>
+              <a:buBlip>
+                <a:blip r:embed="rId3"/>
+              </a:buBlip>
+            </a:pPr>
+            <a:r>
+              <a:rPr lang="en-US" sz="2000" dirty="0" err="1" smtClean="0">
+                <a:sym typeface="Wingdings" panose="05000000000000000000" pitchFamily="2" charset="2"/>
+              </a:rPr>
+              <a:t>git</a:t>
+            </a:r>
+            <a:r>
+              <a:rPr lang="en-US" sz="2000" dirty="0">
+                <a:sym typeface="Wingdings" panose="05000000000000000000" pitchFamily="2" charset="2"/>
+              </a:rPr>
+              <a:t> commit [--</a:t>
+            </a:r>
+            <a:r>
+              <a:rPr lang="en-US" sz="2000" dirty="0" err="1" smtClean="0">
+                <a:sym typeface="Wingdings" panose="05000000000000000000" pitchFamily="2" charset="2"/>
+              </a:rPr>
+              <a:t>ammend</a:t>
+            </a:r>
+            <a:r>
+              <a:rPr lang="en-US" sz="2000" dirty="0">
+                <a:sym typeface="Wingdings" panose="05000000000000000000" pitchFamily="2" charset="2"/>
+              </a:rPr>
+              <a:t>]</a:t>
+            </a:r>
+            <a:endParaRPr lang="en-US" sz="2000" dirty="0" smtClean="0">
+              <a:sym typeface="Wingdings" panose="05000000000000000000" pitchFamily="2" charset="2"/>
+            </a:endParaRPr>
+          </a:p>
+          <a:p>
+            <a:pPr marL="893763" indent="-355600">
+              <a:lnSpc>
+                <a:spcPct val="90000"/>
+              </a:lnSpc>
+              <a:buClr>
+                <a:srgbClr val="2E3640"/>
+              </a:buClr>
+              <a:buSzPct val="100000"/>
+              <a:buBlip>
+                <a:blip r:embed="rId3"/>
+              </a:buBlip>
+            </a:pPr>
+            <a:r>
+              <a:rPr lang="en-US" sz="2000" dirty="0" err="1" smtClean="0">
+                <a:sym typeface="Wingdings" panose="05000000000000000000" pitchFamily="2" charset="2"/>
+              </a:rPr>
+              <a:t>git</a:t>
+            </a:r>
+            <a:r>
+              <a:rPr lang="en-US" sz="2000" dirty="0" smtClean="0">
+                <a:sym typeface="Wingdings" panose="05000000000000000000" pitchFamily="2" charset="2"/>
+              </a:rPr>
+              <a:t> merge [--no-</a:t>
+            </a:r>
+            <a:r>
+              <a:rPr lang="en-US" sz="2000" dirty="0" err="1" smtClean="0">
+                <a:sym typeface="Wingdings" panose="05000000000000000000" pitchFamily="2" charset="2"/>
+              </a:rPr>
+              <a:t>ff</a:t>
+            </a:r>
+            <a:r>
+              <a:rPr lang="en-US" sz="2000" dirty="0" smtClean="0">
+                <a:sym typeface="Wingdings" panose="05000000000000000000" pitchFamily="2" charset="2"/>
+              </a:rPr>
+              <a:t>] [--</a:t>
+            </a:r>
+            <a:r>
+              <a:rPr lang="en-US" sz="2000" dirty="0" err="1" smtClean="0">
+                <a:sym typeface="Wingdings" panose="05000000000000000000" pitchFamily="2" charset="2"/>
+              </a:rPr>
+              <a:t>ff</a:t>
+            </a:r>
+            <a:r>
+              <a:rPr lang="en-US" sz="2000" dirty="0" smtClean="0">
+                <a:sym typeface="Wingdings" panose="05000000000000000000" pitchFamily="2" charset="2"/>
+              </a:rPr>
+              <a:t>-only]</a:t>
+            </a:r>
+          </a:p>
+          <a:p>
+            <a:pPr marL="893763" indent="-355600">
+              <a:lnSpc>
+                <a:spcPct val="90000"/>
+              </a:lnSpc>
+              <a:buClr>
+                <a:srgbClr val="2E3640"/>
+              </a:buClr>
+              <a:buSzPct val="100000"/>
+              <a:buBlip>
+                <a:blip r:embed="rId3"/>
+              </a:buBlip>
+            </a:pPr>
+            <a:r>
+              <a:rPr lang="en-US" sz="2000" dirty="0" err="1" smtClean="0">
+                <a:sym typeface="Wingdings" panose="05000000000000000000" pitchFamily="2" charset="2"/>
+              </a:rPr>
+              <a:t>git</a:t>
+            </a:r>
+            <a:r>
+              <a:rPr lang="en-US" sz="2000" dirty="0" smtClean="0">
+                <a:sym typeface="Wingdings" panose="05000000000000000000" pitchFamily="2" charset="2"/>
+              </a:rPr>
+              <a:t> rebase [--interactive]</a:t>
+            </a:r>
+          </a:p>
+          <a:p>
+            <a:pPr marL="893763" indent="-355600">
+              <a:lnSpc>
+                <a:spcPct val="90000"/>
+              </a:lnSpc>
+              <a:buClr>
+                <a:srgbClr val="2E3640"/>
+              </a:buClr>
+              <a:buSzPct val="100000"/>
+              <a:buBlip>
+                <a:blip r:embed="rId3"/>
+              </a:buBlip>
+            </a:pPr>
+            <a:r>
+              <a:rPr lang="en-US" sz="2000" dirty="0" err="1" smtClean="0">
+                <a:sym typeface="Wingdings" panose="05000000000000000000" pitchFamily="2" charset="2"/>
+              </a:rPr>
+              <a:t>git</a:t>
+            </a:r>
+            <a:r>
+              <a:rPr lang="en-US" sz="2000" dirty="0" smtClean="0">
+                <a:sym typeface="Wingdings" panose="05000000000000000000" pitchFamily="2" charset="2"/>
+              </a:rPr>
+              <a:t> </a:t>
+            </a:r>
+            <a:r>
+              <a:rPr lang="en-US" sz="2000" dirty="0" err="1" smtClean="0">
+                <a:sym typeface="Wingdings" panose="05000000000000000000" pitchFamily="2" charset="2"/>
+              </a:rPr>
+              <a:t>reflog</a:t>
+            </a:r>
+            <a:endParaRPr lang="en-US" sz="2000" dirty="0" smtClean="0">
+              <a:sym typeface="Wingdings" panose="05000000000000000000" pitchFamily="2" charset="2"/>
+            </a:endParaRPr>
+          </a:p>
+          <a:p>
+            <a:pPr marL="893763" indent="-355600">
+              <a:lnSpc>
+                <a:spcPct val="90000"/>
+              </a:lnSpc>
+              <a:buClr>
+                <a:srgbClr val="2E3640"/>
+              </a:buClr>
+              <a:buSzPct val="100000"/>
+              <a:buBlip>
+                <a:blip r:embed="rId3"/>
+              </a:buBlip>
+            </a:pPr>
+            <a:r>
+              <a:rPr lang="en-US" sz="2000" dirty="0" err="1" smtClean="0">
+                <a:sym typeface="Wingdings" panose="05000000000000000000" pitchFamily="2" charset="2"/>
+              </a:rPr>
+              <a:t>git</a:t>
+            </a:r>
+            <a:r>
+              <a:rPr lang="en-US" sz="2000" dirty="0" smtClean="0">
+                <a:sym typeface="Wingdings" panose="05000000000000000000" pitchFamily="2" charset="2"/>
+              </a:rPr>
+              <a:t> fetch</a:t>
+            </a:r>
+          </a:p>
+          <a:p>
+            <a:pPr marL="893763" indent="-355600">
+              <a:lnSpc>
+                <a:spcPct val="90000"/>
+              </a:lnSpc>
+              <a:buClr>
+                <a:srgbClr val="2E3640"/>
+              </a:buClr>
+              <a:buSzPct val="100000"/>
+              <a:buBlip>
+                <a:blip r:embed="rId3"/>
+              </a:buBlip>
+            </a:pPr>
+            <a:r>
+              <a:rPr lang="en-US" sz="2000" dirty="0" err="1" smtClean="0">
+                <a:sym typeface="Wingdings" panose="05000000000000000000" pitchFamily="2" charset="2"/>
+              </a:rPr>
+              <a:t>git</a:t>
+            </a:r>
+            <a:r>
+              <a:rPr lang="en-US" sz="2000" dirty="0" smtClean="0">
+                <a:sym typeface="Wingdings" panose="05000000000000000000" pitchFamily="2" charset="2"/>
+              </a:rPr>
+              <a:t> pull [--rebase]</a:t>
+            </a:r>
+          </a:p>
+          <a:p>
+            <a:pPr marL="893763" indent="-355600">
+              <a:lnSpc>
+                <a:spcPct val="90000"/>
+              </a:lnSpc>
+              <a:buClr>
+                <a:srgbClr val="2E3640"/>
+              </a:buClr>
+              <a:buSzPct val="100000"/>
+              <a:buBlip>
+                <a:blip r:embed="rId3"/>
+              </a:buBlip>
+            </a:pPr>
+            <a:r>
+              <a:rPr lang="en-US" sz="2000" dirty="0" err="1" smtClean="0">
+                <a:sym typeface="Wingdings" panose="05000000000000000000" pitchFamily="2" charset="2"/>
+              </a:rPr>
+              <a:t>git</a:t>
+            </a:r>
+            <a:r>
+              <a:rPr lang="en-US" sz="2000" dirty="0" smtClean="0">
+                <a:sym typeface="Wingdings" panose="05000000000000000000" pitchFamily="2" charset="2"/>
+              </a:rPr>
+              <a:t> push</a:t>
+            </a:r>
+          </a:p>
+          <a:p>
+            <a:pPr marL="893763" indent="-355600">
+              <a:lnSpc>
+                <a:spcPct val="90000"/>
+              </a:lnSpc>
+              <a:buClr>
+                <a:srgbClr val="2E3640"/>
+              </a:buClr>
+              <a:buSzPct val="100000"/>
+              <a:buBlip>
+                <a:blip r:embed="rId3"/>
+              </a:buBlip>
+            </a:pPr>
+            <a:r>
+              <a:rPr lang="en-US" sz="2000" dirty="0" err="1" smtClean="0">
+                <a:sym typeface="Wingdings" panose="05000000000000000000" pitchFamily="2" charset="2"/>
+              </a:rPr>
+              <a:t>git</a:t>
+            </a:r>
+            <a:r>
+              <a:rPr lang="en-US" sz="2000" dirty="0" smtClean="0">
+                <a:sym typeface="Wingdings" panose="05000000000000000000" pitchFamily="2" charset="2"/>
+              </a:rPr>
+              <a:t> branch</a:t>
+            </a:r>
+          </a:p>
+          <a:p>
+            <a:pPr marL="893763" indent="-355600">
+              <a:lnSpc>
+                <a:spcPct val="90000"/>
+              </a:lnSpc>
+              <a:buClr>
+                <a:srgbClr val="2E3640"/>
+              </a:buClr>
+              <a:buSzPct val="100000"/>
+              <a:buBlip>
+                <a:blip r:embed="rId3"/>
+              </a:buBlip>
+            </a:pPr>
+            <a:r>
+              <a:rPr lang="en-US" sz="2000" dirty="0" err="1" smtClean="0">
+                <a:sym typeface="Wingdings" panose="05000000000000000000" pitchFamily="2" charset="2"/>
+              </a:rPr>
+              <a:t>git</a:t>
+            </a:r>
+            <a:r>
+              <a:rPr lang="en-US" sz="2000" dirty="0" smtClean="0">
+                <a:sym typeface="Wingdings" panose="05000000000000000000" pitchFamily="2" charset="2"/>
+              </a:rPr>
+              <a:t> </a:t>
+            </a:r>
+            <a:r>
+              <a:rPr lang="en-US" sz="2000" dirty="0" smtClean="0">
+                <a:sym typeface="Wingdings" panose="05000000000000000000" pitchFamily="2" charset="2"/>
+              </a:rPr>
+              <a:t>tag</a:t>
+            </a:r>
+            <a:endParaRPr lang="en-US" sz="2000" dirty="0" smtClean="0">
+              <a:sym typeface="Wingdings" panose="05000000000000000000" pitchFamily="2" charset="2"/>
+            </a:endParaRPr>
+          </a:p>
+        </p:txBody>
+      </p:sp>
+      <p:sp>
+        <p:nvSpPr>
+          <p:cNvPr id="97" name="Shape 97"/>
+          <p:cNvSpPr txBox="1">
+            <a:spLocks noGrp="1"/>
+          </p:cNvSpPr>
+          <p:nvPr>
+            <p:ph type="body" idx="2"/>
+          </p:nvPr>
+        </p:nvSpPr>
+        <p:spPr>
+          <a:xfrm>
+            <a:off x="341168" y="228026"/>
+            <a:ext cx="8498032" cy="457199"/>
+          </a:xfrm>
+          <a:prstGeom prst="rect">
+            <a:avLst/>
+          </a:prstGeom>
+          <a:noFill/>
+          <a:ln>
+            <a:noFill/>
+          </a:ln>
+        </p:spPr>
+        <p:txBody>
+          <a:bodyPr lIns="68569" tIns="34275" rIns="68569" bIns="34275" anchor="t" anchorCtr="0">
+            <a:noAutofit/>
+          </a:bodyPr>
+          <a:lstStyle/>
+          <a:p>
+            <a:pPr>
+              <a:buClr>
+                <a:schemeClr val="accent2"/>
+              </a:buClr>
+              <a:buSzPct val="25000"/>
+            </a:pPr>
+            <a:r>
+              <a:rPr lang="en-US" sz="3600" dirty="0" smtClean="0"/>
+              <a:t>Hands-on </a:t>
+            </a:r>
+            <a:r>
+              <a:rPr lang="en-US" sz="3600" dirty="0" err="1" smtClean="0"/>
+              <a:t>Workshow</a:t>
+            </a:r>
+            <a:endParaRPr lang="en-US" sz="3600" dirty="0"/>
+          </a:p>
+        </p:txBody>
+      </p:sp>
+    </p:spTree>
+    <p:extLst>
+      <p:ext uri="{BB962C8B-B14F-4D97-AF65-F5344CB8AC3E}">
+        <p14:creationId xmlns:p14="http://schemas.microsoft.com/office/powerpoint/2010/main" val="2935937953"/>
+      </p:ext>
+    </p:extLst>
+  </p:cSld>
+  <p:clrMapOvr>
+    <a:masterClrMapping/>
   </p:clrMapOvr>
   <p:transition spd="slow">
     <p:cut/>

</xml_diff>

<commit_message>
add slides explaining the merge of branches
</commit_message>
<xml_diff>
--- a/GIT Presentation.pptx
+++ b/GIT Presentation.pptx
@@ -6,7 +6,7 @@
     <p:sldMasterId id="2147483665" r:id="rId2"/>
   </p:sldMasterIdLst>
   <p:notesMasterIdLst>
-    <p:notesMasterId r:id="rId24"/>
+    <p:notesMasterId r:id="rId25"/>
   </p:notesMasterIdLst>
   <p:sldIdLst>
     <p:sldId id="257" r:id="rId3"/>
@@ -20,16 +20,17 @@
     <p:sldId id="276" r:id="rId11"/>
     <p:sldId id="277" r:id="rId12"/>
     <p:sldId id="268" r:id="rId13"/>
-    <p:sldId id="278" r:id="rId14"/>
-    <p:sldId id="279" r:id="rId15"/>
-    <p:sldId id="280" r:id="rId16"/>
-    <p:sldId id="281" r:id="rId17"/>
-    <p:sldId id="269" r:id="rId18"/>
-    <p:sldId id="270" r:id="rId19"/>
-    <p:sldId id="271" r:id="rId20"/>
-    <p:sldId id="272" r:id="rId21"/>
-    <p:sldId id="273" r:id="rId22"/>
-    <p:sldId id="275" r:id="rId23"/>
+    <p:sldId id="282" r:id="rId14"/>
+    <p:sldId id="278" r:id="rId15"/>
+    <p:sldId id="279" r:id="rId16"/>
+    <p:sldId id="280" r:id="rId17"/>
+    <p:sldId id="281" r:id="rId18"/>
+    <p:sldId id="269" r:id="rId19"/>
+    <p:sldId id="270" r:id="rId20"/>
+    <p:sldId id="271" r:id="rId21"/>
+    <p:sldId id="272" r:id="rId22"/>
+    <p:sldId id="273" r:id="rId23"/>
+    <p:sldId id="275" r:id="rId24"/>
   </p:sldIdLst>
   <p:sldSz cx="9144000" cy="6858000" type="screen4x3"/>
   <p:notesSz cx="6858000" cy="9144000"/>
@@ -775,6 +776,52 @@
               <a:buFontTx/>
               <a:buChar char="-"/>
             </a:pPr>
+            <a:r>
+              <a:rPr lang="en-US" dirty="0" smtClean="0"/>
+              <a:t>first a new commit is created (H) that contains all the changes</a:t>
+            </a:r>
+            <a:r>
+              <a:rPr lang="en-US" baseline="0" dirty="0" smtClean="0"/>
+              <a:t> that were previously only in master (the changes introduced by C, F, and G)</a:t>
+            </a:r>
+            <a:endParaRPr lang="en-US" dirty="0" smtClean="0"/>
+          </a:p>
+          <a:p>
+            <a:pPr marL="171450" indent="-171450">
+              <a:buFontTx/>
+              <a:buChar char="-"/>
+            </a:pPr>
+            <a:r>
+              <a:rPr lang="en-US" dirty="0" smtClean="0"/>
+              <a:t>notice</a:t>
+            </a:r>
+            <a:r>
+              <a:rPr lang="en-US" baseline="0" dirty="0" smtClean="0"/>
+              <a:t> that this commit has 2 parents – this is how GIT knows that H is a merge commit</a:t>
+            </a:r>
+          </a:p>
+          <a:p>
+            <a:pPr marL="171450" indent="-171450">
+              <a:buFontTx/>
+              <a:buChar char="-"/>
+            </a:pPr>
+            <a:r>
+              <a:rPr lang="en-US" baseline="0" dirty="0" smtClean="0"/>
+              <a:t>if there are no conflicts, GIT commits automatically, otherwise you need to solve conflicts and the commit yourself</a:t>
+            </a:r>
+          </a:p>
+          <a:p>
+            <a:pPr marL="171450" indent="-171450">
+              <a:buFontTx/>
+              <a:buChar char="-"/>
+            </a:pPr>
+            <a:endParaRPr lang="en-US" dirty="0" smtClean="0"/>
+          </a:p>
+          <a:p>
+            <a:pPr marL="171450" indent="-171450">
+              <a:buFontTx/>
+              <a:buChar char="-"/>
+            </a:pPr>
             <a:endParaRPr dirty="0"/>
           </a:p>
         </p:txBody>
@@ -879,6 +926,73 @@
               <a:buFontTx/>
               <a:buChar char="-"/>
             </a:pPr>
+            <a:r>
+              <a:rPr lang="en-US" dirty="0" smtClean="0"/>
+              <a:t>afte</a:t>
+            </a:r>
+            <a:r>
+              <a:rPr lang="en-US" baseline="0" dirty="0" smtClean="0"/>
+              <a:t>r the commit is created, my-branch is changed to point to the new commit</a:t>
+            </a:r>
+          </a:p>
+          <a:p>
+            <a:pPr marL="0" indent="0">
+              <a:buFontTx/>
+              <a:buNone/>
+            </a:pPr>
+            <a:endParaRPr lang="en-US" dirty="0" smtClean="0"/>
+          </a:p>
+          <a:p>
+            <a:pPr marL="0" indent="0">
+              <a:buFontTx/>
+              <a:buNone/>
+            </a:pPr>
+            <a:r>
+              <a:rPr lang="en-US" dirty="0" smtClean="0"/>
+              <a:t>O</a:t>
+            </a:r>
+            <a:r>
+              <a:rPr lang="en-US" baseline="0" dirty="0" smtClean="0"/>
+              <a:t>bservations:</a:t>
+            </a:r>
+          </a:p>
+          <a:p>
+            <a:pPr marL="0" indent="0">
+              <a:buFontTx/>
+              <a:buNone/>
+            </a:pPr>
+            <a:r>
+              <a:rPr lang="en-US" baseline="0" dirty="0" smtClean="0"/>
+              <a:t>- the commit H contains all the changes in commits C, F, and G, so if you try to understand the history without comparing with the master branch, you can be lost</a:t>
+            </a:r>
+          </a:p>
+          <a:p>
+            <a:pPr marL="0" indent="0">
+              <a:buFontTx/>
+              <a:buNone/>
+            </a:pPr>
+            <a:r>
+              <a:rPr lang="en-US" baseline="0" dirty="0" smtClean="0"/>
+              <a:t>- GIT can merge multiple branches at one time (not only 2), but I don’t recommend it since it can get quite difficult to solve conflicts or understand the history later</a:t>
+            </a:r>
+          </a:p>
+          <a:p>
+            <a:pPr marL="0" indent="0">
+              <a:buFontTx/>
+              <a:buNone/>
+            </a:pPr>
+            <a:r>
+              <a:rPr lang="en-US" dirty="0" smtClean="0"/>
+              <a:t>- just because you did not</a:t>
+            </a:r>
+            <a:r>
+              <a:rPr lang="en-US" baseline="0" dirty="0" smtClean="0"/>
+              <a:t> have a conflict it doesn’t mean the merge was successful. Imagine the following scenario: someone on branch A deletes a configuration property, while another developer on branch B creates a class that uses that property. Merging both A and B into master will be successful (no line conflicts), but the result is broken. So, always run the tests after merge. Also, this is one more reason not to merge multiple branches at one time (merge 2 branches multiple times: A into master, then </a:t>
+            </a:r>
+            <a:r>
+              <a:rPr lang="en-US" baseline="0" smtClean="0"/>
+              <a:t>B into master)</a:t>
+            </a:r>
             <a:endParaRPr dirty="0"/>
           </a:p>
         </p:txBody>
@@ -927,7 +1041,7 @@
     </p:spTree>
     <p:extLst>
       <p:ext uri="{BB962C8B-B14F-4D97-AF65-F5344CB8AC3E}">
-        <p14:creationId xmlns:p14="http://schemas.microsoft.com/office/powerpoint/2010/main" val="4173674627"/>
+        <p14:creationId xmlns:p14="http://schemas.microsoft.com/office/powerpoint/2010/main" val="4139308719"/>
       </p:ext>
     </p:extLst>
   </p:cSld>
@@ -1031,7 +1145,7 @@
     </p:spTree>
     <p:extLst>
       <p:ext uri="{BB962C8B-B14F-4D97-AF65-F5344CB8AC3E}">
-        <p14:creationId xmlns:p14="http://schemas.microsoft.com/office/powerpoint/2010/main" val="796577067"/>
+        <p14:creationId xmlns:p14="http://schemas.microsoft.com/office/powerpoint/2010/main" val="4173674627"/>
       </p:ext>
     </p:extLst>
   </p:cSld>
@@ -1135,7 +1249,7 @@
     </p:spTree>
     <p:extLst>
       <p:ext uri="{BB962C8B-B14F-4D97-AF65-F5344CB8AC3E}">
-        <p14:creationId xmlns:p14="http://schemas.microsoft.com/office/powerpoint/2010/main" val="2140635485"/>
+        <p14:creationId xmlns:p14="http://schemas.microsoft.com/office/powerpoint/2010/main" val="796577067"/>
       </p:ext>
     </p:extLst>
   </p:cSld>
@@ -1239,7 +1353,7 @@
     </p:spTree>
     <p:extLst>
       <p:ext uri="{BB962C8B-B14F-4D97-AF65-F5344CB8AC3E}">
-        <p14:creationId xmlns:p14="http://schemas.microsoft.com/office/powerpoint/2010/main" val="3219326357"/>
+        <p14:creationId xmlns:p14="http://schemas.microsoft.com/office/powerpoint/2010/main" val="2140635485"/>
       </p:ext>
     </p:extLst>
   </p:cSld>
@@ -1343,7 +1457,7 @@
     </p:spTree>
     <p:extLst>
       <p:ext uri="{BB962C8B-B14F-4D97-AF65-F5344CB8AC3E}">
-        <p14:creationId xmlns:p14="http://schemas.microsoft.com/office/powerpoint/2010/main" val="1650745352"/>
+        <p14:creationId xmlns:p14="http://schemas.microsoft.com/office/powerpoint/2010/main" val="3219326357"/>
       </p:ext>
     </p:extLst>
   </p:cSld>
@@ -1447,7 +1561,7 @@
     </p:spTree>
     <p:extLst>
       <p:ext uri="{BB962C8B-B14F-4D97-AF65-F5344CB8AC3E}">
-        <p14:creationId xmlns:p14="http://schemas.microsoft.com/office/powerpoint/2010/main" val="979907960"/>
+        <p14:creationId xmlns:p14="http://schemas.microsoft.com/office/powerpoint/2010/main" val="1650745352"/>
       </p:ext>
     </p:extLst>
   </p:cSld>
@@ -1551,7 +1665,7 @@
     </p:spTree>
     <p:extLst>
       <p:ext uri="{BB962C8B-B14F-4D97-AF65-F5344CB8AC3E}">
-        <p14:creationId xmlns:p14="http://schemas.microsoft.com/office/powerpoint/2010/main" val="2667286518"/>
+        <p14:creationId xmlns:p14="http://schemas.microsoft.com/office/powerpoint/2010/main" val="979907960"/>
       </p:ext>
     </p:extLst>
   </p:cSld>
@@ -1655,7 +1769,7 @@
     </p:spTree>
     <p:extLst>
       <p:ext uri="{BB962C8B-B14F-4D97-AF65-F5344CB8AC3E}">
-        <p14:creationId xmlns:p14="http://schemas.microsoft.com/office/powerpoint/2010/main" val="890929024"/>
+        <p14:creationId xmlns:p14="http://schemas.microsoft.com/office/powerpoint/2010/main" val="2667286518"/>
       </p:ext>
     </p:extLst>
   </p:cSld>
@@ -1811,46 +1925,6 @@
               <a:buFontTx/>
               <a:buChar char="-"/>
             </a:pPr>
-            <a:r>
-              <a:rPr lang="en-US" baseline="0" dirty="0" smtClean="0"/>
-              <a:t>install GIT</a:t>
-            </a:r>
-          </a:p>
-          <a:p>
-            <a:pPr marL="628650" lvl="1" indent="-171450">
-              <a:buFontTx/>
-              <a:buChar char="-"/>
-            </a:pPr>
-            <a:r>
-              <a:rPr lang="en-US" baseline="0" dirty="0" smtClean="0"/>
-              <a:t>Windows</a:t>
-            </a:r>
-          </a:p>
-          <a:p>
-            <a:pPr marL="628650" lvl="1" indent="-171450">
-              <a:buFontTx/>
-              <a:buChar char="-"/>
-            </a:pPr>
-            <a:r>
-              <a:rPr lang="en-US" baseline="0" dirty="0" smtClean="0"/>
-              <a:t>Mac</a:t>
-            </a:r>
-          </a:p>
-          <a:p>
-            <a:pPr marL="171450" lvl="0" indent="-171450">
-              <a:buFontTx/>
-              <a:buChar char="-"/>
-            </a:pPr>
-            <a:r>
-              <a:rPr lang="en-US" baseline="0" dirty="0" smtClean="0"/>
-              <a:t>setup username and email</a:t>
-            </a:r>
-          </a:p>
-          <a:p>
-            <a:pPr marL="171450" lvl="0" indent="-171450">
-              <a:buFontTx/>
-              <a:buChar char="-"/>
-            </a:pPr>
             <a:endParaRPr dirty="0"/>
           </a:p>
         </p:txBody>
@@ -1899,6 +1973,150 @@
     </p:spTree>
     <p:extLst>
       <p:ext uri="{BB962C8B-B14F-4D97-AF65-F5344CB8AC3E}">
+        <p14:creationId xmlns:p14="http://schemas.microsoft.com/office/powerpoint/2010/main" val="890929024"/>
+      </p:ext>
+    </p:extLst>
+  </p:cSld>
+  <p:clrMapOvr>
+    <a:masterClrMapping/>
+  </p:clrMapOvr>
+</p:notes>
+</file>
+
+<file path=ppt/notesSlides/notesSlide21.xml><?xml version="1.0" encoding="utf-8"?>
+<p:notes xmlns:a="http://schemas.openxmlformats.org/drawingml/2006/main" xmlns:r="http://schemas.openxmlformats.org/officeDocument/2006/relationships" xmlns:p="http://schemas.openxmlformats.org/presentationml/2006/main" showMasterSp="0" showMasterPhAnim="0">
+  <p:cSld>
+    <p:spTree>
+      <p:nvGrpSpPr>
+        <p:cNvPr id="1" name="Shape 98"/>
+        <p:cNvGrpSpPr/>
+        <p:nvPr/>
+      </p:nvGrpSpPr>
+      <p:grpSpPr>
+        <a:xfrm>
+          <a:off x="0" y="0"/>
+          <a:ext cx="0" cy="0"/>
+          <a:chOff x="0" y="0"/>
+          <a:chExt cx="0" cy="0"/>
+        </a:xfrm>
+      </p:grpSpPr>
+      <p:sp>
+        <p:nvSpPr>
+          <p:cNvPr id="99" name="Shape 99"/>
+          <p:cNvSpPr txBox="1">
+            <a:spLocks noGrp="1"/>
+          </p:cNvSpPr>
+          <p:nvPr>
+            <p:ph type="body" idx="1"/>
+          </p:nvPr>
+        </p:nvSpPr>
+        <p:spPr>
+          <a:xfrm>
+            <a:off x="685800" y="4343400"/>
+            <a:ext cx="5486399" cy="4114800"/>
+          </a:xfrm>
+          <a:prstGeom prst="rect">
+            <a:avLst/>
+          </a:prstGeom>
+        </p:spPr>
+        <p:txBody>
+          <a:bodyPr lIns="91425" tIns="91425" rIns="91425" bIns="91425" anchor="ctr" anchorCtr="0">
+            <a:noAutofit/>
+          </a:bodyPr>
+          <a:lstStyle/>
+          <a:p>
+            <a:pPr marL="171450" indent="-171450">
+              <a:buFontTx/>
+              <a:buChar char="-"/>
+            </a:pPr>
+            <a:r>
+              <a:rPr lang="en-US" baseline="0" dirty="0" smtClean="0"/>
+              <a:t>install GIT</a:t>
+            </a:r>
+          </a:p>
+          <a:p>
+            <a:pPr marL="628650" lvl="1" indent="-171450">
+              <a:buFontTx/>
+              <a:buChar char="-"/>
+            </a:pPr>
+            <a:r>
+              <a:rPr lang="en-US" baseline="0" dirty="0" smtClean="0"/>
+              <a:t>Windows</a:t>
+            </a:r>
+          </a:p>
+          <a:p>
+            <a:pPr marL="628650" lvl="1" indent="-171450">
+              <a:buFontTx/>
+              <a:buChar char="-"/>
+            </a:pPr>
+            <a:r>
+              <a:rPr lang="en-US" baseline="0" dirty="0" smtClean="0"/>
+              <a:t>Mac</a:t>
+            </a:r>
+          </a:p>
+          <a:p>
+            <a:pPr marL="171450" lvl="0" indent="-171450">
+              <a:buFontTx/>
+              <a:buChar char="-"/>
+            </a:pPr>
+            <a:r>
+              <a:rPr lang="en-US" baseline="0" dirty="0" smtClean="0"/>
+              <a:t>setup username and email</a:t>
+            </a:r>
+          </a:p>
+          <a:p>
+            <a:pPr marL="171450" lvl="0" indent="-171450">
+              <a:buFontTx/>
+              <a:buChar char="-"/>
+            </a:pPr>
+            <a:endParaRPr dirty="0"/>
+          </a:p>
+        </p:txBody>
+      </p:sp>
+      <p:sp>
+        <p:nvSpPr>
+          <p:cNvPr id="100" name="Shape 100"/>
+          <p:cNvSpPr>
+            <a:spLocks noGrp="1" noRot="1" noChangeAspect="1"/>
+          </p:cNvSpPr>
+          <p:nvPr>
+            <p:ph type="sldImg" idx="2"/>
+          </p:nvPr>
+        </p:nvSpPr>
+        <p:spPr>
+          <a:xfrm>
+            <a:off x="1143000" y="685800"/>
+            <a:ext cx="4572000" cy="3429000"/>
+          </a:xfrm>
+          <a:custGeom>
+            <a:avLst/>
+            <a:gdLst/>
+            <a:ahLst/>
+            <a:cxnLst/>
+            <a:rect l="0" t="0" r="0" b="0"/>
+            <a:pathLst>
+              <a:path w="120000" h="120000" extrusionOk="0">
+                <a:moveTo>
+                  <a:pt x="0" y="0"/>
+                </a:moveTo>
+                <a:lnTo>
+                  <a:pt x="120000" y="0"/>
+                </a:lnTo>
+                <a:lnTo>
+                  <a:pt x="120000" y="120000"/>
+                </a:lnTo>
+                <a:lnTo>
+                  <a:pt x="0" y="120000"/>
+                </a:lnTo>
+                <a:close/>
+              </a:path>
+            </a:pathLst>
+          </a:custGeom>
+        </p:spPr>
+      </p:sp>
+    </p:spTree>
+    <p:extLst>
+      <p:ext uri="{BB962C8B-B14F-4D97-AF65-F5344CB8AC3E}">
         <p14:creationId xmlns:p14="http://schemas.microsoft.com/office/powerpoint/2010/main" val="2666093823"/>
       </p:ext>
     </p:extLst>
@@ -1909,7 +2127,7 @@
 </p:notes>
 </file>
 
-<file path=ppt/notesSlides/notesSlide21.xml><?xml version="1.0" encoding="utf-8"?>
+<file path=ppt/notesSlides/notesSlide22.xml><?xml version="1.0" encoding="utf-8"?>
 <p:notes xmlns:a="http://schemas.openxmlformats.org/drawingml/2006/main" xmlns:r="http://schemas.openxmlformats.org/officeDocument/2006/relationships" xmlns:p="http://schemas.openxmlformats.org/presentationml/2006/main" showMasterSp="0" showMasterPhAnim="0">
   <p:cSld>
     <p:spTree>
@@ -8217,18 +8435,18 @@
       </p:sp>
       <p:sp>
         <p:nvSpPr>
-          <p:cNvPr id="96" name="Shape 96"/>
+          <p:cNvPr id="97" name="Shape 97"/>
           <p:cNvSpPr txBox="1">
             <a:spLocks noGrp="1"/>
           </p:cNvSpPr>
           <p:nvPr>
-            <p:ph type="body" idx="1"/>
-          </p:nvPr>
-        </p:nvSpPr>
-        <p:spPr>
-          <a:xfrm>
-            <a:off x="341167" y="937873"/>
-            <a:ext cx="8498033" cy="5024690"/>
+            <p:ph type="body" idx="2"/>
+          </p:nvPr>
+        </p:nvSpPr>
+        <p:spPr>
+          <a:xfrm>
+            <a:off x="341168" y="228026"/>
+            <a:ext cx="8498032" cy="457199"/>
           </a:xfrm>
           <a:prstGeom prst="rect">
             <a:avLst/>
@@ -8244,83 +8462,6 @@
           </a:bodyPr>
           <a:lstStyle/>
           <a:p>
-            <a:pPr marL="355600" indent="-355600">
-              <a:lnSpc>
-                <a:spcPct val="90000"/>
-              </a:lnSpc>
-              <a:buClr>
-                <a:srgbClr val="2E3640"/>
-              </a:buClr>
-              <a:buSzPct val="100000"/>
-              <a:buBlip>
-                <a:blip r:embed="rId3"/>
-              </a:buBlip>
-            </a:pPr>
-            <a:r>
-              <a:rPr lang="en-US" sz="2400" dirty="0" smtClean="0"/>
-              <a:t>stuff</a:t>
-            </a:r>
-            <a:endParaRPr lang="en-US" sz="2400" dirty="0" smtClean="0">
-              <a:sym typeface="Wingdings" panose="05000000000000000000" pitchFamily="2" charset="2"/>
-            </a:endParaRPr>
-          </a:p>
-          <a:p>
-            <a:pPr>
-              <a:lnSpc>
-                <a:spcPct val="90000"/>
-              </a:lnSpc>
-              <a:buClr>
-                <a:srgbClr val="2E3640"/>
-              </a:buClr>
-              <a:buSzPct val="100000"/>
-            </a:pPr>
-            <a:endParaRPr lang="en-US" sz="2400" dirty="0">
-              <a:sym typeface="Wingdings" panose="05000000000000000000" pitchFamily="2" charset="2"/>
-            </a:endParaRPr>
-          </a:p>
-          <a:p>
-            <a:pPr>
-              <a:lnSpc>
-                <a:spcPct val="90000"/>
-              </a:lnSpc>
-              <a:buClr>
-                <a:srgbClr val="2E3640"/>
-              </a:buClr>
-              <a:buSzPct val="100000"/>
-            </a:pPr>
-            <a:endParaRPr lang="en-US" sz="2400" dirty="0" smtClean="0"/>
-          </a:p>
-        </p:txBody>
-      </p:sp>
-      <p:sp>
-        <p:nvSpPr>
-          <p:cNvPr id="97" name="Shape 97"/>
-          <p:cNvSpPr txBox="1">
-            <a:spLocks noGrp="1"/>
-          </p:cNvSpPr>
-          <p:nvPr>
-            <p:ph type="body" idx="2"/>
-          </p:nvPr>
-        </p:nvSpPr>
-        <p:spPr>
-          <a:xfrm>
-            <a:off x="341168" y="228026"/>
-            <a:ext cx="8498032" cy="457199"/>
-          </a:xfrm>
-          <a:prstGeom prst="rect">
-            <a:avLst/>
-          </a:prstGeom>
-          <a:noFill/>
-          <a:ln>
-            <a:noFill/>
-          </a:ln>
-        </p:spPr>
-        <p:txBody>
-          <a:bodyPr lIns="68569" tIns="34275" rIns="68569" bIns="34275" anchor="t" anchorCtr="0">
-            <a:noAutofit/>
-          </a:bodyPr>
-          <a:lstStyle/>
-          <a:p>
             <a:pPr>
               <a:buClr>
                 <a:schemeClr val="accent2"/>
@@ -8328,13 +8469,47 @@
               <a:buSzPct val="25000"/>
             </a:pPr>
             <a:r>
+              <a:rPr lang="en-US" sz="3600" dirty="0"/>
+              <a:t>GIT </a:t>
+            </a:r>
+            <a:r>
               <a:rPr lang="en-US" sz="3600" dirty="0" smtClean="0"/>
-              <a:t>Title</a:t>
+              <a:t>merge master into my-branch /1 of 2</a:t>
             </a:r>
             <a:endParaRPr lang="en-US" sz="3600" dirty="0"/>
           </a:p>
         </p:txBody>
       </p:sp>
+      <p:pic>
+        <p:nvPicPr>
+          <p:cNvPr id="3" name="Picture 2"/>
+          <p:cNvPicPr>
+            <a:picLocks noChangeAspect="1"/>
+          </p:cNvPicPr>
+          <p:nvPr/>
+        </p:nvPicPr>
+        <p:blipFill>
+          <a:blip r:embed="rId3">
+            <a:extLst>
+              <a:ext uri="{28A0092B-C50C-407E-A947-70E740481C1C}">
+                <a14:useLocalDpi xmlns:a14="http://schemas.microsoft.com/office/drawing/2010/main" val="0"/>
+              </a:ext>
+            </a:extLst>
+          </a:blip>
+          <a:stretch>
+            <a:fillRect/>
+          </a:stretch>
+        </p:blipFill>
+        <p:spPr>
+          <a:xfrm>
+            <a:off x="1233487" y="1609725"/>
+            <a:ext cx="6677025" cy="3638550"/>
+          </a:xfrm>
+          <a:prstGeom prst="rect">
+            <a:avLst/>
+          </a:prstGeom>
+        </p:spPr>
+      </p:pic>
     </p:spTree>
     <p:extLst>
       <p:ext uri="{BB962C8B-B14F-4D97-AF65-F5344CB8AC3E}">
@@ -8416,18 +8591,18 @@
       </p:sp>
       <p:sp>
         <p:nvSpPr>
-          <p:cNvPr id="96" name="Shape 96"/>
+          <p:cNvPr id="97" name="Shape 97"/>
           <p:cNvSpPr txBox="1">
             <a:spLocks noGrp="1"/>
           </p:cNvSpPr>
           <p:nvPr>
-            <p:ph type="body" idx="1"/>
-          </p:nvPr>
-        </p:nvSpPr>
-        <p:spPr>
-          <a:xfrm>
-            <a:off x="341167" y="937873"/>
-            <a:ext cx="8498033" cy="5024690"/>
+            <p:ph type="body" idx="2"/>
+          </p:nvPr>
+        </p:nvSpPr>
+        <p:spPr>
+          <a:xfrm>
+            <a:off x="341168" y="228026"/>
+            <a:ext cx="8498032" cy="457199"/>
           </a:xfrm>
           <a:prstGeom prst="rect">
             <a:avLst/>
@@ -8443,83 +8618,6 @@
           </a:bodyPr>
           <a:lstStyle/>
           <a:p>
-            <a:pPr marL="355600" indent="-355600">
-              <a:lnSpc>
-                <a:spcPct val="90000"/>
-              </a:lnSpc>
-              <a:buClr>
-                <a:srgbClr val="2E3640"/>
-              </a:buClr>
-              <a:buSzPct val="100000"/>
-              <a:buBlip>
-                <a:blip r:embed="rId3"/>
-              </a:buBlip>
-            </a:pPr>
-            <a:r>
-              <a:rPr lang="en-US" sz="2400" dirty="0" smtClean="0"/>
-              <a:t>stuff</a:t>
-            </a:r>
-            <a:endParaRPr lang="en-US" sz="2400" dirty="0" smtClean="0">
-              <a:sym typeface="Wingdings" panose="05000000000000000000" pitchFamily="2" charset="2"/>
-            </a:endParaRPr>
-          </a:p>
-          <a:p>
-            <a:pPr>
-              <a:lnSpc>
-                <a:spcPct val="90000"/>
-              </a:lnSpc>
-              <a:buClr>
-                <a:srgbClr val="2E3640"/>
-              </a:buClr>
-              <a:buSzPct val="100000"/>
-            </a:pPr>
-            <a:endParaRPr lang="en-US" sz="2400" dirty="0">
-              <a:sym typeface="Wingdings" panose="05000000000000000000" pitchFamily="2" charset="2"/>
-            </a:endParaRPr>
-          </a:p>
-          <a:p>
-            <a:pPr>
-              <a:lnSpc>
-                <a:spcPct val="90000"/>
-              </a:lnSpc>
-              <a:buClr>
-                <a:srgbClr val="2E3640"/>
-              </a:buClr>
-              <a:buSzPct val="100000"/>
-            </a:pPr>
-            <a:endParaRPr lang="en-US" sz="2400" dirty="0" smtClean="0"/>
-          </a:p>
-        </p:txBody>
-      </p:sp>
-      <p:sp>
-        <p:nvSpPr>
-          <p:cNvPr id="97" name="Shape 97"/>
-          <p:cNvSpPr txBox="1">
-            <a:spLocks noGrp="1"/>
-          </p:cNvSpPr>
-          <p:nvPr>
-            <p:ph type="body" idx="2"/>
-          </p:nvPr>
-        </p:nvSpPr>
-        <p:spPr>
-          <a:xfrm>
-            <a:off x="341168" y="228026"/>
-            <a:ext cx="8498032" cy="457199"/>
-          </a:xfrm>
-          <a:prstGeom prst="rect">
-            <a:avLst/>
-          </a:prstGeom>
-          <a:noFill/>
-          <a:ln>
-            <a:noFill/>
-          </a:ln>
-        </p:spPr>
-        <p:txBody>
-          <a:bodyPr lIns="68569" tIns="34275" rIns="68569" bIns="34275" anchor="t" anchorCtr="0">
-            <a:noAutofit/>
-          </a:bodyPr>
-          <a:lstStyle/>
-          <a:p>
             <a:pPr>
               <a:buClr>
                 <a:schemeClr val="accent2"/>
@@ -8527,17 +8625,51 @@
               <a:buSzPct val="25000"/>
             </a:pPr>
             <a:r>
+              <a:rPr lang="en-US" sz="3600" dirty="0"/>
+              <a:t>GIT </a:t>
+            </a:r>
+            <a:r>
               <a:rPr lang="en-US" sz="3600" dirty="0" smtClean="0"/>
-              <a:t>Title</a:t>
+              <a:t>merge master into my-branch /2 of 2</a:t>
             </a:r>
             <a:endParaRPr lang="en-US" sz="3600" dirty="0"/>
           </a:p>
         </p:txBody>
       </p:sp>
+      <p:pic>
+        <p:nvPicPr>
+          <p:cNvPr id="2" name="Picture 1"/>
+          <p:cNvPicPr>
+            <a:picLocks noChangeAspect="1"/>
+          </p:cNvPicPr>
+          <p:nvPr/>
+        </p:nvPicPr>
+        <p:blipFill>
+          <a:blip r:embed="rId3">
+            <a:extLst>
+              <a:ext uri="{28A0092B-C50C-407E-A947-70E740481C1C}">
+                <a14:useLocalDpi xmlns:a14="http://schemas.microsoft.com/office/drawing/2010/main" val="0"/>
+              </a:ext>
+            </a:extLst>
+          </a:blip>
+          <a:stretch>
+            <a:fillRect/>
+          </a:stretch>
+        </p:blipFill>
+        <p:spPr>
+          <a:xfrm>
+            <a:off x="1119187" y="1595437"/>
+            <a:ext cx="6905625" cy="3667125"/>
+          </a:xfrm>
+          <a:prstGeom prst="rect">
+            <a:avLst/>
+          </a:prstGeom>
+        </p:spPr>
+      </p:pic>
     </p:spTree>
     <p:extLst>
       <p:ext uri="{BB962C8B-B14F-4D97-AF65-F5344CB8AC3E}">
-        <p14:creationId xmlns:p14="http://schemas.microsoft.com/office/powerpoint/2010/main" val="2519039036"/>
+        <p14:creationId xmlns:p14="http://schemas.microsoft.com/office/powerpoint/2010/main" val="876445211"/>
       </p:ext>
     </p:extLst>
   </p:cSld>
@@ -8736,7 +8868,7 @@
     </p:spTree>
     <p:extLst>
       <p:ext uri="{BB962C8B-B14F-4D97-AF65-F5344CB8AC3E}">
-        <p14:creationId xmlns:p14="http://schemas.microsoft.com/office/powerpoint/2010/main" val="396525421"/>
+        <p14:creationId xmlns:p14="http://schemas.microsoft.com/office/powerpoint/2010/main" val="2519039036"/>
       </p:ext>
     </p:extLst>
   </p:cSld>
@@ -8935,7 +9067,7 @@
     </p:spTree>
     <p:extLst>
       <p:ext uri="{BB962C8B-B14F-4D97-AF65-F5344CB8AC3E}">
-        <p14:creationId xmlns:p14="http://schemas.microsoft.com/office/powerpoint/2010/main" val="695698909"/>
+        <p14:creationId xmlns:p14="http://schemas.microsoft.com/office/powerpoint/2010/main" val="396525421"/>
       </p:ext>
     </p:extLst>
   </p:cSld>
@@ -9134,7 +9266,7 @@
     </p:spTree>
     <p:extLst>
       <p:ext uri="{BB962C8B-B14F-4D97-AF65-F5344CB8AC3E}">
-        <p14:creationId xmlns:p14="http://schemas.microsoft.com/office/powerpoint/2010/main" val="2915095849"/>
+        <p14:creationId xmlns:p14="http://schemas.microsoft.com/office/powerpoint/2010/main" val="695698909"/>
       </p:ext>
     </p:extLst>
   </p:cSld>
@@ -9333,7 +9465,7 @@
     </p:spTree>
     <p:extLst>
       <p:ext uri="{BB962C8B-B14F-4D97-AF65-F5344CB8AC3E}">
-        <p14:creationId xmlns:p14="http://schemas.microsoft.com/office/powerpoint/2010/main" val="893865620"/>
+        <p14:creationId xmlns:p14="http://schemas.microsoft.com/office/powerpoint/2010/main" val="2915095849"/>
       </p:ext>
     </p:extLst>
   </p:cSld>
@@ -9532,7 +9664,7 @@
     </p:spTree>
     <p:extLst>
       <p:ext uri="{BB962C8B-B14F-4D97-AF65-F5344CB8AC3E}">
-        <p14:creationId xmlns:p14="http://schemas.microsoft.com/office/powerpoint/2010/main" val="2176611703"/>
+        <p14:creationId xmlns:p14="http://schemas.microsoft.com/office/powerpoint/2010/main" val="893865620"/>
       </p:ext>
     </p:extLst>
   </p:cSld>
@@ -9731,7 +9863,7 @@
     </p:spTree>
     <p:extLst>
       <p:ext uri="{BB962C8B-B14F-4D97-AF65-F5344CB8AC3E}">
-        <p14:creationId xmlns:p14="http://schemas.microsoft.com/office/powerpoint/2010/main" val="2978980850"/>
+        <p14:creationId xmlns:p14="http://schemas.microsoft.com/office/powerpoint/2010/main" val="2176611703"/>
       </p:ext>
     </p:extLst>
   </p:cSld>
@@ -9930,7 +10062,7 @@
     </p:spTree>
     <p:extLst>
       <p:ext uri="{BB962C8B-B14F-4D97-AF65-F5344CB8AC3E}">
-        <p14:creationId xmlns:p14="http://schemas.microsoft.com/office/powerpoint/2010/main" val="2675765428"/>
+        <p14:creationId xmlns:p14="http://schemas.microsoft.com/office/powerpoint/2010/main" val="2978980850"/>
       </p:ext>
     </p:extLst>
   </p:cSld>
@@ -10330,7 +10462,7 @@
             </a:pPr>
             <a:r>
               <a:rPr lang="en-US" sz="2400" dirty="0" smtClean="0"/>
-              <a:t>Time to get the hands dirty</a:t>
+              <a:t>stuff</a:t>
             </a:r>
             <a:endParaRPr lang="en-US" sz="2400" dirty="0" smtClean="0">
               <a:sym typeface="Wingdings" panose="05000000000000000000" pitchFamily="2" charset="2"/>
@@ -10401,50 +10533,16 @@
             </a:pPr>
             <a:r>
               <a:rPr lang="en-US" sz="3600" dirty="0" smtClean="0"/>
-              <a:t>Hands-on </a:t>
-            </a:r>
-            <a:r>
-              <a:rPr lang="en-US" sz="3600" dirty="0" err="1" smtClean="0"/>
-              <a:t>Workshow</a:t>
+              <a:t>Title</a:t>
             </a:r>
             <a:endParaRPr lang="en-US" sz="3600" dirty="0"/>
           </a:p>
         </p:txBody>
       </p:sp>
-      <p:pic>
-        <p:nvPicPr>
-          <p:cNvPr id="2" name="Picture 1"/>
-          <p:cNvPicPr>
-            <a:picLocks noChangeAspect="1"/>
-          </p:cNvPicPr>
-          <p:nvPr/>
-        </p:nvPicPr>
-        <p:blipFill>
-          <a:blip r:embed="rId4" cstate="print">
-            <a:extLst>
-              <a:ext uri="{28A0092B-C50C-407E-A947-70E740481C1C}">
-                <a14:useLocalDpi xmlns:a14="http://schemas.microsoft.com/office/drawing/2010/main" val="0"/>
-              </a:ext>
-            </a:extLst>
-          </a:blip>
-          <a:stretch>
-            <a:fillRect/>
-          </a:stretch>
-        </p:blipFill>
-        <p:spPr>
-          <a:xfrm>
-            <a:off x="1744403" y="1514354"/>
-            <a:ext cx="5529699" cy="4479801"/>
-          </a:xfrm>
-          <a:prstGeom prst="rect">
-            <a:avLst/>
-          </a:prstGeom>
-        </p:spPr>
-      </p:pic>
     </p:spTree>
     <p:extLst>
       <p:ext uri="{BB962C8B-B14F-4D97-AF65-F5344CB8AC3E}">
-        <p14:creationId xmlns:p14="http://schemas.microsoft.com/office/powerpoint/2010/main" val="2075129891"/>
+        <p14:creationId xmlns:p14="http://schemas.microsoft.com/office/powerpoint/2010/main" val="2675765428"/>
       </p:ext>
     </p:extLst>
   </p:cSld>
@@ -10562,10 +10660,225 @@
               </a:buBlip>
             </a:pPr>
             <a:r>
-              <a:rPr lang="en-US" sz="2000" dirty="0" smtClean="0"/>
-              <a:t>install GIT</a:t>
-            </a:r>
-          </a:p>
+              <a:rPr lang="en-US" sz="2400" dirty="0" smtClean="0"/>
+              <a:t>Time to get the hands dirty</a:t>
+            </a:r>
+            <a:endParaRPr lang="en-US" sz="2400" dirty="0" smtClean="0">
+              <a:sym typeface="Wingdings" panose="05000000000000000000" pitchFamily="2" charset="2"/>
+            </a:endParaRPr>
+          </a:p>
+          <a:p>
+            <a:pPr>
+              <a:lnSpc>
+                <a:spcPct val="90000"/>
+              </a:lnSpc>
+              <a:buClr>
+                <a:srgbClr val="2E3640"/>
+              </a:buClr>
+              <a:buSzPct val="100000"/>
+            </a:pPr>
+            <a:endParaRPr lang="en-US" sz="2400" dirty="0">
+              <a:sym typeface="Wingdings" panose="05000000000000000000" pitchFamily="2" charset="2"/>
+            </a:endParaRPr>
+          </a:p>
+          <a:p>
+            <a:pPr>
+              <a:lnSpc>
+                <a:spcPct val="90000"/>
+              </a:lnSpc>
+              <a:buClr>
+                <a:srgbClr val="2E3640"/>
+              </a:buClr>
+              <a:buSzPct val="100000"/>
+            </a:pPr>
+            <a:endParaRPr lang="en-US" sz="2400" dirty="0" smtClean="0"/>
+          </a:p>
+        </p:txBody>
+      </p:sp>
+      <p:sp>
+        <p:nvSpPr>
+          <p:cNvPr id="97" name="Shape 97"/>
+          <p:cNvSpPr txBox="1">
+            <a:spLocks noGrp="1"/>
+          </p:cNvSpPr>
+          <p:nvPr>
+            <p:ph type="body" idx="2"/>
+          </p:nvPr>
+        </p:nvSpPr>
+        <p:spPr>
+          <a:xfrm>
+            <a:off x="341168" y="228026"/>
+            <a:ext cx="8498032" cy="457199"/>
+          </a:xfrm>
+          <a:prstGeom prst="rect">
+            <a:avLst/>
+          </a:prstGeom>
+          <a:noFill/>
+          <a:ln>
+            <a:noFill/>
+          </a:ln>
+        </p:spPr>
+        <p:txBody>
+          <a:bodyPr lIns="68569" tIns="34275" rIns="68569" bIns="34275" anchor="t" anchorCtr="0">
+            <a:noAutofit/>
+          </a:bodyPr>
+          <a:lstStyle/>
+          <a:p>
+            <a:pPr>
+              <a:buClr>
+                <a:schemeClr val="accent2"/>
+              </a:buClr>
+              <a:buSzPct val="25000"/>
+            </a:pPr>
+            <a:r>
+              <a:rPr lang="en-US" sz="3600" dirty="0" smtClean="0"/>
+              <a:t>Hands-on </a:t>
+            </a:r>
+            <a:r>
+              <a:rPr lang="en-US" sz="3600" dirty="0" err="1" smtClean="0"/>
+              <a:t>Workshow</a:t>
+            </a:r>
+            <a:endParaRPr lang="en-US" sz="3600" dirty="0"/>
+          </a:p>
+        </p:txBody>
+      </p:sp>
+      <p:pic>
+        <p:nvPicPr>
+          <p:cNvPr id="2" name="Picture 1"/>
+          <p:cNvPicPr>
+            <a:picLocks noChangeAspect="1"/>
+          </p:cNvPicPr>
+          <p:nvPr/>
+        </p:nvPicPr>
+        <p:blipFill>
+          <a:blip r:embed="rId4" cstate="print">
+            <a:extLst>
+              <a:ext uri="{28A0092B-C50C-407E-A947-70E740481C1C}">
+                <a14:useLocalDpi xmlns:a14="http://schemas.microsoft.com/office/drawing/2010/main" val="0"/>
+              </a:ext>
+            </a:extLst>
+          </a:blip>
+          <a:stretch>
+            <a:fillRect/>
+          </a:stretch>
+        </p:blipFill>
+        <p:spPr>
+          <a:xfrm>
+            <a:off x="1744403" y="1514354"/>
+            <a:ext cx="5529699" cy="4479801"/>
+          </a:xfrm>
+          <a:prstGeom prst="rect">
+            <a:avLst/>
+          </a:prstGeom>
+        </p:spPr>
+      </p:pic>
+    </p:spTree>
+    <p:extLst>
+      <p:ext uri="{BB962C8B-B14F-4D97-AF65-F5344CB8AC3E}">
+        <p14:creationId xmlns:p14="http://schemas.microsoft.com/office/powerpoint/2010/main" val="2075129891"/>
+      </p:ext>
+    </p:extLst>
+  </p:cSld>
+  <p:clrMapOvr>
+    <a:masterClrMapping/>
+  </p:clrMapOvr>
+  <p:transition spd="slow">
+    <p:cut/>
+  </p:transition>
+  <p:timing>
+    <p:tnLst>
+      <p:par>
+        <p:cTn id="1" dur="indefinite" restart="never" nodeType="tmRoot"/>
+      </p:par>
+    </p:tnLst>
+  </p:timing>
+</p:sld>
+</file>
+
+<file path=ppt/slides/slide22.xml><?xml version="1.0" encoding="utf-8"?>
+<p:sld xmlns:a="http://schemas.openxmlformats.org/drawingml/2006/main" xmlns:r="http://schemas.openxmlformats.org/officeDocument/2006/relationships" xmlns:p="http://schemas.openxmlformats.org/presentationml/2006/main">
+  <p:cSld>
+    <p:spTree>
+      <p:nvGrpSpPr>
+        <p:cNvPr id="1" name="Shape 93"/>
+        <p:cNvGrpSpPr/>
+        <p:nvPr/>
+      </p:nvGrpSpPr>
+      <p:grpSpPr>
+        <a:xfrm>
+          <a:off x="0" y="0"/>
+          <a:ext cx="0" cy="0"/>
+          <a:chOff x="0" y="0"/>
+          <a:chExt cx="0" cy="0"/>
+        </a:xfrm>
+      </p:grpSpPr>
+      <p:sp>
+        <p:nvSpPr>
+          <p:cNvPr id="95" name="Shape 95"/>
+          <p:cNvSpPr txBox="1">
+            <a:spLocks noGrp="1"/>
+          </p:cNvSpPr>
+          <p:nvPr>
+            <p:ph type="sldNum" idx="12"/>
+          </p:nvPr>
+        </p:nvSpPr>
+        <p:spPr>
+          <a:xfrm>
+            <a:off x="7600950" y="5688719"/>
+            <a:ext cx="269142" cy="273844"/>
+          </a:xfrm>
+          <a:prstGeom prst="rect">
+            <a:avLst/>
+          </a:prstGeom>
+          <a:noFill/>
+          <a:ln>
+            <a:noFill/>
+          </a:ln>
+        </p:spPr>
+        <p:txBody>
+          <a:bodyPr lIns="68569" tIns="34275" rIns="68569" bIns="34275" anchor="ctr" anchorCtr="0">
+            <a:noAutofit/>
+          </a:bodyPr>
+          <a:lstStyle/>
+          <a:p>
+            <a:pPr>
+              <a:buSzPct val="25000"/>
+            </a:pPr>
+            <a:r>
+              <a:rPr lang="en-US"/>
+              <a:t> </a:t>
+            </a:r>
+          </a:p>
+        </p:txBody>
+      </p:sp>
+      <p:sp>
+        <p:nvSpPr>
+          <p:cNvPr id="96" name="Shape 96"/>
+          <p:cNvSpPr txBox="1">
+            <a:spLocks noGrp="1"/>
+          </p:cNvSpPr>
+          <p:nvPr>
+            <p:ph type="body" idx="1"/>
+          </p:nvPr>
+        </p:nvSpPr>
+        <p:spPr>
+          <a:xfrm>
+            <a:off x="341167" y="937873"/>
+            <a:ext cx="8498033" cy="5024690"/>
+          </a:xfrm>
+          <a:prstGeom prst="rect">
+            <a:avLst/>
+          </a:prstGeom>
+          <a:noFill/>
+          <a:ln>
+            <a:noFill/>
+          </a:ln>
+        </p:spPr>
+        <p:txBody>
+          <a:bodyPr lIns="68569" tIns="34275" rIns="68569" bIns="34275" anchor="t" anchorCtr="0">
+            <a:noAutofit/>
+          </a:bodyPr>
+          <a:lstStyle/>
           <a:p>
             <a:pPr marL="355600" indent="-355600">
               <a:lnSpc>
@@ -10580,10 +10893,8 @@
               </a:buBlip>
             </a:pPr>
             <a:r>
-              <a:rPr lang="en-US" sz="2000" dirty="0" smtClean="0">
-                <a:sym typeface="Wingdings" panose="05000000000000000000" pitchFamily="2" charset="2"/>
-              </a:rPr>
-              <a:t>setup username, password, editor</a:t>
+              <a:rPr lang="en-US" sz="2000" dirty="0" smtClean="0"/>
+              <a:t>install GIT</a:t>
             </a:r>
           </a:p>
           <a:p>
@@ -10603,6 +10914,26 @@
               <a:rPr lang="en-US" sz="2000" dirty="0" smtClean="0">
                 <a:sym typeface="Wingdings" panose="05000000000000000000" pitchFamily="2" charset="2"/>
               </a:rPr>
+              <a:t>setup username, password, editor</a:t>
+            </a:r>
+          </a:p>
+          <a:p>
+            <a:pPr marL="355600" indent="-355600">
+              <a:lnSpc>
+                <a:spcPct val="90000"/>
+              </a:lnSpc>
+              <a:buClr>
+                <a:srgbClr val="2E3640"/>
+              </a:buClr>
+              <a:buSzPct val="100000"/>
+              <a:buBlip>
+                <a:blip r:embed="rId3"/>
+              </a:buBlip>
+            </a:pPr>
+            <a:r>
+              <a:rPr lang="en-US" sz="2000" dirty="0" smtClean="0">
+                <a:sym typeface="Wingdings" panose="05000000000000000000" pitchFamily="2" charset="2"/>
+              </a:rPr>
               <a:t>commands</a:t>
             </a:r>
           </a:p>
@@ -10629,7 +10960,7 @@
               <a:rPr lang="en-US" sz="2000" dirty="0" smtClean="0">
                 <a:sym typeface="Wingdings" panose="05000000000000000000" pitchFamily="2" charset="2"/>
               </a:rPr>
-              <a:t> help [command]</a:t>
+              <a:t> help [command] (plus Google)</a:t>
             </a:r>
           </a:p>
           <a:p>
@@ -10868,8 +11199,43 @@
               <a:rPr lang="en-US" sz="2000" dirty="0" smtClean="0">
                 <a:sym typeface="Wingdings" panose="05000000000000000000" pitchFamily="2" charset="2"/>
               </a:rPr>
-              <a:t> rebase [--interactive]</a:t>
-            </a:r>
+              <a:t> rebase [--interactive</a:t>
+            </a:r>
+            <a:r>
+              <a:rPr lang="en-US" sz="2000" dirty="0" smtClean="0">
+                <a:sym typeface="Wingdings" panose="05000000000000000000" pitchFamily="2" charset="2"/>
+              </a:rPr>
+              <a:t>]</a:t>
+            </a:r>
+          </a:p>
+          <a:p>
+            <a:pPr marL="893763" indent="-355600">
+              <a:lnSpc>
+                <a:spcPct val="90000"/>
+              </a:lnSpc>
+              <a:buClr>
+                <a:srgbClr val="2E3640"/>
+              </a:buClr>
+              <a:buSzPct val="100000"/>
+              <a:buBlip>
+                <a:blip r:embed="rId3"/>
+              </a:buBlip>
+            </a:pPr>
+            <a:r>
+              <a:rPr lang="en-US" sz="2000" dirty="0" err="1" smtClean="0">
+                <a:sym typeface="Wingdings" panose="05000000000000000000" pitchFamily="2" charset="2"/>
+              </a:rPr>
+              <a:t>git</a:t>
+            </a:r>
+            <a:r>
+              <a:rPr lang="en-US" sz="2000" dirty="0" smtClean="0">
+                <a:sym typeface="Wingdings" panose="05000000000000000000" pitchFamily="2" charset="2"/>
+              </a:rPr>
+              <a:t> cherry-pick</a:t>
+            </a:r>
+            <a:endParaRPr lang="en-US" sz="2000" dirty="0" smtClean="0">
+              <a:sym typeface="Wingdings" panose="05000000000000000000" pitchFamily="2" charset="2"/>
+            </a:endParaRPr>
           </a:p>
           <a:p>
             <a:pPr marL="893763" indent="-355600">

</xml_diff>

<commit_message>
add slides explaining the difference between fast-forward and non-fast-forward merges
</commit_message>
<xml_diff>
--- a/GIT Presentation.pptx
+++ b/GIT Presentation.pptx
@@ -6,7 +6,7 @@
     <p:sldMasterId id="2147483665" r:id="rId2"/>
   </p:sldMasterIdLst>
   <p:notesMasterIdLst>
-    <p:notesMasterId r:id="rId25"/>
+    <p:notesMasterId r:id="rId28"/>
   </p:notesMasterIdLst>
   <p:sldIdLst>
     <p:sldId id="257" r:id="rId3"/>
@@ -21,16 +21,19 @@
     <p:sldId id="277" r:id="rId12"/>
     <p:sldId id="268" r:id="rId13"/>
     <p:sldId id="282" r:id="rId14"/>
-    <p:sldId id="278" r:id="rId15"/>
-    <p:sldId id="279" r:id="rId16"/>
-    <p:sldId id="280" r:id="rId17"/>
-    <p:sldId id="281" r:id="rId18"/>
-    <p:sldId id="269" r:id="rId19"/>
-    <p:sldId id="270" r:id="rId20"/>
-    <p:sldId id="271" r:id="rId21"/>
-    <p:sldId id="272" r:id="rId22"/>
-    <p:sldId id="273" r:id="rId23"/>
-    <p:sldId id="275" r:id="rId24"/>
+    <p:sldId id="283" r:id="rId15"/>
+    <p:sldId id="285" r:id="rId16"/>
+    <p:sldId id="284" r:id="rId17"/>
+    <p:sldId id="278" r:id="rId18"/>
+    <p:sldId id="279" r:id="rId19"/>
+    <p:sldId id="280" r:id="rId20"/>
+    <p:sldId id="281" r:id="rId21"/>
+    <p:sldId id="269" r:id="rId22"/>
+    <p:sldId id="270" r:id="rId23"/>
+    <p:sldId id="271" r:id="rId24"/>
+    <p:sldId id="272" r:id="rId25"/>
+    <p:sldId id="273" r:id="rId26"/>
+    <p:sldId id="275" r:id="rId27"/>
   </p:sldIdLst>
   <p:sldSz cx="9144000" cy="6858000" type="screen4x3"/>
   <p:notesSz cx="6858000" cy="9144000"/>
@@ -987,11 +990,7 @@
             </a:r>
             <a:r>
               <a:rPr lang="en-US" baseline="0" dirty="0" smtClean="0"/>
-              <a:t> have a conflict it doesn’t mean the merge was successful. Imagine the following scenario: someone on branch A deletes a configuration property, while another developer on branch B creates a class that uses that property. Merging both A and B into master will be successful (no line conflicts), but the result is broken. So, always run the tests after merge. Also, this is one more reason not to merge multiple branches at one time (merge 2 branches multiple times: A into master, then </a:t>
-            </a:r>
-            <a:r>
-              <a:rPr lang="en-US" baseline="0" smtClean="0"/>
-              <a:t>B into master)</a:t>
+              <a:t> have a conflict it doesn’t mean the merge was successful. Imagine the following scenario: someone on branch A deletes a configuration property, while another developer on branch B creates a class that uses that property. Merging both A and B into master will be successful (no line conflicts), but the result is broken. So, always run the tests after merge. Also, this is one more reason not to merge multiple branches at one time (merge 2 branches multiple times: A into master, then B into master)</a:t>
             </a:r>
             <a:endParaRPr dirty="0"/>
           </a:p>
@@ -1145,7 +1144,7 @@
     </p:spTree>
     <p:extLst>
       <p:ext uri="{BB962C8B-B14F-4D97-AF65-F5344CB8AC3E}">
-        <p14:creationId xmlns:p14="http://schemas.microsoft.com/office/powerpoint/2010/main" val="4173674627"/>
+        <p14:creationId xmlns:p14="http://schemas.microsoft.com/office/powerpoint/2010/main" val="3985505281"/>
       </p:ext>
     </p:extLst>
   </p:cSld>
@@ -1201,6 +1200,24 @@
               <a:buFontTx/>
               <a:buChar char="-"/>
             </a:pPr>
+            <a:r>
+              <a:rPr lang="en-US" dirty="0" smtClean="0"/>
+              <a:t>special kind of merge, if the branches have not diverged</a:t>
+            </a:r>
+          </a:p>
+          <a:p>
+            <a:pPr marL="171450" indent="-171450">
+              <a:buFontTx/>
+              <a:buChar char="-"/>
+            </a:pPr>
+            <a:r>
+              <a:rPr lang="en-US" dirty="0" smtClean="0"/>
+              <a:t>no</a:t>
+            </a:r>
+            <a:r>
+              <a:rPr lang="en-US" baseline="0" dirty="0" smtClean="0"/>
+              <a:t> new commit is created, only the branch label is changed to point to a different commit</a:t>
+            </a:r>
             <a:endParaRPr dirty="0"/>
           </a:p>
         </p:txBody>
@@ -1249,7 +1266,7 @@
     </p:spTree>
     <p:extLst>
       <p:ext uri="{BB962C8B-B14F-4D97-AF65-F5344CB8AC3E}">
-        <p14:creationId xmlns:p14="http://schemas.microsoft.com/office/powerpoint/2010/main" val="796577067"/>
+        <p14:creationId xmlns:p14="http://schemas.microsoft.com/office/powerpoint/2010/main" val="1136595489"/>
       </p:ext>
     </p:extLst>
   </p:cSld>
@@ -1305,7 +1322,23 @@
               <a:buFontTx/>
               <a:buChar char="-"/>
             </a:pPr>
-            <a:endParaRPr dirty="0"/>
+            <a:r>
+              <a:rPr lang="en-US" dirty="0" smtClean="0"/>
+              <a:t>the problem</a:t>
+            </a:r>
+            <a:r>
+              <a:rPr lang="en-US" baseline="0" dirty="0" smtClean="0"/>
+              <a:t> with a fast-forward merge is after you do it, you can no longer tell from the history that F and G were developed on a separate branch. If you care about this, you can force GIT to create a commit using a command line argument (“--no-</a:t>
+            </a:r>
+            <a:r>
+              <a:rPr lang="en-US" baseline="0" dirty="0" err="1" smtClean="0"/>
+              <a:t>ff</a:t>
+            </a:r>
+            <a:r>
+              <a:rPr lang="en-US" baseline="0" smtClean="0"/>
+              <a:t>”)</a:t>
+            </a:r>
+            <a:endParaRPr lang="en-US" baseline="0" dirty="0" smtClean="0"/>
           </a:p>
         </p:txBody>
       </p:sp>
@@ -1353,7 +1386,7 @@
     </p:spTree>
     <p:extLst>
       <p:ext uri="{BB962C8B-B14F-4D97-AF65-F5344CB8AC3E}">
-        <p14:creationId xmlns:p14="http://schemas.microsoft.com/office/powerpoint/2010/main" val="2140635485"/>
+        <p14:creationId xmlns:p14="http://schemas.microsoft.com/office/powerpoint/2010/main" val="1736329018"/>
       </p:ext>
     </p:extLst>
   </p:cSld>
@@ -1457,7 +1490,7 @@
     </p:spTree>
     <p:extLst>
       <p:ext uri="{BB962C8B-B14F-4D97-AF65-F5344CB8AC3E}">
-        <p14:creationId xmlns:p14="http://schemas.microsoft.com/office/powerpoint/2010/main" val="3219326357"/>
+        <p14:creationId xmlns:p14="http://schemas.microsoft.com/office/powerpoint/2010/main" val="4173674627"/>
       </p:ext>
     </p:extLst>
   </p:cSld>
@@ -1561,7 +1594,7 @@
     </p:spTree>
     <p:extLst>
       <p:ext uri="{BB962C8B-B14F-4D97-AF65-F5344CB8AC3E}">
-        <p14:creationId xmlns:p14="http://schemas.microsoft.com/office/powerpoint/2010/main" val="1650745352"/>
+        <p14:creationId xmlns:p14="http://schemas.microsoft.com/office/powerpoint/2010/main" val="796577067"/>
       </p:ext>
     </p:extLst>
   </p:cSld>
@@ -1665,7 +1698,7 @@
     </p:spTree>
     <p:extLst>
       <p:ext uri="{BB962C8B-B14F-4D97-AF65-F5344CB8AC3E}">
-        <p14:creationId xmlns:p14="http://schemas.microsoft.com/office/powerpoint/2010/main" val="979907960"/>
+        <p14:creationId xmlns:p14="http://schemas.microsoft.com/office/powerpoint/2010/main" val="2140635485"/>
       </p:ext>
     </p:extLst>
   </p:cSld>
@@ -1769,7 +1802,7 @@
     </p:spTree>
     <p:extLst>
       <p:ext uri="{BB962C8B-B14F-4D97-AF65-F5344CB8AC3E}">
-        <p14:creationId xmlns:p14="http://schemas.microsoft.com/office/powerpoint/2010/main" val="2667286518"/>
+        <p14:creationId xmlns:p14="http://schemas.microsoft.com/office/powerpoint/2010/main" val="3219326357"/>
       </p:ext>
     </p:extLst>
   </p:cSld>
@@ -1973,7 +2006,7 @@
     </p:spTree>
     <p:extLst>
       <p:ext uri="{BB962C8B-B14F-4D97-AF65-F5344CB8AC3E}">
-        <p14:creationId xmlns:p14="http://schemas.microsoft.com/office/powerpoint/2010/main" val="890929024"/>
+        <p14:creationId xmlns:p14="http://schemas.microsoft.com/office/powerpoint/2010/main" val="1650745352"/>
       </p:ext>
     </p:extLst>
   </p:cSld>
@@ -2029,46 +2062,6 @@
               <a:buFontTx/>
               <a:buChar char="-"/>
             </a:pPr>
-            <a:r>
-              <a:rPr lang="en-US" baseline="0" dirty="0" smtClean="0"/>
-              <a:t>install GIT</a:t>
-            </a:r>
-          </a:p>
-          <a:p>
-            <a:pPr marL="628650" lvl="1" indent="-171450">
-              <a:buFontTx/>
-              <a:buChar char="-"/>
-            </a:pPr>
-            <a:r>
-              <a:rPr lang="en-US" baseline="0" dirty="0" smtClean="0"/>
-              <a:t>Windows</a:t>
-            </a:r>
-          </a:p>
-          <a:p>
-            <a:pPr marL="628650" lvl="1" indent="-171450">
-              <a:buFontTx/>
-              <a:buChar char="-"/>
-            </a:pPr>
-            <a:r>
-              <a:rPr lang="en-US" baseline="0" dirty="0" smtClean="0"/>
-              <a:t>Mac</a:t>
-            </a:r>
-          </a:p>
-          <a:p>
-            <a:pPr marL="171450" lvl="0" indent="-171450">
-              <a:buFontTx/>
-              <a:buChar char="-"/>
-            </a:pPr>
-            <a:r>
-              <a:rPr lang="en-US" baseline="0" dirty="0" smtClean="0"/>
-              <a:t>setup username and email</a:t>
-            </a:r>
-          </a:p>
-          <a:p>
-            <a:pPr marL="171450" lvl="0" indent="-171450">
-              <a:buFontTx/>
-              <a:buChar char="-"/>
-            </a:pPr>
             <a:endParaRPr dirty="0"/>
           </a:p>
         </p:txBody>
@@ -2117,6 +2110,358 @@
     </p:spTree>
     <p:extLst>
       <p:ext uri="{BB962C8B-B14F-4D97-AF65-F5344CB8AC3E}">
+        <p14:creationId xmlns:p14="http://schemas.microsoft.com/office/powerpoint/2010/main" val="979907960"/>
+      </p:ext>
+    </p:extLst>
+  </p:cSld>
+  <p:clrMapOvr>
+    <a:masterClrMapping/>
+  </p:clrMapOvr>
+</p:notes>
+</file>
+
+<file path=ppt/notesSlides/notesSlide22.xml><?xml version="1.0" encoding="utf-8"?>
+<p:notes xmlns:a="http://schemas.openxmlformats.org/drawingml/2006/main" xmlns:r="http://schemas.openxmlformats.org/officeDocument/2006/relationships" xmlns:p="http://schemas.openxmlformats.org/presentationml/2006/main" showMasterSp="0" showMasterPhAnim="0">
+  <p:cSld>
+    <p:spTree>
+      <p:nvGrpSpPr>
+        <p:cNvPr id="1" name="Shape 98"/>
+        <p:cNvGrpSpPr/>
+        <p:nvPr/>
+      </p:nvGrpSpPr>
+      <p:grpSpPr>
+        <a:xfrm>
+          <a:off x="0" y="0"/>
+          <a:ext cx="0" cy="0"/>
+          <a:chOff x="0" y="0"/>
+          <a:chExt cx="0" cy="0"/>
+        </a:xfrm>
+      </p:grpSpPr>
+      <p:sp>
+        <p:nvSpPr>
+          <p:cNvPr id="99" name="Shape 99"/>
+          <p:cNvSpPr txBox="1">
+            <a:spLocks noGrp="1"/>
+          </p:cNvSpPr>
+          <p:nvPr>
+            <p:ph type="body" idx="1"/>
+          </p:nvPr>
+        </p:nvSpPr>
+        <p:spPr>
+          <a:xfrm>
+            <a:off x="685800" y="4343400"/>
+            <a:ext cx="5486399" cy="4114800"/>
+          </a:xfrm>
+          <a:prstGeom prst="rect">
+            <a:avLst/>
+          </a:prstGeom>
+        </p:spPr>
+        <p:txBody>
+          <a:bodyPr lIns="91425" tIns="91425" rIns="91425" bIns="91425" anchor="ctr" anchorCtr="0">
+            <a:noAutofit/>
+          </a:bodyPr>
+          <a:lstStyle/>
+          <a:p>
+            <a:pPr marL="171450" indent="-171450">
+              <a:buFontTx/>
+              <a:buChar char="-"/>
+            </a:pPr>
+            <a:endParaRPr dirty="0"/>
+          </a:p>
+        </p:txBody>
+      </p:sp>
+      <p:sp>
+        <p:nvSpPr>
+          <p:cNvPr id="100" name="Shape 100"/>
+          <p:cNvSpPr>
+            <a:spLocks noGrp="1" noRot="1" noChangeAspect="1"/>
+          </p:cNvSpPr>
+          <p:nvPr>
+            <p:ph type="sldImg" idx="2"/>
+          </p:nvPr>
+        </p:nvSpPr>
+        <p:spPr>
+          <a:xfrm>
+            <a:off x="1143000" y="685800"/>
+            <a:ext cx="4572000" cy="3429000"/>
+          </a:xfrm>
+          <a:custGeom>
+            <a:avLst/>
+            <a:gdLst/>
+            <a:ahLst/>
+            <a:cxnLst/>
+            <a:rect l="0" t="0" r="0" b="0"/>
+            <a:pathLst>
+              <a:path w="120000" h="120000" extrusionOk="0">
+                <a:moveTo>
+                  <a:pt x="0" y="0"/>
+                </a:moveTo>
+                <a:lnTo>
+                  <a:pt x="120000" y="0"/>
+                </a:lnTo>
+                <a:lnTo>
+                  <a:pt x="120000" y="120000"/>
+                </a:lnTo>
+                <a:lnTo>
+                  <a:pt x="0" y="120000"/>
+                </a:lnTo>
+                <a:close/>
+              </a:path>
+            </a:pathLst>
+          </a:custGeom>
+        </p:spPr>
+      </p:sp>
+    </p:spTree>
+    <p:extLst>
+      <p:ext uri="{BB962C8B-B14F-4D97-AF65-F5344CB8AC3E}">
+        <p14:creationId xmlns:p14="http://schemas.microsoft.com/office/powerpoint/2010/main" val="2667286518"/>
+      </p:ext>
+    </p:extLst>
+  </p:cSld>
+  <p:clrMapOvr>
+    <a:masterClrMapping/>
+  </p:clrMapOvr>
+</p:notes>
+</file>
+
+<file path=ppt/notesSlides/notesSlide23.xml><?xml version="1.0" encoding="utf-8"?>
+<p:notes xmlns:a="http://schemas.openxmlformats.org/drawingml/2006/main" xmlns:r="http://schemas.openxmlformats.org/officeDocument/2006/relationships" xmlns:p="http://schemas.openxmlformats.org/presentationml/2006/main" showMasterSp="0" showMasterPhAnim="0">
+  <p:cSld>
+    <p:spTree>
+      <p:nvGrpSpPr>
+        <p:cNvPr id="1" name="Shape 98"/>
+        <p:cNvGrpSpPr/>
+        <p:nvPr/>
+      </p:nvGrpSpPr>
+      <p:grpSpPr>
+        <a:xfrm>
+          <a:off x="0" y="0"/>
+          <a:ext cx="0" cy="0"/>
+          <a:chOff x="0" y="0"/>
+          <a:chExt cx="0" cy="0"/>
+        </a:xfrm>
+      </p:grpSpPr>
+      <p:sp>
+        <p:nvSpPr>
+          <p:cNvPr id="99" name="Shape 99"/>
+          <p:cNvSpPr txBox="1">
+            <a:spLocks noGrp="1"/>
+          </p:cNvSpPr>
+          <p:nvPr>
+            <p:ph type="body" idx="1"/>
+          </p:nvPr>
+        </p:nvSpPr>
+        <p:spPr>
+          <a:xfrm>
+            <a:off x="685800" y="4343400"/>
+            <a:ext cx="5486399" cy="4114800"/>
+          </a:xfrm>
+          <a:prstGeom prst="rect">
+            <a:avLst/>
+          </a:prstGeom>
+        </p:spPr>
+        <p:txBody>
+          <a:bodyPr lIns="91425" tIns="91425" rIns="91425" bIns="91425" anchor="ctr" anchorCtr="0">
+            <a:noAutofit/>
+          </a:bodyPr>
+          <a:lstStyle/>
+          <a:p>
+            <a:pPr marL="171450" indent="-171450">
+              <a:buFontTx/>
+              <a:buChar char="-"/>
+            </a:pPr>
+            <a:endParaRPr dirty="0"/>
+          </a:p>
+        </p:txBody>
+      </p:sp>
+      <p:sp>
+        <p:nvSpPr>
+          <p:cNvPr id="100" name="Shape 100"/>
+          <p:cNvSpPr>
+            <a:spLocks noGrp="1" noRot="1" noChangeAspect="1"/>
+          </p:cNvSpPr>
+          <p:nvPr>
+            <p:ph type="sldImg" idx="2"/>
+          </p:nvPr>
+        </p:nvSpPr>
+        <p:spPr>
+          <a:xfrm>
+            <a:off x="1143000" y="685800"/>
+            <a:ext cx="4572000" cy="3429000"/>
+          </a:xfrm>
+          <a:custGeom>
+            <a:avLst/>
+            <a:gdLst/>
+            <a:ahLst/>
+            <a:cxnLst/>
+            <a:rect l="0" t="0" r="0" b="0"/>
+            <a:pathLst>
+              <a:path w="120000" h="120000" extrusionOk="0">
+                <a:moveTo>
+                  <a:pt x="0" y="0"/>
+                </a:moveTo>
+                <a:lnTo>
+                  <a:pt x="120000" y="0"/>
+                </a:lnTo>
+                <a:lnTo>
+                  <a:pt x="120000" y="120000"/>
+                </a:lnTo>
+                <a:lnTo>
+                  <a:pt x="0" y="120000"/>
+                </a:lnTo>
+                <a:close/>
+              </a:path>
+            </a:pathLst>
+          </a:custGeom>
+        </p:spPr>
+      </p:sp>
+    </p:spTree>
+    <p:extLst>
+      <p:ext uri="{BB962C8B-B14F-4D97-AF65-F5344CB8AC3E}">
+        <p14:creationId xmlns:p14="http://schemas.microsoft.com/office/powerpoint/2010/main" val="890929024"/>
+      </p:ext>
+    </p:extLst>
+  </p:cSld>
+  <p:clrMapOvr>
+    <a:masterClrMapping/>
+  </p:clrMapOvr>
+</p:notes>
+</file>
+
+<file path=ppt/notesSlides/notesSlide24.xml><?xml version="1.0" encoding="utf-8"?>
+<p:notes xmlns:a="http://schemas.openxmlformats.org/drawingml/2006/main" xmlns:r="http://schemas.openxmlformats.org/officeDocument/2006/relationships" xmlns:p="http://schemas.openxmlformats.org/presentationml/2006/main" showMasterSp="0" showMasterPhAnim="0">
+  <p:cSld>
+    <p:spTree>
+      <p:nvGrpSpPr>
+        <p:cNvPr id="1" name="Shape 98"/>
+        <p:cNvGrpSpPr/>
+        <p:nvPr/>
+      </p:nvGrpSpPr>
+      <p:grpSpPr>
+        <a:xfrm>
+          <a:off x="0" y="0"/>
+          <a:ext cx="0" cy="0"/>
+          <a:chOff x="0" y="0"/>
+          <a:chExt cx="0" cy="0"/>
+        </a:xfrm>
+      </p:grpSpPr>
+      <p:sp>
+        <p:nvSpPr>
+          <p:cNvPr id="99" name="Shape 99"/>
+          <p:cNvSpPr txBox="1">
+            <a:spLocks noGrp="1"/>
+          </p:cNvSpPr>
+          <p:nvPr>
+            <p:ph type="body" idx="1"/>
+          </p:nvPr>
+        </p:nvSpPr>
+        <p:spPr>
+          <a:xfrm>
+            <a:off x="685800" y="4343400"/>
+            <a:ext cx="5486399" cy="4114800"/>
+          </a:xfrm>
+          <a:prstGeom prst="rect">
+            <a:avLst/>
+          </a:prstGeom>
+        </p:spPr>
+        <p:txBody>
+          <a:bodyPr lIns="91425" tIns="91425" rIns="91425" bIns="91425" anchor="ctr" anchorCtr="0">
+            <a:noAutofit/>
+          </a:bodyPr>
+          <a:lstStyle/>
+          <a:p>
+            <a:pPr marL="171450" indent="-171450">
+              <a:buFontTx/>
+              <a:buChar char="-"/>
+            </a:pPr>
+            <a:r>
+              <a:rPr lang="en-US" baseline="0" dirty="0" smtClean="0"/>
+              <a:t>install GIT</a:t>
+            </a:r>
+          </a:p>
+          <a:p>
+            <a:pPr marL="628650" lvl="1" indent="-171450">
+              <a:buFontTx/>
+              <a:buChar char="-"/>
+            </a:pPr>
+            <a:r>
+              <a:rPr lang="en-US" baseline="0" dirty="0" smtClean="0"/>
+              <a:t>Windows</a:t>
+            </a:r>
+          </a:p>
+          <a:p>
+            <a:pPr marL="628650" lvl="1" indent="-171450">
+              <a:buFontTx/>
+              <a:buChar char="-"/>
+            </a:pPr>
+            <a:r>
+              <a:rPr lang="en-US" baseline="0" dirty="0" smtClean="0"/>
+              <a:t>Mac</a:t>
+            </a:r>
+          </a:p>
+          <a:p>
+            <a:pPr marL="171450" lvl="0" indent="-171450">
+              <a:buFontTx/>
+              <a:buChar char="-"/>
+            </a:pPr>
+            <a:r>
+              <a:rPr lang="en-US" baseline="0" dirty="0" smtClean="0"/>
+              <a:t>setup username and email</a:t>
+            </a:r>
+          </a:p>
+          <a:p>
+            <a:pPr marL="171450" lvl="0" indent="-171450">
+              <a:buFontTx/>
+              <a:buChar char="-"/>
+            </a:pPr>
+            <a:endParaRPr dirty="0"/>
+          </a:p>
+        </p:txBody>
+      </p:sp>
+      <p:sp>
+        <p:nvSpPr>
+          <p:cNvPr id="100" name="Shape 100"/>
+          <p:cNvSpPr>
+            <a:spLocks noGrp="1" noRot="1" noChangeAspect="1"/>
+          </p:cNvSpPr>
+          <p:nvPr>
+            <p:ph type="sldImg" idx="2"/>
+          </p:nvPr>
+        </p:nvSpPr>
+        <p:spPr>
+          <a:xfrm>
+            <a:off x="1143000" y="685800"/>
+            <a:ext cx="4572000" cy="3429000"/>
+          </a:xfrm>
+          <a:custGeom>
+            <a:avLst/>
+            <a:gdLst/>
+            <a:ahLst/>
+            <a:cxnLst/>
+            <a:rect l="0" t="0" r="0" b="0"/>
+            <a:pathLst>
+              <a:path w="120000" h="120000" extrusionOk="0">
+                <a:moveTo>
+                  <a:pt x="0" y="0"/>
+                </a:moveTo>
+                <a:lnTo>
+                  <a:pt x="120000" y="0"/>
+                </a:lnTo>
+                <a:lnTo>
+                  <a:pt x="120000" y="120000"/>
+                </a:lnTo>
+                <a:lnTo>
+                  <a:pt x="0" y="120000"/>
+                </a:lnTo>
+                <a:close/>
+              </a:path>
+            </a:pathLst>
+          </a:custGeom>
+        </p:spPr>
+      </p:sp>
+    </p:spTree>
+    <p:extLst>
+      <p:ext uri="{BB962C8B-B14F-4D97-AF65-F5344CB8AC3E}">
         <p14:creationId xmlns:p14="http://schemas.microsoft.com/office/powerpoint/2010/main" val="2666093823"/>
       </p:ext>
     </p:extLst>
@@ -2127,7 +2472,7 @@
 </p:notes>
 </file>
 
-<file path=ppt/notesSlides/notesSlide22.xml><?xml version="1.0" encoding="utf-8"?>
+<file path=ppt/notesSlides/notesSlide25.xml><?xml version="1.0" encoding="utf-8"?>
 <p:notes xmlns:a="http://schemas.openxmlformats.org/drawingml/2006/main" xmlns:r="http://schemas.openxmlformats.org/officeDocument/2006/relationships" xmlns:p="http://schemas.openxmlformats.org/presentationml/2006/main" showMasterSp="0" showMasterPhAnim="0">
   <p:cSld>
     <p:spTree>
@@ -8747,18 +9092,18 @@
       </p:sp>
       <p:sp>
         <p:nvSpPr>
-          <p:cNvPr id="96" name="Shape 96"/>
+          <p:cNvPr id="97" name="Shape 97"/>
           <p:cNvSpPr txBox="1">
             <a:spLocks noGrp="1"/>
           </p:cNvSpPr>
           <p:nvPr>
-            <p:ph type="body" idx="1"/>
-          </p:nvPr>
-        </p:nvSpPr>
-        <p:spPr>
-          <a:xfrm>
-            <a:off x="341167" y="937873"/>
-            <a:ext cx="8498033" cy="5024690"/>
+            <p:ph type="body" idx="2"/>
+          </p:nvPr>
+        </p:nvSpPr>
+        <p:spPr>
+          <a:xfrm>
+            <a:off x="341168" y="228026"/>
+            <a:ext cx="8498032" cy="457199"/>
           </a:xfrm>
           <a:prstGeom prst="rect">
             <a:avLst/>
@@ -8774,83 +9119,6 @@
           </a:bodyPr>
           <a:lstStyle/>
           <a:p>
-            <a:pPr marL="355600" indent="-355600">
-              <a:lnSpc>
-                <a:spcPct val="90000"/>
-              </a:lnSpc>
-              <a:buClr>
-                <a:srgbClr val="2E3640"/>
-              </a:buClr>
-              <a:buSzPct val="100000"/>
-              <a:buBlip>
-                <a:blip r:embed="rId3"/>
-              </a:buBlip>
-            </a:pPr>
-            <a:r>
-              <a:rPr lang="en-US" sz="2400" dirty="0" smtClean="0"/>
-              <a:t>stuff</a:t>
-            </a:r>
-            <a:endParaRPr lang="en-US" sz="2400" dirty="0" smtClean="0">
-              <a:sym typeface="Wingdings" panose="05000000000000000000" pitchFamily="2" charset="2"/>
-            </a:endParaRPr>
-          </a:p>
-          <a:p>
-            <a:pPr>
-              <a:lnSpc>
-                <a:spcPct val="90000"/>
-              </a:lnSpc>
-              <a:buClr>
-                <a:srgbClr val="2E3640"/>
-              </a:buClr>
-              <a:buSzPct val="100000"/>
-            </a:pPr>
-            <a:endParaRPr lang="en-US" sz="2400" dirty="0">
-              <a:sym typeface="Wingdings" panose="05000000000000000000" pitchFamily="2" charset="2"/>
-            </a:endParaRPr>
-          </a:p>
-          <a:p>
-            <a:pPr>
-              <a:lnSpc>
-                <a:spcPct val="90000"/>
-              </a:lnSpc>
-              <a:buClr>
-                <a:srgbClr val="2E3640"/>
-              </a:buClr>
-              <a:buSzPct val="100000"/>
-            </a:pPr>
-            <a:endParaRPr lang="en-US" sz="2400" dirty="0" smtClean="0"/>
-          </a:p>
-        </p:txBody>
-      </p:sp>
-      <p:sp>
-        <p:nvSpPr>
-          <p:cNvPr id="97" name="Shape 97"/>
-          <p:cNvSpPr txBox="1">
-            <a:spLocks noGrp="1"/>
-          </p:cNvSpPr>
-          <p:nvPr>
-            <p:ph type="body" idx="2"/>
-          </p:nvPr>
-        </p:nvSpPr>
-        <p:spPr>
-          <a:xfrm>
-            <a:off x="341168" y="228026"/>
-            <a:ext cx="8498032" cy="457199"/>
-          </a:xfrm>
-          <a:prstGeom prst="rect">
-            <a:avLst/>
-          </a:prstGeom>
-          <a:noFill/>
-          <a:ln>
-            <a:noFill/>
-          </a:ln>
-        </p:spPr>
-        <p:txBody>
-          <a:bodyPr lIns="68569" tIns="34275" rIns="68569" bIns="34275" anchor="t" anchorCtr="0">
-            <a:noAutofit/>
-          </a:bodyPr>
-          <a:lstStyle/>
-          <a:p>
             <a:pPr>
               <a:buClr>
                 <a:schemeClr val="accent2"/>
@@ -8858,17 +9126,51 @@
               <a:buSzPct val="25000"/>
             </a:pPr>
             <a:r>
+              <a:rPr lang="en-US" sz="3600" dirty="0"/>
+              <a:t>GIT </a:t>
+            </a:r>
+            <a:r>
               <a:rPr lang="en-US" sz="3600" dirty="0" smtClean="0"/>
-              <a:t>Title</a:t>
+              <a:t>fast-forward merges</a:t>
             </a:r>
             <a:endParaRPr lang="en-US" sz="3600" dirty="0"/>
           </a:p>
         </p:txBody>
       </p:sp>
+      <p:pic>
+        <p:nvPicPr>
+          <p:cNvPr id="4" name="Picture 3"/>
+          <p:cNvPicPr>
+            <a:picLocks noChangeAspect="1"/>
+          </p:cNvPicPr>
+          <p:nvPr/>
+        </p:nvPicPr>
+        <p:blipFill>
+          <a:blip r:embed="rId3">
+            <a:extLst>
+              <a:ext uri="{28A0092B-C50C-407E-A947-70E740481C1C}">
+                <a14:useLocalDpi xmlns:a14="http://schemas.microsoft.com/office/drawing/2010/main" val="0"/>
+              </a:ext>
+            </a:extLst>
+          </a:blip>
+          <a:stretch>
+            <a:fillRect/>
+          </a:stretch>
+        </p:blipFill>
+        <p:spPr>
+          <a:xfrm>
+            <a:off x="2090737" y="1928812"/>
+            <a:ext cx="4962525" cy="3000375"/>
+          </a:xfrm>
+          <a:prstGeom prst="rect">
+            <a:avLst/>
+          </a:prstGeom>
+        </p:spPr>
+      </p:pic>
     </p:spTree>
     <p:extLst>
       <p:ext uri="{BB962C8B-B14F-4D97-AF65-F5344CB8AC3E}">
-        <p14:creationId xmlns:p14="http://schemas.microsoft.com/office/powerpoint/2010/main" val="2519039036"/>
+        <p14:creationId xmlns:p14="http://schemas.microsoft.com/office/powerpoint/2010/main" val="1465636522"/>
       </p:ext>
     </p:extLst>
   </p:cSld>
@@ -8946,18 +9248,18 @@
       </p:sp>
       <p:sp>
         <p:nvSpPr>
-          <p:cNvPr id="96" name="Shape 96"/>
+          <p:cNvPr id="97" name="Shape 97"/>
           <p:cNvSpPr txBox="1">
             <a:spLocks noGrp="1"/>
           </p:cNvSpPr>
           <p:nvPr>
-            <p:ph type="body" idx="1"/>
-          </p:nvPr>
-        </p:nvSpPr>
-        <p:spPr>
-          <a:xfrm>
-            <a:off x="341167" y="937873"/>
-            <a:ext cx="8498033" cy="5024690"/>
+            <p:ph type="body" idx="2"/>
+          </p:nvPr>
+        </p:nvSpPr>
+        <p:spPr>
+          <a:xfrm>
+            <a:off x="341168" y="228026"/>
+            <a:ext cx="8498032" cy="457199"/>
           </a:xfrm>
           <a:prstGeom prst="rect">
             <a:avLst/>
@@ -8973,83 +9275,6 @@
           </a:bodyPr>
           <a:lstStyle/>
           <a:p>
-            <a:pPr marL="355600" indent="-355600">
-              <a:lnSpc>
-                <a:spcPct val="90000"/>
-              </a:lnSpc>
-              <a:buClr>
-                <a:srgbClr val="2E3640"/>
-              </a:buClr>
-              <a:buSzPct val="100000"/>
-              <a:buBlip>
-                <a:blip r:embed="rId3"/>
-              </a:buBlip>
-            </a:pPr>
-            <a:r>
-              <a:rPr lang="en-US" sz="2400" dirty="0" smtClean="0"/>
-              <a:t>stuff</a:t>
-            </a:r>
-            <a:endParaRPr lang="en-US" sz="2400" dirty="0" smtClean="0">
-              <a:sym typeface="Wingdings" panose="05000000000000000000" pitchFamily="2" charset="2"/>
-            </a:endParaRPr>
-          </a:p>
-          <a:p>
-            <a:pPr>
-              <a:lnSpc>
-                <a:spcPct val="90000"/>
-              </a:lnSpc>
-              <a:buClr>
-                <a:srgbClr val="2E3640"/>
-              </a:buClr>
-              <a:buSzPct val="100000"/>
-            </a:pPr>
-            <a:endParaRPr lang="en-US" sz="2400" dirty="0">
-              <a:sym typeface="Wingdings" panose="05000000000000000000" pitchFamily="2" charset="2"/>
-            </a:endParaRPr>
-          </a:p>
-          <a:p>
-            <a:pPr>
-              <a:lnSpc>
-                <a:spcPct val="90000"/>
-              </a:lnSpc>
-              <a:buClr>
-                <a:srgbClr val="2E3640"/>
-              </a:buClr>
-              <a:buSzPct val="100000"/>
-            </a:pPr>
-            <a:endParaRPr lang="en-US" sz="2400" dirty="0" smtClean="0"/>
-          </a:p>
-        </p:txBody>
-      </p:sp>
-      <p:sp>
-        <p:nvSpPr>
-          <p:cNvPr id="97" name="Shape 97"/>
-          <p:cNvSpPr txBox="1">
-            <a:spLocks noGrp="1"/>
-          </p:cNvSpPr>
-          <p:nvPr>
-            <p:ph type="body" idx="2"/>
-          </p:nvPr>
-        </p:nvSpPr>
-        <p:spPr>
-          <a:xfrm>
-            <a:off x="341168" y="228026"/>
-            <a:ext cx="8498032" cy="457199"/>
-          </a:xfrm>
-          <a:prstGeom prst="rect">
-            <a:avLst/>
-          </a:prstGeom>
-          <a:noFill/>
-          <a:ln>
-            <a:noFill/>
-          </a:ln>
-        </p:spPr>
-        <p:txBody>
-          <a:bodyPr lIns="68569" tIns="34275" rIns="68569" bIns="34275" anchor="t" anchorCtr="0">
-            <a:noAutofit/>
-          </a:bodyPr>
-          <a:lstStyle/>
-          <a:p>
             <a:pPr>
               <a:buClr>
                 <a:schemeClr val="accent2"/>
@@ -9057,17 +9282,51 @@
               <a:buSzPct val="25000"/>
             </a:pPr>
             <a:r>
+              <a:rPr lang="en-US" sz="3600" dirty="0"/>
+              <a:t>GIT </a:t>
+            </a:r>
+            <a:r>
               <a:rPr lang="en-US" sz="3600" dirty="0" smtClean="0"/>
-              <a:t>Title</a:t>
+              <a:t>fast-forward merge my-branch into master</a:t>
             </a:r>
             <a:endParaRPr lang="en-US" sz="3600" dirty="0"/>
           </a:p>
         </p:txBody>
       </p:sp>
+      <p:pic>
+        <p:nvPicPr>
+          <p:cNvPr id="2" name="Picture 1"/>
+          <p:cNvPicPr>
+            <a:picLocks noChangeAspect="1"/>
+          </p:cNvPicPr>
+          <p:nvPr/>
+        </p:nvPicPr>
+        <p:blipFill>
+          <a:blip r:embed="rId3">
+            <a:extLst>
+              <a:ext uri="{28A0092B-C50C-407E-A947-70E740481C1C}">
+                <a14:useLocalDpi xmlns:a14="http://schemas.microsoft.com/office/drawing/2010/main" val="0"/>
+              </a:ext>
+            </a:extLst>
+          </a:blip>
+          <a:stretch>
+            <a:fillRect/>
+          </a:stretch>
+        </p:blipFill>
+        <p:spPr>
+          <a:xfrm>
+            <a:off x="2090737" y="1933575"/>
+            <a:ext cx="4962525" cy="2990850"/>
+          </a:xfrm>
+          <a:prstGeom prst="rect">
+            <a:avLst/>
+          </a:prstGeom>
+        </p:spPr>
+      </p:pic>
     </p:spTree>
     <p:extLst>
       <p:ext uri="{BB962C8B-B14F-4D97-AF65-F5344CB8AC3E}">
-        <p14:creationId xmlns:p14="http://schemas.microsoft.com/office/powerpoint/2010/main" val="396525421"/>
+        <p14:creationId xmlns:p14="http://schemas.microsoft.com/office/powerpoint/2010/main" val="4060379651"/>
       </p:ext>
     </p:extLst>
   </p:cSld>
@@ -9145,18 +9404,18 @@
       </p:sp>
       <p:sp>
         <p:nvSpPr>
-          <p:cNvPr id="96" name="Shape 96"/>
+          <p:cNvPr id="97" name="Shape 97"/>
           <p:cNvSpPr txBox="1">
             <a:spLocks noGrp="1"/>
           </p:cNvSpPr>
           <p:nvPr>
-            <p:ph type="body" idx="1"/>
-          </p:nvPr>
-        </p:nvSpPr>
-        <p:spPr>
-          <a:xfrm>
-            <a:off x="341167" y="937873"/>
-            <a:ext cx="8498033" cy="5024690"/>
+            <p:ph type="body" idx="2"/>
+          </p:nvPr>
+        </p:nvSpPr>
+        <p:spPr>
+          <a:xfrm>
+            <a:off x="341168" y="228026"/>
+            <a:ext cx="8498032" cy="457199"/>
           </a:xfrm>
           <a:prstGeom prst="rect">
             <a:avLst/>
@@ -9172,83 +9431,6 @@
           </a:bodyPr>
           <a:lstStyle/>
           <a:p>
-            <a:pPr marL="355600" indent="-355600">
-              <a:lnSpc>
-                <a:spcPct val="90000"/>
-              </a:lnSpc>
-              <a:buClr>
-                <a:srgbClr val="2E3640"/>
-              </a:buClr>
-              <a:buSzPct val="100000"/>
-              <a:buBlip>
-                <a:blip r:embed="rId3"/>
-              </a:buBlip>
-            </a:pPr>
-            <a:r>
-              <a:rPr lang="en-US" sz="2400" dirty="0" smtClean="0"/>
-              <a:t>stuff</a:t>
-            </a:r>
-            <a:endParaRPr lang="en-US" sz="2400" dirty="0" smtClean="0">
-              <a:sym typeface="Wingdings" panose="05000000000000000000" pitchFamily="2" charset="2"/>
-            </a:endParaRPr>
-          </a:p>
-          <a:p>
-            <a:pPr>
-              <a:lnSpc>
-                <a:spcPct val="90000"/>
-              </a:lnSpc>
-              <a:buClr>
-                <a:srgbClr val="2E3640"/>
-              </a:buClr>
-              <a:buSzPct val="100000"/>
-            </a:pPr>
-            <a:endParaRPr lang="en-US" sz="2400" dirty="0">
-              <a:sym typeface="Wingdings" panose="05000000000000000000" pitchFamily="2" charset="2"/>
-            </a:endParaRPr>
-          </a:p>
-          <a:p>
-            <a:pPr>
-              <a:lnSpc>
-                <a:spcPct val="90000"/>
-              </a:lnSpc>
-              <a:buClr>
-                <a:srgbClr val="2E3640"/>
-              </a:buClr>
-              <a:buSzPct val="100000"/>
-            </a:pPr>
-            <a:endParaRPr lang="en-US" sz="2400" dirty="0" smtClean="0"/>
-          </a:p>
-        </p:txBody>
-      </p:sp>
-      <p:sp>
-        <p:nvSpPr>
-          <p:cNvPr id="97" name="Shape 97"/>
-          <p:cNvSpPr txBox="1">
-            <a:spLocks noGrp="1"/>
-          </p:cNvSpPr>
-          <p:nvPr>
-            <p:ph type="body" idx="2"/>
-          </p:nvPr>
-        </p:nvSpPr>
-        <p:spPr>
-          <a:xfrm>
-            <a:off x="341168" y="228026"/>
-            <a:ext cx="8498032" cy="457199"/>
-          </a:xfrm>
-          <a:prstGeom prst="rect">
-            <a:avLst/>
-          </a:prstGeom>
-          <a:noFill/>
-          <a:ln>
-            <a:noFill/>
-          </a:ln>
-        </p:spPr>
-        <p:txBody>
-          <a:bodyPr lIns="68569" tIns="34275" rIns="68569" bIns="34275" anchor="t" anchorCtr="0">
-            <a:noAutofit/>
-          </a:bodyPr>
-          <a:lstStyle/>
-          <a:p>
             <a:pPr>
               <a:buClr>
                 <a:schemeClr val="accent2"/>
@@ -9256,17 +9438,59 @@
               <a:buSzPct val="25000"/>
             </a:pPr>
             <a:r>
+              <a:rPr lang="en-US" sz="3600" dirty="0"/>
+              <a:t>GIT </a:t>
+            </a:r>
+            <a:r>
               <a:rPr lang="en-US" sz="3600" dirty="0" smtClean="0"/>
-              <a:t>Title</a:t>
+              <a:t>merge my-branch into master forcing non-fast-forward (--no-</a:t>
+            </a:r>
+            <a:r>
+              <a:rPr lang="en-US" sz="3600" dirty="0" err="1" smtClean="0"/>
+              <a:t>ff</a:t>
+            </a:r>
+            <a:r>
+              <a:rPr lang="en-US" sz="3600" dirty="0" smtClean="0"/>
+              <a:t>)</a:t>
             </a:r>
             <a:endParaRPr lang="en-US" sz="3600" dirty="0"/>
           </a:p>
         </p:txBody>
       </p:sp>
+      <p:pic>
+        <p:nvPicPr>
+          <p:cNvPr id="2" name="Picture 1"/>
+          <p:cNvPicPr>
+            <a:picLocks noChangeAspect="1"/>
+          </p:cNvPicPr>
+          <p:nvPr/>
+        </p:nvPicPr>
+        <p:blipFill>
+          <a:blip r:embed="rId3">
+            <a:extLst>
+              <a:ext uri="{28A0092B-C50C-407E-A947-70E740481C1C}">
+                <a14:useLocalDpi xmlns:a14="http://schemas.microsoft.com/office/drawing/2010/main" val="0"/>
+              </a:ext>
+            </a:extLst>
+          </a:blip>
+          <a:stretch>
+            <a:fillRect/>
+          </a:stretch>
+        </p:blipFill>
+        <p:spPr>
+          <a:xfrm>
+            <a:off x="1614487" y="1543050"/>
+            <a:ext cx="5915025" cy="3771900"/>
+          </a:xfrm>
+          <a:prstGeom prst="rect">
+            <a:avLst/>
+          </a:prstGeom>
+        </p:spPr>
+      </p:pic>
     </p:spTree>
     <p:extLst>
       <p:ext uri="{BB962C8B-B14F-4D97-AF65-F5344CB8AC3E}">
-        <p14:creationId xmlns:p14="http://schemas.microsoft.com/office/powerpoint/2010/main" val="695698909"/>
+        <p14:creationId xmlns:p14="http://schemas.microsoft.com/office/powerpoint/2010/main" val="3900762246"/>
       </p:ext>
     </p:extLst>
   </p:cSld>
@@ -9465,7 +9689,7 @@
     </p:spTree>
     <p:extLst>
       <p:ext uri="{BB962C8B-B14F-4D97-AF65-F5344CB8AC3E}">
-        <p14:creationId xmlns:p14="http://schemas.microsoft.com/office/powerpoint/2010/main" val="2915095849"/>
+        <p14:creationId xmlns:p14="http://schemas.microsoft.com/office/powerpoint/2010/main" val="2519039036"/>
       </p:ext>
     </p:extLst>
   </p:cSld>
@@ -9664,7 +9888,7 @@
     </p:spTree>
     <p:extLst>
       <p:ext uri="{BB962C8B-B14F-4D97-AF65-F5344CB8AC3E}">
-        <p14:creationId xmlns:p14="http://schemas.microsoft.com/office/powerpoint/2010/main" val="893865620"/>
+        <p14:creationId xmlns:p14="http://schemas.microsoft.com/office/powerpoint/2010/main" val="396525421"/>
       </p:ext>
     </p:extLst>
   </p:cSld>
@@ -9863,7 +10087,7 @@
     </p:spTree>
     <p:extLst>
       <p:ext uri="{BB962C8B-B14F-4D97-AF65-F5344CB8AC3E}">
-        <p14:creationId xmlns:p14="http://schemas.microsoft.com/office/powerpoint/2010/main" val="2176611703"/>
+        <p14:creationId xmlns:p14="http://schemas.microsoft.com/office/powerpoint/2010/main" val="695698909"/>
       </p:ext>
     </p:extLst>
   </p:cSld>
@@ -10062,7 +10286,7 @@
     </p:spTree>
     <p:extLst>
       <p:ext uri="{BB962C8B-B14F-4D97-AF65-F5344CB8AC3E}">
-        <p14:creationId xmlns:p14="http://schemas.microsoft.com/office/powerpoint/2010/main" val="2978980850"/>
+        <p14:creationId xmlns:p14="http://schemas.microsoft.com/office/powerpoint/2010/main" val="2915095849"/>
       </p:ext>
     </p:extLst>
   </p:cSld>
@@ -10542,7 +10766,7 @@
     </p:spTree>
     <p:extLst>
       <p:ext uri="{BB962C8B-B14F-4D97-AF65-F5344CB8AC3E}">
-        <p14:creationId xmlns:p14="http://schemas.microsoft.com/office/powerpoint/2010/main" val="2675765428"/>
+        <p14:creationId xmlns:p14="http://schemas.microsoft.com/office/powerpoint/2010/main" val="893865620"/>
       </p:ext>
     </p:extLst>
   </p:cSld>
@@ -10661,6 +10885,603 @@
             </a:pPr>
             <a:r>
               <a:rPr lang="en-US" sz="2400" dirty="0" smtClean="0"/>
+              <a:t>stuff</a:t>
+            </a:r>
+            <a:endParaRPr lang="en-US" sz="2400" dirty="0" smtClean="0">
+              <a:sym typeface="Wingdings" panose="05000000000000000000" pitchFamily="2" charset="2"/>
+            </a:endParaRPr>
+          </a:p>
+          <a:p>
+            <a:pPr>
+              <a:lnSpc>
+                <a:spcPct val="90000"/>
+              </a:lnSpc>
+              <a:buClr>
+                <a:srgbClr val="2E3640"/>
+              </a:buClr>
+              <a:buSzPct val="100000"/>
+            </a:pPr>
+            <a:endParaRPr lang="en-US" sz="2400" dirty="0">
+              <a:sym typeface="Wingdings" panose="05000000000000000000" pitchFamily="2" charset="2"/>
+            </a:endParaRPr>
+          </a:p>
+          <a:p>
+            <a:pPr>
+              <a:lnSpc>
+                <a:spcPct val="90000"/>
+              </a:lnSpc>
+              <a:buClr>
+                <a:srgbClr val="2E3640"/>
+              </a:buClr>
+              <a:buSzPct val="100000"/>
+            </a:pPr>
+            <a:endParaRPr lang="en-US" sz="2400" dirty="0" smtClean="0"/>
+          </a:p>
+        </p:txBody>
+      </p:sp>
+      <p:sp>
+        <p:nvSpPr>
+          <p:cNvPr id="97" name="Shape 97"/>
+          <p:cNvSpPr txBox="1">
+            <a:spLocks noGrp="1"/>
+          </p:cNvSpPr>
+          <p:nvPr>
+            <p:ph type="body" idx="2"/>
+          </p:nvPr>
+        </p:nvSpPr>
+        <p:spPr>
+          <a:xfrm>
+            <a:off x="341168" y="228026"/>
+            <a:ext cx="8498032" cy="457199"/>
+          </a:xfrm>
+          <a:prstGeom prst="rect">
+            <a:avLst/>
+          </a:prstGeom>
+          <a:noFill/>
+          <a:ln>
+            <a:noFill/>
+          </a:ln>
+        </p:spPr>
+        <p:txBody>
+          <a:bodyPr lIns="68569" tIns="34275" rIns="68569" bIns="34275" anchor="t" anchorCtr="0">
+            <a:noAutofit/>
+          </a:bodyPr>
+          <a:lstStyle/>
+          <a:p>
+            <a:pPr>
+              <a:buClr>
+                <a:schemeClr val="accent2"/>
+              </a:buClr>
+              <a:buSzPct val="25000"/>
+            </a:pPr>
+            <a:r>
+              <a:rPr lang="en-US" sz="3600" dirty="0" smtClean="0"/>
+              <a:t>Title</a:t>
+            </a:r>
+            <a:endParaRPr lang="en-US" sz="3600" dirty="0"/>
+          </a:p>
+        </p:txBody>
+      </p:sp>
+    </p:spTree>
+    <p:extLst>
+      <p:ext uri="{BB962C8B-B14F-4D97-AF65-F5344CB8AC3E}">
+        <p14:creationId xmlns:p14="http://schemas.microsoft.com/office/powerpoint/2010/main" val="2176611703"/>
+      </p:ext>
+    </p:extLst>
+  </p:cSld>
+  <p:clrMapOvr>
+    <a:masterClrMapping/>
+  </p:clrMapOvr>
+  <p:transition spd="slow">
+    <p:cut/>
+  </p:transition>
+  <p:timing>
+    <p:tnLst>
+      <p:par>
+        <p:cTn id="1" dur="indefinite" restart="never" nodeType="tmRoot"/>
+      </p:par>
+    </p:tnLst>
+  </p:timing>
+</p:sld>
+</file>
+
+<file path=ppt/slides/slide22.xml><?xml version="1.0" encoding="utf-8"?>
+<p:sld xmlns:a="http://schemas.openxmlformats.org/drawingml/2006/main" xmlns:r="http://schemas.openxmlformats.org/officeDocument/2006/relationships" xmlns:p="http://schemas.openxmlformats.org/presentationml/2006/main">
+  <p:cSld>
+    <p:spTree>
+      <p:nvGrpSpPr>
+        <p:cNvPr id="1" name="Shape 93"/>
+        <p:cNvGrpSpPr/>
+        <p:nvPr/>
+      </p:nvGrpSpPr>
+      <p:grpSpPr>
+        <a:xfrm>
+          <a:off x="0" y="0"/>
+          <a:ext cx="0" cy="0"/>
+          <a:chOff x="0" y="0"/>
+          <a:chExt cx="0" cy="0"/>
+        </a:xfrm>
+      </p:grpSpPr>
+      <p:sp>
+        <p:nvSpPr>
+          <p:cNvPr id="95" name="Shape 95"/>
+          <p:cNvSpPr txBox="1">
+            <a:spLocks noGrp="1"/>
+          </p:cNvSpPr>
+          <p:nvPr>
+            <p:ph type="sldNum" idx="12"/>
+          </p:nvPr>
+        </p:nvSpPr>
+        <p:spPr>
+          <a:xfrm>
+            <a:off x="7600950" y="5688719"/>
+            <a:ext cx="269142" cy="273844"/>
+          </a:xfrm>
+          <a:prstGeom prst="rect">
+            <a:avLst/>
+          </a:prstGeom>
+          <a:noFill/>
+          <a:ln>
+            <a:noFill/>
+          </a:ln>
+        </p:spPr>
+        <p:txBody>
+          <a:bodyPr lIns="68569" tIns="34275" rIns="68569" bIns="34275" anchor="ctr" anchorCtr="0">
+            <a:noAutofit/>
+          </a:bodyPr>
+          <a:lstStyle/>
+          <a:p>
+            <a:pPr>
+              <a:buSzPct val="25000"/>
+            </a:pPr>
+            <a:r>
+              <a:rPr lang="en-US"/>
+              <a:t> </a:t>
+            </a:r>
+          </a:p>
+        </p:txBody>
+      </p:sp>
+      <p:sp>
+        <p:nvSpPr>
+          <p:cNvPr id="96" name="Shape 96"/>
+          <p:cNvSpPr txBox="1">
+            <a:spLocks noGrp="1"/>
+          </p:cNvSpPr>
+          <p:nvPr>
+            <p:ph type="body" idx="1"/>
+          </p:nvPr>
+        </p:nvSpPr>
+        <p:spPr>
+          <a:xfrm>
+            <a:off x="341167" y="937873"/>
+            <a:ext cx="8498033" cy="5024690"/>
+          </a:xfrm>
+          <a:prstGeom prst="rect">
+            <a:avLst/>
+          </a:prstGeom>
+          <a:noFill/>
+          <a:ln>
+            <a:noFill/>
+          </a:ln>
+        </p:spPr>
+        <p:txBody>
+          <a:bodyPr lIns="68569" tIns="34275" rIns="68569" bIns="34275" anchor="t" anchorCtr="0">
+            <a:noAutofit/>
+          </a:bodyPr>
+          <a:lstStyle/>
+          <a:p>
+            <a:pPr marL="355600" indent="-355600">
+              <a:lnSpc>
+                <a:spcPct val="90000"/>
+              </a:lnSpc>
+              <a:buClr>
+                <a:srgbClr val="2E3640"/>
+              </a:buClr>
+              <a:buSzPct val="100000"/>
+              <a:buBlip>
+                <a:blip r:embed="rId3"/>
+              </a:buBlip>
+            </a:pPr>
+            <a:r>
+              <a:rPr lang="en-US" sz="2400" dirty="0" smtClean="0"/>
+              <a:t>stuff</a:t>
+            </a:r>
+            <a:endParaRPr lang="en-US" sz="2400" dirty="0" smtClean="0">
+              <a:sym typeface="Wingdings" panose="05000000000000000000" pitchFamily="2" charset="2"/>
+            </a:endParaRPr>
+          </a:p>
+          <a:p>
+            <a:pPr>
+              <a:lnSpc>
+                <a:spcPct val="90000"/>
+              </a:lnSpc>
+              <a:buClr>
+                <a:srgbClr val="2E3640"/>
+              </a:buClr>
+              <a:buSzPct val="100000"/>
+            </a:pPr>
+            <a:endParaRPr lang="en-US" sz="2400" dirty="0">
+              <a:sym typeface="Wingdings" panose="05000000000000000000" pitchFamily="2" charset="2"/>
+            </a:endParaRPr>
+          </a:p>
+          <a:p>
+            <a:pPr>
+              <a:lnSpc>
+                <a:spcPct val="90000"/>
+              </a:lnSpc>
+              <a:buClr>
+                <a:srgbClr val="2E3640"/>
+              </a:buClr>
+              <a:buSzPct val="100000"/>
+            </a:pPr>
+            <a:endParaRPr lang="en-US" sz="2400" dirty="0" smtClean="0"/>
+          </a:p>
+        </p:txBody>
+      </p:sp>
+      <p:sp>
+        <p:nvSpPr>
+          <p:cNvPr id="97" name="Shape 97"/>
+          <p:cNvSpPr txBox="1">
+            <a:spLocks noGrp="1"/>
+          </p:cNvSpPr>
+          <p:nvPr>
+            <p:ph type="body" idx="2"/>
+          </p:nvPr>
+        </p:nvSpPr>
+        <p:spPr>
+          <a:xfrm>
+            <a:off x="341168" y="228026"/>
+            <a:ext cx="8498032" cy="457199"/>
+          </a:xfrm>
+          <a:prstGeom prst="rect">
+            <a:avLst/>
+          </a:prstGeom>
+          <a:noFill/>
+          <a:ln>
+            <a:noFill/>
+          </a:ln>
+        </p:spPr>
+        <p:txBody>
+          <a:bodyPr lIns="68569" tIns="34275" rIns="68569" bIns="34275" anchor="t" anchorCtr="0">
+            <a:noAutofit/>
+          </a:bodyPr>
+          <a:lstStyle/>
+          <a:p>
+            <a:pPr>
+              <a:buClr>
+                <a:schemeClr val="accent2"/>
+              </a:buClr>
+              <a:buSzPct val="25000"/>
+            </a:pPr>
+            <a:r>
+              <a:rPr lang="en-US" sz="3600" dirty="0" smtClean="0"/>
+              <a:t>Title</a:t>
+            </a:r>
+            <a:endParaRPr lang="en-US" sz="3600" dirty="0"/>
+          </a:p>
+        </p:txBody>
+      </p:sp>
+    </p:spTree>
+    <p:extLst>
+      <p:ext uri="{BB962C8B-B14F-4D97-AF65-F5344CB8AC3E}">
+        <p14:creationId xmlns:p14="http://schemas.microsoft.com/office/powerpoint/2010/main" val="2978980850"/>
+      </p:ext>
+    </p:extLst>
+  </p:cSld>
+  <p:clrMapOvr>
+    <a:masterClrMapping/>
+  </p:clrMapOvr>
+  <p:transition spd="slow">
+    <p:cut/>
+  </p:transition>
+  <p:timing>
+    <p:tnLst>
+      <p:par>
+        <p:cTn id="1" dur="indefinite" restart="never" nodeType="tmRoot"/>
+      </p:par>
+    </p:tnLst>
+  </p:timing>
+</p:sld>
+</file>
+
+<file path=ppt/slides/slide23.xml><?xml version="1.0" encoding="utf-8"?>
+<p:sld xmlns:a="http://schemas.openxmlformats.org/drawingml/2006/main" xmlns:r="http://schemas.openxmlformats.org/officeDocument/2006/relationships" xmlns:p="http://schemas.openxmlformats.org/presentationml/2006/main">
+  <p:cSld>
+    <p:spTree>
+      <p:nvGrpSpPr>
+        <p:cNvPr id="1" name="Shape 93"/>
+        <p:cNvGrpSpPr/>
+        <p:nvPr/>
+      </p:nvGrpSpPr>
+      <p:grpSpPr>
+        <a:xfrm>
+          <a:off x="0" y="0"/>
+          <a:ext cx="0" cy="0"/>
+          <a:chOff x="0" y="0"/>
+          <a:chExt cx="0" cy="0"/>
+        </a:xfrm>
+      </p:grpSpPr>
+      <p:sp>
+        <p:nvSpPr>
+          <p:cNvPr id="95" name="Shape 95"/>
+          <p:cNvSpPr txBox="1">
+            <a:spLocks noGrp="1"/>
+          </p:cNvSpPr>
+          <p:nvPr>
+            <p:ph type="sldNum" idx="12"/>
+          </p:nvPr>
+        </p:nvSpPr>
+        <p:spPr>
+          <a:xfrm>
+            <a:off x="7600950" y="5688719"/>
+            <a:ext cx="269142" cy="273844"/>
+          </a:xfrm>
+          <a:prstGeom prst="rect">
+            <a:avLst/>
+          </a:prstGeom>
+          <a:noFill/>
+          <a:ln>
+            <a:noFill/>
+          </a:ln>
+        </p:spPr>
+        <p:txBody>
+          <a:bodyPr lIns="68569" tIns="34275" rIns="68569" bIns="34275" anchor="ctr" anchorCtr="0">
+            <a:noAutofit/>
+          </a:bodyPr>
+          <a:lstStyle/>
+          <a:p>
+            <a:pPr>
+              <a:buSzPct val="25000"/>
+            </a:pPr>
+            <a:r>
+              <a:rPr lang="en-US"/>
+              <a:t> </a:t>
+            </a:r>
+          </a:p>
+        </p:txBody>
+      </p:sp>
+      <p:sp>
+        <p:nvSpPr>
+          <p:cNvPr id="96" name="Shape 96"/>
+          <p:cNvSpPr txBox="1">
+            <a:spLocks noGrp="1"/>
+          </p:cNvSpPr>
+          <p:nvPr>
+            <p:ph type="body" idx="1"/>
+          </p:nvPr>
+        </p:nvSpPr>
+        <p:spPr>
+          <a:xfrm>
+            <a:off x="341167" y="937873"/>
+            <a:ext cx="8498033" cy="5024690"/>
+          </a:xfrm>
+          <a:prstGeom prst="rect">
+            <a:avLst/>
+          </a:prstGeom>
+          <a:noFill/>
+          <a:ln>
+            <a:noFill/>
+          </a:ln>
+        </p:spPr>
+        <p:txBody>
+          <a:bodyPr lIns="68569" tIns="34275" rIns="68569" bIns="34275" anchor="t" anchorCtr="0">
+            <a:noAutofit/>
+          </a:bodyPr>
+          <a:lstStyle/>
+          <a:p>
+            <a:pPr marL="355600" indent="-355600">
+              <a:lnSpc>
+                <a:spcPct val="90000"/>
+              </a:lnSpc>
+              <a:buClr>
+                <a:srgbClr val="2E3640"/>
+              </a:buClr>
+              <a:buSzPct val="100000"/>
+              <a:buBlip>
+                <a:blip r:embed="rId3"/>
+              </a:buBlip>
+            </a:pPr>
+            <a:r>
+              <a:rPr lang="en-US" sz="2400" dirty="0" smtClean="0"/>
+              <a:t>stuff</a:t>
+            </a:r>
+            <a:endParaRPr lang="en-US" sz="2400" dirty="0" smtClean="0">
+              <a:sym typeface="Wingdings" panose="05000000000000000000" pitchFamily="2" charset="2"/>
+            </a:endParaRPr>
+          </a:p>
+          <a:p>
+            <a:pPr>
+              <a:lnSpc>
+                <a:spcPct val="90000"/>
+              </a:lnSpc>
+              <a:buClr>
+                <a:srgbClr val="2E3640"/>
+              </a:buClr>
+              <a:buSzPct val="100000"/>
+            </a:pPr>
+            <a:endParaRPr lang="en-US" sz="2400" dirty="0">
+              <a:sym typeface="Wingdings" panose="05000000000000000000" pitchFamily="2" charset="2"/>
+            </a:endParaRPr>
+          </a:p>
+          <a:p>
+            <a:pPr>
+              <a:lnSpc>
+                <a:spcPct val="90000"/>
+              </a:lnSpc>
+              <a:buClr>
+                <a:srgbClr val="2E3640"/>
+              </a:buClr>
+              <a:buSzPct val="100000"/>
+            </a:pPr>
+            <a:endParaRPr lang="en-US" sz="2400" dirty="0" smtClean="0"/>
+          </a:p>
+        </p:txBody>
+      </p:sp>
+      <p:sp>
+        <p:nvSpPr>
+          <p:cNvPr id="97" name="Shape 97"/>
+          <p:cNvSpPr txBox="1">
+            <a:spLocks noGrp="1"/>
+          </p:cNvSpPr>
+          <p:nvPr>
+            <p:ph type="body" idx="2"/>
+          </p:nvPr>
+        </p:nvSpPr>
+        <p:spPr>
+          <a:xfrm>
+            <a:off x="341168" y="228026"/>
+            <a:ext cx="8498032" cy="457199"/>
+          </a:xfrm>
+          <a:prstGeom prst="rect">
+            <a:avLst/>
+          </a:prstGeom>
+          <a:noFill/>
+          <a:ln>
+            <a:noFill/>
+          </a:ln>
+        </p:spPr>
+        <p:txBody>
+          <a:bodyPr lIns="68569" tIns="34275" rIns="68569" bIns="34275" anchor="t" anchorCtr="0">
+            <a:noAutofit/>
+          </a:bodyPr>
+          <a:lstStyle/>
+          <a:p>
+            <a:pPr>
+              <a:buClr>
+                <a:schemeClr val="accent2"/>
+              </a:buClr>
+              <a:buSzPct val="25000"/>
+            </a:pPr>
+            <a:r>
+              <a:rPr lang="en-US" sz="3600" dirty="0" smtClean="0"/>
+              <a:t>Title</a:t>
+            </a:r>
+            <a:endParaRPr lang="en-US" sz="3600" dirty="0"/>
+          </a:p>
+        </p:txBody>
+      </p:sp>
+    </p:spTree>
+    <p:extLst>
+      <p:ext uri="{BB962C8B-B14F-4D97-AF65-F5344CB8AC3E}">
+        <p14:creationId xmlns:p14="http://schemas.microsoft.com/office/powerpoint/2010/main" val="2675765428"/>
+      </p:ext>
+    </p:extLst>
+  </p:cSld>
+  <p:clrMapOvr>
+    <a:masterClrMapping/>
+  </p:clrMapOvr>
+  <p:transition spd="slow">
+    <p:cut/>
+  </p:transition>
+  <p:timing>
+    <p:tnLst>
+      <p:par>
+        <p:cTn id="1" dur="indefinite" restart="never" nodeType="tmRoot"/>
+      </p:par>
+    </p:tnLst>
+  </p:timing>
+</p:sld>
+</file>
+
+<file path=ppt/slides/slide24.xml><?xml version="1.0" encoding="utf-8"?>
+<p:sld xmlns:a="http://schemas.openxmlformats.org/drawingml/2006/main" xmlns:r="http://schemas.openxmlformats.org/officeDocument/2006/relationships" xmlns:p="http://schemas.openxmlformats.org/presentationml/2006/main">
+  <p:cSld>
+    <p:spTree>
+      <p:nvGrpSpPr>
+        <p:cNvPr id="1" name="Shape 93"/>
+        <p:cNvGrpSpPr/>
+        <p:nvPr/>
+      </p:nvGrpSpPr>
+      <p:grpSpPr>
+        <a:xfrm>
+          <a:off x="0" y="0"/>
+          <a:ext cx="0" cy="0"/>
+          <a:chOff x="0" y="0"/>
+          <a:chExt cx="0" cy="0"/>
+        </a:xfrm>
+      </p:grpSpPr>
+      <p:sp>
+        <p:nvSpPr>
+          <p:cNvPr id="95" name="Shape 95"/>
+          <p:cNvSpPr txBox="1">
+            <a:spLocks noGrp="1"/>
+          </p:cNvSpPr>
+          <p:nvPr>
+            <p:ph type="sldNum" idx="12"/>
+          </p:nvPr>
+        </p:nvSpPr>
+        <p:spPr>
+          <a:xfrm>
+            <a:off x="7600950" y="5688719"/>
+            <a:ext cx="269142" cy="273844"/>
+          </a:xfrm>
+          <a:prstGeom prst="rect">
+            <a:avLst/>
+          </a:prstGeom>
+          <a:noFill/>
+          <a:ln>
+            <a:noFill/>
+          </a:ln>
+        </p:spPr>
+        <p:txBody>
+          <a:bodyPr lIns="68569" tIns="34275" rIns="68569" bIns="34275" anchor="ctr" anchorCtr="0">
+            <a:noAutofit/>
+          </a:bodyPr>
+          <a:lstStyle/>
+          <a:p>
+            <a:pPr>
+              <a:buSzPct val="25000"/>
+            </a:pPr>
+            <a:r>
+              <a:rPr lang="en-US"/>
+              <a:t> </a:t>
+            </a:r>
+          </a:p>
+        </p:txBody>
+      </p:sp>
+      <p:sp>
+        <p:nvSpPr>
+          <p:cNvPr id="96" name="Shape 96"/>
+          <p:cNvSpPr txBox="1">
+            <a:spLocks noGrp="1"/>
+          </p:cNvSpPr>
+          <p:nvPr>
+            <p:ph type="body" idx="1"/>
+          </p:nvPr>
+        </p:nvSpPr>
+        <p:spPr>
+          <a:xfrm>
+            <a:off x="341167" y="937873"/>
+            <a:ext cx="8498033" cy="5024690"/>
+          </a:xfrm>
+          <a:prstGeom prst="rect">
+            <a:avLst/>
+          </a:prstGeom>
+          <a:noFill/>
+          <a:ln>
+            <a:noFill/>
+          </a:ln>
+        </p:spPr>
+        <p:txBody>
+          <a:bodyPr lIns="68569" tIns="34275" rIns="68569" bIns="34275" anchor="t" anchorCtr="0">
+            <a:noAutofit/>
+          </a:bodyPr>
+          <a:lstStyle/>
+          <a:p>
+            <a:pPr marL="355600" indent="-355600">
+              <a:lnSpc>
+                <a:spcPct val="90000"/>
+              </a:lnSpc>
+              <a:buClr>
+                <a:srgbClr val="2E3640"/>
+              </a:buClr>
+              <a:buSzPct val="100000"/>
+              <a:buBlip>
+                <a:blip r:embed="rId3"/>
+              </a:buBlip>
+            </a:pPr>
+            <a:r>
+              <a:rPr lang="en-US" sz="2400" dirty="0" smtClean="0"/>
               <a:t>Time to get the hands dirty</a:t>
             </a:r>
             <a:endParaRPr lang="en-US" sz="2400" dirty="0" smtClean="0">
@@ -10795,7 +11616,7 @@
 </p:sld>
 </file>
 
-<file path=ppt/slides/slide22.xml><?xml version="1.0" encoding="utf-8"?>
+<file path=ppt/slides/slide25.xml><?xml version="1.0" encoding="utf-8"?>
 <p:sld xmlns:a="http://schemas.openxmlformats.org/drawingml/2006/main" xmlns:r="http://schemas.openxmlformats.org/officeDocument/2006/relationships" xmlns:p="http://schemas.openxmlformats.org/presentationml/2006/main">
   <p:cSld>
     <p:spTree>

</xml_diff>

<commit_message>
added slide on tools
</commit_message>
<xml_diff>
--- a/GIT Presentation.pptx
+++ b/GIT Presentation.pptx
@@ -6,34 +6,35 @@
     <p:sldMasterId id="2147483665" r:id="rId2"/>
   </p:sldMasterIdLst>
   <p:notesMasterIdLst>
-    <p:notesMasterId r:id="rId28"/>
+    <p:notesMasterId r:id="rId29"/>
   </p:notesMasterIdLst>
   <p:sldIdLst>
     <p:sldId id="257" r:id="rId3"/>
     <p:sldId id="258" r:id="rId4"/>
-    <p:sldId id="263" r:id="rId5"/>
-    <p:sldId id="264" r:id="rId6"/>
-    <p:sldId id="265" r:id="rId7"/>
-    <p:sldId id="274" r:id="rId8"/>
-    <p:sldId id="266" r:id="rId9"/>
-    <p:sldId id="267" r:id="rId10"/>
-    <p:sldId id="276" r:id="rId11"/>
-    <p:sldId id="277" r:id="rId12"/>
-    <p:sldId id="268" r:id="rId13"/>
-    <p:sldId id="282" r:id="rId14"/>
-    <p:sldId id="283" r:id="rId15"/>
-    <p:sldId id="285" r:id="rId16"/>
-    <p:sldId id="284" r:id="rId17"/>
-    <p:sldId id="278" r:id="rId18"/>
-    <p:sldId id="279" r:id="rId19"/>
-    <p:sldId id="280" r:id="rId20"/>
-    <p:sldId id="281" r:id="rId21"/>
-    <p:sldId id="269" r:id="rId22"/>
-    <p:sldId id="270" r:id="rId23"/>
-    <p:sldId id="271" r:id="rId24"/>
-    <p:sldId id="272" r:id="rId25"/>
-    <p:sldId id="273" r:id="rId26"/>
-    <p:sldId id="275" r:id="rId27"/>
+    <p:sldId id="286" r:id="rId5"/>
+    <p:sldId id="263" r:id="rId6"/>
+    <p:sldId id="264" r:id="rId7"/>
+    <p:sldId id="265" r:id="rId8"/>
+    <p:sldId id="274" r:id="rId9"/>
+    <p:sldId id="266" r:id="rId10"/>
+    <p:sldId id="267" r:id="rId11"/>
+    <p:sldId id="276" r:id="rId12"/>
+    <p:sldId id="277" r:id="rId13"/>
+    <p:sldId id="268" r:id="rId14"/>
+    <p:sldId id="282" r:id="rId15"/>
+    <p:sldId id="283" r:id="rId16"/>
+    <p:sldId id="285" r:id="rId17"/>
+    <p:sldId id="284" r:id="rId18"/>
+    <p:sldId id="278" r:id="rId19"/>
+    <p:sldId id="279" r:id="rId20"/>
+    <p:sldId id="280" r:id="rId21"/>
+    <p:sldId id="281" r:id="rId22"/>
+    <p:sldId id="269" r:id="rId23"/>
+    <p:sldId id="270" r:id="rId24"/>
+    <p:sldId id="271" r:id="rId25"/>
+    <p:sldId id="272" r:id="rId26"/>
+    <p:sldId id="273" r:id="rId27"/>
+    <p:sldId id="275" r:id="rId28"/>
   </p:sldIdLst>
   <p:sldSz cx="9144000" cy="6858000" type="screen4x3"/>
   <p:notesSz cx="6858000" cy="9144000"/>
@@ -649,31 +650,21 @@
             </a:pPr>
             <a:r>
               <a:rPr lang="en-US" dirty="0" smtClean="0"/>
-              <a:t>2 things happens</a:t>
-            </a:r>
-          </a:p>
-          <a:p>
-            <a:pPr marL="628650" lvl="1" indent="-171450">
+              <a:t>after that the</a:t>
+            </a:r>
+            <a:r>
+              <a:rPr lang="en-US" baseline="0" dirty="0" smtClean="0"/>
+              <a:t> master branch is modified to point to the new commit</a:t>
+            </a:r>
+          </a:p>
+          <a:p>
+            <a:pPr marL="171450" indent="-171450">
               <a:buFontTx/>
               <a:buChar char="-"/>
             </a:pPr>
             <a:r>
-              <a:rPr lang="en-US" dirty="0" smtClean="0"/>
-              <a:t>the</a:t>
-            </a:r>
-            <a:r>
               <a:rPr lang="en-US" baseline="0" dirty="0" smtClean="0"/>
-              <a:t> HEAD label changes to point to the new branch (my-branch)</a:t>
-            </a:r>
-          </a:p>
-          <a:p>
-            <a:pPr marL="628650" lvl="1" indent="-171450">
-              <a:buFontTx/>
-              <a:buChar char="-"/>
-            </a:pPr>
-            <a:r>
-              <a:rPr lang="en-US" baseline="0" dirty="0" smtClean="0"/>
-              <a:t>the files in the working directory are changed to reflect the state of the files in my-branch</a:t>
+              <a:t>notice that HEAD did not change – it still points to the master branch, because we didn’t changed branches</a:t>
             </a:r>
             <a:endParaRPr dirty="0"/>
           </a:p>
@@ -723,7 +714,7 @@
     </p:spTree>
     <p:extLst>
       <p:ext uri="{BB962C8B-B14F-4D97-AF65-F5344CB8AC3E}">
-        <p14:creationId xmlns:p14="http://schemas.microsoft.com/office/powerpoint/2010/main" val="1129209744"/>
+        <p14:creationId xmlns:p14="http://schemas.microsoft.com/office/powerpoint/2010/main" val="789771486"/>
       </p:ext>
     </p:extLst>
   </p:cSld>
@@ -781,50 +772,32 @@
             </a:pPr>
             <a:r>
               <a:rPr lang="en-US" dirty="0" smtClean="0"/>
-              <a:t>first a new commit is created (H) that contains all the changes</a:t>
-            </a:r>
-            <a:r>
-              <a:rPr lang="en-US" baseline="0" dirty="0" smtClean="0"/>
-              <a:t> that were previously only in master (the changes introduced by C, F, and G)</a:t>
-            </a:r>
-            <a:endParaRPr lang="en-US" dirty="0" smtClean="0"/>
-          </a:p>
-          <a:p>
-            <a:pPr marL="171450" indent="-171450">
+              <a:t>2 things happens</a:t>
+            </a:r>
+          </a:p>
+          <a:p>
+            <a:pPr marL="628650" lvl="1" indent="-171450">
               <a:buFontTx/>
               <a:buChar char="-"/>
             </a:pPr>
             <a:r>
               <a:rPr lang="en-US" dirty="0" smtClean="0"/>
-              <a:t>notice</a:t>
+              <a:t>the</a:t>
             </a:r>
             <a:r>
               <a:rPr lang="en-US" baseline="0" dirty="0" smtClean="0"/>
-              <a:t> that this commit has 2 parents – this is how GIT knows that H is a merge commit</a:t>
-            </a:r>
-          </a:p>
-          <a:p>
-            <a:pPr marL="171450" indent="-171450">
+              <a:t> HEAD label changes to point to the new branch (my-branch)</a:t>
+            </a:r>
+          </a:p>
+          <a:p>
+            <a:pPr marL="628650" lvl="1" indent="-171450">
               <a:buFontTx/>
               <a:buChar char="-"/>
             </a:pPr>
             <a:r>
               <a:rPr lang="en-US" baseline="0" dirty="0" smtClean="0"/>
-              <a:t>if there are no conflicts, GIT commits automatically, otherwise you need to solve conflicts and the commit yourself</a:t>
-            </a:r>
-          </a:p>
-          <a:p>
-            <a:pPr marL="171450" indent="-171450">
-              <a:buFontTx/>
-              <a:buChar char="-"/>
-            </a:pPr>
-            <a:endParaRPr lang="en-US" dirty="0" smtClean="0"/>
-          </a:p>
-          <a:p>
-            <a:pPr marL="171450" indent="-171450">
-              <a:buFontTx/>
-              <a:buChar char="-"/>
-            </a:pPr>
+              <a:t>the files in the working directory are changed to reflect the state of the files in my-branch</a:t>
+            </a:r>
             <a:endParaRPr dirty="0"/>
           </a:p>
         </p:txBody>
@@ -873,7 +846,7 @@
     </p:spTree>
     <p:extLst>
       <p:ext uri="{BB962C8B-B14F-4D97-AF65-F5344CB8AC3E}">
-        <p14:creationId xmlns:p14="http://schemas.microsoft.com/office/powerpoint/2010/main" val="1408504777"/>
+        <p14:creationId xmlns:p14="http://schemas.microsoft.com/office/powerpoint/2010/main" val="1129209744"/>
       </p:ext>
     </p:extLst>
   </p:cSld>
@@ -931,67 +904,50 @@
             </a:pPr>
             <a:r>
               <a:rPr lang="en-US" dirty="0" smtClean="0"/>
-              <a:t>afte</a:t>
+              <a:t>first a new commit is created (H) that contains all the changes</a:t>
             </a:r>
             <a:r>
               <a:rPr lang="en-US" baseline="0" dirty="0" smtClean="0"/>
-              <a:t>r the commit is created, my-branch is changed to point to the new commit</a:t>
-            </a:r>
-          </a:p>
-          <a:p>
-            <a:pPr marL="0" indent="0">
+              <a:t> that were previously only in master (the changes introduced by C, F, and G)</a:t>
+            </a:r>
+            <a:endParaRPr lang="en-US" dirty="0" smtClean="0"/>
+          </a:p>
+          <a:p>
+            <a:pPr marL="171450" indent="-171450">
               <a:buFontTx/>
-              <a:buNone/>
+              <a:buChar char="-"/>
+            </a:pPr>
+            <a:r>
+              <a:rPr lang="en-US" dirty="0" smtClean="0"/>
+              <a:t>notice</a:t>
+            </a:r>
+            <a:r>
+              <a:rPr lang="en-US" baseline="0" dirty="0" smtClean="0"/>
+              <a:t> that this commit has 2 parents – this is how GIT knows that H is a merge commit</a:t>
+            </a:r>
+          </a:p>
+          <a:p>
+            <a:pPr marL="171450" indent="-171450">
+              <a:buFontTx/>
+              <a:buChar char="-"/>
+            </a:pPr>
+            <a:r>
+              <a:rPr lang="en-US" baseline="0" dirty="0" smtClean="0"/>
+              <a:t>if there are no conflicts, GIT commits automatically, otherwise you need to solve conflicts and the commit yourself</a:t>
+            </a:r>
+          </a:p>
+          <a:p>
+            <a:pPr marL="171450" indent="-171450">
+              <a:buFontTx/>
+              <a:buChar char="-"/>
             </a:pPr>
             <a:endParaRPr lang="en-US" dirty="0" smtClean="0"/>
           </a:p>
           <a:p>
-            <a:pPr marL="0" indent="0">
+            <a:pPr marL="171450" indent="-171450">
               <a:buFontTx/>
-              <a:buNone/>
-            </a:pPr>
-            <a:r>
-              <a:rPr lang="en-US" dirty="0" smtClean="0"/>
-              <a:t>O</a:t>
-            </a:r>
-            <a:r>
-              <a:rPr lang="en-US" baseline="0" dirty="0" smtClean="0"/>
-              <a:t>bservations:</a:t>
-            </a:r>
-          </a:p>
-          <a:p>
-            <a:pPr marL="0" indent="0">
-              <a:buFontTx/>
-              <a:buNone/>
-            </a:pPr>
-            <a:r>
-              <a:rPr lang="en-US" baseline="0" dirty="0" smtClean="0"/>
-              <a:t>- the commit H contains all the changes in commits C, F, and G, so if you try to understand the history without comparing with the master branch, you can be lost</a:t>
-            </a:r>
-          </a:p>
-          <a:p>
-            <a:pPr marL="0" indent="0">
-              <a:buFontTx/>
-              <a:buNone/>
-            </a:pPr>
-            <a:r>
-              <a:rPr lang="en-US" baseline="0" dirty="0" smtClean="0"/>
-              <a:t>- GIT can merge multiple branches at one time (not only 2), but I don’t recommend it since it can get quite difficult to solve conflicts or understand the history later</a:t>
-            </a:r>
-          </a:p>
-          <a:p>
-            <a:pPr marL="0" indent="0">
-              <a:buFontTx/>
-              <a:buNone/>
-            </a:pPr>
-            <a:r>
-              <a:rPr lang="en-US" dirty="0" smtClean="0"/>
-              <a:t>- just because you did not</a:t>
-            </a:r>
-            <a:r>
-              <a:rPr lang="en-US" baseline="0" dirty="0" smtClean="0"/>
-              <a:t> have a conflict it doesn’t mean the merge was successful. Imagine the following scenario: someone on branch A deletes a configuration property, while another developer on branch B creates a class that uses that property. Merging both A and B into master will be successful (no line conflicts), but the result is broken. So, always run the tests after merge. Also, this is one more reason not to merge multiple branches at one time (merge 2 branches multiple times: A into master, then B into master)</a:t>
-            </a:r>
+              <a:buChar char="-"/>
+            </a:pPr>
             <a:endParaRPr dirty="0"/>
           </a:p>
         </p:txBody>
@@ -1040,7 +996,7 @@
     </p:spTree>
     <p:extLst>
       <p:ext uri="{BB962C8B-B14F-4D97-AF65-F5344CB8AC3E}">
-        <p14:creationId xmlns:p14="http://schemas.microsoft.com/office/powerpoint/2010/main" val="4139308719"/>
+        <p14:creationId xmlns:p14="http://schemas.microsoft.com/office/powerpoint/2010/main" val="1408504777"/>
       </p:ext>
     </p:extLst>
   </p:cSld>
@@ -1096,6 +1052,69 @@
               <a:buFontTx/>
               <a:buChar char="-"/>
             </a:pPr>
+            <a:r>
+              <a:rPr lang="en-US" dirty="0" smtClean="0"/>
+              <a:t>afte</a:t>
+            </a:r>
+            <a:r>
+              <a:rPr lang="en-US" baseline="0" dirty="0" smtClean="0"/>
+              <a:t>r the commit is created, my-branch is changed to point to the new commit</a:t>
+            </a:r>
+          </a:p>
+          <a:p>
+            <a:pPr marL="0" indent="0">
+              <a:buFontTx/>
+              <a:buNone/>
+            </a:pPr>
+            <a:endParaRPr lang="en-US" dirty="0" smtClean="0"/>
+          </a:p>
+          <a:p>
+            <a:pPr marL="0" indent="0">
+              <a:buFontTx/>
+              <a:buNone/>
+            </a:pPr>
+            <a:r>
+              <a:rPr lang="en-US" dirty="0" smtClean="0"/>
+              <a:t>O</a:t>
+            </a:r>
+            <a:r>
+              <a:rPr lang="en-US" baseline="0" dirty="0" smtClean="0"/>
+              <a:t>bservations:</a:t>
+            </a:r>
+          </a:p>
+          <a:p>
+            <a:pPr marL="0" indent="0">
+              <a:buFontTx/>
+              <a:buNone/>
+            </a:pPr>
+            <a:r>
+              <a:rPr lang="en-US" baseline="0" dirty="0" smtClean="0"/>
+              <a:t>- the commit H contains all the changes in commits C, F, and G, so if you try to understand the history without comparing with the master branch, you can be lost</a:t>
+            </a:r>
+          </a:p>
+          <a:p>
+            <a:pPr marL="0" indent="0">
+              <a:buFontTx/>
+              <a:buNone/>
+            </a:pPr>
+            <a:r>
+              <a:rPr lang="en-US" baseline="0" dirty="0" smtClean="0"/>
+              <a:t>- GIT can merge multiple branches at one time (not only 2), but I don’t recommend it since it can get quite difficult to solve conflicts or understand the history later</a:t>
+            </a:r>
+          </a:p>
+          <a:p>
+            <a:pPr marL="0" indent="0">
+              <a:buFontTx/>
+              <a:buNone/>
+            </a:pPr>
+            <a:r>
+              <a:rPr lang="en-US" dirty="0" smtClean="0"/>
+              <a:t>- just because you did not</a:t>
+            </a:r>
+            <a:r>
+              <a:rPr lang="en-US" baseline="0" dirty="0" smtClean="0"/>
+              <a:t> have a conflict it doesn’t mean the merge was successful. Imagine the following scenario: someone on branch A deletes a configuration property, while another developer on branch B creates a class that uses that property. Merging both A and B into master will be successful (no line conflicts), but the result is broken. So, always run the tests after merge. Also, this is one more reason not to merge multiple branches at one time (merge 2 branches multiple times: A into master, then B into master)</a:t>
+            </a:r>
             <a:endParaRPr dirty="0"/>
           </a:p>
         </p:txBody>
@@ -1144,7 +1163,7 @@
     </p:spTree>
     <p:extLst>
       <p:ext uri="{BB962C8B-B14F-4D97-AF65-F5344CB8AC3E}">
-        <p14:creationId xmlns:p14="http://schemas.microsoft.com/office/powerpoint/2010/main" val="3985505281"/>
+        <p14:creationId xmlns:p14="http://schemas.microsoft.com/office/powerpoint/2010/main" val="4139308719"/>
       </p:ext>
     </p:extLst>
   </p:cSld>
@@ -1200,24 +1219,6 @@
               <a:buFontTx/>
               <a:buChar char="-"/>
             </a:pPr>
-            <a:r>
-              <a:rPr lang="en-US" dirty="0" smtClean="0"/>
-              <a:t>special kind of merge, if the branches have not diverged</a:t>
-            </a:r>
-          </a:p>
-          <a:p>
-            <a:pPr marL="171450" indent="-171450">
-              <a:buFontTx/>
-              <a:buChar char="-"/>
-            </a:pPr>
-            <a:r>
-              <a:rPr lang="en-US" dirty="0" smtClean="0"/>
-              <a:t>no</a:t>
-            </a:r>
-            <a:r>
-              <a:rPr lang="en-US" baseline="0" dirty="0" smtClean="0"/>
-              <a:t> new commit is created, only the branch label is changed to point to a different commit</a:t>
-            </a:r>
             <a:endParaRPr dirty="0"/>
           </a:p>
         </p:txBody>
@@ -1266,7 +1267,7 @@
     </p:spTree>
     <p:extLst>
       <p:ext uri="{BB962C8B-B14F-4D97-AF65-F5344CB8AC3E}">
-        <p14:creationId xmlns:p14="http://schemas.microsoft.com/office/powerpoint/2010/main" val="1136595489"/>
+        <p14:creationId xmlns:p14="http://schemas.microsoft.com/office/powerpoint/2010/main" val="3985505281"/>
       </p:ext>
     </p:extLst>
   </p:cSld>
@@ -1324,21 +1325,23 @@
             </a:pPr>
             <a:r>
               <a:rPr lang="en-US" dirty="0" smtClean="0"/>
-              <a:t>the problem</a:t>
+              <a:t>special kind of merge, if the branches have not diverged</a:t>
+            </a:r>
+          </a:p>
+          <a:p>
+            <a:pPr marL="171450" indent="-171450">
+              <a:buFontTx/>
+              <a:buChar char="-"/>
+            </a:pPr>
+            <a:r>
+              <a:rPr lang="en-US" dirty="0" smtClean="0"/>
+              <a:t>no</a:t>
             </a:r>
             <a:r>
               <a:rPr lang="en-US" baseline="0" dirty="0" smtClean="0"/>
-              <a:t> with a fast-forward merge is after you do it, you can no longer tell from the history that F and G were developed on a separate branch. If you care about this, you can force GIT to create a commit using a command line argument (“--no-</a:t>
-            </a:r>
-            <a:r>
-              <a:rPr lang="en-US" baseline="0" dirty="0" err="1" smtClean="0"/>
-              <a:t>ff</a:t>
-            </a:r>
-            <a:r>
-              <a:rPr lang="en-US" baseline="0" smtClean="0"/>
-              <a:t>”)</a:t>
-            </a:r>
-            <a:endParaRPr lang="en-US" baseline="0" dirty="0" smtClean="0"/>
+              <a:t> new commit is created, only the branch label is changed to point to a different commit</a:t>
+            </a:r>
+            <a:endParaRPr dirty="0"/>
           </a:p>
         </p:txBody>
       </p:sp>
@@ -1386,7 +1389,7 @@
     </p:spTree>
     <p:extLst>
       <p:ext uri="{BB962C8B-B14F-4D97-AF65-F5344CB8AC3E}">
-        <p14:creationId xmlns:p14="http://schemas.microsoft.com/office/powerpoint/2010/main" val="1736329018"/>
+        <p14:creationId xmlns:p14="http://schemas.microsoft.com/office/powerpoint/2010/main" val="1136595489"/>
       </p:ext>
     </p:extLst>
   </p:cSld>
@@ -1442,7 +1445,23 @@
               <a:buFontTx/>
               <a:buChar char="-"/>
             </a:pPr>
-            <a:endParaRPr dirty="0"/>
+            <a:r>
+              <a:rPr lang="en-US" dirty="0" smtClean="0"/>
+              <a:t>the problem</a:t>
+            </a:r>
+            <a:r>
+              <a:rPr lang="en-US" baseline="0" dirty="0" smtClean="0"/>
+              <a:t> with a fast-forward merge is after you do it, you can no longer tell from the history that F and G were developed on a separate branch. If you care about this, you can force GIT to create a commit using a command line argument (“--no-</a:t>
+            </a:r>
+            <a:r>
+              <a:rPr lang="en-US" baseline="0" dirty="0" err="1" smtClean="0"/>
+              <a:t>ff</a:t>
+            </a:r>
+            <a:r>
+              <a:rPr lang="en-US" baseline="0" smtClean="0"/>
+              <a:t>”)</a:t>
+            </a:r>
+            <a:endParaRPr lang="en-US" baseline="0" dirty="0" smtClean="0"/>
           </a:p>
         </p:txBody>
       </p:sp>
@@ -1490,7 +1509,7 @@
     </p:spTree>
     <p:extLst>
       <p:ext uri="{BB962C8B-B14F-4D97-AF65-F5344CB8AC3E}">
-        <p14:creationId xmlns:p14="http://schemas.microsoft.com/office/powerpoint/2010/main" val="4173674627"/>
+        <p14:creationId xmlns:p14="http://schemas.microsoft.com/office/powerpoint/2010/main" val="1736329018"/>
       </p:ext>
     </p:extLst>
   </p:cSld>
@@ -1594,7 +1613,7 @@
     </p:spTree>
     <p:extLst>
       <p:ext uri="{BB962C8B-B14F-4D97-AF65-F5344CB8AC3E}">
-        <p14:creationId xmlns:p14="http://schemas.microsoft.com/office/powerpoint/2010/main" val="796577067"/>
+        <p14:creationId xmlns:p14="http://schemas.microsoft.com/office/powerpoint/2010/main" val="4173674627"/>
       </p:ext>
     </p:extLst>
   </p:cSld>
@@ -1698,7 +1717,7 @@
     </p:spTree>
     <p:extLst>
       <p:ext uri="{BB962C8B-B14F-4D97-AF65-F5344CB8AC3E}">
-        <p14:creationId xmlns:p14="http://schemas.microsoft.com/office/powerpoint/2010/main" val="2140635485"/>
+        <p14:creationId xmlns:p14="http://schemas.microsoft.com/office/powerpoint/2010/main" val="796577067"/>
       </p:ext>
     </p:extLst>
   </p:cSld>
@@ -1802,7 +1821,7 @@
     </p:spTree>
     <p:extLst>
       <p:ext uri="{BB962C8B-B14F-4D97-AF65-F5344CB8AC3E}">
-        <p14:creationId xmlns:p14="http://schemas.microsoft.com/office/powerpoint/2010/main" val="3219326357"/>
+        <p14:creationId xmlns:p14="http://schemas.microsoft.com/office/powerpoint/2010/main" val="2140635485"/>
       </p:ext>
     </p:extLst>
   </p:cSld>
@@ -2006,7 +2025,7 @@
     </p:spTree>
     <p:extLst>
       <p:ext uri="{BB962C8B-B14F-4D97-AF65-F5344CB8AC3E}">
-        <p14:creationId xmlns:p14="http://schemas.microsoft.com/office/powerpoint/2010/main" val="1650745352"/>
+        <p14:creationId xmlns:p14="http://schemas.microsoft.com/office/powerpoint/2010/main" val="3219326357"/>
       </p:ext>
     </p:extLst>
   </p:cSld>
@@ -2110,7 +2129,7 @@
     </p:spTree>
     <p:extLst>
       <p:ext uri="{BB962C8B-B14F-4D97-AF65-F5344CB8AC3E}">
-        <p14:creationId xmlns:p14="http://schemas.microsoft.com/office/powerpoint/2010/main" val="979907960"/>
+        <p14:creationId xmlns:p14="http://schemas.microsoft.com/office/powerpoint/2010/main" val="1650745352"/>
       </p:ext>
     </p:extLst>
   </p:cSld>
@@ -2214,7 +2233,7 @@
     </p:spTree>
     <p:extLst>
       <p:ext uri="{BB962C8B-B14F-4D97-AF65-F5344CB8AC3E}">
-        <p14:creationId xmlns:p14="http://schemas.microsoft.com/office/powerpoint/2010/main" val="2667286518"/>
+        <p14:creationId xmlns:p14="http://schemas.microsoft.com/office/powerpoint/2010/main" val="979907960"/>
       </p:ext>
     </p:extLst>
   </p:cSld>
@@ -2318,7 +2337,7 @@
     </p:spTree>
     <p:extLst>
       <p:ext uri="{BB962C8B-B14F-4D97-AF65-F5344CB8AC3E}">
-        <p14:creationId xmlns:p14="http://schemas.microsoft.com/office/powerpoint/2010/main" val="890929024"/>
+        <p14:creationId xmlns:p14="http://schemas.microsoft.com/office/powerpoint/2010/main" val="2667286518"/>
       </p:ext>
     </p:extLst>
   </p:cSld>
@@ -2374,46 +2393,6 @@
               <a:buFontTx/>
               <a:buChar char="-"/>
             </a:pPr>
-            <a:r>
-              <a:rPr lang="en-US" baseline="0" dirty="0" smtClean="0"/>
-              <a:t>install GIT</a:t>
-            </a:r>
-          </a:p>
-          <a:p>
-            <a:pPr marL="628650" lvl="1" indent="-171450">
-              <a:buFontTx/>
-              <a:buChar char="-"/>
-            </a:pPr>
-            <a:r>
-              <a:rPr lang="en-US" baseline="0" dirty="0" smtClean="0"/>
-              <a:t>Windows</a:t>
-            </a:r>
-          </a:p>
-          <a:p>
-            <a:pPr marL="628650" lvl="1" indent="-171450">
-              <a:buFontTx/>
-              <a:buChar char="-"/>
-            </a:pPr>
-            <a:r>
-              <a:rPr lang="en-US" baseline="0" dirty="0" smtClean="0"/>
-              <a:t>Mac</a:t>
-            </a:r>
-          </a:p>
-          <a:p>
-            <a:pPr marL="171450" lvl="0" indent="-171450">
-              <a:buFontTx/>
-              <a:buChar char="-"/>
-            </a:pPr>
-            <a:r>
-              <a:rPr lang="en-US" baseline="0" dirty="0" smtClean="0"/>
-              <a:t>setup username and email</a:t>
-            </a:r>
-          </a:p>
-          <a:p>
-            <a:pPr marL="171450" lvl="0" indent="-171450">
-              <a:buFontTx/>
-              <a:buChar char="-"/>
-            </a:pPr>
             <a:endParaRPr dirty="0"/>
           </a:p>
         </p:txBody>
@@ -2462,6 +2441,150 @@
     </p:spTree>
     <p:extLst>
       <p:ext uri="{BB962C8B-B14F-4D97-AF65-F5344CB8AC3E}">
+        <p14:creationId xmlns:p14="http://schemas.microsoft.com/office/powerpoint/2010/main" val="890929024"/>
+      </p:ext>
+    </p:extLst>
+  </p:cSld>
+  <p:clrMapOvr>
+    <a:masterClrMapping/>
+  </p:clrMapOvr>
+</p:notes>
+</file>
+
+<file path=ppt/notesSlides/notesSlide25.xml><?xml version="1.0" encoding="utf-8"?>
+<p:notes xmlns:a="http://schemas.openxmlformats.org/drawingml/2006/main" xmlns:r="http://schemas.openxmlformats.org/officeDocument/2006/relationships" xmlns:p="http://schemas.openxmlformats.org/presentationml/2006/main" showMasterSp="0" showMasterPhAnim="0">
+  <p:cSld>
+    <p:spTree>
+      <p:nvGrpSpPr>
+        <p:cNvPr id="1" name="Shape 98"/>
+        <p:cNvGrpSpPr/>
+        <p:nvPr/>
+      </p:nvGrpSpPr>
+      <p:grpSpPr>
+        <a:xfrm>
+          <a:off x="0" y="0"/>
+          <a:ext cx="0" cy="0"/>
+          <a:chOff x="0" y="0"/>
+          <a:chExt cx="0" cy="0"/>
+        </a:xfrm>
+      </p:grpSpPr>
+      <p:sp>
+        <p:nvSpPr>
+          <p:cNvPr id="99" name="Shape 99"/>
+          <p:cNvSpPr txBox="1">
+            <a:spLocks noGrp="1"/>
+          </p:cNvSpPr>
+          <p:nvPr>
+            <p:ph type="body" idx="1"/>
+          </p:nvPr>
+        </p:nvSpPr>
+        <p:spPr>
+          <a:xfrm>
+            <a:off x="685800" y="4343400"/>
+            <a:ext cx="5486399" cy="4114800"/>
+          </a:xfrm>
+          <a:prstGeom prst="rect">
+            <a:avLst/>
+          </a:prstGeom>
+        </p:spPr>
+        <p:txBody>
+          <a:bodyPr lIns="91425" tIns="91425" rIns="91425" bIns="91425" anchor="ctr" anchorCtr="0">
+            <a:noAutofit/>
+          </a:bodyPr>
+          <a:lstStyle/>
+          <a:p>
+            <a:pPr marL="171450" indent="-171450">
+              <a:buFontTx/>
+              <a:buChar char="-"/>
+            </a:pPr>
+            <a:r>
+              <a:rPr lang="en-US" baseline="0" dirty="0" smtClean="0"/>
+              <a:t>install GIT</a:t>
+            </a:r>
+          </a:p>
+          <a:p>
+            <a:pPr marL="628650" lvl="1" indent="-171450">
+              <a:buFontTx/>
+              <a:buChar char="-"/>
+            </a:pPr>
+            <a:r>
+              <a:rPr lang="en-US" baseline="0" dirty="0" smtClean="0"/>
+              <a:t>Windows</a:t>
+            </a:r>
+          </a:p>
+          <a:p>
+            <a:pPr marL="628650" lvl="1" indent="-171450">
+              <a:buFontTx/>
+              <a:buChar char="-"/>
+            </a:pPr>
+            <a:r>
+              <a:rPr lang="en-US" baseline="0" dirty="0" smtClean="0"/>
+              <a:t>Mac</a:t>
+            </a:r>
+          </a:p>
+          <a:p>
+            <a:pPr marL="171450" lvl="0" indent="-171450">
+              <a:buFontTx/>
+              <a:buChar char="-"/>
+            </a:pPr>
+            <a:r>
+              <a:rPr lang="en-US" baseline="0" dirty="0" smtClean="0"/>
+              <a:t>setup username and email</a:t>
+            </a:r>
+          </a:p>
+          <a:p>
+            <a:pPr marL="171450" lvl="0" indent="-171450">
+              <a:buFontTx/>
+              <a:buChar char="-"/>
+            </a:pPr>
+            <a:endParaRPr dirty="0"/>
+          </a:p>
+        </p:txBody>
+      </p:sp>
+      <p:sp>
+        <p:nvSpPr>
+          <p:cNvPr id="100" name="Shape 100"/>
+          <p:cNvSpPr>
+            <a:spLocks noGrp="1" noRot="1" noChangeAspect="1"/>
+          </p:cNvSpPr>
+          <p:nvPr>
+            <p:ph type="sldImg" idx="2"/>
+          </p:nvPr>
+        </p:nvSpPr>
+        <p:spPr>
+          <a:xfrm>
+            <a:off x="1143000" y="685800"/>
+            <a:ext cx="4572000" cy="3429000"/>
+          </a:xfrm>
+          <a:custGeom>
+            <a:avLst/>
+            <a:gdLst/>
+            <a:ahLst/>
+            <a:cxnLst/>
+            <a:rect l="0" t="0" r="0" b="0"/>
+            <a:pathLst>
+              <a:path w="120000" h="120000" extrusionOk="0">
+                <a:moveTo>
+                  <a:pt x="0" y="0"/>
+                </a:moveTo>
+                <a:lnTo>
+                  <a:pt x="120000" y="0"/>
+                </a:lnTo>
+                <a:lnTo>
+                  <a:pt x="120000" y="120000"/>
+                </a:lnTo>
+                <a:lnTo>
+                  <a:pt x="0" y="120000"/>
+                </a:lnTo>
+                <a:close/>
+              </a:path>
+            </a:pathLst>
+          </a:custGeom>
+        </p:spPr>
+      </p:sp>
+    </p:spTree>
+    <p:extLst>
+      <p:ext uri="{BB962C8B-B14F-4D97-AF65-F5344CB8AC3E}">
         <p14:creationId xmlns:p14="http://schemas.microsoft.com/office/powerpoint/2010/main" val="2666093823"/>
       </p:ext>
     </p:extLst>
@@ -2472,7 +2595,7 @@
 </p:notes>
 </file>
 
-<file path=ppt/notesSlides/notesSlide25.xml><?xml version="1.0" encoding="utf-8"?>
+<file path=ppt/notesSlides/notesSlide26.xml><?xml version="1.0" encoding="utf-8"?>
 <p:notes xmlns:a="http://schemas.openxmlformats.org/drawingml/2006/main" xmlns:r="http://schemas.openxmlformats.org/officeDocument/2006/relationships" xmlns:p="http://schemas.openxmlformats.org/presentationml/2006/main" showMasterSp="0" showMasterPhAnim="0">
   <p:cSld>
     <p:spTree>
@@ -2706,7 +2829,7 @@
     </p:spTree>
     <p:extLst>
       <p:ext uri="{BB962C8B-B14F-4D97-AF65-F5344CB8AC3E}">
-        <p14:creationId xmlns:p14="http://schemas.microsoft.com/office/powerpoint/2010/main" val="2622067385"/>
+        <p14:creationId xmlns:p14="http://schemas.microsoft.com/office/powerpoint/2010/main" val="2392866614"/>
       </p:ext>
     </p:extLst>
   </p:cSld>
@@ -2758,100 +2881,7 @@
           </a:bodyPr>
           <a:lstStyle/>
           <a:p>
-            <a:pPr marL="171450" indent="-171450">
-              <a:buFontTx/>
-              <a:buChar char="-"/>
-            </a:pPr>
-            <a:r>
-              <a:rPr lang="en-US" dirty="0" smtClean="0"/>
-              <a:t>each developer has</a:t>
-            </a:r>
-            <a:r>
-              <a:rPr lang="en-US" baseline="0" dirty="0" smtClean="0"/>
-              <a:t> the entire history</a:t>
-            </a:r>
-          </a:p>
-          <a:p>
-            <a:pPr marL="628650" lvl="1" indent="-171450">
-              <a:buFontTx/>
-              <a:buChar char="-"/>
-            </a:pPr>
-            <a:r>
-              <a:rPr lang="en-US" baseline="0" dirty="0" smtClean="0"/>
-              <a:t>faster than SVN because most operations as local (e.g. log)</a:t>
-            </a:r>
-          </a:p>
-          <a:p>
-            <a:pPr marL="628650" lvl="1" indent="-171450">
-              <a:buFontTx/>
-              <a:buChar char="-"/>
-            </a:pPr>
-            <a:r>
-              <a:rPr lang="en-US" baseline="0" dirty="0" smtClean="0"/>
-              <a:t>side benefit: the repository is backed-up on many more locations (on developer’s computer)</a:t>
-            </a:r>
-          </a:p>
-          <a:p>
-            <a:pPr marL="628650" lvl="1" indent="-171450">
-              <a:buFontTx/>
-              <a:buChar char="-"/>
-            </a:pPr>
-            <a:r>
-              <a:rPr lang="en-US" baseline="0" dirty="0" smtClean="0"/>
-              <a:t>HDD space not a problem</a:t>
-            </a:r>
-          </a:p>
-          <a:p>
-            <a:pPr marL="1085850" lvl="2" indent="-171450">
-              <a:buFontTx/>
-              <a:buChar char="-"/>
-            </a:pPr>
-            <a:r>
-              <a:rPr lang="en-US" baseline="0" dirty="0" smtClean="0"/>
-              <a:t>GIT is very efficient</a:t>
-            </a:r>
-          </a:p>
-          <a:p>
-            <a:pPr marL="1085850" lvl="2" indent="-171450">
-              <a:buFontTx/>
-              <a:buChar char="-"/>
-            </a:pPr>
-            <a:r>
-              <a:rPr lang="en-US" baseline="0" dirty="0" smtClean="0"/>
-              <a:t>HDDs are cheap</a:t>
-            </a:r>
-            <a:endParaRPr lang="en-US" dirty="0" smtClean="0"/>
-          </a:p>
-          <a:p>
-            <a:pPr marL="171450" indent="-171450">
-              <a:buFontTx/>
-              <a:buChar char="-"/>
-            </a:pPr>
-            <a:r>
-              <a:rPr lang="en-US" baseline="0" dirty="0" smtClean="0"/>
-              <a:t>GIT also allows us to have a central repository, it just doesn’t force it</a:t>
-            </a:r>
-          </a:p>
-          <a:p>
-            <a:pPr marL="628650" lvl="1" indent="-171450">
-              <a:buFontTx/>
-              <a:buChar char="-"/>
-            </a:pPr>
-            <a:r>
-              <a:rPr lang="en-US" baseline="0" dirty="0" smtClean="0"/>
-              <a:t>for our projects we will use a central repo for CI</a:t>
-            </a:r>
-          </a:p>
-          <a:p>
-            <a:pPr marL="628650" lvl="1" indent="-171450">
-              <a:buFontTx/>
-              <a:buChar char="-"/>
-            </a:pPr>
-            <a:r>
-              <a:rPr lang="en-US" baseline="0" dirty="0" smtClean="0"/>
-              <a:t>but GIT allows developers to communicate between themselves if needed (e.g. work together on one feature)</a:t>
-            </a:r>
-            <a:endParaRPr dirty="0"/>
+            <a:endParaRPr/>
           </a:p>
         </p:txBody>
       </p:sp>
@@ -2899,7 +2929,7 @@
     </p:spTree>
     <p:extLst>
       <p:ext uri="{BB962C8B-B14F-4D97-AF65-F5344CB8AC3E}">
-        <p14:creationId xmlns:p14="http://schemas.microsoft.com/office/powerpoint/2010/main" val="529022399"/>
+        <p14:creationId xmlns:p14="http://schemas.microsoft.com/office/powerpoint/2010/main" val="2622067385"/>
       </p:ext>
     </p:extLst>
   </p:cSld>
@@ -2955,6 +2985,95 @@
               <a:buFontTx/>
               <a:buChar char="-"/>
             </a:pPr>
+            <a:r>
+              <a:rPr lang="en-US" dirty="0" smtClean="0"/>
+              <a:t>each developer has</a:t>
+            </a:r>
+            <a:r>
+              <a:rPr lang="en-US" baseline="0" dirty="0" smtClean="0"/>
+              <a:t> the entire history</a:t>
+            </a:r>
+          </a:p>
+          <a:p>
+            <a:pPr marL="628650" lvl="1" indent="-171450">
+              <a:buFontTx/>
+              <a:buChar char="-"/>
+            </a:pPr>
+            <a:r>
+              <a:rPr lang="en-US" baseline="0" dirty="0" smtClean="0"/>
+              <a:t>faster than SVN because most operations as local (e.g. log)</a:t>
+            </a:r>
+          </a:p>
+          <a:p>
+            <a:pPr marL="628650" lvl="1" indent="-171450">
+              <a:buFontTx/>
+              <a:buChar char="-"/>
+            </a:pPr>
+            <a:r>
+              <a:rPr lang="en-US" baseline="0" dirty="0" smtClean="0"/>
+              <a:t>side benefit: the repository is backed-up on many more locations (on developer’s computer)</a:t>
+            </a:r>
+          </a:p>
+          <a:p>
+            <a:pPr marL="628650" lvl="1" indent="-171450">
+              <a:buFontTx/>
+              <a:buChar char="-"/>
+            </a:pPr>
+            <a:r>
+              <a:rPr lang="en-US" baseline="0" dirty="0" smtClean="0"/>
+              <a:t>HDD space not a problem</a:t>
+            </a:r>
+          </a:p>
+          <a:p>
+            <a:pPr marL="1085850" lvl="2" indent="-171450">
+              <a:buFontTx/>
+              <a:buChar char="-"/>
+            </a:pPr>
+            <a:r>
+              <a:rPr lang="en-US" baseline="0" dirty="0" smtClean="0"/>
+              <a:t>GIT is very efficient</a:t>
+            </a:r>
+          </a:p>
+          <a:p>
+            <a:pPr marL="1085850" lvl="2" indent="-171450">
+              <a:buFontTx/>
+              <a:buChar char="-"/>
+            </a:pPr>
+            <a:r>
+              <a:rPr lang="en-US" baseline="0" dirty="0" smtClean="0"/>
+              <a:t>HDDs are cheap</a:t>
+            </a:r>
+            <a:endParaRPr lang="en-US" dirty="0" smtClean="0"/>
+          </a:p>
+          <a:p>
+            <a:pPr marL="171450" indent="-171450">
+              <a:buFontTx/>
+              <a:buChar char="-"/>
+            </a:pPr>
+            <a:r>
+              <a:rPr lang="en-US" baseline="0" dirty="0" smtClean="0"/>
+              <a:t>GIT also allows us to have a central repository, it just doesn’t force it</a:t>
+            </a:r>
+          </a:p>
+          <a:p>
+            <a:pPr marL="628650" lvl="1" indent="-171450">
+              <a:buFontTx/>
+              <a:buChar char="-"/>
+            </a:pPr>
+            <a:r>
+              <a:rPr lang="en-US" baseline="0" dirty="0" smtClean="0"/>
+              <a:t>for our projects we will use a central repo for CI</a:t>
+            </a:r>
+          </a:p>
+          <a:p>
+            <a:pPr marL="628650" lvl="1" indent="-171450">
+              <a:buFontTx/>
+              <a:buChar char="-"/>
+            </a:pPr>
+            <a:r>
+              <a:rPr lang="en-US" baseline="0" dirty="0" smtClean="0"/>
+              <a:t>but GIT allows developers to communicate between themselves if needed (e.g. work together on one feature)</a:t>
+            </a:r>
             <a:endParaRPr dirty="0"/>
           </a:p>
         </p:txBody>
@@ -3003,7 +3122,7 @@
     </p:spTree>
     <p:extLst>
       <p:ext uri="{BB962C8B-B14F-4D97-AF65-F5344CB8AC3E}">
-        <p14:creationId xmlns:p14="http://schemas.microsoft.com/office/powerpoint/2010/main" val="1554615446"/>
+        <p14:creationId xmlns:p14="http://schemas.microsoft.com/office/powerpoint/2010/main" val="529022399"/>
       </p:ext>
     </p:extLst>
   </p:cSld>
@@ -3055,9 +3174,9 @@
           </a:bodyPr>
           <a:lstStyle/>
           <a:p>
-            <a:pPr marL="0" indent="0">
+            <a:pPr marL="171450" indent="-171450">
               <a:buFontTx/>
-              <a:buNone/>
+              <a:buChar char="-"/>
             </a:pPr>
             <a:endParaRPr dirty="0"/>
           </a:p>
@@ -3107,7 +3226,7 @@
     </p:spTree>
     <p:extLst>
       <p:ext uri="{BB962C8B-B14F-4D97-AF65-F5344CB8AC3E}">
-        <p14:creationId xmlns:p14="http://schemas.microsoft.com/office/powerpoint/2010/main" val="4021709295"/>
+        <p14:creationId xmlns:p14="http://schemas.microsoft.com/office/powerpoint/2010/main" val="1554615446"/>
       </p:ext>
     </p:extLst>
   </p:cSld>
@@ -3159,76 +3278,10 @@
           </a:bodyPr>
           <a:lstStyle/>
           <a:p>
-            <a:pPr marL="171450" indent="-171450">
-              <a:buFontTx/>
-              <a:buChar char="-"/>
-            </a:pPr>
-            <a:r>
-              <a:rPr lang="en-US" baseline="0" dirty="0" smtClean="0"/>
-              <a:t>DAG (directed acyclic graph) of commits</a:t>
-            </a:r>
-          </a:p>
-          <a:p>
-            <a:pPr marL="171450" indent="-171450">
-              <a:buFontTx/>
-              <a:buChar char="-"/>
-            </a:pPr>
-            <a:r>
-              <a:rPr lang="en-US" baseline="0" dirty="0" smtClean="0"/>
-              <a:t>each commit points to its parent</a:t>
-            </a:r>
-          </a:p>
-          <a:p>
-            <a:pPr marL="171450" indent="-171450">
-              <a:buFontTx/>
-              <a:buChar char="-"/>
-            </a:pPr>
-            <a:r>
-              <a:rPr lang="en-US" baseline="0" dirty="0" smtClean="0"/>
-              <a:t>a branch is a label pointing to a particular node in the </a:t>
-            </a:r>
-            <a:r>
-              <a:rPr lang="en-US" baseline="0" dirty="0" smtClean="0"/>
-              <a:t>graph</a:t>
-            </a:r>
-          </a:p>
-          <a:p>
-            <a:pPr marL="628650" lvl="1" indent="-171450">
-              <a:buFontTx/>
-              <a:buChar char="-"/>
-            </a:pPr>
-            <a:r>
-              <a:rPr lang="en-US" baseline="0" dirty="0" smtClean="0"/>
-              <a:t>because of the parent-child link between commits, we say that “commit E is on branch my-branch” because it’s reachable from my-branch. Commits A and B are on both branches (my-branch and master)</a:t>
-            </a:r>
-            <a:endParaRPr lang="en-US" baseline="0" dirty="0" smtClean="0"/>
-          </a:p>
-          <a:p>
-            <a:pPr marL="171450" indent="-171450">
-              <a:buFontTx/>
-              <a:buChar char="-"/>
-            </a:pPr>
-            <a:r>
-              <a:rPr lang="en-US" baseline="0" dirty="0" smtClean="0"/>
-              <a:t>the special label “HEAD” points to the current branch (that’s how GIT know what is the current branch)</a:t>
-            </a:r>
-          </a:p>
-          <a:p>
-            <a:pPr marL="171450" indent="-171450">
-              <a:buFontTx/>
-              <a:buChar char="-"/>
-            </a:pPr>
-            <a:endParaRPr lang="en-US" baseline="0" dirty="0" smtClean="0"/>
-          </a:p>
-          <a:p>
             <a:pPr marL="0" indent="0">
               <a:buFontTx/>
               <a:buNone/>
             </a:pPr>
-            <a:r>
-              <a:rPr lang="en-US" baseline="0" dirty="0" smtClean="0"/>
-              <a:t>We will use this kind of diagrams to explain GIT commands</a:t>
-            </a:r>
             <a:endParaRPr dirty="0"/>
           </a:p>
         </p:txBody>
@@ -3277,7 +3330,7 @@
     </p:spTree>
     <p:extLst>
       <p:ext uri="{BB962C8B-B14F-4D97-AF65-F5344CB8AC3E}">
-        <p14:creationId xmlns:p14="http://schemas.microsoft.com/office/powerpoint/2010/main" val="2936528267"/>
+        <p14:creationId xmlns:p14="http://schemas.microsoft.com/office/powerpoint/2010/main" val="4021709295"/>
       </p:ext>
     </p:extLst>
   </p:cSld>
@@ -3334,12 +3387,65 @@
               <a:buChar char="-"/>
             </a:pPr>
             <a:r>
-              <a:rPr lang="en-US" dirty="0" smtClean="0"/>
-              <a:t>first a commit is added with</a:t>
-            </a:r>
-            <a:r>
               <a:rPr lang="en-US" baseline="0" dirty="0" smtClean="0"/>
-              <a:t> its parent pointing to the current commit (which is HEAD)</a:t>
+              <a:t>DAG (directed acyclic graph) of commits</a:t>
+            </a:r>
+          </a:p>
+          <a:p>
+            <a:pPr marL="171450" indent="-171450">
+              <a:buFontTx/>
+              <a:buChar char="-"/>
+            </a:pPr>
+            <a:r>
+              <a:rPr lang="en-US" baseline="0" dirty="0" smtClean="0"/>
+              <a:t>each commit points to its parent</a:t>
+            </a:r>
+          </a:p>
+          <a:p>
+            <a:pPr marL="171450" indent="-171450">
+              <a:buFontTx/>
+              <a:buChar char="-"/>
+            </a:pPr>
+            <a:r>
+              <a:rPr lang="en-US" baseline="0" dirty="0" smtClean="0"/>
+              <a:t>a branch is a label pointing to a particular node in the graph</a:t>
+            </a:r>
+          </a:p>
+          <a:p>
+            <a:pPr marL="628650" lvl="1" indent="-171450">
+              <a:buFontTx/>
+              <a:buChar char="-"/>
+            </a:pPr>
+            <a:r>
+              <a:rPr lang="en-US" baseline="0" dirty="0" smtClean="0"/>
+              <a:t>because of the parent-child link between commits, we say that “commit E is on branch my-branch” because it’s reachable from my-branch. Commits A and B are on both branches (my-branch and master)</a:t>
+            </a:r>
+          </a:p>
+          <a:p>
+            <a:pPr marL="171450" indent="-171450">
+              <a:buFontTx/>
+              <a:buChar char="-"/>
+            </a:pPr>
+            <a:r>
+              <a:rPr lang="en-US" baseline="0" dirty="0" smtClean="0"/>
+              <a:t>the special label “HEAD” points to the current branch (that’s how GIT know what is the current branch)</a:t>
+            </a:r>
+          </a:p>
+          <a:p>
+            <a:pPr marL="171450" indent="-171450">
+              <a:buFontTx/>
+              <a:buChar char="-"/>
+            </a:pPr>
+            <a:endParaRPr lang="en-US" baseline="0" dirty="0" smtClean="0"/>
+          </a:p>
+          <a:p>
+            <a:pPr marL="0" indent="0">
+              <a:buFontTx/>
+              <a:buNone/>
+            </a:pPr>
+            <a:r>
+              <a:rPr lang="en-US" baseline="0" dirty="0" smtClean="0"/>
+              <a:t>We will use this kind of diagrams to explain GIT commands</a:t>
             </a:r>
             <a:endParaRPr dirty="0"/>
           </a:p>
@@ -3389,7 +3495,7 @@
     </p:spTree>
     <p:extLst>
       <p:ext uri="{BB962C8B-B14F-4D97-AF65-F5344CB8AC3E}">
-        <p14:creationId xmlns:p14="http://schemas.microsoft.com/office/powerpoint/2010/main" val="3009485542"/>
+        <p14:creationId xmlns:p14="http://schemas.microsoft.com/office/powerpoint/2010/main" val="2936528267"/>
       </p:ext>
     </p:extLst>
   </p:cSld>
@@ -3447,21 +3553,11 @@
             </a:pPr>
             <a:r>
               <a:rPr lang="en-US" dirty="0" smtClean="0"/>
-              <a:t>after that the</a:t>
+              <a:t>first a commit is added with</a:t>
             </a:r>
             <a:r>
               <a:rPr lang="en-US" baseline="0" dirty="0" smtClean="0"/>
-              <a:t> master branch is modified to point to the new commit</a:t>
-            </a:r>
-          </a:p>
-          <a:p>
-            <a:pPr marL="171450" indent="-171450">
-              <a:buFontTx/>
-              <a:buChar char="-"/>
-            </a:pPr>
-            <a:r>
-              <a:rPr lang="en-US" baseline="0" dirty="0" smtClean="0"/>
-              <a:t>notice that HEAD did not change – it still points to the master branch, because we didn’t changed branches</a:t>
+              <a:t> its parent pointing to the current commit (which is HEAD)</a:t>
             </a:r>
             <a:endParaRPr dirty="0"/>
           </a:p>
@@ -3511,7 +3607,7 @@
     </p:spTree>
     <p:extLst>
       <p:ext uri="{BB962C8B-B14F-4D97-AF65-F5344CB8AC3E}">
-        <p14:creationId xmlns:p14="http://schemas.microsoft.com/office/powerpoint/2010/main" val="789771486"/>
+        <p14:creationId xmlns:p14="http://schemas.microsoft.com/office/powerpoint/2010/main" val="3009485542"/>
       </p:ext>
     </p:extLst>
   </p:cSld>
@@ -8663,7 +8759,7 @@
             </a:pPr>
             <a:r>
               <a:rPr lang="en-US" sz="3600" dirty="0" smtClean="0"/>
-              <a:t>GIT checkout my-branch</a:t>
+              <a:t>GIT commit / 2 of 2</a:t>
             </a:r>
             <a:endParaRPr lang="en-US" sz="3600" dirty="0"/>
           </a:p>
@@ -8671,7 +8767,7 @@
       </p:sp>
       <p:pic>
         <p:nvPicPr>
-          <p:cNvPr id="3" name="Picture 2"/>
+          <p:cNvPr id="2" name="Picture 1"/>
           <p:cNvPicPr>
             <a:picLocks noChangeAspect="1"/>
           </p:cNvPicPr>
@@ -8691,8 +8787,8 @@
         </p:blipFill>
         <p:spPr>
           <a:xfrm>
-            <a:off x="818284" y="2215492"/>
-            <a:ext cx="7543800" cy="3695700"/>
+            <a:off x="800100" y="1566862"/>
+            <a:ext cx="7543800" cy="3724275"/>
           </a:xfrm>
           <a:prstGeom prst="rect">
             <a:avLst/>
@@ -8702,7 +8798,7 @@
     </p:spTree>
     <p:extLst>
       <p:ext uri="{BB962C8B-B14F-4D97-AF65-F5344CB8AC3E}">
-        <p14:creationId xmlns:p14="http://schemas.microsoft.com/office/powerpoint/2010/main" val="305243239"/>
+        <p14:creationId xmlns:p14="http://schemas.microsoft.com/office/powerpoint/2010/main" val="3927573702"/>
       </p:ext>
     </p:extLst>
   </p:cSld>
@@ -8814,12 +8910,8 @@
               <a:buSzPct val="25000"/>
             </a:pPr>
             <a:r>
-              <a:rPr lang="en-US" sz="3600" dirty="0"/>
-              <a:t>GIT </a:t>
-            </a:r>
-            <a:r>
               <a:rPr lang="en-US" sz="3600" dirty="0" smtClean="0"/>
-              <a:t>merge master into my-branch /1 of 2</a:t>
+              <a:t>GIT checkout my-branch</a:t>
             </a:r>
             <a:endParaRPr lang="en-US" sz="3600" dirty="0"/>
           </a:p>
@@ -8847,8 +8939,8 @@
         </p:blipFill>
         <p:spPr>
           <a:xfrm>
-            <a:off x="1233487" y="1609725"/>
-            <a:ext cx="6677025" cy="3638550"/>
+            <a:off x="818284" y="2215492"/>
+            <a:ext cx="7543800" cy="3695700"/>
           </a:xfrm>
           <a:prstGeom prst="rect">
             <a:avLst/>
@@ -8858,7 +8950,7 @@
     </p:spTree>
     <p:extLst>
       <p:ext uri="{BB962C8B-B14F-4D97-AF65-F5344CB8AC3E}">
-        <p14:creationId xmlns:p14="http://schemas.microsoft.com/office/powerpoint/2010/main" val="264915446"/>
+        <p14:creationId xmlns:p14="http://schemas.microsoft.com/office/powerpoint/2010/main" val="305243239"/>
       </p:ext>
     </p:extLst>
   </p:cSld>
@@ -8975,7 +9067,7 @@
             </a:r>
             <a:r>
               <a:rPr lang="en-US" sz="3600" dirty="0" smtClean="0"/>
-              <a:t>merge master into my-branch /2 of 2</a:t>
+              <a:t>merge master into my-branch /1 of 2</a:t>
             </a:r>
             <a:endParaRPr lang="en-US" sz="3600" dirty="0"/>
           </a:p>
@@ -8983,7 +9075,7 @@
       </p:sp>
       <p:pic>
         <p:nvPicPr>
-          <p:cNvPr id="2" name="Picture 1"/>
+          <p:cNvPr id="3" name="Picture 2"/>
           <p:cNvPicPr>
             <a:picLocks noChangeAspect="1"/>
           </p:cNvPicPr>
@@ -9003,8 +9095,8 @@
         </p:blipFill>
         <p:spPr>
           <a:xfrm>
-            <a:off x="1119187" y="1595437"/>
-            <a:ext cx="6905625" cy="3667125"/>
+            <a:off x="1233487" y="1609725"/>
+            <a:ext cx="6677025" cy="3638550"/>
           </a:xfrm>
           <a:prstGeom prst="rect">
             <a:avLst/>
@@ -9014,7 +9106,7 @@
     </p:spTree>
     <p:extLst>
       <p:ext uri="{BB962C8B-B14F-4D97-AF65-F5344CB8AC3E}">
-        <p14:creationId xmlns:p14="http://schemas.microsoft.com/office/powerpoint/2010/main" val="876445211"/>
+        <p14:creationId xmlns:p14="http://schemas.microsoft.com/office/powerpoint/2010/main" val="264915446"/>
       </p:ext>
     </p:extLst>
   </p:cSld>
@@ -9131,7 +9223,7 @@
             </a:r>
             <a:r>
               <a:rPr lang="en-US" sz="3600" dirty="0" smtClean="0"/>
-              <a:t>fast-forward merges</a:t>
+              <a:t>merge master into my-branch /2 of 2</a:t>
             </a:r>
             <a:endParaRPr lang="en-US" sz="3600" dirty="0"/>
           </a:p>
@@ -9139,7 +9231,7 @@
       </p:sp>
       <p:pic>
         <p:nvPicPr>
-          <p:cNvPr id="4" name="Picture 3"/>
+          <p:cNvPr id="2" name="Picture 1"/>
           <p:cNvPicPr>
             <a:picLocks noChangeAspect="1"/>
           </p:cNvPicPr>
@@ -9159,8 +9251,8 @@
         </p:blipFill>
         <p:spPr>
           <a:xfrm>
-            <a:off x="2090737" y="1928812"/>
-            <a:ext cx="4962525" cy="3000375"/>
+            <a:off x="1119187" y="1595437"/>
+            <a:ext cx="6905625" cy="3667125"/>
           </a:xfrm>
           <a:prstGeom prst="rect">
             <a:avLst/>
@@ -9170,7 +9262,7 @@
     </p:spTree>
     <p:extLst>
       <p:ext uri="{BB962C8B-B14F-4D97-AF65-F5344CB8AC3E}">
-        <p14:creationId xmlns:p14="http://schemas.microsoft.com/office/powerpoint/2010/main" val="1465636522"/>
+        <p14:creationId xmlns:p14="http://schemas.microsoft.com/office/powerpoint/2010/main" val="876445211"/>
       </p:ext>
     </p:extLst>
   </p:cSld>
@@ -9287,7 +9379,7 @@
             </a:r>
             <a:r>
               <a:rPr lang="en-US" sz="3600" dirty="0" smtClean="0"/>
-              <a:t>fast-forward merge my-branch into master</a:t>
+              <a:t>fast-forward merges</a:t>
             </a:r>
             <a:endParaRPr lang="en-US" sz="3600" dirty="0"/>
           </a:p>
@@ -9295,7 +9387,7 @@
       </p:sp>
       <p:pic>
         <p:nvPicPr>
-          <p:cNvPr id="2" name="Picture 1"/>
+          <p:cNvPr id="4" name="Picture 3"/>
           <p:cNvPicPr>
             <a:picLocks noChangeAspect="1"/>
           </p:cNvPicPr>
@@ -9315,8 +9407,8 @@
         </p:blipFill>
         <p:spPr>
           <a:xfrm>
-            <a:off x="2090737" y="1933575"/>
-            <a:ext cx="4962525" cy="2990850"/>
+            <a:off x="2090737" y="1928812"/>
+            <a:ext cx="4962525" cy="3000375"/>
           </a:xfrm>
           <a:prstGeom prst="rect">
             <a:avLst/>
@@ -9326,7 +9418,7 @@
     </p:spTree>
     <p:extLst>
       <p:ext uri="{BB962C8B-B14F-4D97-AF65-F5344CB8AC3E}">
-        <p14:creationId xmlns:p14="http://schemas.microsoft.com/office/powerpoint/2010/main" val="4060379651"/>
+        <p14:creationId xmlns:p14="http://schemas.microsoft.com/office/powerpoint/2010/main" val="1465636522"/>
       </p:ext>
     </p:extLst>
   </p:cSld>
@@ -9443,15 +9535,7 @@
             </a:r>
             <a:r>
               <a:rPr lang="en-US" sz="3600" dirty="0" smtClean="0"/>
-              <a:t>merge my-branch into master forcing non-fast-forward (--no-</a:t>
-            </a:r>
-            <a:r>
-              <a:rPr lang="en-US" sz="3600" dirty="0" err="1" smtClean="0"/>
-              <a:t>ff</a:t>
-            </a:r>
-            <a:r>
-              <a:rPr lang="en-US" sz="3600" dirty="0" smtClean="0"/>
-              <a:t>)</a:t>
+              <a:t>fast-forward merge my-branch into master</a:t>
             </a:r>
             <a:endParaRPr lang="en-US" sz="3600" dirty="0"/>
           </a:p>
@@ -9479,8 +9563,8 @@
         </p:blipFill>
         <p:spPr>
           <a:xfrm>
-            <a:off x="1614487" y="1543050"/>
-            <a:ext cx="5915025" cy="3771900"/>
+            <a:off x="2090737" y="1933575"/>
+            <a:ext cx="4962525" cy="2990850"/>
           </a:xfrm>
           <a:prstGeom prst="rect">
             <a:avLst/>
@@ -9490,7 +9574,7 @@
     </p:spTree>
     <p:extLst>
       <p:ext uri="{BB962C8B-B14F-4D97-AF65-F5344CB8AC3E}">
-        <p14:creationId xmlns:p14="http://schemas.microsoft.com/office/powerpoint/2010/main" val="3900762246"/>
+        <p14:creationId xmlns:p14="http://schemas.microsoft.com/office/powerpoint/2010/main" val="4060379651"/>
       </p:ext>
     </p:extLst>
   </p:cSld>
@@ -9568,18 +9652,18 @@
       </p:sp>
       <p:sp>
         <p:nvSpPr>
-          <p:cNvPr id="96" name="Shape 96"/>
+          <p:cNvPr id="97" name="Shape 97"/>
           <p:cNvSpPr txBox="1">
             <a:spLocks noGrp="1"/>
           </p:cNvSpPr>
           <p:nvPr>
-            <p:ph type="body" idx="1"/>
-          </p:nvPr>
-        </p:nvSpPr>
-        <p:spPr>
-          <a:xfrm>
-            <a:off x="341167" y="937873"/>
-            <a:ext cx="8498033" cy="5024690"/>
+            <p:ph type="body" idx="2"/>
+          </p:nvPr>
+        </p:nvSpPr>
+        <p:spPr>
+          <a:xfrm>
+            <a:off x="341168" y="228026"/>
+            <a:ext cx="8498032" cy="457199"/>
           </a:xfrm>
           <a:prstGeom prst="rect">
             <a:avLst/>
@@ -9595,83 +9679,6 @@
           </a:bodyPr>
           <a:lstStyle/>
           <a:p>
-            <a:pPr marL="355600" indent="-355600">
-              <a:lnSpc>
-                <a:spcPct val="90000"/>
-              </a:lnSpc>
-              <a:buClr>
-                <a:srgbClr val="2E3640"/>
-              </a:buClr>
-              <a:buSzPct val="100000"/>
-              <a:buBlip>
-                <a:blip r:embed="rId3"/>
-              </a:buBlip>
-            </a:pPr>
-            <a:r>
-              <a:rPr lang="en-US" sz="2400" dirty="0" smtClean="0"/>
-              <a:t>stuff</a:t>
-            </a:r>
-            <a:endParaRPr lang="en-US" sz="2400" dirty="0" smtClean="0">
-              <a:sym typeface="Wingdings" panose="05000000000000000000" pitchFamily="2" charset="2"/>
-            </a:endParaRPr>
-          </a:p>
-          <a:p>
-            <a:pPr>
-              <a:lnSpc>
-                <a:spcPct val="90000"/>
-              </a:lnSpc>
-              <a:buClr>
-                <a:srgbClr val="2E3640"/>
-              </a:buClr>
-              <a:buSzPct val="100000"/>
-            </a:pPr>
-            <a:endParaRPr lang="en-US" sz="2400" dirty="0">
-              <a:sym typeface="Wingdings" panose="05000000000000000000" pitchFamily="2" charset="2"/>
-            </a:endParaRPr>
-          </a:p>
-          <a:p>
-            <a:pPr>
-              <a:lnSpc>
-                <a:spcPct val="90000"/>
-              </a:lnSpc>
-              <a:buClr>
-                <a:srgbClr val="2E3640"/>
-              </a:buClr>
-              <a:buSzPct val="100000"/>
-            </a:pPr>
-            <a:endParaRPr lang="en-US" sz="2400" dirty="0" smtClean="0"/>
-          </a:p>
-        </p:txBody>
-      </p:sp>
-      <p:sp>
-        <p:nvSpPr>
-          <p:cNvPr id="97" name="Shape 97"/>
-          <p:cNvSpPr txBox="1">
-            <a:spLocks noGrp="1"/>
-          </p:cNvSpPr>
-          <p:nvPr>
-            <p:ph type="body" idx="2"/>
-          </p:nvPr>
-        </p:nvSpPr>
-        <p:spPr>
-          <a:xfrm>
-            <a:off x="341168" y="228026"/>
-            <a:ext cx="8498032" cy="457199"/>
-          </a:xfrm>
-          <a:prstGeom prst="rect">
-            <a:avLst/>
-          </a:prstGeom>
-          <a:noFill/>
-          <a:ln>
-            <a:noFill/>
-          </a:ln>
-        </p:spPr>
-        <p:txBody>
-          <a:bodyPr lIns="68569" tIns="34275" rIns="68569" bIns="34275" anchor="t" anchorCtr="0">
-            <a:noAutofit/>
-          </a:bodyPr>
-          <a:lstStyle/>
-          <a:p>
             <a:pPr>
               <a:buClr>
                 <a:schemeClr val="accent2"/>
@@ -9679,17 +9686,59 @@
               <a:buSzPct val="25000"/>
             </a:pPr>
             <a:r>
+              <a:rPr lang="en-US" sz="3600" dirty="0"/>
+              <a:t>GIT </a:t>
+            </a:r>
+            <a:r>
               <a:rPr lang="en-US" sz="3600" dirty="0" smtClean="0"/>
-              <a:t>Title</a:t>
+              <a:t>merge my-branch into master forcing non-fast-forward (--no-</a:t>
+            </a:r>
+            <a:r>
+              <a:rPr lang="en-US" sz="3600" dirty="0" err="1" smtClean="0"/>
+              <a:t>ff</a:t>
+            </a:r>
+            <a:r>
+              <a:rPr lang="en-US" sz="3600" dirty="0" smtClean="0"/>
+              <a:t>)</a:t>
             </a:r>
             <a:endParaRPr lang="en-US" sz="3600" dirty="0"/>
           </a:p>
         </p:txBody>
       </p:sp>
+      <p:pic>
+        <p:nvPicPr>
+          <p:cNvPr id="2" name="Picture 1"/>
+          <p:cNvPicPr>
+            <a:picLocks noChangeAspect="1"/>
+          </p:cNvPicPr>
+          <p:nvPr/>
+        </p:nvPicPr>
+        <p:blipFill>
+          <a:blip r:embed="rId3">
+            <a:extLst>
+              <a:ext uri="{28A0092B-C50C-407E-A947-70E740481C1C}">
+                <a14:useLocalDpi xmlns:a14="http://schemas.microsoft.com/office/drawing/2010/main" val="0"/>
+              </a:ext>
+            </a:extLst>
+          </a:blip>
+          <a:stretch>
+            <a:fillRect/>
+          </a:stretch>
+        </p:blipFill>
+        <p:spPr>
+          <a:xfrm>
+            <a:off x="1614487" y="1543050"/>
+            <a:ext cx="5915025" cy="3771900"/>
+          </a:xfrm>
+          <a:prstGeom prst="rect">
+            <a:avLst/>
+          </a:prstGeom>
+        </p:spPr>
+      </p:pic>
     </p:spTree>
     <p:extLst>
       <p:ext uri="{BB962C8B-B14F-4D97-AF65-F5344CB8AC3E}">
-        <p14:creationId xmlns:p14="http://schemas.microsoft.com/office/powerpoint/2010/main" val="2519039036"/>
+        <p14:creationId xmlns:p14="http://schemas.microsoft.com/office/powerpoint/2010/main" val="3900762246"/>
       </p:ext>
     </p:extLst>
   </p:cSld>
@@ -9888,7 +9937,7 @@
     </p:spTree>
     <p:extLst>
       <p:ext uri="{BB962C8B-B14F-4D97-AF65-F5344CB8AC3E}">
-        <p14:creationId xmlns:p14="http://schemas.microsoft.com/office/powerpoint/2010/main" val="396525421"/>
+        <p14:creationId xmlns:p14="http://schemas.microsoft.com/office/powerpoint/2010/main" val="2519039036"/>
       </p:ext>
     </p:extLst>
   </p:cSld>
@@ -10087,7 +10136,7 @@
     </p:spTree>
     <p:extLst>
       <p:ext uri="{BB962C8B-B14F-4D97-AF65-F5344CB8AC3E}">
-        <p14:creationId xmlns:p14="http://schemas.microsoft.com/office/powerpoint/2010/main" val="695698909"/>
+        <p14:creationId xmlns:p14="http://schemas.microsoft.com/office/powerpoint/2010/main" val="396525421"/>
       </p:ext>
     </p:extLst>
   </p:cSld>
@@ -10286,7 +10335,7 @@
     </p:spTree>
     <p:extLst>
       <p:ext uri="{BB962C8B-B14F-4D97-AF65-F5344CB8AC3E}">
-        <p14:creationId xmlns:p14="http://schemas.microsoft.com/office/powerpoint/2010/main" val="2915095849"/>
+        <p14:creationId xmlns:p14="http://schemas.microsoft.com/office/powerpoint/2010/main" val="695698909"/>
       </p:ext>
     </p:extLst>
   </p:cSld>
@@ -10431,7 +10480,29 @@
             </a:pPr>
             <a:r>
               <a:rPr lang="en-US" sz="2400" dirty="0" smtClean="0"/>
-              <a:t> Compared with SVN</a:t>
+              <a:t>Tools </a:t>
+            </a:r>
+          </a:p>
+          <a:p>
+            <a:pPr marL="641350" lvl="5" indent="-285750">
+              <a:lnSpc>
+                <a:spcPct val="150000"/>
+              </a:lnSpc>
+              <a:buClr>
+                <a:srgbClr val="2E3640"/>
+              </a:buClr>
+              <a:buSzPct val="100000"/>
+              <a:buBlip>
+                <a:blip r:embed="rId4"/>
+              </a:buBlip>
+            </a:pPr>
+            <a:r>
+              <a:rPr lang="en-US" sz="2400" dirty="0" smtClean="0"/>
+              <a:t>Compared </a:t>
+            </a:r>
+            <a:r>
+              <a:rPr lang="en-US" sz="2400" dirty="0" smtClean="0"/>
+              <a:t>with SVN</a:t>
             </a:r>
           </a:p>
           <a:p>
@@ -10766,7 +10837,7 @@
     </p:spTree>
     <p:extLst>
       <p:ext uri="{BB962C8B-B14F-4D97-AF65-F5344CB8AC3E}">
-        <p14:creationId xmlns:p14="http://schemas.microsoft.com/office/powerpoint/2010/main" val="893865620"/>
+        <p14:creationId xmlns:p14="http://schemas.microsoft.com/office/powerpoint/2010/main" val="2915095849"/>
       </p:ext>
     </p:extLst>
   </p:cSld>
@@ -10965,7 +11036,7 @@
     </p:spTree>
     <p:extLst>
       <p:ext uri="{BB962C8B-B14F-4D97-AF65-F5344CB8AC3E}">
-        <p14:creationId xmlns:p14="http://schemas.microsoft.com/office/powerpoint/2010/main" val="2176611703"/>
+        <p14:creationId xmlns:p14="http://schemas.microsoft.com/office/powerpoint/2010/main" val="893865620"/>
       </p:ext>
     </p:extLst>
   </p:cSld>
@@ -11164,7 +11235,7 @@
     </p:spTree>
     <p:extLst>
       <p:ext uri="{BB962C8B-B14F-4D97-AF65-F5344CB8AC3E}">
-        <p14:creationId xmlns:p14="http://schemas.microsoft.com/office/powerpoint/2010/main" val="2978980850"/>
+        <p14:creationId xmlns:p14="http://schemas.microsoft.com/office/powerpoint/2010/main" val="2176611703"/>
       </p:ext>
     </p:extLst>
   </p:cSld>
@@ -11363,7 +11434,7 @@
     </p:spTree>
     <p:extLst>
       <p:ext uri="{BB962C8B-B14F-4D97-AF65-F5344CB8AC3E}">
-        <p14:creationId xmlns:p14="http://schemas.microsoft.com/office/powerpoint/2010/main" val="2675765428"/>
+        <p14:creationId xmlns:p14="http://schemas.microsoft.com/office/powerpoint/2010/main" val="2978980850"/>
       </p:ext>
     </p:extLst>
   </p:cSld>
@@ -11482,7 +11553,7 @@
             </a:pPr>
             <a:r>
               <a:rPr lang="en-US" sz="2400" dirty="0" smtClean="0"/>
-              <a:t>Time to get the hands dirty</a:t>
+              <a:t>stuff</a:t>
             </a:r>
             <a:endParaRPr lang="en-US" sz="2400" dirty="0" smtClean="0">
               <a:sym typeface="Wingdings" panose="05000000000000000000" pitchFamily="2" charset="2"/>
@@ -11553,50 +11624,16 @@
             </a:pPr>
             <a:r>
               <a:rPr lang="en-US" sz="3600" dirty="0" smtClean="0"/>
-              <a:t>Hands-on </a:t>
-            </a:r>
-            <a:r>
-              <a:rPr lang="en-US" sz="3600" dirty="0" err="1" smtClean="0"/>
-              <a:t>Workshow</a:t>
+              <a:t>Title</a:t>
             </a:r>
             <a:endParaRPr lang="en-US" sz="3600" dirty="0"/>
           </a:p>
         </p:txBody>
       </p:sp>
-      <p:pic>
-        <p:nvPicPr>
-          <p:cNvPr id="2" name="Picture 1"/>
-          <p:cNvPicPr>
-            <a:picLocks noChangeAspect="1"/>
-          </p:cNvPicPr>
-          <p:nvPr/>
-        </p:nvPicPr>
-        <p:blipFill>
-          <a:blip r:embed="rId4" cstate="print">
-            <a:extLst>
-              <a:ext uri="{28A0092B-C50C-407E-A947-70E740481C1C}">
-                <a14:useLocalDpi xmlns:a14="http://schemas.microsoft.com/office/drawing/2010/main" val="0"/>
-              </a:ext>
-            </a:extLst>
-          </a:blip>
-          <a:stretch>
-            <a:fillRect/>
-          </a:stretch>
-        </p:blipFill>
-        <p:spPr>
-          <a:xfrm>
-            <a:off x="1744403" y="1514354"/>
-            <a:ext cx="5529699" cy="4479801"/>
-          </a:xfrm>
-          <a:prstGeom prst="rect">
-            <a:avLst/>
-          </a:prstGeom>
-        </p:spPr>
-      </p:pic>
     </p:spTree>
     <p:extLst>
       <p:ext uri="{BB962C8B-B14F-4D97-AF65-F5344CB8AC3E}">
-        <p14:creationId xmlns:p14="http://schemas.microsoft.com/office/powerpoint/2010/main" val="2075129891"/>
+        <p14:creationId xmlns:p14="http://schemas.microsoft.com/office/powerpoint/2010/main" val="2675765428"/>
       </p:ext>
     </p:extLst>
   </p:cSld>
@@ -11714,10 +11751,225 @@
               </a:buBlip>
             </a:pPr>
             <a:r>
-              <a:rPr lang="en-US" sz="2000" dirty="0" smtClean="0"/>
-              <a:t>install GIT</a:t>
-            </a:r>
-          </a:p>
+              <a:rPr lang="en-US" sz="2400" dirty="0" smtClean="0"/>
+              <a:t>Time to get the hands dirty</a:t>
+            </a:r>
+            <a:endParaRPr lang="en-US" sz="2400" dirty="0" smtClean="0">
+              <a:sym typeface="Wingdings" panose="05000000000000000000" pitchFamily="2" charset="2"/>
+            </a:endParaRPr>
+          </a:p>
+          <a:p>
+            <a:pPr>
+              <a:lnSpc>
+                <a:spcPct val="90000"/>
+              </a:lnSpc>
+              <a:buClr>
+                <a:srgbClr val="2E3640"/>
+              </a:buClr>
+              <a:buSzPct val="100000"/>
+            </a:pPr>
+            <a:endParaRPr lang="en-US" sz="2400" dirty="0">
+              <a:sym typeface="Wingdings" panose="05000000000000000000" pitchFamily="2" charset="2"/>
+            </a:endParaRPr>
+          </a:p>
+          <a:p>
+            <a:pPr>
+              <a:lnSpc>
+                <a:spcPct val="90000"/>
+              </a:lnSpc>
+              <a:buClr>
+                <a:srgbClr val="2E3640"/>
+              </a:buClr>
+              <a:buSzPct val="100000"/>
+            </a:pPr>
+            <a:endParaRPr lang="en-US" sz="2400" dirty="0" smtClean="0"/>
+          </a:p>
+        </p:txBody>
+      </p:sp>
+      <p:sp>
+        <p:nvSpPr>
+          <p:cNvPr id="97" name="Shape 97"/>
+          <p:cNvSpPr txBox="1">
+            <a:spLocks noGrp="1"/>
+          </p:cNvSpPr>
+          <p:nvPr>
+            <p:ph type="body" idx="2"/>
+          </p:nvPr>
+        </p:nvSpPr>
+        <p:spPr>
+          <a:xfrm>
+            <a:off x="341168" y="228026"/>
+            <a:ext cx="8498032" cy="457199"/>
+          </a:xfrm>
+          <a:prstGeom prst="rect">
+            <a:avLst/>
+          </a:prstGeom>
+          <a:noFill/>
+          <a:ln>
+            <a:noFill/>
+          </a:ln>
+        </p:spPr>
+        <p:txBody>
+          <a:bodyPr lIns="68569" tIns="34275" rIns="68569" bIns="34275" anchor="t" anchorCtr="0">
+            <a:noAutofit/>
+          </a:bodyPr>
+          <a:lstStyle/>
+          <a:p>
+            <a:pPr>
+              <a:buClr>
+                <a:schemeClr val="accent2"/>
+              </a:buClr>
+              <a:buSzPct val="25000"/>
+            </a:pPr>
+            <a:r>
+              <a:rPr lang="en-US" sz="3600" dirty="0" smtClean="0"/>
+              <a:t>Hands-on </a:t>
+            </a:r>
+            <a:r>
+              <a:rPr lang="en-US" sz="3600" dirty="0" err="1" smtClean="0"/>
+              <a:t>Workshow</a:t>
+            </a:r>
+            <a:endParaRPr lang="en-US" sz="3600" dirty="0"/>
+          </a:p>
+        </p:txBody>
+      </p:sp>
+      <p:pic>
+        <p:nvPicPr>
+          <p:cNvPr id="2" name="Picture 1"/>
+          <p:cNvPicPr>
+            <a:picLocks noChangeAspect="1"/>
+          </p:cNvPicPr>
+          <p:nvPr/>
+        </p:nvPicPr>
+        <p:blipFill>
+          <a:blip r:embed="rId4" cstate="print">
+            <a:extLst>
+              <a:ext uri="{28A0092B-C50C-407E-A947-70E740481C1C}">
+                <a14:useLocalDpi xmlns:a14="http://schemas.microsoft.com/office/drawing/2010/main" val="0"/>
+              </a:ext>
+            </a:extLst>
+          </a:blip>
+          <a:stretch>
+            <a:fillRect/>
+          </a:stretch>
+        </p:blipFill>
+        <p:spPr>
+          <a:xfrm>
+            <a:off x="1744403" y="1514354"/>
+            <a:ext cx="5529699" cy="4479801"/>
+          </a:xfrm>
+          <a:prstGeom prst="rect">
+            <a:avLst/>
+          </a:prstGeom>
+        </p:spPr>
+      </p:pic>
+    </p:spTree>
+    <p:extLst>
+      <p:ext uri="{BB962C8B-B14F-4D97-AF65-F5344CB8AC3E}">
+        <p14:creationId xmlns:p14="http://schemas.microsoft.com/office/powerpoint/2010/main" val="2075129891"/>
+      </p:ext>
+    </p:extLst>
+  </p:cSld>
+  <p:clrMapOvr>
+    <a:masterClrMapping/>
+  </p:clrMapOvr>
+  <p:transition spd="slow">
+    <p:cut/>
+  </p:transition>
+  <p:timing>
+    <p:tnLst>
+      <p:par>
+        <p:cTn id="1" dur="indefinite" restart="never" nodeType="tmRoot"/>
+      </p:par>
+    </p:tnLst>
+  </p:timing>
+</p:sld>
+</file>
+
+<file path=ppt/slides/slide26.xml><?xml version="1.0" encoding="utf-8"?>
+<p:sld xmlns:a="http://schemas.openxmlformats.org/drawingml/2006/main" xmlns:r="http://schemas.openxmlformats.org/officeDocument/2006/relationships" xmlns:p="http://schemas.openxmlformats.org/presentationml/2006/main">
+  <p:cSld>
+    <p:spTree>
+      <p:nvGrpSpPr>
+        <p:cNvPr id="1" name="Shape 93"/>
+        <p:cNvGrpSpPr/>
+        <p:nvPr/>
+      </p:nvGrpSpPr>
+      <p:grpSpPr>
+        <a:xfrm>
+          <a:off x="0" y="0"/>
+          <a:ext cx="0" cy="0"/>
+          <a:chOff x="0" y="0"/>
+          <a:chExt cx="0" cy="0"/>
+        </a:xfrm>
+      </p:grpSpPr>
+      <p:sp>
+        <p:nvSpPr>
+          <p:cNvPr id="95" name="Shape 95"/>
+          <p:cNvSpPr txBox="1">
+            <a:spLocks noGrp="1"/>
+          </p:cNvSpPr>
+          <p:nvPr>
+            <p:ph type="sldNum" idx="12"/>
+          </p:nvPr>
+        </p:nvSpPr>
+        <p:spPr>
+          <a:xfrm>
+            <a:off x="7600950" y="5688719"/>
+            <a:ext cx="269142" cy="273844"/>
+          </a:xfrm>
+          <a:prstGeom prst="rect">
+            <a:avLst/>
+          </a:prstGeom>
+          <a:noFill/>
+          <a:ln>
+            <a:noFill/>
+          </a:ln>
+        </p:spPr>
+        <p:txBody>
+          <a:bodyPr lIns="68569" tIns="34275" rIns="68569" bIns="34275" anchor="ctr" anchorCtr="0">
+            <a:noAutofit/>
+          </a:bodyPr>
+          <a:lstStyle/>
+          <a:p>
+            <a:pPr>
+              <a:buSzPct val="25000"/>
+            </a:pPr>
+            <a:r>
+              <a:rPr lang="en-US"/>
+              <a:t> </a:t>
+            </a:r>
+          </a:p>
+        </p:txBody>
+      </p:sp>
+      <p:sp>
+        <p:nvSpPr>
+          <p:cNvPr id="96" name="Shape 96"/>
+          <p:cNvSpPr txBox="1">
+            <a:spLocks noGrp="1"/>
+          </p:cNvSpPr>
+          <p:nvPr>
+            <p:ph type="body" idx="1"/>
+          </p:nvPr>
+        </p:nvSpPr>
+        <p:spPr>
+          <a:xfrm>
+            <a:off x="341167" y="937873"/>
+            <a:ext cx="8498033" cy="5024690"/>
+          </a:xfrm>
+          <a:prstGeom prst="rect">
+            <a:avLst/>
+          </a:prstGeom>
+          <a:noFill/>
+          <a:ln>
+            <a:noFill/>
+          </a:ln>
+        </p:spPr>
+        <p:txBody>
+          <a:bodyPr lIns="68569" tIns="34275" rIns="68569" bIns="34275" anchor="t" anchorCtr="0">
+            <a:noAutofit/>
+          </a:bodyPr>
+          <a:lstStyle/>
           <a:p>
             <a:pPr marL="355600" indent="-355600">
               <a:lnSpc>
@@ -11732,10 +11984,8 @@
               </a:buBlip>
             </a:pPr>
             <a:r>
-              <a:rPr lang="en-US" sz="2000" dirty="0" smtClean="0">
-                <a:sym typeface="Wingdings" panose="05000000000000000000" pitchFamily="2" charset="2"/>
-              </a:rPr>
-              <a:t>setup username, password, editor</a:t>
+              <a:rPr lang="en-US" sz="2000" dirty="0" smtClean="0"/>
+              <a:t>install GIT</a:t>
             </a:r>
           </a:p>
           <a:p>
@@ -11755,6 +12005,26 @@
               <a:rPr lang="en-US" sz="2000" dirty="0" smtClean="0">
                 <a:sym typeface="Wingdings" panose="05000000000000000000" pitchFamily="2" charset="2"/>
               </a:rPr>
+              <a:t>setup username, password, editor</a:t>
+            </a:r>
+          </a:p>
+          <a:p>
+            <a:pPr marL="355600" indent="-355600">
+              <a:lnSpc>
+                <a:spcPct val="90000"/>
+              </a:lnSpc>
+              <a:buClr>
+                <a:srgbClr val="2E3640"/>
+              </a:buClr>
+              <a:buSzPct val="100000"/>
+              <a:buBlip>
+                <a:blip r:embed="rId3"/>
+              </a:buBlip>
+            </a:pPr>
+            <a:r>
+              <a:rPr lang="en-US" sz="2000" dirty="0" smtClean="0">
+                <a:sym typeface="Wingdings" panose="05000000000000000000" pitchFamily="2" charset="2"/>
+              </a:rPr>
               <a:t>commands</a:t>
             </a:r>
           </a:p>
@@ -12020,13 +12290,7 @@
               <a:rPr lang="en-US" sz="2000" dirty="0" smtClean="0">
                 <a:sym typeface="Wingdings" panose="05000000000000000000" pitchFamily="2" charset="2"/>
               </a:rPr>
-              <a:t> rebase [--interactive</a:t>
-            </a:r>
-            <a:r>
-              <a:rPr lang="en-US" sz="2000" dirty="0" smtClean="0">
-                <a:sym typeface="Wingdings" panose="05000000000000000000" pitchFamily="2" charset="2"/>
-              </a:rPr>
-              <a:t>]</a:t>
+              <a:t> rebase [--interactive]</a:t>
             </a:r>
           </a:p>
           <a:p>
@@ -12054,9 +12318,6 @@
               </a:rPr>
               <a:t> cherry-pick</a:t>
             </a:r>
-            <a:endParaRPr lang="en-US" sz="2000" dirty="0" smtClean="0">
-              <a:sym typeface="Wingdings" panose="05000000000000000000" pitchFamily="2" charset="2"/>
-            </a:endParaRPr>
           </a:p>
           <a:p>
             <a:pPr marL="893763" indent="-355600">
@@ -12220,17 +12481,8 @@
               <a:rPr lang="en-US" sz="2000" dirty="0" smtClean="0">
                 <a:sym typeface="Wingdings" panose="05000000000000000000" pitchFamily="2" charset="2"/>
               </a:rPr>
-              <a:t> </a:t>
-            </a:r>
-            <a:r>
-              <a:rPr lang="en-US" sz="2000" dirty="0" smtClean="0">
-                <a:sym typeface="Wingdings" panose="05000000000000000000" pitchFamily="2" charset="2"/>
-              </a:rPr>
-              <a:t>tag</a:t>
-            </a:r>
-            <a:endParaRPr lang="en-US" sz="2000" dirty="0" smtClean="0">
-              <a:sym typeface="Wingdings" panose="05000000000000000000" pitchFamily="2" charset="2"/>
-            </a:endParaRPr>
+              <a:t> tag</a:t>
+            </a:r>
           </a:p>
         </p:txBody>
       </p:sp>
@@ -12362,18 +12614,18 @@
       </p:sp>
       <p:sp>
         <p:nvSpPr>
-          <p:cNvPr id="97" name="Shape 97"/>
+          <p:cNvPr id="96" name="Shape 96"/>
           <p:cNvSpPr txBox="1">
             <a:spLocks noGrp="1"/>
           </p:cNvSpPr>
           <p:nvPr>
-            <p:ph type="body" idx="2"/>
-          </p:nvPr>
-        </p:nvSpPr>
-        <p:spPr>
-          <a:xfrm>
-            <a:off x="341168" y="228026"/>
-            <a:ext cx="8498032" cy="457199"/>
+            <p:ph type="body" idx="1"/>
+          </p:nvPr>
+        </p:nvSpPr>
+        <p:spPr>
+          <a:xfrm>
+            <a:off x="341167" y="937873"/>
+            <a:ext cx="8498033" cy="5024690"/>
           </a:xfrm>
           <a:prstGeom prst="rect">
             <a:avLst/>
@@ -12389,6 +12641,204 @@
           </a:bodyPr>
           <a:lstStyle/>
           <a:p>
+            <a:pPr marL="342900" indent="-342900">
+              <a:lnSpc>
+                <a:spcPct val="150000"/>
+              </a:lnSpc>
+              <a:buClr>
+                <a:srgbClr val="2E3640"/>
+              </a:buClr>
+              <a:buSzPct val="100000"/>
+              <a:buBlip>
+                <a:blip r:embed="rId3"/>
+              </a:buBlip>
+            </a:pPr>
+            <a:r>
+              <a:rPr lang="en-US" sz="2400" dirty="0" smtClean="0"/>
+              <a:t>command line – required by other tools                   (</a:t>
+            </a:r>
+            <a:r>
+              <a:rPr lang="en-US" sz="2400" dirty="0" smtClean="0">
+                <a:hlinkClick r:id="rId4"/>
+              </a:rPr>
+              <a:t>http://git-scm.com/downloads</a:t>
+            </a:r>
+            <a:r>
+              <a:rPr lang="en-US" sz="2400" dirty="0" smtClean="0"/>
+              <a:t>)</a:t>
+            </a:r>
+          </a:p>
+          <a:p>
+            <a:pPr marL="342900" indent="-342900">
+              <a:lnSpc>
+                <a:spcPct val="150000"/>
+              </a:lnSpc>
+              <a:buClr>
+                <a:srgbClr val="2E3640"/>
+              </a:buClr>
+              <a:buSzPct val="100000"/>
+              <a:buBlip>
+                <a:blip r:embed="rId3"/>
+              </a:buBlip>
+            </a:pPr>
+            <a:r>
+              <a:rPr lang="en-US" sz="2400" dirty="0" smtClean="0"/>
+              <a:t>Windows-only: </a:t>
+            </a:r>
+            <a:r>
+              <a:rPr lang="en-US" sz="2400" dirty="0" err="1" smtClean="0"/>
+              <a:t>TortoiseGit</a:t>
+            </a:r>
+            <a:r>
+              <a:rPr lang="en-US" sz="2400" dirty="0" smtClean="0"/>
+              <a:t> </a:t>
+            </a:r>
+            <a:r>
+              <a:rPr lang="en-US" sz="2400" dirty="0"/>
+              <a:t>(</a:t>
+            </a:r>
+            <a:r>
+              <a:rPr lang="en-US" sz="2400" dirty="0">
+                <a:hlinkClick r:id="rId5"/>
+              </a:rPr>
+              <a:t>https://</a:t>
+            </a:r>
+            <a:r>
+              <a:rPr lang="en-US" sz="2400" dirty="0" smtClean="0">
+                <a:hlinkClick r:id="rId5"/>
+              </a:rPr>
+              <a:t>code.google.com/p/tortoisegit/wiki/Download</a:t>
+            </a:r>
+            <a:r>
+              <a:rPr lang="en-US" sz="2400" dirty="0" smtClean="0"/>
+              <a:t>)</a:t>
+            </a:r>
+          </a:p>
+          <a:p>
+            <a:pPr marL="342900" indent="-342900">
+              <a:lnSpc>
+                <a:spcPct val="150000"/>
+              </a:lnSpc>
+              <a:buClr>
+                <a:srgbClr val="2E3640"/>
+              </a:buClr>
+              <a:buSzPct val="100000"/>
+              <a:buBlip>
+                <a:blip r:embed="rId3"/>
+              </a:buBlip>
+            </a:pPr>
+            <a:r>
+              <a:rPr lang="en-US" sz="2400" dirty="0" err="1" smtClean="0"/>
+              <a:t>SourceTree</a:t>
+            </a:r>
+            <a:r>
+              <a:rPr lang="en-US" sz="2400" dirty="0"/>
+              <a:t> (</a:t>
+            </a:r>
+            <a:r>
+              <a:rPr lang="en-US" sz="2400" dirty="0">
+                <a:hlinkClick r:id="rId6"/>
+              </a:rPr>
+              <a:t>http://www.sourcetreeapp.com</a:t>
+            </a:r>
+            <a:r>
+              <a:rPr lang="en-US" sz="2400" dirty="0" smtClean="0">
+                <a:hlinkClick r:id="rId6"/>
+              </a:rPr>
+              <a:t>/</a:t>
+            </a:r>
+            <a:r>
+              <a:rPr lang="en-US" sz="2400" dirty="0" smtClean="0"/>
+              <a:t>)</a:t>
+            </a:r>
+          </a:p>
+          <a:p>
+            <a:pPr marL="342900" indent="-342900">
+              <a:lnSpc>
+                <a:spcPct val="150000"/>
+              </a:lnSpc>
+              <a:buClr>
+                <a:srgbClr val="2E3640"/>
+              </a:buClr>
+              <a:buSzPct val="100000"/>
+              <a:buBlip>
+                <a:blip r:embed="rId3"/>
+              </a:buBlip>
+            </a:pPr>
+            <a:r>
+              <a:rPr lang="en-US" sz="2400" dirty="0" err="1" smtClean="0"/>
+              <a:t>IntelliJ</a:t>
+            </a:r>
+            <a:r>
+              <a:rPr lang="en-US" sz="2400" dirty="0"/>
+              <a:t> (</a:t>
+            </a:r>
+            <a:r>
+              <a:rPr lang="en-US" sz="2400" dirty="0">
+                <a:hlinkClick r:id="rId7"/>
+              </a:rPr>
+              <a:t>http://www.jetbrains.com/idea/download</a:t>
+            </a:r>
+            <a:r>
+              <a:rPr lang="en-US" sz="2400" dirty="0" smtClean="0">
+                <a:hlinkClick r:id="rId7"/>
+              </a:rPr>
+              <a:t>/</a:t>
+            </a:r>
+            <a:r>
+              <a:rPr lang="en-US" sz="2400" dirty="0" smtClean="0"/>
+              <a:t>)</a:t>
+            </a:r>
+          </a:p>
+          <a:p>
+            <a:pPr marL="342900" indent="-342900">
+              <a:lnSpc>
+                <a:spcPct val="150000"/>
+              </a:lnSpc>
+              <a:buClr>
+                <a:srgbClr val="2E3640"/>
+              </a:buClr>
+              <a:buSzPct val="100000"/>
+              <a:buBlip>
+                <a:blip r:embed="rId3"/>
+              </a:buBlip>
+            </a:pPr>
+            <a:r>
+              <a:rPr lang="en-US" sz="2400" dirty="0" smtClean="0"/>
+              <a:t>etc.</a:t>
+            </a:r>
+          </a:p>
+        </p:txBody>
+      </p:sp>
+      <p:sp>
+        <p:nvSpPr>
+          <p:cNvPr id="97" name="Shape 97"/>
+          <p:cNvSpPr txBox="1">
+            <a:spLocks noGrp="1"/>
+          </p:cNvSpPr>
+          <p:nvPr>
+            <p:ph type="body" idx="2"/>
+          </p:nvPr>
+        </p:nvSpPr>
+        <p:spPr>
+          <a:xfrm>
+            <a:off x="341168" y="228026"/>
+            <a:ext cx="8498032" cy="457199"/>
+          </a:xfrm>
+          <a:prstGeom prst="rect">
+            <a:avLst/>
+          </a:prstGeom>
+          <a:noFill/>
+          <a:ln>
+            <a:noFill/>
+          </a:ln>
+        </p:spPr>
+        <p:txBody>
+          <a:bodyPr lIns="68569" tIns="34275" rIns="68569" bIns="34275" anchor="t" anchorCtr="0">
+            <a:noAutofit/>
+          </a:bodyPr>
+          <a:lstStyle/>
+          <a:p>
             <a:pPr>
               <a:buClr>
                 <a:schemeClr val="accent2"/>
@@ -12397,57 +12847,16 @@
             </a:pPr>
             <a:r>
               <a:rPr lang="en-US" sz="3600" dirty="0" smtClean="0"/>
-              <a:t>GIT vs. SVN</a:t>
+              <a:t>Tools</a:t>
             </a:r>
             <a:endParaRPr lang="en-US" sz="3600" dirty="0"/>
           </a:p>
         </p:txBody>
       </p:sp>
-      <p:pic>
-        <p:nvPicPr>
-          <p:cNvPr id="1028" name="Picture 4" descr="http://theopak.com/assets/blog/2012/version-control_vs.png"/>
-          <p:cNvPicPr>
-            <a:picLocks noChangeAspect="1" noChangeArrowheads="1"/>
-          </p:cNvPicPr>
-          <p:nvPr/>
-        </p:nvPicPr>
-        <p:blipFill>
-          <a:blip r:embed="rId3">
-            <a:extLst>
-              <a:ext uri="{28A0092B-C50C-407E-A947-70E740481C1C}">
-                <a14:useLocalDpi xmlns:a14="http://schemas.microsoft.com/office/drawing/2010/main" val="0"/>
-              </a:ext>
-            </a:extLst>
-          </a:blip>
-          <a:srcRect/>
-          <a:stretch>
-            <a:fillRect/>
-          </a:stretch>
-        </p:blipFill>
-        <p:spPr bwMode="auto">
-          <a:xfrm>
-            <a:off x="341168" y="1304999"/>
-            <a:ext cx="8394522" cy="3847491"/>
-          </a:xfrm>
-          <a:prstGeom prst="rect">
-            <a:avLst/>
-          </a:prstGeom>
-          <a:noFill/>
-          <a:extLst>
-            <a:ext uri="{909E8E84-426E-40DD-AFC4-6F175D3DCCD1}">
-              <a14:hiddenFill xmlns:a14="http://schemas.microsoft.com/office/drawing/2010/main">
-                <a:solidFill>
-                  <a:srgbClr val="FFFFFF"/>
-                </a:solidFill>
-              </a14:hiddenFill>
-            </a:ext>
-          </a:extLst>
-        </p:spPr>
-      </p:pic>
     </p:spTree>
     <p:extLst>
       <p:ext uri="{BB962C8B-B14F-4D97-AF65-F5344CB8AC3E}">
-        <p14:creationId xmlns:p14="http://schemas.microsoft.com/office/powerpoint/2010/main" val="1006578245"/>
+        <p14:creationId xmlns:p14="http://schemas.microsoft.com/office/powerpoint/2010/main" val="1549631399"/>
       </p:ext>
     </p:extLst>
   </p:cSld>
@@ -12525,18 +12934,18 @@
       </p:sp>
       <p:sp>
         <p:nvSpPr>
-          <p:cNvPr id="96" name="Shape 96"/>
+          <p:cNvPr id="97" name="Shape 97"/>
           <p:cNvSpPr txBox="1">
             <a:spLocks noGrp="1"/>
           </p:cNvSpPr>
           <p:nvPr>
-            <p:ph type="body" idx="1"/>
-          </p:nvPr>
-        </p:nvSpPr>
-        <p:spPr>
-          <a:xfrm>
-            <a:off x="341167" y="937873"/>
-            <a:ext cx="8498033" cy="5024690"/>
+            <p:ph type="body" idx="2"/>
+          </p:nvPr>
+        </p:nvSpPr>
+        <p:spPr>
+          <a:xfrm>
+            <a:off x="341168" y="228026"/>
+            <a:ext cx="8498032" cy="457199"/>
           </a:xfrm>
           <a:prstGeom prst="rect">
             <a:avLst/>
@@ -12552,86 +12961,6 @@
           </a:bodyPr>
           <a:lstStyle/>
           <a:p>
-            <a:pPr marL="355600" indent="-355600">
-              <a:lnSpc>
-                <a:spcPct val="90000"/>
-              </a:lnSpc>
-              <a:buClr>
-                <a:srgbClr val="2E3640"/>
-              </a:buClr>
-              <a:buSzPct val="100000"/>
-              <a:buBlip>
-                <a:blip r:embed="rId3"/>
-              </a:buBlip>
-            </a:pPr>
-            <a:r>
-              <a:rPr lang="en-US" sz="2400" dirty="0" smtClean="0"/>
-              <a:t>GIT is distributed, SVN is not </a:t>
-            </a:r>
-            <a:r>
-              <a:rPr lang="en-US" sz="2400" dirty="0" smtClean="0">
-                <a:sym typeface="Wingdings" panose="05000000000000000000" pitchFamily="2" charset="2"/>
-              </a:rPr>
-              <a:t> more flexibility</a:t>
-            </a:r>
-          </a:p>
-          <a:p>
-            <a:pPr>
-              <a:lnSpc>
-                <a:spcPct val="90000"/>
-              </a:lnSpc>
-              <a:buClr>
-                <a:srgbClr val="2E3640"/>
-              </a:buClr>
-              <a:buSzPct val="100000"/>
-            </a:pPr>
-            <a:endParaRPr lang="en-US" sz="2400" dirty="0">
-              <a:sym typeface="Wingdings" panose="05000000000000000000" pitchFamily="2" charset="2"/>
-            </a:endParaRPr>
-          </a:p>
-          <a:p>
-            <a:pPr>
-              <a:lnSpc>
-                <a:spcPct val="90000"/>
-              </a:lnSpc>
-              <a:buClr>
-                <a:srgbClr val="2E3640"/>
-              </a:buClr>
-              <a:buSzPct val="100000"/>
-            </a:pPr>
-            <a:endParaRPr lang="en-US" sz="2400" dirty="0" smtClean="0"/>
-          </a:p>
-        </p:txBody>
-      </p:sp>
-      <p:sp>
-        <p:nvSpPr>
-          <p:cNvPr id="97" name="Shape 97"/>
-          <p:cNvSpPr txBox="1">
-            <a:spLocks noGrp="1"/>
-          </p:cNvSpPr>
-          <p:nvPr>
-            <p:ph type="body" idx="2"/>
-          </p:nvPr>
-        </p:nvSpPr>
-        <p:spPr>
-          <a:xfrm>
-            <a:off x="341168" y="228026"/>
-            <a:ext cx="8498032" cy="457199"/>
-          </a:xfrm>
-          <a:prstGeom prst="rect">
-            <a:avLst/>
-          </a:prstGeom>
-          <a:noFill/>
-          <a:ln>
-            <a:noFill/>
-          </a:ln>
-        </p:spPr>
-        <p:txBody>
-          <a:bodyPr lIns="68569" tIns="34275" rIns="68569" bIns="34275" anchor="t" anchorCtr="0">
-            <a:noAutofit/>
-          </a:bodyPr>
-          <a:lstStyle/>
-          <a:p>
             <a:pPr>
               <a:buClr>
                 <a:schemeClr val="accent2"/>
@@ -12639,12 +12968,8 @@
               <a:buSzPct val="25000"/>
             </a:pPr>
             <a:r>
-              <a:rPr lang="en-US" sz="3600" dirty="0"/>
-              <a:t>GIT vs. </a:t>
-            </a:r>
-            <a:r>
               <a:rPr lang="en-US" sz="3600" dirty="0" smtClean="0"/>
-              <a:t>SVN / Distribution / Repositories</a:t>
+              <a:t>GIT vs. SVN</a:t>
             </a:r>
             <a:endParaRPr lang="en-US" sz="3600" dirty="0"/>
           </a:p>
@@ -12652,38 +12977,49 @@
       </p:sp>
       <p:pic>
         <p:nvPicPr>
-          <p:cNvPr id="3" name="Picture 2"/>
+          <p:cNvPr id="1028" name="Picture 4" descr="http://theopak.com/assets/blog/2012/version-control_vs.png"/>
           <p:cNvPicPr>
-            <a:picLocks noChangeAspect="1"/>
+            <a:picLocks noChangeAspect="1" noChangeArrowheads="1"/>
           </p:cNvPicPr>
           <p:nvPr/>
         </p:nvPicPr>
         <p:blipFill>
-          <a:blip r:embed="rId4">
+          <a:blip r:embed="rId3">
             <a:extLst>
               <a:ext uri="{28A0092B-C50C-407E-A947-70E740481C1C}">
                 <a14:useLocalDpi xmlns:a14="http://schemas.microsoft.com/office/drawing/2010/main" val="0"/>
               </a:ext>
             </a:extLst>
           </a:blip>
+          <a:srcRect/>
           <a:stretch>
             <a:fillRect/>
           </a:stretch>
         </p:blipFill>
-        <p:spPr>
-          <a:xfrm>
-            <a:off x="856070" y="1304999"/>
-            <a:ext cx="7983130" cy="5183851"/>
-          </a:xfrm>
-          <a:prstGeom prst="rect">
-            <a:avLst/>
-          </a:prstGeom>
+        <p:spPr bwMode="auto">
+          <a:xfrm>
+            <a:off x="341168" y="1304999"/>
+            <a:ext cx="8394522" cy="3847491"/>
+          </a:xfrm>
+          <a:prstGeom prst="rect">
+            <a:avLst/>
+          </a:prstGeom>
+          <a:noFill/>
+          <a:extLst>
+            <a:ext uri="{909E8E84-426E-40DD-AFC4-6F175D3DCCD1}">
+              <a14:hiddenFill xmlns:a14="http://schemas.microsoft.com/office/drawing/2010/main">
+                <a:solidFill>
+                  <a:srgbClr val="FFFFFF"/>
+                </a:solidFill>
+              </a14:hiddenFill>
+            </a:ext>
+          </a:extLst>
         </p:spPr>
       </p:pic>
     </p:spTree>
     <p:extLst>
       <p:ext uri="{BB962C8B-B14F-4D97-AF65-F5344CB8AC3E}">
-        <p14:creationId xmlns:p14="http://schemas.microsoft.com/office/powerpoint/2010/main" val="3360973859"/>
+        <p14:creationId xmlns:p14="http://schemas.microsoft.com/office/powerpoint/2010/main" val="1006578245"/>
       </p:ext>
     </p:extLst>
   </p:cSld>
@@ -12802,11 +13138,14 @@
             </a:pPr>
             <a:r>
               <a:rPr lang="en-US" sz="2400" dirty="0" smtClean="0"/>
-              <a:t>GIT has real branches (DAG), SVN has linear history with simulated branches (just directories)</a:t>
-            </a:r>
-            <a:endParaRPr lang="en-US" sz="2400" dirty="0" smtClean="0">
-              <a:sym typeface="Wingdings" panose="05000000000000000000" pitchFamily="2" charset="2"/>
-            </a:endParaRPr>
+              <a:t>GIT is distributed, SVN is not </a:t>
+            </a:r>
+            <a:r>
+              <a:rPr lang="en-US" sz="2400" dirty="0" smtClean="0">
+                <a:sym typeface="Wingdings" panose="05000000000000000000" pitchFamily="2" charset="2"/>
+              </a:rPr>
+              <a:t> more flexibility</a:t>
+            </a:r>
           </a:p>
           <a:p>
             <a:pPr>
@@ -12877,7 +13216,7 @@
             </a:r>
             <a:r>
               <a:rPr lang="en-US" sz="3600" dirty="0" smtClean="0"/>
-              <a:t>SVN / History</a:t>
+              <a:t>SVN / Distribution / Repositories</a:t>
             </a:r>
             <a:endParaRPr lang="en-US" sz="3600" dirty="0"/>
           </a:p>
@@ -12885,7 +13224,7 @@
       </p:sp>
       <p:pic>
         <p:nvPicPr>
-          <p:cNvPr id="2" name="Picture 1"/>
+          <p:cNvPr id="3" name="Picture 2"/>
           <p:cNvPicPr>
             <a:picLocks noChangeAspect="1"/>
           </p:cNvPicPr>
@@ -12905,98 +13244,8 @@
         </p:blipFill>
         <p:spPr>
           <a:xfrm>
-            <a:off x="1418549" y="1525440"/>
-            <a:ext cx="7313770" cy="1300226"/>
-          </a:xfrm>
-          <a:prstGeom prst="rect">
-            <a:avLst/>
-          </a:prstGeom>
-        </p:spPr>
-      </p:pic>
-      <p:pic>
-        <p:nvPicPr>
-          <p:cNvPr id="3" name="Picture 2"/>
-          <p:cNvPicPr>
-            <a:picLocks noChangeAspect="1"/>
-          </p:cNvPicPr>
-          <p:nvPr/>
-        </p:nvPicPr>
-        <p:blipFill>
-          <a:blip r:embed="rId5">
-            <a:extLst>
-              <a:ext uri="{28A0092B-C50C-407E-A947-70E740481C1C}">
-                <a14:useLocalDpi xmlns:a14="http://schemas.microsoft.com/office/drawing/2010/main" val="0"/>
-              </a:ext>
-            </a:extLst>
-          </a:blip>
-          <a:stretch>
-            <a:fillRect/>
-          </a:stretch>
-        </p:blipFill>
-        <p:spPr>
-          <a:xfrm>
-            <a:off x="19866" y="2190979"/>
-            <a:ext cx="1487309" cy="1026243"/>
-          </a:xfrm>
-          <a:prstGeom prst="rect">
-            <a:avLst/>
-          </a:prstGeom>
-        </p:spPr>
-      </p:pic>
-      <p:pic>
-        <p:nvPicPr>
-          <p:cNvPr id="4" name="Picture 3"/>
-          <p:cNvPicPr>
-            <a:picLocks noChangeAspect="1"/>
-          </p:cNvPicPr>
-          <p:nvPr/>
-        </p:nvPicPr>
-        <p:blipFill>
-          <a:blip r:embed="rId6">
-            <a:extLst>
-              <a:ext uri="{28A0092B-C50C-407E-A947-70E740481C1C}">
-                <a14:useLocalDpi xmlns:a14="http://schemas.microsoft.com/office/drawing/2010/main" val="0"/>
-              </a:ext>
-            </a:extLst>
-          </a:blip>
-          <a:stretch>
-            <a:fillRect/>
-          </a:stretch>
-        </p:blipFill>
-        <p:spPr>
-          <a:xfrm>
-            <a:off x="1418549" y="3413233"/>
-            <a:ext cx="7313770" cy="3047404"/>
-          </a:xfrm>
-          <a:prstGeom prst="rect">
-            <a:avLst/>
-          </a:prstGeom>
-        </p:spPr>
-      </p:pic>
-      <p:pic>
-        <p:nvPicPr>
-          <p:cNvPr id="5" name="Picture 4"/>
-          <p:cNvPicPr>
-            <a:picLocks noChangeAspect="1"/>
-          </p:cNvPicPr>
-          <p:nvPr/>
-        </p:nvPicPr>
-        <p:blipFill>
-          <a:blip r:embed="rId7" cstate="print">
-            <a:extLst>
-              <a:ext uri="{28A0092B-C50C-407E-A947-70E740481C1C}">
-                <a14:useLocalDpi xmlns:a14="http://schemas.microsoft.com/office/drawing/2010/main" val="0"/>
-              </a:ext>
-            </a:extLst>
-          </a:blip>
-          <a:stretch>
-            <a:fillRect/>
-          </a:stretch>
-        </p:blipFill>
-        <p:spPr>
-          <a:xfrm>
-            <a:off x="238125" y="4537110"/>
-            <a:ext cx="1559786" cy="651339"/>
+            <a:off x="856070" y="1304999"/>
+            <a:ext cx="7983130" cy="5183851"/>
           </a:xfrm>
           <a:prstGeom prst="rect">
             <a:avLst/>
@@ -13006,7 +13255,7 @@
     </p:spTree>
     <p:extLst>
       <p:ext uri="{BB962C8B-B14F-4D97-AF65-F5344CB8AC3E}">
-        <p14:creationId xmlns:p14="http://schemas.microsoft.com/office/powerpoint/2010/main" val="2294655380"/>
+        <p14:creationId xmlns:p14="http://schemas.microsoft.com/office/powerpoint/2010/main" val="3360973859"/>
       </p:ext>
     </p:extLst>
   </p:cSld>
@@ -13124,33 +13373,12 @@
               </a:buBlip>
             </a:pPr>
             <a:r>
-              <a:rPr lang="en-US" sz="2400" dirty="0"/>
-              <a:t>i</a:t>
-            </a:r>
-            <a:r>
               <a:rPr lang="en-US" sz="2400" dirty="0" smtClean="0"/>
-              <a:t>n SVN you checkout different branches into different directories</a:t>
-            </a:r>
-          </a:p>
-          <a:p>
-            <a:pPr marL="355600" indent="-355600">
-              <a:lnSpc>
-                <a:spcPct val="90000"/>
-              </a:lnSpc>
-              <a:buClr>
-                <a:srgbClr val="2E3640"/>
-              </a:buClr>
-              <a:buSzPct val="100000"/>
-              <a:buBlip>
-                <a:blip r:embed="rId3"/>
-              </a:buBlip>
-            </a:pPr>
-            <a:r>
-              <a:rPr lang="en-US" sz="2400" dirty="0" smtClean="0">
-                <a:sym typeface="Wingdings" panose="05000000000000000000" pitchFamily="2" charset="2"/>
-              </a:rPr>
-              <a:t>in GIT you switch between branches in the same directory</a:t>
-            </a:r>
+              <a:t>GIT has real branches (DAG), SVN has linear history with simulated branches (just directories)</a:t>
+            </a:r>
+            <a:endParaRPr lang="en-US" sz="2400" dirty="0" smtClean="0">
+              <a:sym typeface="Wingdings" panose="05000000000000000000" pitchFamily="2" charset="2"/>
+            </a:endParaRPr>
           </a:p>
           <a:p>
             <a:pPr>
@@ -13162,6 +13390,20 @@
               </a:buClr>
               <a:buSzPct val="100000"/>
             </a:pPr>
+            <a:endParaRPr lang="en-US" sz="2400" dirty="0">
+              <a:sym typeface="Wingdings" panose="05000000000000000000" pitchFamily="2" charset="2"/>
+            </a:endParaRPr>
+          </a:p>
+          <a:p>
+            <a:pPr>
+              <a:lnSpc>
+                <a:spcPct val="90000"/>
+              </a:lnSpc>
+              <a:buClr>
+                <a:srgbClr val="2E3640"/>
+              </a:buClr>
+              <a:buSzPct val="100000"/>
+            </a:pPr>
             <a:endParaRPr lang="en-US" sz="2400" dirty="0" smtClean="0"/>
           </a:p>
         </p:txBody>
@@ -13207,16 +13449,136 @@
             </a:r>
             <a:r>
               <a:rPr lang="en-US" sz="3600" dirty="0" smtClean="0"/>
-              <a:t>SVN / More on Branches</a:t>
+              <a:t>SVN / History</a:t>
             </a:r>
             <a:endParaRPr lang="en-US" sz="3600" dirty="0"/>
           </a:p>
         </p:txBody>
       </p:sp>
+      <p:pic>
+        <p:nvPicPr>
+          <p:cNvPr id="2" name="Picture 1"/>
+          <p:cNvPicPr>
+            <a:picLocks noChangeAspect="1"/>
+          </p:cNvPicPr>
+          <p:nvPr/>
+        </p:nvPicPr>
+        <p:blipFill>
+          <a:blip r:embed="rId4">
+            <a:extLst>
+              <a:ext uri="{28A0092B-C50C-407E-A947-70E740481C1C}">
+                <a14:useLocalDpi xmlns:a14="http://schemas.microsoft.com/office/drawing/2010/main" val="0"/>
+              </a:ext>
+            </a:extLst>
+          </a:blip>
+          <a:stretch>
+            <a:fillRect/>
+          </a:stretch>
+        </p:blipFill>
+        <p:spPr>
+          <a:xfrm>
+            <a:off x="1418549" y="1525440"/>
+            <a:ext cx="7313770" cy="1300226"/>
+          </a:xfrm>
+          <a:prstGeom prst="rect">
+            <a:avLst/>
+          </a:prstGeom>
+        </p:spPr>
+      </p:pic>
+      <p:pic>
+        <p:nvPicPr>
+          <p:cNvPr id="3" name="Picture 2"/>
+          <p:cNvPicPr>
+            <a:picLocks noChangeAspect="1"/>
+          </p:cNvPicPr>
+          <p:nvPr/>
+        </p:nvPicPr>
+        <p:blipFill>
+          <a:blip r:embed="rId5">
+            <a:extLst>
+              <a:ext uri="{28A0092B-C50C-407E-A947-70E740481C1C}">
+                <a14:useLocalDpi xmlns:a14="http://schemas.microsoft.com/office/drawing/2010/main" val="0"/>
+              </a:ext>
+            </a:extLst>
+          </a:blip>
+          <a:stretch>
+            <a:fillRect/>
+          </a:stretch>
+        </p:blipFill>
+        <p:spPr>
+          <a:xfrm>
+            <a:off x="19866" y="2190979"/>
+            <a:ext cx="1487309" cy="1026243"/>
+          </a:xfrm>
+          <a:prstGeom prst="rect">
+            <a:avLst/>
+          </a:prstGeom>
+        </p:spPr>
+      </p:pic>
+      <p:pic>
+        <p:nvPicPr>
+          <p:cNvPr id="4" name="Picture 3"/>
+          <p:cNvPicPr>
+            <a:picLocks noChangeAspect="1"/>
+          </p:cNvPicPr>
+          <p:nvPr/>
+        </p:nvPicPr>
+        <p:blipFill>
+          <a:blip r:embed="rId6">
+            <a:extLst>
+              <a:ext uri="{28A0092B-C50C-407E-A947-70E740481C1C}">
+                <a14:useLocalDpi xmlns:a14="http://schemas.microsoft.com/office/drawing/2010/main" val="0"/>
+              </a:ext>
+            </a:extLst>
+          </a:blip>
+          <a:stretch>
+            <a:fillRect/>
+          </a:stretch>
+        </p:blipFill>
+        <p:spPr>
+          <a:xfrm>
+            <a:off x="1418549" y="3413233"/>
+            <a:ext cx="7313770" cy="3047404"/>
+          </a:xfrm>
+          <a:prstGeom prst="rect">
+            <a:avLst/>
+          </a:prstGeom>
+        </p:spPr>
+      </p:pic>
+      <p:pic>
+        <p:nvPicPr>
+          <p:cNvPr id="5" name="Picture 4"/>
+          <p:cNvPicPr>
+            <a:picLocks noChangeAspect="1"/>
+          </p:cNvPicPr>
+          <p:nvPr/>
+        </p:nvPicPr>
+        <p:blipFill>
+          <a:blip r:embed="rId7" cstate="print">
+            <a:extLst>
+              <a:ext uri="{28A0092B-C50C-407E-A947-70E740481C1C}">
+                <a14:useLocalDpi xmlns:a14="http://schemas.microsoft.com/office/drawing/2010/main" val="0"/>
+              </a:ext>
+            </a:extLst>
+          </a:blip>
+          <a:stretch>
+            <a:fillRect/>
+          </a:stretch>
+        </p:blipFill>
+        <p:spPr>
+          <a:xfrm>
+            <a:off x="238125" y="4537110"/>
+            <a:ext cx="1559786" cy="651339"/>
+          </a:xfrm>
+          <a:prstGeom prst="rect">
+            <a:avLst/>
+          </a:prstGeom>
+        </p:spPr>
+      </p:pic>
     </p:spTree>
     <p:extLst>
       <p:ext uri="{BB962C8B-B14F-4D97-AF65-F5344CB8AC3E}">
-        <p14:creationId xmlns:p14="http://schemas.microsoft.com/office/powerpoint/2010/main" val="3927442516"/>
+        <p14:creationId xmlns:p14="http://schemas.microsoft.com/office/powerpoint/2010/main" val="2294655380"/>
       </p:ext>
     </p:extLst>
   </p:cSld>
@@ -13294,18 +13656,18 @@
       </p:sp>
       <p:sp>
         <p:nvSpPr>
-          <p:cNvPr id="97" name="Shape 97"/>
+          <p:cNvPr id="96" name="Shape 96"/>
           <p:cNvSpPr txBox="1">
             <a:spLocks noGrp="1"/>
           </p:cNvSpPr>
           <p:nvPr>
-            <p:ph type="body" idx="2"/>
-          </p:nvPr>
-        </p:nvSpPr>
-        <p:spPr>
-          <a:xfrm>
-            <a:off x="341168" y="228026"/>
-            <a:ext cx="8498032" cy="457199"/>
+            <p:ph type="body" idx="1"/>
+          </p:nvPr>
+        </p:nvSpPr>
+        <p:spPr>
+          <a:xfrm>
+            <a:off x="341167" y="937873"/>
+            <a:ext cx="8498033" cy="5024690"/>
           </a:xfrm>
           <a:prstGeom prst="rect">
             <a:avLst/>
@@ -13321,6 +13683,90 @@
           </a:bodyPr>
           <a:lstStyle/>
           <a:p>
+            <a:pPr marL="355600" indent="-355600">
+              <a:lnSpc>
+                <a:spcPct val="90000"/>
+              </a:lnSpc>
+              <a:buClr>
+                <a:srgbClr val="2E3640"/>
+              </a:buClr>
+              <a:buSzPct val="100000"/>
+              <a:buBlip>
+                <a:blip r:embed="rId3"/>
+              </a:buBlip>
+            </a:pPr>
+            <a:r>
+              <a:rPr lang="en-US" sz="2400" dirty="0"/>
+              <a:t>i</a:t>
+            </a:r>
+            <a:r>
+              <a:rPr lang="en-US" sz="2400" dirty="0" smtClean="0"/>
+              <a:t>n SVN you checkout different branches into different directories</a:t>
+            </a:r>
+          </a:p>
+          <a:p>
+            <a:pPr marL="355600" indent="-355600">
+              <a:lnSpc>
+                <a:spcPct val="90000"/>
+              </a:lnSpc>
+              <a:buClr>
+                <a:srgbClr val="2E3640"/>
+              </a:buClr>
+              <a:buSzPct val="100000"/>
+              <a:buBlip>
+                <a:blip r:embed="rId3"/>
+              </a:buBlip>
+            </a:pPr>
+            <a:r>
+              <a:rPr lang="en-US" sz="2400" dirty="0" smtClean="0">
+                <a:sym typeface="Wingdings" panose="05000000000000000000" pitchFamily="2" charset="2"/>
+              </a:rPr>
+              <a:t>in GIT you switch between branches in the same directory</a:t>
+            </a:r>
+          </a:p>
+          <a:p>
+            <a:pPr>
+              <a:lnSpc>
+                <a:spcPct val="90000"/>
+              </a:lnSpc>
+              <a:buClr>
+                <a:srgbClr val="2E3640"/>
+              </a:buClr>
+              <a:buSzPct val="100000"/>
+            </a:pPr>
+            <a:endParaRPr lang="en-US" sz="2400" dirty="0" smtClean="0"/>
+          </a:p>
+        </p:txBody>
+      </p:sp>
+      <p:sp>
+        <p:nvSpPr>
+          <p:cNvPr id="97" name="Shape 97"/>
+          <p:cNvSpPr txBox="1">
+            <a:spLocks noGrp="1"/>
+          </p:cNvSpPr>
+          <p:nvPr>
+            <p:ph type="body" idx="2"/>
+          </p:nvPr>
+        </p:nvSpPr>
+        <p:spPr>
+          <a:xfrm>
+            <a:off x="341168" y="228026"/>
+            <a:ext cx="8498032" cy="457199"/>
+          </a:xfrm>
+          <a:prstGeom prst="rect">
+            <a:avLst/>
+          </a:prstGeom>
+          <a:noFill/>
+          <a:ln>
+            <a:noFill/>
+          </a:ln>
+        </p:spPr>
+        <p:txBody>
+          <a:bodyPr lIns="68569" tIns="34275" rIns="68569" bIns="34275" anchor="t" anchorCtr="0">
+            <a:noAutofit/>
+          </a:bodyPr>
+          <a:lstStyle/>
+          <a:p>
             <a:pPr>
               <a:buClr>
                 <a:schemeClr val="accent2"/>
@@ -13329,50 +13775,20 @@
             </a:pPr>
             <a:r>
               <a:rPr lang="en-US" sz="3600" dirty="0"/>
-              <a:t>GIT </a:t>
+              <a:t>GIT vs. </a:t>
             </a:r>
             <a:r>
               <a:rPr lang="en-US" sz="3600" dirty="0" smtClean="0"/>
-              <a:t>concepts / DAG</a:t>
+              <a:t>SVN / More on Branches</a:t>
             </a:r>
             <a:endParaRPr lang="en-US" sz="3600" dirty="0"/>
           </a:p>
         </p:txBody>
       </p:sp>
-      <p:pic>
-        <p:nvPicPr>
-          <p:cNvPr id="4" name="Picture 3"/>
-          <p:cNvPicPr>
-            <a:picLocks noChangeAspect="1"/>
-          </p:cNvPicPr>
-          <p:nvPr/>
-        </p:nvPicPr>
-        <p:blipFill>
-          <a:blip r:embed="rId3">
-            <a:extLst>
-              <a:ext uri="{28A0092B-C50C-407E-A947-70E740481C1C}">
-                <a14:useLocalDpi xmlns:a14="http://schemas.microsoft.com/office/drawing/2010/main" val="0"/>
-              </a:ext>
-            </a:extLst>
-          </a:blip>
-          <a:stretch>
-            <a:fillRect/>
-          </a:stretch>
-        </p:blipFill>
-        <p:spPr>
-          <a:xfrm>
-            <a:off x="530424" y="895265"/>
-            <a:ext cx="8119520" cy="4975258"/>
-          </a:xfrm>
-          <a:prstGeom prst="rect">
-            <a:avLst/>
-          </a:prstGeom>
-        </p:spPr>
-      </p:pic>
     </p:spTree>
     <p:extLst>
       <p:ext uri="{BB962C8B-B14F-4D97-AF65-F5344CB8AC3E}">
-        <p14:creationId xmlns:p14="http://schemas.microsoft.com/office/powerpoint/2010/main" val="3778375179"/>
+        <p14:creationId xmlns:p14="http://schemas.microsoft.com/office/powerpoint/2010/main" val="3927442516"/>
       </p:ext>
     </p:extLst>
   </p:cSld>
@@ -13484,8 +13900,12 @@
               <a:buSzPct val="25000"/>
             </a:pPr>
             <a:r>
+              <a:rPr lang="en-US" sz="3600" dirty="0"/>
+              <a:t>GIT </a:t>
+            </a:r>
+            <a:r>
               <a:rPr lang="en-US" sz="3600" dirty="0" smtClean="0"/>
-              <a:t>GIT commit / 1 of 2</a:t>
+              <a:t>concepts / DAG</a:t>
             </a:r>
             <a:endParaRPr lang="en-US" sz="3600" dirty="0"/>
           </a:p>
@@ -13493,7 +13913,7 @@
       </p:sp>
       <p:pic>
         <p:nvPicPr>
-          <p:cNvPr id="3" name="Picture 2"/>
+          <p:cNvPr id="4" name="Picture 3"/>
           <p:cNvPicPr>
             <a:picLocks noChangeAspect="1"/>
           </p:cNvPicPr>
@@ -13513,8 +13933,8 @@
         </p:blipFill>
         <p:spPr>
           <a:xfrm>
-            <a:off x="852487" y="1552575"/>
-            <a:ext cx="7439025" cy="3752850"/>
+            <a:off x="530424" y="895265"/>
+            <a:ext cx="8119520" cy="4975258"/>
           </a:xfrm>
           <a:prstGeom prst="rect">
             <a:avLst/>
@@ -13524,7 +13944,7 @@
     </p:spTree>
     <p:extLst>
       <p:ext uri="{BB962C8B-B14F-4D97-AF65-F5344CB8AC3E}">
-        <p14:creationId xmlns:p14="http://schemas.microsoft.com/office/powerpoint/2010/main" val="1351868076"/>
+        <p14:creationId xmlns:p14="http://schemas.microsoft.com/office/powerpoint/2010/main" val="3778375179"/>
       </p:ext>
     </p:extLst>
   </p:cSld>
@@ -13637,7 +14057,7 @@
             </a:pPr>
             <a:r>
               <a:rPr lang="en-US" sz="3600" dirty="0" smtClean="0"/>
-              <a:t>GIT commit / 2 of 2</a:t>
+              <a:t>GIT commit / 1 of 2</a:t>
             </a:r>
             <a:endParaRPr lang="en-US" sz="3600" dirty="0"/>
           </a:p>
@@ -13645,7 +14065,7 @@
       </p:sp>
       <p:pic>
         <p:nvPicPr>
-          <p:cNvPr id="2" name="Picture 1"/>
+          <p:cNvPr id="3" name="Picture 2"/>
           <p:cNvPicPr>
             <a:picLocks noChangeAspect="1"/>
           </p:cNvPicPr>
@@ -13665,8 +14085,8 @@
         </p:blipFill>
         <p:spPr>
           <a:xfrm>
-            <a:off x="800100" y="1566862"/>
-            <a:ext cx="7543800" cy="3724275"/>
+            <a:off x="852487" y="1552575"/>
+            <a:ext cx="7439025" cy="3752850"/>
           </a:xfrm>
           <a:prstGeom prst="rect">
             <a:avLst/>
@@ -13676,7 +14096,7 @@
     </p:spTree>
     <p:extLst>
       <p:ext uri="{BB962C8B-B14F-4D97-AF65-F5344CB8AC3E}">
-        <p14:creationId xmlns:p14="http://schemas.microsoft.com/office/powerpoint/2010/main" val="3927573702"/>
+        <p14:creationId xmlns:p14="http://schemas.microsoft.com/office/powerpoint/2010/main" val="1351868076"/>
       </p:ext>
     </p:extLst>
   </p:cSld>

</xml_diff>

<commit_message>
add information about tags
</commit_message>
<xml_diff>
--- a/GIT Presentation.pptx
+++ b/GIT Presentation.pptx
@@ -3408,8 +3408,27 @@
             </a:pPr>
             <a:r>
               <a:rPr lang="en-US" baseline="0" dirty="0" smtClean="0"/>
-              <a:t>a branch is a label pointing to a particular node in the graph</a:t>
-            </a:r>
+              <a:t>master and my-branch are branches</a:t>
+            </a:r>
+          </a:p>
+          <a:p>
+            <a:pPr marL="171450" indent="-171450">
+              <a:buFontTx/>
+              <a:buChar char="-"/>
+            </a:pPr>
+            <a:r>
+              <a:rPr lang="en-US" baseline="0" dirty="0" smtClean="0"/>
+              <a:t>a </a:t>
+            </a:r>
+            <a:r>
+              <a:rPr lang="en-US" baseline="0" dirty="0" smtClean="0"/>
+              <a:t>branch is a label pointing to a particular node in the </a:t>
+            </a:r>
+            <a:r>
+              <a:rPr lang="en-US" baseline="0" dirty="0" smtClean="0"/>
+              <a:t>graph</a:t>
+            </a:r>
+            <a:endParaRPr lang="en-US" baseline="0" dirty="0" smtClean="0"/>
           </a:p>
           <a:p>
             <a:pPr marL="628650" lvl="1" indent="-171450">
@@ -3428,8 +3447,27 @@
             </a:pPr>
             <a:r>
               <a:rPr lang="en-US" baseline="0" dirty="0" smtClean="0"/>
-              <a:t>the special label “HEAD” points to the current branch (that’s how GIT know what is the current branch)</a:t>
-            </a:r>
+              <a:t>the special label “HEAD” points to the current branch (that’s how GIT know what is the current branch</a:t>
+            </a:r>
+            <a:r>
+              <a:rPr lang="en-US" baseline="0" dirty="0" smtClean="0"/>
+              <a:t>)</a:t>
+            </a:r>
+          </a:p>
+          <a:p>
+            <a:pPr marL="171450" indent="-171450">
+              <a:buFontTx/>
+              <a:buChar char="-"/>
+            </a:pPr>
+            <a:r>
+              <a:rPr lang="en-US" baseline="0" dirty="0" smtClean="0"/>
+              <a:t>v0.1 is a tag. A tag is like a branch in that it points to a commit, but a tag does not change. It will always point to the </a:t>
+            </a:r>
+            <a:r>
+              <a:rPr lang="en-US" baseline="0" smtClean="0"/>
+              <a:t>same commit.</a:t>
+            </a:r>
+            <a:endParaRPr lang="en-US" baseline="0" dirty="0" smtClean="0"/>
           </a:p>
           <a:p>
             <a:pPr marL="171450" indent="-171450">
@@ -10498,11 +10536,7 @@
             </a:pPr>
             <a:r>
               <a:rPr lang="en-US" sz="2400" dirty="0" smtClean="0"/>
-              <a:t>Compared </a:t>
-            </a:r>
-            <a:r>
-              <a:rPr lang="en-US" sz="2400" dirty="0" smtClean="0"/>
-              <a:t>with SVN</a:t>
+              <a:t>Compared with SVN</a:t>
             </a:r>
           </a:p>
           <a:p>
@@ -13913,7 +13947,7 @@
       </p:sp>
       <p:pic>
         <p:nvPicPr>
-          <p:cNvPr id="4" name="Picture 3"/>
+          <p:cNvPr id="2" name="Picture 1"/>
           <p:cNvPicPr>
             <a:picLocks noChangeAspect="1"/>
           </p:cNvPicPr>
@@ -13933,8 +13967,8 @@
         </p:blipFill>
         <p:spPr>
           <a:xfrm>
-            <a:off x="530424" y="895265"/>
-            <a:ext cx="8119520" cy="4975258"/>
+            <a:off x="1509712" y="1552575"/>
+            <a:ext cx="6124575" cy="3752850"/>
           </a:xfrm>
           <a:prstGeom prst="rect">
             <a:avLst/>

</xml_diff>

<commit_message>
add slides explaining rebase
</commit_message>
<xml_diff>
--- a/GIT Presentation.pptx
+++ b/GIT Presentation.pptx
@@ -6,7 +6,7 @@
     <p:sldMasterId id="2147483665" r:id="rId2"/>
   </p:sldMasterIdLst>
   <p:notesMasterIdLst>
-    <p:notesMasterId r:id="rId29"/>
+    <p:notesMasterId r:id="rId34"/>
   </p:notesMasterIdLst>
   <p:sldIdLst>
     <p:sldId id="257" r:id="rId3"/>
@@ -26,15 +26,20 @@
     <p:sldId id="285" r:id="rId17"/>
     <p:sldId id="284" r:id="rId18"/>
     <p:sldId id="278" r:id="rId19"/>
-    <p:sldId id="279" r:id="rId20"/>
-    <p:sldId id="280" r:id="rId21"/>
-    <p:sldId id="281" r:id="rId22"/>
-    <p:sldId id="269" r:id="rId23"/>
-    <p:sldId id="270" r:id="rId24"/>
-    <p:sldId id="271" r:id="rId25"/>
-    <p:sldId id="272" r:id="rId26"/>
-    <p:sldId id="273" r:id="rId27"/>
-    <p:sldId id="275" r:id="rId28"/>
+    <p:sldId id="287" r:id="rId20"/>
+    <p:sldId id="288" r:id="rId21"/>
+    <p:sldId id="289" r:id="rId22"/>
+    <p:sldId id="290" r:id="rId23"/>
+    <p:sldId id="291" r:id="rId24"/>
+    <p:sldId id="279" r:id="rId25"/>
+    <p:sldId id="280" r:id="rId26"/>
+    <p:sldId id="281" r:id="rId27"/>
+    <p:sldId id="269" r:id="rId28"/>
+    <p:sldId id="270" r:id="rId29"/>
+    <p:sldId id="271" r:id="rId30"/>
+    <p:sldId id="272" r:id="rId31"/>
+    <p:sldId id="273" r:id="rId32"/>
+    <p:sldId id="275" r:id="rId33"/>
   </p:sldIdLst>
   <p:sldSz cx="9144000" cy="6858000" type="screen4x3"/>
   <p:notesSz cx="6858000" cy="9144000"/>
@@ -234,7 +239,7 @@
           <a:p>
             <a:fld id="{42C5866F-BF00-48DD-AC73-07692588090A}" type="datetimeFigureOut">
               <a:rPr lang="en-US" smtClean="0"/>
-              <a:t>10-06-2014</a:t>
+              <a:t>11-06-2014</a:t>
             </a:fld>
             <a:endParaRPr lang="en-US"/>
           </a:p>
@@ -1565,6 +1570,40 @@
               <a:buFontTx/>
               <a:buChar char="-"/>
             </a:pPr>
+            <a:r>
+              <a:rPr lang="en-US" dirty="0" smtClean="0"/>
+              <a:t>rebase will create linear history: A,</a:t>
+            </a:r>
+            <a:r>
+              <a:rPr lang="en-US" baseline="0" dirty="0" smtClean="0"/>
+              <a:t> B, C, F, E, D.</a:t>
+            </a:r>
+          </a:p>
+          <a:p>
+            <a:pPr marL="628650" lvl="1" indent="-171450">
+              <a:buFontTx/>
+              <a:buChar char="-"/>
+            </a:pPr>
+            <a:r>
+              <a:rPr lang="en-US" baseline="0" dirty="0" smtClean="0"/>
+              <a:t>one example where you would need this is when using GIT as an SVN client, since SVN only knows of linear history</a:t>
+            </a:r>
+          </a:p>
+          <a:p>
+            <a:pPr marL="628650" lvl="1" indent="-171450">
+              <a:buFontTx/>
+              <a:buChar char="-"/>
+            </a:pPr>
+            <a:r>
+              <a:rPr lang="en-US" baseline="0" dirty="0" smtClean="0"/>
+              <a:t>because the history is linear, people will not know that E and D were developed on a separate branch, which is something that you may or may not want</a:t>
+            </a:r>
+          </a:p>
+          <a:p>
+            <a:pPr marL="0" lvl="0" indent="0">
+              <a:buFontTx/>
+              <a:buNone/>
+            </a:pPr>
             <a:endParaRPr dirty="0"/>
           </a:p>
         </p:txBody>
@@ -1669,6 +1708,14 @@
               <a:buFontTx/>
               <a:buChar char="-"/>
             </a:pPr>
+            <a:r>
+              <a:rPr lang="en-US" dirty="0" smtClean="0"/>
+              <a:t>the my-branch</a:t>
+            </a:r>
+            <a:r>
+              <a:rPr lang="en-US" baseline="0" dirty="0" smtClean="0"/>
+              <a:t> will first point to the same commit as master</a:t>
+            </a:r>
             <a:endParaRPr dirty="0"/>
           </a:p>
         </p:txBody>
@@ -1717,7 +1764,7 @@
     </p:spTree>
     <p:extLst>
       <p:ext uri="{BB962C8B-B14F-4D97-AF65-F5344CB8AC3E}">
-        <p14:creationId xmlns:p14="http://schemas.microsoft.com/office/powerpoint/2010/main" val="796577067"/>
+        <p14:creationId xmlns:p14="http://schemas.microsoft.com/office/powerpoint/2010/main" val="3893781737"/>
       </p:ext>
     </p:extLst>
   </p:cSld>
@@ -1773,6 +1820,34 @@
               <a:buFontTx/>
               <a:buChar char="-"/>
             </a:pPr>
+            <a:r>
+              <a:rPr lang="en-US" dirty="0" smtClean="0"/>
+              <a:t>a</a:t>
+            </a:r>
+            <a:r>
+              <a:rPr lang="en-US" baseline="0" dirty="0" smtClean="0"/>
+              <a:t> commit E' is created that introduces the same changes as E</a:t>
+            </a:r>
+          </a:p>
+          <a:p>
+            <a:pPr marL="171450" indent="-171450">
+              <a:buFontTx/>
+              <a:buChar char="-"/>
+            </a:pPr>
+            <a:r>
+              <a:rPr lang="en-US" baseline="0" dirty="0" smtClean="0"/>
+              <a:t>the new commit is not exactly the same, since it has a different parent, a different commit time, etc. In other words, E and E' have different SHA1 IDs.</a:t>
+            </a:r>
+          </a:p>
+          <a:p>
+            <a:pPr marL="171450" indent="-171450">
+              <a:buFontTx/>
+              <a:buChar char="-"/>
+            </a:pPr>
+            <a:r>
+              <a:rPr lang="en-US" baseline="0" dirty="0" smtClean="0"/>
+              <a:t>the new commit may conflict with changes made in commit C or F. These conflicts will need to be manually solved and then rebase can continue</a:t>
+            </a:r>
             <a:endParaRPr dirty="0"/>
           </a:p>
         </p:txBody>
@@ -1821,7 +1896,7 @@
     </p:spTree>
     <p:extLst>
       <p:ext uri="{BB962C8B-B14F-4D97-AF65-F5344CB8AC3E}">
-        <p14:creationId xmlns:p14="http://schemas.microsoft.com/office/powerpoint/2010/main" val="2140635485"/>
+        <p14:creationId xmlns:p14="http://schemas.microsoft.com/office/powerpoint/2010/main" val="2400778321"/>
       </p:ext>
     </p:extLst>
   </p:cSld>
@@ -1977,6 +2052,22 @@
               <a:buFontTx/>
               <a:buChar char="-"/>
             </a:pPr>
+            <a:r>
+              <a:rPr lang="en-US" dirty="0" smtClean="0"/>
+              <a:t>because it’s the current branch (as</a:t>
+            </a:r>
+            <a:r>
+              <a:rPr lang="en-US" baseline="0" dirty="0" smtClean="0"/>
+              <a:t> shown by HEAD), </a:t>
+            </a:r>
+            <a:r>
+              <a:rPr lang="en-US" dirty="0" smtClean="0"/>
+              <a:t>my-branch</a:t>
+            </a:r>
+            <a:r>
+              <a:rPr lang="en-US" baseline="0" dirty="0" smtClean="0"/>
+              <a:t> will then point to the new commit</a:t>
+            </a:r>
             <a:endParaRPr dirty="0"/>
           </a:p>
         </p:txBody>
@@ -2025,7 +2116,7 @@
     </p:spTree>
     <p:extLst>
       <p:ext uri="{BB962C8B-B14F-4D97-AF65-F5344CB8AC3E}">
-        <p14:creationId xmlns:p14="http://schemas.microsoft.com/office/powerpoint/2010/main" val="3219326357"/>
+        <p14:creationId xmlns:p14="http://schemas.microsoft.com/office/powerpoint/2010/main" val="206851763"/>
       </p:ext>
     </p:extLst>
   </p:cSld>
@@ -2081,6 +2172,14 @@
               <a:buFontTx/>
               <a:buChar char="-"/>
             </a:pPr>
+            <a:r>
+              <a:rPr lang="en-US" dirty="0" smtClean="0"/>
+              <a:t>the</a:t>
+            </a:r>
+            <a:r>
+              <a:rPr lang="en-US" baseline="0" dirty="0" smtClean="0"/>
+              <a:t> commit D' is created that introduces the same changes as D</a:t>
+            </a:r>
             <a:endParaRPr dirty="0"/>
           </a:p>
         </p:txBody>
@@ -2129,7 +2228,7 @@
     </p:spTree>
     <p:extLst>
       <p:ext uri="{BB962C8B-B14F-4D97-AF65-F5344CB8AC3E}">
-        <p14:creationId xmlns:p14="http://schemas.microsoft.com/office/powerpoint/2010/main" val="1650745352"/>
+        <p14:creationId xmlns:p14="http://schemas.microsoft.com/office/powerpoint/2010/main" val="1510356220"/>
       </p:ext>
     </p:extLst>
   </p:cSld>
@@ -2185,6 +2284,92 @@
               <a:buFontTx/>
               <a:buChar char="-"/>
             </a:pPr>
+            <a:r>
+              <a:rPr lang="en-US" dirty="0" smtClean="0"/>
+              <a:t>lastly, my-branch changes to point to the new commit</a:t>
+            </a:r>
+          </a:p>
+          <a:p>
+            <a:pPr marL="171450" indent="-171450">
+              <a:buFontTx/>
+              <a:buChar char="-"/>
+            </a:pPr>
+            <a:r>
+              <a:rPr lang="en-US" dirty="0" smtClean="0"/>
+              <a:t>at this point</a:t>
+            </a:r>
+            <a:r>
+              <a:rPr lang="en-US" baseline="0" dirty="0" smtClean="0"/>
+              <a:t> we are done with the rebase and the history is linear</a:t>
+            </a:r>
+            <a:endParaRPr lang="en-US" dirty="0" smtClean="0"/>
+          </a:p>
+          <a:p>
+            <a:pPr marL="171450" indent="-171450">
+              <a:buFontTx/>
+              <a:buChar char="-"/>
+            </a:pPr>
+            <a:r>
+              <a:rPr lang="en-US" dirty="0" smtClean="0"/>
+              <a:t>the commits E and D are no longer reachable by any</a:t>
+            </a:r>
+            <a:r>
+              <a:rPr lang="en-US" baseline="0" dirty="0" smtClean="0"/>
+              <a:t> branch or tag, so they will be garbage collected in time. GIT performs garbage collection automatically from time to time, and you can also manually force it using the “</a:t>
+            </a:r>
+            <a:r>
+              <a:rPr lang="en-US" baseline="0" dirty="0" err="1" smtClean="0"/>
+              <a:t>git</a:t>
+            </a:r>
+            <a:r>
+              <a:rPr lang="en-US" baseline="0" dirty="0" smtClean="0"/>
+              <a:t> </a:t>
+            </a:r>
+            <a:r>
+              <a:rPr lang="en-US" baseline="0" dirty="0" err="1" smtClean="0"/>
+              <a:t>gc</a:t>
+            </a:r>
+            <a:r>
+              <a:rPr lang="en-US" baseline="0" dirty="0" smtClean="0"/>
+              <a:t>” command</a:t>
+            </a:r>
+          </a:p>
+          <a:p>
+            <a:pPr marL="171450" indent="-171450">
+              <a:buFontTx/>
+              <a:buChar char="-"/>
+            </a:pPr>
+            <a:r>
+              <a:rPr lang="en-US" baseline="0" dirty="0" smtClean="0"/>
+              <a:t>What if you made a mistake? For example you manually solved conflicts incorrectly, and you want to re-try the rebase. Since the commits E and D are not yet deleted, we can. We’ll take a look at an example during the workshop when we discuss about the “</a:t>
+            </a:r>
+            <a:r>
+              <a:rPr lang="en-US" baseline="0" dirty="0" err="1" smtClean="0"/>
+              <a:t>git</a:t>
+            </a:r>
+            <a:r>
+              <a:rPr lang="en-US" baseline="0" dirty="0" smtClean="0"/>
+              <a:t> </a:t>
+            </a:r>
+            <a:r>
+              <a:rPr lang="en-US" baseline="0" dirty="0" err="1" smtClean="0"/>
+              <a:t>reflog</a:t>
+            </a:r>
+            <a:r>
+              <a:rPr lang="en-US" baseline="0" dirty="0" smtClean="0"/>
+              <a:t>” command.</a:t>
+            </a:r>
+            <a:endParaRPr lang="en-US" dirty="0" smtClean="0"/>
+          </a:p>
+          <a:p>
+            <a:pPr marL="171450" indent="-171450">
+              <a:buFontTx/>
+              <a:buChar char="-"/>
+            </a:pPr>
+            <a:r>
+              <a:rPr lang="en-US" dirty="0" smtClean="0"/>
+              <a:t>don’t rebase public history</a:t>
+            </a:r>
             <a:endParaRPr dirty="0"/>
           </a:p>
         </p:txBody>
@@ -2233,7 +2418,7 @@
     </p:spTree>
     <p:extLst>
       <p:ext uri="{BB962C8B-B14F-4D97-AF65-F5344CB8AC3E}">
-        <p14:creationId xmlns:p14="http://schemas.microsoft.com/office/powerpoint/2010/main" val="979907960"/>
+        <p14:creationId xmlns:p14="http://schemas.microsoft.com/office/powerpoint/2010/main" val="3080892451"/>
       </p:ext>
     </p:extLst>
   </p:cSld>
@@ -2337,7 +2522,7 @@
     </p:spTree>
     <p:extLst>
       <p:ext uri="{BB962C8B-B14F-4D97-AF65-F5344CB8AC3E}">
-        <p14:creationId xmlns:p14="http://schemas.microsoft.com/office/powerpoint/2010/main" val="2667286518"/>
+        <p14:creationId xmlns:p14="http://schemas.microsoft.com/office/powerpoint/2010/main" val="796577067"/>
       </p:ext>
     </p:extLst>
   </p:cSld>
@@ -2441,7 +2626,7 @@
     </p:spTree>
     <p:extLst>
       <p:ext uri="{BB962C8B-B14F-4D97-AF65-F5344CB8AC3E}">
-        <p14:creationId xmlns:p14="http://schemas.microsoft.com/office/powerpoint/2010/main" val="890929024"/>
+        <p14:creationId xmlns:p14="http://schemas.microsoft.com/office/powerpoint/2010/main" val="2140635485"/>
       </p:ext>
     </p:extLst>
   </p:cSld>
@@ -2497,46 +2682,6 @@
               <a:buFontTx/>
               <a:buChar char="-"/>
             </a:pPr>
-            <a:r>
-              <a:rPr lang="en-US" baseline="0" dirty="0" smtClean="0"/>
-              <a:t>install GIT</a:t>
-            </a:r>
-          </a:p>
-          <a:p>
-            <a:pPr marL="628650" lvl="1" indent="-171450">
-              <a:buFontTx/>
-              <a:buChar char="-"/>
-            </a:pPr>
-            <a:r>
-              <a:rPr lang="en-US" baseline="0" dirty="0" smtClean="0"/>
-              <a:t>Windows</a:t>
-            </a:r>
-          </a:p>
-          <a:p>
-            <a:pPr marL="628650" lvl="1" indent="-171450">
-              <a:buFontTx/>
-              <a:buChar char="-"/>
-            </a:pPr>
-            <a:r>
-              <a:rPr lang="en-US" baseline="0" dirty="0" smtClean="0"/>
-              <a:t>Mac</a:t>
-            </a:r>
-          </a:p>
-          <a:p>
-            <a:pPr marL="171450" lvl="0" indent="-171450">
-              <a:buFontTx/>
-              <a:buChar char="-"/>
-            </a:pPr>
-            <a:r>
-              <a:rPr lang="en-US" baseline="0" dirty="0" smtClean="0"/>
-              <a:t>setup username and email</a:t>
-            </a:r>
-          </a:p>
-          <a:p>
-            <a:pPr marL="171450" lvl="0" indent="-171450">
-              <a:buFontTx/>
-              <a:buChar char="-"/>
-            </a:pPr>
             <a:endParaRPr dirty="0"/>
           </a:p>
         </p:txBody>
@@ -2585,7 +2730,7 @@
     </p:spTree>
     <p:extLst>
       <p:ext uri="{BB962C8B-B14F-4D97-AF65-F5344CB8AC3E}">
-        <p14:creationId xmlns:p14="http://schemas.microsoft.com/office/powerpoint/2010/main" val="2666093823"/>
+        <p14:creationId xmlns:p14="http://schemas.microsoft.com/office/powerpoint/2010/main" val="3219326357"/>
       </p:ext>
     </p:extLst>
   </p:cSld>
@@ -2641,46 +2786,6 @@
               <a:buFontTx/>
               <a:buChar char="-"/>
             </a:pPr>
-            <a:r>
-              <a:rPr lang="en-US" baseline="0" dirty="0" smtClean="0"/>
-              <a:t>install GIT</a:t>
-            </a:r>
-          </a:p>
-          <a:p>
-            <a:pPr marL="628650" lvl="1" indent="-171450">
-              <a:buFontTx/>
-              <a:buChar char="-"/>
-            </a:pPr>
-            <a:r>
-              <a:rPr lang="en-US" baseline="0" dirty="0" smtClean="0"/>
-              <a:t>Windows</a:t>
-            </a:r>
-          </a:p>
-          <a:p>
-            <a:pPr marL="628650" lvl="1" indent="-171450">
-              <a:buFontTx/>
-              <a:buChar char="-"/>
-            </a:pPr>
-            <a:r>
-              <a:rPr lang="en-US" baseline="0" dirty="0" smtClean="0"/>
-              <a:t>Mac</a:t>
-            </a:r>
-          </a:p>
-          <a:p>
-            <a:pPr marL="171450" lvl="0" indent="-171450">
-              <a:buFontTx/>
-              <a:buChar char="-"/>
-            </a:pPr>
-            <a:r>
-              <a:rPr lang="en-US" baseline="0" dirty="0" smtClean="0"/>
-              <a:t>setup username and email</a:t>
-            </a:r>
-          </a:p>
-          <a:p>
-            <a:pPr marL="171450" lvl="0" indent="-171450">
-              <a:buFontTx/>
-              <a:buChar char="-"/>
-            </a:pPr>
             <a:endParaRPr dirty="0"/>
           </a:p>
         </p:txBody>
@@ -2729,7 +2834,319 @@
     </p:spTree>
     <p:extLst>
       <p:ext uri="{BB962C8B-B14F-4D97-AF65-F5344CB8AC3E}">
-        <p14:creationId xmlns:p14="http://schemas.microsoft.com/office/powerpoint/2010/main" val="1567401964"/>
+        <p14:creationId xmlns:p14="http://schemas.microsoft.com/office/powerpoint/2010/main" val="1650745352"/>
+      </p:ext>
+    </p:extLst>
+  </p:cSld>
+  <p:clrMapOvr>
+    <a:masterClrMapping/>
+  </p:clrMapOvr>
+</p:notes>
+</file>
+
+<file path=ppt/notesSlides/notesSlide27.xml><?xml version="1.0" encoding="utf-8"?>
+<p:notes xmlns:a="http://schemas.openxmlformats.org/drawingml/2006/main" xmlns:r="http://schemas.openxmlformats.org/officeDocument/2006/relationships" xmlns:p="http://schemas.openxmlformats.org/presentationml/2006/main" showMasterSp="0" showMasterPhAnim="0">
+  <p:cSld>
+    <p:spTree>
+      <p:nvGrpSpPr>
+        <p:cNvPr id="1" name="Shape 98"/>
+        <p:cNvGrpSpPr/>
+        <p:nvPr/>
+      </p:nvGrpSpPr>
+      <p:grpSpPr>
+        <a:xfrm>
+          <a:off x="0" y="0"/>
+          <a:ext cx="0" cy="0"/>
+          <a:chOff x="0" y="0"/>
+          <a:chExt cx="0" cy="0"/>
+        </a:xfrm>
+      </p:grpSpPr>
+      <p:sp>
+        <p:nvSpPr>
+          <p:cNvPr id="99" name="Shape 99"/>
+          <p:cNvSpPr txBox="1">
+            <a:spLocks noGrp="1"/>
+          </p:cNvSpPr>
+          <p:nvPr>
+            <p:ph type="body" idx="1"/>
+          </p:nvPr>
+        </p:nvSpPr>
+        <p:spPr>
+          <a:xfrm>
+            <a:off x="685800" y="4343400"/>
+            <a:ext cx="5486399" cy="4114800"/>
+          </a:xfrm>
+          <a:prstGeom prst="rect">
+            <a:avLst/>
+          </a:prstGeom>
+        </p:spPr>
+        <p:txBody>
+          <a:bodyPr lIns="91425" tIns="91425" rIns="91425" bIns="91425" anchor="ctr" anchorCtr="0">
+            <a:noAutofit/>
+          </a:bodyPr>
+          <a:lstStyle/>
+          <a:p>
+            <a:pPr marL="171450" indent="-171450">
+              <a:buFontTx/>
+              <a:buChar char="-"/>
+            </a:pPr>
+            <a:endParaRPr dirty="0"/>
+          </a:p>
+        </p:txBody>
+      </p:sp>
+      <p:sp>
+        <p:nvSpPr>
+          <p:cNvPr id="100" name="Shape 100"/>
+          <p:cNvSpPr>
+            <a:spLocks noGrp="1" noRot="1" noChangeAspect="1"/>
+          </p:cNvSpPr>
+          <p:nvPr>
+            <p:ph type="sldImg" idx="2"/>
+          </p:nvPr>
+        </p:nvSpPr>
+        <p:spPr>
+          <a:xfrm>
+            <a:off x="1143000" y="685800"/>
+            <a:ext cx="4572000" cy="3429000"/>
+          </a:xfrm>
+          <a:custGeom>
+            <a:avLst/>
+            <a:gdLst/>
+            <a:ahLst/>
+            <a:cxnLst/>
+            <a:rect l="0" t="0" r="0" b="0"/>
+            <a:pathLst>
+              <a:path w="120000" h="120000" extrusionOk="0">
+                <a:moveTo>
+                  <a:pt x="0" y="0"/>
+                </a:moveTo>
+                <a:lnTo>
+                  <a:pt x="120000" y="0"/>
+                </a:lnTo>
+                <a:lnTo>
+                  <a:pt x="120000" y="120000"/>
+                </a:lnTo>
+                <a:lnTo>
+                  <a:pt x="0" y="120000"/>
+                </a:lnTo>
+                <a:close/>
+              </a:path>
+            </a:pathLst>
+          </a:custGeom>
+        </p:spPr>
+      </p:sp>
+    </p:spTree>
+    <p:extLst>
+      <p:ext uri="{BB962C8B-B14F-4D97-AF65-F5344CB8AC3E}">
+        <p14:creationId xmlns:p14="http://schemas.microsoft.com/office/powerpoint/2010/main" val="979907960"/>
+      </p:ext>
+    </p:extLst>
+  </p:cSld>
+  <p:clrMapOvr>
+    <a:masterClrMapping/>
+  </p:clrMapOvr>
+</p:notes>
+</file>
+
+<file path=ppt/notesSlides/notesSlide28.xml><?xml version="1.0" encoding="utf-8"?>
+<p:notes xmlns:a="http://schemas.openxmlformats.org/drawingml/2006/main" xmlns:r="http://schemas.openxmlformats.org/officeDocument/2006/relationships" xmlns:p="http://schemas.openxmlformats.org/presentationml/2006/main" showMasterSp="0" showMasterPhAnim="0">
+  <p:cSld>
+    <p:spTree>
+      <p:nvGrpSpPr>
+        <p:cNvPr id="1" name="Shape 98"/>
+        <p:cNvGrpSpPr/>
+        <p:nvPr/>
+      </p:nvGrpSpPr>
+      <p:grpSpPr>
+        <a:xfrm>
+          <a:off x="0" y="0"/>
+          <a:ext cx="0" cy="0"/>
+          <a:chOff x="0" y="0"/>
+          <a:chExt cx="0" cy="0"/>
+        </a:xfrm>
+      </p:grpSpPr>
+      <p:sp>
+        <p:nvSpPr>
+          <p:cNvPr id="99" name="Shape 99"/>
+          <p:cNvSpPr txBox="1">
+            <a:spLocks noGrp="1"/>
+          </p:cNvSpPr>
+          <p:nvPr>
+            <p:ph type="body" idx="1"/>
+          </p:nvPr>
+        </p:nvSpPr>
+        <p:spPr>
+          <a:xfrm>
+            <a:off x="685800" y="4343400"/>
+            <a:ext cx="5486399" cy="4114800"/>
+          </a:xfrm>
+          <a:prstGeom prst="rect">
+            <a:avLst/>
+          </a:prstGeom>
+        </p:spPr>
+        <p:txBody>
+          <a:bodyPr lIns="91425" tIns="91425" rIns="91425" bIns="91425" anchor="ctr" anchorCtr="0">
+            <a:noAutofit/>
+          </a:bodyPr>
+          <a:lstStyle/>
+          <a:p>
+            <a:pPr marL="171450" indent="-171450">
+              <a:buFontTx/>
+              <a:buChar char="-"/>
+            </a:pPr>
+            <a:endParaRPr dirty="0"/>
+          </a:p>
+        </p:txBody>
+      </p:sp>
+      <p:sp>
+        <p:nvSpPr>
+          <p:cNvPr id="100" name="Shape 100"/>
+          <p:cNvSpPr>
+            <a:spLocks noGrp="1" noRot="1" noChangeAspect="1"/>
+          </p:cNvSpPr>
+          <p:nvPr>
+            <p:ph type="sldImg" idx="2"/>
+          </p:nvPr>
+        </p:nvSpPr>
+        <p:spPr>
+          <a:xfrm>
+            <a:off x="1143000" y="685800"/>
+            <a:ext cx="4572000" cy="3429000"/>
+          </a:xfrm>
+          <a:custGeom>
+            <a:avLst/>
+            <a:gdLst/>
+            <a:ahLst/>
+            <a:cxnLst/>
+            <a:rect l="0" t="0" r="0" b="0"/>
+            <a:pathLst>
+              <a:path w="120000" h="120000" extrusionOk="0">
+                <a:moveTo>
+                  <a:pt x="0" y="0"/>
+                </a:moveTo>
+                <a:lnTo>
+                  <a:pt x="120000" y="0"/>
+                </a:lnTo>
+                <a:lnTo>
+                  <a:pt x="120000" y="120000"/>
+                </a:lnTo>
+                <a:lnTo>
+                  <a:pt x="0" y="120000"/>
+                </a:lnTo>
+                <a:close/>
+              </a:path>
+            </a:pathLst>
+          </a:custGeom>
+        </p:spPr>
+      </p:sp>
+    </p:spTree>
+    <p:extLst>
+      <p:ext uri="{BB962C8B-B14F-4D97-AF65-F5344CB8AC3E}">
+        <p14:creationId xmlns:p14="http://schemas.microsoft.com/office/powerpoint/2010/main" val="2667286518"/>
+      </p:ext>
+    </p:extLst>
+  </p:cSld>
+  <p:clrMapOvr>
+    <a:masterClrMapping/>
+  </p:clrMapOvr>
+</p:notes>
+</file>
+
+<file path=ppt/notesSlides/notesSlide29.xml><?xml version="1.0" encoding="utf-8"?>
+<p:notes xmlns:a="http://schemas.openxmlformats.org/drawingml/2006/main" xmlns:r="http://schemas.openxmlformats.org/officeDocument/2006/relationships" xmlns:p="http://schemas.openxmlformats.org/presentationml/2006/main" showMasterSp="0" showMasterPhAnim="0">
+  <p:cSld>
+    <p:spTree>
+      <p:nvGrpSpPr>
+        <p:cNvPr id="1" name="Shape 98"/>
+        <p:cNvGrpSpPr/>
+        <p:nvPr/>
+      </p:nvGrpSpPr>
+      <p:grpSpPr>
+        <a:xfrm>
+          <a:off x="0" y="0"/>
+          <a:ext cx="0" cy="0"/>
+          <a:chOff x="0" y="0"/>
+          <a:chExt cx="0" cy="0"/>
+        </a:xfrm>
+      </p:grpSpPr>
+      <p:sp>
+        <p:nvSpPr>
+          <p:cNvPr id="99" name="Shape 99"/>
+          <p:cNvSpPr txBox="1">
+            <a:spLocks noGrp="1"/>
+          </p:cNvSpPr>
+          <p:nvPr>
+            <p:ph type="body" idx="1"/>
+          </p:nvPr>
+        </p:nvSpPr>
+        <p:spPr>
+          <a:xfrm>
+            <a:off x="685800" y="4343400"/>
+            <a:ext cx="5486399" cy="4114800"/>
+          </a:xfrm>
+          <a:prstGeom prst="rect">
+            <a:avLst/>
+          </a:prstGeom>
+        </p:spPr>
+        <p:txBody>
+          <a:bodyPr lIns="91425" tIns="91425" rIns="91425" bIns="91425" anchor="ctr" anchorCtr="0">
+            <a:noAutofit/>
+          </a:bodyPr>
+          <a:lstStyle/>
+          <a:p>
+            <a:pPr marL="171450" indent="-171450">
+              <a:buFontTx/>
+              <a:buChar char="-"/>
+            </a:pPr>
+            <a:endParaRPr dirty="0"/>
+          </a:p>
+        </p:txBody>
+      </p:sp>
+      <p:sp>
+        <p:nvSpPr>
+          <p:cNvPr id="100" name="Shape 100"/>
+          <p:cNvSpPr>
+            <a:spLocks noGrp="1" noRot="1" noChangeAspect="1"/>
+          </p:cNvSpPr>
+          <p:nvPr>
+            <p:ph type="sldImg" idx="2"/>
+          </p:nvPr>
+        </p:nvSpPr>
+        <p:spPr>
+          <a:xfrm>
+            <a:off x="1143000" y="685800"/>
+            <a:ext cx="4572000" cy="3429000"/>
+          </a:xfrm>
+          <a:custGeom>
+            <a:avLst/>
+            <a:gdLst/>
+            <a:ahLst/>
+            <a:cxnLst/>
+            <a:rect l="0" t="0" r="0" b="0"/>
+            <a:pathLst>
+              <a:path w="120000" h="120000" extrusionOk="0">
+                <a:moveTo>
+                  <a:pt x="0" y="0"/>
+                </a:moveTo>
+                <a:lnTo>
+                  <a:pt x="120000" y="0"/>
+                </a:lnTo>
+                <a:lnTo>
+                  <a:pt x="120000" y="120000"/>
+                </a:lnTo>
+                <a:lnTo>
+                  <a:pt x="0" y="120000"/>
+                </a:lnTo>
+                <a:close/>
+              </a:path>
+            </a:pathLst>
+          </a:custGeom>
+        </p:spPr>
+      </p:sp>
+    </p:spTree>
+    <p:extLst>
+      <p:ext uri="{BB962C8B-B14F-4D97-AF65-F5344CB8AC3E}">
+        <p14:creationId xmlns:p14="http://schemas.microsoft.com/office/powerpoint/2010/main" val="890929024"/>
       </p:ext>
     </p:extLst>
   </p:cSld>
@@ -2830,6 +3247,294 @@
     <p:extLst>
       <p:ext uri="{BB962C8B-B14F-4D97-AF65-F5344CB8AC3E}">
         <p14:creationId xmlns:p14="http://schemas.microsoft.com/office/powerpoint/2010/main" val="2392866614"/>
+      </p:ext>
+    </p:extLst>
+  </p:cSld>
+  <p:clrMapOvr>
+    <a:masterClrMapping/>
+  </p:clrMapOvr>
+</p:notes>
+</file>
+
+<file path=ppt/notesSlides/notesSlide30.xml><?xml version="1.0" encoding="utf-8"?>
+<p:notes xmlns:a="http://schemas.openxmlformats.org/drawingml/2006/main" xmlns:r="http://schemas.openxmlformats.org/officeDocument/2006/relationships" xmlns:p="http://schemas.openxmlformats.org/presentationml/2006/main" showMasterSp="0" showMasterPhAnim="0">
+  <p:cSld>
+    <p:spTree>
+      <p:nvGrpSpPr>
+        <p:cNvPr id="1" name="Shape 98"/>
+        <p:cNvGrpSpPr/>
+        <p:nvPr/>
+      </p:nvGrpSpPr>
+      <p:grpSpPr>
+        <a:xfrm>
+          <a:off x="0" y="0"/>
+          <a:ext cx="0" cy="0"/>
+          <a:chOff x="0" y="0"/>
+          <a:chExt cx="0" cy="0"/>
+        </a:xfrm>
+      </p:grpSpPr>
+      <p:sp>
+        <p:nvSpPr>
+          <p:cNvPr id="99" name="Shape 99"/>
+          <p:cNvSpPr txBox="1">
+            <a:spLocks noGrp="1"/>
+          </p:cNvSpPr>
+          <p:nvPr>
+            <p:ph type="body" idx="1"/>
+          </p:nvPr>
+        </p:nvSpPr>
+        <p:spPr>
+          <a:xfrm>
+            <a:off x="685800" y="4343400"/>
+            <a:ext cx="5486399" cy="4114800"/>
+          </a:xfrm>
+          <a:prstGeom prst="rect">
+            <a:avLst/>
+          </a:prstGeom>
+        </p:spPr>
+        <p:txBody>
+          <a:bodyPr lIns="91425" tIns="91425" rIns="91425" bIns="91425" anchor="ctr" anchorCtr="0">
+            <a:noAutofit/>
+          </a:bodyPr>
+          <a:lstStyle/>
+          <a:p>
+            <a:pPr marL="171450" indent="-171450">
+              <a:buFontTx/>
+              <a:buChar char="-"/>
+            </a:pPr>
+            <a:r>
+              <a:rPr lang="en-US" baseline="0" dirty="0" smtClean="0"/>
+              <a:t>install GIT</a:t>
+            </a:r>
+          </a:p>
+          <a:p>
+            <a:pPr marL="628650" lvl="1" indent="-171450">
+              <a:buFontTx/>
+              <a:buChar char="-"/>
+            </a:pPr>
+            <a:r>
+              <a:rPr lang="en-US" baseline="0" dirty="0" smtClean="0"/>
+              <a:t>Windows</a:t>
+            </a:r>
+          </a:p>
+          <a:p>
+            <a:pPr marL="628650" lvl="1" indent="-171450">
+              <a:buFontTx/>
+              <a:buChar char="-"/>
+            </a:pPr>
+            <a:r>
+              <a:rPr lang="en-US" baseline="0" dirty="0" smtClean="0"/>
+              <a:t>Mac</a:t>
+            </a:r>
+          </a:p>
+          <a:p>
+            <a:pPr marL="171450" lvl="0" indent="-171450">
+              <a:buFontTx/>
+              <a:buChar char="-"/>
+            </a:pPr>
+            <a:r>
+              <a:rPr lang="en-US" baseline="0" dirty="0" smtClean="0"/>
+              <a:t>setup username and email</a:t>
+            </a:r>
+          </a:p>
+          <a:p>
+            <a:pPr marL="171450" lvl="0" indent="-171450">
+              <a:buFontTx/>
+              <a:buChar char="-"/>
+            </a:pPr>
+            <a:endParaRPr dirty="0"/>
+          </a:p>
+        </p:txBody>
+      </p:sp>
+      <p:sp>
+        <p:nvSpPr>
+          <p:cNvPr id="100" name="Shape 100"/>
+          <p:cNvSpPr>
+            <a:spLocks noGrp="1" noRot="1" noChangeAspect="1"/>
+          </p:cNvSpPr>
+          <p:nvPr>
+            <p:ph type="sldImg" idx="2"/>
+          </p:nvPr>
+        </p:nvSpPr>
+        <p:spPr>
+          <a:xfrm>
+            <a:off x="1143000" y="685800"/>
+            <a:ext cx="4572000" cy="3429000"/>
+          </a:xfrm>
+          <a:custGeom>
+            <a:avLst/>
+            <a:gdLst/>
+            <a:ahLst/>
+            <a:cxnLst/>
+            <a:rect l="0" t="0" r="0" b="0"/>
+            <a:pathLst>
+              <a:path w="120000" h="120000" extrusionOk="0">
+                <a:moveTo>
+                  <a:pt x="0" y="0"/>
+                </a:moveTo>
+                <a:lnTo>
+                  <a:pt x="120000" y="0"/>
+                </a:lnTo>
+                <a:lnTo>
+                  <a:pt x="120000" y="120000"/>
+                </a:lnTo>
+                <a:lnTo>
+                  <a:pt x="0" y="120000"/>
+                </a:lnTo>
+                <a:close/>
+              </a:path>
+            </a:pathLst>
+          </a:custGeom>
+        </p:spPr>
+      </p:sp>
+    </p:spTree>
+    <p:extLst>
+      <p:ext uri="{BB962C8B-B14F-4D97-AF65-F5344CB8AC3E}">
+        <p14:creationId xmlns:p14="http://schemas.microsoft.com/office/powerpoint/2010/main" val="2666093823"/>
+      </p:ext>
+    </p:extLst>
+  </p:cSld>
+  <p:clrMapOvr>
+    <a:masterClrMapping/>
+  </p:clrMapOvr>
+</p:notes>
+</file>
+
+<file path=ppt/notesSlides/notesSlide31.xml><?xml version="1.0" encoding="utf-8"?>
+<p:notes xmlns:a="http://schemas.openxmlformats.org/drawingml/2006/main" xmlns:r="http://schemas.openxmlformats.org/officeDocument/2006/relationships" xmlns:p="http://schemas.openxmlformats.org/presentationml/2006/main" showMasterSp="0" showMasterPhAnim="0">
+  <p:cSld>
+    <p:spTree>
+      <p:nvGrpSpPr>
+        <p:cNvPr id="1" name="Shape 98"/>
+        <p:cNvGrpSpPr/>
+        <p:nvPr/>
+      </p:nvGrpSpPr>
+      <p:grpSpPr>
+        <a:xfrm>
+          <a:off x="0" y="0"/>
+          <a:ext cx="0" cy="0"/>
+          <a:chOff x="0" y="0"/>
+          <a:chExt cx="0" cy="0"/>
+        </a:xfrm>
+      </p:grpSpPr>
+      <p:sp>
+        <p:nvSpPr>
+          <p:cNvPr id="99" name="Shape 99"/>
+          <p:cNvSpPr txBox="1">
+            <a:spLocks noGrp="1"/>
+          </p:cNvSpPr>
+          <p:nvPr>
+            <p:ph type="body" idx="1"/>
+          </p:nvPr>
+        </p:nvSpPr>
+        <p:spPr>
+          <a:xfrm>
+            <a:off x="685800" y="4343400"/>
+            <a:ext cx="5486399" cy="4114800"/>
+          </a:xfrm>
+          <a:prstGeom prst="rect">
+            <a:avLst/>
+          </a:prstGeom>
+        </p:spPr>
+        <p:txBody>
+          <a:bodyPr lIns="91425" tIns="91425" rIns="91425" bIns="91425" anchor="ctr" anchorCtr="0">
+            <a:noAutofit/>
+          </a:bodyPr>
+          <a:lstStyle/>
+          <a:p>
+            <a:pPr marL="171450" indent="-171450">
+              <a:buFontTx/>
+              <a:buChar char="-"/>
+            </a:pPr>
+            <a:r>
+              <a:rPr lang="en-US" baseline="0" dirty="0" smtClean="0"/>
+              <a:t>install GIT</a:t>
+            </a:r>
+          </a:p>
+          <a:p>
+            <a:pPr marL="628650" lvl="1" indent="-171450">
+              <a:buFontTx/>
+              <a:buChar char="-"/>
+            </a:pPr>
+            <a:r>
+              <a:rPr lang="en-US" baseline="0" dirty="0" smtClean="0"/>
+              <a:t>Windows</a:t>
+            </a:r>
+          </a:p>
+          <a:p>
+            <a:pPr marL="628650" lvl="1" indent="-171450">
+              <a:buFontTx/>
+              <a:buChar char="-"/>
+            </a:pPr>
+            <a:r>
+              <a:rPr lang="en-US" baseline="0" dirty="0" smtClean="0"/>
+              <a:t>Mac</a:t>
+            </a:r>
+          </a:p>
+          <a:p>
+            <a:pPr marL="171450" lvl="0" indent="-171450">
+              <a:buFontTx/>
+              <a:buChar char="-"/>
+            </a:pPr>
+            <a:r>
+              <a:rPr lang="en-US" baseline="0" dirty="0" smtClean="0"/>
+              <a:t>setup username and email</a:t>
+            </a:r>
+          </a:p>
+          <a:p>
+            <a:pPr marL="171450" lvl="0" indent="-171450">
+              <a:buFontTx/>
+              <a:buChar char="-"/>
+            </a:pPr>
+            <a:endParaRPr dirty="0"/>
+          </a:p>
+        </p:txBody>
+      </p:sp>
+      <p:sp>
+        <p:nvSpPr>
+          <p:cNvPr id="100" name="Shape 100"/>
+          <p:cNvSpPr>
+            <a:spLocks noGrp="1" noRot="1" noChangeAspect="1"/>
+          </p:cNvSpPr>
+          <p:nvPr>
+            <p:ph type="sldImg" idx="2"/>
+          </p:nvPr>
+        </p:nvSpPr>
+        <p:spPr>
+          <a:xfrm>
+            <a:off x="1143000" y="685800"/>
+            <a:ext cx="4572000" cy="3429000"/>
+          </a:xfrm>
+          <a:custGeom>
+            <a:avLst/>
+            <a:gdLst/>
+            <a:ahLst/>
+            <a:cxnLst/>
+            <a:rect l="0" t="0" r="0" b="0"/>
+            <a:pathLst>
+              <a:path w="120000" h="120000" extrusionOk="0">
+                <a:moveTo>
+                  <a:pt x="0" y="0"/>
+                </a:moveTo>
+                <a:lnTo>
+                  <a:pt x="120000" y="0"/>
+                </a:lnTo>
+                <a:lnTo>
+                  <a:pt x="120000" y="120000"/>
+                </a:lnTo>
+                <a:lnTo>
+                  <a:pt x="0" y="120000"/>
+                </a:lnTo>
+                <a:close/>
+              </a:path>
+            </a:pathLst>
+          </a:custGeom>
+        </p:spPr>
+      </p:sp>
+    </p:spTree>
+    <p:extLst>
+      <p:ext uri="{BB962C8B-B14F-4D97-AF65-F5344CB8AC3E}">
+        <p14:creationId xmlns:p14="http://schemas.microsoft.com/office/powerpoint/2010/main" val="1567401964"/>
       </p:ext>
     </p:extLst>
   </p:cSld>
@@ -3178,6 +3883,34 @@
               <a:buFontTx/>
               <a:buChar char="-"/>
             </a:pPr>
+            <a:r>
+              <a:rPr lang="en-US" dirty="0" smtClean="0"/>
+              <a:t>IDs</a:t>
+            </a:r>
+          </a:p>
+          <a:p>
+            <a:pPr marL="628650" lvl="1" indent="-171450">
+              <a:buFontTx/>
+              <a:buChar char="-"/>
+            </a:pPr>
+            <a:r>
+              <a:rPr lang="en-US" dirty="0" smtClean="0"/>
+              <a:t>in</a:t>
+            </a:r>
+            <a:r>
+              <a:rPr lang="en-US" baseline="0" dirty="0" smtClean="0"/>
+              <a:t> SVN, you identify a commit using the revision number</a:t>
+            </a:r>
+          </a:p>
+          <a:p>
+            <a:pPr marL="628650" lvl="1" indent="-171450">
+              <a:buFontTx/>
+              <a:buChar char="-"/>
+            </a:pPr>
+            <a:r>
+              <a:rPr lang="en-US" baseline="0" dirty="0" smtClean="0"/>
+              <a:t>because GIT is distributed, you don’t know the sequence of commits on 2 different branches. GIT uses a cryptographical hash function, SHA1. It’s like MD5, but much stronger. GIT uses this as a commit identifier.</a:t>
+            </a:r>
             <a:endParaRPr dirty="0"/>
           </a:p>
         </p:txBody>
@@ -3388,7 +4121,15 @@
             </a:pPr>
             <a:r>
               <a:rPr lang="en-US" baseline="0" dirty="0" smtClean="0"/>
-              <a:t>DAG (directed acyclic graph) of commits</a:t>
+              <a:t>DAG </a:t>
+            </a:r>
+            <a:r>
+              <a:rPr lang="en-US" baseline="0" dirty="0" smtClean="0"/>
+              <a:t>(directed acyclic graph) of </a:t>
+            </a:r>
+            <a:r>
+              <a:rPr lang="en-US" baseline="0" dirty="0" smtClean="0"/>
+              <a:t>commits</a:t>
             </a:r>
           </a:p>
           <a:p>
@@ -3398,8 +4139,9 @@
             </a:pPr>
             <a:r>
               <a:rPr lang="en-US" baseline="0" dirty="0" smtClean="0"/>
-              <a:t>each commit points to its parent</a:t>
-            </a:r>
+              <a:t>each commit has a SHA1 identifier in GIT, but I represented them by letters to make things easier to understand</a:t>
+            </a:r>
+            <a:endParaRPr lang="en-US" baseline="0" dirty="0" smtClean="0"/>
           </a:p>
           <a:p>
             <a:pPr marL="171450" indent="-171450">
@@ -3408,7 +4150,7 @@
             </a:pPr>
             <a:r>
               <a:rPr lang="en-US" baseline="0" dirty="0" smtClean="0"/>
-              <a:t>master and my-branch are branches</a:t>
+              <a:t>each commit points to its parent</a:t>
             </a:r>
           </a:p>
           <a:p>
@@ -3418,17 +4160,18 @@
             </a:pPr>
             <a:r>
               <a:rPr lang="en-US" baseline="0" dirty="0" smtClean="0"/>
-              <a:t>a </a:t>
-            </a:r>
+              <a:t>master and my-branch are branches</a:t>
+            </a:r>
+          </a:p>
+          <a:p>
+            <a:pPr marL="171450" indent="-171450">
+              <a:buFontTx/>
+              <a:buChar char="-"/>
+            </a:pPr>
             <a:r>
               <a:rPr lang="en-US" baseline="0" dirty="0" smtClean="0"/>
-              <a:t>branch is a label pointing to a particular node in the </a:t>
-            </a:r>
-            <a:r>
-              <a:rPr lang="en-US" baseline="0" dirty="0" smtClean="0"/>
-              <a:t>graph</a:t>
-            </a:r>
-            <a:endParaRPr lang="en-US" baseline="0" dirty="0" smtClean="0"/>
+              <a:t>a branch is a label pointing to a particular node in the graph</a:t>
+            </a:r>
           </a:p>
           <a:p>
             <a:pPr marL="628650" lvl="1" indent="-171450">
@@ -3447,11 +4190,7 @@
             </a:pPr>
             <a:r>
               <a:rPr lang="en-US" baseline="0" dirty="0" smtClean="0"/>
-              <a:t>the special label “HEAD” points to the current branch (that’s how GIT know what is the current branch</a:t>
-            </a:r>
-            <a:r>
-              <a:rPr lang="en-US" baseline="0" dirty="0" smtClean="0"/>
-              <a:t>)</a:t>
+              <a:t>the special label “HEAD” points to the current branch (that’s how GIT know what is the current branch)</a:t>
             </a:r>
           </a:p>
           <a:p>
@@ -3461,13 +4200,8 @@
             </a:pPr>
             <a:r>
               <a:rPr lang="en-US" baseline="0" dirty="0" smtClean="0"/>
-              <a:t>v0.1 is a tag. A tag is like a branch in that it points to a commit, but a tag does not change. It will always point to the </a:t>
-            </a:r>
-            <a:r>
-              <a:rPr lang="en-US" baseline="0" smtClean="0"/>
-              <a:t>same commit.</a:t>
-            </a:r>
-            <a:endParaRPr lang="en-US" baseline="0" dirty="0" smtClean="0"/>
+              <a:t>v0.1 is a tag. A tag is like a branch in that it points to a commit, but a tag does not change. It will always point to the same commit.</a:t>
+            </a:r>
           </a:p>
           <a:p>
             <a:pPr marL="171450" indent="-171450">
@@ -9783,9 +10517,18 @@
   <p:clrMapOvr>
     <a:masterClrMapping/>
   </p:clrMapOvr>
-  <p:transition spd="slow">
-    <p:cut/>
-  </p:transition>
+  <mc:AlternateContent xmlns:mc="http://schemas.openxmlformats.org/markup-compatibility/2006">
+    <mc:Choice xmlns:p14="http://schemas.microsoft.com/office/powerpoint/2010/main" Requires="p14">
+      <p:transition p14:dur="100">
+        <p:cut/>
+      </p:transition>
+    </mc:Choice>
+    <mc:Fallback>
+      <p:transition>
+        <p:cut/>
+      </p:transition>
+    </mc:Fallback>
+  </mc:AlternateContent>
   <p:timing>
     <p:tnLst>
       <p:par>
@@ -9854,18 +10597,18 @@
       </p:sp>
       <p:sp>
         <p:nvSpPr>
-          <p:cNvPr id="96" name="Shape 96"/>
+          <p:cNvPr id="97" name="Shape 97"/>
           <p:cNvSpPr txBox="1">
             <a:spLocks noGrp="1"/>
           </p:cNvSpPr>
           <p:nvPr>
-            <p:ph type="body" idx="1"/>
-          </p:nvPr>
-        </p:nvSpPr>
-        <p:spPr>
-          <a:xfrm>
-            <a:off x="341167" y="937873"/>
-            <a:ext cx="8498033" cy="5024690"/>
+            <p:ph type="body" idx="2"/>
+          </p:nvPr>
+        </p:nvSpPr>
+        <p:spPr>
+          <a:xfrm>
+            <a:off x="341168" y="228026"/>
+            <a:ext cx="8498032" cy="457199"/>
           </a:xfrm>
           <a:prstGeom prst="rect">
             <a:avLst/>
@@ -9881,83 +10624,6 @@
           </a:bodyPr>
           <a:lstStyle/>
           <a:p>
-            <a:pPr marL="355600" indent="-355600">
-              <a:lnSpc>
-                <a:spcPct val="90000"/>
-              </a:lnSpc>
-              <a:buClr>
-                <a:srgbClr val="2E3640"/>
-              </a:buClr>
-              <a:buSzPct val="100000"/>
-              <a:buBlip>
-                <a:blip r:embed="rId3"/>
-              </a:buBlip>
-            </a:pPr>
-            <a:r>
-              <a:rPr lang="en-US" sz="2400" dirty="0" smtClean="0"/>
-              <a:t>stuff</a:t>
-            </a:r>
-            <a:endParaRPr lang="en-US" sz="2400" dirty="0" smtClean="0">
-              <a:sym typeface="Wingdings" panose="05000000000000000000" pitchFamily="2" charset="2"/>
-            </a:endParaRPr>
-          </a:p>
-          <a:p>
-            <a:pPr>
-              <a:lnSpc>
-                <a:spcPct val="90000"/>
-              </a:lnSpc>
-              <a:buClr>
-                <a:srgbClr val="2E3640"/>
-              </a:buClr>
-              <a:buSzPct val="100000"/>
-            </a:pPr>
-            <a:endParaRPr lang="en-US" sz="2400" dirty="0">
-              <a:sym typeface="Wingdings" panose="05000000000000000000" pitchFamily="2" charset="2"/>
-            </a:endParaRPr>
-          </a:p>
-          <a:p>
-            <a:pPr>
-              <a:lnSpc>
-                <a:spcPct val="90000"/>
-              </a:lnSpc>
-              <a:buClr>
-                <a:srgbClr val="2E3640"/>
-              </a:buClr>
-              <a:buSzPct val="100000"/>
-            </a:pPr>
-            <a:endParaRPr lang="en-US" sz="2400" dirty="0" smtClean="0"/>
-          </a:p>
-        </p:txBody>
-      </p:sp>
-      <p:sp>
-        <p:nvSpPr>
-          <p:cNvPr id="97" name="Shape 97"/>
-          <p:cNvSpPr txBox="1">
-            <a:spLocks noGrp="1"/>
-          </p:cNvSpPr>
-          <p:nvPr>
-            <p:ph type="body" idx="2"/>
-          </p:nvPr>
-        </p:nvSpPr>
-        <p:spPr>
-          <a:xfrm>
-            <a:off x="341168" y="228026"/>
-            <a:ext cx="8498032" cy="457199"/>
-          </a:xfrm>
-          <a:prstGeom prst="rect">
-            <a:avLst/>
-          </a:prstGeom>
-          <a:noFill/>
-          <a:ln>
-            <a:noFill/>
-          </a:ln>
-        </p:spPr>
-        <p:txBody>
-          <a:bodyPr lIns="68569" tIns="34275" rIns="68569" bIns="34275" anchor="t" anchorCtr="0">
-            <a:noAutofit/>
-          </a:bodyPr>
-          <a:lstStyle/>
-          <a:p>
             <a:pPr>
               <a:buClr>
                 <a:schemeClr val="accent2"/>
@@ -9966,12 +10632,42 @@
             </a:pPr>
             <a:r>
               <a:rPr lang="en-US" sz="3600" dirty="0" smtClean="0"/>
-              <a:t>Title</a:t>
+              <a:t>GIT rebase my-branch on top of master / 1 of 6</a:t>
             </a:r>
             <a:endParaRPr lang="en-US" sz="3600" dirty="0"/>
           </a:p>
         </p:txBody>
       </p:sp>
+      <p:pic>
+        <p:nvPicPr>
+          <p:cNvPr id="7" name="Picture 6"/>
+          <p:cNvPicPr>
+            <a:picLocks noChangeAspect="1"/>
+          </p:cNvPicPr>
+          <p:nvPr/>
+        </p:nvPicPr>
+        <p:blipFill>
+          <a:blip r:embed="rId3">
+            <a:extLst>
+              <a:ext uri="{28A0092B-C50C-407E-A947-70E740481C1C}">
+                <a14:useLocalDpi xmlns:a14="http://schemas.microsoft.com/office/drawing/2010/main" val="0"/>
+              </a:ext>
+            </a:extLst>
+          </a:blip>
+          <a:stretch>
+            <a:fillRect/>
+          </a:stretch>
+        </p:blipFill>
+        <p:spPr>
+          <a:xfrm>
+            <a:off x="1571625" y="1562100"/>
+            <a:ext cx="6000750" cy="3733800"/>
+          </a:xfrm>
+          <a:prstGeom prst="rect">
+            <a:avLst/>
+          </a:prstGeom>
+        </p:spPr>
+      </p:pic>
     </p:spTree>
     <p:extLst>
       <p:ext uri="{BB962C8B-B14F-4D97-AF65-F5344CB8AC3E}">
@@ -9982,9 +10678,18 @@
   <p:clrMapOvr>
     <a:masterClrMapping/>
   </p:clrMapOvr>
-  <p:transition spd="slow">
-    <p:cut/>
-  </p:transition>
+  <mc:AlternateContent xmlns:mc="http://schemas.openxmlformats.org/markup-compatibility/2006">
+    <mc:Choice xmlns:p14="http://schemas.microsoft.com/office/powerpoint/2010/main" Requires="p14">
+      <p:transition p14:dur="100">
+        <p:cut/>
+      </p:transition>
+    </mc:Choice>
+    <mc:Fallback>
+      <p:transition>
+        <p:cut/>
+      </p:transition>
+    </mc:Fallback>
+  </mc:AlternateContent>
   <p:timing>
     <p:tnLst>
       <p:par>
@@ -10053,18 +10758,18 @@
       </p:sp>
       <p:sp>
         <p:nvSpPr>
-          <p:cNvPr id="96" name="Shape 96"/>
+          <p:cNvPr id="97" name="Shape 97"/>
           <p:cNvSpPr txBox="1">
             <a:spLocks noGrp="1"/>
           </p:cNvSpPr>
           <p:nvPr>
-            <p:ph type="body" idx="1"/>
-          </p:nvPr>
-        </p:nvSpPr>
-        <p:spPr>
-          <a:xfrm>
-            <a:off x="341167" y="937873"/>
-            <a:ext cx="8498033" cy="5024690"/>
+            <p:ph type="body" idx="2"/>
+          </p:nvPr>
+        </p:nvSpPr>
+        <p:spPr>
+          <a:xfrm>
+            <a:off x="341168" y="228026"/>
+            <a:ext cx="8498032" cy="457199"/>
           </a:xfrm>
           <a:prstGeom prst="rect">
             <a:avLst/>
@@ -10080,83 +10785,6 @@
           </a:bodyPr>
           <a:lstStyle/>
           <a:p>
-            <a:pPr marL="355600" indent="-355600">
-              <a:lnSpc>
-                <a:spcPct val="90000"/>
-              </a:lnSpc>
-              <a:buClr>
-                <a:srgbClr val="2E3640"/>
-              </a:buClr>
-              <a:buSzPct val="100000"/>
-              <a:buBlip>
-                <a:blip r:embed="rId3"/>
-              </a:buBlip>
-            </a:pPr>
-            <a:r>
-              <a:rPr lang="en-US" sz="2400" dirty="0" smtClean="0"/>
-              <a:t>stuff</a:t>
-            </a:r>
-            <a:endParaRPr lang="en-US" sz="2400" dirty="0" smtClean="0">
-              <a:sym typeface="Wingdings" panose="05000000000000000000" pitchFamily="2" charset="2"/>
-            </a:endParaRPr>
-          </a:p>
-          <a:p>
-            <a:pPr>
-              <a:lnSpc>
-                <a:spcPct val="90000"/>
-              </a:lnSpc>
-              <a:buClr>
-                <a:srgbClr val="2E3640"/>
-              </a:buClr>
-              <a:buSzPct val="100000"/>
-            </a:pPr>
-            <a:endParaRPr lang="en-US" sz="2400" dirty="0">
-              <a:sym typeface="Wingdings" panose="05000000000000000000" pitchFamily="2" charset="2"/>
-            </a:endParaRPr>
-          </a:p>
-          <a:p>
-            <a:pPr>
-              <a:lnSpc>
-                <a:spcPct val="90000"/>
-              </a:lnSpc>
-              <a:buClr>
-                <a:srgbClr val="2E3640"/>
-              </a:buClr>
-              <a:buSzPct val="100000"/>
-            </a:pPr>
-            <a:endParaRPr lang="en-US" sz="2400" dirty="0" smtClean="0"/>
-          </a:p>
-        </p:txBody>
-      </p:sp>
-      <p:sp>
-        <p:nvSpPr>
-          <p:cNvPr id="97" name="Shape 97"/>
-          <p:cNvSpPr txBox="1">
-            <a:spLocks noGrp="1"/>
-          </p:cNvSpPr>
-          <p:nvPr>
-            <p:ph type="body" idx="2"/>
-          </p:nvPr>
-        </p:nvSpPr>
-        <p:spPr>
-          <a:xfrm>
-            <a:off x="341168" y="228026"/>
-            <a:ext cx="8498032" cy="457199"/>
-          </a:xfrm>
-          <a:prstGeom prst="rect">
-            <a:avLst/>
-          </a:prstGeom>
-          <a:noFill/>
-          <a:ln>
-            <a:noFill/>
-          </a:ln>
-        </p:spPr>
-        <p:txBody>
-          <a:bodyPr lIns="68569" tIns="34275" rIns="68569" bIns="34275" anchor="t" anchorCtr="0">
-            <a:noAutofit/>
-          </a:bodyPr>
-          <a:lstStyle/>
-          <a:p>
             <a:pPr>
               <a:buClr>
                 <a:schemeClr val="accent2"/>
@@ -10165,16 +10793,46 @@
             </a:pPr>
             <a:r>
               <a:rPr lang="en-US" sz="3600" dirty="0" smtClean="0"/>
-              <a:t>Title</a:t>
+              <a:t>GIT rebase my-branch on top of master / 2 of 6</a:t>
             </a:r>
             <a:endParaRPr lang="en-US" sz="3600" dirty="0"/>
           </a:p>
         </p:txBody>
       </p:sp>
+      <p:pic>
+        <p:nvPicPr>
+          <p:cNvPr id="2" name="Picture 1"/>
+          <p:cNvPicPr>
+            <a:picLocks noChangeAspect="1"/>
+          </p:cNvPicPr>
+          <p:nvPr/>
+        </p:nvPicPr>
+        <p:blipFill>
+          <a:blip r:embed="rId3">
+            <a:extLst>
+              <a:ext uri="{28A0092B-C50C-407E-A947-70E740481C1C}">
+                <a14:useLocalDpi xmlns:a14="http://schemas.microsoft.com/office/drawing/2010/main" val="0"/>
+              </a:ext>
+            </a:extLst>
+          </a:blip>
+          <a:stretch>
+            <a:fillRect/>
+          </a:stretch>
+        </p:blipFill>
+        <p:spPr>
+          <a:xfrm>
+            <a:off x="1509712" y="1962150"/>
+            <a:ext cx="6124575" cy="2933700"/>
+          </a:xfrm>
+          <a:prstGeom prst="rect">
+            <a:avLst/>
+          </a:prstGeom>
+        </p:spPr>
+      </p:pic>
     </p:spTree>
     <p:extLst>
       <p:ext uri="{BB962C8B-B14F-4D97-AF65-F5344CB8AC3E}">
-        <p14:creationId xmlns:p14="http://schemas.microsoft.com/office/powerpoint/2010/main" val="396525421"/>
+        <p14:creationId xmlns:p14="http://schemas.microsoft.com/office/powerpoint/2010/main" val="4105156958"/>
       </p:ext>
     </p:extLst>
   </p:cSld>
@@ -10252,18 +10910,18 @@
       </p:sp>
       <p:sp>
         <p:nvSpPr>
-          <p:cNvPr id="96" name="Shape 96"/>
+          <p:cNvPr id="97" name="Shape 97"/>
           <p:cNvSpPr txBox="1">
             <a:spLocks noGrp="1"/>
           </p:cNvSpPr>
           <p:nvPr>
-            <p:ph type="body" idx="1"/>
-          </p:nvPr>
-        </p:nvSpPr>
-        <p:spPr>
-          <a:xfrm>
-            <a:off x="341167" y="937873"/>
-            <a:ext cx="8498033" cy="5024690"/>
+            <p:ph type="body" idx="2"/>
+          </p:nvPr>
+        </p:nvSpPr>
+        <p:spPr>
+          <a:xfrm>
+            <a:off x="341168" y="228026"/>
+            <a:ext cx="8498032" cy="457199"/>
           </a:xfrm>
           <a:prstGeom prst="rect">
             <a:avLst/>
@@ -10279,83 +10937,6 @@
           </a:bodyPr>
           <a:lstStyle/>
           <a:p>
-            <a:pPr marL="355600" indent="-355600">
-              <a:lnSpc>
-                <a:spcPct val="90000"/>
-              </a:lnSpc>
-              <a:buClr>
-                <a:srgbClr val="2E3640"/>
-              </a:buClr>
-              <a:buSzPct val="100000"/>
-              <a:buBlip>
-                <a:blip r:embed="rId3"/>
-              </a:buBlip>
-            </a:pPr>
-            <a:r>
-              <a:rPr lang="en-US" sz="2400" dirty="0" smtClean="0"/>
-              <a:t>stuff</a:t>
-            </a:r>
-            <a:endParaRPr lang="en-US" sz="2400" dirty="0" smtClean="0">
-              <a:sym typeface="Wingdings" panose="05000000000000000000" pitchFamily="2" charset="2"/>
-            </a:endParaRPr>
-          </a:p>
-          <a:p>
-            <a:pPr>
-              <a:lnSpc>
-                <a:spcPct val="90000"/>
-              </a:lnSpc>
-              <a:buClr>
-                <a:srgbClr val="2E3640"/>
-              </a:buClr>
-              <a:buSzPct val="100000"/>
-            </a:pPr>
-            <a:endParaRPr lang="en-US" sz="2400" dirty="0">
-              <a:sym typeface="Wingdings" panose="05000000000000000000" pitchFamily="2" charset="2"/>
-            </a:endParaRPr>
-          </a:p>
-          <a:p>
-            <a:pPr>
-              <a:lnSpc>
-                <a:spcPct val="90000"/>
-              </a:lnSpc>
-              <a:buClr>
-                <a:srgbClr val="2E3640"/>
-              </a:buClr>
-              <a:buSzPct val="100000"/>
-            </a:pPr>
-            <a:endParaRPr lang="en-US" sz="2400" dirty="0" smtClean="0"/>
-          </a:p>
-        </p:txBody>
-      </p:sp>
-      <p:sp>
-        <p:nvSpPr>
-          <p:cNvPr id="97" name="Shape 97"/>
-          <p:cNvSpPr txBox="1">
-            <a:spLocks noGrp="1"/>
-          </p:cNvSpPr>
-          <p:nvPr>
-            <p:ph type="body" idx="2"/>
-          </p:nvPr>
-        </p:nvSpPr>
-        <p:spPr>
-          <a:xfrm>
-            <a:off x="341168" y="228026"/>
-            <a:ext cx="8498032" cy="457199"/>
-          </a:xfrm>
-          <a:prstGeom prst="rect">
-            <a:avLst/>
-          </a:prstGeom>
-          <a:noFill/>
-          <a:ln>
-            <a:noFill/>
-          </a:ln>
-        </p:spPr>
-        <p:txBody>
-          <a:bodyPr lIns="68569" tIns="34275" rIns="68569" bIns="34275" anchor="t" anchorCtr="0">
-            <a:noAutofit/>
-          </a:bodyPr>
-          <a:lstStyle/>
-          <a:p>
             <a:pPr>
               <a:buClr>
                 <a:schemeClr val="accent2"/>
@@ -10364,16 +10945,46 @@
             </a:pPr>
             <a:r>
               <a:rPr lang="en-US" sz="3600" dirty="0" smtClean="0"/>
-              <a:t>Title</a:t>
+              <a:t>GIT rebase my-branch on top of master / 3 of 6</a:t>
             </a:r>
             <a:endParaRPr lang="en-US" sz="3600" dirty="0"/>
           </a:p>
         </p:txBody>
       </p:sp>
+      <p:pic>
+        <p:nvPicPr>
+          <p:cNvPr id="2" name="Picture 1"/>
+          <p:cNvPicPr>
+            <a:picLocks noChangeAspect="1"/>
+          </p:cNvPicPr>
+          <p:nvPr/>
+        </p:nvPicPr>
+        <p:blipFill>
+          <a:blip r:embed="rId3">
+            <a:extLst>
+              <a:ext uri="{28A0092B-C50C-407E-A947-70E740481C1C}">
+                <a14:useLocalDpi xmlns:a14="http://schemas.microsoft.com/office/drawing/2010/main" val="0"/>
+              </a:ext>
+            </a:extLst>
+          </a:blip>
+          <a:stretch>
+            <a:fillRect/>
+          </a:stretch>
+        </p:blipFill>
+        <p:spPr>
+          <a:xfrm>
+            <a:off x="1023937" y="1962150"/>
+            <a:ext cx="7096125" cy="2933700"/>
+          </a:xfrm>
+          <a:prstGeom prst="rect">
+            <a:avLst/>
+          </a:prstGeom>
+        </p:spPr>
+      </p:pic>
     </p:spTree>
     <p:extLst>
       <p:ext uri="{BB962C8B-B14F-4D97-AF65-F5344CB8AC3E}">
-        <p14:creationId xmlns:p14="http://schemas.microsoft.com/office/powerpoint/2010/main" val="695698909"/>
+        <p14:creationId xmlns:p14="http://schemas.microsoft.com/office/powerpoint/2010/main" val="3597349377"/>
       </p:ext>
     </p:extLst>
   </p:cSld>
@@ -10750,18 +11361,18 @@
       </p:sp>
       <p:sp>
         <p:nvSpPr>
-          <p:cNvPr id="96" name="Shape 96"/>
+          <p:cNvPr id="97" name="Shape 97"/>
           <p:cNvSpPr txBox="1">
             <a:spLocks noGrp="1"/>
           </p:cNvSpPr>
           <p:nvPr>
-            <p:ph type="body" idx="1"/>
-          </p:nvPr>
-        </p:nvSpPr>
-        <p:spPr>
-          <a:xfrm>
-            <a:off x="341167" y="937873"/>
-            <a:ext cx="8498033" cy="5024690"/>
+            <p:ph type="body" idx="2"/>
+          </p:nvPr>
+        </p:nvSpPr>
+        <p:spPr>
+          <a:xfrm>
+            <a:off x="341168" y="228026"/>
+            <a:ext cx="8498032" cy="457199"/>
           </a:xfrm>
           <a:prstGeom prst="rect">
             <a:avLst/>
@@ -10777,83 +11388,6 @@
           </a:bodyPr>
           <a:lstStyle/>
           <a:p>
-            <a:pPr marL="355600" indent="-355600">
-              <a:lnSpc>
-                <a:spcPct val="90000"/>
-              </a:lnSpc>
-              <a:buClr>
-                <a:srgbClr val="2E3640"/>
-              </a:buClr>
-              <a:buSzPct val="100000"/>
-              <a:buBlip>
-                <a:blip r:embed="rId3"/>
-              </a:buBlip>
-            </a:pPr>
-            <a:r>
-              <a:rPr lang="en-US" sz="2400" dirty="0" smtClean="0"/>
-              <a:t>stuff</a:t>
-            </a:r>
-            <a:endParaRPr lang="en-US" sz="2400" dirty="0" smtClean="0">
-              <a:sym typeface="Wingdings" panose="05000000000000000000" pitchFamily="2" charset="2"/>
-            </a:endParaRPr>
-          </a:p>
-          <a:p>
-            <a:pPr>
-              <a:lnSpc>
-                <a:spcPct val="90000"/>
-              </a:lnSpc>
-              <a:buClr>
-                <a:srgbClr val="2E3640"/>
-              </a:buClr>
-              <a:buSzPct val="100000"/>
-            </a:pPr>
-            <a:endParaRPr lang="en-US" sz="2400" dirty="0">
-              <a:sym typeface="Wingdings" panose="05000000000000000000" pitchFamily="2" charset="2"/>
-            </a:endParaRPr>
-          </a:p>
-          <a:p>
-            <a:pPr>
-              <a:lnSpc>
-                <a:spcPct val="90000"/>
-              </a:lnSpc>
-              <a:buClr>
-                <a:srgbClr val="2E3640"/>
-              </a:buClr>
-              <a:buSzPct val="100000"/>
-            </a:pPr>
-            <a:endParaRPr lang="en-US" sz="2400" dirty="0" smtClean="0"/>
-          </a:p>
-        </p:txBody>
-      </p:sp>
-      <p:sp>
-        <p:nvSpPr>
-          <p:cNvPr id="97" name="Shape 97"/>
-          <p:cNvSpPr txBox="1">
-            <a:spLocks noGrp="1"/>
-          </p:cNvSpPr>
-          <p:nvPr>
-            <p:ph type="body" idx="2"/>
-          </p:nvPr>
-        </p:nvSpPr>
-        <p:spPr>
-          <a:xfrm>
-            <a:off x="341168" y="228026"/>
-            <a:ext cx="8498032" cy="457199"/>
-          </a:xfrm>
-          <a:prstGeom prst="rect">
-            <a:avLst/>
-          </a:prstGeom>
-          <a:noFill/>
-          <a:ln>
-            <a:noFill/>
-          </a:ln>
-        </p:spPr>
-        <p:txBody>
-          <a:bodyPr lIns="68569" tIns="34275" rIns="68569" bIns="34275" anchor="t" anchorCtr="0">
-            <a:noAutofit/>
-          </a:bodyPr>
-          <a:lstStyle/>
-          <a:p>
             <a:pPr>
               <a:buClr>
                 <a:schemeClr val="accent2"/>
@@ -10862,16 +11396,46 @@
             </a:pPr>
             <a:r>
               <a:rPr lang="en-US" sz="3600" dirty="0" smtClean="0"/>
-              <a:t>Title</a:t>
+              <a:t>GIT rebase my-branch on top of master / 4 of 6</a:t>
             </a:r>
             <a:endParaRPr lang="en-US" sz="3600" dirty="0"/>
           </a:p>
         </p:txBody>
       </p:sp>
+      <p:pic>
+        <p:nvPicPr>
+          <p:cNvPr id="2" name="Picture 1"/>
+          <p:cNvPicPr>
+            <a:picLocks noChangeAspect="1"/>
+          </p:cNvPicPr>
+          <p:nvPr/>
+        </p:nvPicPr>
+        <p:blipFill>
+          <a:blip r:embed="rId3">
+            <a:extLst>
+              <a:ext uri="{28A0092B-C50C-407E-A947-70E740481C1C}">
+                <a14:useLocalDpi xmlns:a14="http://schemas.microsoft.com/office/drawing/2010/main" val="0"/>
+              </a:ext>
+            </a:extLst>
+          </a:blip>
+          <a:stretch>
+            <a:fillRect/>
+          </a:stretch>
+        </p:blipFill>
+        <p:spPr>
+          <a:xfrm>
+            <a:off x="909637" y="1962150"/>
+            <a:ext cx="7324725" cy="2933700"/>
+          </a:xfrm>
+          <a:prstGeom prst="rect">
+            <a:avLst/>
+          </a:prstGeom>
+        </p:spPr>
+      </p:pic>
     </p:spTree>
     <p:extLst>
       <p:ext uri="{BB962C8B-B14F-4D97-AF65-F5344CB8AC3E}">
-        <p14:creationId xmlns:p14="http://schemas.microsoft.com/office/powerpoint/2010/main" val="2915095849"/>
+        <p14:creationId xmlns:p14="http://schemas.microsoft.com/office/powerpoint/2010/main" val="2879789484"/>
       </p:ext>
     </p:extLst>
   </p:cSld>
@@ -10949,18 +11513,18 @@
       </p:sp>
       <p:sp>
         <p:nvSpPr>
-          <p:cNvPr id="96" name="Shape 96"/>
+          <p:cNvPr id="97" name="Shape 97"/>
           <p:cNvSpPr txBox="1">
             <a:spLocks noGrp="1"/>
           </p:cNvSpPr>
           <p:nvPr>
-            <p:ph type="body" idx="1"/>
-          </p:nvPr>
-        </p:nvSpPr>
-        <p:spPr>
-          <a:xfrm>
-            <a:off x="341167" y="937873"/>
-            <a:ext cx="8498033" cy="5024690"/>
+            <p:ph type="body" idx="2"/>
+          </p:nvPr>
+        </p:nvSpPr>
+        <p:spPr>
+          <a:xfrm>
+            <a:off x="341168" y="228026"/>
+            <a:ext cx="8498032" cy="457199"/>
           </a:xfrm>
           <a:prstGeom prst="rect">
             <a:avLst/>
@@ -10976,83 +11540,6 @@
           </a:bodyPr>
           <a:lstStyle/>
           <a:p>
-            <a:pPr marL="355600" indent="-355600">
-              <a:lnSpc>
-                <a:spcPct val="90000"/>
-              </a:lnSpc>
-              <a:buClr>
-                <a:srgbClr val="2E3640"/>
-              </a:buClr>
-              <a:buSzPct val="100000"/>
-              <a:buBlip>
-                <a:blip r:embed="rId3"/>
-              </a:buBlip>
-            </a:pPr>
-            <a:r>
-              <a:rPr lang="en-US" sz="2400" dirty="0" smtClean="0"/>
-              <a:t>stuff</a:t>
-            </a:r>
-            <a:endParaRPr lang="en-US" sz="2400" dirty="0" smtClean="0">
-              <a:sym typeface="Wingdings" panose="05000000000000000000" pitchFamily="2" charset="2"/>
-            </a:endParaRPr>
-          </a:p>
-          <a:p>
-            <a:pPr>
-              <a:lnSpc>
-                <a:spcPct val="90000"/>
-              </a:lnSpc>
-              <a:buClr>
-                <a:srgbClr val="2E3640"/>
-              </a:buClr>
-              <a:buSzPct val="100000"/>
-            </a:pPr>
-            <a:endParaRPr lang="en-US" sz="2400" dirty="0">
-              <a:sym typeface="Wingdings" panose="05000000000000000000" pitchFamily="2" charset="2"/>
-            </a:endParaRPr>
-          </a:p>
-          <a:p>
-            <a:pPr>
-              <a:lnSpc>
-                <a:spcPct val="90000"/>
-              </a:lnSpc>
-              <a:buClr>
-                <a:srgbClr val="2E3640"/>
-              </a:buClr>
-              <a:buSzPct val="100000"/>
-            </a:pPr>
-            <a:endParaRPr lang="en-US" sz="2400" dirty="0" smtClean="0"/>
-          </a:p>
-        </p:txBody>
-      </p:sp>
-      <p:sp>
-        <p:nvSpPr>
-          <p:cNvPr id="97" name="Shape 97"/>
-          <p:cNvSpPr txBox="1">
-            <a:spLocks noGrp="1"/>
-          </p:cNvSpPr>
-          <p:nvPr>
-            <p:ph type="body" idx="2"/>
-          </p:nvPr>
-        </p:nvSpPr>
-        <p:spPr>
-          <a:xfrm>
-            <a:off x="341168" y="228026"/>
-            <a:ext cx="8498032" cy="457199"/>
-          </a:xfrm>
-          <a:prstGeom prst="rect">
-            <a:avLst/>
-          </a:prstGeom>
-          <a:noFill/>
-          <a:ln>
-            <a:noFill/>
-          </a:ln>
-        </p:spPr>
-        <p:txBody>
-          <a:bodyPr lIns="68569" tIns="34275" rIns="68569" bIns="34275" anchor="t" anchorCtr="0">
-            <a:noAutofit/>
-          </a:bodyPr>
-          <a:lstStyle/>
-          <a:p>
             <a:pPr>
               <a:buClr>
                 <a:schemeClr val="accent2"/>
@@ -11061,16 +11548,46 @@
             </a:pPr>
             <a:r>
               <a:rPr lang="en-US" sz="3600" dirty="0" smtClean="0"/>
-              <a:t>Title</a:t>
+              <a:t>GIT rebase my-branch on top of master / 5 of 6</a:t>
             </a:r>
             <a:endParaRPr lang="en-US" sz="3600" dirty="0"/>
           </a:p>
         </p:txBody>
       </p:sp>
+      <p:pic>
+        <p:nvPicPr>
+          <p:cNvPr id="2" name="Picture 1"/>
+          <p:cNvPicPr>
+            <a:picLocks noChangeAspect="1"/>
+          </p:cNvPicPr>
+          <p:nvPr/>
+        </p:nvPicPr>
+        <p:blipFill>
+          <a:blip r:embed="rId3">
+            <a:extLst>
+              <a:ext uri="{28A0092B-C50C-407E-A947-70E740481C1C}">
+                <a14:useLocalDpi xmlns:a14="http://schemas.microsoft.com/office/drawing/2010/main" val="0"/>
+              </a:ext>
+            </a:extLst>
+          </a:blip>
+          <a:stretch>
+            <a:fillRect/>
+          </a:stretch>
+        </p:blipFill>
+        <p:spPr>
+          <a:xfrm>
+            <a:off x="423862" y="1962150"/>
+            <a:ext cx="8296275" cy="2933700"/>
+          </a:xfrm>
+          <a:prstGeom prst="rect">
+            <a:avLst/>
+          </a:prstGeom>
+        </p:spPr>
+      </p:pic>
     </p:spTree>
     <p:extLst>
       <p:ext uri="{BB962C8B-B14F-4D97-AF65-F5344CB8AC3E}">
-        <p14:creationId xmlns:p14="http://schemas.microsoft.com/office/powerpoint/2010/main" val="893865620"/>
+        <p14:creationId xmlns:p14="http://schemas.microsoft.com/office/powerpoint/2010/main" val="1129268425"/>
       </p:ext>
     </p:extLst>
   </p:cSld>
@@ -11148,18 +11665,18 @@
       </p:sp>
       <p:sp>
         <p:nvSpPr>
-          <p:cNvPr id="96" name="Shape 96"/>
+          <p:cNvPr id="97" name="Shape 97"/>
           <p:cNvSpPr txBox="1">
             <a:spLocks noGrp="1"/>
           </p:cNvSpPr>
           <p:nvPr>
-            <p:ph type="body" idx="1"/>
-          </p:nvPr>
-        </p:nvSpPr>
-        <p:spPr>
-          <a:xfrm>
-            <a:off x="341167" y="937873"/>
-            <a:ext cx="8498033" cy="5024690"/>
+            <p:ph type="body" idx="2"/>
+          </p:nvPr>
+        </p:nvSpPr>
+        <p:spPr>
+          <a:xfrm>
+            <a:off x="341168" y="228026"/>
+            <a:ext cx="8498032" cy="457199"/>
           </a:xfrm>
           <a:prstGeom prst="rect">
             <a:avLst/>
@@ -11175,83 +11692,6 @@
           </a:bodyPr>
           <a:lstStyle/>
           <a:p>
-            <a:pPr marL="355600" indent="-355600">
-              <a:lnSpc>
-                <a:spcPct val="90000"/>
-              </a:lnSpc>
-              <a:buClr>
-                <a:srgbClr val="2E3640"/>
-              </a:buClr>
-              <a:buSzPct val="100000"/>
-              <a:buBlip>
-                <a:blip r:embed="rId3"/>
-              </a:buBlip>
-            </a:pPr>
-            <a:r>
-              <a:rPr lang="en-US" sz="2400" dirty="0" smtClean="0"/>
-              <a:t>stuff</a:t>
-            </a:r>
-            <a:endParaRPr lang="en-US" sz="2400" dirty="0" smtClean="0">
-              <a:sym typeface="Wingdings" panose="05000000000000000000" pitchFamily="2" charset="2"/>
-            </a:endParaRPr>
-          </a:p>
-          <a:p>
-            <a:pPr>
-              <a:lnSpc>
-                <a:spcPct val="90000"/>
-              </a:lnSpc>
-              <a:buClr>
-                <a:srgbClr val="2E3640"/>
-              </a:buClr>
-              <a:buSzPct val="100000"/>
-            </a:pPr>
-            <a:endParaRPr lang="en-US" sz="2400" dirty="0">
-              <a:sym typeface="Wingdings" panose="05000000000000000000" pitchFamily="2" charset="2"/>
-            </a:endParaRPr>
-          </a:p>
-          <a:p>
-            <a:pPr>
-              <a:lnSpc>
-                <a:spcPct val="90000"/>
-              </a:lnSpc>
-              <a:buClr>
-                <a:srgbClr val="2E3640"/>
-              </a:buClr>
-              <a:buSzPct val="100000"/>
-            </a:pPr>
-            <a:endParaRPr lang="en-US" sz="2400" dirty="0" smtClean="0"/>
-          </a:p>
-        </p:txBody>
-      </p:sp>
-      <p:sp>
-        <p:nvSpPr>
-          <p:cNvPr id="97" name="Shape 97"/>
-          <p:cNvSpPr txBox="1">
-            <a:spLocks noGrp="1"/>
-          </p:cNvSpPr>
-          <p:nvPr>
-            <p:ph type="body" idx="2"/>
-          </p:nvPr>
-        </p:nvSpPr>
-        <p:spPr>
-          <a:xfrm>
-            <a:off x="341168" y="228026"/>
-            <a:ext cx="8498032" cy="457199"/>
-          </a:xfrm>
-          <a:prstGeom prst="rect">
-            <a:avLst/>
-          </a:prstGeom>
-          <a:noFill/>
-          <a:ln>
-            <a:noFill/>
-          </a:ln>
-        </p:spPr>
-        <p:txBody>
-          <a:bodyPr lIns="68569" tIns="34275" rIns="68569" bIns="34275" anchor="t" anchorCtr="0">
-            <a:noAutofit/>
-          </a:bodyPr>
-          <a:lstStyle/>
-          <a:p>
             <a:pPr>
               <a:buClr>
                 <a:schemeClr val="accent2"/>
@@ -11260,16 +11700,46 @@
             </a:pPr>
             <a:r>
               <a:rPr lang="en-US" sz="3600" dirty="0" smtClean="0"/>
-              <a:t>Title</a:t>
+              <a:t>GIT rebase my-branch on top of master / 6 of 6</a:t>
             </a:r>
             <a:endParaRPr lang="en-US" sz="3600" dirty="0"/>
           </a:p>
         </p:txBody>
       </p:sp>
+      <p:pic>
+        <p:nvPicPr>
+          <p:cNvPr id="2" name="Picture 1"/>
+          <p:cNvPicPr>
+            <a:picLocks noChangeAspect="1"/>
+          </p:cNvPicPr>
+          <p:nvPr/>
+        </p:nvPicPr>
+        <p:blipFill>
+          <a:blip r:embed="rId3">
+            <a:extLst>
+              <a:ext uri="{28A0092B-C50C-407E-A947-70E740481C1C}">
+                <a14:useLocalDpi xmlns:a14="http://schemas.microsoft.com/office/drawing/2010/main" val="0"/>
+              </a:ext>
+            </a:extLst>
+          </a:blip>
+          <a:stretch>
+            <a:fillRect/>
+          </a:stretch>
+        </p:blipFill>
+        <p:spPr>
+          <a:xfrm>
+            <a:off x="309562" y="1962150"/>
+            <a:ext cx="8524875" cy="2933700"/>
+          </a:xfrm>
+          <a:prstGeom prst="rect">
+            <a:avLst/>
+          </a:prstGeom>
+        </p:spPr>
+      </p:pic>
     </p:spTree>
     <p:extLst>
       <p:ext uri="{BB962C8B-B14F-4D97-AF65-F5344CB8AC3E}">
-        <p14:creationId xmlns:p14="http://schemas.microsoft.com/office/powerpoint/2010/main" val="2176611703"/>
+        <p14:creationId xmlns:p14="http://schemas.microsoft.com/office/powerpoint/2010/main" val="4010013225"/>
       </p:ext>
     </p:extLst>
   </p:cSld>
@@ -11468,7 +11938,7 @@
     </p:spTree>
     <p:extLst>
       <p:ext uri="{BB962C8B-B14F-4D97-AF65-F5344CB8AC3E}">
-        <p14:creationId xmlns:p14="http://schemas.microsoft.com/office/powerpoint/2010/main" val="2978980850"/>
+        <p14:creationId xmlns:p14="http://schemas.microsoft.com/office/powerpoint/2010/main" val="396525421"/>
       </p:ext>
     </p:extLst>
   </p:cSld>
@@ -11667,7 +12137,7 @@
     </p:spTree>
     <p:extLst>
       <p:ext uri="{BB962C8B-B14F-4D97-AF65-F5344CB8AC3E}">
-        <p14:creationId xmlns:p14="http://schemas.microsoft.com/office/powerpoint/2010/main" val="2675765428"/>
+        <p14:creationId xmlns:p14="http://schemas.microsoft.com/office/powerpoint/2010/main" val="695698909"/>
       </p:ext>
     </p:extLst>
   </p:cSld>
@@ -11786,7 +12256,7 @@
             </a:pPr>
             <a:r>
               <a:rPr lang="en-US" sz="2400" dirty="0" smtClean="0"/>
-              <a:t>Time to get the hands dirty</a:t>
+              <a:t>stuff</a:t>
             </a:r>
             <a:endParaRPr lang="en-US" sz="2400" dirty="0" smtClean="0">
               <a:sym typeface="Wingdings" panose="05000000000000000000" pitchFamily="2" charset="2"/>
@@ -11857,50 +12327,16 @@
             </a:pPr>
             <a:r>
               <a:rPr lang="en-US" sz="3600" dirty="0" smtClean="0"/>
-              <a:t>Hands-on </a:t>
-            </a:r>
-            <a:r>
-              <a:rPr lang="en-US" sz="3600" dirty="0" err="1" smtClean="0"/>
-              <a:t>Workshow</a:t>
+              <a:t>Title</a:t>
             </a:r>
             <a:endParaRPr lang="en-US" sz="3600" dirty="0"/>
           </a:p>
         </p:txBody>
       </p:sp>
-      <p:pic>
-        <p:nvPicPr>
-          <p:cNvPr id="2" name="Picture 1"/>
-          <p:cNvPicPr>
-            <a:picLocks noChangeAspect="1"/>
-          </p:cNvPicPr>
-          <p:nvPr/>
-        </p:nvPicPr>
-        <p:blipFill>
-          <a:blip r:embed="rId4" cstate="print">
-            <a:extLst>
-              <a:ext uri="{28A0092B-C50C-407E-A947-70E740481C1C}">
-                <a14:useLocalDpi xmlns:a14="http://schemas.microsoft.com/office/drawing/2010/main" val="0"/>
-              </a:ext>
-            </a:extLst>
-          </a:blip>
-          <a:stretch>
-            <a:fillRect/>
-          </a:stretch>
-        </p:blipFill>
-        <p:spPr>
-          <a:xfrm>
-            <a:off x="1744403" y="1514354"/>
-            <a:ext cx="5529699" cy="4479801"/>
-          </a:xfrm>
-          <a:prstGeom prst="rect">
-            <a:avLst/>
-          </a:prstGeom>
-        </p:spPr>
-      </p:pic>
     </p:spTree>
     <p:extLst>
       <p:ext uri="{BB962C8B-B14F-4D97-AF65-F5344CB8AC3E}">
-        <p14:creationId xmlns:p14="http://schemas.microsoft.com/office/powerpoint/2010/main" val="2075129891"/>
+        <p14:creationId xmlns:p14="http://schemas.microsoft.com/office/powerpoint/2010/main" val="2915095849"/>
       </p:ext>
     </p:extLst>
   </p:cSld>
@@ -12018,10 +12454,191 @@
               </a:buBlip>
             </a:pPr>
             <a:r>
-              <a:rPr lang="en-US" sz="2000" dirty="0" smtClean="0"/>
-              <a:t>install GIT</a:t>
-            </a:r>
-          </a:p>
+              <a:rPr lang="en-US" sz="2400" dirty="0" smtClean="0"/>
+              <a:t>stuff</a:t>
+            </a:r>
+            <a:endParaRPr lang="en-US" sz="2400" dirty="0" smtClean="0">
+              <a:sym typeface="Wingdings" panose="05000000000000000000" pitchFamily="2" charset="2"/>
+            </a:endParaRPr>
+          </a:p>
+          <a:p>
+            <a:pPr>
+              <a:lnSpc>
+                <a:spcPct val="90000"/>
+              </a:lnSpc>
+              <a:buClr>
+                <a:srgbClr val="2E3640"/>
+              </a:buClr>
+              <a:buSzPct val="100000"/>
+            </a:pPr>
+            <a:endParaRPr lang="en-US" sz="2400" dirty="0">
+              <a:sym typeface="Wingdings" panose="05000000000000000000" pitchFamily="2" charset="2"/>
+            </a:endParaRPr>
+          </a:p>
+          <a:p>
+            <a:pPr>
+              <a:lnSpc>
+                <a:spcPct val="90000"/>
+              </a:lnSpc>
+              <a:buClr>
+                <a:srgbClr val="2E3640"/>
+              </a:buClr>
+              <a:buSzPct val="100000"/>
+            </a:pPr>
+            <a:endParaRPr lang="en-US" sz="2400" dirty="0" smtClean="0"/>
+          </a:p>
+        </p:txBody>
+      </p:sp>
+      <p:sp>
+        <p:nvSpPr>
+          <p:cNvPr id="97" name="Shape 97"/>
+          <p:cNvSpPr txBox="1">
+            <a:spLocks noGrp="1"/>
+          </p:cNvSpPr>
+          <p:nvPr>
+            <p:ph type="body" idx="2"/>
+          </p:nvPr>
+        </p:nvSpPr>
+        <p:spPr>
+          <a:xfrm>
+            <a:off x="341168" y="228026"/>
+            <a:ext cx="8498032" cy="457199"/>
+          </a:xfrm>
+          <a:prstGeom prst="rect">
+            <a:avLst/>
+          </a:prstGeom>
+          <a:noFill/>
+          <a:ln>
+            <a:noFill/>
+          </a:ln>
+        </p:spPr>
+        <p:txBody>
+          <a:bodyPr lIns="68569" tIns="34275" rIns="68569" bIns="34275" anchor="t" anchorCtr="0">
+            <a:noAutofit/>
+          </a:bodyPr>
+          <a:lstStyle/>
+          <a:p>
+            <a:pPr>
+              <a:buClr>
+                <a:schemeClr val="accent2"/>
+              </a:buClr>
+              <a:buSzPct val="25000"/>
+            </a:pPr>
+            <a:r>
+              <a:rPr lang="en-US" sz="3600" dirty="0" smtClean="0"/>
+              <a:t>Title</a:t>
+            </a:r>
+            <a:endParaRPr lang="en-US" sz="3600" dirty="0"/>
+          </a:p>
+        </p:txBody>
+      </p:sp>
+    </p:spTree>
+    <p:extLst>
+      <p:ext uri="{BB962C8B-B14F-4D97-AF65-F5344CB8AC3E}">
+        <p14:creationId xmlns:p14="http://schemas.microsoft.com/office/powerpoint/2010/main" val="893865620"/>
+      </p:ext>
+    </p:extLst>
+  </p:cSld>
+  <p:clrMapOvr>
+    <a:masterClrMapping/>
+  </p:clrMapOvr>
+  <p:transition spd="slow">
+    <p:cut/>
+  </p:transition>
+  <p:timing>
+    <p:tnLst>
+      <p:par>
+        <p:cTn id="1" dur="indefinite" restart="never" nodeType="tmRoot"/>
+      </p:par>
+    </p:tnLst>
+  </p:timing>
+</p:sld>
+</file>
+
+<file path=ppt/slides/slide27.xml><?xml version="1.0" encoding="utf-8"?>
+<p:sld xmlns:a="http://schemas.openxmlformats.org/drawingml/2006/main" xmlns:r="http://schemas.openxmlformats.org/officeDocument/2006/relationships" xmlns:p="http://schemas.openxmlformats.org/presentationml/2006/main">
+  <p:cSld>
+    <p:spTree>
+      <p:nvGrpSpPr>
+        <p:cNvPr id="1" name="Shape 93"/>
+        <p:cNvGrpSpPr/>
+        <p:nvPr/>
+      </p:nvGrpSpPr>
+      <p:grpSpPr>
+        <a:xfrm>
+          <a:off x="0" y="0"/>
+          <a:ext cx="0" cy="0"/>
+          <a:chOff x="0" y="0"/>
+          <a:chExt cx="0" cy="0"/>
+        </a:xfrm>
+      </p:grpSpPr>
+      <p:sp>
+        <p:nvSpPr>
+          <p:cNvPr id="95" name="Shape 95"/>
+          <p:cNvSpPr txBox="1">
+            <a:spLocks noGrp="1"/>
+          </p:cNvSpPr>
+          <p:nvPr>
+            <p:ph type="sldNum" idx="12"/>
+          </p:nvPr>
+        </p:nvSpPr>
+        <p:spPr>
+          <a:xfrm>
+            <a:off x="7600950" y="5688719"/>
+            <a:ext cx="269142" cy="273844"/>
+          </a:xfrm>
+          <a:prstGeom prst="rect">
+            <a:avLst/>
+          </a:prstGeom>
+          <a:noFill/>
+          <a:ln>
+            <a:noFill/>
+          </a:ln>
+        </p:spPr>
+        <p:txBody>
+          <a:bodyPr lIns="68569" tIns="34275" rIns="68569" bIns="34275" anchor="ctr" anchorCtr="0">
+            <a:noAutofit/>
+          </a:bodyPr>
+          <a:lstStyle/>
+          <a:p>
+            <a:pPr>
+              <a:buSzPct val="25000"/>
+            </a:pPr>
+            <a:r>
+              <a:rPr lang="en-US"/>
+              <a:t> </a:t>
+            </a:r>
+          </a:p>
+        </p:txBody>
+      </p:sp>
+      <p:sp>
+        <p:nvSpPr>
+          <p:cNvPr id="96" name="Shape 96"/>
+          <p:cNvSpPr txBox="1">
+            <a:spLocks noGrp="1"/>
+          </p:cNvSpPr>
+          <p:nvPr>
+            <p:ph type="body" idx="1"/>
+          </p:nvPr>
+        </p:nvSpPr>
+        <p:spPr>
+          <a:xfrm>
+            <a:off x="341167" y="937873"/>
+            <a:ext cx="8498033" cy="5024690"/>
+          </a:xfrm>
+          <a:prstGeom prst="rect">
+            <a:avLst/>
+          </a:prstGeom>
+          <a:noFill/>
+          <a:ln>
+            <a:noFill/>
+          </a:ln>
+        </p:spPr>
+        <p:txBody>
+          <a:bodyPr lIns="68569" tIns="34275" rIns="68569" bIns="34275" anchor="t" anchorCtr="0">
+            <a:noAutofit/>
+          </a:bodyPr>
+          <a:lstStyle/>
           <a:p>
             <a:pPr marL="355600" indent="-355600">
               <a:lnSpc>
@@ -12036,12 +12653,191 @@
               </a:buBlip>
             </a:pPr>
             <a:r>
-              <a:rPr lang="en-US" sz="2000" dirty="0" smtClean="0">
-                <a:sym typeface="Wingdings" panose="05000000000000000000" pitchFamily="2" charset="2"/>
-              </a:rPr>
-              <a:t>setup username, password, editor</a:t>
-            </a:r>
-          </a:p>
+              <a:rPr lang="en-US" sz="2400" dirty="0" smtClean="0"/>
+              <a:t>stuff</a:t>
+            </a:r>
+            <a:endParaRPr lang="en-US" sz="2400" dirty="0" smtClean="0">
+              <a:sym typeface="Wingdings" panose="05000000000000000000" pitchFamily="2" charset="2"/>
+            </a:endParaRPr>
+          </a:p>
+          <a:p>
+            <a:pPr>
+              <a:lnSpc>
+                <a:spcPct val="90000"/>
+              </a:lnSpc>
+              <a:buClr>
+                <a:srgbClr val="2E3640"/>
+              </a:buClr>
+              <a:buSzPct val="100000"/>
+            </a:pPr>
+            <a:endParaRPr lang="en-US" sz="2400" dirty="0">
+              <a:sym typeface="Wingdings" panose="05000000000000000000" pitchFamily="2" charset="2"/>
+            </a:endParaRPr>
+          </a:p>
+          <a:p>
+            <a:pPr>
+              <a:lnSpc>
+                <a:spcPct val="90000"/>
+              </a:lnSpc>
+              <a:buClr>
+                <a:srgbClr val="2E3640"/>
+              </a:buClr>
+              <a:buSzPct val="100000"/>
+            </a:pPr>
+            <a:endParaRPr lang="en-US" sz="2400" dirty="0" smtClean="0"/>
+          </a:p>
+        </p:txBody>
+      </p:sp>
+      <p:sp>
+        <p:nvSpPr>
+          <p:cNvPr id="97" name="Shape 97"/>
+          <p:cNvSpPr txBox="1">
+            <a:spLocks noGrp="1"/>
+          </p:cNvSpPr>
+          <p:nvPr>
+            <p:ph type="body" idx="2"/>
+          </p:nvPr>
+        </p:nvSpPr>
+        <p:spPr>
+          <a:xfrm>
+            <a:off x="341168" y="228026"/>
+            <a:ext cx="8498032" cy="457199"/>
+          </a:xfrm>
+          <a:prstGeom prst="rect">
+            <a:avLst/>
+          </a:prstGeom>
+          <a:noFill/>
+          <a:ln>
+            <a:noFill/>
+          </a:ln>
+        </p:spPr>
+        <p:txBody>
+          <a:bodyPr lIns="68569" tIns="34275" rIns="68569" bIns="34275" anchor="t" anchorCtr="0">
+            <a:noAutofit/>
+          </a:bodyPr>
+          <a:lstStyle/>
+          <a:p>
+            <a:pPr>
+              <a:buClr>
+                <a:schemeClr val="accent2"/>
+              </a:buClr>
+              <a:buSzPct val="25000"/>
+            </a:pPr>
+            <a:r>
+              <a:rPr lang="en-US" sz="3600" dirty="0" smtClean="0"/>
+              <a:t>Title</a:t>
+            </a:r>
+            <a:endParaRPr lang="en-US" sz="3600" dirty="0"/>
+          </a:p>
+        </p:txBody>
+      </p:sp>
+    </p:spTree>
+    <p:extLst>
+      <p:ext uri="{BB962C8B-B14F-4D97-AF65-F5344CB8AC3E}">
+        <p14:creationId xmlns:p14="http://schemas.microsoft.com/office/powerpoint/2010/main" val="2176611703"/>
+      </p:ext>
+    </p:extLst>
+  </p:cSld>
+  <p:clrMapOvr>
+    <a:masterClrMapping/>
+  </p:clrMapOvr>
+  <p:transition spd="slow">
+    <p:cut/>
+  </p:transition>
+  <p:timing>
+    <p:tnLst>
+      <p:par>
+        <p:cTn id="1" dur="indefinite" restart="never" nodeType="tmRoot"/>
+      </p:par>
+    </p:tnLst>
+  </p:timing>
+</p:sld>
+</file>
+
+<file path=ppt/slides/slide28.xml><?xml version="1.0" encoding="utf-8"?>
+<p:sld xmlns:a="http://schemas.openxmlformats.org/drawingml/2006/main" xmlns:r="http://schemas.openxmlformats.org/officeDocument/2006/relationships" xmlns:p="http://schemas.openxmlformats.org/presentationml/2006/main">
+  <p:cSld>
+    <p:spTree>
+      <p:nvGrpSpPr>
+        <p:cNvPr id="1" name="Shape 93"/>
+        <p:cNvGrpSpPr/>
+        <p:nvPr/>
+      </p:nvGrpSpPr>
+      <p:grpSpPr>
+        <a:xfrm>
+          <a:off x="0" y="0"/>
+          <a:ext cx="0" cy="0"/>
+          <a:chOff x="0" y="0"/>
+          <a:chExt cx="0" cy="0"/>
+        </a:xfrm>
+      </p:grpSpPr>
+      <p:sp>
+        <p:nvSpPr>
+          <p:cNvPr id="95" name="Shape 95"/>
+          <p:cNvSpPr txBox="1">
+            <a:spLocks noGrp="1"/>
+          </p:cNvSpPr>
+          <p:nvPr>
+            <p:ph type="sldNum" idx="12"/>
+          </p:nvPr>
+        </p:nvSpPr>
+        <p:spPr>
+          <a:xfrm>
+            <a:off x="7600950" y="5688719"/>
+            <a:ext cx="269142" cy="273844"/>
+          </a:xfrm>
+          <a:prstGeom prst="rect">
+            <a:avLst/>
+          </a:prstGeom>
+          <a:noFill/>
+          <a:ln>
+            <a:noFill/>
+          </a:ln>
+        </p:spPr>
+        <p:txBody>
+          <a:bodyPr lIns="68569" tIns="34275" rIns="68569" bIns="34275" anchor="ctr" anchorCtr="0">
+            <a:noAutofit/>
+          </a:bodyPr>
+          <a:lstStyle/>
+          <a:p>
+            <a:pPr>
+              <a:buSzPct val="25000"/>
+            </a:pPr>
+            <a:r>
+              <a:rPr lang="en-US"/>
+              <a:t> </a:t>
+            </a:r>
+          </a:p>
+        </p:txBody>
+      </p:sp>
+      <p:sp>
+        <p:nvSpPr>
+          <p:cNvPr id="96" name="Shape 96"/>
+          <p:cNvSpPr txBox="1">
+            <a:spLocks noGrp="1"/>
+          </p:cNvSpPr>
+          <p:nvPr>
+            <p:ph type="body" idx="1"/>
+          </p:nvPr>
+        </p:nvSpPr>
+        <p:spPr>
+          <a:xfrm>
+            <a:off x="341167" y="937873"/>
+            <a:ext cx="8498033" cy="5024690"/>
+          </a:xfrm>
+          <a:prstGeom prst="rect">
+            <a:avLst/>
+          </a:prstGeom>
+          <a:noFill/>
+          <a:ln>
+            <a:noFill/>
+          </a:ln>
+        </p:spPr>
+        <p:txBody>
+          <a:bodyPr lIns="68569" tIns="34275" rIns="68569" bIns="34275" anchor="t" anchorCtr="0">
+            <a:noAutofit/>
+          </a:bodyPr>
+          <a:lstStyle/>
           <a:p>
             <a:pPr marL="355600" indent="-355600">
               <a:lnSpc>
@@ -12056,14 +12852,193 @@
               </a:buBlip>
             </a:pPr>
             <a:r>
-              <a:rPr lang="en-US" sz="2000" dirty="0" smtClean="0">
-                <a:sym typeface="Wingdings" panose="05000000000000000000" pitchFamily="2" charset="2"/>
-              </a:rPr>
-              <a:t>commands</a:t>
-            </a:r>
-          </a:p>
-          <a:p>
-            <a:pPr marL="893763" indent="-355600">
+              <a:rPr lang="en-US" sz="2400" dirty="0" smtClean="0"/>
+              <a:t>stuff</a:t>
+            </a:r>
+            <a:endParaRPr lang="en-US" sz="2400" dirty="0" smtClean="0">
+              <a:sym typeface="Wingdings" panose="05000000000000000000" pitchFamily="2" charset="2"/>
+            </a:endParaRPr>
+          </a:p>
+          <a:p>
+            <a:pPr>
+              <a:lnSpc>
+                <a:spcPct val="90000"/>
+              </a:lnSpc>
+              <a:buClr>
+                <a:srgbClr val="2E3640"/>
+              </a:buClr>
+              <a:buSzPct val="100000"/>
+            </a:pPr>
+            <a:endParaRPr lang="en-US" sz="2400" dirty="0">
+              <a:sym typeface="Wingdings" panose="05000000000000000000" pitchFamily="2" charset="2"/>
+            </a:endParaRPr>
+          </a:p>
+          <a:p>
+            <a:pPr>
+              <a:lnSpc>
+                <a:spcPct val="90000"/>
+              </a:lnSpc>
+              <a:buClr>
+                <a:srgbClr val="2E3640"/>
+              </a:buClr>
+              <a:buSzPct val="100000"/>
+            </a:pPr>
+            <a:endParaRPr lang="en-US" sz="2400" dirty="0" smtClean="0"/>
+          </a:p>
+        </p:txBody>
+      </p:sp>
+      <p:sp>
+        <p:nvSpPr>
+          <p:cNvPr id="97" name="Shape 97"/>
+          <p:cNvSpPr txBox="1">
+            <a:spLocks noGrp="1"/>
+          </p:cNvSpPr>
+          <p:nvPr>
+            <p:ph type="body" idx="2"/>
+          </p:nvPr>
+        </p:nvSpPr>
+        <p:spPr>
+          <a:xfrm>
+            <a:off x="341168" y="228026"/>
+            <a:ext cx="8498032" cy="457199"/>
+          </a:xfrm>
+          <a:prstGeom prst="rect">
+            <a:avLst/>
+          </a:prstGeom>
+          <a:noFill/>
+          <a:ln>
+            <a:noFill/>
+          </a:ln>
+        </p:spPr>
+        <p:txBody>
+          <a:bodyPr lIns="68569" tIns="34275" rIns="68569" bIns="34275" anchor="t" anchorCtr="0">
+            <a:noAutofit/>
+          </a:bodyPr>
+          <a:lstStyle/>
+          <a:p>
+            <a:pPr>
+              <a:buClr>
+                <a:schemeClr val="accent2"/>
+              </a:buClr>
+              <a:buSzPct val="25000"/>
+            </a:pPr>
+            <a:r>
+              <a:rPr lang="en-US" sz="3600" dirty="0" smtClean="0"/>
+              <a:t>Title</a:t>
+            </a:r>
+            <a:endParaRPr lang="en-US" sz="3600" dirty="0"/>
+          </a:p>
+        </p:txBody>
+      </p:sp>
+    </p:spTree>
+    <p:extLst>
+      <p:ext uri="{BB962C8B-B14F-4D97-AF65-F5344CB8AC3E}">
+        <p14:creationId xmlns:p14="http://schemas.microsoft.com/office/powerpoint/2010/main" val="2978980850"/>
+      </p:ext>
+    </p:extLst>
+  </p:cSld>
+  <p:clrMapOvr>
+    <a:masterClrMapping/>
+  </p:clrMapOvr>
+  <p:transition spd="slow">
+    <p:cut/>
+  </p:transition>
+  <p:timing>
+    <p:tnLst>
+      <p:par>
+        <p:cTn id="1" dur="indefinite" restart="never" nodeType="tmRoot"/>
+      </p:par>
+    </p:tnLst>
+  </p:timing>
+</p:sld>
+</file>
+
+<file path=ppt/slides/slide29.xml><?xml version="1.0" encoding="utf-8"?>
+<p:sld xmlns:a="http://schemas.openxmlformats.org/drawingml/2006/main" xmlns:r="http://schemas.openxmlformats.org/officeDocument/2006/relationships" xmlns:p="http://schemas.openxmlformats.org/presentationml/2006/main">
+  <p:cSld>
+    <p:spTree>
+      <p:nvGrpSpPr>
+        <p:cNvPr id="1" name="Shape 93"/>
+        <p:cNvGrpSpPr/>
+        <p:nvPr/>
+      </p:nvGrpSpPr>
+      <p:grpSpPr>
+        <a:xfrm>
+          <a:off x="0" y="0"/>
+          <a:ext cx="0" cy="0"/>
+          <a:chOff x="0" y="0"/>
+          <a:chExt cx="0" cy="0"/>
+        </a:xfrm>
+      </p:grpSpPr>
+      <p:sp>
+        <p:nvSpPr>
+          <p:cNvPr id="95" name="Shape 95"/>
+          <p:cNvSpPr txBox="1">
+            <a:spLocks noGrp="1"/>
+          </p:cNvSpPr>
+          <p:nvPr>
+            <p:ph type="sldNum" idx="12"/>
+          </p:nvPr>
+        </p:nvSpPr>
+        <p:spPr>
+          <a:xfrm>
+            <a:off x="7600950" y="5688719"/>
+            <a:ext cx="269142" cy="273844"/>
+          </a:xfrm>
+          <a:prstGeom prst="rect">
+            <a:avLst/>
+          </a:prstGeom>
+          <a:noFill/>
+          <a:ln>
+            <a:noFill/>
+          </a:ln>
+        </p:spPr>
+        <p:txBody>
+          <a:bodyPr lIns="68569" tIns="34275" rIns="68569" bIns="34275" anchor="ctr" anchorCtr="0">
+            <a:noAutofit/>
+          </a:bodyPr>
+          <a:lstStyle/>
+          <a:p>
+            <a:pPr>
+              <a:buSzPct val="25000"/>
+            </a:pPr>
+            <a:r>
+              <a:rPr lang="en-US"/>
+              <a:t> </a:t>
+            </a:r>
+          </a:p>
+        </p:txBody>
+      </p:sp>
+      <p:sp>
+        <p:nvSpPr>
+          <p:cNvPr id="96" name="Shape 96"/>
+          <p:cNvSpPr txBox="1">
+            <a:spLocks noGrp="1"/>
+          </p:cNvSpPr>
+          <p:nvPr>
+            <p:ph type="body" idx="1"/>
+          </p:nvPr>
+        </p:nvSpPr>
+        <p:spPr>
+          <a:xfrm>
+            <a:off x="341167" y="937873"/>
+            <a:ext cx="8498033" cy="5024690"/>
+          </a:xfrm>
+          <a:prstGeom prst="rect">
+            <a:avLst/>
+          </a:prstGeom>
+          <a:noFill/>
+          <a:ln>
+            <a:noFill/>
+          </a:ln>
+        </p:spPr>
+        <p:txBody>
+          <a:bodyPr lIns="68569" tIns="34275" rIns="68569" bIns="34275" anchor="t" anchorCtr="0">
+            <a:noAutofit/>
+          </a:bodyPr>
+          <a:lstStyle/>
+          <a:p>
+            <a:pPr marL="355600" indent="-355600">
               <a:lnSpc>
                 <a:spcPct val="90000"/>
               </a:lnSpc>
@@ -12076,20 +13051,15 @@
               </a:buBlip>
             </a:pPr>
             <a:r>
-              <a:rPr lang="en-US" sz="2000" dirty="0" err="1" smtClean="0">
-                <a:sym typeface="Wingdings" panose="05000000000000000000" pitchFamily="2" charset="2"/>
-              </a:rPr>
-              <a:t>git</a:t>
-            </a:r>
-            <a:r>
-              <a:rPr lang="en-US" sz="2000" dirty="0" smtClean="0">
-                <a:sym typeface="Wingdings" panose="05000000000000000000" pitchFamily="2" charset="2"/>
-              </a:rPr>
-              <a:t> help [command] (plus Google)</a:t>
-            </a:r>
-          </a:p>
-          <a:p>
-            <a:pPr marL="893763" indent="-355600">
+              <a:rPr lang="en-US" sz="2400" dirty="0" smtClean="0"/>
+              <a:t>stuff</a:t>
+            </a:r>
+            <a:endParaRPr lang="en-US" sz="2400" dirty="0" smtClean="0">
+              <a:sym typeface="Wingdings" panose="05000000000000000000" pitchFamily="2" charset="2"/>
+            </a:endParaRPr>
+          </a:p>
+          <a:p>
+            <a:pPr>
               <a:lnSpc>
                 <a:spcPct val="90000"/>
               </a:lnSpc>
@@ -12097,34 +13067,13 @@
                 <a:srgbClr val="2E3640"/>
               </a:buClr>
               <a:buSzPct val="100000"/>
-              <a:buBlip>
-                <a:blip r:embed="rId3"/>
-              </a:buBlip>
-            </a:pPr>
-            <a:r>
-              <a:rPr lang="en-US" sz="2000" dirty="0" err="1" smtClean="0">
-                <a:sym typeface="Wingdings" panose="05000000000000000000" pitchFamily="2" charset="2"/>
-              </a:rPr>
-              <a:t>git</a:t>
-            </a:r>
-            <a:r>
-              <a:rPr lang="en-US" sz="2000" dirty="0" smtClean="0">
-                <a:sym typeface="Wingdings" panose="05000000000000000000" pitchFamily="2" charset="2"/>
-              </a:rPr>
-              <a:t> </a:t>
-            </a:r>
-            <a:r>
-              <a:rPr lang="en-US" sz="2000" dirty="0" err="1" smtClean="0">
-                <a:sym typeface="Wingdings" panose="05000000000000000000" pitchFamily="2" charset="2"/>
-              </a:rPr>
-              <a:t>init</a:t>
-            </a:r>
-            <a:endParaRPr lang="en-US" sz="2000" dirty="0" smtClean="0">
+            </a:pPr>
+            <a:endParaRPr lang="en-US" sz="2400" dirty="0">
               <a:sym typeface="Wingdings" panose="05000000000000000000" pitchFamily="2" charset="2"/>
             </a:endParaRPr>
           </a:p>
           <a:p>
-            <a:pPr marL="893763" indent="-355600">
+            <a:pPr>
               <a:lnSpc>
                 <a:spcPct val="90000"/>
               </a:lnSpc>
@@ -12132,391 +13081,8 @@
                 <a:srgbClr val="2E3640"/>
               </a:buClr>
               <a:buSzPct val="100000"/>
-              <a:buBlip>
-                <a:blip r:embed="rId3"/>
-              </a:buBlip>
-            </a:pPr>
-            <a:r>
-              <a:rPr lang="en-US" sz="2000" dirty="0" err="1" smtClean="0">
-                <a:sym typeface="Wingdings" panose="05000000000000000000" pitchFamily="2" charset="2"/>
-              </a:rPr>
-              <a:t>git</a:t>
-            </a:r>
-            <a:r>
-              <a:rPr lang="en-US" sz="2000" dirty="0" smtClean="0">
-                <a:sym typeface="Wingdings" panose="05000000000000000000" pitchFamily="2" charset="2"/>
-              </a:rPr>
-              <a:t> ignore</a:t>
-            </a:r>
-          </a:p>
-          <a:p>
-            <a:pPr marL="893763" indent="-355600">
-              <a:lnSpc>
-                <a:spcPct val="90000"/>
-              </a:lnSpc>
-              <a:buClr>
-                <a:srgbClr val="2E3640"/>
-              </a:buClr>
-              <a:buSzPct val="100000"/>
-              <a:buBlip>
-                <a:blip r:embed="rId3"/>
-              </a:buBlip>
-            </a:pPr>
-            <a:r>
-              <a:rPr lang="en-US" sz="2000" dirty="0" err="1" smtClean="0">
-                <a:sym typeface="Wingdings" panose="05000000000000000000" pitchFamily="2" charset="2"/>
-              </a:rPr>
-              <a:t>git</a:t>
-            </a:r>
-            <a:r>
-              <a:rPr lang="en-US" sz="2000" dirty="0" smtClean="0">
-                <a:sym typeface="Wingdings" panose="05000000000000000000" pitchFamily="2" charset="2"/>
-              </a:rPr>
-              <a:t> add</a:t>
-            </a:r>
-          </a:p>
-          <a:p>
-            <a:pPr marL="893763" indent="-355600">
-              <a:lnSpc>
-                <a:spcPct val="90000"/>
-              </a:lnSpc>
-              <a:buClr>
-                <a:srgbClr val="2E3640"/>
-              </a:buClr>
-              <a:buSzPct val="100000"/>
-              <a:buBlip>
-                <a:blip r:embed="rId3"/>
-              </a:buBlip>
-            </a:pPr>
-            <a:r>
-              <a:rPr lang="en-US" sz="2000" dirty="0" err="1" smtClean="0">
-                <a:sym typeface="Wingdings" panose="05000000000000000000" pitchFamily="2" charset="2"/>
-              </a:rPr>
-              <a:t>git</a:t>
-            </a:r>
-            <a:r>
-              <a:rPr lang="en-US" sz="2000" dirty="0" smtClean="0">
-                <a:sym typeface="Wingdings" panose="05000000000000000000" pitchFamily="2" charset="2"/>
-              </a:rPr>
-              <a:t> </a:t>
-            </a:r>
-            <a:r>
-              <a:rPr lang="en-US" sz="2000" dirty="0" err="1" smtClean="0">
-                <a:sym typeface="Wingdings" panose="05000000000000000000" pitchFamily="2" charset="2"/>
-              </a:rPr>
-              <a:t>rm</a:t>
-            </a:r>
-            <a:endParaRPr lang="en-US" sz="2000" dirty="0" smtClean="0">
-              <a:sym typeface="Wingdings" panose="05000000000000000000" pitchFamily="2" charset="2"/>
-            </a:endParaRPr>
-          </a:p>
-          <a:p>
-            <a:pPr marL="893763" indent="-355600">
-              <a:lnSpc>
-                <a:spcPct val="90000"/>
-              </a:lnSpc>
-              <a:buClr>
-                <a:srgbClr val="2E3640"/>
-              </a:buClr>
-              <a:buSzPct val="100000"/>
-              <a:buBlip>
-                <a:blip r:embed="rId3"/>
-              </a:buBlip>
-            </a:pPr>
-            <a:r>
-              <a:rPr lang="en-US" sz="2000" dirty="0" err="1" smtClean="0">
-                <a:sym typeface="Wingdings" panose="05000000000000000000" pitchFamily="2" charset="2"/>
-              </a:rPr>
-              <a:t>git</a:t>
-            </a:r>
-            <a:r>
-              <a:rPr lang="en-US" sz="2000" dirty="0">
-                <a:sym typeface="Wingdings" panose="05000000000000000000" pitchFamily="2" charset="2"/>
-              </a:rPr>
-              <a:t> commit [--</a:t>
-            </a:r>
-            <a:r>
-              <a:rPr lang="en-US" sz="2000" dirty="0" err="1" smtClean="0">
-                <a:sym typeface="Wingdings" panose="05000000000000000000" pitchFamily="2" charset="2"/>
-              </a:rPr>
-              <a:t>ammend</a:t>
-            </a:r>
-            <a:r>
-              <a:rPr lang="en-US" sz="2000" dirty="0">
-                <a:sym typeface="Wingdings" panose="05000000000000000000" pitchFamily="2" charset="2"/>
-              </a:rPr>
-              <a:t>]</a:t>
-            </a:r>
-            <a:endParaRPr lang="en-US" sz="2000" dirty="0" smtClean="0">
-              <a:sym typeface="Wingdings" panose="05000000000000000000" pitchFamily="2" charset="2"/>
-            </a:endParaRPr>
-          </a:p>
-          <a:p>
-            <a:pPr marL="893763" indent="-355600">
-              <a:lnSpc>
-                <a:spcPct val="90000"/>
-              </a:lnSpc>
-              <a:buClr>
-                <a:srgbClr val="2E3640"/>
-              </a:buClr>
-              <a:buSzPct val="100000"/>
-              <a:buBlip>
-                <a:blip r:embed="rId3"/>
-              </a:buBlip>
-            </a:pPr>
-            <a:r>
-              <a:rPr lang="en-US" sz="2000" dirty="0" err="1" smtClean="0">
-                <a:sym typeface="Wingdings" panose="05000000000000000000" pitchFamily="2" charset="2"/>
-              </a:rPr>
-              <a:t>git</a:t>
-            </a:r>
-            <a:r>
-              <a:rPr lang="en-US" sz="2000" dirty="0" smtClean="0">
-                <a:sym typeface="Wingdings" panose="05000000000000000000" pitchFamily="2" charset="2"/>
-              </a:rPr>
-              <a:t> merge [--no-</a:t>
-            </a:r>
-            <a:r>
-              <a:rPr lang="en-US" sz="2000" dirty="0" err="1" smtClean="0">
-                <a:sym typeface="Wingdings" panose="05000000000000000000" pitchFamily="2" charset="2"/>
-              </a:rPr>
-              <a:t>ff</a:t>
-            </a:r>
-            <a:r>
-              <a:rPr lang="en-US" sz="2000" dirty="0" smtClean="0">
-                <a:sym typeface="Wingdings" panose="05000000000000000000" pitchFamily="2" charset="2"/>
-              </a:rPr>
-              <a:t>] [--</a:t>
-            </a:r>
-            <a:r>
-              <a:rPr lang="en-US" sz="2000" dirty="0" err="1" smtClean="0">
-                <a:sym typeface="Wingdings" panose="05000000000000000000" pitchFamily="2" charset="2"/>
-              </a:rPr>
-              <a:t>ff</a:t>
-            </a:r>
-            <a:r>
-              <a:rPr lang="en-US" sz="2000" dirty="0" smtClean="0">
-                <a:sym typeface="Wingdings" panose="05000000000000000000" pitchFamily="2" charset="2"/>
-              </a:rPr>
-              <a:t>-only]</a:t>
-            </a:r>
-          </a:p>
-          <a:p>
-            <a:pPr marL="893763" indent="-355600">
-              <a:lnSpc>
-                <a:spcPct val="90000"/>
-              </a:lnSpc>
-              <a:buClr>
-                <a:srgbClr val="2E3640"/>
-              </a:buClr>
-              <a:buSzPct val="100000"/>
-              <a:buBlip>
-                <a:blip r:embed="rId3"/>
-              </a:buBlip>
-            </a:pPr>
-            <a:r>
-              <a:rPr lang="en-US" sz="2000" dirty="0" err="1" smtClean="0">
-                <a:sym typeface="Wingdings" panose="05000000000000000000" pitchFamily="2" charset="2"/>
-              </a:rPr>
-              <a:t>git</a:t>
-            </a:r>
-            <a:r>
-              <a:rPr lang="en-US" sz="2000" dirty="0" smtClean="0">
-                <a:sym typeface="Wingdings" panose="05000000000000000000" pitchFamily="2" charset="2"/>
-              </a:rPr>
-              <a:t> rebase [--interactive]</a:t>
-            </a:r>
-          </a:p>
-          <a:p>
-            <a:pPr marL="893763" indent="-355600">
-              <a:lnSpc>
-                <a:spcPct val="90000"/>
-              </a:lnSpc>
-              <a:buClr>
-                <a:srgbClr val="2E3640"/>
-              </a:buClr>
-              <a:buSzPct val="100000"/>
-              <a:buBlip>
-                <a:blip r:embed="rId3"/>
-              </a:buBlip>
-            </a:pPr>
-            <a:r>
-              <a:rPr lang="en-US" sz="2000" dirty="0" err="1" smtClean="0">
-                <a:sym typeface="Wingdings" panose="05000000000000000000" pitchFamily="2" charset="2"/>
-              </a:rPr>
-              <a:t>git</a:t>
-            </a:r>
-            <a:r>
-              <a:rPr lang="en-US" sz="2000" dirty="0" smtClean="0">
-                <a:sym typeface="Wingdings" panose="05000000000000000000" pitchFamily="2" charset="2"/>
-              </a:rPr>
-              <a:t> cherry-pick</a:t>
-            </a:r>
-          </a:p>
-          <a:p>
-            <a:pPr marL="893763" indent="-355600">
-              <a:lnSpc>
-                <a:spcPct val="90000"/>
-              </a:lnSpc>
-              <a:buClr>
-                <a:srgbClr val="2E3640"/>
-              </a:buClr>
-              <a:buSzPct val="100000"/>
-              <a:buBlip>
-                <a:blip r:embed="rId3"/>
-              </a:buBlip>
-            </a:pPr>
-            <a:r>
-              <a:rPr lang="en-US" sz="2000" dirty="0" err="1" smtClean="0">
-                <a:sym typeface="Wingdings" panose="05000000000000000000" pitchFamily="2" charset="2"/>
-              </a:rPr>
-              <a:t>git</a:t>
-            </a:r>
-            <a:r>
-              <a:rPr lang="en-US" sz="2000" dirty="0" smtClean="0">
-                <a:sym typeface="Wingdings" panose="05000000000000000000" pitchFamily="2" charset="2"/>
-              </a:rPr>
-              <a:t> </a:t>
-            </a:r>
-            <a:r>
-              <a:rPr lang="en-US" sz="2000" dirty="0" err="1" smtClean="0">
-                <a:sym typeface="Wingdings" panose="05000000000000000000" pitchFamily="2" charset="2"/>
-              </a:rPr>
-              <a:t>reflog</a:t>
-            </a:r>
-            <a:endParaRPr lang="en-US" sz="2000" dirty="0" smtClean="0">
-              <a:sym typeface="Wingdings" panose="05000000000000000000" pitchFamily="2" charset="2"/>
-            </a:endParaRPr>
-          </a:p>
-          <a:p>
-            <a:pPr marL="893763" indent="-355600">
-              <a:lnSpc>
-                <a:spcPct val="90000"/>
-              </a:lnSpc>
-              <a:buClr>
-                <a:srgbClr val="2E3640"/>
-              </a:buClr>
-              <a:buSzPct val="100000"/>
-              <a:buBlip>
-                <a:blip r:embed="rId3"/>
-              </a:buBlip>
-            </a:pPr>
-            <a:r>
-              <a:rPr lang="en-US" sz="2000" dirty="0" err="1" smtClean="0">
-                <a:sym typeface="Wingdings" panose="05000000000000000000" pitchFamily="2" charset="2"/>
-              </a:rPr>
-              <a:t>git</a:t>
-            </a:r>
-            <a:r>
-              <a:rPr lang="en-US" sz="2000" dirty="0" smtClean="0">
-                <a:sym typeface="Wingdings" panose="05000000000000000000" pitchFamily="2" charset="2"/>
-              </a:rPr>
-              <a:t> fetch</a:t>
-            </a:r>
-          </a:p>
-          <a:p>
-            <a:pPr marL="893763" indent="-355600">
-              <a:lnSpc>
-                <a:spcPct val="90000"/>
-              </a:lnSpc>
-              <a:buClr>
-                <a:srgbClr val="2E3640"/>
-              </a:buClr>
-              <a:buSzPct val="100000"/>
-              <a:buBlip>
-                <a:blip r:embed="rId3"/>
-              </a:buBlip>
-            </a:pPr>
-            <a:r>
-              <a:rPr lang="en-US" sz="2000" dirty="0" err="1" smtClean="0">
-                <a:sym typeface="Wingdings" panose="05000000000000000000" pitchFamily="2" charset="2"/>
-              </a:rPr>
-              <a:t>git</a:t>
-            </a:r>
-            <a:r>
-              <a:rPr lang="en-US" sz="2000" dirty="0" smtClean="0">
-                <a:sym typeface="Wingdings" panose="05000000000000000000" pitchFamily="2" charset="2"/>
-              </a:rPr>
-              <a:t> pull [--rebase]</a:t>
-            </a:r>
-          </a:p>
-          <a:p>
-            <a:pPr marL="893763" indent="-355600">
-              <a:lnSpc>
-                <a:spcPct val="90000"/>
-              </a:lnSpc>
-              <a:buClr>
-                <a:srgbClr val="2E3640"/>
-              </a:buClr>
-              <a:buSzPct val="100000"/>
-              <a:buBlip>
-                <a:blip r:embed="rId3"/>
-              </a:buBlip>
-            </a:pPr>
-            <a:r>
-              <a:rPr lang="en-US" sz="2000" dirty="0" err="1" smtClean="0">
-                <a:sym typeface="Wingdings" panose="05000000000000000000" pitchFamily="2" charset="2"/>
-              </a:rPr>
-              <a:t>git</a:t>
-            </a:r>
-            <a:r>
-              <a:rPr lang="en-US" sz="2000" dirty="0" smtClean="0">
-                <a:sym typeface="Wingdings" panose="05000000000000000000" pitchFamily="2" charset="2"/>
-              </a:rPr>
-              <a:t> push</a:t>
-            </a:r>
-          </a:p>
-          <a:p>
-            <a:pPr marL="893763" indent="-355600">
-              <a:lnSpc>
-                <a:spcPct val="90000"/>
-              </a:lnSpc>
-              <a:buClr>
-                <a:srgbClr val="2E3640"/>
-              </a:buClr>
-              <a:buSzPct val="100000"/>
-              <a:buBlip>
-                <a:blip r:embed="rId3"/>
-              </a:buBlip>
-            </a:pPr>
-            <a:r>
-              <a:rPr lang="en-US" sz="2000" dirty="0" err="1" smtClean="0">
-                <a:sym typeface="Wingdings" panose="05000000000000000000" pitchFamily="2" charset="2"/>
-              </a:rPr>
-              <a:t>git</a:t>
-            </a:r>
-            <a:r>
-              <a:rPr lang="en-US" sz="2000" dirty="0" smtClean="0">
-                <a:sym typeface="Wingdings" panose="05000000000000000000" pitchFamily="2" charset="2"/>
-              </a:rPr>
-              <a:t> branch</a:t>
-            </a:r>
-          </a:p>
-          <a:p>
-            <a:pPr marL="893763" indent="-355600">
-              <a:lnSpc>
-                <a:spcPct val="90000"/>
-              </a:lnSpc>
-              <a:buClr>
-                <a:srgbClr val="2E3640"/>
-              </a:buClr>
-              <a:buSzPct val="100000"/>
-              <a:buBlip>
-                <a:blip r:embed="rId3"/>
-              </a:buBlip>
-            </a:pPr>
-            <a:r>
-              <a:rPr lang="en-US" sz="2000" dirty="0" err="1" smtClean="0">
-                <a:sym typeface="Wingdings" panose="05000000000000000000" pitchFamily="2" charset="2"/>
-              </a:rPr>
-              <a:t>git</a:t>
-            </a:r>
-            <a:r>
-              <a:rPr lang="en-US" sz="2000" dirty="0" smtClean="0">
-                <a:sym typeface="Wingdings" panose="05000000000000000000" pitchFamily="2" charset="2"/>
-              </a:rPr>
-              <a:t> tag</a:t>
-            </a:r>
+            </a:pPr>
+            <a:endParaRPr lang="en-US" sz="2400" dirty="0" smtClean="0"/>
           </a:p>
         </p:txBody>
       </p:sp>
@@ -12557,11 +13123,7 @@
             </a:pPr>
             <a:r>
               <a:rPr lang="en-US" sz="3600" dirty="0" smtClean="0"/>
-              <a:t>Hands-on </a:t>
-            </a:r>
-            <a:r>
-              <a:rPr lang="en-US" sz="3600" dirty="0" err="1" smtClean="0"/>
-              <a:t>Workshow</a:t>
+              <a:t>Title</a:t>
             </a:r>
             <a:endParaRPr lang="en-US" sz="3600" dirty="0"/>
           </a:p>
@@ -12570,7 +13132,7 @@
     </p:spTree>
     <p:extLst>
       <p:ext uri="{BB962C8B-B14F-4D97-AF65-F5344CB8AC3E}">
-        <p14:creationId xmlns:p14="http://schemas.microsoft.com/office/powerpoint/2010/main" val="2935937953"/>
+        <p14:creationId xmlns:p14="http://schemas.microsoft.com/office/powerpoint/2010/main" val="2675765428"/>
       </p:ext>
     </p:extLst>
   </p:cSld>
@@ -12891,6 +13453,909 @@
     <p:extLst>
       <p:ext uri="{BB962C8B-B14F-4D97-AF65-F5344CB8AC3E}">
         <p14:creationId xmlns:p14="http://schemas.microsoft.com/office/powerpoint/2010/main" val="1549631399"/>
+      </p:ext>
+    </p:extLst>
+  </p:cSld>
+  <p:clrMapOvr>
+    <a:masterClrMapping/>
+  </p:clrMapOvr>
+  <p:transition spd="slow">
+    <p:cut/>
+  </p:transition>
+  <p:timing>
+    <p:tnLst>
+      <p:par>
+        <p:cTn id="1" dur="indefinite" restart="never" nodeType="tmRoot"/>
+      </p:par>
+    </p:tnLst>
+  </p:timing>
+</p:sld>
+</file>
+
+<file path=ppt/slides/slide30.xml><?xml version="1.0" encoding="utf-8"?>
+<p:sld xmlns:a="http://schemas.openxmlformats.org/drawingml/2006/main" xmlns:r="http://schemas.openxmlformats.org/officeDocument/2006/relationships" xmlns:p="http://schemas.openxmlformats.org/presentationml/2006/main">
+  <p:cSld>
+    <p:spTree>
+      <p:nvGrpSpPr>
+        <p:cNvPr id="1" name="Shape 93"/>
+        <p:cNvGrpSpPr/>
+        <p:nvPr/>
+      </p:nvGrpSpPr>
+      <p:grpSpPr>
+        <a:xfrm>
+          <a:off x="0" y="0"/>
+          <a:ext cx="0" cy="0"/>
+          <a:chOff x="0" y="0"/>
+          <a:chExt cx="0" cy="0"/>
+        </a:xfrm>
+      </p:grpSpPr>
+      <p:sp>
+        <p:nvSpPr>
+          <p:cNvPr id="95" name="Shape 95"/>
+          <p:cNvSpPr txBox="1">
+            <a:spLocks noGrp="1"/>
+          </p:cNvSpPr>
+          <p:nvPr>
+            <p:ph type="sldNum" idx="12"/>
+          </p:nvPr>
+        </p:nvSpPr>
+        <p:spPr>
+          <a:xfrm>
+            <a:off x="7600950" y="5688719"/>
+            <a:ext cx="269142" cy="273844"/>
+          </a:xfrm>
+          <a:prstGeom prst="rect">
+            <a:avLst/>
+          </a:prstGeom>
+          <a:noFill/>
+          <a:ln>
+            <a:noFill/>
+          </a:ln>
+        </p:spPr>
+        <p:txBody>
+          <a:bodyPr lIns="68569" tIns="34275" rIns="68569" bIns="34275" anchor="ctr" anchorCtr="0">
+            <a:noAutofit/>
+          </a:bodyPr>
+          <a:lstStyle/>
+          <a:p>
+            <a:pPr>
+              <a:buSzPct val="25000"/>
+            </a:pPr>
+            <a:r>
+              <a:rPr lang="en-US"/>
+              <a:t> </a:t>
+            </a:r>
+          </a:p>
+        </p:txBody>
+      </p:sp>
+      <p:sp>
+        <p:nvSpPr>
+          <p:cNvPr id="96" name="Shape 96"/>
+          <p:cNvSpPr txBox="1">
+            <a:spLocks noGrp="1"/>
+          </p:cNvSpPr>
+          <p:nvPr>
+            <p:ph type="body" idx="1"/>
+          </p:nvPr>
+        </p:nvSpPr>
+        <p:spPr>
+          <a:xfrm>
+            <a:off x="341167" y="937873"/>
+            <a:ext cx="8498033" cy="5024690"/>
+          </a:xfrm>
+          <a:prstGeom prst="rect">
+            <a:avLst/>
+          </a:prstGeom>
+          <a:noFill/>
+          <a:ln>
+            <a:noFill/>
+          </a:ln>
+        </p:spPr>
+        <p:txBody>
+          <a:bodyPr lIns="68569" tIns="34275" rIns="68569" bIns="34275" anchor="t" anchorCtr="0">
+            <a:noAutofit/>
+          </a:bodyPr>
+          <a:lstStyle/>
+          <a:p>
+            <a:pPr marL="355600" indent="-355600">
+              <a:lnSpc>
+                <a:spcPct val="90000"/>
+              </a:lnSpc>
+              <a:buClr>
+                <a:srgbClr val="2E3640"/>
+              </a:buClr>
+              <a:buSzPct val="100000"/>
+              <a:buBlip>
+                <a:blip r:embed="rId3"/>
+              </a:buBlip>
+            </a:pPr>
+            <a:r>
+              <a:rPr lang="en-US" sz="2400" dirty="0" smtClean="0"/>
+              <a:t>Time to get the hands dirty</a:t>
+            </a:r>
+            <a:endParaRPr lang="en-US" sz="2400" dirty="0" smtClean="0">
+              <a:sym typeface="Wingdings" panose="05000000000000000000" pitchFamily="2" charset="2"/>
+            </a:endParaRPr>
+          </a:p>
+          <a:p>
+            <a:pPr>
+              <a:lnSpc>
+                <a:spcPct val="90000"/>
+              </a:lnSpc>
+              <a:buClr>
+                <a:srgbClr val="2E3640"/>
+              </a:buClr>
+              <a:buSzPct val="100000"/>
+            </a:pPr>
+            <a:endParaRPr lang="en-US" sz="2400" dirty="0">
+              <a:sym typeface="Wingdings" panose="05000000000000000000" pitchFamily="2" charset="2"/>
+            </a:endParaRPr>
+          </a:p>
+          <a:p>
+            <a:pPr>
+              <a:lnSpc>
+                <a:spcPct val="90000"/>
+              </a:lnSpc>
+              <a:buClr>
+                <a:srgbClr val="2E3640"/>
+              </a:buClr>
+              <a:buSzPct val="100000"/>
+            </a:pPr>
+            <a:endParaRPr lang="en-US" sz="2400" dirty="0" smtClean="0"/>
+          </a:p>
+        </p:txBody>
+      </p:sp>
+      <p:sp>
+        <p:nvSpPr>
+          <p:cNvPr id="97" name="Shape 97"/>
+          <p:cNvSpPr txBox="1">
+            <a:spLocks noGrp="1"/>
+          </p:cNvSpPr>
+          <p:nvPr>
+            <p:ph type="body" idx="2"/>
+          </p:nvPr>
+        </p:nvSpPr>
+        <p:spPr>
+          <a:xfrm>
+            <a:off x="341168" y="228026"/>
+            <a:ext cx="8498032" cy="457199"/>
+          </a:xfrm>
+          <a:prstGeom prst="rect">
+            <a:avLst/>
+          </a:prstGeom>
+          <a:noFill/>
+          <a:ln>
+            <a:noFill/>
+          </a:ln>
+        </p:spPr>
+        <p:txBody>
+          <a:bodyPr lIns="68569" tIns="34275" rIns="68569" bIns="34275" anchor="t" anchorCtr="0">
+            <a:noAutofit/>
+          </a:bodyPr>
+          <a:lstStyle/>
+          <a:p>
+            <a:pPr>
+              <a:buClr>
+                <a:schemeClr val="accent2"/>
+              </a:buClr>
+              <a:buSzPct val="25000"/>
+            </a:pPr>
+            <a:r>
+              <a:rPr lang="en-US" sz="3600" dirty="0" smtClean="0"/>
+              <a:t>Hands-on </a:t>
+            </a:r>
+            <a:r>
+              <a:rPr lang="en-US" sz="3600" dirty="0" err="1" smtClean="0"/>
+              <a:t>Workshow</a:t>
+            </a:r>
+            <a:endParaRPr lang="en-US" sz="3600" dirty="0"/>
+          </a:p>
+        </p:txBody>
+      </p:sp>
+      <p:pic>
+        <p:nvPicPr>
+          <p:cNvPr id="2" name="Picture 1"/>
+          <p:cNvPicPr>
+            <a:picLocks noChangeAspect="1"/>
+          </p:cNvPicPr>
+          <p:nvPr/>
+        </p:nvPicPr>
+        <p:blipFill>
+          <a:blip r:embed="rId4" cstate="print">
+            <a:extLst>
+              <a:ext uri="{28A0092B-C50C-407E-A947-70E740481C1C}">
+                <a14:useLocalDpi xmlns:a14="http://schemas.microsoft.com/office/drawing/2010/main" val="0"/>
+              </a:ext>
+            </a:extLst>
+          </a:blip>
+          <a:stretch>
+            <a:fillRect/>
+          </a:stretch>
+        </p:blipFill>
+        <p:spPr>
+          <a:xfrm>
+            <a:off x="1744403" y="1514354"/>
+            <a:ext cx="5529699" cy="4479801"/>
+          </a:xfrm>
+          <a:prstGeom prst="rect">
+            <a:avLst/>
+          </a:prstGeom>
+        </p:spPr>
+      </p:pic>
+    </p:spTree>
+    <p:extLst>
+      <p:ext uri="{BB962C8B-B14F-4D97-AF65-F5344CB8AC3E}">
+        <p14:creationId xmlns:p14="http://schemas.microsoft.com/office/powerpoint/2010/main" val="2075129891"/>
+      </p:ext>
+    </p:extLst>
+  </p:cSld>
+  <p:clrMapOvr>
+    <a:masterClrMapping/>
+  </p:clrMapOvr>
+  <p:transition spd="slow">
+    <p:cut/>
+  </p:transition>
+  <p:timing>
+    <p:tnLst>
+      <p:par>
+        <p:cTn id="1" dur="indefinite" restart="never" nodeType="tmRoot"/>
+      </p:par>
+    </p:tnLst>
+  </p:timing>
+</p:sld>
+</file>
+
+<file path=ppt/slides/slide31.xml><?xml version="1.0" encoding="utf-8"?>
+<p:sld xmlns:a="http://schemas.openxmlformats.org/drawingml/2006/main" xmlns:r="http://schemas.openxmlformats.org/officeDocument/2006/relationships" xmlns:p="http://schemas.openxmlformats.org/presentationml/2006/main">
+  <p:cSld>
+    <p:spTree>
+      <p:nvGrpSpPr>
+        <p:cNvPr id="1" name="Shape 93"/>
+        <p:cNvGrpSpPr/>
+        <p:nvPr/>
+      </p:nvGrpSpPr>
+      <p:grpSpPr>
+        <a:xfrm>
+          <a:off x="0" y="0"/>
+          <a:ext cx="0" cy="0"/>
+          <a:chOff x="0" y="0"/>
+          <a:chExt cx="0" cy="0"/>
+        </a:xfrm>
+      </p:grpSpPr>
+      <p:sp>
+        <p:nvSpPr>
+          <p:cNvPr id="95" name="Shape 95"/>
+          <p:cNvSpPr txBox="1">
+            <a:spLocks noGrp="1"/>
+          </p:cNvSpPr>
+          <p:nvPr>
+            <p:ph type="sldNum" idx="12"/>
+          </p:nvPr>
+        </p:nvSpPr>
+        <p:spPr>
+          <a:xfrm>
+            <a:off x="7600950" y="5688719"/>
+            <a:ext cx="269142" cy="273844"/>
+          </a:xfrm>
+          <a:prstGeom prst="rect">
+            <a:avLst/>
+          </a:prstGeom>
+          <a:noFill/>
+          <a:ln>
+            <a:noFill/>
+          </a:ln>
+        </p:spPr>
+        <p:txBody>
+          <a:bodyPr lIns="68569" tIns="34275" rIns="68569" bIns="34275" anchor="ctr" anchorCtr="0">
+            <a:noAutofit/>
+          </a:bodyPr>
+          <a:lstStyle/>
+          <a:p>
+            <a:pPr>
+              <a:buSzPct val="25000"/>
+            </a:pPr>
+            <a:r>
+              <a:rPr lang="en-US"/>
+              <a:t> </a:t>
+            </a:r>
+          </a:p>
+        </p:txBody>
+      </p:sp>
+      <p:sp>
+        <p:nvSpPr>
+          <p:cNvPr id="96" name="Shape 96"/>
+          <p:cNvSpPr txBox="1">
+            <a:spLocks noGrp="1"/>
+          </p:cNvSpPr>
+          <p:nvPr>
+            <p:ph type="body" idx="1"/>
+          </p:nvPr>
+        </p:nvSpPr>
+        <p:spPr>
+          <a:xfrm>
+            <a:off x="341167" y="937873"/>
+            <a:ext cx="8498033" cy="5024690"/>
+          </a:xfrm>
+          <a:prstGeom prst="rect">
+            <a:avLst/>
+          </a:prstGeom>
+          <a:noFill/>
+          <a:ln>
+            <a:noFill/>
+          </a:ln>
+        </p:spPr>
+        <p:txBody>
+          <a:bodyPr lIns="68569" tIns="34275" rIns="68569" bIns="34275" anchor="t" anchorCtr="0">
+            <a:noAutofit/>
+          </a:bodyPr>
+          <a:lstStyle/>
+          <a:p>
+            <a:pPr marL="355600" indent="-355600">
+              <a:lnSpc>
+                <a:spcPct val="90000"/>
+              </a:lnSpc>
+              <a:buClr>
+                <a:srgbClr val="2E3640"/>
+              </a:buClr>
+              <a:buSzPct val="100000"/>
+              <a:buBlip>
+                <a:blip r:embed="rId3"/>
+              </a:buBlip>
+            </a:pPr>
+            <a:r>
+              <a:rPr lang="en-US" sz="2000" dirty="0" smtClean="0"/>
+              <a:t>install GIT</a:t>
+            </a:r>
+          </a:p>
+          <a:p>
+            <a:pPr marL="355600" indent="-355600">
+              <a:lnSpc>
+                <a:spcPct val="90000"/>
+              </a:lnSpc>
+              <a:buClr>
+                <a:srgbClr val="2E3640"/>
+              </a:buClr>
+              <a:buSzPct val="100000"/>
+              <a:buBlip>
+                <a:blip r:embed="rId3"/>
+              </a:buBlip>
+            </a:pPr>
+            <a:r>
+              <a:rPr lang="en-US" sz="2000" dirty="0" smtClean="0">
+                <a:sym typeface="Wingdings" panose="05000000000000000000" pitchFamily="2" charset="2"/>
+              </a:rPr>
+              <a:t>setup username, password, editor</a:t>
+            </a:r>
+          </a:p>
+          <a:p>
+            <a:pPr marL="355600" indent="-355600">
+              <a:lnSpc>
+                <a:spcPct val="90000"/>
+              </a:lnSpc>
+              <a:buClr>
+                <a:srgbClr val="2E3640"/>
+              </a:buClr>
+              <a:buSzPct val="100000"/>
+              <a:buBlip>
+                <a:blip r:embed="rId3"/>
+              </a:buBlip>
+            </a:pPr>
+            <a:r>
+              <a:rPr lang="en-US" sz="2000" dirty="0" smtClean="0">
+                <a:sym typeface="Wingdings" panose="05000000000000000000" pitchFamily="2" charset="2"/>
+              </a:rPr>
+              <a:t>commands</a:t>
+            </a:r>
+          </a:p>
+          <a:p>
+            <a:pPr marL="893763" indent="-355600">
+              <a:lnSpc>
+                <a:spcPct val="90000"/>
+              </a:lnSpc>
+              <a:buClr>
+                <a:srgbClr val="2E3640"/>
+              </a:buClr>
+              <a:buSzPct val="100000"/>
+              <a:buBlip>
+                <a:blip r:embed="rId3"/>
+              </a:buBlip>
+            </a:pPr>
+            <a:r>
+              <a:rPr lang="en-US" sz="2000" dirty="0" err="1" smtClean="0">
+                <a:sym typeface="Wingdings" panose="05000000000000000000" pitchFamily="2" charset="2"/>
+              </a:rPr>
+              <a:t>git</a:t>
+            </a:r>
+            <a:r>
+              <a:rPr lang="en-US" sz="2000" dirty="0" smtClean="0">
+                <a:sym typeface="Wingdings" panose="05000000000000000000" pitchFamily="2" charset="2"/>
+              </a:rPr>
+              <a:t> help [command] (plus Google)</a:t>
+            </a:r>
+          </a:p>
+          <a:p>
+            <a:pPr marL="893763" indent="-355600">
+              <a:lnSpc>
+                <a:spcPct val="90000"/>
+              </a:lnSpc>
+              <a:buClr>
+                <a:srgbClr val="2E3640"/>
+              </a:buClr>
+              <a:buSzPct val="100000"/>
+              <a:buBlip>
+                <a:blip r:embed="rId3"/>
+              </a:buBlip>
+            </a:pPr>
+            <a:r>
+              <a:rPr lang="en-US" sz="2000" dirty="0" err="1" smtClean="0">
+                <a:sym typeface="Wingdings" panose="05000000000000000000" pitchFamily="2" charset="2"/>
+              </a:rPr>
+              <a:t>git</a:t>
+            </a:r>
+            <a:r>
+              <a:rPr lang="en-US" sz="2000" dirty="0" smtClean="0">
+                <a:sym typeface="Wingdings" panose="05000000000000000000" pitchFamily="2" charset="2"/>
+              </a:rPr>
+              <a:t> </a:t>
+            </a:r>
+            <a:r>
+              <a:rPr lang="en-US" sz="2000" dirty="0" err="1" smtClean="0">
+                <a:sym typeface="Wingdings" panose="05000000000000000000" pitchFamily="2" charset="2"/>
+              </a:rPr>
+              <a:t>init</a:t>
+            </a:r>
+            <a:endParaRPr lang="en-US" sz="2000" dirty="0" smtClean="0">
+              <a:sym typeface="Wingdings" panose="05000000000000000000" pitchFamily="2" charset="2"/>
+            </a:endParaRPr>
+          </a:p>
+          <a:p>
+            <a:pPr marL="893763" indent="-355600">
+              <a:lnSpc>
+                <a:spcPct val="90000"/>
+              </a:lnSpc>
+              <a:buClr>
+                <a:srgbClr val="2E3640"/>
+              </a:buClr>
+              <a:buSzPct val="100000"/>
+              <a:buBlip>
+                <a:blip r:embed="rId3"/>
+              </a:buBlip>
+            </a:pPr>
+            <a:r>
+              <a:rPr lang="en-US" sz="2000" dirty="0" err="1" smtClean="0">
+                <a:sym typeface="Wingdings" panose="05000000000000000000" pitchFamily="2" charset="2"/>
+              </a:rPr>
+              <a:t>git</a:t>
+            </a:r>
+            <a:r>
+              <a:rPr lang="en-US" sz="2000" dirty="0" smtClean="0">
+                <a:sym typeface="Wingdings" panose="05000000000000000000" pitchFamily="2" charset="2"/>
+              </a:rPr>
+              <a:t> ignore</a:t>
+            </a:r>
+          </a:p>
+          <a:p>
+            <a:pPr marL="893763" indent="-355600">
+              <a:lnSpc>
+                <a:spcPct val="90000"/>
+              </a:lnSpc>
+              <a:buClr>
+                <a:srgbClr val="2E3640"/>
+              </a:buClr>
+              <a:buSzPct val="100000"/>
+              <a:buBlip>
+                <a:blip r:embed="rId3"/>
+              </a:buBlip>
+            </a:pPr>
+            <a:r>
+              <a:rPr lang="en-US" sz="2000" dirty="0" err="1" smtClean="0">
+                <a:sym typeface="Wingdings" panose="05000000000000000000" pitchFamily="2" charset="2"/>
+              </a:rPr>
+              <a:t>git</a:t>
+            </a:r>
+            <a:r>
+              <a:rPr lang="en-US" sz="2000" dirty="0" smtClean="0">
+                <a:sym typeface="Wingdings" panose="05000000000000000000" pitchFamily="2" charset="2"/>
+              </a:rPr>
+              <a:t> add</a:t>
+            </a:r>
+          </a:p>
+          <a:p>
+            <a:pPr marL="893763" indent="-355600">
+              <a:lnSpc>
+                <a:spcPct val="90000"/>
+              </a:lnSpc>
+              <a:buClr>
+                <a:srgbClr val="2E3640"/>
+              </a:buClr>
+              <a:buSzPct val="100000"/>
+              <a:buBlip>
+                <a:blip r:embed="rId3"/>
+              </a:buBlip>
+            </a:pPr>
+            <a:r>
+              <a:rPr lang="en-US" sz="2000" dirty="0" err="1" smtClean="0">
+                <a:sym typeface="Wingdings" panose="05000000000000000000" pitchFamily="2" charset="2"/>
+              </a:rPr>
+              <a:t>git</a:t>
+            </a:r>
+            <a:r>
+              <a:rPr lang="en-US" sz="2000" dirty="0" smtClean="0">
+                <a:sym typeface="Wingdings" panose="05000000000000000000" pitchFamily="2" charset="2"/>
+              </a:rPr>
+              <a:t> </a:t>
+            </a:r>
+            <a:r>
+              <a:rPr lang="en-US" sz="2000" dirty="0" err="1" smtClean="0">
+                <a:sym typeface="Wingdings" panose="05000000000000000000" pitchFamily="2" charset="2"/>
+              </a:rPr>
+              <a:t>rm</a:t>
+            </a:r>
+            <a:endParaRPr lang="en-US" sz="2000" dirty="0" smtClean="0">
+              <a:sym typeface="Wingdings" panose="05000000000000000000" pitchFamily="2" charset="2"/>
+            </a:endParaRPr>
+          </a:p>
+          <a:p>
+            <a:pPr marL="893763" indent="-355600">
+              <a:lnSpc>
+                <a:spcPct val="90000"/>
+              </a:lnSpc>
+              <a:buClr>
+                <a:srgbClr val="2E3640"/>
+              </a:buClr>
+              <a:buSzPct val="100000"/>
+              <a:buBlip>
+                <a:blip r:embed="rId3"/>
+              </a:buBlip>
+            </a:pPr>
+            <a:r>
+              <a:rPr lang="en-US" sz="2000" dirty="0" err="1" smtClean="0">
+                <a:sym typeface="Wingdings" panose="05000000000000000000" pitchFamily="2" charset="2"/>
+              </a:rPr>
+              <a:t>git</a:t>
+            </a:r>
+            <a:r>
+              <a:rPr lang="en-US" sz="2000" dirty="0">
+                <a:sym typeface="Wingdings" panose="05000000000000000000" pitchFamily="2" charset="2"/>
+              </a:rPr>
+              <a:t> commit [--</a:t>
+            </a:r>
+            <a:r>
+              <a:rPr lang="en-US" sz="2000" dirty="0" err="1" smtClean="0">
+                <a:sym typeface="Wingdings" panose="05000000000000000000" pitchFamily="2" charset="2"/>
+              </a:rPr>
+              <a:t>ammend</a:t>
+            </a:r>
+            <a:r>
+              <a:rPr lang="en-US" sz="2000" dirty="0">
+                <a:sym typeface="Wingdings" panose="05000000000000000000" pitchFamily="2" charset="2"/>
+              </a:rPr>
+              <a:t>]</a:t>
+            </a:r>
+            <a:endParaRPr lang="en-US" sz="2000" dirty="0" smtClean="0">
+              <a:sym typeface="Wingdings" panose="05000000000000000000" pitchFamily="2" charset="2"/>
+            </a:endParaRPr>
+          </a:p>
+          <a:p>
+            <a:pPr marL="893763" indent="-355600">
+              <a:lnSpc>
+                <a:spcPct val="90000"/>
+              </a:lnSpc>
+              <a:buClr>
+                <a:srgbClr val="2E3640"/>
+              </a:buClr>
+              <a:buSzPct val="100000"/>
+              <a:buBlip>
+                <a:blip r:embed="rId3"/>
+              </a:buBlip>
+            </a:pPr>
+            <a:r>
+              <a:rPr lang="en-US" sz="2000" dirty="0" err="1" smtClean="0">
+                <a:sym typeface="Wingdings" panose="05000000000000000000" pitchFamily="2" charset="2"/>
+              </a:rPr>
+              <a:t>git</a:t>
+            </a:r>
+            <a:r>
+              <a:rPr lang="en-US" sz="2000" dirty="0" smtClean="0">
+                <a:sym typeface="Wingdings" panose="05000000000000000000" pitchFamily="2" charset="2"/>
+              </a:rPr>
+              <a:t> merge [--no-</a:t>
+            </a:r>
+            <a:r>
+              <a:rPr lang="en-US" sz="2000" dirty="0" err="1" smtClean="0">
+                <a:sym typeface="Wingdings" panose="05000000000000000000" pitchFamily="2" charset="2"/>
+              </a:rPr>
+              <a:t>ff</a:t>
+            </a:r>
+            <a:r>
+              <a:rPr lang="en-US" sz="2000" dirty="0" smtClean="0">
+                <a:sym typeface="Wingdings" panose="05000000000000000000" pitchFamily="2" charset="2"/>
+              </a:rPr>
+              <a:t>] [--</a:t>
+            </a:r>
+            <a:r>
+              <a:rPr lang="en-US" sz="2000" dirty="0" err="1" smtClean="0">
+                <a:sym typeface="Wingdings" panose="05000000000000000000" pitchFamily="2" charset="2"/>
+              </a:rPr>
+              <a:t>ff</a:t>
+            </a:r>
+            <a:r>
+              <a:rPr lang="en-US" sz="2000" dirty="0" smtClean="0">
+                <a:sym typeface="Wingdings" panose="05000000000000000000" pitchFamily="2" charset="2"/>
+              </a:rPr>
+              <a:t>-only]</a:t>
+            </a:r>
+          </a:p>
+          <a:p>
+            <a:pPr marL="893763" indent="-355600">
+              <a:lnSpc>
+                <a:spcPct val="90000"/>
+              </a:lnSpc>
+              <a:buClr>
+                <a:srgbClr val="2E3640"/>
+              </a:buClr>
+              <a:buSzPct val="100000"/>
+              <a:buBlip>
+                <a:blip r:embed="rId3"/>
+              </a:buBlip>
+            </a:pPr>
+            <a:r>
+              <a:rPr lang="en-US" sz="2000" dirty="0" err="1" smtClean="0">
+                <a:sym typeface="Wingdings" panose="05000000000000000000" pitchFamily="2" charset="2"/>
+              </a:rPr>
+              <a:t>git</a:t>
+            </a:r>
+            <a:r>
+              <a:rPr lang="en-US" sz="2000" dirty="0" smtClean="0">
+                <a:sym typeface="Wingdings" panose="05000000000000000000" pitchFamily="2" charset="2"/>
+              </a:rPr>
+              <a:t> rebase [--interactive]</a:t>
+            </a:r>
+          </a:p>
+          <a:p>
+            <a:pPr marL="893763" indent="-355600">
+              <a:lnSpc>
+                <a:spcPct val="90000"/>
+              </a:lnSpc>
+              <a:buClr>
+                <a:srgbClr val="2E3640"/>
+              </a:buClr>
+              <a:buSzPct val="100000"/>
+              <a:buBlip>
+                <a:blip r:embed="rId3"/>
+              </a:buBlip>
+            </a:pPr>
+            <a:r>
+              <a:rPr lang="en-US" sz="2000" dirty="0" err="1" smtClean="0">
+                <a:sym typeface="Wingdings" panose="05000000000000000000" pitchFamily="2" charset="2"/>
+              </a:rPr>
+              <a:t>git</a:t>
+            </a:r>
+            <a:r>
+              <a:rPr lang="en-US" sz="2000" dirty="0" smtClean="0">
+                <a:sym typeface="Wingdings" panose="05000000000000000000" pitchFamily="2" charset="2"/>
+              </a:rPr>
+              <a:t> cherry-pick</a:t>
+            </a:r>
+          </a:p>
+          <a:p>
+            <a:pPr marL="893763" indent="-355600">
+              <a:lnSpc>
+                <a:spcPct val="90000"/>
+              </a:lnSpc>
+              <a:buClr>
+                <a:srgbClr val="2E3640"/>
+              </a:buClr>
+              <a:buSzPct val="100000"/>
+              <a:buBlip>
+                <a:blip r:embed="rId3"/>
+              </a:buBlip>
+            </a:pPr>
+            <a:r>
+              <a:rPr lang="en-US" sz="2000" dirty="0" err="1" smtClean="0">
+                <a:sym typeface="Wingdings" panose="05000000000000000000" pitchFamily="2" charset="2"/>
+              </a:rPr>
+              <a:t>git</a:t>
+            </a:r>
+            <a:r>
+              <a:rPr lang="en-US" sz="2000" dirty="0" smtClean="0">
+                <a:sym typeface="Wingdings" panose="05000000000000000000" pitchFamily="2" charset="2"/>
+              </a:rPr>
+              <a:t> </a:t>
+            </a:r>
+            <a:r>
+              <a:rPr lang="en-US" sz="2000" dirty="0" err="1" smtClean="0">
+                <a:sym typeface="Wingdings" panose="05000000000000000000" pitchFamily="2" charset="2"/>
+              </a:rPr>
+              <a:t>reflog</a:t>
+            </a:r>
+            <a:endParaRPr lang="en-US" sz="2000" dirty="0" smtClean="0">
+              <a:sym typeface="Wingdings" panose="05000000000000000000" pitchFamily="2" charset="2"/>
+            </a:endParaRPr>
+          </a:p>
+          <a:p>
+            <a:pPr marL="893763" indent="-355600">
+              <a:lnSpc>
+                <a:spcPct val="90000"/>
+              </a:lnSpc>
+              <a:buClr>
+                <a:srgbClr val="2E3640"/>
+              </a:buClr>
+              <a:buSzPct val="100000"/>
+              <a:buBlip>
+                <a:blip r:embed="rId3"/>
+              </a:buBlip>
+            </a:pPr>
+            <a:r>
+              <a:rPr lang="en-US" sz="2000" dirty="0" err="1" smtClean="0">
+                <a:sym typeface="Wingdings" panose="05000000000000000000" pitchFamily="2" charset="2"/>
+              </a:rPr>
+              <a:t>git</a:t>
+            </a:r>
+            <a:r>
+              <a:rPr lang="en-US" sz="2000" dirty="0" smtClean="0">
+                <a:sym typeface="Wingdings" panose="05000000000000000000" pitchFamily="2" charset="2"/>
+              </a:rPr>
+              <a:t> fetch</a:t>
+            </a:r>
+          </a:p>
+          <a:p>
+            <a:pPr marL="893763" indent="-355600">
+              <a:lnSpc>
+                <a:spcPct val="90000"/>
+              </a:lnSpc>
+              <a:buClr>
+                <a:srgbClr val="2E3640"/>
+              </a:buClr>
+              <a:buSzPct val="100000"/>
+              <a:buBlip>
+                <a:blip r:embed="rId3"/>
+              </a:buBlip>
+            </a:pPr>
+            <a:r>
+              <a:rPr lang="en-US" sz="2000" dirty="0" err="1" smtClean="0">
+                <a:sym typeface="Wingdings" panose="05000000000000000000" pitchFamily="2" charset="2"/>
+              </a:rPr>
+              <a:t>git</a:t>
+            </a:r>
+            <a:r>
+              <a:rPr lang="en-US" sz="2000" dirty="0" smtClean="0">
+                <a:sym typeface="Wingdings" panose="05000000000000000000" pitchFamily="2" charset="2"/>
+              </a:rPr>
+              <a:t> pull [--rebase]</a:t>
+            </a:r>
+          </a:p>
+          <a:p>
+            <a:pPr marL="893763" indent="-355600">
+              <a:lnSpc>
+                <a:spcPct val="90000"/>
+              </a:lnSpc>
+              <a:buClr>
+                <a:srgbClr val="2E3640"/>
+              </a:buClr>
+              <a:buSzPct val="100000"/>
+              <a:buBlip>
+                <a:blip r:embed="rId3"/>
+              </a:buBlip>
+            </a:pPr>
+            <a:r>
+              <a:rPr lang="en-US" sz="2000" dirty="0" err="1" smtClean="0">
+                <a:sym typeface="Wingdings" panose="05000000000000000000" pitchFamily="2" charset="2"/>
+              </a:rPr>
+              <a:t>git</a:t>
+            </a:r>
+            <a:r>
+              <a:rPr lang="en-US" sz="2000" dirty="0" smtClean="0">
+                <a:sym typeface="Wingdings" panose="05000000000000000000" pitchFamily="2" charset="2"/>
+              </a:rPr>
+              <a:t> push</a:t>
+            </a:r>
+          </a:p>
+          <a:p>
+            <a:pPr marL="893763" indent="-355600">
+              <a:lnSpc>
+                <a:spcPct val="90000"/>
+              </a:lnSpc>
+              <a:buClr>
+                <a:srgbClr val="2E3640"/>
+              </a:buClr>
+              <a:buSzPct val="100000"/>
+              <a:buBlip>
+                <a:blip r:embed="rId3"/>
+              </a:buBlip>
+            </a:pPr>
+            <a:r>
+              <a:rPr lang="en-US" sz="2000" dirty="0" err="1" smtClean="0">
+                <a:sym typeface="Wingdings" panose="05000000000000000000" pitchFamily="2" charset="2"/>
+              </a:rPr>
+              <a:t>git</a:t>
+            </a:r>
+            <a:r>
+              <a:rPr lang="en-US" sz="2000" dirty="0" smtClean="0">
+                <a:sym typeface="Wingdings" panose="05000000000000000000" pitchFamily="2" charset="2"/>
+              </a:rPr>
+              <a:t> branch</a:t>
+            </a:r>
+          </a:p>
+          <a:p>
+            <a:pPr marL="893763" indent="-355600">
+              <a:lnSpc>
+                <a:spcPct val="90000"/>
+              </a:lnSpc>
+              <a:buClr>
+                <a:srgbClr val="2E3640"/>
+              </a:buClr>
+              <a:buSzPct val="100000"/>
+              <a:buBlip>
+                <a:blip r:embed="rId3"/>
+              </a:buBlip>
+            </a:pPr>
+            <a:r>
+              <a:rPr lang="en-US" sz="2000" dirty="0" err="1" smtClean="0">
+                <a:sym typeface="Wingdings" panose="05000000000000000000" pitchFamily="2" charset="2"/>
+              </a:rPr>
+              <a:t>git</a:t>
+            </a:r>
+            <a:r>
+              <a:rPr lang="en-US" sz="2000" dirty="0" smtClean="0">
+                <a:sym typeface="Wingdings" panose="05000000000000000000" pitchFamily="2" charset="2"/>
+              </a:rPr>
+              <a:t> tag</a:t>
+            </a:r>
+          </a:p>
+        </p:txBody>
+      </p:sp>
+      <p:sp>
+        <p:nvSpPr>
+          <p:cNvPr id="97" name="Shape 97"/>
+          <p:cNvSpPr txBox="1">
+            <a:spLocks noGrp="1"/>
+          </p:cNvSpPr>
+          <p:nvPr>
+            <p:ph type="body" idx="2"/>
+          </p:nvPr>
+        </p:nvSpPr>
+        <p:spPr>
+          <a:xfrm>
+            <a:off x="341168" y="228026"/>
+            <a:ext cx="8498032" cy="457199"/>
+          </a:xfrm>
+          <a:prstGeom prst="rect">
+            <a:avLst/>
+          </a:prstGeom>
+          <a:noFill/>
+          <a:ln>
+            <a:noFill/>
+          </a:ln>
+        </p:spPr>
+        <p:txBody>
+          <a:bodyPr lIns="68569" tIns="34275" rIns="68569" bIns="34275" anchor="t" anchorCtr="0">
+            <a:noAutofit/>
+          </a:bodyPr>
+          <a:lstStyle/>
+          <a:p>
+            <a:pPr>
+              <a:buClr>
+                <a:schemeClr val="accent2"/>
+              </a:buClr>
+              <a:buSzPct val="25000"/>
+            </a:pPr>
+            <a:r>
+              <a:rPr lang="en-US" sz="3600" dirty="0" smtClean="0"/>
+              <a:t>Hands-on </a:t>
+            </a:r>
+            <a:r>
+              <a:rPr lang="en-US" sz="3600" dirty="0" err="1" smtClean="0"/>
+              <a:t>Workshow</a:t>
+            </a:r>
+            <a:endParaRPr lang="en-US" sz="3600" dirty="0"/>
+          </a:p>
+        </p:txBody>
+      </p:sp>
+    </p:spTree>
+    <p:extLst>
+      <p:ext uri="{BB962C8B-B14F-4D97-AF65-F5344CB8AC3E}">
+        <p14:creationId xmlns:p14="http://schemas.microsoft.com/office/powerpoint/2010/main" val="2935937953"/>
       </p:ext>
     </p:extLst>
   </p:cSld>
@@ -13609,6 +15074,86 @@
           </a:prstGeom>
         </p:spPr>
       </p:pic>
+      <p:sp>
+        <p:nvSpPr>
+          <p:cNvPr id="6" name="TextBox 5"/>
+          <p:cNvSpPr txBox="1"/>
+          <p:nvPr/>
+        </p:nvSpPr>
+        <p:spPr>
+          <a:xfrm>
+            <a:off x="19866" y="3323168"/>
+            <a:ext cx="5917004" cy="369332"/>
+          </a:xfrm>
+          <a:prstGeom prst="rect">
+            <a:avLst/>
+          </a:prstGeom>
+        </p:spPr>
+        <p:style>
+          <a:lnRef idx="2">
+            <a:schemeClr val="accent4"/>
+          </a:lnRef>
+          <a:fillRef idx="1">
+            <a:schemeClr val="lt1"/>
+          </a:fillRef>
+          <a:effectRef idx="0">
+            <a:schemeClr val="accent4"/>
+          </a:effectRef>
+          <a:fontRef idx="minor">
+            <a:schemeClr val="dk1"/>
+          </a:fontRef>
+        </p:style>
+        <p:txBody>
+          <a:bodyPr wrap="none" rtlCol="0">
+            <a:spAutoFit/>
+          </a:bodyPr>
+          <a:lstStyle/>
+          <a:p>
+            <a:r>
+              <a:rPr lang="en-US" dirty="0"/>
+              <a:t>SHA1 (</a:t>
+            </a:r>
+            <a:r>
+              <a:rPr lang="en-US" dirty="0" smtClean="0"/>
+              <a:t>295f3c241859d6fab606a7cb1a7598d2af7a1a3e)</a:t>
+            </a:r>
+            <a:endParaRPr lang="en-US" dirty="0"/>
+          </a:p>
+        </p:txBody>
+      </p:sp>
+      <p:cxnSp>
+        <p:nvCxnSpPr>
+          <p:cNvPr id="8" name="Straight Arrow Connector 7"/>
+          <p:cNvCxnSpPr/>
+          <p:nvPr/>
+        </p:nvCxnSpPr>
+        <p:spPr>
+          <a:xfrm>
+            <a:off x="1311668" y="3692500"/>
+            <a:ext cx="486243" cy="204586"/>
+          </a:xfrm>
+          <a:prstGeom prst="straightConnector1">
+            <a:avLst/>
+          </a:prstGeom>
+          <a:ln>
+            <a:tailEnd type="triangle"/>
+          </a:ln>
+        </p:spPr>
+        <p:style>
+          <a:lnRef idx="1">
+            <a:schemeClr val="accent4"/>
+          </a:lnRef>
+          <a:fillRef idx="0">
+            <a:schemeClr val="accent4"/>
+          </a:fillRef>
+          <a:effectRef idx="0">
+            <a:schemeClr val="accent4"/>
+          </a:effectRef>
+          <a:fontRef idx="minor">
+            <a:schemeClr val="tx1"/>
+          </a:fontRef>
+        </p:style>
+      </p:cxnSp>
     </p:spTree>
     <p:extLst>
       <p:ext uri="{BB962C8B-B14F-4D97-AF65-F5344CB8AC3E}">

</xml_diff>

<commit_message>
add info about using git locally, without a server
</commit_message>
<xml_diff>
--- a/GIT Presentation.pptx
+++ b/GIT Presentation.pptx
@@ -3777,7 +3777,33 @@
             </a:pPr>
             <a:r>
               <a:rPr lang="en-US" baseline="0" dirty="0" smtClean="0"/>
-              <a:t>but GIT allows developers to communicate between themselves if needed (e.g. work together on one feature)</a:t>
+              <a:t>but GIT allows </a:t>
+            </a:r>
+            <a:r>
+              <a:rPr lang="en-US" baseline="0" dirty="0" smtClean="0"/>
+              <a:t>developers </a:t>
+            </a:r>
+            <a:r>
+              <a:rPr lang="en-US" baseline="0" dirty="0" smtClean="0"/>
+              <a:t>to communicate between themselves if needed (e.g. work together on one feature</a:t>
+            </a:r>
+            <a:r>
+              <a:rPr lang="en-US" baseline="0" dirty="0" smtClean="0"/>
+              <a:t>)</a:t>
+            </a:r>
+          </a:p>
+          <a:p>
+            <a:pPr marL="171450" lvl="0" indent="-171450">
+              <a:buFontTx/>
+              <a:buChar char="-"/>
+            </a:pPr>
+            <a:r>
+              <a:rPr lang="en-US" baseline="0" dirty="0" smtClean="0"/>
+              <a:t>no need of a server. This can be quite useful. For example, I use it locally to version </a:t>
+            </a:r>
+            <a:r>
+              <a:rPr lang="en-US" baseline="0" smtClean="0"/>
+              <a:t>some documents.</a:t>
             </a:r>
             <a:endParaRPr dirty="0"/>
           </a:p>
@@ -4121,15 +4147,7 @@
             </a:pPr>
             <a:r>
               <a:rPr lang="en-US" baseline="0" dirty="0" smtClean="0"/>
-              <a:t>DAG </a:t>
-            </a:r>
-            <a:r>
-              <a:rPr lang="en-US" baseline="0" dirty="0" smtClean="0"/>
-              <a:t>(directed acyclic graph) of </a:t>
-            </a:r>
-            <a:r>
-              <a:rPr lang="en-US" baseline="0" dirty="0" smtClean="0"/>
-              <a:t>commits</a:t>
+              <a:t>DAG (directed acyclic graph) of commits</a:t>
             </a:r>
           </a:p>
           <a:p>
@@ -4141,7 +4159,6 @@
               <a:rPr lang="en-US" baseline="0" dirty="0" smtClean="0"/>
               <a:t>each commit has a SHA1 identifier in GIT, but I represented them by letters to make things easier to understand</a:t>
             </a:r>
-            <a:endParaRPr lang="en-US" baseline="0" dirty="0" smtClean="0"/>
           </a:p>
           <a:p>
             <a:pPr marL="171450" indent="-171450">
@@ -10517,13 +10534,13 @@
   <p:clrMapOvr>
     <a:masterClrMapping/>
   </p:clrMapOvr>
-  <mc:AlternateContent xmlns:mc="http://schemas.openxmlformats.org/markup-compatibility/2006">
-    <mc:Choice xmlns:p14="http://schemas.microsoft.com/office/powerpoint/2010/main" Requires="p14">
+  <mc:AlternateContent xmlns:mc="http://schemas.openxmlformats.org/markup-compatibility/2006" xmlns:p14="http://schemas.microsoft.com/office/powerpoint/2010/main">
+    <mc:Choice Requires="p14">
       <p:transition p14:dur="100">
         <p:cut/>
       </p:transition>
     </mc:Choice>
-    <mc:Fallback>
+    <mc:Fallback xmlns="">
       <p:transition>
         <p:cut/>
       </p:transition>
@@ -10678,13 +10695,13 @@
   <p:clrMapOvr>
     <a:masterClrMapping/>
   </p:clrMapOvr>
-  <mc:AlternateContent xmlns:mc="http://schemas.openxmlformats.org/markup-compatibility/2006">
-    <mc:Choice xmlns:p14="http://schemas.microsoft.com/office/powerpoint/2010/main" Requires="p14">
+  <mc:AlternateContent xmlns:mc="http://schemas.openxmlformats.org/markup-compatibility/2006" xmlns:p14="http://schemas.microsoft.com/office/powerpoint/2010/main">
+    <mc:Choice Requires="p14">
       <p:transition p14:dur="100">
         <p:cut/>
       </p:transition>
     </mc:Choice>
-    <mc:Fallback>
+    <mc:Fallback xmlns="">
       <p:transition>
         <p:cut/>
       </p:transition>

</xml_diff>

<commit_message>
add slides explaining clone and push with success
</commit_message>
<xml_diff>
--- a/GIT Presentation.pptx
+++ b/GIT Presentation.pptx
@@ -6,7 +6,7 @@
     <p:sldMasterId id="2147483665" r:id="rId2"/>
   </p:sldMasterIdLst>
   <p:notesMasterIdLst>
-    <p:notesMasterId r:id="rId34"/>
+    <p:notesMasterId r:id="rId40"/>
   </p:notesMasterIdLst>
   <p:sldIdLst>
     <p:sldId id="257" r:id="rId3"/>
@@ -31,15 +31,21 @@
     <p:sldId id="289" r:id="rId22"/>
     <p:sldId id="290" r:id="rId23"/>
     <p:sldId id="291" r:id="rId24"/>
-    <p:sldId id="279" r:id="rId25"/>
-    <p:sldId id="280" r:id="rId26"/>
-    <p:sldId id="281" r:id="rId27"/>
-    <p:sldId id="269" r:id="rId28"/>
-    <p:sldId id="270" r:id="rId29"/>
-    <p:sldId id="271" r:id="rId30"/>
-    <p:sldId id="272" r:id="rId31"/>
-    <p:sldId id="273" r:id="rId32"/>
-    <p:sldId id="275" r:id="rId33"/>
+    <p:sldId id="280" r:id="rId25"/>
+    <p:sldId id="292" r:id="rId26"/>
+    <p:sldId id="293" r:id="rId27"/>
+    <p:sldId id="279" r:id="rId28"/>
+    <p:sldId id="294" r:id="rId29"/>
+    <p:sldId id="295" r:id="rId30"/>
+    <p:sldId id="296" r:id="rId31"/>
+    <p:sldId id="297" r:id="rId32"/>
+    <p:sldId id="281" r:id="rId33"/>
+    <p:sldId id="269" r:id="rId34"/>
+    <p:sldId id="270" r:id="rId35"/>
+    <p:sldId id="271" r:id="rId36"/>
+    <p:sldId id="272" r:id="rId37"/>
+    <p:sldId id="273" r:id="rId38"/>
+    <p:sldId id="275" r:id="rId39"/>
   </p:sldIdLst>
   <p:sldSz cx="9144000" cy="6858000" type="screen4x3"/>
   <p:notesSz cx="6858000" cy="9144000"/>
@@ -2474,7 +2480,111 @@
               <a:buFontTx/>
               <a:buChar char="-"/>
             </a:pPr>
-            <a:endParaRPr dirty="0"/>
+            <a:r>
+              <a:rPr lang="en-US" dirty="0" smtClean="0"/>
+              <a:t>the</a:t>
+            </a:r>
+            <a:r>
+              <a:rPr lang="en-US" baseline="0" dirty="0" smtClean="0"/>
+              <a:t> commits A, B, and C in the local repository are identical to A, B, and C in the remote repository – the have the same SHA1 ID</a:t>
+            </a:r>
+            <a:endParaRPr lang="en-US" dirty="0" smtClean="0"/>
+          </a:p>
+          <a:p>
+            <a:pPr marL="171450" indent="-171450">
+              <a:buFontTx/>
+              <a:buChar char="-"/>
+            </a:pPr>
+            <a:r>
+              <a:rPr lang="en-US" dirty="0" smtClean="0"/>
+              <a:t>2 branches are created:</a:t>
+            </a:r>
+          </a:p>
+          <a:p>
+            <a:pPr marL="628650" lvl="1" indent="-171450">
+              <a:buFontTx/>
+              <a:buChar char="-"/>
+            </a:pPr>
+            <a:r>
+              <a:rPr lang="en-US" dirty="0" smtClean="0"/>
+              <a:t>remotes/origin/master</a:t>
+            </a:r>
+          </a:p>
+          <a:p>
+            <a:pPr marL="1085850" lvl="2" indent="-171450">
+              <a:buFontTx/>
+              <a:buChar char="-"/>
+            </a:pPr>
+            <a:r>
+              <a:rPr lang="en-US" baseline="0" dirty="0" smtClean="0"/>
+              <a:t>t</a:t>
+            </a:r>
+            <a:r>
+              <a:rPr lang="en-US" dirty="0" smtClean="0"/>
+              <a:t>his is</a:t>
+            </a:r>
+            <a:r>
+              <a:rPr lang="en-US" baseline="0" dirty="0" smtClean="0"/>
+              <a:t> what you local repository thinks that the remote branch looks like.</a:t>
+            </a:r>
+          </a:p>
+          <a:p>
+            <a:pPr marL="1085850" lvl="2" indent="-171450">
+              <a:buFontTx/>
+              <a:buChar char="-"/>
+            </a:pPr>
+            <a:r>
+              <a:rPr lang="en-US" baseline="0" dirty="0" smtClean="0"/>
+              <a:t>never commit on this branch</a:t>
+            </a:r>
+          </a:p>
+          <a:p>
+            <a:pPr marL="1085850" lvl="2" indent="-171450">
+              <a:buFontTx/>
+              <a:buChar char="-"/>
+            </a:pPr>
+            <a:r>
+              <a:rPr lang="en-US" baseline="0" dirty="0" smtClean="0"/>
+              <a:t>this branch will only be updated when you pull changes from the remote repository</a:t>
+            </a:r>
+          </a:p>
+          <a:p>
+            <a:pPr marL="628650" lvl="1" indent="-171450">
+              <a:buFontTx/>
+              <a:buChar char="-"/>
+            </a:pPr>
+            <a:r>
+              <a:rPr lang="en-US" baseline="0" dirty="0" smtClean="0"/>
+              <a:t>master</a:t>
+            </a:r>
+          </a:p>
+          <a:p>
+            <a:pPr marL="1085850" lvl="2" indent="-171450">
+              <a:buFontTx/>
+              <a:buChar char="-"/>
+            </a:pPr>
+            <a:r>
+              <a:rPr lang="en-US" baseline="0" dirty="0" smtClean="0"/>
+              <a:t>this is where you will do your commits</a:t>
+            </a:r>
+          </a:p>
+          <a:p>
+            <a:pPr marL="1085850" lvl="2" indent="-171450">
+              <a:buFontTx/>
+              <a:buChar char="-"/>
+            </a:pPr>
+            <a:r>
+              <a:rPr lang="en-US" baseline="0" dirty="0" smtClean="0"/>
+              <a:t>notice this is the current branch after clone</a:t>
+            </a:r>
+            <a:endParaRPr lang="en-US" dirty="0" smtClean="0"/>
+          </a:p>
+          <a:p>
+            <a:pPr marL="628650" lvl="1" indent="-171450">
+              <a:buFontTx/>
+              <a:buChar char="-"/>
+            </a:pPr>
+            <a:endParaRPr lang="en-US" dirty="0" smtClean="0"/>
           </a:p>
         </p:txBody>
       </p:sp>
@@ -2522,7 +2632,7 @@
     </p:spTree>
     <p:extLst>
       <p:ext uri="{BB962C8B-B14F-4D97-AF65-F5344CB8AC3E}">
-        <p14:creationId xmlns:p14="http://schemas.microsoft.com/office/powerpoint/2010/main" val="796577067"/>
+        <p14:creationId xmlns:p14="http://schemas.microsoft.com/office/powerpoint/2010/main" val="2140635485"/>
       </p:ext>
     </p:extLst>
   </p:cSld>
@@ -2574,11 +2684,75 @@
           </a:bodyPr>
           <a:lstStyle/>
           <a:p>
+            <a:pPr marL="171450" marR="0" indent="-171450" algn="l" defTabSz="914400" rtl="0" eaLnBrk="1" fontAlgn="auto" latinLnBrk="0" hangingPunct="1">
+              <a:lnSpc>
+                <a:spcPct val="100000"/>
+              </a:lnSpc>
+              <a:spcBef>
+                <a:spcPts val="0"/>
+              </a:spcBef>
+              <a:spcAft>
+                <a:spcPts val="0"/>
+              </a:spcAft>
+              <a:buClrTx/>
+              <a:buSzTx/>
+              <a:buFontTx/>
+              <a:buChar char="-"/>
+              <a:tabLst/>
+              <a:defRPr/>
+            </a:pPr>
+            <a:r>
+              <a:rPr lang="en-US" dirty="0" smtClean="0"/>
+              <a:t>master is called a “local branch“</a:t>
+            </a:r>
+          </a:p>
+          <a:p>
             <a:pPr marL="171450" indent="-171450">
               <a:buFontTx/>
               <a:buChar char="-"/>
             </a:pPr>
-            <a:endParaRPr dirty="0"/>
+            <a:r>
+              <a:rPr lang="en-US" dirty="0" smtClean="0"/>
+              <a:t>the</a:t>
+            </a:r>
+            <a:r>
+              <a:rPr lang="en-US" baseline="0" dirty="0" smtClean="0"/>
+              <a:t> branch "remotes/origin/master“ is called a "remote tracking branch" because it’s purpose is to track the remote branch – to be a one-to-one copy of the remote branch</a:t>
+            </a:r>
+          </a:p>
+          <a:p>
+            <a:pPr marL="628650" lvl="1" indent="-171450">
+              <a:buFontTx/>
+              <a:buChar char="-"/>
+            </a:pPr>
+            <a:r>
+              <a:rPr lang="en-US" dirty="0" smtClean="0"/>
+              <a:t>all</a:t>
+            </a:r>
+            <a:r>
+              <a:rPr lang="en-US" baseline="0" dirty="0" smtClean="0"/>
+              <a:t> remote tracking branches are by default under "remotes/"</a:t>
+            </a:r>
+          </a:p>
+          <a:p>
+            <a:pPr marL="628650" lvl="1" indent="-171450">
+              <a:buFontTx/>
+              <a:buChar char="-"/>
+            </a:pPr>
+            <a:r>
+              <a:rPr lang="en-US" baseline="0" dirty="0" smtClean="0"/>
+              <a:t>"origin" is a name that you give to the remote repository (GIT uses it’s URL instead) and is called a "remote". You can have multiple remotes since GIT doesn’t restrict you to communicate with only one remote repository.</a:t>
+            </a:r>
+          </a:p>
+          <a:p>
+            <a:pPr marL="628650" lvl="1" indent="-171450">
+              <a:buFontTx/>
+              <a:buChar char="-"/>
+            </a:pPr>
+            <a:r>
+              <a:rPr lang="en-US" baseline="0" dirty="0" smtClean="0"/>
+              <a:t>"origin" is the name that GIT chooses when cloning a remote repository, but there is nothing special about it</a:t>
+            </a:r>
           </a:p>
         </p:txBody>
       </p:sp>
@@ -2626,7 +2800,7 @@
     </p:spTree>
     <p:extLst>
       <p:ext uri="{BB962C8B-B14F-4D97-AF65-F5344CB8AC3E}">
-        <p14:creationId xmlns:p14="http://schemas.microsoft.com/office/powerpoint/2010/main" val="2140635485"/>
+        <p14:creationId xmlns:p14="http://schemas.microsoft.com/office/powerpoint/2010/main" val="3318685764"/>
       </p:ext>
     </p:extLst>
   </p:cSld>
@@ -2682,6 +2856,24 @@
               <a:buFontTx/>
               <a:buChar char="-"/>
             </a:pPr>
+            <a:r>
+              <a:rPr lang="en-US" dirty="0" smtClean="0"/>
+              <a:t>master</a:t>
+            </a:r>
+            <a:r>
+              <a:rPr lang="en-US" baseline="0" dirty="0" smtClean="0"/>
+              <a:t> is said to "track the upstream branch remotes/origin/master"</a:t>
+            </a:r>
+          </a:p>
+          <a:p>
+            <a:pPr marL="171450" indent="-171450">
+              <a:buFontTx/>
+              <a:buChar char="-"/>
+            </a:pPr>
+            <a:r>
+              <a:rPr lang="en-US" baseline="0" dirty="0" smtClean="0"/>
+              <a:t>this link is needed for example for GIT to know to which remote repository to push changes when the current branch is master and you don't specify a remote name when pushing</a:t>
+            </a:r>
             <a:endParaRPr dirty="0"/>
           </a:p>
         </p:txBody>
@@ -2730,7 +2922,7 @@
     </p:spTree>
     <p:extLst>
       <p:ext uri="{BB962C8B-B14F-4D97-AF65-F5344CB8AC3E}">
-        <p14:creationId xmlns:p14="http://schemas.microsoft.com/office/powerpoint/2010/main" val="3219326357"/>
+        <p14:creationId xmlns:p14="http://schemas.microsoft.com/office/powerpoint/2010/main" val="3400672015"/>
       </p:ext>
     </p:extLst>
   </p:cSld>
@@ -2786,6 +2978,22 @@
               <a:buFontTx/>
               <a:buChar char="-"/>
             </a:pPr>
+            <a:r>
+              <a:rPr lang="en-US" dirty="0" smtClean="0"/>
+              <a:t>we</a:t>
+            </a:r>
+            <a:r>
+              <a:rPr lang="en-US" baseline="0" dirty="0" smtClean="0"/>
+              <a:t> </a:t>
+            </a:r>
+            <a:r>
+              <a:rPr lang="en-US" dirty="0" smtClean="0"/>
+              <a:t>create locally 2 more commits:</a:t>
+            </a:r>
+            <a:r>
+              <a:rPr lang="en-US" baseline="0" dirty="0" smtClean="0"/>
+              <a:t> D and E and we push them</a:t>
+            </a:r>
             <a:endParaRPr dirty="0"/>
           </a:p>
         </p:txBody>
@@ -2834,7 +3042,7 @@
     </p:spTree>
     <p:extLst>
       <p:ext uri="{BB962C8B-B14F-4D97-AF65-F5344CB8AC3E}">
-        <p14:creationId xmlns:p14="http://schemas.microsoft.com/office/powerpoint/2010/main" val="1650745352"/>
+        <p14:creationId xmlns:p14="http://schemas.microsoft.com/office/powerpoint/2010/main" val="796577067"/>
       </p:ext>
     </p:extLst>
   </p:cSld>
@@ -2890,7 +3098,14 @@
               <a:buFontTx/>
               <a:buChar char="-"/>
             </a:pPr>
-            <a:endParaRPr dirty="0"/>
+            <a:r>
+              <a:rPr lang="en-US" dirty="0" smtClean="0"/>
+              <a:t>first the commits D and</a:t>
+            </a:r>
+            <a:r>
+              <a:rPr lang="en-US" baseline="0" dirty="0" smtClean="0"/>
+              <a:t> E are created in the remote repository. These commits are identical to D and E in the local repository – they have the same SHA1 ID</a:t>
+            </a:r>
           </a:p>
         </p:txBody>
       </p:sp>
@@ -2938,7 +3153,7 @@
     </p:spTree>
     <p:extLst>
       <p:ext uri="{BB962C8B-B14F-4D97-AF65-F5344CB8AC3E}">
-        <p14:creationId xmlns:p14="http://schemas.microsoft.com/office/powerpoint/2010/main" val="979907960"/>
+        <p14:creationId xmlns:p14="http://schemas.microsoft.com/office/powerpoint/2010/main" val="962578301"/>
       </p:ext>
     </p:extLst>
   </p:cSld>
@@ -2994,7 +3209,14 @@
               <a:buFontTx/>
               <a:buChar char="-"/>
             </a:pPr>
-            <a:endParaRPr dirty="0"/>
+            <a:r>
+              <a:rPr lang="en-US" dirty="0" smtClean="0"/>
+              <a:t>then</a:t>
+            </a:r>
+            <a:r>
+              <a:rPr lang="en-US" baseline="0" dirty="0" smtClean="0"/>
+              <a:t> the master branch on the remote repository is set to point to E (the new tip of the branch)</a:t>
+            </a:r>
           </a:p>
         </p:txBody>
       </p:sp>
@@ -3042,7 +3264,7 @@
     </p:spTree>
     <p:extLst>
       <p:ext uri="{BB962C8B-B14F-4D97-AF65-F5344CB8AC3E}">
-        <p14:creationId xmlns:p14="http://schemas.microsoft.com/office/powerpoint/2010/main" val="2667286518"/>
+        <p14:creationId xmlns:p14="http://schemas.microsoft.com/office/powerpoint/2010/main" val="1905914098"/>
       </p:ext>
     </p:extLst>
   </p:cSld>
@@ -3098,6 +3320,32 @@
               <a:buFontTx/>
               <a:buChar char="-"/>
             </a:pPr>
+            <a:r>
+              <a:rPr lang="en-US" dirty="0" smtClean="0"/>
+              <a:t>in the local repo,</a:t>
+            </a:r>
+            <a:r>
+              <a:rPr lang="en-US" baseline="0" dirty="0" smtClean="0"/>
+              <a:t> </a:t>
+            </a:r>
+            <a:r>
+              <a:rPr lang="en-US" dirty="0" smtClean="0"/>
+              <a:t>the branch "remotes/origin/master" is set to point to D, since that is where</a:t>
+            </a:r>
+            <a:r>
+              <a:rPr lang="en-US" baseline="0" dirty="0" smtClean="0"/>
+              <a:t> the "master" branch points to in the remote repository</a:t>
+            </a:r>
+          </a:p>
+          <a:p>
+            <a:pPr marL="171450" indent="-171450">
+              <a:buFontTx/>
+              <a:buChar char="-"/>
+            </a:pPr>
+            <a:r>
+              <a:rPr lang="en-US" baseline="0" dirty="0" smtClean="0"/>
+              <a:t>and we are done</a:t>
+            </a:r>
             <a:endParaRPr dirty="0"/>
           </a:p>
         </p:txBody>
@@ -3146,7 +3394,7 @@
     </p:spTree>
     <p:extLst>
       <p:ext uri="{BB962C8B-B14F-4D97-AF65-F5344CB8AC3E}">
-        <p14:creationId xmlns:p14="http://schemas.microsoft.com/office/powerpoint/2010/main" val="890929024"/>
+        <p14:creationId xmlns:p14="http://schemas.microsoft.com/office/powerpoint/2010/main" val="3827576176"/>
       </p:ext>
     </p:extLst>
   </p:cSld>
@@ -3298,50 +3546,14 @@
           </a:bodyPr>
           <a:lstStyle/>
           <a:p>
-            <a:pPr marL="171450" indent="-171450">
+            <a:pPr marL="0" indent="0">
               <a:buFontTx/>
-              <a:buChar char="-"/>
-            </a:pPr>
-            <a:r>
-              <a:rPr lang="en-US" baseline="0" dirty="0" smtClean="0"/>
-              <a:t>install GIT</a:t>
-            </a:r>
-          </a:p>
-          <a:p>
-            <a:pPr marL="628650" lvl="1" indent="-171450">
-              <a:buFontTx/>
-              <a:buChar char="-"/>
-            </a:pPr>
-            <a:r>
-              <a:rPr lang="en-US" baseline="0" dirty="0" smtClean="0"/>
-              <a:t>Windows</a:t>
-            </a:r>
-          </a:p>
-          <a:p>
-            <a:pPr marL="628650" lvl="1" indent="-171450">
-              <a:buFontTx/>
-              <a:buChar char="-"/>
-            </a:pPr>
-            <a:r>
-              <a:rPr lang="en-US" baseline="0" dirty="0" smtClean="0"/>
-              <a:t>Mac</a:t>
-            </a:r>
-          </a:p>
-          <a:p>
-            <a:pPr marL="171450" lvl="0" indent="-171450">
-              <a:buFontTx/>
-              <a:buChar char="-"/>
-            </a:pPr>
-            <a:r>
-              <a:rPr lang="en-US" baseline="0" dirty="0" smtClean="0"/>
-              <a:t>setup username and email</a:t>
-            </a:r>
-          </a:p>
-          <a:p>
-            <a:pPr marL="171450" lvl="0" indent="-171450">
-              <a:buFontTx/>
-              <a:buChar char="-"/>
-            </a:pPr>
+              <a:buNone/>
+            </a:pPr>
+            <a:r>
+              <a:rPr lang="en-US" dirty="0" smtClean="0"/>
+              <a:t>(this diagram only changes the layout)</a:t>
+            </a:r>
             <a:endParaRPr dirty="0"/>
           </a:p>
         </p:txBody>
@@ -3390,6 +3602,670 @@
     </p:spTree>
     <p:extLst>
       <p:ext uri="{BB962C8B-B14F-4D97-AF65-F5344CB8AC3E}">
+        <p14:creationId xmlns:p14="http://schemas.microsoft.com/office/powerpoint/2010/main" val="164043609"/>
+      </p:ext>
+    </p:extLst>
+  </p:cSld>
+  <p:clrMapOvr>
+    <a:masterClrMapping/>
+  </p:clrMapOvr>
+</p:notes>
+</file>
+
+<file path=ppt/notesSlides/notesSlide31.xml><?xml version="1.0" encoding="utf-8"?>
+<p:notes xmlns:a="http://schemas.openxmlformats.org/drawingml/2006/main" xmlns:r="http://schemas.openxmlformats.org/officeDocument/2006/relationships" xmlns:p="http://schemas.openxmlformats.org/presentationml/2006/main" showMasterSp="0" showMasterPhAnim="0">
+  <p:cSld>
+    <p:spTree>
+      <p:nvGrpSpPr>
+        <p:cNvPr id="1" name="Shape 98"/>
+        <p:cNvGrpSpPr/>
+        <p:nvPr/>
+      </p:nvGrpSpPr>
+      <p:grpSpPr>
+        <a:xfrm>
+          <a:off x="0" y="0"/>
+          <a:ext cx="0" cy="0"/>
+          <a:chOff x="0" y="0"/>
+          <a:chExt cx="0" cy="0"/>
+        </a:xfrm>
+      </p:grpSpPr>
+      <p:sp>
+        <p:nvSpPr>
+          <p:cNvPr id="99" name="Shape 99"/>
+          <p:cNvSpPr txBox="1">
+            <a:spLocks noGrp="1"/>
+          </p:cNvSpPr>
+          <p:nvPr>
+            <p:ph type="body" idx="1"/>
+          </p:nvPr>
+        </p:nvSpPr>
+        <p:spPr>
+          <a:xfrm>
+            <a:off x="685800" y="4343400"/>
+            <a:ext cx="5486399" cy="4114800"/>
+          </a:xfrm>
+          <a:prstGeom prst="rect">
+            <a:avLst/>
+          </a:prstGeom>
+        </p:spPr>
+        <p:txBody>
+          <a:bodyPr lIns="91425" tIns="91425" rIns="91425" bIns="91425" anchor="ctr" anchorCtr="0">
+            <a:noAutofit/>
+          </a:bodyPr>
+          <a:lstStyle/>
+          <a:p>
+            <a:pPr marL="171450" indent="-171450">
+              <a:buFontTx/>
+              <a:buChar char="-"/>
+            </a:pPr>
+            <a:endParaRPr dirty="0"/>
+          </a:p>
+        </p:txBody>
+      </p:sp>
+      <p:sp>
+        <p:nvSpPr>
+          <p:cNvPr id="100" name="Shape 100"/>
+          <p:cNvSpPr>
+            <a:spLocks noGrp="1" noRot="1" noChangeAspect="1"/>
+          </p:cNvSpPr>
+          <p:nvPr>
+            <p:ph type="sldImg" idx="2"/>
+          </p:nvPr>
+        </p:nvSpPr>
+        <p:spPr>
+          <a:xfrm>
+            <a:off x="1143000" y="685800"/>
+            <a:ext cx="4572000" cy="3429000"/>
+          </a:xfrm>
+          <a:custGeom>
+            <a:avLst/>
+            <a:gdLst/>
+            <a:ahLst/>
+            <a:cxnLst/>
+            <a:rect l="0" t="0" r="0" b="0"/>
+            <a:pathLst>
+              <a:path w="120000" h="120000" extrusionOk="0">
+                <a:moveTo>
+                  <a:pt x="0" y="0"/>
+                </a:moveTo>
+                <a:lnTo>
+                  <a:pt x="120000" y="0"/>
+                </a:lnTo>
+                <a:lnTo>
+                  <a:pt x="120000" y="120000"/>
+                </a:lnTo>
+                <a:lnTo>
+                  <a:pt x="0" y="120000"/>
+                </a:lnTo>
+                <a:close/>
+              </a:path>
+            </a:pathLst>
+          </a:custGeom>
+        </p:spPr>
+      </p:sp>
+    </p:spTree>
+    <p:extLst>
+      <p:ext uri="{BB962C8B-B14F-4D97-AF65-F5344CB8AC3E}">
+        <p14:creationId xmlns:p14="http://schemas.microsoft.com/office/powerpoint/2010/main" val="3219326357"/>
+      </p:ext>
+    </p:extLst>
+  </p:cSld>
+  <p:clrMapOvr>
+    <a:masterClrMapping/>
+  </p:clrMapOvr>
+</p:notes>
+</file>
+
+<file path=ppt/notesSlides/notesSlide32.xml><?xml version="1.0" encoding="utf-8"?>
+<p:notes xmlns:a="http://schemas.openxmlformats.org/drawingml/2006/main" xmlns:r="http://schemas.openxmlformats.org/officeDocument/2006/relationships" xmlns:p="http://schemas.openxmlformats.org/presentationml/2006/main" showMasterSp="0" showMasterPhAnim="0">
+  <p:cSld>
+    <p:spTree>
+      <p:nvGrpSpPr>
+        <p:cNvPr id="1" name="Shape 98"/>
+        <p:cNvGrpSpPr/>
+        <p:nvPr/>
+      </p:nvGrpSpPr>
+      <p:grpSpPr>
+        <a:xfrm>
+          <a:off x="0" y="0"/>
+          <a:ext cx="0" cy="0"/>
+          <a:chOff x="0" y="0"/>
+          <a:chExt cx="0" cy="0"/>
+        </a:xfrm>
+      </p:grpSpPr>
+      <p:sp>
+        <p:nvSpPr>
+          <p:cNvPr id="99" name="Shape 99"/>
+          <p:cNvSpPr txBox="1">
+            <a:spLocks noGrp="1"/>
+          </p:cNvSpPr>
+          <p:nvPr>
+            <p:ph type="body" idx="1"/>
+          </p:nvPr>
+        </p:nvSpPr>
+        <p:spPr>
+          <a:xfrm>
+            <a:off x="685800" y="4343400"/>
+            <a:ext cx="5486399" cy="4114800"/>
+          </a:xfrm>
+          <a:prstGeom prst="rect">
+            <a:avLst/>
+          </a:prstGeom>
+        </p:spPr>
+        <p:txBody>
+          <a:bodyPr lIns="91425" tIns="91425" rIns="91425" bIns="91425" anchor="ctr" anchorCtr="0">
+            <a:noAutofit/>
+          </a:bodyPr>
+          <a:lstStyle/>
+          <a:p>
+            <a:pPr marL="171450" indent="-171450">
+              <a:buFontTx/>
+              <a:buChar char="-"/>
+            </a:pPr>
+            <a:endParaRPr dirty="0"/>
+          </a:p>
+        </p:txBody>
+      </p:sp>
+      <p:sp>
+        <p:nvSpPr>
+          <p:cNvPr id="100" name="Shape 100"/>
+          <p:cNvSpPr>
+            <a:spLocks noGrp="1" noRot="1" noChangeAspect="1"/>
+          </p:cNvSpPr>
+          <p:nvPr>
+            <p:ph type="sldImg" idx="2"/>
+          </p:nvPr>
+        </p:nvSpPr>
+        <p:spPr>
+          <a:xfrm>
+            <a:off x="1143000" y="685800"/>
+            <a:ext cx="4572000" cy="3429000"/>
+          </a:xfrm>
+          <a:custGeom>
+            <a:avLst/>
+            <a:gdLst/>
+            <a:ahLst/>
+            <a:cxnLst/>
+            <a:rect l="0" t="0" r="0" b="0"/>
+            <a:pathLst>
+              <a:path w="120000" h="120000" extrusionOk="0">
+                <a:moveTo>
+                  <a:pt x="0" y="0"/>
+                </a:moveTo>
+                <a:lnTo>
+                  <a:pt x="120000" y="0"/>
+                </a:lnTo>
+                <a:lnTo>
+                  <a:pt x="120000" y="120000"/>
+                </a:lnTo>
+                <a:lnTo>
+                  <a:pt x="0" y="120000"/>
+                </a:lnTo>
+                <a:close/>
+              </a:path>
+            </a:pathLst>
+          </a:custGeom>
+        </p:spPr>
+      </p:sp>
+    </p:spTree>
+    <p:extLst>
+      <p:ext uri="{BB962C8B-B14F-4D97-AF65-F5344CB8AC3E}">
+        <p14:creationId xmlns:p14="http://schemas.microsoft.com/office/powerpoint/2010/main" val="1650745352"/>
+      </p:ext>
+    </p:extLst>
+  </p:cSld>
+  <p:clrMapOvr>
+    <a:masterClrMapping/>
+  </p:clrMapOvr>
+</p:notes>
+</file>
+
+<file path=ppt/notesSlides/notesSlide33.xml><?xml version="1.0" encoding="utf-8"?>
+<p:notes xmlns:a="http://schemas.openxmlformats.org/drawingml/2006/main" xmlns:r="http://schemas.openxmlformats.org/officeDocument/2006/relationships" xmlns:p="http://schemas.openxmlformats.org/presentationml/2006/main" showMasterSp="0" showMasterPhAnim="0">
+  <p:cSld>
+    <p:spTree>
+      <p:nvGrpSpPr>
+        <p:cNvPr id="1" name="Shape 98"/>
+        <p:cNvGrpSpPr/>
+        <p:nvPr/>
+      </p:nvGrpSpPr>
+      <p:grpSpPr>
+        <a:xfrm>
+          <a:off x="0" y="0"/>
+          <a:ext cx="0" cy="0"/>
+          <a:chOff x="0" y="0"/>
+          <a:chExt cx="0" cy="0"/>
+        </a:xfrm>
+      </p:grpSpPr>
+      <p:sp>
+        <p:nvSpPr>
+          <p:cNvPr id="99" name="Shape 99"/>
+          <p:cNvSpPr txBox="1">
+            <a:spLocks noGrp="1"/>
+          </p:cNvSpPr>
+          <p:nvPr>
+            <p:ph type="body" idx="1"/>
+          </p:nvPr>
+        </p:nvSpPr>
+        <p:spPr>
+          <a:xfrm>
+            <a:off x="685800" y="4343400"/>
+            <a:ext cx="5486399" cy="4114800"/>
+          </a:xfrm>
+          <a:prstGeom prst="rect">
+            <a:avLst/>
+          </a:prstGeom>
+        </p:spPr>
+        <p:txBody>
+          <a:bodyPr lIns="91425" tIns="91425" rIns="91425" bIns="91425" anchor="ctr" anchorCtr="0">
+            <a:noAutofit/>
+          </a:bodyPr>
+          <a:lstStyle/>
+          <a:p>
+            <a:pPr marL="171450" indent="-171450">
+              <a:buFontTx/>
+              <a:buChar char="-"/>
+            </a:pPr>
+            <a:endParaRPr dirty="0"/>
+          </a:p>
+        </p:txBody>
+      </p:sp>
+      <p:sp>
+        <p:nvSpPr>
+          <p:cNvPr id="100" name="Shape 100"/>
+          <p:cNvSpPr>
+            <a:spLocks noGrp="1" noRot="1" noChangeAspect="1"/>
+          </p:cNvSpPr>
+          <p:nvPr>
+            <p:ph type="sldImg" idx="2"/>
+          </p:nvPr>
+        </p:nvSpPr>
+        <p:spPr>
+          <a:xfrm>
+            <a:off x="1143000" y="685800"/>
+            <a:ext cx="4572000" cy="3429000"/>
+          </a:xfrm>
+          <a:custGeom>
+            <a:avLst/>
+            <a:gdLst/>
+            <a:ahLst/>
+            <a:cxnLst/>
+            <a:rect l="0" t="0" r="0" b="0"/>
+            <a:pathLst>
+              <a:path w="120000" h="120000" extrusionOk="0">
+                <a:moveTo>
+                  <a:pt x="0" y="0"/>
+                </a:moveTo>
+                <a:lnTo>
+                  <a:pt x="120000" y="0"/>
+                </a:lnTo>
+                <a:lnTo>
+                  <a:pt x="120000" y="120000"/>
+                </a:lnTo>
+                <a:lnTo>
+                  <a:pt x="0" y="120000"/>
+                </a:lnTo>
+                <a:close/>
+              </a:path>
+            </a:pathLst>
+          </a:custGeom>
+        </p:spPr>
+      </p:sp>
+    </p:spTree>
+    <p:extLst>
+      <p:ext uri="{BB962C8B-B14F-4D97-AF65-F5344CB8AC3E}">
+        <p14:creationId xmlns:p14="http://schemas.microsoft.com/office/powerpoint/2010/main" val="979907960"/>
+      </p:ext>
+    </p:extLst>
+  </p:cSld>
+  <p:clrMapOvr>
+    <a:masterClrMapping/>
+  </p:clrMapOvr>
+</p:notes>
+</file>
+
+<file path=ppt/notesSlides/notesSlide34.xml><?xml version="1.0" encoding="utf-8"?>
+<p:notes xmlns:a="http://schemas.openxmlformats.org/drawingml/2006/main" xmlns:r="http://schemas.openxmlformats.org/officeDocument/2006/relationships" xmlns:p="http://schemas.openxmlformats.org/presentationml/2006/main" showMasterSp="0" showMasterPhAnim="0">
+  <p:cSld>
+    <p:spTree>
+      <p:nvGrpSpPr>
+        <p:cNvPr id="1" name="Shape 98"/>
+        <p:cNvGrpSpPr/>
+        <p:nvPr/>
+      </p:nvGrpSpPr>
+      <p:grpSpPr>
+        <a:xfrm>
+          <a:off x="0" y="0"/>
+          <a:ext cx="0" cy="0"/>
+          <a:chOff x="0" y="0"/>
+          <a:chExt cx="0" cy="0"/>
+        </a:xfrm>
+      </p:grpSpPr>
+      <p:sp>
+        <p:nvSpPr>
+          <p:cNvPr id="99" name="Shape 99"/>
+          <p:cNvSpPr txBox="1">
+            <a:spLocks noGrp="1"/>
+          </p:cNvSpPr>
+          <p:nvPr>
+            <p:ph type="body" idx="1"/>
+          </p:nvPr>
+        </p:nvSpPr>
+        <p:spPr>
+          <a:xfrm>
+            <a:off x="685800" y="4343400"/>
+            <a:ext cx="5486399" cy="4114800"/>
+          </a:xfrm>
+          <a:prstGeom prst="rect">
+            <a:avLst/>
+          </a:prstGeom>
+        </p:spPr>
+        <p:txBody>
+          <a:bodyPr lIns="91425" tIns="91425" rIns="91425" bIns="91425" anchor="ctr" anchorCtr="0">
+            <a:noAutofit/>
+          </a:bodyPr>
+          <a:lstStyle/>
+          <a:p>
+            <a:pPr marL="171450" indent="-171450">
+              <a:buFontTx/>
+              <a:buChar char="-"/>
+            </a:pPr>
+            <a:endParaRPr dirty="0"/>
+          </a:p>
+        </p:txBody>
+      </p:sp>
+      <p:sp>
+        <p:nvSpPr>
+          <p:cNvPr id="100" name="Shape 100"/>
+          <p:cNvSpPr>
+            <a:spLocks noGrp="1" noRot="1" noChangeAspect="1"/>
+          </p:cNvSpPr>
+          <p:nvPr>
+            <p:ph type="sldImg" idx="2"/>
+          </p:nvPr>
+        </p:nvSpPr>
+        <p:spPr>
+          <a:xfrm>
+            <a:off x="1143000" y="685800"/>
+            <a:ext cx="4572000" cy="3429000"/>
+          </a:xfrm>
+          <a:custGeom>
+            <a:avLst/>
+            <a:gdLst/>
+            <a:ahLst/>
+            <a:cxnLst/>
+            <a:rect l="0" t="0" r="0" b="0"/>
+            <a:pathLst>
+              <a:path w="120000" h="120000" extrusionOk="0">
+                <a:moveTo>
+                  <a:pt x="0" y="0"/>
+                </a:moveTo>
+                <a:lnTo>
+                  <a:pt x="120000" y="0"/>
+                </a:lnTo>
+                <a:lnTo>
+                  <a:pt x="120000" y="120000"/>
+                </a:lnTo>
+                <a:lnTo>
+                  <a:pt x="0" y="120000"/>
+                </a:lnTo>
+                <a:close/>
+              </a:path>
+            </a:pathLst>
+          </a:custGeom>
+        </p:spPr>
+      </p:sp>
+    </p:spTree>
+    <p:extLst>
+      <p:ext uri="{BB962C8B-B14F-4D97-AF65-F5344CB8AC3E}">
+        <p14:creationId xmlns:p14="http://schemas.microsoft.com/office/powerpoint/2010/main" val="2667286518"/>
+      </p:ext>
+    </p:extLst>
+  </p:cSld>
+  <p:clrMapOvr>
+    <a:masterClrMapping/>
+  </p:clrMapOvr>
+</p:notes>
+</file>
+
+<file path=ppt/notesSlides/notesSlide35.xml><?xml version="1.0" encoding="utf-8"?>
+<p:notes xmlns:a="http://schemas.openxmlformats.org/drawingml/2006/main" xmlns:r="http://schemas.openxmlformats.org/officeDocument/2006/relationships" xmlns:p="http://schemas.openxmlformats.org/presentationml/2006/main" showMasterSp="0" showMasterPhAnim="0">
+  <p:cSld>
+    <p:spTree>
+      <p:nvGrpSpPr>
+        <p:cNvPr id="1" name="Shape 98"/>
+        <p:cNvGrpSpPr/>
+        <p:nvPr/>
+      </p:nvGrpSpPr>
+      <p:grpSpPr>
+        <a:xfrm>
+          <a:off x="0" y="0"/>
+          <a:ext cx="0" cy="0"/>
+          <a:chOff x="0" y="0"/>
+          <a:chExt cx="0" cy="0"/>
+        </a:xfrm>
+      </p:grpSpPr>
+      <p:sp>
+        <p:nvSpPr>
+          <p:cNvPr id="99" name="Shape 99"/>
+          <p:cNvSpPr txBox="1">
+            <a:spLocks noGrp="1"/>
+          </p:cNvSpPr>
+          <p:nvPr>
+            <p:ph type="body" idx="1"/>
+          </p:nvPr>
+        </p:nvSpPr>
+        <p:spPr>
+          <a:xfrm>
+            <a:off x="685800" y="4343400"/>
+            <a:ext cx="5486399" cy="4114800"/>
+          </a:xfrm>
+          <a:prstGeom prst="rect">
+            <a:avLst/>
+          </a:prstGeom>
+        </p:spPr>
+        <p:txBody>
+          <a:bodyPr lIns="91425" tIns="91425" rIns="91425" bIns="91425" anchor="ctr" anchorCtr="0">
+            <a:noAutofit/>
+          </a:bodyPr>
+          <a:lstStyle/>
+          <a:p>
+            <a:pPr marL="171450" indent="-171450">
+              <a:buFontTx/>
+              <a:buChar char="-"/>
+            </a:pPr>
+            <a:endParaRPr dirty="0"/>
+          </a:p>
+        </p:txBody>
+      </p:sp>
+      <p:sp>
+        <p:nvSpPr>
+          <p:cNvPr id="100" name="Shape 100"/>
+          <p:cNvSpPr>
+            <a:spLocks noGrp="1" noRot="1" noChangeAspect="1"/>
+          </p:cNvSpPr>
+          <p:nvPr>
+            <p:ph type="sldImg" idx="2"/>
+          </p:nvPr>
+        </p:nvSpPr>
+        <p:spPr>
+          <a:xfrm>
+            <a:off x="1143000" y="685800"/>
+            <a:ext cx="4572000" cy="3429000"/>
+          </a:xfrm>
+          <a:custGeom>
+            <a:avLst/>
+            <a:gdLst/>
+            <a:ahLst/>
+            <a:cxnLst/>
+            <a:rect l="0" t="0" r="0" b="0"/>
+            <a:pathLst>
+              <a:path w="120000" h="120000" extrusionOk="0">
+                <a:moveTo>
+                  <a:pt x="0" y="0"/>
+                </a:moveTo>
+                <a:lnTo>
+                  <a:pt x="120000" y="0"/>
+                </a:lnTo>
+                <a:lnTo>
+                  <a:pt x="120000" y="120000"/>
+                </a:lnTo>
+                <a:lnTo>
+                  <a:pt x="0" y="120000"/>
+                </a:lnTo>
+                <a:close/>
+              </a:path>
+            </a:pathLst>
+          </a:custGeom>
+        </p:spPr>
+      </p:sp>
+    </p:spTree>
+    <p:extLst>
+      <p:ext uri="{BB962C8B-B14F-4D97-AF65-F5344CB8AC3E}">
+        <p14:creationId xmlns:p14="http://schemas.microsoft.com/office/powerpoint/2010/main" val="890929024"/>
+      </p:ext>
+    </p:extLst>
+  </p:cSld>
+  <p:clrMapOvr>
+    <a:masterClrMapping/>
+  </p:clrMapOvr>
+</p:notes>
+</file>
+
+<file path=ppt/notesSlides/notesSlide36.xml><?xml version="1.0" encoding="utf-8"?>
+<p:notes xmlns:a="http://schemas.openxmlformats.org/drawingml/2006/main" xmlns:r="http://schemas.openxmlformats.org/officeDocument/2006/relationships" xmlns:p="http://schemas.openxmlformats.org/presentationml/2006/main" showMasterSp="0" showMasterPhAnim="0">
+  <p:cSld>
+    <p:spTree>
+      <p:nvGrpSpPr>
+        <p:cNvPr id="1" name="Shape 98"/>
+        <p:cNvGrpSpPr/>
+        <p:nvPr/>
+      </p:nvGrpSpPr>
+      <p:grpSpPr>
+        <a:xfrm>
+          <a:off x="0" y="0"/>
+          <a:ext cx="0" cy="0"/>
+          <a:chOff x="0" y="0"/>
+          <a:chExt cx="0" cy="0"/>
+        </a:xfrm>
+      </p:grpSpPr>
+      <p:sp>
+        <p:nvSpPr>
+          <p:cNvPr id="99" name="Shape 99"/>
+          <p:cNvSpPr txBox="1">
+            <a:spLocks noGrp="1"/>
+          </p:cNvSpPr>
+          <p:nvPr>
+            <p:ph type="body" idx="1"/>
+          </p:nvPr>
+        </p:nvSpPr>
+        <p:spPr>
+          <a:xfrm>
+            <a:off x="685800" y="4343400"/>
+            <a:ext cx="5486399" cy="4114800"/>
+          </a:xfrm>
+          <a:prstGeom prst="rect">
+            <a:avLst/>
+          </a:prstGeom>
+        </p:spPr>
+        <p:txBody>
+          <a:bodyPr lIns="91425" tIns="91425" rIns="91425" bIns="91425" anchor="ctr" anchorCtr="0">
+            <a:noAutofit/>
+          </a:bodyPr>
+          <a:lstStyle/>
+          <a:p>
+            <a:pPr marL="171450" indent="-171450">
+              <a:buFontTx/>
+              <a:buChar char="-"/>
+            </a:pPr>
+            <a:r>
+              <a:rPr lang="en-US" baseline="0" dirty="0" smtClean="0"/>
+              <a:t>install GIT</a:t>
+            </a:r>
+          </a:p>
+          <a:p>
+            <a:pPr marL="628650" lvl="1" indent="-171450">
+              <a:buFontTx/>
+              <a:buChar char="-"/>
+            </a:pPr>
+            <a:r>
+              <a:rPr lang="en-US" baseline="0" dirty="0" smtClean="0"/>
+              <a:t>Windows</a:t>
+            </a:r>
+          </a:p>
+          <a:p>
+            <a:pPr marL="628650" lvl="1" indent="-171450">
+              <a:buFontTx/>
+              <a:buChar char="-"/>
+            </a:pPr>
+            <a:r>
+              <a:rPr lang="en-US" baseline="0" dirty="0" smtClean="0"/>
+              <a:t>Mac</a:t>
+            </a:r>
+          </a:p>
+          <a:p>
+            <a:pPr marL="171450" lvl="0" indent="-171450">
+              <a:buFontTx/>
+              <a:buChar char="-"/>
+            </a:pPr>
+            <a:r>
+              <a:rPr lang="en-US" baseline="0" dirty="0" smtClean="0"/>
+              <a:t>setup username and email</a:t>
+            </a:r>
+          </a:p>
+          <a:p>
+            <a:pPr marL="171450" lvl="0" indent="-171450">
+              <a:buFontTx/>
+              <a:buChar char="-"/>
+            </a:pPr>
+            <a:endParaRPr dirty="0"/>
+          </a:p>
+        </p:txBody>
+      </p:sp>
+      <p:sp>
+        <p:nvSpPr>
+          <p:cNvPr id="100" name="Shape 100"/>
+          <p:cNvSpPr>
+            <a:spLocks noGrp="1" noRot="1" noChangeAspect="1"/>
+          </p:cNvSpPr>
+          <p:nvPr>
+            <p:ph type="sldImg" idx="2"/>
+          </p:nvPr>
+        </p:nvSpPr>
+        <p:spPr>
+          <a:xfrm>
+            <a:off x="1143000" y="685800"/>
+            <a:ext cx="4572000" cy="3429000"/>
+          </a:xfrm>
+          <a:custGeom>
+            <a:avLst/>
+            <a:gdLst/>
+            <a:ahLst/>
+            <a:cxnLst/>
+            <a:rect l="0" t="0" r="0" b="0"/>
+            <a:pathLst>
+              <a:path w="120000" h="120000" extrusionOk="0">
+                <a:moveTo>
+                  <a:pt x="0" y="0"/>
+                </a:moveTo>
+                <a:lnTo>
+                  <a:pt x="120000" y="0"/>
+                </a:lnTo>
+                <a:lnTo>
+                  <a:pt x="120000" y="120000"/>
+                </a:lnTo>
+                <a:lnTo>
+                  <a:pt x="0" y="120000"/>
+                </a:lnTo>
+                <a:close/>
+              </a:path>
+            </a:pathLst>
+          </a:custGeom>
+        </p:spPr>
+      </p:sp>
+    </p:spTree>
+    <p:extLst>
+      <p:ext uri="{BB962C8B-B14F-4D97-AF65-F5344CB8AC3E}">
         <p14:creationId xmlns:p14="http://schemas.microsoft.com/office/powerpoint/2010/main" val="2666093823"/>
       </p:ext>
     </p:extLst>
@@ -3400,7 +4276,7 @@
 </p:notes>
 </file>
 
-<file path=ppt/notesSlides/notesSlide31.xml><?xml version="1.0" encoding="utf-8"?>
+<file path=ppt/notesSlides/notesSlide37.xml><?xml version="1.0" encoding="utf-8"?>
 <p:notes xmlns:a="http://schemas.openxmlformats.org/drawingml/2006/main" xmlns:r="http://schemas.openxmlformats.org/officeDocument/2006/relationships" xmlns:p="http://schemas.openxmlformats.org/presentationml/2006/main" showMasterSp="0" showMasterPhAnim="0">
   <p:cSld>
     <p:spTree>
@@ -3777,19 +4653,7 @@
             </a:pPr>
             <a:r>
               <a:rPr lang="en-US" baseline="0" dirty="0" smtClean="0"/>
-              <a:t>but GIT allows </a:t>
-            </a:r>
-            <a:r>
-              <a:rPr lang="en-US" baseline="0" dirty="0" smtClean="0"/>
-              <a:t>developers </a:t>
-            </a:r>
-            <a:r>
-              <a:rPr lang="en-US" baseline="0" dirty="0" smtClean="0"/>
-              <a:t>to communicate between themselves if needed (e.g. work together on one feature</a:t>
-            </a:r>
-            <a:r>
-              <a:rPr lang="en-US" baseline="0" dirty="0" smtClean="0"/>
-              <a:t>)</a:t>
+              <a:t>but GIT allows developers to communicate between themselves if needed (e.g. work together on one feature)</a:t>
             </a:r>
           </a:p>
           <a:p>
@@ -11164,7 +12028,11 @@
             </a:pPr>
             <a:r>
               <a:rPr lang="en-US" sz="2400" dirty="0" smtClean="0"/>
-              <a:t>Compared with SVN</a:t>
+              <a:t>GIT vs. </a:t>
+            </a:r>
+            <a:r>
+              <a:rPr lang="en-US" sz="2400" dirty="0" smtClean="0"/>
+              <a:t>SVN</a:t>
             </a:r>
           </a:p>
           <a:p>
@@ -11181,13 +12049,28 @@
               </a:buBlip>
             </a:pPr>
             <a:r>
-              <a:rPr lang="en-US" sz="2400" dirty="0"/>
-              <a:t> </a:t>
-            </a:r>
-            <a:r>
               <a:rPr lang="en-US" sz="2400" dirty="0" smtClean="0"/>
-              <a:t>GIT concepts</a:t>
-            </a:r>
+              <a:t>GIT concepts (DAG, branch, tag, etc.)</a:t>
+            </a:r>
+          </a:p>
+          <a:p>
+            <a:pPr marL="641350" lvl="5" indent="-285750">
+              <a:lnSpc>
+                <a:spcPct val="150000"/>
+              </a:lnSpc>
+              <a:buClr>
+                <a:srgbClr val="2E3640"/>
+              </a:buClr>
+              <a:buSzPct val="100000"/>
+              <a:buBlip>
+                <a:blip r:embed="rId4"/>
+              </a:buBlip>
+            </a:pPr>
+            <a:r>
+              <a:rPr lang="en-US" sz="2400" dirty="0" smtClean="0"/>
+              <a:t>GIT operations (commit, merge, etc.)</a:t>
+            </a:r>
+            <a:endParaRPr lang="en-US" sz="2400" dirty="0" smtClean="0"/>
           </a:p>
           <a:p>
             <a:pPr marL="285750" indent="-285750">
@@ -11834,7 +12717,79 @@
       </p:sp>
       <p:sp>
         <p:nvSpPr>
-          <p:cNvPr id="96" name="Shape 96"/>
+          <p:cNvPr id="97" name="Shape 97"/>
+          <p:cNvSpPr txBox="1">
+            <a:spLocks noGrp="1"/>
+          </p:cNvSpPr>
+          <p:nvPr>
+            <p:ph type="body" idx="2"/>
+          </p:nvPr>
+        </p:nvSpPr>
+        <p:spPr>
+          <a:xfrm>
+            <a:off x="341168" y="228026"/>
+            <a:ext cx="8498032" cy="457199"/>
+          </a:xfrm>
+          <a:prstGeom prst="rect">
+            <a:avLst/>
+          </a:prstGeom>
+          <a:noFill/>
+          <a:ln>
+            <a:noFill/>
+          </a:ln>
+        </p:spPr>
+        <p:txBody>
+          <a:bodyPr lIns="68569" tIns="34275" rIns="68569" bIns="34275" anchor="t" anchorCtr="0">
+            <a:noAutofit/>
+          </a:bodyPr>
+          <a:lstStyle/>
+          <a:p>
+            <a:pPr>
+              <a:buClr>
+                <a:schemeClr val="accent2"/>
+              </a:buClr>
+              <a:buSzPct val="25000"/>
+            </a:pPr>
+            <a:r>
+              <a:rPr lang="en-US" sz="3600" dirty="0" smtClean="0"/>
+              <a:t>GIT clone / 1 of 3</a:t>
+            </a:r>
+          </a:p>
+        </p:txBody>
+      </p:sp>
+      <p:pic>
+        <p:nvPicPr>
+          <p:cNvPr id="5" name="Picture 4"/>
+          <p:cNvPicPr>
+            <a:picLocks noChangeAspect="1"/>
+          </p:cNvPicPr>
+          <p:nvPr/>
+        </p:nvPicPr>
+        <p:blipFill>
+          <a:blip r:embed="rId3">
+            <a:extLst>
+              <a:ext uri="{28A0092B-C50C-407E-A947-70E740481C1C}">
+                <a14:useLocalDpi xmlns:a14="http://schemas.microsoft.com/office/drawing/2010/main" val="0"/>
+              </a:ext>
+            </a:extLst>
+          </a:blip>
+          <a:stretch>
+            <a:fillRect/>
+          </a:stretch>
+        </p:blipFill>
+        <p:spPr>
+          <a:xfrm>
+            <a:off x="4762" y="1548000"/>
+            <a:ext cx="9134475" cy="4733925"/>
+          </a:xfrm>
+          <a:prstGeom prst="rect">
+            <a:avLst/>
+          </a:prstGeom>
+        </p:spPr>
+      </p:pic>
+      <p:sp>
+        <p:nvSpPr>
+          <p:cNvPr id="11" name="Shape 96"/>
           <p:cNvSpPr txBox="1">
             <a:spLocks noGrp="1"/>
           </p:cNvSpPr>
@@ -11870,92 +12825,28 @@
               </a:buClr>
               <a:buSzPct val="100000"/>
               <a:buBlip>
-                <a:blip r:embed="rId3"/>
+                <a:blip r:embed="rId4"/>
               </a:buBlip>
             </a:pPr>
             <a:r>
               <a:rPr lang="en-US" sz="2400" dirty="0" smtClean="0"/>
-              <a:t>stuff</a:t>
-            </a:r>
-            <a:endParaRPr lang="en-US" sz="2400" dirty="0" smtClean="0">
-              <a:sym typeface="Wingdings" panose="05000000000000000000" pitchFamily="2" charset="2"/>
-            </a:endParaRPr>
-          </a:p>
-          <a:p>
-            <a:pPr>
-              <a:lnSpc>
-                <a:spcPct val="90000"/>
-              </a:lnSpc>
-              <a:buClr>
-                <a:srgbClr val="2E3640"/>
-              </a:buClr>
-              <a:buSzPct val="100000"/>
-            </a:pPr>
-            <a:endParaRPr lang="en-US" sz="2400" dirty="0">
-              <a:sym typeface="Wingdings" panose="05000000000000000000" pitchFamily="2" charset="2"/>
-            </a:endParaRPr>
-          </a:p>
-          <a:p>
-            <a:pPr>
-              <a:lnSpc>
-                <a:spcPct val="90000"/>
-              </a:lnSpc>
-              <a:buClr>
-                <a:srgbClr val="2E3640"/>
-              </a:buClr>
-              <a:buSzPct val="100000"/>
-            </a:pPr>
-            <a:endParaRPr lang="en-US" sz="2400" dirty="0" smtClean="0"/>
-          </a:p>
-        </p:txBody>
-      </p:sp>
-      <p:sp>
-        <p:nvSpPr>
-          <p:cNvPr id="97" name="Shape 97"/>
-          <p:cNvSpPr txBox="1">
-            <a:spLocks noGrp="1"/>
-          </p:cNvSpPr>
-          <p:nvPr>
-            <p:ph type="body" idx="2"/>
-          </p:nvPr>
-        </p:nvSpPr>
-        <p:spPr>
-          <a:xfrm>
-            <a:off x="341168" y="228026"/>
-            <a:ext cx="8498032" cy="457199"/>
-          </a:xfrm>
-          <a:prstGeom prst="rect">
-            <a:avLst/>
-          </a:prstGeom>
-          <a:noFill/>
-          <a:ln>
-            <a:noFill/>
-          </a:ln>
-        </p:spPr>
-        <p:txBody>
-          <a:bodyPr lIns="68569" tIns="34275" rIns="68569" bIns="34275" anchor="t" anchorCtr="0">
-            <a:noAutofit/>
-          </a:bodyPr>
-          <a:lstStyle/>
-          <a:p>
-            <a:pPr>
-              <a:buClr>
-                <a:schemeClr val="accent2"/>
-              </a:buClr>
-              <a:buSzPct val="25000"/>
-            </a:pPr>
-            <a:r>
-              <a:rPr lang="en-US" sz="3600" dirty="0" smtClean="0"/>
-              <a:t>Title</a:t>
-            </a:r>
-            <a:endParaRPr lang="en-US" sz="3600" dirty="0"/>
+              <a:t>use "</a:t>
+            </a:r>
+            <a:r>
+              <a:rPr lang="en-US" sz="2400" dirty="0" err="1" smtClean="0"/>
+              <a:t>git</a:t>
+            </a:r>
+            <a:r>
+              <a:rPr lang="en-US" sz="2400" dirty="0" smtClean="0"/>
+              <a:t> clone" to "copy" a remote repository, to start work</a:t>
+            </a:r>
           </a:p>
         </p:txBody>
       </p:sp>
     </p:spTree>
     <p:extLst>
       <p:ext uri="{BB962C8B-B14F-4D97-AF65-F5344CB8AC3E}">
-        <p14:creationId xmlns:p14="http://schemas.microsoft.com/office/powerpoint/2010/main" val="396525421"/>
+        <p14:creationId xmlns:p14="http://schemas.microsoft.com/office/powerpoint/2010/main" val="695698909"/>
       </p:ext>
     </p:extLst>
   </p:cSld>
@@ -12033,18 +12924,18 @@
       </p:sp>
       <p:sp>
         <p:nvSpPr>
-          <p:cNvPr id="96" name="Shape 96"/>
+          <p:cNvPr id="97" name="Shape 97"/>
           <p:cNvSpPr txBox="1">
             <a:spLocks noGrp="1"/>
           </p:cNvSpPr>
           <p:nvPr>
-            <p:ph type="body" idx="1"/>
-          </p:nvPr>
-        </p:nvSpPr>
-        <p:spPr>
-          <a:xfrm>
-            <a:off x="341167" y="937873"/>
-            <a:ext cx="8498033" cy="5024690"/>
+            <p:ph type="body" idx="2"/>
+          </p:nvPr>
+        </p:nvSpPr>
+        <p:spPr>
+          <a:xfrm>
+            <a:off x="341168" y="228026"/>
+            <a:ext cx="8498032" cy="457199"/>
           </a:xfrm>
           <a:prstGeom prst="rect">
             <a:avLst/>
@@ -12060,83 +12951,6 @@
           </a:bodyPr>
           <a:lstStyle/>
           <a:p>
-            <a:pPr marL="355600" indent="-355600">
-              <a:lnSpc>
-                <a:spcPct val="90000"/>
-              </a:lnSpc>
-              <a:buClr>
-                <a:srgbClr val="2E3640"/>
-              </a:buClr>
-              <a:buSzPct val="100000"/>
-              <a:buBlip>
-                <a:blip r:embed="rId3"/>
-              </a:buBlip>
-            </a:pPr>
-            <a:r>
-              <a:rPr lang="en-US" sz="2400" dirty="0" smtClean="0"/>
-              <a:t>stuff</a:t>
-            </a:r>
-            <a:endParaRPr lang="en-US" sz="2400" dirty="0" smtClean="0">
-              <a:sym typeface="Wingdings" panose="05000000000000000000" pitchFamily="2" charset="2"/>
-            </a:endParaRPr>
-          </a:p>
-          <a:p>
-            <a:pPr>
-              <a:lnSpc>
-                <a:spcPct val="90000"/>
-              </a:lnSpc>
-              <a:buClr>
-                <a:srgbClr val="2E3640"/>
-              </a:buClr>
-              <a:buSzPct val="100000"/>
-            </a:pPr>
-            <a:endParaRPr lang="en-US" sz="2400" dirty="0">
-              <a:sym typeface="Wingdings" panose="05000000000000000000" pitchFamily="2" charset="2"/>
-            </a:endParaRPr>
-          </a:p>
-          <a:p>
-            <a:pPr>
-              <a:lnSpc>
-                <a:spcPct val="90000"/>
-              </a:lnSpc>
-              <a:buClr>
-                <a:srgbClr val="2E3640"/>
-              </a:buClr>
-              <a:buSzPct val="100000"/>
-            </a:pPr>
-            <a:endParaRPr lang="en-US" sz="2400" dirty="0" smtClean="0"/>
-          </a:p>
-        </p:txBody>
-      </p:sp>
-      <p:sp>
-        <p:nvSpPr>
-          <p:cNvPr id="97" name="Shape 97"/>
-          <p:cNvSpPr txBox="1">
-            <a:spLocks noGrp="1"/>
-          </p:cNvSpPr>
-          <p:nvPr>
-            <p:ph type="body" idx="2"/>
-          </p:nvPr>
-        </p:nvSpPr>
-        <p:spPr>
-          <a:xfrm>
-            <a:off x="341168" y="228026"/>
-            <a:ext cx="8498032" cy="457199"/>
-          </a:xfrm>
-          <a:prstGeom prst="rect">
-            <a:avLst/>
-          </a:prstGeom>
-          <a:noFill/>
-          <a:ln>
-            <a:noFill/>
-          </a:ln>
-        </p:spPr>
-        <p:txBody>
-          <a:bodyPr lIns="68569" tIns="34275" rIns="68569" bIns="34275" anchor="t" anchorCtr="0">
-            <a:noAutofit/>
-          </a:bodyPr>
-          <a:lstStyle/>
-          <a:p>
             <a:pPr>
               <a:buClr>
                 <a:schemeClr val="accent2"/>
@@ -12145,16 +12959,45 @@
             </a:pPr>
             <a:r>
               <a:rPr lang="en-US" sz="3600" dirty="0" smtClean="0"/>
-              <a:t>Title</a:t>
-            </a:r>
-            <a:endParaRPr lang="en-US" sz="3600" dirty="0"/>
+              <a:t>GIT clone / 2 of 3</a:t>
+            </a:r>
           </a:p>
         </p:txBody>
       </p:sp>
+      <p:pic>
+        <p:nvPicPr>
+          <p:cNvPr id="3" name="Picture 2"/>
+          <p:cNvPicPr>
+            <a:picLocks noChangeAspect="1"/>
+          </p:cNvPicPr>
+          <p:nvPr/>
+        </p:nvPicPr>
+        <p:blipFill>
+          <a:blip r:embed="rId3">
+            <a:extLst>
+              <a:ext uri="{28A0092B-C50C-407E-A947-70E740481C1C}">
+                <a14:useLocalDpi xmlns:a14="http://schemas.microsoft.com/office/drawing/2010/main" val="0"/>
+              </a:ext>
+            </a:extLst>
+          </a:blip>
+          <a:stretch>
+            <a:fillRect/>
+          </a:stretch>
+        </p:blipFill>
+        <p:spPr>
+          <a:xfrm>
+            <a:off x="4762" y="1548000"/>
+            <a:ext cx="9134475" cy="4733925"/>
+          </a:xfrm>
+          <a:prstGeom prst="rect">
+            <a:avLst/>
+          </a:prstGeom>
+        </p:spPr>
+      </p:pic>
     </p:spTree>
     <p:extLst>
       <p:ext uri="{BB962C8B-B14F-4D97-AF65-F5344CB8AC3E}">
-        <p14:creationId xmlns:p14="http://schemas.microsoft.com/office/powerpoint/2010/main" val="695698909"/>
+        <p14:creationId xmlns:p14="http://schemas.microsoft.com/office/powerpoint/2010/main" val="81207464"/>
       </p:ext>
     </p:extLst>
   </p:cSld>
@@ -12232,18 +13075,18 @@
       </p:sp>
       <p:sp>
         <p:nvSpPr>
-          <p:cNvPr id="96" name="Shape 96"/>
+          <p:cNvPr id="97" name="Shape 97"/>
           <p:cNvSpPr txBox="1">
             <a:spLocks noGrp="1"/>
           </p:cNvSpPr>
           <p:nvPr>
-            <p:ph type="body" idx="1"/>
-          </p:nvPr>
-        </p:nvSpPr>
-        <p:spPr>
-          <a:xfrm>
-            <a:off x="341167" y="937873"/>
-            <a:ext cx="8498033" cy="5024690"/>
+            <p:ph type="body" idx="2"/>
+          </p:nvPr>
+        </p:nvSpPr>
+        <p:spPr>
+          <a:xfrm>
+            <a:off x="341168" y="228026"/>
+            <a:ext cx="8498032" cy="457199"/>
           </a:xfrm>
           <a:prstGeom prst="rect">
             <a:avLst/>
@@ -12259,83 +13102,6 @@
           </a:bodyPr>
           <a:lstStyle/>
           <a:p>
-            <a:pPr marL="355600" indent="-355600">
-              <a:lnSpc>
-                <a:spcPct val="90000"/>
-              </a:lnSpc>
-              <a:buClr>
-                <a:srgbClr val="2E3640"/>
-              </a:buClr>
-              <a:buSzPct val="100000"/>
-              <a:buBlip>
-                <a:blip r:embed="rId3"/>
-              </a:buBlip>
-            </a:pPr>
-            <a:r>
-              <a:rPr lang="en-US" sz="2400" dirty="0" smtClean="0"/>
-              <a:t>stuff</a:t>
-            </a:r>
-            <a:endParaRPr lang="en-US" sz="2400" dirty="0" smtClean="0">
-              <a:sym typeface="Wingdings" panose="05000000000000000000" pitchFamily="2" charset="2"/>
-            </a:endParaRPr>
-          </a:p>
-          <a:p>
-            <a:pPr>
-              <a:lnSpc>
-                <a:spcPct val="90000"/>
-              </a:lnSpc>
-              <a:buClr>
-                <a:srgbClr val="2E3640"/>
-              </a:buClr>
-              <a:buSzPct val="100000"/>
-            </a:pPr>
-            <a:endParaRPr lang="en-US" sz="2400" dirty="0">
-              <a:sym typeface="Wingdings" panose="05000000000000000000" pitchFamily="2" charset="2"/>
-            </a:endParaRPr>
-          </a:p>
-          <a:p>
-            <a:pPr>
-              <a:lnSpc>
-                <a:spcPct val="90000"/>
-              </a:lnSpc>
-              <a:buClr>
-                <a:srgbClr val="2E3640"/>
-              </a:buClr>
-              <a:buSzPct val="100000"/>
-            </a:pPr>
-            <a:endParaRPr lang="en-US" sz="2400" dirty="0" smtClean="0"/>
-          </a:p>
-        </p:txBody>
-      </p:sp>
-      <p:sp>
-        <p:nvSpPr>
-          <p:cNvPr id="97" name="Shape 97"/>
-          <p:cNvSpPr txBox="1">
-            <a:spLocks noGrp="1"/>
-          </p:cNvSpPr>
-          <p:nvPr>
-            <p:ph type="body" idx="2"/>
-          </p:nvPr>
-        </p:nvSpPr>
-        <p:spPr>
-          <a:xfrm>
-            <a:off x="341168" y="228026"/>
-            <a:ext cx="8498032" cy="457199"/>
-          </a:xfrm>
-          <a:prstGeom prst="rect">
-            <a:avLst/>
-          </a:prstGeom>
-          <a:noFill/>
-          <a:ln>
-            <a:noFill/>
-          </a:ln>
-        </p:spPr>
-        <p:txBody>
-          <a:bodyPr lIns="68569" tIns="34275" rIns="68569" bIns="34275" anchor="t" anchorCtr="0">
-            <a:noAutofit/>
-          </a:bodyPr>
-          <a:lstStyle/>
-          <a:p>
             <a:pPr>
               <a:buClr>
                 <a:schemeClr val="accent2"/>
@@ -12344,16 +13110,45 @@
             </a:pPr>
             <a:r>
               <a:rPr lang="en-US" sz="3600" dirty="0" smtClean="0"/>
-              <a:t>Title</a:t>
-            </a:r>
-            <a:endParaRPr lang="en-US" sz="3600" dirty="0"/>
+              <a:t>GIT clone / 3 of 3</a:t>
+            </a:r>
           </a:p>
         </p:txBody>
       </p:sp>
+      <p:pic>
+        <p:nvPicPr>
+          <p:cNvPr id="3" name="Picture 2"/>
+          <p:cNvPicPr>
+            <a:picLocks noChangeAspect="1"/>
+          </p:cNvPicPr>
+          <p:nvPr/>
+        </p:nvPicPr>
+        <p:blipFill>
+          <a:blip r:embed="rId3">
+            <a:extLst>
+              <a:ext uri="{28A0092B-C50C-407E-A947-70E740481C1C}">
+                <a14:useLocalDpi xmlns:a14="http://schemas.microsoft.com/office/drawing/2010/main" val="0"/>
+              </a:ext>
+            </a:extLst>
+          </a:blip>
+          <a:stretch>
+            <a:fillRect/>
+          </a:stretch>
+        </p:blipFill>
+        <p:spPr>
+          <a:xfrm>
+            <a:off x="4762" y="1548000"/>
+            <a:ext cx="9134475" cy="4733925"/>
+          </a:xfrm>
+          <a:prstGeom prst="rect">
+            <a:avLst/>
+          </a:prstGeom>
+        </p:spPr>
+      </p:pic>
     </p:spTree>
     <p:extLst>
       <p:ext uri="{BB962C8B-B14F-4D97-AF65-F5344CB8AC3E}">
-        <p14:creationId xmlns:p14="http://schemas.microsoft.com/office/powerpoint/2010/main" val="2915095849"/>
+        <p14:creationId xmlns:p14="http://schemas.microsoft.com/office/powerpoint/2010/main" val="3708247386"/>
       </p:ext>
     </p:extLst>
   </p:cSld>
@@ -12472,7 +13267,39 @@
             </a:pPr>
             <a:r>
               <a:rPr lang="en-US" sz="2400" dirty="0" smtClean="0"/>
-              <a:t>stuff</a:t>
+              <a:t>all commit/merge/rebase operations are local</a:t>
+            </a:r>
+          </a:p>
+          <a:p>
+            <a:pPr marL="355600" indent="-355600">
+              <a:lnSpc>
+                <a:spcPct val="90000"/>
+              </a:lnSpc>
+              <a:buClr>
+                <a:srgbClr val="2E3640"/>
+              </a:buClr>
+              <a:buSzPct val="100000"/>
+              <a:buBlip>
+                <a:blip r:embed="rId3"/>
+              </a:buBlip>
+            </a:pPr>
+            <a:r>
+              <a:rPr lang="en-US" sz="2400" dirty="0" smtClean="0">
+                <a:sym typeface="Wingdings" panose="05000000000000000000" pitchFamily="2" charset="2"/>
+              </a:rPr>
+              <a:t>"</a:t>
+            </a:r>
+            <a:r>
+              <a:rPr lang="en-US" sz="2400" dirty="0" err="1" smtClean="0">
+                <a:sym typeface="Wingdings" panose="05000000000000000000" pitchFamily="2" charset="2"/>
+              </a:rPr>
+              <a:t>git</a:t>
+            </a:r>
+            <a:r>
+              <a:rPr lang="en-US" sz="2400" dirty="0" smtClean="0">
+                <a:sym typeface="Wingdings" panose="05000000000000000000" pitchFamily="2" charset="2"/>
+              </a:rPr>
+              <a:t> push" sends the commits to another GIT repo</a:t>
             </a:r>
             <a:endParaRPr lang="en-US" sz="2400" dirty="0" smtClean="0">
               <a:sym typeface="Wingdings" panose="05000000000000000000" pitchFamily="2" charset="2"/>
@@ -12492,18 +13319,6 @@
               <a:sym typeface="Wingdings" panose="05000000000000000000" pitchFamily="2" charset="2"/>
             </a:endParaRPr>
           </a:p>
-          <a:p>
-            <a:pPr>
-              <a:lnSpc>
-                <a:spcPct val="90000"/>
-              </a:lnSpc>
-              <a:buClr>
-                <a:srgbClr val="2E3640"/>
-              </a:buClr>
-              <a:buSzPct val="100000"/>
-            </a:pPr>
-            <a:endParaRPr lang="en-US" sz="2400" dirty="0" smtClean="0"/>
-          </a:p>
         </p:txBody>
       </p:sp>
       <p:sp>
@@ -12543,16 +13358,46 @@
             </a:pPr>
             <a:r>
               <a:rPr lang="en-US" sz="3600" dirty="0" smtClean="0"/>
-              <a:t>Title</a:t>
+              <a:t>GIT push / success case / 1 of 5</a:t>
             </a:r>
             <a:endParaRPr lang="en-US" sz="3600" dirty="0"/>
           </a:p>
         </p:txBody>
       </p:sp>
+      <p:pic>
+        <p:nvPicPr>
+          <p:cNvPr id="5" name="Picture 4"/>
+          <p:cNvPicPr>
+            <a:picLocks noChangeAspect="1"/>
+          </p:cNvPicPr>
+          <p:nvPr/>
+        </p:nvPicPr>
+        <p:blipFill>
+          <a:blip r:embed="rId4">
+            <a:extLst>
+              <a:ext uri="{28A0092B-C50C-407E-A947-70E740481C1C}">
+                <a14:useLocalDpi xmlns:a14="http://schemas.microsoft.com/office/drawing/2010/main" val="0"/>
+              </a:ext>
+            </a:extLst>
+          </a:blip>
+          <a:stretch>
+            <a:fillRect/>
+          </a:stretch>
+        </p:blipFill>
+        <p:spPr>
+          <a:xfrm>
+            <a:off x="4762" y="1548000"/>
+            <a:ext cx="9134475" cy="4733925"/>
+          </a:xfrm>
+          <a:prstGeom prst="rect">
+            <a:avLst/>
+          </a:prstGeom>
+        </p:spPr>
+      </p:pic>
     </p:spTree>
     <p:extLst>
       <p:ext uri="{BB962C8B-B14F-4D97-AF65-F5344CB8AC3E}">
-        <p14:creationId xmlns:p14="http://schemas.microsoft.com/office/powerpoint/2010/main" val="893865620"/>
+        <p14:creationId xmlns:p14="http://schemas.microsoft.com/office/powerpoint/2010/main" val="396525421"/>
       </p:ext>
     </p:extLst>
   </p:cSld>
@@ -12630,18 +13475,18 @@
       </p:sp>
       <p:sp>
         <p:nvSpPr>
-          <p:cNvPr id="96" name="Shape 96"/>
+          <p:cNvPr id="97" name="Shape 97"/>
           <p:cNvSpPr txBox="1">
             <a:spLocks noGrp="1"/>
           </p:cNvSpPr>
           <p:nvPr>
-            <p:ph type="body" idx="1"/>
-          </p:nvPr>
-        </p:nvSpPr>
-        <p:spPr>
-          <a:xfrm>
-            <a:off x="341167" y="937873"/>
-            <a:ext cx="8498033" cy="5024690"/>
+            <p:ph type="body" idx="2"/>
+          </p:nvPr>
+        </p:nvSpPr>
+        <p:spPr>
+          <a:xfrm>
+            <a:off x="341168" y="228026"/>
+            <a:ext cx="8498032" cy="457199"/>
           </a:xfrm>
           <a:prstGeom prst="rect">
             <a:avLst/>
@@ -12657,83 +13502,6 @@
           </a:bodyPr>
           <a:lstStyle/>
           <a:p>
-            <a:pPr marL="355600" indent="-355600">
-              <a:lnSpc>
-                <a:spcPct val="90000"/>
-              </a:lnSpc>
-              <a:buClr>
-                <a:srgbClr val="2E3640"/>
-              </a:buClr>
-              <a:buSzPct val="100000"/>
-              <a:buBlip>
-                <a:blip r:embed="rId3"/>
-              </a:buBlip>
-            </a:pPr>
-            <a:r>
-              <a:rPr lang="en-US" sz="2400" dirty="0" smtClean="0"/>
-              <a:t>stuff</a:t>
-            </a:r>
-            <a:endParaRPr lang="en-US" sz="2400" dirty="0" smtClean="0">
-              <a:sym typeface="Wingdings" panose="05000000000000000000" pitchFamily="2" charset="2"/>
-            </a:endParaRPr>
-          </a:p>
-          <a:p>
-            <a:pPr>
-              <a:lnSpc>
-                <a:spcPct val="90000"/>
-              </a:lnSpc>
-              <a:buClr>
-                <a:srgbClr val="2E3640"/>
-              </a:buClr>
-              <a:buSzPct val="100000"/>
-            </a:pPr>
-            <a:endParaRPr lang="en-US" sz="2400" dirty="0">
-              <a:sym typeface="Wingdings" panose="05000000000000000000" pitchFamily="2" charset="2"/>
-            </a:endParaRPr>
-          </a:p>
-          <a:p>
-            <a:pPr>
-              <a:lnSpc>
-                <a:spcPct val="90000"/>
-              </a:lnSpc>
-              <a:buClr>
-                <a:srgbClr val="2E3640"/>
-              </a:buClr>
-              <a:buSzPct val="100000"/>
-            </a:pPr>
-            <a:endParaRPr lang="en-US" sz="2400" dirty="0" smtClean="0"/>
-          </a:p>
-        </p:txBody>
-      </p:sp>
-      <p:sp>
-        <p:nvSpPr>
-          <p:cNvPr id="97" name="Shape 97"/>
-          <p:cNvSpPr txBox="1">
-            <a:spLocks noGrp="1"/>
-          </p:cNvSpPr>
-          <p:nvPr>
-            <p:ph type="body" idx="2"/>
-          </p:nvPr>
-        </p:nvSpPr>
-        <p:spPr>
-          <a:xfrm>
-            <a:off x="341168" y="228026"/>
-            <a:ext cx="8498032" cy="457199"/>
-          </a:xfrm>
-          <a:prstGeom prst="rect">
-            <a:avLst/>
-          </a:prstGeom>
-          <a:noFill/>
-          <a:ln>
-            <a:noFill/>
-          </a:ln>
-        </p:spPr>
-        <p:txBody>
-          <a:bodyPr lIns="68569" tIns="34275" rIns="68569" bIns="34275" anchor="t" anchorCtr="0">
-            <a:noAutofit/>
-          </a:bodyPr>
-          <a:lstStyle/>
-          <a:p>
             <a:pPr>
               <a:buClr>
                 <a:schemeClr val="accent2"/>
@@ -12742,16 +13510,54 @@
             </a:pPr>
             <a:r>
               <a:rPr lang="en-US" sz="3600" dirty="0" smtClean="0"/>
-              <a:t>Title</a:t>
+              <a:t>GIT push </a:t>
+            </a:r>
+            <a:r>
+              <a:rPr lang="en-US" sz="3600" dirty="0"/>
+              <a:t>/ success case / </a:t>
+            </a:r>
+            <a:r>
+              <a:rPr lang="en-US" sz="3600" dirty="0" smtClean="0"/>
+              <a:t>2 of 5</a:t>
             </a:r>
             <a:endParaRPr lang="en-US" sz="3600" dirty="0"/>
           </a:p>
         </p:txBody>
       </p:sp>
+      <p:pic>
+        <p:nvPicPr>
+          <p:cNvPr id="3" name="Picture 2"/>
+          <p:cNvPicPr>
+            <a:picLocks noChangeAspect="1"/>
+          </p:cNvPicPr>
+          <p:nvPr/>
+        </p:nvPicPr>
+        <p:blipFill>
+          <a:blip r:embed="rId3">
+            <a:extLst>
+              <a:ext uri="{28A0092B-C50C-407E-A947-70E740481C1C}">
+                <a14:useLocalDpi xmlns:a14="http://schemas.microsoft.com/office/drawing/2010/main" val="0"/>
+              </a:ext>
+            </a:extLst>
+          </a:blip>
+          <a:stretch>
+            <a:fillRect/>
+          </a:stretch>
+        </p:blipFill>
+        <p:spPr>
+          <a:xfrm>
+            <a:off x="4762" y="1548000"/>
+            <a:ext cx="9134475" cy="4733925"/>
+          </a:xfrm>
+          <a:prstGeom prst="rect">
+            <a:avLst/>
+          </a:prstGeom>
+        </p:spPr>
+      </p:pic>
     </p:spTree>
     <p:extLst>
       <p:ext uri="{BB962C8B-B14F-4D97-AF65-F5344CB8AC3E}">
-        <p14:creationId xmlns:p14="http://schemas.microsoft.com/office/powerpoint/2010/main" val="2176611703"/>
+        <p14:creationId xmlns:p14="http://schemas.microsoft.com/office/powerpoint/2010/main" val="3838144171"/>
       </p:ext>
     </p:extLst>
   </p:cSld>
@@ -12829,18 +13635,18 @@
       </p:sp>
       <p:sp>
         <p:nvSpPr>
-          <p:cNvPr id="96" name="Shape 96"/>
+          <p:cNvPr id="97" name="Shape 97"/>
           <p:cNvSpPr txBox="1">
             <a:spLocks noGrp="1"/>
           </p:cNvSpPr>
           <p:nvPr>
-            <p:ph type="body" idx="1"/>
-          </p:nvPr>
-        </p:nvSpPr>
-        <p:spPr>
-          <a:xfrm>
-            <a:off x="341167" y="937873"/>
-            <a:ext cx="8498033" cy="5024690"/>
+            <p:ph type="body" idx="2"/>
+          </p:nvPr>
+        </p:nvSpPr>
+        <p:spPr>
+          <a:xfrm>
+            <a:off x="341168" y="228026"/>
+            <a:ext cx="8498032" cy="457199"/>
           </a:xfrm>
           <a:prstGeom prst="rect">
             <a:avLst/>
@@ -12856,83 +13662,6 @@
           </a:bodyPr>
           <a:lstStyle/>
           <a:p>
-            <a:pPr marL="355600" indent="-355600">
-              <a:lnSpc>
-                <a:spcPct val="90000"/>
-              </a:lnSpc>
-              <a:buClr>
-                <a:srgbClr val="2E3640"/>
-              </a:buClr>
-              <a:buSzPct val="100000"/>
-              <a:buBlip>
-                <a:blip r:embed="rId3"/>
-              </a:buBlip>
-            </a:pPr>
-            <a:r>
-              <a:rPr lang="en-US" sz="2400" dirty="0" smtClean="0"/>
-              <a:t>stuff</a:t>
-            </a:r>
-            <a:endParaRPr lang="en-US" sz="2400" dirty="0" smtClean="0">
-              <a:sym typeface="Wingdings" panose="05000000000000000000" pitchFamily="2" charset="2"/>
-            </a:endParaRPr>
-          </a:p>
-          <a:p>
-            <a:pPr>
-              <a:lnSpc>
-                <a:spcPct val="90000"/>
-              </a:lnSpc>
-              <a:buClr>
-                <a:srgbClr val="2E3640"/>
-              </a:buClr>
-              <a:buSzPct val="100000"/>
-            </a:pPr>
-            <a:endParaRPr lang="en-US" sz="2400" dirty="0">
-              <a:sym typeface="Wingdings" panose="05000000000000000000" pitchFamily="2" charset="2"/>
-            </a:endParaRPr>
-          </a:p>
-          <a:p>
-            <a:pPr>
-              <a:lnSpc>
-                <a:spcPct val="90000"/>
-              </a:lnSpc>
-              <a:buClr>
-                <a:srgbClr val="2E3640"/>
-              </a:buClr>
-              <a:buSzPct val="100000"/>
-            </a:pPr>
-            <a:endParaRPr lang="en-US" sz="2400" dirty="0" smtClean="0"/>
-          </a:p>
-        </p:txBody>
-      </p:sp>
-      <p:sp>
-        <p:nvSpPr>
-          <p:cNvPr id="97" name="Shape 97"/>
-          <p:cNvSpPr txBox="1">
-            <a:spLocks noGrp="1"/>
-          </p:cNvSpPr>
-          <p:nvPr>
-            <p:ph type="body" idx="2"/>
-          </p:nvPr>
-        </p:nvSpPr>
-        <p:spPr>
-          <a:xfrm>
-            <a:off x="341168" y="228026"/>
-            <a:ext cx="8498032" cy="457199"/>
-          </a:xfrm>
-          <a:prstGeom prst="rect">
-            <a:avLst/>
-          </a:prstGeom>
-          <a:noFill/>
-          <a:ln>
-            <a:noFill/>
-          </a:ln>
-        </p:spPr>
-        <p:txBody>
-          <a:bodyPr lIns="68569" tIns="34275" rIns="68569" bIns="34275" anchor="t" anchorCtr="0">
-            <a:noAutofit/>
-          </a:bodyPr>
-          <a:lstStyle/>
-          <a:p>
             <a:pPr>
               <a:buClr>
                 <a:schemeClr val="accent2"/>
@@ -12941,16 +13670,54 @@
             </a:pPr>
             <a:r>
               <a:rPr lang="en-US" sz="3600" dirty="0" smtClean="0"/>
-              <a:t>Title</a:t>
+              <a:t>GIT push </a:t>
+            </a:r>
+            <a:r>
+              <a:rPr lang="en-US" sz="3600" dirty="0"/>
+              <a:t>/ success case / </a:t>
+            </a:r>
+            <a:r>
+              <a:rPr lang="en-US" sz="3600" dirty="0" smtClean="0"/>
+              <a:t>3 of 5</a:t>
             </a:r>
             <a:endParaRPr lang="en-US" sz="3600" dirty="0"/>
           </a:p>
         </p:txBody>
       </p:sp>
+      <p:pic>
+        <p:nvPicPr>
+          <p:cNvPr id="2" name="Picture 1"/>
+          <p:cNvPicPr>
+            <a:picLocks noChangeAspect="1"/>
+          </p:cNvPicPr>
+          <p:nvPr/>
+        </p:nvPicPr>
+        <p:blipFill>
+          <a:blip r:embed="rId3">
+            <a:extLst>
+              <a:ext uri="{28A0092B-C50C-407E-A947-70E740481C1C}">
+                <a14:useLocalDpi xmlns:a14="http://schemas.microsoft.com/office/drawing/2010/main" val="0"/>
+              </a:ext>
+            </a:extLst>
+          </a:blip>
+          <a:stretch>
+            <a:fillRect/>
+          </a:stretch>
+        </p:blipFill>
+        <p:spPr>
+          <a:xfrm>
+            <a:off x="4762" y="1548000"/>
+            <a:ext cx="9134475" cy="4733925"/>
+          </a:xfrm>
+          <a:prstGeom prst="rect">
+            <a:avLst/>
+          </a:prstGeom>
+        </p:spPr>
+      </p:pic>
     </p:spTree>
     <p:extLst>
       <p:ext uri="{BB962C8B-B14F-4D97-AF65-F5344CB8AC3E}">
-        <p14:creationId xmlns:p14="http://schemas.microsoft.com/office/powerpoint/2010/main" val="2978980850"/>
+        <p14:creationId xmlns:p14="http://schemas.microsoft.com/office/powerpoint/2010/main" val="1930106349"/>
       </p:ext>
     </p:extLst>
   </p:cSld>
@@ -13028,18 +13795,18 @@
       </p:sp>
       <p:sp>
         <p:nvSpPr>
-          <p:cNvPr id="96" name="Shape 96"/>
+          <p:cNvPr id="97" name="Shape 97"/>
           <p:cNvSpPr txBox="1">
             <a:spLocks noGrp="1"/>
           </p:cNvSpPr>
           <p:nvPr>
-            <p:ph type="body" idx="1"/>
-          </p:nvPr>
-        </p:nvSpPr>
-        <p:spPr>
-          <a:xfrm>
-            <a:off x="341167" y="937873"/>
-            <a:ext cx="8498033" cy="5024690"/>
+            <p:ph type="body" idx="2"/>
+          </p:nvPr>
+        </p:nvSpPr>
+        <p:spPr>
+          <a:xfrm>
+            <a:off x="341168" y="228026"/>
+            <a:ext cx="8498032" cy="457199"/>
           </a:xfrm>
           <a:prstGeom prst="rect">
             <a:avLst/>
@@ -13055,83 +13822,6 @@
           </a:bodyPr>
           <a:lstStyle/>
           <a:p>
-            <a:pPr marL="355600" indent="-355600">
-              <a:lnSpc>
-                <a:spcPct val="90000"/>
-              </a:lnSpc>
-              <a:buClr>
-                <a:srgbClr val="2E3640"/>
-              </a:buClr>
-              <a:buSzPct val="100000"/>
-              <a:buBlip>
-                <a:blip r:embed="rId3"/>
-              </a:buBlip>
-            </a:pPr>
-            <a:r>
-              <a:rPr lang="en-US" sz="2400" dirty="0" smtClean="0"/>
-              <a:t>stuff</a:t>
-            </a:r>
-            <a:endParaRPr lang="en-US" sz="2400" dirty="0" smtClean="0">
-              <a:sym typeface="Wingdings" panose="05000000000000000000" pitchFamily="2" charset="2"/>
-            </a:endParaRPr>
-          </a:p>
-          <a:p>
-            <a:pPr>
-              <a:lnSpc>
-                <a:spcPct val="90000"/>
-              </a:lnSpc>
-              <a:buClr>
-                <a:srgbClr val="2E3640"/>
-              </a:buClr>
-              <a:buSzPct val="100000"/>
-            </a:pPr>
-            <a:endParaRPr lang="en-US" sz="2400" dirty="0">
-              <a:sym typeface="Wingdings" panose="05000000000000000000" pitchFamily="2" charset="2"/>
-            </a:endParaRPr>
-          </a:p>
-          <a:p>
-            <a:pPr>
-              <a:lnSpc>
-                <a:spcPct val="90000"/>
-              </a:lnSpc>
-              <a:buClr>
-                <a:srgbClr val="2E3640"/>
-              </a:buClr>
-              <a:buSzPct val="100000"/>
-            </a:pPr>
-            <a:endParaRPr lang="en-US" sz="2400" dirty="0" smtClean="0"/>
-          </a:p>
-        </p:txBody>
-      </p:sp>
-      <p:sp>
-        <p:nvSpPr>
-          <p:cNvPr id="97" name="Shape 97"/>
-          <p:cNvSpPr txBox="1">
-            <a:spLocks noGrp="1"/>
-          </p:cNvSpPr>
-          <p:nvPr>
-            <p:ph type="body" idx="2"/>
-          </p:nvPr>
-        </p:nvSpPr>
-        <p:spPr>
-          <a:xfrm>
-            <a:off x="341168" y="228026"/>
-            <a:ext cx="8498032" cy="457199"/>
-          </a:xfrm>
-          <a:prstGeom prst="rect">
-            <a:avLst/>
-          </a:prstGeom>
-          <a:noFill/>
-          <a:ln>
-            <a:noFill/>
-          </a:ln>
-        </p:spPr>
-        <p:txBody>
-          <a:bodyPr lIns="68569" tIns="34275" rIns="68569" bIns="34275" anchor="t" anchorCtr="0">
-            <a:noAutofit/>
-          </a:bodyPr>
-          <a:lstStyle/>
-          <a:p>
             <a:pPr>
               <a:buClr>
                 <a:schemeClr val="accent2"/>
@@ -13140,16 +13830,54 @@
             </a:pPr>
             <a:r>
               <a:rPr lang="en-US" sz="3600" dirty="0" smtClean="0"/>
-              <a:t>Title</a:t>
+              <a:t>GIT push </a:t>
+            </a:r>
+            <a:r>
+              <a:rPr lang="en-US" sz="3600" dirty="0"/>
+              <a:t>/ success case / </a:t>
+            </a:r>
+            <a:r>
+              <a:rPr lang="en-US" sz="3600" dirty="0" smtClean="0"/>
+              <a:t>4 of 5</a:t>
             </a:r>
             <a:endParaRPr lang="en-US" sz="3600" dirty="0"/>
           </a:p>
         </p:txBody>
       </p:sp>
+      <p:pic>
+        <p:nvPicPr>
+          <p:cNvPr id="2" name="Picture 1"/>
+          <p:cNvPicPr>
+            <a:picLocks noChangeAspect="1"/>
+          </p:cNvPicPr>
+          <p:nvPr/>
+        </p:nvPicPr>
+        <p:blipFill>
+          <a:blip r:embed="rId3">
+            <a:extLst>
+              <a:ext uri="{28A0092B-C50C-407E-A947-70E740481C1C}">
+                <a14:useLocalDpi xmlns:a14="http://schemas.microsoft.com/office/drawing/2010/main" val="0"/>
+              </a:ext>
+            </a:extLst>
+          </a:blip>
+          <a:stretch>
+            <a:fillRect/>
+          </a:stretch>
+        </p:blipFill>
+        <p:spPr>
+          <a:xfrm>
+            <a:off x="4762" y="1548000"/>
+            <a:ext cx="9134475" cy="4733925"/>
+          </a:xfrm>
+          <a:prstGeom prst="rect">
+            <a:avLst/>
+          </a:prstGeom>
+        </p:spPr>
+      </p:pic>
     </p:spTree>
     <p:extLst>
       <p:ext uri="{BB962C8B-B14F-4D97-AF65-F5344CB8AC3E}">
-        <p14:creationId xmlns:p14="http://schemas.microsoft.com/office/powerpoint/2010/main" val="2675765428"/>
+        <p14:creationId xmlns:p14="http://schemas.microsoft.com/office/powerpoint/2010/main" val="2165262458"/>
       </p:ext>
     </p:extLst>
   </p:cSld>
@@ -13547,6 +14275,1161 @@
       </p:sp>
       <p:sp>
         <p:nvSpPr>
+          <p:cNvPr id="97" name="Shape 97"/>
+          <p:cNvSpPr txBox="1">
+            <a:spLocks noGrp="1"/>
+          </p:cNvSpPr>
+          <p:nvPr>
+            <p:ph type="body" idx="2"/>
+          </p:nvPr>
+        </p:nvSpPr>
+        <p:spPr>
+          <a:xfrm>
+            <a:off x="341168" y="228026"/>
+            <a:ext cx="8498032" cy="457199"/>
+          </a:xfrm>
+          <a:prstGeom prst="rect">
+            <a:avLst/>
+          </a:prstGeom>
+          <a:noFill/>
+          <a:ln>
+            <a:noFill/>
+          </a:ln>
+        </p:spPr>
+        <p:txBody>
+          <a:bodyPr lIns="68569" tIns="34275" rIns="68569" bIns="34275" anchor="t" anchorCtr="0">
+            <a:noAutofit/>
+          </a:bodyPr>
+          <a:lstStyle/>
+          <a:p>
+            <a:pPr>
+              <a:buClr>
+                <a:schemeClr val="accent2"/>
+              </a:buClr>
+              <a:buSzPct val="25000"/>
+            </a:pPr>
+            <a:r>
+              <a:rPr lang="en-US" sz="3600" dirty="0" smtClean="0"/>
+              <a:t>GIT push </a:t>
+            </a:r>
+            <a:r>
+              <a:rPr lang="en-US" sz="3600" dirty="0"/>
+              <a:t>/ success case / </a:t>
+            </a:r>
+            <a:r>
+              <a:rPr lang="en-US" sz="3600" dirty="0" smtClean="0"/>
+              <a:t>5 of 5</a:t>
+            </a:r>
+            <a:endParaRPr lang="en-US" sz="3600" dirty="0"/>
+          </a:p>
+        </p:txBody>
+      </p:sp>
+      <p:pic>
+        <p:nvPicPr>
+          <p:cNvPr id="2" name="Picture 1"/>
+          <p:cNvPicPr>
+            <a:picLocks noChangeAspect="1"/>
+          </p:cNvPicPr>
+          <p:nvPr/>
+        </p:nvPicPr>
+        <p:blipFill>
+          <a:blip r:embed="rId3">
+            <a:extLst>
+              <a:ext uri="{28A0092B-C50C-407E-A947-70E740481C1C}">
+                <a14:useLocalDpi xmlns:a14="http://schemas.microsoft.com/office/drawing/2010/main" val="0"/>
+              </a:ext>
+            </a:extLst>
+          </a:blip>
+          <a:stretch>
+            <a:fillRect/>
+          </a:stretch>
+        </p:blipFill>
+        <p:spPr>
+          <a:xfrm>
+            <a:off x="4762" y="1548000"/>
+            <a:ext cx="9134475" cy="4733925"/>
+          </a:xfrm>
+          <a:prstGeom prst="rect">
+            <a:avLst/>
+          </a:prstGeom>
+        </p:spPr>
+      </p:pic>
+    </p:spTree>
+    <p:extLst>
+      <p:ext uri="{BB962C8B-B14F-4D97-AF65-F5344CB8AC3E}">
+        <p14:creationId xmlns:p14="http://schemas.microsoft.com/office/powerpoint/2010/main" val="1440731541"/>
+      </p:ext>
+    </p:extLst>
+  </p:cSld>
+  <p:clrMapOvr>
+    <a:masterClrMapping/>
+  </p:clrMapOvr>
+  <p:transition spd="slow">
+    <p:cut/>
+  </p:transition>
+  <p:timing>
+    <p:tnLst>
+      <p:par>
+        <p:cTn id="1" dur="indefinite" restart="never" nodeType="tmRoot"/>
+      </p:par>
+    </p:tnLst>
+  </p:timing>
+</p:sld>
+</file>
+
+<file path=ppt/slides/slide31.xml><?xml version="1.0" encoding="utf-8"?>
+<p:sld xmlns:a="http://schemas.openxmlformats.org/drawingml/2006/main" xmlns:r="http://schemas.openxmlformats.org/officeDocument/2006/relationships" xmlns:p="http://schemas.openxmlformats.org/presentationml/2006/main">
+  <p:cSld>
+    <p:spTree>
+      <p:nvGrpSpPr>
+        <p:cNvPr id="1" name="Shape 93"/>
+        <p:cNvGrpSpPr/>
+        <p:nvPr/>
+      </p:nvGrpSpPr>
+      <p:grpSpPr>
+        <a:xfrm>
+          <a:off x="0" y="0"/>
+          <a:ext cx="0" cy="0"/>
+          <a:chOff x="0" y="0"/>
+          <a:chExt cx="0" cy="0"/>
+        </a:xfrm>
+      </p:grpSpPr>
+      <p:sp>
+        <p:nvSpPr>
+          <p:cNvPr id="95" name="Shape 95"/>
+          <p:cNvSpPr txBox="1">
+            <a:spLocks noGrp="1"/>
+          </p:cNvSpPr>
+          <p:nvPr>
+            <p:ph type="sldNum" idx="12"/>
+          </p:nvPr>
+        </p:nvSpPr>
+        <p:spPr>
+          <a:xfrm>
+            <a:off x="7600950" y="5688719"/>
+            <a:ext cx="269142" cy="273844"/>
+          </a:xfrm>
+          <a:prstGeom prst="rect">
+            <a:avLst/>
+          </a:prstGeom>
+          <a:noFill/>
+          <a:ln>
+            <a:noFill/>
+          </a:ln>
+        </p:spPr>
+        <p:txBody>
+          <a:bodyPr lIns="68569" tIns="34275" rIns="68569" bIns="34275" anchor="ctr" anchorCtr="0">
+            <a:noAutofit/>
+          </a:bodyPr>
+          <a:lstStyle/>
+          <a:p>
+            <a:pPr>
+              <a:buSzPct val="25000"/>
+            </a:pPr>
+            <a:r>
+              <a:rPr lang="en-US"/>
+              <a:t> </a:t>
+            </a:r>
+          </a:p>
+        </p:txBody>
+      </p:sp>
+      <p:sp>
+        <p:nvSpPr>
+          <p:cNvPr id="96" name="Shape 96"/>
+          <p:cNvSpPr txBox="1">
+            <a:spLocks noGrp="1"/>
+          </p:cNvSpPr>
+          <p:nvPr>
+            <p:ph type="body" idx="1"/>
+          </p:nvPr>
+        </p:nvSpPr>
+        <p:spPr>
+          <a:xfrm>
+            <a:off x="341167" y="937873"/>
+            <a:ext cx="8498033" cy="5024690"/>
+          </a:xfrm>
+          <a:prstGeom prst="rect">
+            <a:avLst/>
+          </a:prstGeom>
+          <a:noFill/>
+          <a:ln>
+            <a:noFill/>
+          </a:ln>
+        </p:spPr>
+        <p:txBody>
+          <a:bodyPr lIns="68569" tIns="34275" rIns="68569" bIns="34275" anchor="t" anchorCtr="0">
+            <a:noAutofit/>
+          </a:bodyPr>
+          <a:lstStyle/>
+          <a:p>
+            <a:pPr marL="355600" indent="-355600">
+              <a:lnSpc>
+                <a:spcPct val="90000"/>
+              </a:lnSpc>
+              <a:buClr>
+                <a:srgbClr val="2E3640"/>
+              </a:buClr>
+              <a:buSzPct val="100000"/>
+              <a:buBlip>
+                <a:blip r:embed="rId3"/>
+              </a:buBlip>
+            </a:pPr>
+            <a:r>
+              <a:rPr lang="en-US" sz="2400" dirty="0" smtClean="0"/>
+              <a:t>stuff</a:t>
+            </a:r>
+            <a:endParaRPr lang="en-US" sz="2400" dirty="0" smtClean="0">
+              <a:sym typeface="Wingdings" panose="05000000000000000000" pitchFamily="2" charset="2"/>
+            </a:endParaRPr>
+          </a:p>
+          <a:p>
+            <a:pPr>
+              <a:lnSpc>
+                <a:spcPct val="90000"/>
+              </a:lnSpc>
+              <a:buClr>
+                <a:srgbClr val="2E3640"/>
+              </a:buClr>
+              <a:buSzPct val="100000"/>
+            </a:pPr>
+            <a:endParaRPr lang="en-US" sz="2400" dirty="0">
+              <a:sym typeface="Wingdings" panose="05000000000000000000" pitchFamily="2" charset="2"/>
+            </a:endParaRPr>
+          </a:p>
+          <a:p>
+            <a:pPr>
+              <a:lnSpc>
+                <a:spcPct val="90000"/>
+              </a:lnSpc>
+              <a:buClr>
+                <a:srgbClr val="2E3640"/>
+              </a:buClr>
+              <a:buSzPct val="100000"/>
+            </a:pPr>
+            <a:endParaRPr lang="en-US" sz="2400" dirty="0" smtClean="0"/>
+          </a:p>
+        </p:txBody>
+      </p:sp>
+      <p:sp>
+        <p:nvSpPr>
+          <p:cNvPr id="97" name="Shape 97"/>
+          <p:cNvSpPr txBox="1">
+            <a:spLocks noGrp="1"/>
+          </p:cNvSpPr>
+          <p:nvPr>
+            <p:ph type="body" idx="2"/>
+          </p:nvPr>
+        </p:nvSpPr>
+        <p:spPr>
+          <a:xfrm>
+            <a:off x="341168" y="228026"/>
+            <a:ext cx="8498032" cy="457199"/>
+          </a:xfrm>
+          <a:prstGeom prst="rect">
+            <a:avLst/>
+          </a:prstGeom>
+          <a:noFill/>
+          <a:ln>
+            <a:noFill/>
+          </a:ln>
+        </p:spPr>
+        <p:txBody>
+          <a:bodyPr lIns="68569" tIns="34275" rIns="68569" bIns="34275" anchor="t" anchorCtr="0">
+            <a:noAutofit/>
+          </a:bodyPr>
+          <a:lstStyle/>
+          <a:p>
+            <a:pPr>
+              <a:buClr>
+                <a:schemeClr val="accent2"/>
+              </a:buClr>
+              <a:buSzPct val="25000"/>
+            </a:pPr>
+            <a:r>
+              <a:rPr lang="en-US" sz="3600" dirty="0" smtClean="0"/>
+              <a:t>Title</a:t>
+            </a:r>
+            <a:endParaRPr lang="en-US" sz="3600" dirty="0"/>
+          </a:p>
+        </p:txBody>
+      </p:sp>
+    </p:spTree>
+    <p:extLst>
+      <p:ext uri="{BB962C8B-B14F-4D97-AF65-F5344CB8AC3E}">
+        <p14:creationId xmlns:p14="http://schemas.microsoft.com/office/powerpoint/2010/main" val="2915095849"/>
+      </p:ext>
+    </p:extLst>
+  </p:cSld>
+  <p:clrMapOvr>
+    <a:masterClrMapping/>
+  </p:clrMapOvr>
+  <p:transition spd="slow">
+    <p:cut/>
+  </p:transition>
+  <p:timing>
+    <p:tnLst>
+      <p:par>
+        <p:cTn id="1" dur="indefinite" restart="never" nodeType="tmRoot"/>
+      </p:par>
+    </p:tnLst>
+  </p:timing>
+</p:sld>
+</file>
+
+<file path=ppt/slides/slide32.xml><?xml version="1.0" encoding="utf-8"?>
+<p:sld xmlns:a="http://schemas.openxmlformats.org/drawingml/2006/main" xmlns:r="http://schemas.openxmlformats.org/officeDocument/2006/relationships" xmlns:p="http://schemas.openxmlformats.org/presentationml/2006/main">
+  <p:cSld>
+    <p:spTree>
+      <p:nvGrpSpPr>
+        <p:cNvPr id="1" name="Shape 93"/>
+        <p:cNvGrpSpPr/>
+        <p:nvPr/>
+      </p:nvGrpSpPr>
+      <p:grpSpPr>
+        <a:xfrm>
+          <a:off x="0" y="0"/>
+          <a:ext cx="0" cy="0"/>
+          <a:chOff x="0" y="0"/>
+          <a:chExt cx="0" cy="0"/>
+        </a:xfrm>
+      </p:grpSpPr>
+      <p:sp>
+        <p:nvSpPr>
+          <p:cNvPr id="95" name="Shape 95"/>
+          <p:cNvSpPr txBox="1">
+            <a:spLocks noGrp="1"/>
+          </p:cNvSpPr>
+          <p:nvPr>
+            <p:ph type="sldNum" idx="12"/>
+          </p:nvPr>
+        </p:nvSpPr>
+        <p:spPr>
+          <a:xfrm>
+            <a:off x="7600950" y="5688719"/>
+            <a:ext cx="269142" cy="273844"/>
+          </a:xfrm>
+          <a:prstGeom prst="rect">
+            <a:avLst/>
+          </a:prstGeom>
+          <a:noFill/>
+          <a:ln>
+            <a:noFill/>
+          </a:ln>
+        </p:spPr>
+        <p:txBody>
+          <a:bodyPr lIns="68569" tIns="34275" rIns="68569" bIns="34275" anchor="ctr" anchorCtr="0">
+            <a:noAutofit/>
+          </a:bodyPr>
+          <a:lstStyle/>
+          <a:p>
+            <a:pPr>
+              <a:buSzPct val="25000"/>
+            </a:pPr>
+            <a:r>
+              <a:rPr lang="en-US"/>
+              <a:t> </a:t>
+            </a:r>
+          </a:p>
+        </p:txBody>
+      </p:sp>
+      <p:sp>
+        <p:nvSpPr>
+          <p:cNvPr id="96" name="Shape 96"/>
+          <p:cNvSpPr txBox="1">
+            <a:spLocks noGrp="1"/>
+          </p:cNvSpPr>
+          <p:nvPr>
+            <p:ph type="body" idx="1"/>
+          </p:nvPr>
+        </p:nvSpPr>
+        <p:spPr>
+          <a:xfrm>
+            <a:off x="341167" y="937873"/>
+            <a:ext cx="8498033" cy="5024690"/>
+          </a:xfrm>
+          <a:prstGeom prst="rect">
+            <a:avLst/>
+          </a:prstGeom>
+          <a:noFill/>
+          <a:ln>
+            <a:noFill/>
+          </a:ln>
+        </p:spPr>
+        <p:txBody>
+          <a:bodyPr lIns="68569" tIns="34275" rIns="68569" bIns="34275" anchor="t" anchorCtr="0">
+            <a:noAutofit/>
+          </a:bodyPr>
+          <a:lstStyle/>
+          <a:p>
+            <a:pPr marL="355600" indent="-355600">
+              <a:lnSpc>
+                <a:spcPct val="90000"/>
+              </a:lnSpc>
+              <a:buClr>
+                <a:srgbClr val="2E3640"/>
+              </a:buClr>
+              <a:buSzPct val="100000"/>
+              <a:buBlip>
+                <a:blip r:embed="rId3"/>
+              </a:buBlip>
+            </a:pPr>
+            <a:r>
+              <a:rPr lang="en-US" sz="2400" dirty="0" smtClean="0"/>
+              <a:t>stuff</a:t>
+            </a:r>
+            <a:endParaRPr lang="en-US" sz="2400" dirty="0" smtClean="0">
+              <a:sym typeface="Wingdings" panose="05000000000000000000" pitchFamily="2" charset="2"/>
+            </a:endParaRPr>
+          </a:p>
+          <a:p>
+            <a:pPr>
+              <a:lnSpc>
+                <a:spcPct val="90000"/>
+              </a:lnSpc>
+              <a:buClr>
+                <a:srgbClr val="2E3640"/>
+              </a:buClr>
+              <a:buSzPct val="100000"/>
+            </a:pPr>
+            <a:endParaRPr lang="en-US" sz="2400" dirty="0">
+              <a:sym typeface="Wingdings" panose="05000000000000000000" pitchFamily="2" charset="2"/>
+            </a:endParaRPr>
+          </a:p>
+          <a:p>
+            <a:pPr>
+              <a:lnSpc>
+                <a:spcPct val="90000"/>
+              </a:lnSpc>
+              <a:buClr>
+                <a:srgbClr val="2E3640"/>
+              </a:buClr>
+              <a:buSzPct val="100000"/>
+            </a:pPr>
+            <a:endParaRPr lang="en-US" sz="2400" dirty="0" smtClean="0"/>
+          </a:p>
+        </p:txBody>
+      </p:sp>
+      <p:sp>
+        <p:nvSpPr>
+          <p:cNvPr id="97" name="Shape 97"/>
+          <p:cNvSpPr txBox="1">
+            <a:spLocks noGrp="1"/>
+          </p:cNvSpPr>
+          <p:nvPr>
+            <p:ph type="body" idx="2"/>
+          </p:nvPr>
+        </p:nvSpPr>
+        <p:spPr>
+          <a:xfrm>
+            <a:off x="341168" y="228026"/>
+            <a:ext cx="8498032" cy="457199"/>
+          </a:xfrm>
+          <a:prstGeom prst="rect">
+            <a:avLst/>
+          </a:prstGeom>
+          <a:noFill/>
+          <a:ln>
+            <a:noFill/>
+          </a:ln>
+        </p:spPr>
+        <p:txBody>
+          <a:bodyPr lIns="68569" tIns="34275" rIns="68569" bIns="34275" anchor="t" anchorCtr="0">
+            <a:noAutofit/>
+          </a:bodyPr>
+          <a:lstStyle/>
+          <a:p>
+            <a:pPr>
+              <a:buClr>
+                <a:schemeClr val="accent2"/>
+              </a:buClr>
+              <a:buSzPct val="25000"/>
+            </a:pPr>
+            <a:r>
+              <a:rPr lang="en-US" sz="3600" dirty="0" smtClean="0"/>
+              <a:t>Title</a:t>
+            </a:r>
+            <a:endParaRPr lang="en-US" sz="3600" dirty="0"/>
+          </a:p>
+        </p:txBody>
+      </p:sp>
+    </p:spTree>
+    <p:extLst>
+      <p:ext uri="{BB962C8B-B14F-4D97-AF65-F5344CB8AC3E}">
+        <p14:creationId xmlns:p14="http://schemas.microsoft.com/office/powerpoint/2010/main" val="893865620"/>
+      </p:ext>
+    </p:extLst>
+  </p:cSld>
+  <p:clrMapOvr>
+    <a:masterClrMapping/>
+  </p:clrMapOvr>
+  <p:transition spd="slow">
+    <p:cut/>
+  </p:transition>
+  <p:timing>
+    <p:tnLst>
+      <p:par>
+        <p:cTn id="1" dur="indefinite" restart="never" nodeType="tmRoot"/>
+      </p:par>
+    </p:tnLst>
+  </p:timing>
+</p:sld>
+</file>
+
+<file path=ppt/slides/slide33.xml><?xml version="1.0" encoding="utf-8"?>
+<p:sld xmlns:a="http://schemas.openxmlformats.org/drawingml/2006/main" xmlns:r="http://schemas.openxmlformats.org/officeDocument/2006/relationships" xmlns:p="http://schemas.openxmlformats.org/presentationml/2006/main">
+  <p:cSld>
+    <p:spTree>
+      <p:nvGrpSpPr>
+        <p:cNvPr id="1" name="Shape 93"/>
+        <p:cNvGrpSpPr/>
+        <p:nvPr/>
+      </p:nvGrpSpPr>
+      <p:grpSpPr>
+        <a:xfrm>
+          <a:off x="0" y="0"/>
+          <a:ext cx="0" cy="0"/>
+          <a:chOff x="0" y="0"/>
+          <a:chExt cx="0" cy="0"/>
+        </a:xfrm>
+      </p:grpSpPr>
+      <p:sp>
+        <p:nvSpPr>
+          <p:cNvPr id="95" name="Shape 95"/>
+          <p:cNvSpPr txBox="1">
+            <a:spLocks noGrp="1"/>
+          </p:cNvSpPr>
+          <p:nvPr>
+            <p:ph type="sldNum" idx="12"/>
+          </p:nvPr>
+        </p:nvSpPr>
+        <p:spPr>
+          <a:xfrm>
+            <a:off x="7600950" y="5688719"/>
+            <a:ext cx="269142" cy="273844"/>
+          </a:xfrm>
+          <a:prstGeom prst="rect">
+            <a:avLst/>
+          </a:prstGeom>
+          <a:noFill/>
+          <a:ln>
+            <a:noFill/>
+          </a:ln>
+        </p:spPr>
+        <p:txBody>
+          <a:bodyPr lIns="68569" tIns="34275" rIns="68569" bIns="34275" anchor="ctr" anchorCtr="0">
+            <a:noAutofit/>
+          </a:bodyPr>
+          <a:lstStyle/>
+          <a:p>
+            <a:pPr>
+              <a:buSzPct val="25000"/>
+            </a:pPr>
+            <a:r>
+              <a:rPr lang="en-US"/>
+              <a:t> </a:t>
+            </a:r>
+          </a:p>
+        </p:txBody>
+      </p:sp>
+      <p:sp>
+        <p:nvSpPr>
+          <p:cNvPr id="96" name="Shape 96"/>
+          <p:cNvSpPr txBox="1">
+            <a:spLocks noGrp="1"/>
+          </p:cNvSpPr>
+          <p:nvPr>
+            <p:ph type="body" idx="1"/>
+          </p:nvPr>
+        </p:nvSpPr>
+        <p:spPr>
+          <a:xfrm>
+            <a:off x="341167" y="937873"/>
+            <a:ext cx="8498033" cy="5024690"/>
+          </a:xfrm>
+          <a:prstGeom prst="rect">
+            <a:avLst/>
+          </a:prstGeom>
+          <a:noFill/>
+          <a:ln>
+            <a:noFill/>
+          </a:ln>
+        </p:spPr>
+        <p:txBody>
+          <a:bodyPr lIns="68569" tIns="34275" rIns="68569" bIns="34275" anchor="t" anchorCtr="0">
+            <a:noAutofit/>
+          </a:bodyPr>
+          <a:lstStyle/>
+          <a:p>
+            <a:pPr marL="355600" indent="-355600">
+              <a:lnSpc>
+                <a:spcPct val="90000"/>
+              </a:lnSpc>
+              <a:buClr>
+                <a:srgbClr val="2E3640"/>
+              </a:buClr>
+              <a:buSzPct val="100000"/>
+              <a:buBlip>
+                <a:blip r:embed="rId3"/>
+              </a:buBlip>
+            </a:pPr>
+            <a:r>
+              <a:rPr lang="en-US" sz="2400" dirty="0" smtClean="0"/>
+              <a:t>stuff</a:t>
+            </a:r>
+            <a:endParaRPr lang="en-US" sz="2400" dirty="0" smtClean="0">
+              <a:sym typeface="Wingdings" panose="05000000000000000000" pitchFamily="2" charset="2"/>
+            </a:endParaRPr>
+          </a:p>
+          <a:p>
+            <a:pPr>
+              <a:lnSpc>
+                <a:spcPct val="90000"/>
+              </a:lnSpc>
+              <a:buClr>
+                <a:srgbClr val="2E3640"/>
+              </a:buClr>
+              <a:buSzPct val="100000"/>
+            </a:pPr>
+            <a:endParaRPr lang="en-US" sz="2400" dirty="0">
+              <a:sym typeface="Wingdings" panose="05000000000000000000" pitchFamily="2" charset="2"/>
+            </a:endParaRPr>
+          </a:p>
+          <a:p>
+            <a:pPr>
+              <a:lnSpc>
+                <a:spcPct val="90000"/>
+              </a:lnSpc>
+              <a:buClr>
+                <a:srgbClr val="2E3640"/>
+              </a:buClr>
+              <a:buSzPct val="100000"/>
+            </a:pPr>
+            <a:endParaRPr lang="en-US" sz="2400" dirty="0" smtClean="0"/>
+          </a:p>
+        </p:txBody>
+      </p:sp>
+      <p:sp>
+        <p:nvSpPr>
+          <p:cNvPr id="97" name="Shape 97"/>
+          <p:cNvSpPr txBox="1">
+            <a:spLocks noGrp="1"/>
+          </p:cNvSpPr>
+          <p:nvPr>
+            <p:ph type="body" idx="2"/>
+          </p:nvPr>
+        </p:nvSpPr>
+        <p:spPr>
+          <a:xfrm>
+            <a:off x="341168" y="228026"/>
+            <a:ext cx="8498032" cy="457199"/>
+          </a:xfrm>
+          <a:prstGeom prst="rect">
+            <a:avLst/>
+          </a:prstGeom>
+          <a:noFill/>
+          <a:ln>
+            <a:noFill/>
+          </a:ln>
+        </p:spPr>
+        <p:txBody>
+          <a:bodyPr lIns="68569" tIns="34275" rIns="68569" bIns="34275" anchor="t" anchorCtr="0">
+            <a:noAutofit/>
+          </a:bodyPr>
+          <a:lstStyle/>
+          <a:p>
+            <a:pPr>
+              <a:buClr>
+                <a:schemeClr val="accent2"/>
+              </a:buClr>
+              <a:buSzPct val="25000"/>
+            </a:pPr>
+            <a:r>
+              <a:rPr lang="en-US" sz="3600" dirty="0" smtClean="0"/>
+              <a:t>Title</a:t>
+            </a:r>
+            <a:endParaRPr lang="en-US" sz="3600" dirty="0"/>
+          </a:p>
+        </p:txBody>
+      </p:sp>
+    </p:spTree>
+    <p:extLst>
+      <p:ext uri="{BB962C8B-B14F-4D97-AF65-F5344CB8AC3E}">
+        <p14:creationId xmlns:p14="http://schemas.microsoft.com/office/powerpoint/2010/main" val="2176611703"/>
+      </p:ext>
+    </p:extLst>
+  </p:cSld>
+  <p:clrMapOvr>
+    <a:masterClrMapping/>
+  </p:clrMapOvr>
+  <p:transition spd="slow">
+    <p:cut/>
+  </p:transition>
+  <p:timing>
+    <p:tnLst>
+      <p:par>
+        <p:cTn id="1" dur="indefinite" restart="never" nodeType="tmRoot"/>
+      </p:par>
+    </p:tnLst>
+  </p:timing>
+</p:sld>
+</file>
+
+<file path=ppt/slides/slide34.xml><?xml version="1.0" encoding="utf-8"?>
+<p:sld xmlns:a="http://schemas.openxmlformats.org/drawingml/2006/main" xmlns:r="http://schemas.openxmlformats.org/officeDocument/2006/relationships" xmlns:p="http://schemas.openxmlformats.org/presentationml/2006/main">
+  <p:cSld>
+    <p:spTree>
+      <p:nvGrpSpPr>
+        <p:cNvPr id="1" name="Shape 93"/>
+        <p:cNvGrpSpPr/>
+        <p:nvPr/>
+      </p:nvGrpSpPr>
+      <p:grpSpPr>
+        <a:xfrm>
+          <a:off x="0" y="0"/>
+          <a:ext cx="0" cy="0"/>
+          <a:chOff x="0" y="0"/>
+          <a:chExt cx="0" cy="0"/>
+        </a:xfrm>
+      </p:grpSpPr>
+      <p:sp>
+        <p:nvSpPr>
+          <p:cNvPr id="95" name="Shape 95"/>
+          <p:cNvSpPr txBox="1">
+            <a:spLocks noGrp="1"/>
+          </p:cNvSpPr>
+          <p:nvPr>
+            <p:ph type="sldNum" idx="12"/>
+          </p:nvPr>
+        </p:nvSpPr>
+        <p:spPr>
+          <a:xfrm>
+            <a:off x="7600950" y="5688719"/>
+            <a:ext cx="269142" cy="273844"/>
+          </a:xfrm>
+          <a:prstGeom prst="rect">
+            <a:avLst/>
+          </a:prstGeom>
+          <a:noFill/>
+          <a:ln>
+            <a:noFill/>
+          </a:ln>
+        </p:spPr>
+        <p:txBody>
+          <a:bodyPr lIns="68569" tIns="34275" rIns="68569" bIns="34275" anchor="ctr" anchorCtr="0">
+            <a:noAutofit/>
+          </a:bodyPr>
+          <a:lstStyle/>
+          <a:p>
+            <a:pPr>
+              <a:buSzPct val="25000"/>
+            </a:pPr>
+            <a:r>
+              <a:rPr lang="en-US"/>
+              <a:t> </a:t>
+            </a:r>
+          </a:p>
+        </p:txBody>
+      </p:sp>
+      <p:sp>
+        <p:nvSpPr>
+          <p:cNvPr id="96" name="Shape 96"/>
+          <p:cNvSpPr txBox="1">
+            <a:spLocks noGrp="1"/>
+          </p:cNvSpPr>
+          <p:nvPr>
+            <p:ph type="body" idx="1"/>
+          </p:nvPr>
+        </p:nvSpPr>
+        <p:spPr>
+          <a:xfrm>
+            <a:off x="341167" y="937873"/>
+            <a:ext cx="8498033" cy="5024690"/>
+          </a:xfrm>
+          <a:prstGeom prst="rect">
+            <a:avLst/>
+          </a:prstGeom>
+          <a:noFill/>
+          <a:ln>
+            <a:noFill/>
+          </a:ln>
+        </p:spPr>
+        <p:txBody>
+          <a:bodyPr lIns="68569" tIns="34275" rIns="68569" bIns="34275" anchor="t" anchorCtr="0">
+            <a:noAutofit/>
+          </a:bodyPr>
+          <a:lstStyle/>
+          <a:p>
+            <a:pPr marL="355600" indent="-355600">
+              <a:lnSpc>
+                <a:spcPct val="90000"/>
+              </a:lnSpc>
+              <a:buClr>
+                <a:srgbClr val="2E3640"/>
+              </a:buClr>
+              <a:buSzPct val="100000"/>
+              <a:buBlip>
+                <a:blip r:embed="rId3"/>
+              </a:buBlip>
+            </a:pPr>
+            <a:r>
+              <a:rPr lang="en-US" sz="2400" dirty="0" smtClean="0"/>
+              <a:t>stuff</a:t>
+            </a:r>
+            <a:endParaRPr lang="en-US" sz="2400" dirty="0" smtClean="0">
+              <a:sym typeface="Wingdings" panose="05000000000000000000" pitchFamily="2" charset="2"/>
+            </a:endParaRPr>
+          </a:p>
+          <a:p>
+            <a:pPr>
+              <a:lnSpc>
+                <a:spcPct val="90000"/>
+              </a:lnSpc>
+              <a:buClr>
+                <a:srgbClr val="2E3640"/>
+              </a:buClr>
+              <a:buSzPct val="100000"/>
+            </a:pPr>
+            <a:endParaRPr lang="en-US" sz="2400" dirty="0">
+              <a:sym typeface="Wingdings" panose="05000000000000000000" pitchFamily="2" charset="2"/>
+            </a:endParaRPr>
+          </a:p>
+          <a:p>
+            <a:pPr>
+              <a:lnSpc>
+                <a:spcPct val="90000"/>
+              </a:lnSpc>
+              <a:buClr>
+                <a:srgbClr val="2E3640"/>
+              </a:buClr>
+              <a:buSzPct val="100000"/>
+            </a:pPr>
+            <a:endParaRPr lang="en-US" sz="2400" dirty="0" smtClean="0"/>
+          </a:p>
+        </p:txBody>
+      </p:sp>
+      <p:sp>
+        <p:nvSpPr>
+          <p:cNvPr id="97" name="Shape 97"/>
+          <p:cNvSpPr txBox="1">
+            <a:spLocks noGrp="1"/>
+          </p:cNvSpPr>
+          <p:nvPr>
+            <p:ph type="body" idx="2"/>
+          </p:nvPr>
+        </p:nvSpPr>
+        <p:spPr>
+          <a:xfrm>
+            <a:off x="341168" y="228026"/>
+            <a:ext cx="8498032" cy="457199"/>
+          </a:xfrm>
+          <a:prstGeom prst="rect">
+            <a:avLst/>
+          </a:prstGeom>
+          <a:noFill/>
+          <a:ln>
+            <a:noFill/>
+          </a:ln>
+        </p:spPr>
+        <p:txBody>
+          <a:bodyPr lIns="68569" tIns="34275" rIns="68569" bIns="34275" anchor="t" anchorCtr="0">
+            <a:noAutofit/>
+          </a:bodyPr>
+          <a:lstStyle/>
+          <a:p>
+            <a:pPr>
+              <a:buClr>
+                <a:schemeClr val="accent2"/>
+              </a:buClr>
+              <a:buSzPct val="25000"/>
+            </a:pPr>
+            <a:r>
+              <a:rPr lang="en-US" sz="3600" dirty="0" smtClean="0"/>
+              <a:t>Title</a:t>
+            </a:r>
+            <a:endParaRPr lang="en-US" sz="3600" dirty="0"/>
+          </a:p>
+        </p:txBody>
+      </p:sp>
+    </p:spTree>
+    <p:extLst>
+      <p:ext uri="{BB962C8B-B14F-4D97-AF65-F5344CB8AC3E}">
+        <p14:creationId xmlns:p14="http://schemas.microsoft.com/office/powerpoint/2010/main" val="2978980850"/>
+      </p:ext>
+    </p:extLst>
+  </p:cSld>
+  <p:clrMapOvr>
+    <a:masterClrMapping/>
+  </p:clrMapOvr>
+  <p:transition spd="slow">
+    <p:cut/>
+  </p:transition>
+  <p:timing>
+    <p:tnLst>
+      <p:par>
+        <p:cTn id="1" dur="indefinite" restart="never" nodeType="tmRoot"/>
+      </p:par>
+    </p:tnLst>
+  </p:timing>
+</p:sld>
+</file>
+
+<file path=ppt/slides/slide35.xml><?xml version="1.0" encoding="utf-8"?>
+<p:sld xmlns:a="http://schemas.openxmlformats.org/drawingml/2006/main" xmlns:r="http://schemas.openxmlformats.org/officeDocument/2006/relationships" xmlns:p="http://schemas.openxmlformats.org/presentationml/2006/main">
+  <p:cSld>
+    <p:spTree>
+      <p:nvGrpSpPr>
+        <p:cNvPr id="1" name="Shape 93"/>
+        <p:cNvGrpSpPr/>
+        <p:nvPr/>
+      </p:nvGrpSpPr>
+      <p:grpSpPr>
+        <a:xfrm>
+          <a:off x="0" y="0"/>
+          <a:ext cx="0" cy="0"/>
+          <a:chOff x="0" y="0"/>
+          <a:chExt cx="0" cy="0"/>
+        </a:xfrm>
+      </p:grpSpPr>
+      <p:sp>
+        <p:nvSpPr>
+          <p:cNvPr id="95" name="Shape 95"/>
+          <p:cNvSpPr txBox="1">
+            <a:spLocks noGrp="1"/>
+          </p:cNvSpPr>
+          <p:nvPr>
+            <p:ph type="sldNum" idx="12"/>
+          </p:nvPr>
+        </p:nvSpPr>
+        <p:spPr>
+          <a:xfrm>
+            <a:off x="7600950" y="5688719"/>
+            <a:ext cx="269142" cy="273844"/>
+          </a:xfrm>
+          <a:prstGeom prst="rect">
+            <a:avLst/>
+          </a:prstGeom>
+          <a:noFill/>
+          <a:ln>
+            <a:noFill/>
+          </a:ln>
+        </p:spPr>
+        <p:txBody>
+          <a:bodyPr lIns="68569" tIns="34275" rIns="68569" bIns="34275" anchor="ctr" anchorCtr="0">
+            <a:noAutofit/>
+          </a:bodyPr>
+          <a:lstStyle/>
+          <a:p>
+            <a:pPr>
+              <a:buSzPct val="25000"/>
+            </a:pPr>
+            <a:r>
+              <a:rPr lang="en-US"/>
+              <a:t> </a:t>
+            </a:r>
+          </a:p>
+        </p:txBody>
+      </p:sp>
+      <p:sp>
+        <p:nvSpPr>
+          <p:cNvPr id="96" name="Shape 96"/>
+          <p:cNvSpPr txBox="1">
+            <a:spLocks noGrp="1"/>
+          </p:cNvSpPr>
+          <p:nvPr>
+            <p:ph type="body" idx="1"/>
+          </p:nvPr>
+        </p:nvSpPr>
+        <p:spPr>
+          <a:xfrm>
+            <a:off x="341167" y="937873"/>
+            <a:ext cx="8498033" cy="5024690"/>
+          </a:xfrm>
+          <a:prstGeom prst="rect">
+            <a:avLst/>
+          </a:prstGeom>
+          <a:noFill/>
+          <a:ln>
+            <a:noFill/>
+          </a:ln>
+        </p:spPr>
+        <p:txBody>
+          <a:bodyPr lIns="68569" tIns="34275" rIns="68569" bIns="34275" anchor="t" anchorCtr="0">
+            <a:noAutofit/>
+          </a:bodyPr>
+          <a:lstStyle/>
+          <a:p>
+            <a:pPr marL="355600" indent="-355600">
+              <a:lnSpc>
+                <a:spcPct val="90000"/>
+              </a:lnSpc>
+              <a:buClr>
+                <a:srgbClr val="2E3640"/>
+              </a:buClr>
+              <a:buSzPct val="100000"/>
+              <a:buBlip>
+                <a:blip r:embed="rId3"/>
+              </a:buBlip>
+            </a:pPr>
+            <a:r>
+              <a:rPr lang="en-US" sz="2400" dirty="0" smtClean="0"/>
+              <a:t>stuff</a:t>
+            </a:r>
+            <a:endParaRPr lang="en-US" sz="2400" dirty="0" smtClean="0">
+              <a:sym typeface="Wingdings" panose="05000000000000000000" pitchFamily="2" charset="2"/>
+            </a:endParaRPr>
+          </a:p>
+          <a:p>
+            <a:pPr>
+              <a:lnSpc>
+                <a:spcPct val="90000"/>
+              </a:lnSpc>
+              <a:buClr>
+                <a:srgbClr val="2E3640"/>
+              </a:buClr>
+              <a:buSzPct val="100000"/>
+            </a:pPr>
+            <a:endParaRPr lang="en-US" sz="2400" dirty="0">
+              <a:sym typeface="Wingdings" panose="05000000000000000000" pitchFamily="2" charset="2"/>
+            </a:endParaRPr>
+          </a:p>
+          <a:p>
+            <a:pPr>
+              <a:lnSpc>
+                <a:spcPct val="90000"/>
+              </a:lnSpc>
+              <a:buClr>
+                <a:srgbClr val="2E3640"/>
+              </a:buClr>
+              <a:buSzPct val="100000"/>
+            </a:pPr>
+            <a:endParaRPr lang="en-US" sz="2400" dirty="0" smtClean="0"/>
+          </a:p>
+        </p:txBody>
+      </p:sp>
+      <p:sp>
+        <p:nvSpPr>
+          <p:cNvPr id="97" name="Shape 97"/>
+          <p:cNvSpPr txBox="1">
+            <a:spLocks noGrp="1"/>
+          </p:cNvSpPr>
+          <p:nvPr>
+            <p:ph type="body" idx="2"/>
+          </p:nvPr>
+        </p:nvSpPr>
+        <p:spPr>
+          <a:xfrm>
+            <a:off x="341168" y="228026"/>
+            <a:ext cx="8498032" cy="457199"/>
+          </a:xfrm>
+          <a:prstGeom prst="rect">
+            <a:avLst/>
+          </a:prstGeom>
+          <a:noFill/>
+          <a:ln>
+            <a:noFill/>
+          </a:ln>
+        </p:spPr>
+        <p:txBody>
+          <a:bodyPr lIns="68569" tIns="34275" rIns="68569" bIns="34275" anchor="t" anchorCtr="0">
+            <a:noAutofit/>
+          </a:bodyPr>
+          <a:lstStyle/>
+          <a:p>
+            <a:pPr>
+              <a:buClr>
+                <a:schemeClr val="accent2"/>
+              </a:buClr>
+              <a:buSzPct val="25000"/>
+            </a:pPr>
+            <a:r>
+              <a:rPr lang="en-US" sz="3600" dirty="0" smtClean="0"/>
+              <a:t>Title</a:t>
+            </a:r>
+            <a:endParaRPr lang="en-US" sz="3600" dirty="0"/>
+          </a:p>
+        </p:txBody>
+      </p:sp>
+    </p:spTree>
+    <p:extLst>
+      <p:ext uri="{BB962C8B-B14F-4D97-AF65-F5344CB8AC3E}">
+        <p14:creationId xmlns:p14="http://schemas.microsoft.com/office/powerpoint/2010/main" val="2675765428"/>
+      </p:ext>
+    </p:extLst>
+  </p:cSld>
+  <p:clrMapOvr>
+    <a:masterClrMapping/>
+  </p:clrMapOvr>
+  <p:transition spd="slow">
+    <p:cut/>
+  </p:transition>
+  <p:timing>
+    <p:tnLst>
+      <p:par>
+        <p:cTn id="1" dur="indefinite" restart="never" nodeType="tmRoot"/>
+      </p:par>
+    </p:tnLst>
+  </p:timing>
+</p:sld>
+</file>
+
+<file path=ppt/slides/slide36.xml><?xml version="1.0" encoding="utf-8"?>
+<p:sld xmlns:a="http://schemas.openxmlformats.org/drawingml/2006/main" xmlns:r="http://schemas.openxmlformats.org/officeDocument/2006/relationships" xmlns:p="http://schemas.openxmlformats.org/presentationml/2006/main">
+  <p:cSld>
+    <p:spTree>
+      <p:nvGrpSpPr>
+        <p:cNvPr id="1" name="Shape 93"/>
+        <p:cNvGrpSpPr/>
+        <p:nvPr/>
+      </p:nvGrpSpPr>
+      <p:grpSpPr>
+        <a:xfrm>
+          <a:off x="0" y="0"/>
+          <a:ext cx="0" cy="0"/>
+          <a:chOff x="0" y="0"/>
+          <a:chExt cx="0" cy="0"/>
+        </a:xfrm>
+      </p:grpSpPr>
+      <p:sp>
+        <p:nvSpPr>
+          <p:cNvPr id="95" name="Shape 95"/>
+          <p:cNvSpPr txBox="1">
+            <a:spLocks noGrp="1"/>
+          </p:cNvSpPr>
+          <p:nvPr>
+            <p:ph type="sldNum" idx="12"/>
+          </p:nvPr>
+        </p:nvSpPr>
+        <p:spPr>
+          <a:xfrm>
+            <a:off x="7600950" y="5688719"/>
+            <a:ext cx="269142" cy="273844"/>
+          </a:xfrm>
+          <a:prstGeom prst="rect">
+            <a:avLst/>
+          </a:prstGeom>
+          <a:noFill/>
+          <a:ln>
+            <a:noFill/>
+          </a:ln>
+        </p:spPr>
+        <p:txBody>
+          <a:bodyPr lIns="68569" tIns="34275" rIns="68569" bIns="34275" anchor="ctr" anchorCtr="0">
+            <a:noAutofit/>
+          </a:bodyPr>
+          <a:lstStyle/>
+          <a:p>
+            <a:pPr>
+              <a:buSzPct val="25000"/>
+            </a:pPr>
+            <a:r>
+              <a:rPr lang="en-US"/>
+              <a:t> </a:t>
+            </a:r>
+          </a:p>
+        </p:txBody>
+      </p:sp>
+      <p:sp>
+        <p:nvSpPr>
           <p:cNvPr id="96" name="Shape 96"/>
           <p:cNvSpPr txBox="1">
             <a:spLocks noGrp="1"/>
@@ -13722,7 +15605,7 @@
 </p:sld>
 </file>
 
-<file path=ppt/slides/slide31.xml><?xml version="1.0" encoding="utf-8"?>
+<file path=ppt/slides/slide37.xml><?xml version="1.0" encoding="utf-8"?>
 <p:sld xmlns:a="http://schemas.openxmlformats.org/drawingml/2006/main" xmlns:r="http://schemas.openxmlformats.org/officeDocument/2006/relationships" xmlns:p="http://schemas.openxmlformats.org/presentationml/2006/main">
   <p:cSld>
     <p:spTree>

</xml_diff>

<commit_message>
add more info about use cases for the link between a branch and the upstream branch
</commit_message>
<xml_diff>
--- a/GIT Presentation.pptx
+++ b/GIT Presentation.pptx
@@ -2866,14 +2866,66 @@
             </a:r>
           </a:p>
           <a:p>
-            <a:pPr marL="171450" indent="-171450">
+            <a:pPr marL="628650" lvl="1" indent="-171450">
               <a:buFontTx/>
               <a:buChar char="-"/>
             </a:pPr>
             <a:r>
               <a:rPr lang="en-US" baseline="0" dirty="0" smtClean="0"/>
-              <a:t>this link is needed for example for GIT to know to which remote repository to push changes when the current branch is master and you don't specify a remote name when pushing</a:t>
-            </a:r>
+              <a:t>this link is needed for example for GIT to know to which remote repository to push changes when the current branch is master and you don't specify a remote name when </a:t>
+            </a:r>
+            <a:r>
+              <a:rPr lang="en-US" baseline="0" dirty="0" smtClean="0"/>
+              <a:t>pushing</a:t>
+            </a:r>
+          </a:p>
+          <a:p>
+            <a:pPr marL="628650" lvl="1" indent="-171450">
+              <a:buFontTx/>
+              <a:buChar char="-"/>
+            </a:pPr>
+            <a:r>
+              <a:rPr lang="en-US" baseline="0" dirty="0" smtClean="0"/>
+              <a:t>other commands that use this </a:t>
+            </a:r>
+          </a:p>
+          <a:p>
+            <a:pPr marL="1085850" lvl="2" indent="-171450">
+              <a:buFontTx/>
+              <a:buChar char="-"/>
+            </a:pPr>
+            <a:r>
+              <a:rPr lang="en-US" baseline="0" dirty="0" smtClean="0"/>
+              <a:t>merge, when you don't specify what branch to merge into the current branch</a:t>
+            </a:r>
+          </a:p>
+          <a:p>
+            <a:pPr marL="1085850" lvl="2" indent="-171450">
+              <a:buFontTx/>
+              <a:buChar char="-"/>
+            </a:pPr>
+            <a:r>
+              <a:rPr lang="en-US" baseline="0" dirty="0" smtClean="0"/>
+              <a:t>rebase, when you don't specify what on top of which branch to rebase </a:t>
+            </a:r>
+            <a:r>
+              <a:rPr lang="en-US" baseline="0" smtClean="0"/>
+              <a:t>the current branch</a:t>
+            </a:r>
+            <a:endParaRPr lang="en-US" baseline="0" dirty="0" smtClean="0"/>
+          </a:p>
+          <a:p>
+            <a:pPr marL="1085850" lvl="2" indent="-171450">
+              <a:buFontTx/>
+              <a:buChar char="-"/>
+            </a:pPr>
+            <a:endParaRPr lang="en-US" baseline="0" dirty="0" smtClean="0"/>
+          </a:p>
+          <a:p>
+            <a:pPr marL="0" indent="0">
+              <a:buFontTx/>
+              <a:buNone/>
+            </a:pPr>
             <a:endParaRPr dirty="0"/>
           </a:p>
         </p:txBody>
@@ -12028,11 +12080,7 @@
             </a:pPr>
             <a:r>
               <a:rPr lang="en-US" sz="2400" dirty="0" smtClean="0"/>
-              <a:t>GIT vs. </a:t>
-            </a:r>
-            <a:r>
-              <a:rPr lang="en-US" sz="2400" dirty="0" smtClean="0"/>
-              <a:t>SVN</a:t>
+              <a:t>GIT vs. SVN</a:t>
             </a:r>
           </a:p>
           <a:p>
@@ -12070,7 +12118,6 @@
               <a:rPr lang="en-US" sz="2400" dirty="0" smtClean="0"/>
               <a:t>GIT operations (commit, merge, etc.)</a:t>
             </a:r>
-            <a:endParaRPr lang="en-US" sz="2400" dirty="0" smtClean="0"/>
           </a:p>
           <a:p>
             <a:pPr marL="285750" indent="-285750">
@@ -13301,9 +13348,6 @@
               </a:rPr>
               <a:t> push" sends the commits to another GIT repo</a:t>
             </a:r>
-            <a:endParaRPr lang="en-US" sz="2400" dirty="0" smtClean="0">
-              <a:sym typeface="Wingdings" panose="05000000000000000000" pitchFamily="2" charset="2"/>
-            </a:endParaRPr>
           </a:p>
           <a:p>
             <a:pPr>

</xml_diff>

<commit_message>
add slide: introduction to merge & rebase
</commit_message>
<xml_diff>
--- a/GIT Presentation.pptx
+++ b/GIT Presentation.pptx
@@ -6,7 +6,7 @@
     <p:sldMasterId id="2147483665" r:id="rId2"/>
   </p:sldMasterIdLst>
   <p:notesMasterIdLst>
-    <p:notesMasterId r:id="rId49"/>
+    <p:notesMasterId r:id="rId50"/>
   </p:notesMasterIdLst>
   <p:sldIdLst>
     <p:sldId id="257" r:id="rId3"/>
@@ -21,40 +21,41 @@
     <p:sldId id="276" r:id="rId12"/>
     <p:sldId id="277" r:id="rId13"/>
     <p:sldId id="268" r:id="rId14"/>
-    <p:sldId id="282" r:id="rId15"/>
-    <p:sldId id="283" r:id="rId16"/>
-    <p:sldId id="285" r:id="rId17"/>
-    <p:sldId id="284" r:id="rId18"/>
-    <p:sldId id="278" r:id="rId19"/>
-    <p:sldId id="287" r:id="rId20"/>
-    <p:sldId id="288" r:id="rId21"/>
-    <p:sldId id="289" r:id="rId22"/>
-    <p:sldId id="290" r:id="rId23"/>
-    <p:sldId id="291" r:id="rId24"/>
-    <p:sldId id="280" r:id="rId25"/>
-    <p:sldId id="312" r:id="rId26"/>
-    <p:sldId id="292" r:id="rId27"/>
-    <p:sldId id="293" r:id="rId28"/>
-    <p:sldId id="279" r:id="rId29"/>
-    <p:sldId id="294" r:id="rId30"/>
-    <p:sldId id="295" r:id="rId31"/>
-    <p:sldId id="296" r:id="rId32"/>
-    <p:sldId id="297" r:id="rId33"/>
-    <p:sldId id="298" r:id="rId34"/>
-    <p:sldId id="300" r:id="rId35"/>
-    <p:sldId id="301" r:id="rId36"/>
-    <p:sldId id="302" r:id="rId37"/>
-    <p:sldId id="303" r:id="rId38"/>
-    <p:sldId id="304" r:id="rId39"/>
-    <p:sldId id="305" r:id="rId40"/>
-    <p:sldId id="307" r:id="rId41"/>
-    <p:sldId id="306" r:id="rId42"/>
-    <p:sldId id="308" r:id="rId43"/>
-    <p:sldId id="309" r:id="rId44"/>
-    <p:sldId id="310" r:id="rId45"/>
-    <p:sldId id="311" r:id="rId46"/>
-    <p:sldId id="273" r:id="rId47"/>
-    <p:sldId id="275" r:id="rId48"/>
+    <p:sldId id="313" r:id="rId15"/>
+    <p:sldId id="282" r:id="rId16"/>
+    <p:sldId id="283" r:id="rId17"/>
+    <p:sldId id="285" r:id="rId18"/>
+    <p:sldId id="284" r:id="rId19"/>
+    <p:sldId id="278" r:id="rId20"/>
+    <p:sldId id="287" r:id="rId21"/>
+    <p:sldId id="288" r:id="rId22"/>
+    <p:sldId id="289" r:id="rId23"/>
+    <p:sldId id="290" r:id="rId24"/>
+    <p:sldId id="291" r:id="rId25"/>
+    <p:sldId id="280" r:id="rId26"/>
+    <p:sldId id="312" r:id="rId27"/>
+    <p:sldId id="292" r:id="rId28"/>
+    <p:sldId id="293" r:id="rId29"/>
+    <p:sldId id="279" r:id="rId30"/>
+    <p:sldId id="294" r:id="rId31"/>
+    <p:sldId id="295" r:id="rId32"/>
+    <p:sldId id="296" r:id="rId33"/>
+    <p:sldId id="297" r:id="rId34"/>
+    <p:sldId id="298" r:id="rId35"/>
+    <p:sldId id="300" r:id="rId36"/>
+    <p:sldId id="301" r:id="rId37"/>
+    <p:sldId id="302" r:id="rId38"/>
+    <p:sldId id="303" r:id="rId39"/>
+    <p:sldId id="304" r:id="rId40"/>
+    <p:sldId id="305" r:id="rId41"/>
+    <p:sldId id="307" r:id="rId42"/>
+    <p:sldId id="306" r:id="rId43"/>
+    <p:sldId id="308" r:id="rId44"/>
+    <p:sldId id="309" r:id="rId45"/>
+    <p:sldId id="310" r:id="rId46"/>
+    <p:sldId id="311" r:id="rId47"/>
+    <p:sldId id="273" r:id="rId48"/>
+    <p:sldId id="275" r:id="rId49"/>
   </p:sldIdLst>
   <p:sldSz cx="9144000" cy="6858000" type="screen4x3"/>
   <p:notesSz cx="6858000" cy="9144000"/>
@@ -924,50 +925,16 @@
             </a:pPr>
             <a:r>
               <a:rPr lang="en-US" dirty="0" smtClean="0"/>
-              <a:t>first a new commit is created (H) that contains all the changes</a:t>
+              <a:t>working on different branches is cool,</a:t>
             </a:r>
             <a:r>
               <a:rPr lang="en-US" baseline="0" dirty="0" smtClean="0"/>
-              <a:t> that were previously only in master (the changes introduced by C, F, and G)</a:t>
-            </a:r>
-            <a:endParaRPr lang="en-US" dirty="0" smtClean="0"/>
-          </a:p>
-          <a:p>
-            <a:pPr marL="171450" indent="-171450">
-              <a:buFontTx/>
-              <a:buChar char="-"/>
-            </a:pPr>
-            <a:r>
-              <a:rPr lang="en-US" dirty="0" smtClean="0"/>
-              <a:t>notice</a:t>
-            </a:r>
-            <a:r>
-              <a:rPr lang="en-US" baseline="0" dirty="0" smtClean="0"/>
-              <a:t> that this commit has 2 parents – this is how GIT knows that H is a merge commit</a:t>
-            </a:r>
-          </a:p>
-          <a:p>
-            <a:pPr marL="171450" indent="-171450">
-              <a:buFontTx/>
-              <a:buChar char="-"/>
-            </a:pPr>
-            <a:r>
-              <a:rPr lang="en-US" baseline="0" dirty="0" smtClean="0"/>
-              <a:t>if there are no conflicts, GIT commits automatically, otherwise you need to solve conflicts and the commit yourself</a:t>
-            </a:r>
-          </a:p>
-          <a:p>
-            <a:pPr marL="171450" indent="-171450">
-              <a:buFontTx/>
-              <a:buChar char="-"/>
-            </a:pPr>
-            <a:endParaRPr lang="en-US" dirty="0" smtClean="0"/>
-          </a:p>
-          <a:p>
-            <a:pPr marL="171450" indent="-171450">
-              <a:buFontTx/>
-              <a:buChar char="-"/>
-            </a:pPr>
+              <a:t> but to benefit from that work, you need to </a:t>
+            </a:r>
+            <a:r>
+              <a:rPr lang="en-US" baseline="0" smtClean="0"/>
+              <a:t>unify branches</a:t>
+            </a:r>
             <a:endParaRPr dirty="0"/>
           </a:p>
         </p:txBody>
@@ -1074,67 +1041,50 @@
             </a:pPr>
             <a:r>
               <a:rPr lang="en-US" dirty="0" smtClean="0"/>
-              <a:t>afte</a:t>
+              <a:t>first a new commit is created (H) that contains all the changes</a:t>
             </a:r>
             <a:r>
               <a:rPr lang="en-US" baseline="0" dirty="0" smtClean="0"/>
-              <a:t>r the commit is created, my-branch is changed to point to the new commit</a:t>
-            </a:r>
-          </a:p>
-          <a:p>
-            <a:pPr marL="0" indent="0">
+              <a:t> that were previously only in master (the changes introduced by C, F, and G)</a:t>
+            </a:r>
+            <a:endParaRPr lang="en-US" dirty="0" smtClean="0"/>
+          </a:p>
+          <a:p>
+            <a:pPr marL="171450" indent="-171450">
               <a:buFontTx/>
-              <a:buNone/>
+              <a:buChar char="-"/>
+            </a:pPr>
+            <a:r>
+              <a:rPr lang="en-US" dirty="0" smtClean="0"/>
+              <a:t>notice</a:t>
+            </a:r>
+            <a:r>
+              <a:rPr lang="en-US" baseline="0" dirty="0" smtClean="0"/>
+              <a:t> that this commit has 2 parents – this is how GIT knows that H is a merge commit</a:t>
+            </a:r>
+          </a:p>
+          <a:p>
+            <a:pPr marL="171450" indent="-171450">
+              <a:buFontTx/>
+              <a:buChar char="-"/>
+            </a:pPr>
+            <a:r>
+              <a:rPr lang="en-US" baseline="0" dirty="0" smtClean="0"/>
+              <a:t>if there are no conflicts, GIT commits automatically, otherwise you need to solve conflicts and the commit yourself</a:t>
+            </a:r>
+          </a:p>
+          <a:p>
+            <a:pPr marL="171450" indent="-171450">
+              <a:buFontTx/>
+              <a:buChar char="-"/>
             </a:pPr>
             <a:endParaRPr lang="en-US" dirty="0" smtClean="0"/>
           </a:p>
           <a:p>
-            <a:pPr marL="0" indent="0">
+            <a:pPr marL="171450" indent="-171450">
               <a:buFontTx/>
-              <a:buNone/>
-            </a:pPr>
-            <a:r>
-              <a:rPr lang="en-US" dirty="0" smtClean="0"/>
-              <a:t>O</a:t>
-            </a:r>
-            <a:r>
-              <a:rPr lang="en-US" baseline="0" dirty="0" smtClean="0"/>
-              <a:t>bservations:</a:t>
-            </a:r>
-          </a:p>
-          <a:p>
-            <a:pPr marL="0" indent="0">
-              <a:buFontTx/>
-              <a:buNone/>
-            </a:pPr>
-            <a:r>
-              <a:rPr lang="en-US" baseline="0" dirty="0" smtClean="0"/>
-              <a:t>- the commit H contains all the changes in commits C, F, and G, so if you try to understand the history without comparing with the master branch, you can be lost</a:t>
-            </a:r>
-          </a:p>
-          <a:p>
-            <a:pPr marL="0" indent="0">
-              <a:buFontTx/>
-              <a:buNone/>
-            </a:pPr>
-            <a:r>
-              <a:rPr lang="en-US" baseline="0" dirty="0" smtClean="0"/>
-              <a:t>- GIT can merge multiple branches at one time (not only 2), but I don’t recommend it since it can get quite difficult to solve conflicts or understand the history later</a:t>
-            </a:r>
-          </a:p>
-          <a:p>
-            <a:pPr marL="0" indent="0">
-              <a:buFontTx/>
-              <a:buNone/>
-            </a:pPr>
-            <a:r>
-              <a:rPr lang="en-US" dirty="0" smtClean="0"/>
-              <a:t>- just because you did not</a:t>
-            </a:r>
-            <a:r>
-              <a:rPr lang="en-US" baseline="0" dirty="0" smtClean="0"/>
-              <a:t> have a conflict it doesn’t mean the merge was successful. Imagine the following scenario: someone on branch A deletes a configuration property, while another developer on branch B creates a class that uses that property. Merging both A and B into master will be successful (no line conflicts), but the result is broken. So, always run the tests after merge. Also, this is one more reason not to merge multiple branches at one time (merge 2 branches multiple times: A into master, then B into master)</a:t>
-            </a:r>
+              <a:buChar char="-"/>
+            </a:pPr>
             <a:endParaRPr dirty="0"/>
           </a:p>
         </p:txBody>
@@ -1183,7 +1133,7 @@
     </p:spTree>
     <p:extLst>
       <p:ext uri="{BB962C8B-B14F-4D97-AF65-F5344CB8AC3E}">
-        <p14:creationId xmlns:p14="http://schemas.microsoft.com/office/powerpoint/2010/main" val="4139308719"/>
+        <p14:creationId xmlns:p14="http://schemas.microsoft.com/office/powerpoint/2010/main" val="1166683538"/>
       </p:ext>
     </p:extLst>
   </p:cSld>
@@ -1239,6 +1189,69 @@
               <a:buFontTx/>
               <a:buChar char="-"/>
             </a:pPr>
+            <a:r>
+              <a:rPr lang="en-US" dirty="0" smtClean="0"/>
+              <a:t>afte</a:t>
+            </a:r>
+            <a:r>
+              <a:rPr lang="en-US" baseline="0" dirty="0" smtClean="0"/>
+              <a:t>r the commit is created, my-branch is changed to point to the new commit</a:t>
+            </a:r>
+          </a:p>
+          <a:p>
+            <a:pPr marL="0" indent="0">
+              <a:buFontTx/>
+              <a:buNone/>
+            </a:pPr>
+            <a:endParaRPr lang="en-US" dirty="0" smtClean="0"/>
+          </a:p>
+          <a:p>
+            <a:pPr marL="0" indent="0">
+              <a:buFontTx/>
+              <a:buNone/>
+            </a:pPr>
+            <a:r>
+              <a:rPr lang="en-US" dirty="0" smtClean="0"/>
+              <a:t>O</a:t>
+            </a:r>
+            <a:r>
+              <a:rPr lang="en-US" baseline="0" dirty="0" smtClean="0"/>
+              <a:t>bservations:</a:t>
+            </a:r>
+          </a:p>
+          <a:p>
+            <a:pPr marL="0" indent="0">
+              <a:buFontTx/>
+              <a:buNone/>
+            </a:pPr>
+            <a:r>
+              <a:rPr lang="en-US" baseline="0" dirty="0" smtClean="0"/>
+              <a:t>- the commit H contains all the changes in commits C, F, and G, so if you try to understand the history without comparing with the master branch, you can be lost</a:t>
+            </a:r>
+          </a:p>
+          <a:p>
+            <a:pPr marL="0" indent="0">
+              <a:buFontTx/>
+              <a:buNone/>
+            </a:pPr>
+            <a:r>
+              <a:rPr lang="en-US" baseline="0" dirty="0" smtClean="0"/>
+              <a:t>- GIT can merge multiple branches at one time (not only 2), but I don’t recommend it since it can get quite difficult to solve conflicts or understand the history later</a:t>
+            </a:r>
+          </a:p>
+          <a:p>
+            <a:pPr marL="0" indent="0">
+              <a:buFontTx/>
+              <a:buNone/>
+            </a:pPr>
+            <a:r>
+              <a:rPr lang="en-US" dirty="0" smtClean="0"/>
+              <a:t>- just because you did not</a:t>
+            </a:r>
+            <a:r>
+              <a:rPr lang="en-US" baseline="0" dirty="0" smtClean="0"/>
+              <a:t> have a conflict it doesn’t mean the merge was successful. Imagine the following scenario: someone on branch A deletes a configuration property, while another developer on branch B creates a class that uses that property. Merging both A and B into master will be successful (no line conflicts), but the result is broken. So, always run the tests after merge. Also, this is one more reason not to merge multiple branches at one time (merge 2 branches multiple times: A into master, then B into master)</a:t>
+            </a:r>
             <a:endParaRPr dirty="0"/>
           </a:p>
         </p:txBody>
@@ -1287,7 +1300,7 @@
     </p:spTree>
     <p:extLst>
       <p:ext uri="{BB962C8B-B14F-4D97-AF65-F5344CB8AC3E}">
-        <p14:creationId xmlns:p14="http://schemas.microsoft.com/office/powerpoint/2010/main" val="3985505281"/>
+        <p14:creationId xmlns:p14="http://schemas.microsoft.com/office/powerpoint/2010/main" val="4139308719"/>
       </p:ext>
     </p:extLst>
   </p:cSld>
@@ -1343,24 +1356,6 @@
               <a:buFontTx/>
               <a:buChar char="-"/>
             </a:pPr>
-            <a:r>
-              <a:rPr lang="en-US" dirty="0" smtClean="0"/>
-              <a:t>special kind of merge, if the branches have not diverged</a:t>
-            </a:r>
-          </a:p>
-          <a:p>
-            <a:pPr marL="171450" indent="-171450">
-              <a:buFontTx/>
-              <a:buChar char="-"/>
-            </a:pPr>
-            <a:r>
-              <a:rPr lang="en-US" dirty="0" smtClean="0"/>
-              <a:t>no</a:t>
-            </a:r>
-            <a:r>
-              <a:rPr lang="en-US" baseline="0" dirty="0" smtClean="0"/>
-              <a:t> new commit is created, only the branch label is changed to point to a different commit</a:t>
-            </a:r>
             <a:endParaRPr dirty="0"/>
           </a:p>
         </p:txBody>
@@ -1409,7 +1404,7 @@
     </p:spTree>
     <p:extLst>
       <p:ext uri="{BB962C8B-B14F-4D97-AF65-F5344CB8AC3E}">
-        <p14:creationId xmlns:p14="http://schemas.microsoft.com/office/powerpoint/2010/main" val="1136595489"/>
+        <p14:creationId xmlns:p14="http://schemas.microsoft.com/office/powerpoint/2010/main" val="3985505281"/>
       </p:ext>
     </p:extLst>
   </p:cSld>
@@ -1467,21 +1462,23 @@
             </a:pPr>
             <a:r>
               <a:rPr lang="en-US" dirty="0" smtClean="0"/>
-              <a:t>the problem</a:t>
+              <a:t>special kind of merge, if the branches have not diverged</a:t>
+            </a:r>
+          </a:p>
+          <a:p>
+            <a:pPr marL="171450" indent="-171450">
+              <a:buFontTx/>
+              <a:buChar char="-"/>
+            </a:pPr>
+            <a:r>
+              <a:rPr lang="en-US" dirty="0" smtClean="0"/>
+              <a:t>no</a:t>
             </a:r>
             <a:r>
               <a:rPr lang="en-US" baseline="0" dirty="0" smtClean="0"/>
-              <a:t> with a fast-forward merge is after you do it, you can no longer tell from the history that F and G were developed on a separate branch. If you care about this, you can force GIT to create a commit using a command line argument (“--no-</a:t>
-            </a:r>
-            <a:r>
-              <a:rPr lang="en-US" baseline="0" dirty="0" err="1" smtClean="0"/>
-              <a:t>ff</a:t>
-            </a:r>
-            <a:r>
-              <a:rPr lang="en-US" baseline="0" smtClean="0"/>
-              <a:t>”)</a:t>
-            </a:r>
-            <a:endParaRPr lang="en-US" baseline="0" dirty="0" smtClean="0"/>
+              <a:t> new commit is created, only the branch label is changed to point to a different commit</a:t>
+            </a:r>
+            <a:endParaRPr dirty="0"/>
           </a:p>
         </p:txBody>
       </p:sp>
@@ -1529,7 +1526,7 @@
     </p:spTree>
     <p:extLst>
       <p:ext uri="{BB962C8B-B14F-4D97-AF65-F5344CB8AC3E}">
-        <p14:creationId xmlns:p14="http://schemas.microsoft.com/office/powerpoint/2010/main" val="1736329018"/>
+        <p14:creationId xmlns:p14="http://schemas.microsoft.com/office/powerpoint/2010/main" val="1136595489"/>
       </p:ext>
     </p:extLst>
   </p:cSld>
@@ -1587,39 +1584,21 @@
             </a:pPr>
             <a:r>
               <a:rPr lang="en-US" dirty="0" smtClean="0"/>
-              <a:t>rebase will create linear history: A,</a:t>
+              <a:t>the problem</a:t>
             </a:r>
             <a:r>
               <a:rPr lang="en-US" baseline="0" dirty="0" smtClean="0"/>
-              <a:t> B, C, F, E, D.</a:t>
-            </a:r>
-          </a:p>
-          <a:p>
-            <a:pPr marL="628650" lvl="1" indent="-171450">
-              <a:buFontTx/>
-              <a:buChar char="-"/>
-            </a:pPr>
-            <a:r>
-              <a:rPr lang="en-US" baseline="0" dirty="0" smtClean="0"/>
-              <a:t>one example where you would need this is when using GIT as an SVN client, since SVN only knows of linear history</a:t>
-            </a:r>
-          </a:p>
-          <a:p>
-            <a:pPr marL="628650" lvl="1" indent="-171450">
-              <a:buFontTx/>
-              <a:buChar char="-"/>
-            </a:pPr>
-            <a:r>
-              <a:rPr lang="en-US" baseline="0" dirty="0" smtClean="0"/>
-              <a:t>because the history is linear, people will not know that E and D were developed on a separate branch, which is something that you may or may not want</a:t>
-            </a:r>
-          </a:p>
-          <a:p>
-            <a:pPr marL="0" lvl="0" indent="0">
-              <a:buFontTx/>
-              <a:buNone/>
-            </a:pPr>
-            <a:endParaRPr dirty="0"/>
+              <a:t> with a fast-forward merge is after you do it, you can no longer tell from the history that F and G were developed on a separate branch. If you care about this, you can force GIT to create a commit using a command line argument (“--no-</a:t>
+            </a:r>
+            <a:r>
+              <a:rPr lang="en-US" baseline="0" dirty="0" err="1" smtClean="0"/>
+              <a:t>ff</a:t>
+            </a:r>
+            <a:r>
+              <a:rPr lang="en-US" baseline="0" smtClean="0"/>
+              <a:t>”)</a:t>
+            </a:r>
+            <a:endParaRPr lang="en-US" baseline="0" dirty="0" smtClean="0"/>
           </a:p>
         </p:txBody>
       </p:sp>
@@ -1667,7 +1646,7 @@
     </p:spTree>
     <p:extLst>
       <p:ext uri="{BB962C8B-B14F-4D97-AF65-F5344CB8AC3E}">
-        <p14:creationId xmlns:p14="http://schemas.microsoft.com/office/powerpoint/2010/main" val="4173674627"/>
+        <p14:creationId xmlns:p14="http://schemas.microsoft.com/office/powerpoint/2010/main" val="1736329018"/>
       </p:ext>
     </p:extLst>
   </p:cSld>
@@ -1725,12 +1704,38 @@
             </a:pPr>
             <a:r>
               <a:rPr lang="en-US" dirty="0" smtClean="0"/>
-              <a:t>the my-branch</a:t>
+              <a:t>rebase will create linear history: A,</a:t>
             </a:r>
             <a:r>
               <a:rPr lang="en-US" baseline="0" dirty="0" smtClean="0"/>
-              <a:t> will first point to the same commit as master</a:t>
-            </a:r>
+              <a:t> B, C, F, E, D.</a:t>
+            </a:r>
+          </a:p>
+          <a:p>
+            <a:pPr marL="628650" lvl="1" indent="-171450">
+              <a:buFontTx/>
+              <a:buChar char="-"/>
+            </a:pPr>
+            <a:r>
+              <a:rPr lang="en-US" baseline="0" dirty="0" smtClean="0"/>
+              <a:t>one example where you would need this is when using GIT as an SVN client, since SVN only knows of linear history</a:t>
+            </a:r>
+          </a:p>
+          <a:p>
+            <a:pPr marL="628650" lvl="1" indent="-171450">
+              <a:buFontTx/>
+              <a:buChar char="-"/>
+            </a:pPr>
+            <a:r>
+              <a:rPr lang="en-US" baseline="0" dirty="0" smtClean="0"/>
+              <a:t>because the history is linear, people will not know that E and D were developed on a separate branch, which is something that you may or may not want</a:t>
+            </a:r>
+          </a:p>
+          <a:p>
+            <a:pPr marL="0" lvl="0" indent="0">
+              <a:buFontTx/>
+              <a:buNone/>
+            </a:pPr>
             <a:endParaRPr dirty="0"/>
           </a:p>
         </p:txBody>
@@ -1779,7 +1784,7 @@
     </p:spTree>
     <p:extLst>
       <p:ext uri="{BB962C8B-B14F-4D97-AF65-F5344CB8AC3E}">
-        <p14:creationId xmlns:p14="http://schemas.microsoft.com/office/powerpoint/2010/main" val="3893781737"/>
+        <p14:creationId xmlns:p14="http://schemas.microsoft.com/office/powerpoint/2010/main" val="4173674627"/>
       </p:ext>
     </p:extLst>
   </p:cSld>
@@ -1837,31 +1842,11 @@
             </a:pPr>
             <a:r>
               <a:rPr lang="en-US" dirty="0" smtClean="0"/>
-              <a:t>a</a:t>
+              <a:t>the my-branch</a:t>
             </a:r>
             <a:r>
               <a:rPr lang="en-US" baseline="0" dirty="0" smtClean="0"/>
-              <a:t> commit E' is created that introduces the same changes as E</a:t>
-            </a:r>
-          </a:p>
-          <a:p>
-            <a:pPr marL="171450" indent="-171450">
-              <a:buFontTx/>
-              <a:buChar char="-"/>
-            </a:pPr>
-            <a:r>
-              <a:rPr lang="en-US" baseline="0" dirty="0" smtClean="0"/>
-              <a:t>the new commit is not exactly the same, since it has a different parent, a different commit time, etc. In other words, E and E' have different SHA1 IDs.</a:t>
-            </a:r>
-          </a:p>
-          <a:p>
-            <a:pPr marL="171450" indent="-171450">
-              <a:buFontTx/>
-              <a:buChar char="-"/>
-            </a:pPr>
-            <a:r>
-              <a:rPr lang="en-US" baseline="0" dirty="0" smtClean="0"/>
-              <a:t>the new commit may conflict with changes made in commit C or F. These conflicts will need to be manually solved and then rebase can continue</a:t>
+              <a:t> will first point to the same commit as master</a:t>
             </a:r>
             <a:endParaRPr dirty="0"/>
           </a:p>
@@ -1911,7 +1896,7 @@
     </p:spTree>
     <p:extLst>
       <p:ext uri="{BB962C8B-B14F-4D97-AF65-F5344CB8AC3E}">
-        <p14:creationId xmlns:p14="http://schemas.microsoft.com/office/powerpoint/2010/main" val="2400778321"/>
+        <p14:creationId xmlns:p14="http://schemas.microsoft.com/office/powerpoint/2010/main" val="3893781737"/>
       </p:ext>
     </p:extLst>
   </p:cSld>
@@ -2069,19 +2054,31 @@
             </a:pPr>
             <a:r>
               <a:rPr lang="en-US" dirty="0" smtClean="0"/>
-              <a:t>because it’s the current branch (as</a:t>
+              <a:t>a</a:t>
             </a:r>
             <a:r>
               <a:rPr lang="en-US" baseline="0" dirty="0" smtClean="0"/>
-              <a:t> shown by HEAD), </a:t>
-            </a:r>
-            <a:r>
-              <a:rPr lang="en-US" dirty="0" smtClean="0"/>
-              <a:t>my-branch</a:t>
-            </a:r>
+              <a:t> commit E' is created that introduces the same changes as E</a:t>
+            </a:r>
+          </a:p>
+          <a:p>
+            <a:pPr marL="171450" indent="-171450">
+              <a:buFontTx/>
+              <a:buChar char="-"/>
+            </a:pPr>
             <a:r>
               <a:rPr lang="en-US" baseline="0" dirty="0" smtClean="0"/>
-              <a:t> will then point to the new commit</a:t>
+              <a:t>the new commit is not exactly the same, since it has a different parent, a different commit time, etc. In other words, E and E' have different SHA1 IDs.</a:t>
+            </a:r>
+          </a:p>
+          <a:p>
+            <a:pPr marL="171450" indent="-171450">
+              <a:buFontTx/>
+              <a:buChar char="-"/>
+            </a:pPr>
+            <a:r>
+              <a:rPr lang="en-US" baseline="0" dirty="0" smtClean="0"/>
+              <a:t>the new commit may conflict with changes made in commit C or F. These conflicts will need to be manually solved and then rebase can continue</a:t>
             </a:r>
             <a:endParaRPr dirty="0"/>
           </a:p>
@@ -2131,7 +2128,7 @@
     </p:spTree>
     <p:extLst>
       <p:ext uri="{BB962C8B-B14F-4D97-AF65-F5344CB8AC3E}">
-        <p14:creationId xmlns:p14="http://schemas.microsoft.com/office/powerpoint/2010/main" val="206851763"/>
+        <p14:creationId xmlns:p14="http://schemas.microsoft.com/office/powerpoint/2010/main" val="2400778321"/>
       </p:ext>
     </p:extLst>
   </p:cSld>
@@ -2189,11 +2186,19 @@
             </a:pPr>
             <a:r>
               <a:rPr lang="en-US" dirty="0" smtClean="0"/>
-              <a:t>the</a:t>
+              <a:t>because it’s the current branch (as</a:t>
             </a:r>
             <a:r>
               <a:rPr lang="en-US" baseline="0" dirty="0" smtClean="0"/>
-              <a:t> commit D' is created that introduces the same changes as D</a:t>
+              <a:t> shown by HEAD), </a:t>
+            </a:r>
+            <a:r>
+              <a:rPr lang="en-US" dirty="0" smtClean="0"/>
+              <a:t>my-branch</a:t>
+            </a:r>
+            <a:r>
+              <a:rPr lang="en-US" baseline="0" dirty="0" smtClean="0"/>
+              <a:t> will then point to the new commit</a:t>
             </a:r>
             <a:endParaRPr dirty="0"/>
           </a:p>
@@ -2243,7 +2248,7 @@
     </p:spTree>
     <p:extLst>
       <p:ext uri="{BB962C8B-B14F-4D97-AF65-F5344CB8AC3E}">
-        <p14:creationId xmlns:p14="http://schemas.microsoft.com/office/powerpoint/2010/main" val="1510356220"/>
+        <p14:creationId xmlns:p14="http://schemas.microsoft.com/office/powerpoint/2010/main" val="206851763"/>
       </p:ext>
     </p:extLst>
   </p:cSld>
@@ -2301,89 +2306,11 @@
             </a:pPr>
             <a:r>
               <a:rPr lang="en-US" dirty="0" smtClean="0"/>
-              <a:t>lastly, my-branch changes to point to the new commit</a:t>
-            </a:r>
-          </a:p>
-          <a:p>
-            <a:pPr marL="171450" indent="-171450">
-              <a:buFontTx/>
-              <a:buChar char="-"/>
-            </a:pPr>
-            <a:r>
-              <a:rPr lang="en-US" dirty="0" smtClean="0"/>
-              <a:t>at this point</a:t>
+              <a:t>the</a:t>
             </a:r>
             <a:r>
               <a:rPr lang="en-US" baseline="0" dirty="0" smtClean="0"/>
-              <a:t> we are done with the rebase and the history is linear</a:t>
-            </a:r>
-            <a:endParaRPr lang="en-US" dirty="0" smtClean="0"/>
-          </a:p>
-          <a:p>
-            <a:pPr marL="171450" indent="-171450">
-              <a:buFontTx/>
-              <a:buChar char="-"/>
-            </a:pPr>
-            <a:r>
-              <a:rPr lang="en-US" dirty="0" smtClean="0"/>
-              <a:t>the commits E and D are no longer reachable by any</a:t>
-            </a:r>
-            <a:r>
-              <a:rPr lang="en-US" baseline="0" dirty="0" smtClean="0"/>
-              <a:t> branch or tag, so they will be garbage collected in time. GIT performs garbage collection automatically from time to time, and you can also manually force it using the “</a:t>
-            </a:r>
-            <a:r>
-              <a:rPr lang="en-US" baseline="0" dirty="0" err="1" smtClean="0"/>
-              <a:t>git</a:t>
-            </a:r>
-            <a:r>
-              <a:rPr lang="en-US" baseline="0" dirty="0" smtClean="0"/>
-              <a:t> </a:t>
-            </a:r>
-            <a:r>
-              <a:rPr lang="en-US" baseline="0" dirty="0" err="1" smtClean="0"/>
-              <a:t>gc</a:t>
-            </a:r>
-            <a:r>
-              <a:rPr lang="en-US" baseline="0" dirty="0" smtClean="0"/>
-              <a:t>” command</a:t>
-            </a:r>
-          </a:p>
-          <a:p>
-            <a:pPr marL="171450" indent="-171450">
-              <a:buFontTx/>
-              <a:buChar char="-"/>
-            </a:pPr>
-            <a:r>
-              <a:rPr lang="en-US" baseline="0" dirty="0" smtClean="0"/>
-              <a:t>What if you made a mistake? For example you manually solved conflicts incorrectly, and you want to re-try the rebase. Since the commits E and D are not yet deleted, we can. We’ll take a look at an example during the workshop when we discuss about the “</a:t>
-            </a:r>
-            <a:r>
-              <a:rPr lang="en-US" baseline="0" dirty="0" err="1" smtClean="0"/>
-              <a:t>git</a:t>
-            </a:r>
-            <a:r>
-              <a:rPr lang="en-US" baseline="0" dirty="0" smtClean="0"/>
-              <a:t> </a:t>
-            </a:r>
-            <a:r>
-              <a:rPr lang="en-US" baseline="0" dirty="0" err="1" smtClean="0"/>
-              <a:t>reflog</a:t>
-            </a:r>
-            <a:r>
-              <a:rPr lang="en-US" baseline="0" dirty="0" smtClean="0"/>
-              <a:t>” command.</a:t>
-            </a:r>
-            <a:endParaRPr lang="en-US" dirty="0" smtClean="0"/>
-          </a:p>
-          <a:p>
-            <a:pPr marL="171450" indent="-171450">
-              <a:buFontTx/>
-              <a:buChar char="-"/>
-            </a:pPr>
-            <a:r>
-              <a:rPr lang="en-US" dirty="0" smtClean="0"/>
-              <a:t>don’t rebase public history</a:t>
+              <a:t> commit D' is created that introduces the same changes as D</a:t>
             </a:r>
             <a:endParaRPr dirty="0"/>
           </a:p>
@@ -2433,7 +2360,7 @@
     </p:spTree>
     <p:extLst>
       <p:ext uri="{BB962C8B-B14F-4D97-AF65-F5344CB8AC3E}">
-        <p14:creationId xmlns:p14="http://schemas.microsoft.com/office/powerpoint/2010/main" val="3080892451"/>
+        <p14:creationId xmlns:p14="http://schemas.microsoft.com/office/powerpoint/2010/main" val="1510356220"/>
       </p:ext>
     </p:extLst>
   </p:cSld>
@@ -2485,11 +2412,97 @@
           </a:bodyPr>
           <a:lstStyle/>
           <a:p>
-            <a:pPr marL="171450" lvl="0" indent="-171450">
+            <a:pPr marL="171450" indent="-171450">
               <a:buFontTx/>
               <a:buChar char="-"/>
             </a:pPr>
+            <a:r>
+              <a:rPr lang="en-US" dirty="0" smtClean="0"/>
+              <a:t>lastly, my-branch changes to point to the new commit</a:t>
+            </a:r>
+          </a:p>
+          <a:p>
+            <a:pPr marL="171450" indent="-171450">
+              <a:buFontTx/>
+              <a:buChar char="-"/>
+            </a:pPr>
+            <a:r>
+              <a:rPr lang="en-US" dirty="0" smtClean="0"/>
+              <a:t>at this point</a:t>
+            </a:r>
+            <a:r>
+              <a:rPr lang="en-US" baseline="0" dirty="0" smtClean="0"/>
+              <a:t> we are done with the rebase and the history is linear</a:t>
+            </a:r>
             <a:endParaRPr lang="en-US" dirty="0" smtClean="0"/>
+          </a:p>
+          <a:p>
+            <a:pPr marL="171450" indent="-171450">
+              <a:buFontTx/>
+              <a:buChar char="-"/>
+            </a:pPr>
+            <a:r>
+              <a:rPr lang="en-US" dirty="0" smtClean="0"/>
+              <a:t>the commits E and D are no longer reachable by any</a:t>
+            </a:r>
+            <a:r>
+              <a:rPr lang="en-US" baseline="0" dirty="0" smtClean="0"/>
+              <a:t> branch or tag, so they will be garbage collected in time. GIT performs garbage collection automatically from time to time, and you can also manually force it using the “</a:t>
+            </a:r>
+            <a:r>
+              <a:rPr lang="en-US" baseline="0" dirty="0" err="1" smtClean="0"/>
+              <a:t>git</a:t>
+            </a:r>
+            <a:r>
+              <a:rPr lang="en-US" baseline="0" dirty="0" smtClean="0"/>
+              <a:t> </a:t>
+            </a:r>
+            <a:r>
+              <a:rPr lang="en-US" baseline="0" dirty="0" err="1" smtClean="0"/>
+              <a:t>gc</a:t>
+            </a:r>
+            <a:r>
+              <a:rPr lang="en-US" baseline="0" dirty="0" smtClean="0"/>
+              <a:t>” command</a:t>
+            </a:r>
+          </a:p>
+          <a:p>
+            <a:pPr marL="171450" indent="-171450">
+              <a:buFontTx/>
+              <a:buChar char="-"/>
+            </a:pPr>
+            <a:r>
+              <a:rPr lang="en-US" baseline="0" dirty="0" smtClean="0"/>
+              <a:t>What if you made a mistake? For example you manually solved conflicts incorrectly, and you want to re-try the rebase. Since the commits E and D are not yet deleted, we can. We’ll take a look at an example during the workshop when we discuss about the “</a:t>
+            </a:r>
+            <a:r>
+              <a:rPr lang="en-US" baseline="0" dirty="0" err="1" smtClean="0"/>
+              <a:t>git</a:t>
+            </a:r>
+            <a:r>
+              <a:rPr lang="en-US" baseline="0" dirty="0" smtClean="0"/>
+              <a:t> </a:t>
+            </a:r>
+            <a:r>
+              <a:rPr lang="en-US" baseline="0" dirty="0" err="1" smtClean="0"/>
+              <a:t>reflog</a:t>
+            </a:r>
+            <a:r>
+              <a:rPr lang="en-US" baseline="0" dirty="0" smtClean="0"/>
+              <a:t>” command.</a:t>
+            </a:r>
+            <a:endParaRPr lang="en-US" dirty="0" smtClean="0"/>
+          </a:p>
+          <a:p>
+            <a:pPr marL="171450" indent="-171450">
+              <a:buFontTx/>
+              <a:buChar char="-"/>
+            </a:pPr>
+            <a:r>
+              <a:rPr lang="en-US" dirty="0" smtClean="0"/>
+              <a:t>don’t rebase public history</a:t>
+            </a:r>
+            <a:endParaRPr dirty="0"/>
           </a:p>
         </p:txBody>
       </p:sp>
@@ -2537,7 +2550,7 @@
     </p:spTree>
     <p:extLst>
       <p:ext uri="{BB962C8B-B14F-4D97-AF65-F5344CB8AC3E}">
-        <p14:creationId xmlns:p14="http://schemas.microsoft.com/office/powerpoint/2010/main" val="2140635485"/>
+        <p14:creationId xmlns:p14="http://schemas.microsoft.com/office/powerpoint/2010/main" val="3080892451"/>
       </p:ext>
     </p:extLst>
   </p:cSld>
@@ -2589,120 +2602,9 @@
           </a:bodyPr>
           <a:lstStyle/>
           <a:p>
-            <a:pPr marL="171450" indent="-171450">
+            <a:pPr marL="171450" lvl="0" indent="-171450">
               <a:buFontTx/>
               <a:buChar char="-"/>
-            </a:pPr>
-            <a:r>
-              <a:rPr lang="en-US" dirty="0" smtClean="0"/>
-              <a:t>the</a:t>
-            </a:r>
-            <a:r>
-              <a:rPr lang="en-US" baseline="0" dirty="0" smtClean="0"/>
-              <a:t> commits A, B, and C in the local repository are identical to A, B, and C in the remote repository – the have the same SHA1 ID</a:t>
-            </a:r>
-            <a:endParaRPr lang="en-US" dirty="0" smtClean="0"/>
-          </a:p>
-          <a:p>
-            <a:pPr marL="171450" indent="-171450">
-              <a:buFontTx/>
-              <a:buChar char="-"/>
-            </a:pPr>
-            <a:r>
-              <a:rPr lang="en-US" dirty="0" smtClean="0"/>
-              <a:t>2 branches are created:</a:t>
-            </a:r>
-          </a:p>
-          <a:p>
-            <a:pPr marL="628650" lvl="1" indent="-171450">
-              <a:buFontTx/>
-              <a:buChar char="-"/>
-            </a:pPr>
-            <a:r>
-              <a:rPr lang="en-US" dirty="0" smtClean="0"/>
-              <a:t>remotes/origin/master</a:t>
-            </a:r>
-          </a:p>
-          <a:p>
-            <a:pPr marL="1085850" lvl="2" indent="-171450">
-              <a:buFontTx/>
-              <a:buChar char="-"/>
-            </a:pPr>
-            <a:r>
-              <a:rPr lang="en-US" baseline="0" dirty="0" smtClean="0"/>
-              <a:t>t</a:t>
-            </a:r>
-            <a:r>
-              <a:rPr lang="en-US" dirty="0" smtClean="0"/>
-              <a:t>his is</a:t>
-            </a:r>
-            <a:r>
-              <a:rPr lang="en-US" baseline="0" dirty="0" smtClean="0"/>
-              <a:t> what you local repository thinks that the remote branch looks like.</a:t>
-            </a:r>
-          </a:p>
-          <a:p>
-            <a:pPr marL="1085850" lvl="2" indent="-171450">
-              <a:buFontTx/>
-              <a:buChar char="-"/>
-            </a:pPr>
-            <a:r>
-              <a:rPr lang="en-US" baseline="0" dirty="0" smtClean="0"/>
-              <a:t>never commit on this branch</a:t>
-            </a:r>
-          </a:p>
-          <a:p>
-            <a:pPr marL="1085850" lvl="2" indent="-171450">
-              <a:buFontTx/>
-              <a:buChar char="-"/>
-            </a:pPr>
-            <a:r>
-              <a:rPr lang="en-US" baseline="0" dirty="0" smtClean="0"/>
-              <a:t>this branch will only be updated when you pull changes from the remote repository</a:t>
-            </a:r>
-          </a:p>
-          <a:p>
-            <a:pPr marL="628650" lvl="1" indent="-171450">
-              <a:buFontTx/>
-              <a:buChar char="-"/>
-            </a:pPr>
-            <a:r>
-              <a:rPr lang="en-US" baseline="0" dirty="0" smtClean="0"/>
-              <a:t>master</a:t>
-            </a:r>
-          </a:p>
-          <a:p>
-            <a:pPr marL="1085850" lvl="2" indent="-171450">
-              <a:buFontTx/>
-              <a:buChar char="-"/>
-            </a:pPr>
-            <a:r>
-              <a:rPr lang="en-US" baseline="0" dirty="0" smtClean="0"/>
-              <a:t>this is where you will do your commits</a:t>
-            </a:r>
-          </a:p>
-          <a:p>
-            <a:pPr marL="1085850" lvl="2" indent="-171450">
-              <a:buFontTx/>
-              <a:buChar char="-"/>
-            </a:pPr>
-            <a:r>
-              <a:rPr lang="en-US" baseline="0" dirty="0" smtClean="0"/>
-              <a:t>notice this is the current branch after clone</a:t>
-            </a:r>
-            <a:endParaRPr lang="en-US" dirty="0" smtClean="0"/>
-          </a:p>
-          <a:p>
-            <a:pPr marL="628650" lvl="1" indent="-171450">
-              <a:buFontTx/>
-              <a:buChar char="-"/>
-            </a:pPr>
-            <a:endParaRPr lang="en-US" dirty="0" smtClean="0"/>
-          </a:p>
-          <a:p>
-            <a:pPr marL="457200" lvl="1" indent="0">
-              <a:buFontTx/>
-              <a:buNone/>
             </a:pPr>
             <a:endParaRPr lang="en-US" dirty="0" smtClean="0"/>
           </a:p>
@@ -2752,7 +2654,7 @@
     </p:spTree>
     <p:extLst>
       <p:ext uri="{BB962C8B-B14F-4D97-AF65-F5344CB8AC3E}">
-        <p14:creationId xmlns:p14="http://schemas.microsoft.com/office/powerpoint/2010/main" val="4126286845"/>
+        <p14:creationId xmlns:p14="http://schemas.microsoft.com/office/powerpoint/2010/main" val="2140635485"/>
       </p:ext>
     </p:extLst>
   </p:cSld>
@@ -2804,29 +2706,6 @@
           </a:bodyPr>
           <a:lstStyle/>
           <a:p>
-            <a:pPr marL="171450" marR="0" indent="-171450" algn="l" defTabSz="914400" rtl="0" eaLnBrk="1" fontAlgn="auto" latinLnBrk="0" hangingPunct="1">
-              <a:lnSpc>
-                <a:spcPct val="100000"/>
-              </a:lnSpc>
-              <a:spcBef>
-                <a:spcPts val="0"/>
-              </a:spcBef>
-              <a:spcAft>
-                <a:spcPts val="0"/>
-              </a:spcAft>
-              <a:buClrTx/>
-              <a:buSzTx/>
-              <a:buFontTx/>
-              <a:buChar char="-"/>
-              <a:tabLst/>
-              <a:defRPr/>
-            </a:pPr>
-            <a:r>
-              <a:rPr lang="en-US" dirty="0" smtClean="0"/>
-              <a:t>master is called a “local branch“</a:t>
-            </a:r>
-          </a:p>
-          <a:p>
             <a:pPr marL="171450" indent="-171450">
               <a:buFontTx/>
               <a:buChar char="-"/>
@@ -2837,7 +2716,18 @@
             </a:r>
             <a:r>
               <a:rPr lang="en-US" baseline="0" dirty="0" smtClean="0"/>
-              <a:t> branch "remotes/origin/master“ is called a "remote tracking branch" because it’s purpose is to track the remote branch – to be a one-to-one copy of the remote branch</a:t>
+              <a:t> commits A, B, and C in the local repository are identical to A, B, and C in the remote repository – the have the same SHA1 ID</a:t>
+            </a:r>
+            <a:endParaRPr lang="en-US" dirty="0" smtClean="0"/>
+          </a:p>
+          <a:p>
+            <a:pPr marL="171450" indent="-171450">
+              <a:buFontTx/>
+              <a:buChar char="-"/>
+            </a:pPr>
+            <a:r>
+              <a:rPr lang="en-US" dirty="0" smtClean="0"/>
+              <a:t>2 branches are created:</a:t>
             </a:r>
           </a:p>
           <a:p>
@@ -2847,11 +2737,45 @@
             </a:pPr>
             <a:r>
               <a:rPr lang="en-US" dirty="0" smtClean="0"/>
-              <a:t>all</a:t>
-            </a:r>
+              <a:t>remotes/origin/master</a:t>
+            </a:r>
+          </a:p>
+          <a:p>
+            <a:pPr marL="1085850" lvl="2" indent="-171450">
+              <a:buFontTx/>
+              <a:buChar char="-"/>
+            </a:pPr>
             <a:r>
               <a:rPr lang="en-US" baseline="0" dirty="0" smtClean="0"/>
-              <a:t> remote tracking branches are by default under "remotes/"</a:t>
+              <a:t>t</a:t>
+            </a:r>
+            <a:r>
+              <a:rPr lang="en-US" dirty="0" smtClean="0"/>
+              <a:t>his is</a:t>
+            </a:r>
+            <a:r>
+              <a:rPr lang="en-US" baseline="0" dirty="0" smtClean="0"/>
+              <a:t> what you local repository thinks that the remote branch looks like.</a:t>
+            </a:r>
+          </a:p>
+          <a:p>
+            <a:pPr marL="1085850" lvl="2" indent="-171450">
+              <a:buFontTx/>
+              <a:buChar char="-"/>
+            </a:pPr>
+            <a:r>
+              <a:rPr lang="en-US" baseline="0" dirty="0" smtClean="0"/>
+              <a:t>never commit on this branch</a:t>
+            </a:r>
+          </a:p>
+          <a:p>
+            <a:pPr marL="1085850" lvl="2" indent="-171450">
+              <a:buFontTx/>
+              <a:buChar char="-"/>
+            </a:pPr>
+            <a:r>
+              <a:rPr lang="en-US" baseline="0" dirty="0" smtClean="0"/>
+              <a:t>this branch will only be updated when you pull changes from the remote repository</a:t>
             </a:r>
           </a:p>
           <a:p>
@@ -2861,18 +2785,43 @@
             </a:pPr>
             <a:r>
               <a:rPr lang="en-US" baseline="0" dirty="0" smtClean="0"/>
-              <a:t>"origin" is a name that you give to the remote repository (GIT uses it’s URL instead) and is called a "remote". You can have multiple remotes since GIT doesn’t restrict you to communicate with only one remote repository.</a:t>
-            </a:r>
+              <a:t>master</a:t>
+            </a:r>
+          </a:p>
+          <a:p>
+            <a:pPr marL="1085850" lvl="2" indent="-171450">
+              <a:buFontTx/>
+              <a:buChar char="-"/>
+            </a:pPr>
+            <a:r>
+              <a:rPr lang="en-US" baseline="0" dirty="0" smtClean="0"/>
+              <a:t>this is where you will do your commits</a:t>
+            </a:r>
+          </a:p>
+          <a:p>
+            <a:pPr marL="1085850" lvl="2" indent="-171450">
+              <a:buFontTx/>
+              <a:buChar char="-"/>
+            </a:pPr>
+            <a:r>
+              <a:rPr lang="en-US" baseline="0" dirty="0" smtClean="0"/>
+              <a:t>notice this is the current branch after clone</a:t>
+            </a:r>
+            <a:endParaRPr lang="en-US" dirty="0" smtClean="0"/>
           </a:p>
           <a:p>
             <a:pPr marL="628650" lvl="1" indent="-171450">
               <a:buFontTx/>
               <a:buChar char="-"/>
             </a:pPr>
-            <a:r>
-              <a:rPr lang="en-US" baseline="0" dirty="0" smtClean="0"/>
-              <a:t>"origin" is the name that GIT chooses when cloning a remote repository, but there is nothing special about it</a:t>
-            </a:r>
+            <a:endParaRPr lang="en-US" dirty="0" smtClean="0"/>
+          </a:p>
+          <a:p>
+            <a:pPr marL="457200" lvl="1" indent="0">
+              <a:buFontTx/>
+              <a:buNone/>
+            </a:pPr>
+            <a:endParaRPr lang="en-US" dirty="0" smtClean="0"/>
           </a:p>
         </p:txBody>
       </p:sp>
@@ -2920,7 +2869,7 @@
     </p:spTree>
     <p:extLst>
       <p:ext uri="{BB962C8B-B14F-4D97-AF65-F5344CB8AC3E}">
-        <p14:creationId xmlns:p14="http://schemas.microsoft.com/office/powerpoint/2010/main" val="3318685764"/>
+        <p14:creationId xmlns:p14="http://schemas.microsoft.com/office/powerpoint/2010/main" val="4126286845"/>
       </p:ext>
     </p:extLst>
   </p:cSld>
@@ -2972,17 +2921,40 @@
           </a:bodyPr>
           <a:lstStyle/>
           <a:p>
+            <a:pPr marL="171450" marR="0" indent="-171450" algn="l" defTabSz="914400" rtl="0" eaLnBrk="1" fontAlgn="auto" latinLnBrk="0" hangingPunct="1">
+              <a:lnSpc>
+                <a:spcPct val="100000"/>
+              </a:lnSpc>
+              <a:spcBef>
+                <a:spcPts val="0"/>
+              </a:spcBef>
+              <a:spcAft>
+                <a:spcPts val="0"/>
+              </a:spcAft>
+              <a:buClrTx/>
+              <a:buSzTx/>
+              <a:buFontTx/>
+              <a:buChar char="-"/>
+              <a:tabLst/>
+              <a:defRPr/>
+            </a:pPr>
+            <a:r>
+              <a:rPr lang="en-US" dirty="0" smtClean="0"/>
+              <a:t>master is called a “local branch“</a:t>
+            </a:r>
+          </a:p>
+          <a:p>
             <a:pPr marL="171450" indent="-171450">
               <a:buFontTx/>
               <a:buChar char="-"/>
             </a:pPr>
             <a:r>
               <a:rPr lang="en-US" dirty="0" smtClean="0"/>
-              <a:t>master</a:t>
+              <a:t>the</a:t>
             </a:r>
             <a:r>
               <a:rPr lang="en-US" baseline="0" dirty="0" smtClean="0"/>
-              <a:t> is said to "track the upstream branch remotes/origin/master"</a:t>
+              <a:t> branch "remotes/origin/master“ is called a "remote tracking branch" because it’s purpose is to track the remote branch – to be a one-to-one copy of the remote branch</a:t>
             </a:r>
           </a:p>
           <a:p>
@@ -2991,8 +2963,12 @@
               <a:buChar char="-"/>
             </a:pPr>
             <a:r>
+              <a:rPr lang="en-US" dirty="0" smtClean="0"/>
+              <a:t>all</a:t>
+            </a:r>
+            <a:r>
               <a:rPr lang="en-US" baseline="0" dirty="0" smtClean="0"/>
-              <a:t>this link is needed for example for GIT to know to which remote repository to push changes when the current branch is master and you don't specify a remote name when pushing</a:t>
+              <a:t> remote tracking branches are by default under "remotes/"</a:t>
             </a:r>
           </a:p>
           <a:p>
@@ -3002,47 +2978,18 @@
             </a:pPr>
             <a:r>
               <a:rPr lang="en-US" baseline="0" dirty="0" smtClean="0"/>
-              <a:t>other commands that use this </a:t>
-            </a:r>
-          </a:p>
-          <a:p>
-            <a:pPr marL="1085850" lvl="2" indent="-171450">
+              <a:t>"origin" is a name that you give to the remote repository (GIT uses it’s URL instead) and is called a "remote". You can have multiple remotes since GIT doesn’t restrict you to communicate with only one remote repository.</a:t>
+            </a:r>
+          </a:p>
+          <a:p>
+            <a:pPr marL="628650" lvl="1" indent="-171450">
               <a:buFontTx/>
               <a:buChar char="-"/>
             </a:pPr>
             <a:r>
               <a:rPr lang="en-US" baseline="0" dirty="0" smtClean="0"/>
-              <a:t>merge, when you don't specify what branch to merge into the current branch</a:t>
-            </a:r>
-          </a:p>
-          <a:p>
-            <a:pPr marL="1085850" lvl="2" indent="-171450">
-              <a:buFontTx/>
-              <a:buChar char="-"/>
-            </a:pPr>
-            <a:r>
-              <a:rPr lang="en-US" baseline="0" dirty="0" smtClean="0"/>
-              <a:t>rebase, when you don't specify what on top of which branch to rebase </a:t>
-            </a:r>
-            <a:r>
-              <a:rPr lang="en-US" baseline="0" smtClean="0"/>
-              <a:t>the current branch</a:t>
-            </a:r>
-            <a:endParaRPr lang="en-US" baseline="0" dirty="0" smtClean="0"/>
-          </a:p>
-          <a:p>
-            <a:pPr marL="1085850" lvl="2" indent="-171450">
-              <a:buFontTx/>
-              <a:buChar char="-"/>
-            </a:pPr>
-            <a:endParaRPr lang="en-US" baseline="0" dirty="0" smtClean="0"/>
-          </a:p>
-          <a:p>
-            <a:pPr marL="0" indent="0">
-              <a:buFontTx/>
-              <a:buNone/>
-            </a:pPr>
-            <a:endParaRPr dirty="0"/>
+              <a:t>"origin" is the name that GIT chooses when cloning a remote repository, but there is nothing special about it</a:t>
+            </a:r>
           </a:p>
         </p:txBody>
       </p:sp>
@@ -3090,7 +3037,7 @@
     </p:spTree>
     <p:extLst>
       <p:ext uri="{BB962C8B-B14F-4D97-AF65-F5344CB8AC3E}">
-        <p14:creationId xmlns:p14="http://schemas.microsoft.com/office/powerpoint/2010/main" val="3400672015"/>
+        <p14:creationId xmlns:p14="http://schemas.microsoft.com/office/powerpoint/2010/main" val="3318685764"/>
       </p:ext>
     </p:extLst>
   </p:cSld>
@@ -3148,20 +3095,70 @@
             </a:pPr>
             <a:r>
               <a:rPr lang="en-US" dirty="0" smtClean="0"/>
-              <a:t>we</a:t>
+              <a:t>master</a:t>
             </a:r>
             <a:r>
               <a:rPr lang="en-US" baseline="0" dirty="0" smtClean="0"/>
-              <a:t> </a:t>
-            </a:r>
-            <a:r>
-              <a:rPr lang="en-US" dirty="0" smtClean="0"/>
-              <a:t>create locally 2 more commits:</a:t>
-            </a:r>
+              <a:t> is said to "track the upstream branch remotes/origin/master"</a:t>
+            </a:r>
+          </a:p>
+          <a:p>
+            <a:pPr marL="628650" lvl="1" indent="-171450">
+              <a:buFontTx/>
+              <a:buChar char="-"/>
+            </a:pPr>
             <a:r>
               <a:rPr lang="en-US" baseline="0" dirty="0" smtClean="0"/>
-              <a:t> D and E and we push them</a:t>
-            </a:r>
+              <a:t>this link is needed for example for GIT to know to which remote repository to push changes when the current branch is master and you don't specify a remote name when pushing</a:t>
+            </a:r>
+          </a:p>
+          <a:p>
+            <a:pPr marL="628650" lvl="1" indent="-171450">
+              <a:buFontTx/>
+              <a:buChar char="-"/>
+            </a:pPr>
+            <a:r>
+              <a:rPr lang="en-US" baseline="0" dirty="0" smtClean="0"/>
+              <a:t>other commands that use this </a:t>
+            </a:r>
+          </a:p>
+          <a:p>
+            <a:pPr marL="1085850" lvl="2" indent="-171450">
+              <a:buFontTx/>
+              <a:buChar char="-"/>
+            </a:pPr>
+            <a:r>
+              <a:rPr lang="en-US" baseline="0" dirty="0" smtClean="0"/>
+              <a:t>merge, when you don't specify what branch to merge into the current branch</a:t>
+            </a:r>
+          </a:p>
+          <a:p>
+            <a:pPr marL="1085850" lvl="2" indent="-171450">
+              <a:buFontTx/>
+              <a:buChar char="-"/>
+            </a:pPr>
+            <a:r>
+              <a:rPr lang="en-US" baseline="0" dirty="0" smtClean="0"/>
+              <a:t>rebase, when you don't specify what on top of which branch to rebase </a:t>
+            </a:r>
+            <a:r>
+              <a:rPr lang="en-US" baseline="0" smtClean="0"/>
+              <a:t>the current branch</a:t>
+            </a:r>
+            <a:endParaRPr lang="en-US" baseline="0" dirty="0" smtClean="0"/>
+          </a:p>
+          <a:p>
+            <a:pPr marL="1085850" lvl="2" indent="-171450">
+              <a:buFontTx/>
+              <a:buChar char="-"/>
+            </a:pPr>
+            <a:endParaRPr lang="en-US" baseline="0" dirty="0" smtClean="0"/>
+          </a:p>
+          <a:p>
+            <a:pPr marL="0" indent="0">
+              <a:buFontTx/>
+              <a:buNone/>
+            </a:pPr>
             <a:endParaRPr dirty="0"/>
           </a:p>
         </p:txBody>
@@ -3210,7 +3207,7 @@
     </p:spTree>
     <p:extLst>
       <p:ext uri="{BB962C8B-B14F-4D97-AF65-F5344CB8AC3E}">
-        <p14:creationId xmlns:p14="http://schemas.microsoft.com/office/powerpoint/2010/main" val="796577067"/>
+        <p14:creationId xmlns:p14="http://schemas.microsoft.com/office/powerpoint/2010/main" val="3400672015"/>
       </p:ext>
     </p:extLst>
   </p:cSld>
@@ -3268,12 +3265,21 @@
             </a:pPr>
             <a:r>
               <a:rPr lang="en-US" dirty="0" smtClean="0"/>
-              <a:t>first the commits D and</a:t>
+              <a:t>we</a:t>
             </a:r>
             <a:r>
               <a:rPr lang="en-US" baseline="0" dirty="0" smtClean="0"/>
-              <a:t> E are created in the remote repository. These commits are identical to D and E in the local repository – they have the same SHA1 ID</a:t>
-            </a:r>
+              <a:t> </a:t>
+            </a:r>
+            <a:r>
+              <a:rPr lang="en-US" dirty="0" smtClean="0"/>
+              <a:t>create locally 2 more commits:</a:t>
+            </a:r>
+            <a:r>
+              <a:rPr lang="en-US" baseline="0" dirty="0" smtClean="0"/>
+              <a:t> D and E and we push them</a:t>
+            </a:r>
+            <a:endParaRPr dirty="0"/>
           </a:p>
         </p:txBody>
       </p:sp>
@@ -3321,7 +3327,7 @@
     </p:spTree>
     <p:extLst>
       <p:ext uri="{BB962C8B-B14F-4D97-AF65-F5344CB8AC3E}">
-        <p14:creationId xmlns:p14="http://schemas.microsoft.com/office/powerpoint/2010/main" val="962578301"/>
+        <p14:creationId xmlns:p14="http://schemas.microsoft.com/office/powerpoint/2010/main" val="796577067"/>
       </p:ext>
     </p:extLst>
   </p:cSld>
@@ -3379,11 +3385,11 @@
             </a:pPr>
             <a:r>
               <a:rPr lang="en-US" dirty="0" smtClean="0"/>
-              <a:t>then</a:t>
+              <a:t>first the commits D and</a:t>
             </a:r>
             <a:r>
               <a:rPr lang="en-US" baseline="0" dirty="0" smtClean="0"/>
-              <a:t> the master branch on the remote repository is set to point to E (the new tip of the branch)</a:t>
+              <a:t> E are created in the remote repository. These commits are identical to D and E in the local repository – they have the same SHA1 ID</a:t>
             </a:r>
           </a:p>
         </p:txBody>
@@ -3432,7 +3438,7 @@
     </p:spTree>
     <p:extLst>
       <p:ext uri="{BB962C8B-B14F-4D97-AF65-F5344CB8AC3E}">
-        <p14:creationId xmlns:p14="http://schemas.microsoft.com/office/powerpoint/2010/main" val="1905914098"/>
+        <p14:creationId xmlns:p14="http://schemas.microsoft.com/office/powerpoint/2010/main" val="962578301"/>
       </p:ext>
     </p:extLst>
   </p:cSld>
@@ -3590,31 +3596,12 @@
             </a:pPr>
             <a:r>
               <a:rPr lang="en-US" dirty="0" smtClean="0"/>
-              <a:t>in the local repo,</a:t>
+              <a:t>then</a:t>
             </a:r>
             <a:r>
               <a:rPr lang="en-US" baseline="0" dirty="0" smtClean="0"/>
-              <a:t> </a:t>
-            </a:r>
-            <a:r>
-              <a:rPr lang="en-US" dirty="0" smtClean="0"/>
-              <a:t>the branch "remotes/origin/master" is set to point to D, since that is where</a:t>
-            </a:r>
-            <a:r>
-              <a:rPr lang="en-US" baseline="0" dirty="0" smtClean="0"/>
-              <a:t> the "master" branch points to in the remote repository</a:t>
-            </a:r>
-          </a:p>
-          <a:p>
-            <a:pPr marL="171450" indent="-171450">
-              <a:buFontTx/>
-              <a:buChar char="-"/>
-            </a:pPr>
-            <a:r>
-              <a:rPr lang="en-US" baseline="0" dirty="0" smtClean="0"/>
-              <a:t>and we are done</a:t>
-            </a:r>
-            <a:endParaRPr dirty="0"/>
+              <a:t> the master branch on the remote repository is set to point to E (the new tip of the branch)</a:t>
+            </a:r>
           </a:p>
         </p:txBody>
       </p:sp>
@@ -3662,7 +3649,7 @@
     </p:spTree>
     <p:extLst>
       <p:ext uri="{BB962C8B-B14F-4D97-AF65-F5344CB8AC3E}">
-        <p14:creationId xmlns:p14="http://schemas.microsoft.com/office/powerpoint/2010/main" val="3827576176"/>
+        <p14:creationId xmlns:p14="http://schemas.microsoft.com/office/powerpoint/2010/main" val="1905914098"/>
       </p:ext>
     </p:extLst>
   </p:cSld>
@@ -3714,13 +3701,35 @@
           </a:bodyPr>
           <a:lstStyle/>
           <a:p>
-            <a:pPr marL="0" indent="0">
+            <a:pPr marL="171450" indent="-171450">
               <a:buFontTx/>
-              <a:buNone/>
+              <a:buChar char="-"/>
             </a:pPr>
             <a:r>
               <a:rPr lang="en-US" dirty="0" smtClean="0"/>
-              <a:t>(this diagram only changes the layout)</a:t>
+              <a:t>in the local repo,</a:t>
+            </a:r>
+            <a:r>
+              <a:rPr lang="en-US" baseline="0" dirty="0" smtClean="0"/>
+              <a:t> </a:t>
+            </a:r>
+            <a:r>
+              <a:rPr lang="en-US" dirty="0" smtClean="0"/>
+              <a:t>the branch "remotes/origin/master" is set to point to D, since that is where</a:t>
+            </a:r>
+            <a:r>
+              <a:rPr lang="en-US" baseline="0" dirty="0" smtClean="0"/>
+              <a:t> the "master" branch points to in the remote repository</a:t>
+            </a:r>
+          </a:p>
+          <a:p>
+            <a:pPr marL="171450" indent="-171450">
+              <a:buFontTx/>
+              <a:buChar char="-"/>
+            </a:pPr>
+            <a:r>
+              <a:rPr lang="en-US" baseline="0" dirty="0" smtClean="0"/>
+              <a:t>and we are done</a:t>
             </a:r>
             <a:endParaRPr dirty="0"/>
           </a:p>
@@ -3770,7 +3779,7 @@
     </p:spTree>
     <p:extLst>
       <p:ext uri="{BB962C8B-B14F-4D97-AF65-F5344CB8AC3E}">
-        <p14:creationId xmlns:p14="http://schemas.microsoft.com/office/powerpoint/2010/main" val="164043609"/>
+        <p14:creationId xmlns:p14="http://schemas.microsoft.com/office/powerpoint/2010/main" val="3827576176"/>
       </p:ext>
     </p:extLst>
   </p:cSld>
@@ -3822,63 +3831,13 @@
           </a:bodyPr>
           <a:lstStyle/>
           <a:p>
-            <a:pPr marL="171450" indent="-171450">
+            <a:pPr marL="0" indent="0">
               <a:buFontTx/>
-              <a:buChar char="-"/>
+              <a:buNone/>
             </a:pPr>
             <a:r>
               <a:rPr lang="en-US" dirty="0" smtClean="0"/>
-              <a:t>we</a:t>
-            </a:r>
-            <a:r>
-              <a:rPr lang="en-US" baseline="0" dirty="0" smtClean="0"/>
-              <a:t> </a:t>
-            </a:r>
-            <a:r>
-              <a:rPr lang="en-US" dirty="0" smtClean="0"/>
-              <a:t>create locally 2 more commits:</a:t>
-            </a:r>
-            <a:r>
-              <a:rPr lang="en-US" baseline="0" dirty="0" smtClean="0"/>
-              <a:t> D and E and we push them</a:t>
-            </a:r>
-          </a:p>
-          <a:p>
-            <a:pPr marL="171450" indent="-171450">
-              <a:buFontTx/>
-              <a:buChar char="-"/>
-            </a:pPr>
-            <a:r>
-              <a:rPr lang="en-US" dirty="0" smtClean="0"/>
-              <a:t>in the mean time, someone else pushed commit F to the remote</a:t>
-            </a:r>
-            <a:r>
-              <a:rPr lang="en-US" baseline="0" dirty="0" smtClean="0"/>
-              <a:t> repo</a:t>
-            </a:r>
-          </a:p>
-          <a:p>
-            <a:pPr marL="171450" indent="-171450">
-              <a:buFontTx/>
-              <a:buChar char="-"/>
-            </a:pPr>
-            <a:r>
-              <a:rPr lang="en-US" dirty="0" smtClean="0"/>
-              <a:t>because of this, we</a:t>
-            </a:r>
-            <a:r>
-              <a:rPr lang="en-US" baseline="0" dirty="0" smtClean="0"/>
-              <a:t> won't be able to push until our master branch also contains the F commit (GIT will give an error when trying to push)</a:t>
-            </a:r>
-          </a:p>
-          <a:p>
-            <a:pPr marL="171450" indent="-171450">
-              <a:buFontTx/>
-              <a:buChar char="-"/>
-            </a:pPr>
-            <a:r>
-              <a:rPr lang="en-US" baseline="0" dirty="0" smtClean="0"/>
-              <a:t>we can incorporate the commit F using merge or rebase</a:t>
+              <a:t>(this diagram only changes the layout)</a:t>
             </a:r>
             <a:endParaRPr dirty="0"/>
           </a:p>
@@ -3928,7 +3887,7 @@
     </p:spTree>
     <p:extLst>
       <p:ext uri="{BB962C8B-B14F-4D97-AF65-F5344CB8AC3E}">
-        <p14:creationId xmlns:p14="http://schemas.microsoft.com/office/powerpoint/2010/main" val="1775467682"/>
+        <p14:creationId xmlns:p14="http://schemas.microsoft.com/office/powerpoint/2010/main" val="164043609"/>
       </p:ext>
     </p:extLst>
   </p:cSld>
@@ -3980,17 +3939,63 @@
           </a:bodyPr>
           <a:lstStyle/>
           <a:p>
-            <a:pPr marL="0" indent="0">
+            <a:pPr marL="171450" indent="-171450">
               <a:buFontTx/>
-              <a:buNone/>
+              <a:buChar char="-"/>
             </a:pPr>
             <a:r>
               <a:rPr lang="en-US" dirty="0" smtClean="0"/>
-              <a:t>(same as previous slide,</a:t>
+              <a:t>we</a:t>
             </a:r>
             <a:r>
               <a:rPr lang="en-US" baseline="0" dirty="0" smtClean="0"/>
-              <a:t> only a small re-arrangement)</a:t>
+              <a:t> </a:t>
+            </a:r>
+            <a:r>
+              <a:rPr lang="en-US" dirty="0" smtClean="0"/>
+              <a:t>create locally 2 more commits:</a:t>
+            </a:r>
+            <a:r>
+              <a:rPr lang="en-US" baseline="0" dirty="0" smtClean="0"/>
+              <a:t> D and E and we push them</a:t>
+            </a:r>
+          </a:p>
+          <a:p>
+            <a:pPr marL="171450" indent="-171450">
+              <a:buFontTx/>
+              <a:buChar char="-"/>
+            </a:pPr>
+            <a:r>
+              <a:rPr lang="en-US" dirty="0" smtClean="0"/>
+              <a:t>in the mean time, someone else pushed commit F to the remote</a:t>
+            </a:r>
+            <a:r>
+              <a:rPr lang="en-US" baseline="0" dirty="0" smtClean="0"/>
+              <a:t> repo</a:t>
+            </a:r>
+          </a:p>
+          <a:p>
+            <a:pPr marL="171450" indent="-171450">
+              <a:buFontTx/>
+              <a:buChar char="-"/>
+            </a:pPr>
+            <a:r>
+              <a:rPr lang="en-US" dirty="0" smtClean="0"/>
+              <a:t>because of this, we</a:t>
+            </a:r>
+            <a:r>
+              <a:rPr lang="en-US" baseline="0" dirty="0" smtClean="0"/>
+              <a:t> won't be able to push until our master branch also contains the F commit (GIT will give an error when trying to push)</a:t>
+            </a:r>
+          </a:p>
+          <a:p>
+            <a:pPr marL="171450" indent="-171450">
+              <a:buFontTx/>
+              <a:buChar char="-"/>
+            </a:pPr>
+            <a:r>
+              <a:rPr lang="en-US" baseline="0" dirty="0" smtClean="0"/>
+              <a:t>we can incorporate the commit F using merge or rebase</a:t>
             </a:r>
             <a:endParaRPr dirty="0"/>
           </a:p>
@@ -4040,7 +4045,7 @@
     </p:spTree>
     <p:extLst>
       <p:ext uri="{BB962C8B-B14F-4D97-AF65-F5344CB8AC3E}">
-        <p14:creationId xmlns:p14="http://schemas.microsoft.com/office/powerpoint/2010/main" val="3845787020"/>
+        <p14:creationId xmlns:p14="http://schemas.microsoft.com/office/powerpoint/2010/main" val="1775467682"/>
       </p:ext>
     </p:extLst>
   </p:cSld>
@@ -4092,71 +4097,18 @@
           </a:bodyPr>
           <a:lstStyle/>
           <a:p>
-            <a:pPr marL="171450" indent="-171450">
+            <a:pPr marL="0" indent="0">
               <a:buFontTx/>
-              <a:buChar char="-"/>
+              <a:buNone/>
             </a:pPr>
             <a:r>
               <a:rPr lang="en-US" dirty="0" smtClean="0"/>
-              <a:t>but merge or rebase are local operations</a:t>
-            </a:r>
-          </a:p>
-          <a:p>
-            <a:pPr marL="171450" indent="-171450">
-              <a:buFontTx/>
-              <a:buChar char="-"/>
-            </a:pPr>
-            <a:r>
-              <a:rPr lang="en-US" dirty="0" smtClean="0"/>
-              <a:t>to</a:t>
+              <a:t>(same as previous slide,</a:t>
             </a:r>
             <a:r>
               <a:rPr lang="en-US" baseline="0" dirty="0" smtClean="0"/>
-              <a:t> be able to merge or rebase, we first need to have the commit F in the local repository</a:t>
-            </a:r>
-          </a:p>
-          <a:p>
-            <a:pPr marL="171450" indent="-171450">
-              <a:buFontTx/>
-              <a:buChar char="-"/>
-            </a:pPr>
-            <a:r>
-              <a:rPr lang="en-US" baseline="0" dirty="0" smtClean="0"/>
-              <a:t>to get it we use the "fetch" GIT command</a:t>
-            </a:r>
-          </a:p>
-          <a:p>
-            <a:pPr marL="171450" marR="0" indent="-171450" algn="l" defTabSz="914400" rtl="0" eaLnBrk="1" fontAlgn="auto" latinLnBrk="0" hangingPunct="1">
-              <a:lnSpc>
-                <a:spcPct val="100000"/>
-              </a:lnSpc>
-              <a:spcBef>
-                <a:spcPts val="0"/>
-              </a:spcBef>
-              <a:spcAft>
-                <a:spcPts val="0"/>
-              </a:spcAft>
-              <a:buClrTx/>
-              <a:buSzTx/>
-              <a:buFontTx/>
-              <a:buChar char="-"/>
-              <a:tabLst/>
-              <a:defRPr/>
-            </a:pPr>
-            <a:r>
-              <a:rPr lang="en-US" dirty="0" smtClean="0"/>
-              <a:t>now</a:t>
-            </a:r>
-            <a:r>
-              <a:rPr lang="en-US" baseline="0" dirty="0" smtClean="0"/>
-              <a:t> we can see that the history diverged in the 2 branches</a:t>
-            </a:r>
-          </a:p>
-          <a:p>
-            <a:pPr marL="171450" indent="-171450">
-              <a:buFontTx/>
-              <a:buChar char="-"/>
-            </a:pPr>
+              <a:t> only a small re-arrangement)</a:t>
+            </a:r>
             <a:endParaRPr dirty="0"/>
           </a:p>
         </p:txBody>
@@ -4205,7 +4157,7 @@
     </p:spTree>
     <p:extLst>
       <p:ext uri="{BB962C8B-B14F-4D97-AF65-F5344CB8AC3E}">
-        <p14:creationId xmlns:p14="http://schemas.microsoft.com/office/powerpoint/2010/main" val="2874538124"/>
+        <p14:creationId xmlns:p14="http://schemas.microsoft.com/office/powerpoint/2010/main" val="3845787020"/>
       </p:ext>
     </p:extLst>
   </p:cSld>
@@ -4262,8 +4214,8 @@
               <a:buChar char="-"/>
             </a:pPr>
             <a:r>
-              <a:rPr lang="en-US" baseline="0" dirty="0" smtClean="0"/>
-              <a:t>we merge the remote tracking branch (remotes/origin/master) into the local branch (master) and this results in a new commit: G</a:t>
+              <a:rPr lang="en-US" dirty="0" smtClean="0"/>
+              <a:t>but merge or rebase are local operations</a:t>
             </a:r>
           </a:p>
           <a:p>
@@ -4272,9 +4224,57 @@
               <a:buChar char="-"/>
             </a:pPr>
             <a:r>
+              <a:rPr lang="en-US" dirty="0" smtClean="0"/>
+              <a:t>to</a:t>
+            </a:r>
+            <a:r>
               <a:rPr lang="en-US" baseline="0" dirty="0" smtClean="0"/>
-              <a:t>since our new local branch master contains all the changes in the remote repository, GIT will now allow us to push</a:t>
-            </a:r>
+              <a:t> be able to merge or rebase, we first need to have the commit F in the local repository</a:t>
+            </a:r>
+          </a:p>
+          <a:p>
+            <a:pPr marL="171450" indent="-171450">
+              <a:buFontTx/>
+              <a:buChar char="-"/>
+            </a:pPr>
+            <a:r>
+              <a:rPr lang="en-US" baseline="0" dirty="0" smtClean="0"/>
+              <a:t>to get it we use the "fetch" GIT command</a:t>
+            </a:r>
+          </a:p>
+          <a:p>
+            <a:pPr marL="171450" marR="0" indent="-171450" algn="l" defTabSz="914400" rtl="0" eaLnBrk="1" fontAlgn="auto" latinLnBrk="0" hangingPunct="1">
+              <a:lnSpc>
+                <a:spcPct val="100000"/>
+              </a:lnSpc>
+              <a:spcBef>
+                <a:spcPts val="0"/>
+              </a:spcBef>
+              <a:spcAft>
+                <a:spcPts val="0"/>
+              </a:spcAft>
+              <a:buClrTx/>
+              <a:buSzTx/>
+              <a:buFontTx/>
+              <a:buChar char="-"/>
+              <a:tabLst/>
+              <a:defRPr/>
+            </a:pPr>
+            <a:r>
+              <a:rPr lang="en-US" dirty="0" smtClean="0"/>
+              <a:t>now</a:t>
+            </a:r>
+            <a:r>
+              <a:rPr lang="en-US" baseline="0" dirty="0" smtClean="0"/>
+              <a:t> we can see that the history diverged in the 2 branches</a:t>
+            </a:r>
+          </a:p>
+          <a:p>
+            <a:pPr marL="171450" indent="-171450">
+              <a:buFontTx/>
+              <a:buChar char="-"/>
+            </a:pPr>
+            <a:endParaRPr dirty="0"/>
           </a:p>
         </p:txBody>
       </p:sp>
@@ -4322,7 +4322,7 @@
     </p:spTree>
     <p:extLst>
       <p:ext uri="{BB962C8B-B14F-4D97-AF65-F5344CB8AC3E}">
-        <p14:creationId xmlns:p14="http://schemas.microsoft.com/office/powerpoint/2010/main" val="862042354"/>
+        <p14:creationId xmlns:p14="http://schemas.microsoft.com/office/powerpoint/2010/main" val="2874538124"/>
       </p:ext>
     </p:extLst>
   </p:cSld>
@@ -4374,11 +4374,24 @@
           </a:bodyPr>
           <a:lstStyle/>
           <a:p>
-            <a:pPr marL="0" indent="0">
+            <a:pPr marL="171450" indent="-171450">
               <a:buFontTx/>
-              <a:buNone/>
-            </a:pPr>
-            <a:endParaRPr dirty="0"/>
+              <a:buChar char="-"/>
+            </a:pPr>
+            <a:r>
+              <a:rPr lang="en-US" baseline="0" dirty="0" smtClean="0"/>
+              <a:t>we merge the remote tracking branch (remotes/origin/master) into the local branch (master) and this results in a new commit: G</a:t>
+            </a:r>
+          </a:p>
+          <a:p>
+            <a:pPr marL="171450" indent="-171450">
+              <a:buFontTx/>
+              <a:buChar char="-"/>
+            </a:pPr>
+            <a:r>
+              <a:rPr lang="en-US" baseline="0" dirty="0" smtClean="0"/>
+              <a:t>since our new local branch master contains all the changes in the remote repository, GIT will now allow us to push</a:t>
+            </a:r>
           </a:p>
         </p:txBody>
       </p:sp>
@@ -4426,7 +4439,7 @@
     </p:spTree>
     <p:extLst>
       <p:ext uri="{BB962C8B-B14F-4D97-AF65-F5344CB8AC3E}">
-        <p14:creationId xmlns:p14="http://schemas.microsoft.com/office/powerpoint/2010/main" val="4246856136"/>
+        <p14:creationId xmlns:p14="http://schemas.microsoft.com/office/powerpoint/2010/main" val="862042354"/>
       </p:ext>
     </p:extLst>
   </p:cSld>
@@ -4478,26 +4491,10 @@
           </a:bodyPr>
           <a:lstStyle/>
           <a:p>
-            <a:pPr marL="171450" indent="-171450">
+            <a:pPr marL="0" indent="0">
               <a:buFontTx/>
-              <a:buChar char="-"/>
-            </a:pPr>
-            <a:r>
-              <a:rPr lang="en-US" dirty="0" smtClean="0"/>
-              <a:t>we</a:t>
-            </a:r>
-            <a:r>
-              <a:rPr lang="en-US" baseline="0" dirty="0" smtClean="0"/>
-              <a:t> </a:t>
-            </a:r>
-            <a:r>
-              <a:rPr lang="en-US" dirty="0" smtClean="0"/>
-              <a:t>create locally 2 more commits:</a:t>
-            </a:r>
-            <a:r>
-              <a:rPr lang="en-US" baseline="0" dirty="0" smtClean="0"/>
-              <a:t> D and E and we push them</a:t>
-            </a:r>
+              <a:buNone/>
+            </a:pPr>
             <a:endParaRPr dirty="0"/>
           </a:p>
         </p:txBody>
@@ -4546,7 +4543,7 @@
     </p:spTree>
     <p:extLst>
       <p:ext uri="{BB962C8B-B14F-4D97-AF65-F5344CB8AC3E}">
-        <p14:creationId xmlns:p14="http://schemas.microsoft.com/office/powerpoint/2010/main" val="3346740879"/>
+        <p14:creationId xmlns:p14="http://schemas.microsoft.com/office/powerpoint/2010/main" val="4246856136"/>
       </p:ext>
     </p:extLst>
   </p:cSld>
@@ -4666,7 +4663,7 @@
     </p:spTree>
     <p:extLst>
       <p:ext uri="{BB962C8B-B14F-4D97-AF65-F5344CB8AC3E}">
-        <p14:creationId xmlns:p14="http://schemas.microsoft.com/office/powerpoint/2010/main" val="3252484880"/>
+        <p14:creationId xmlns:p14="http://schemas.microsoft.com/office/powerpoint/2010/main" val="3346740879"/>
       </p:ext>
     </p:extLst>
   </p:cSld>
@@ -4724,12 +4721,21 @@
             </a:pPr>
             <a:r>
               <a:rPr lang="en-US" dirty="0" smtClean="0"/>
-              <a:t>let's</a:t>
+              <a:t>we</a:t>
             </a:r>
             <a:r>
               <a:rPr lang="en-US" baseline="0" dirty="0" smtClean="0"/>
-              <a:t> resolve the conflict by using rebase instead of merge</a:t>
-            </a:r>
+              <a:t> </a:t>
+            </a:r>
+            <a:r>
+              <a:rPr lang="en-US" dirty="0" smtClean="0"/>
+              <a:t>create locally 2 more commits:</a:t>
+            </a:r>
+            <a:r>
+              <a:rPr lang="en-US" baseline="0" dirty="0" smtClean="0"/>
+              <a:t> D and E and we push them</a:t>
+            </a:r>
+            <a:endParaRPr dirty="0"/>
           </a:p>
         </p:txBody>
       </p:sp>
@@ -4777,7 +4783,7 @@
     </p:spTree>
     <p:extLst>
       <p:ext uri="{BB962C8B-B14F-4D97-AF65-F5344CB8AC3E}">
-        <p14:creationId xmlns:p14="http://schemas.microsoft.com/office/powerpoint/2010/main" val="1115261495"/>
+        <p14:creationId xmlns:p14="http://schemas.microsoft.com/office/powerpoint/2010/main" val="3252484880"/>
       </p:ext>
     </p:extLst>
   </p:cSld>
@@ -4934,28 +4940,13 @@
               <a:buChar char="-"/>
             </a:pPr>
             <a:r>
+              <a:rPr lang="en-US" dirty="0" smtClean="0"/>
+              <a:t>let's</a:t>
+            </a:r>
+            <a:r>
               <a:rPr lang="en-US" baseline="0" dirty="0" smtClean="0"/>
-              <a:t>we start by fetching the changes from the remote repository, just like in the case of merge (they are both local operations</a:t>
-            </a:r>
-            <a:r>
-              <a:rPr lang="en-US" baseline="0" dirty="0" smtClean="0"/>
-              <a:t>)</a:t>
-            </a:r>
-          </a:p>
-          <a:p>
-            <a:pPr marL="171450" indent="-171450">
-              <a:buFontTx/>
-              <a:buChar char="-"/>
-            </a:pPr>
-            <a:r>
-              <a:rPr lang="en-US" baseline="0" dirty="0" smtClean="0"/>
-              <a:t>if you use GIT as an SVN client, this is the only option because rebase, unlike merge, keeps the history linear (SVN can't handle </a:t>
-            </a:r>
-            <a:r>
-              <a:rPr lang="en-US" baseline="0" smtClean="0"/>
-              <a:t>non-linear history)</a:t>
-            </a:r>
-            <a:endParaRPr dirty="0"/>
+              <a:t> resolve the conflict by using rebase instead of merge</a:t>
+            </a:r>
           </a:p>
         </p:txBody>
       </p:sp>
@@ -5003,7 +4994,7 @@
     </p:spTree>
     <p:extLst>
       <p:ext uri="{BB962C8B-B14F-4D97-AF65-F5344CB8AC3E}">
-        <p14:creationId xmlns:p14="http://schemas.microsoft.com/office/powerpoint/2010/main" val="1157381647"/>
+        <p14:creationId xmlns:p14="http://schemas.microsoft.com/office/powerpoint/2010/main" val="1115261495"/>
       </p:ext>
     </p:extLst>
   </p:cSld>
@@ -5061,31 +5052,23 @@
             </a:pPr>
             <a:r>
               <a:rPr lang="en-US" baseline="0" dirty="0" smtClean="0"/>
-              <a:t>this is how the local repository looks after rebase</a:t>
-            </a:r>
-          </a:p>
-          <a:p>
-            <a:pPr marL="171450" marR="0" indent="-171450" algn="l" defTabSz="914400" rtl="0" eaLnBrk="1" fontAlgn="auto" latinLnBrk="0" hangingPunct="1">
-              <a:lnSpc>
-                <a:spcPct val="100000"/>
-              </a:lnSpc>
-              <a:spcBef>
-                <a:spcPts val="0"/>
-              </a:spcBef>
-              <a:spcAft>
-                <a:spcPts val="0"/>
-              </a:spcAft>
-              <a:buClrTx/>
-              <a:buSzTx/>
+              <a:t>we start by fetching the changes from the remote repository, just like in the case of merge (they are both local operations)</a:t>
+            </a:r>
+          </a:p>
+          <a:p>
+            <a:pPr marL="171450" indent="-171450">
               <a:buFontTx/>
               <a:buChar char="-"/>
-              <a:tabLst/>
-              <a:defRPr/>
             </a:pPr>
             <a:r>
               <a:rPr lang="en-US" baseline="0" dirty="0" smtClean="0"/>
-              <a:t>since our new local branch master contains all the changes in the remote repository, GIT will now allow us to push</a:t>
-            </a:r>
+              <a:t>if you use GIT as an SVN client, this is the only option because rebase, unlike merge, keeps the history linear (SVN can't handle </a:t>
+            </a:r>
+            <a:r>
+              <a:rPr lang="en-US" baseline="0" smtClean="0"/>
+              <a:t>non-linear history)</a:t>
+            </a:r>
+            <a:endParaRPr dirty="0"/>
           </a:p>
         </p:txBody>
       </p:sp>
@@ -5133,7 +5116,7 @@
     </p:spTree>
     <p:extLst>
       <p:ext uri="{BB962C8B-B14F-4D97-AF65-F5344CB8AC3E}">
-        <p14:creationId xmlns:p14="http://schemas.microsoft.com/office/powerpoint/2010/main" val="4157551837"/>
+        <p14:creationId xmlns:p14="http://schemas.microsoft.com/office/powerpoint/2010/main" val="1157381647"/>
       </p:ext>
     </p:extLst>
   </p:cSld>
@@ -5189,7 +5172,33 @@
               <a:buFontTx/>
               <a:buChar char="-"/>
             </a:pPr>
-            <a:endParaRPr lang="en-US" baseline="0" dirty="0" smtClean="0"/>
+            <a:r>
+              <a:rPr lang="en-US" baseline="0" dirty="0" smtClean="0"/>
+              <a:t>this is how the local repository looks after rebase</a:t>
+            </a:r>
+          </a:p>
+          <a:p>
+            <a:pPr marL="171450" marR="0" indent="-171450" algn="l" defTabSz="914400" rtl="0" eaLnBrk="1" fontAlgn="auto" latinLnBrk="0" hangingPunct="1">
+              <a:lnSpc>
+                <a:spcPct val="100000"/>
+              </a:lnSpc>
+              <a:spcBef>
+                <a:spcPts val="0"/>
+              </a:spcBef>
+              <a:spcAft>
+                <a:spcPts val="0"/>
+              </a:spcAft>
+              <a:buClrTx/>
+              <a:buSzTx/>
+              <a:buFontTx/>
+              <a:buChar char="-"/>
+              <a:tabLst/>
+              <a:defRPr/>
+            </a:pPr>
+            <a:r>
+              <a:rPr lang="en-US" baseline="0" dirty="0" smtClean="0"/>
+              <a:t>since our new local branch master contains all the changes in the remote repository, GIT will now allow us to push</a:t>
+            </a:r>
           </a:p>
         </p:txBody>
       </p:sp>
@@ -5237,7 +5246,7 @@
     </p:spTree>
     <p:extLst>
       <p:ext uri="{BB962C8B-B14F-4D97-AF65-F5344CB8AC3E}">
-        <p14:creationId xmlns:p14="http://schemas.microsoft.com/office/powerpoint/2010/main" val="3066297034"/>
+        <p14:creationId xmlns:p14="http://schemas.microsoft.com/office/powerpoint/2010/main" val="4157551837"/>
       </p:ext>
     </p:extLst>
   </p:cSld>
@@ -5341,7 +5350,7 @@
     </p:spTree>
     <p:extLst>
       <p:ext uri="{BB962C8B-B14F-4D97-AF65-F5344CB8AC3E}">
-        <p14:creationId xmlns:p14="http://schemas.microsoft.com/office/powerpoint/2010/main" val="1501843149"/>
+        <p14:creationId xmlns:p14="http://schemas.microsoft.com/office/powerpoint/2010/main" val="3066297034"/>
       </p:ext>
     </p:extLst>
   </p:cSld>
@@ -5445,7 +5454,7 @@
     </p:spTree>
     <p:extLst>
       <p:ext uri="{BB962C8B-B14F-4D97-AF65-F5344CB8AC3E}">
-        <p14:creationId xmlns:p14="http://schemas.microsoft.com/office/powerpoint/2010/main" val="3445725188"/>
+        <p14:creationId xmlns:p14="http://schemas.microsoft.com/office/powerpoint/2010/main" val="1501843149"/>
       </p:ext>
     </p:extLst>
   </p:cSld>
@@ -5501,47 +5510,7 @@
               <a:buFontTx/>
               <a:buChar char="-"/>
             </a:pPr>
-            <a:r>
-              <a:rPr lang="en-US" baseline="0" dirty="0" smtClean="0"/>
-              <a:t>install GIT</a:t>
-            </a:r>
-          </a:p>
-          <a:p>
-            <a:pPr marL="628650" lvl="1" indent="-171450">
-              <a:buFontTx/>
-              <a:buChar char="-"/>
-            </a:pPr>
-            <a:r>
-              <a:rPr lang="en-US" baseline="0" dirty="0" smtClean="0"/>
-              <a:t>Windows</a:t>
-            </a:r>
-          </a:p>
-          <a:p>
-            <a:pPr marL="628650" lvl="1" indent="-171450">
-              <a:buFontTx/>
-              <a:buChar char="-"/>
-            </a:pPr>
-            <a:r>
-              <a:rPr lang="en-US" baseline="0" dirty="0" smtClean="0"/>
-              <a:t>Mac</a:t>
-            </a:r>
-          </a:p>
-          <a:p>
-            <a:pPr marL="171450" lvl="0" indent="-171450">
-              <a:buFontTx/>
-              <a:buChar char="-"/>
-            </a:pPr>
-            <a:r>
-              <a:rPr lang="en-US" baseline="0" dirty="0" smtClean="0"/>
-              <a:t>setup username and email</a:t>
-            </a:r>
-          </a:p>
-          <a:p>
-            <a:pPr marL="171450" lvl="0" indent="-171450">
-              <a:buFontTx/>
-              <a:buChar char="-"/>
-            </a:pPr>
-            <a:endParaRPr dirty="0"/>
+            <a:endParaRPr lang="en-US" baseline="0" dirty="0" smtClean="0"/>
           </a:p>
         </p:txBody>
       </p:sp>
@@ -5589,6 +5558,150 @@
     </p:spTree>
     <p:extLst>
       <p:ext uri="{BB962C8B-B14F-4D97-AF65-F5344CB8AC3E}">
+        <p14:creationId xmlns:p14="http://schemas.microsoft.com/office/powerpoint/2010/main" val="3445725188"/>
+      </p:ext>
+    </p:extLst>
+  </p:cSld>
+  <p:clrMapOvr>
+    <a:masterClrMapping/>
+  </p:clrMapOvr>
+</p:notes>
+</file>
+
+<file path=ppt/notesSlides/notesSlide46.xml><?xml version="1.0" encoding="utf-8"?>
+<p:notes xmlns:a="http://schemas.openxmlformats.org/drawingml/2006/main" xmlns:r="http://schemas.openxmlformats.org/officeDocument/2006/relationships" xmlns:p="http://schemas.openxmlformats.org/presentationml/2006/main" showMasterSp="0" showMasterPhAnim="0">
+  <p:cSld>
+    <p:spTree>
+      <p:nvGrpSpPr>
+        <p:cNvPr id="1" name="Shape 98"/>
+        <p:cNvGrpSpPr/>
+        <p:nvPr/>
+      </p:nvGrpSpPr>
+      <p:grpSpPr>
+        <a:xfrm>
+          <a:off x="0" y="0"/>
+          <a:ext cx="0" cy="0"/>
+          <a:chOff x="0" y="0"/>
+          <a:chExt cx="0" cy="0"/>
+        </a:xfrm>
+      </p:grpSpPr>
+      <p:sp>
+        <p:nvSpPr>
+          <p:cNvPr id="99" name="Shape 99"/>
+          <p:cNvSpPr txBox="1">
+            <a:spLocks noGrp="1"/>
+          </p:cNvSpPr>
+          <p:nvPr>
+            <p:ph type="body" idx="1"/>
+          </p:nvPr>
+        </p:nvSpPr>
+        <p:spPr>
+          <a:xfrm>
+            <a:off x="685800" y="4343400"/>
+            <a:ext cx="5486399" cy="4114800"/>
+          </a:xfrm>
+          <a:prstGeom prst="rect">
+            <a:avLst/>
+          </a:prstGeom>
+        </p:spPr>
+        <p:txBody>
+          <a:bodyPr lIns="91425" tIns="91425" rIns="91425" bIns="91425" anchor="ctr" anchorCtr="0">
+            <a:noAutofit/>
+          </a:bodyPr>
+          <a:lstStyle/>
+          <a:p>
+            <a:pPr marL="171450" indent="-171450">
+              <a:buFontTx/>
+              <a:buChar char="-"/>
+            </a:pPr>
+            <a:r>
+              <a:rPr lang="en-US" baseline="0" dirty="0" smtClean="0"/>
+              <a:t>install GIT</a:t>
+            </a:r>
+          </a:p>
+          <a:p>
+            <a:pPr marL="628650" lvl="1" indent="-171450">
+              <a:buFontTx/>
+              <a:buChar char="-"/>
+            </a:pPr>
+            <a:r>
+              <a:rPr lang="en-US" baseline="0" dirty="0" smtClean="0"/>
+              <a:t>Windows</a:t>
+            </a:r>
+          </a:p>
+          <a:p>
+            <a:pPr marL="628650" lvl="1" indent="-171450">
+              <a:buFontTx/>
+              <a:buChar char="-"/>
+            </a:pPr>
+            <a:r>
+              <a:rPr lang="en-US" baseline="0" dirty="0" smtClean="0"/>
+              <a:t>Mac</a:t>
+            </a:r>
+          </a:p>
+          <a:p>
+            <a:pPr marL="171450" lvl="0" indent="-171450">
+              <a:buFontTx/>
+              <a:buChar char="-"/>
+            </a:pPr>
+            <a:r>
+              <a:rPr lang="en-US" baseline="0" dirty="0" smtClean="0"/>
+              <a:t>setup username and email</a:t>
+            </a:r>
+          </a:p>
+          <a:p>
+            <a:pPr marL="171450" lvl="0" indent="-171450">
+              <a:buFontTx/>
+              <a:buChar char="-"/>
+            </a:pPr>
+            <a:endParaRPr dirty="0"/>
+          </a:p>
+        </p:txBody>
+      </p:sp>
+      <p:sp>
+        <p:nvSpPr>
+          <p:cNvPr id="100" name="Shape 100"/>
+          <p:cNvSpPr>
+            <a:spLocks noGrp="1" noRot="1" noChangeAspect="1"/>
+          </p:cNvSpPr>
+          <p:nvPr>
+            <p:ph type="sldImg" idx="2"/>
+          </p:nvPr>
+        </p:nvSpPr>
+        <p:spPr>
+          <a:xfrm>
+            <a:off x="1143000" y="685800"/>
+            <a:ext cx="4572000" cy="3429000"/>
+          </a:xfrm>
+          <a:custGeom>
+            <a:avLst/>
+            <a:gdLst/>
+            <a:ahLst/>
+            <a:cxnLst/>
+            <a:rect l="0" t="0" r="0" b="0"/>
+            <a:pathLst>
+              <a:path w="120000" h="120000" extrusionOk="0">
+                <a:moveTo>
+                  <a:pt x="0" y="0"/>
+                </a:moveTo>
+                <a:lnTo>
+                  <a:pt x="120000" y="0"/>
+                </a:lnTo>
+                <a:lnTo>
+                  <a:pt x="120000" y="120000"/>
+                </a:lnTo>
+                <a:lnTo>
+                  <a:pt x="0" y="120000"/>
+                </a:lnTo>
+                <a:close/>
+              </a:path>
+            </a:pathLst>
+          </a:custGeom>
+        </p:spPr>
+      </p:sp>
+    </p:spTree>
+    <p:extLst>
+      <p:ext uri="{BB962C8B-B14F-4D97-AF65-F5344CB8AC3E}">
         <p14:creationId xmlns:p14="http://schemas.microsoft.com/office/powerpoint/2010/main" val="2666093823"/>
       </p:ext>
     </p:extLst>
@@ -5599,7 +5712,7 @@
 </p:notes>
 </file>
 
-<file path=ppt/notesSlides/notesSlide46.xml><?xml version="1.0" encoding="utf-8"?>
+<file path=ppt/notesSlides/notesSlide47.xml><?xml version="1.0" encoding="utf-8"?>
 <p:notes xmlns:a="http://schemas.openxmlformats.org/drawingml/2006/main" xmlns:r="http://schemas.openxmlformats.org/officeDocument/2006/relationships" xmlns:p="http://schemas.openxmlformats.org/presentationml/2006/main" showMasterSp="0" showMasterPhAnim="0">
   <p:cSld>
     <p:spTree>
@@ -11787,7 +11900,11 @@
             </a:pPr>
             <a:r>
               <a:rPr lang="en-US" sz="3600" dirty="0" smtClean="0"/>
-              <a:t>GIT checkout my-branch</a:t>
+              <a:t>GIT checkout </a:t>
+            </a:r>
+            <a:r>
+              <a:rPr lang="en-US" sz="3600" dirty="0" smtClean="0"/>
+              <a:t>my-branch</a:t>
             </a:r>
             <a:endParaRPr lang="en-US" sz="3600" dirty="0"/>
           </a:p>
@@ -11942,43 +12059,98 @@
               <a:t>GIT </a:t>
             </a:r>
             <a:r>
-              <a:rPr lang="en-US" sz="3600" dirty="0" smtClean="0"/>
-              <a:t>merge master into my-branch /1 of 2</a:t>
+              <a:rPr lang="en-US" sz="3600" dirty="0"/>
+              <a:t>unifying divergent histories</a:t>
             </a:r>
             <a:endParaRPr lang="en-US" sz="3600" dirty="0"/>
           </a:p>
         </p:txBody>
       </p:sp>
-      <p:pic>
-        <p:nvPicPr>
-          <p:cNvPr id="3" name="Picture 2"/>
-          <p:cNvPicPr>
-            <a:picLocks noChangeAspect="1"/>
-          </p:cNvPicPr>
-          <p:nvPr/>
-        </p:nvPicPr>
-        <p:blipFill>
-          <a:blip r:embed="rId3">
-            <a:extLst>
-              <a:ext uri="{28A0092B-C50C-407E-A947-70E740481C1C}">
-                <a14:useLocalDpi xmlns:a14="http://schemas.microsoft.com/office/drawing/2010/main" val="0"/>
-              </a:ext>
-            </a:extLst>
-          </a:blip>
-          <a:stretch>
-            <a:fillRect/>
-          </a:stretch>
-        </p:blipFill>
-        <p:spPr>
-          <a:xfrm>
-            <a:off x="1233487" y="1609725"/>
-            <a:ext cx="6677025" cy="3638550"/>
-          </a:xfrm>
-          <a:prstGeom prst="rect">
-            <a:avLst/>
-          </a:prstGeom>
-        </p:spPr>
-      </p:pic>
+      <p:sp>
+        <p:nvSpPr>
+          <p:cNvPr id="5" name="Shape 96"/>
+          <p:cNvSpPr txBox="1">
+            <a:spLocks noGrp="1"/>
+          </p:cNvSpPr>
+          <p:nvPr>
+            <p:ph type="body" idx="1"/>
+          </p:nvPr>
+        </p:nvSpPr>
+        <p:spPr>
+          <a:xfrm>
+            <a:off x="341167" y="937873"/>
+            <a:ext cx="8498033" cy="5024690"/>
+          </a:xfrm>
+          <a:prstGeom prst="rect">
+            <a:avLst/>
+          </a:prstGeom>
+          <a:noFill/>
+          <a:ln>
+            <a:noFill/>
+          </a:ln>
+        </p:spPr>
+        <p:txBody>
+          <a:bodyPr lIns="68569" tIns="34275" rIns="68569" bIns="34275" anchor="t" anchorCtr="0">
+            <a:noAutofit/>
+          </a:bodyPr>
+          <a:lstStyle/>
+          <a:p>
+            <a:pPr marL="342900" indent="-342900">
+              <a:lnSpc>
+                <a:spcPct val="150000"/>
+              </a:lnSpc>
+              <a:buClr>
+                <a:srgbClr val="2E3640"/>
+              </a:buClr>
+              <a:buSzPct val="100000"/>
+              <a:buBlip>
+                <a:blip r:embed="rId3"/>
+              </a:buBlip>
+            </a:pPr>
+            <a:r>
+              <a:rPr lang="en-US" sz="2400" dirty="0" smtClean="0"/>
+              <a:t>two ways:</a:t>
+            </a:r>
+          </a:p>
+          <a:p>
+            <a:pPr marL="719138" indent="-342900">
+              <a:lnSpc>
+                <a:spcPct val="150000"/>
+              </a:lnSpc>
+              <a:buClr>
+                <a:srgbClr val="2E3640"/>
+              </a:buClr>
+              <a:buSzPct val="100000"/>
+              <a:buBlip>
+                <a:blip r:embed="rId3"/>
+              </a:buBlip>
+            </a:pPr>
+            <a:r>
+              <a:rPr lang="en-US" sz="2400" dirty="0" smtClean="0"/>
+              <a:t>merge</a:t>
+            </a:r>
+          </a:p>
+          <a:p>
+            <a:pPr marL="719138" indent="-342900">
+              <a:lnSpc>
+                <a:spcPct val="150000"/>
+              </a:lnSpc>
+              <a:buClr>
+                <a:srgbClr val="2E3640"/>
+              </a:buClr>
+              <a:buSzPct val="100000"/>
+              <a:buBlip>
+                <a:blip r:embed="rId3"/>
+              </a:buBlip>
+            </a:pPr>
+            <a:r>
+              <a:rPr lang="en-US" sz="2400" dirty="0" smtClean="0"/>
+              <a:t>rebase</a:t>
+            </a:r>
+            <a:endParaRPr lang="en-US" sz="2400" dirty="0" smtClean="0"/>
+          </a:p>
+        </p:txBody>
+      </p:sp>
     </p:spTree>
     <p:extLst>
       <p:ext uri="{BB962C8B-B14F-4D97-AF65-F5344CB8AC3E}">
@@ -12099,7 +12271,7 @@
             </a:r>
             <a:r>
               <a:rPr lang="en-US" sz="3600" dirty="0" smtClean="0"/>
-              <a:t>merge master into my-branch /2 of 2</a:t>
+              <a:t>merge master into my-branch /1 of 2</a:t>
             </a:r>
             <a:endParaRPr lang="en-US" sz="3600" dirty="0"/>
           </a:p>
@@ -12107,7 +12279,7 @@
       </p:sp>
       <p:pic>
         <p:nvPicPr>
-          <p:cNvPr id="2" name="Picture 1"/>
+          <p:cNvPr id="3" name="Picture 2"/>
           <p:cNvPicPr>
             <a:picLocks noChangeAspect="1"/>
           </p:cNvPicPr>
@@ -12127,8 +12299,8 @@
         </p:blipFill>
         <p:spPr>
           <a:xfrm>
-            <a:off x="1119187" y="1595437"/>
-            <a:ext cx="6905625" cy="3667125"/>
+            <a:off x="1233487" y="1609725"/>
+            <a:ext cx="6677025" cy="3638550"/>
           </a:xfrm>
           <a:prstGeom prst="rect">
             <a:avLst/>
@@ -12138,7 +12310,7 @@
     </p:spTree>
     <p:extLst>
       <p:ext uri="{BB962C8B-B14F-4D97-AF65-F5344CB8AC3E}">
-        <p14:creationId xmlns:p14="http://schemas.microsoft.com/office/powerpoint/2010/main" val="876445211"/>
+        <p14:creationId xmlns:p14="http://schemas.microsoft.com/office/powerpoint/2010/main" val="2252654587"/>
       </p:ext>
     </p:extLst>
   </p:cSld>
@@ -12255,7 +12427,7 @@
             </a:r>
             <a:r>
               <a:rPr lang="en-US" sz="3600" dirty="0" smtClean="0"/>
-              <a:t>fast-forward merges</a:t>
+              <a:t>merge master into my-branch /2 of 2</a:t>
             </a:r>
             <a:endParaRPr lang="en-US" sz="3600" dirty="0"/>
           </a:p>
@@ -12263,7 +12435,7 @@
       </p:sp>
       <p:pic>
         <p:nvPicPr>
-          <p:cNvPr id="4" name="Picture 3"/>
+          <p:cNvPr id="2" name="Picture 1"/>
           <p:cNvPicPr>
             <a:picLocks noChangeAspect="1"/>
           </p:cNvPicPr>
@@ -12283,8 +12455,8 @@
         </p:blipFill>
         <p:spPr>
           <a:xfrm>
-            <a:off x="2090737" y="1928812"/>
-            <a:ext cx="4962525" cy="3000375"/>
+            <a:off x="1119187" y="1595437"/>
+            <a:ext cx="6905625" cy="3667125"/>
           </a:xfrm>
           <a:prstGeom prst="rect">
             <a:avLst/>
@@ -12294,7 +12466,7 @@
     </p:spTree>
     <p:extLst>
       <p:ext uri="{BB962C8B-B14F-4D97-AF65-F5344CB8AC3E}">
-        <p14:creationId xmlns:p14="http://schemas.microsoft.com/office/powerpoint/2010/main" val="1465636522"/>
+        <p14:creationId xmlns:p14="http://schemas.microsoft.com/office/powerpoint/2010/main" val="876445211"/>
       </p:ext>
     </p:extLst>
   </p:cSld>
@@ -12411,7 +12583,7 @@
             </a:r>
             <a:r>
               <a:rPr lang="en-US" sz="3600" dirty="0" smtClean="0"/>
-              <a:t>fast-forward merge my-branch into master</a:t>
+              <a:t>fast-forward merges</a:t>
             </a:r>
             <a:endParaRPr lang="en-US" sz="3600" dirty="0"/>
           </a:p>
@@ -12419,7 +12591,7 @@
       </p:sp>
       <p:pic>
         <p:nvPicPr>
-          <p:cNvPr id="2" name="Picture 1"/>
+          <p:cNvPr id="4" name="Picture 3"/>
           <p:cNvPicPr>
             <a:picLocks noChangeAspect="1"/>
           </p:cNvPicPr>
@@ -12439,8 +12611,8 @@
         </p:blipFill>
         <p:spPr>
           <a:xfrm>
-            <a:off x="2090737" y="1933575"/>
-            <a:ext cx="4962525" cy="2990850"/>
+            <a:off x="2090737" y="1928812"/>
+            <a:ext cx="4962525" cy="3000375"/>
           </a:xfrm>
           <a:prstGeom prst="rect">
             <a:avLst/>
@@ -12450,7 +12622,7 @@
     </p:spTree>
     <p:extLst>
       <p:ext uri="{BB962C8B-B14F-4D97-AF65-F5344CB8AC3E}">
-        <p14:creationId xmlns:p14="http://schemas.microsoft.com/office/powerpoint/2010/main" val="4060379651"/>
+        <p14:creationId xmlns:p14="http://schemas.microsoft.com/office/powerpoint/2010/main" val="1465636522"/>
       </p:ext>
     </p:extLst>
   </p:cSld>
@@ -12567,15 +12739,7 @@
             </a:r>
             <a:r>
               <a:rPr lang="en-US" sz="3600" dirty="0" smtClean="0"/>
-              <a:t>merge my-branch into master forcing non-fast-forward (--no-</a:t>
-            </a:r>
-            <a:r>
-              <a:rPr lang="en-US" sz="3600" dirty="0" err="1" smtClean="0"/>
-              <a:t>ff</a:t>
-            </a:r>
-            <a:r>
-              <a:rPr lang="en-US" sz="3600" dirty="0" smtClean="0"/>
-              <a:t>)</a:t>
+              <a:t>fast-forward merge my-branch into master</a:t>
             </a:r>
             <a:endParaRPr lang="en-US" sz="3600" dirty="0"/>
           </a:p>
@@ -12603,8 +12767,8 @@
         </p:blipFill>
         <p:spPr>
           <a:xfrm>
-            <a:off x="1614487" y="1543050"/>
-            <a:ext cx="5915025" cy="3771900"/>
+            <a:off x="2090737" y="1933575"/>
+            <a:ext cx="4962525" cy="2990850"/>
           </a:xfrm>
           <a:prstGeom prst="rect">
             <a:avLst/>
@@ -12614,25 +12778,16 @@
     </p:spTree>
     <p:extLst>
       <p:ext uri="{BB962C8B-B14F-4D97-AF65-F5344CB8AC3E}">
-        <p14:creationId xmlns:p14="http://schemas.microsoft.com/office/powerpoint/2010/main" val="3900762246"/>
+        <p14:creationId xmlns:p14="http://schemas.microsoft.com/office/powerpoint/2010/main" val="4060379651"/>
       </p:ext>
     </p:extLst>
   </p:cSld>
   <p:clrMapOvr>
     <a:masterClrMapping/>
   </p:clrMapOvr>
-  <mc:AlternateContent xmlns:mc="http://schemas.openxmlformats.org/markup-compatibility/2006" xmlns:p14="http://schemas.microsoft.com/office/powerpoint/2010/main">
-    <mc:Choice Requires="p14">
-      <p:transition p14:dur="100">
-        <p:cut/>
-      </p:transition>
-    </mc:Choice>
-    <mc:Fallback xmlns="">
-      <p:transition>
-        <p:cut/>
-      </p:transition>
-    </mc:Fallback>
-  </mc:AlternateContent>
+  <p:transition spd="slow">
+    <p:cut/>
+  </p:transition>
   <p:timing>
     <p:tnLst>
       <p:par>
@@ -12735,8 +12890,20 @@
               <a:buSzPct val="25000"/>
             </a:pPr>
             <a:r>
+              <a:rPr lang="en-US" sz="3600" dirty="0"/>
+              <a:t>GIT </a:t>
+            </a:r>
+            <a:r>
               <a:rPr lang="en-US" sz="3600" dirty="0" smtClean="0"/>
-              <a:t>GIT rebase my-branch on top of master / 1 of 6</a:t>
+              <a:t>merge my-branch into master forcing non-fast-forward (--no-</a:t>
+            </a:r>
+            <a:r>
+              <a:rPr lang="en-US" sz="3600" dirty="0" err="1" smtClean="0"/>
+              <a:t>ff</a:t>
+            </a:r>
+            <a:r>
+              <a:rPr lang="en-US" sz="3600" dirty="0" smtClean="0"/>
+              <a:t>)</a:t>
             </a:r>
             <a:endParaRPr lang="en-US" sz="3600" dirty="0"/>
           </a:p>
@@ -12744,7 +12911,7 @@
       </p:sp>
       <p:pic>
         <p:nvPicPr>
-          <p:cNvPr id="7" name="Picture 6"/>
+          <p:cNvPr id="2" name="Picture 1"/>
           <p:cNvPicPr>
             <a:picLocks noChangeAspect="1"/>
           </p:cNvPicPr>
@@ -12764,8 +12931,8 @@
         </p:blipFill>
         <p:spPr>
           <a:xfrm>
-            <a:off x="1571625" y="1562100"/>
-            <a:ext cx="6000750" cy="3733800"/>
+            <a:off x="1614487" y="1543050"/>
+            <a:ext cx="5915025" cy="3771900"/>
           </a:xfrm>
           <a:prstGeom prst="rect">
             <a:avLst/>
@@ -12775,7 +12942,7 @@
     </p:spTree>
     <p:extLst>
       <p:ext uri="{BB962C8B-B14F-4D97-AF65-F5344CB8AC3E}">
-        <p14:creationId xmlns:p14="http://schemas.microsoft.com/office/powerpoint/2010/main" val="2519039036"/>
+        <p14:creationId xmlns:p14="http://schemas.microsoft.com/office/powerpoint/2010/main" val="3900762246"/>
       </p:ext>
     </p:extLst>
   </p:cSld>
@@ -12897,7 +13064,7 @@
             </a:pPr>
             <a:r>
               <a:rPr lang="en-US" sz="3600" dirty="0" smtClean="0"/>
-              <a:t>GIT rebase my-branch on top of master / 2 of 6</a:t>
+              <a:t>GIT rebase my-branch on top of master / 1 of 6</a:t>
             </a:r>
             <a:endParaRPr lang="en-US" sz="3600" dirty="0"/>
           </a:p>
@@ -12905,7 +13072,7 @@
       </p:sp>
       <p:pic>
         <p:nvPicPr>
-          <p:cNvPr id="2" name="Picture 1"/>
+          <p:cNvPr id="7" name="Picture 6"/>
           <p:cNvPicPr>
             <a:picLocks noChangeAspect="1"/>
           </p:cNvPicPr>
@@ -12925,8 +13092,8 @@
         </p:blipFill>
         <p:spPr>
           <a:xfrm>
-            <a:off x="1509712" y="1962150"/>
-            <a:ext cx="6124575" cy="2933700"/>
+            <a:off x="1571625" y="1562100"/>
+            <a:ext cx="6000750" cy="3733800"/>
           </a:xfrm>
           <a:prstGeom prst="rect">
             <a:avLst/>
@@ -12936,16 +13103,25 @@
     </p:spTree>
     <p:extLst>
       <p:ext uri="{BB962C8B-B14F-4D97-AF65-F5344CB8AC3E}">
-        <p14:creationId xmlns:p14="http://schemas.microsoft.com/office/powerpoint/2010/main" val="4105156958"/>
+        <p14:creationId xmlns:p14="http://schemas.microsoft.com/office/powerpoint/2010/main" val="2519039036"/>
       </p:ext>
     </p:extLst>
   </p:cSld>
   <p:clrMapOvr>
     <a:masterClrMapping/>
   </p:clrMapOvr>
-  <p:transition spd="slow">
-    <p:cut/>
-  </p:transition>
+  <mc:AlternateContent xmlns:mc="http://schemas.openxmlformats.org/markup-compatibility/2006" xmlns:p14="http://schemas.microsoft.com/office/powerpoint/2010/main">
+    <mc:Choice Requires="p14">
+      <p:transition p14:dur="100">
+        <p:cut/>
+      </p:transition>
+    </mc:Choice>
+    <mc:Fallback xmlns="">
+      <p:transition>
+        <p:cut/>
+      </p:transition>
+    </mc:Fallback>
+  </mc:AlternateContent>
   <p:timing>
     <p:tnLst>
       <p:par>
@@ -13049,7 +13225,7 @@
             </a:pPr>
             <a:r>
               <a:rPr lang="en-US" sz="3600" dirty="0" smtClean="0"/>
-              <a:t>GIT rebase my-branch on top of master / 3 of 6</a:t>
+              <a:t>GIT rebase my-branch on top of master / 2 of 6</a:t>
             </a:r>
             <a:endParaRPr lang="en-US" sz="3600" dirty="0"/>
           </a:p>
@@ -13077,8 +13253,8 @@
         </p:blipFill>
         <p:spPr>
           <a:xfrm>
-            <a:off x="1023937" y="1962150"/>
-            <a:ext cx="7096125" cy="2933700"/>
+            <a:off x="1509712" y="1962150"/>
+            <a:ext cx="6124575" cy="2933700"/>
           </a:xfrm>
           <a:prstGeom prst="rect">
             <a:avLst/>
@@ -13088,7 +13264,7 @@
     </p:spTree>
     <p:extLst>
       <p:ext uri="{BB962C8B-B14F-4D97-AF65-F5344CB8AC3E}">
-        <p14:creationId xmlns:p14="http://schemas.microsoft.com/office/powerpoint/2010/main" val="3597349377"/>
+        <p14:creationId xmlns:p14="http://schemas.microsoft.com/office/powerpoint/2010/main" val="4105156958"/>
       </p:ext>
     </p:extLst>
   </p:cSld>
@@ -13514,7 +13690,7 @@
             </a:pPr>
             <a:r>
               <a:rPr lang="en-US" sz="3600" dirty="0" smtClean="0"/>
-              <a:t>GIT rebase my-branch on top of master / 4 of 6</a:t>
+              <a:t>GIT rebase my-branch on top of master / 3 of 6</a:t>
             </a:r>
             <a:endParaRPr lang="en-US" sz="3600" dirty="0"/>
           </a:p>
@@ -13542,8 +13718,8 @@
         </p:blipFill>
         <p:spPr>
           <a:xfrm>
-            <a:off x="909637" y="1962150"/>
-            <a:ext cx="7324725" cy="2933700"/>
+            <a:off x="1023937" y="1962150"/>
+            <a:ext cx="7096125" cy="2933700"/>
           </a:xfrm>
           <a:prstGeom prst="rect">
             <a:avLst/>
@@ -13553,7 +13729,7 @@
     </p:spTree>
     <p:extLst>
       <p:ext uri="{BB962C8B-B14F-4D97-AF65-F5344CB8AC3E}">
-        <p14:creationId xmlns:p14="http://schemas.microsoft.com/office/powerpoint/2010/main" val="2879789484"/>
+        <p14:creationId xmlns:p14="http://schemas.microsoft.com/office/powerpoint/2010/main" val="3597349377"/>
       </p:ext>
     </p:extLst>
   </p:cSld>
@@ -13666,7 +13842,7 @@
             </a:pPr>
             <a:r>
               <a:rPr lang="en-US" sz="3600" dirty="0" smtClean="0"/>
-              <a:t>GIT rebase my-branch on top of master / 5 of 6</a:t>
+              <a:t>GIT rebase my-branch on top of master / 4 of 6</a:t>
             </a:r>
             <a:endParaRPr lang="en-US" sz="3600" dirty="0"/>
           </a:p>
@@ -13694,8 +13870,8 @@
         </p:blipFill>
         <p:spPr>
           <a:xfrm>
-            <a:off x="423862" y="1962150"/>
-            <a:ext cx="8296275" cy="2933700"/>
+            <a:off x="909637" y="1962150"/>
+            <a:ext cx="7324725" cy="2933700"/>
           </a:xfrm>
           <a:prstGeom prst="rect">
             <a:avLst/>
@@ -13705,7 +13881,7 @@
     </p:spTree>
     <p:extLst>
       <p:ext uri="{BB962C8B-B14F-4D97-AF65-F5344CB8AC3E}">
-        <p14:creationId xmlns:p14="http://schemas.microsoft.com/office/powerpoint/2010/main" val="1129268425"/>
+        <p14:creationId xmlns:p14="http://schemas.microsoft.com/office/powerpoint/2010/main" val="2879789484"/>
       </p:ext>
     </p:extLst>
   </p:cSld>
@@ -13818,7 +13994,7 @@
             </a:pPr>
             <a:r>
               <a:rPr lang="en-US" sz="3600" dirty="0" smtClean="0"/>
-              <a:t>GIT rebase my-branch on top of master / 6 of 6</a:t>
+              <a:t>GIT rebase my-branch on top of master / 5 of 6</a:t>
             </a:r>
             <a:endParaRPr lang="en-US" sz="3600" dirty="0"/>
           </a:p>
@@ -13846,8 +14022,8 @@
         </p:blipFill>
         <p:spPr>
           <a:xfrm>
-            <a:off x="309562" y="1962150"/>
-            <a:ext cx="8524875" cy="2933700"/>
+            <a:off x="423862" y="1962150"/>
+            <a:ext cx="8296275" cy="2933700"/>
           </a:xfrm>
           <a:prstGeom prst="rect">
             <a:avLst/>
@@ -13857,7 +14033,7 @@
     </p:spTree>
     <p:extLst>
       <p:ext uri="{BB962C8B-B14F-4D97-AF65-F5344CB8AC3E}">
-        <p14:creationId xmlns:p14="http://schemas.microsoft.com/office/powerpoint/2010/main" val="4010013225"/>
+        <p14:creationId xmlns:p14="http://schemas.microsoft.com/office/powerpoint/2010/main" val="1129268425"/>
       </p:ext>
     </p:extLst>
   </p:cSld>
@@ -13970,64 +14146,9 @@
             </a:pPr>
             <a:r>
               <a:rPr lang="en-US" sz="3600" dirty="0" smtClean="0"/>
-              <a:t>GIT clone / 1 of 4</a:t>
-            </a:r>
-          </a:p>
-        </p:txBody>
-      </p:sp>
-      <p:sp>
-        <p:nvSpPr>
-          <p:cNvPr id="11" name="Shape 96"/>
-          <p:cNvSpPr txBox="1">
-            <a:spLocks noGrp="1"/>
-          </p:cNvSpPr>
-          <p:nvPr>
-            <p:ph type="body" idx="1"/>
-          </p:nvPr>
-        </p:nvSpPr>
-        <p:spPr>
-          <a:xfrm>
-            <a:off x="341167" y="937873"/>
-            <a:ext cx="8498033" cy="5024690"/>
-          </a:xfrm>
-          <a:prstGeom prst="rect">
-            <a:avLst/>
-          </a:prstGeom>
-          <a:noFill/>
-          <a:ln>
-            <a:noFill/>
-          </a:ln>
-        </p:spPr>
-        <p:txBody>
-          <a:bodyPr lIns="68569" tIns="34275" rIns="68569" bIns="34275" anchor="t" anchorCtr="0">
-            <a:noAutofit/>
-          </a:bodyPr>
-          <a:lstStyle/>
-          <a:p>
-            <a:pPr marL="355600" indent="-355600">
-              <a:lnSpc>
-                <a:spcPct val="90000"/>
-              </a:lnSpc>
-              <a:buClr>
-                <a:srgbClr val="2E3640"/>
-              </a:buClr>
-              <a:buSzPct val="100000"/>
-              <a:buBlip>
-                <a:blip r:embed="rId3"/>
-              </a:buBlip>
-            </a:pPr>
-            <a:r>
-              <a:rPr lang="en-US" sz="2400" dirty="0" smtClean="0"/>
-              <a:t>use "</a:t>
-            </a:r>
-            <a:r>
-              <a:rPr lang="en-US" sz="2400" dirty="0" err="1" smtClean="0"/>
-              <a:t>git</a:t>
-            </a:r>
-            <a:r>
-              <a:rPr lang="en-US" sz="2400" dirty="0" smtClean="0"/>
-              <a:t> clone" to "copy" a remote repository, to start work</a:t>
-            </a:r>
+              <a:t>GIT rebase my-branch on top of master / 6 of 6</a:t>
+            </a:r>
+            <a:endParaRPr lang="en-US" sz="3600" dirty="0"/>
           </a:p>
         </p:txBody>
       </p:sp>
@@ -14040,7 +14161,7 @@
           <p:nvPr/>
         </p:nvPicPr>
         <p:blipFill>
-          <a:blip r:embed="rId4">
+          <a:blip r:embed="rId3">
             <a:extLst>
               <a:ext uri="{28A0092B-C50C-407E-A947-70E740481C1C}">
                 <a14:useLocalDpi xmlns:a14="http://schemas.microsoft.com/office/drawing/2010/main" val="0"/>
@@ -14053,8 +14174,8 @@
         </p:blipFill>
         <p:spPr>
           <a:xfrm>
-            <a:off x="4762" y="1548000"/>
-            <a:ext cx="9134475" cy="4733925"/>
+            <a:off x="309562" y="1962150"/>
+            <a:ext cx="8524875" cy="2933700"/>
           </a:xfrm>
           <a:prstGeom prst="rect">
             <a:avLst/>
@@ -14064,7 +14185,7 @@
     </p:spTree>
     <p:extLst>
       <p:ext uri="{BB962C8B-B14F-4D97-AF65-F5344CB8AC3E}">
-        <p14:creationId xmlns:p14="http://schemas.microsoft.com/office/powerpoint/2010/main" val="695698909"/>
+        <p14:creationId xmlns:p14="http://schemas.microsoft.com/office/powerpoint/2010/main" val="4010013225"/>
       </p:ext>
     </p:extLst>
   </p:cSld>
@@ -14177,21 +14298,77 @@
             </a:pPr>
             <a:r>
               <a:rPr lang="en-US" sz="3600" dirty="0" smtClean="0"/>
-              <a:t>GIT clone / 2 of 4</a:t>
+              <a:t>GIT clone / 1 of 4</a:t>
+            </a:r>
+          </a:p>
+        </p:txBody>
+      </p:sp>
+      <p:sp>
+        <p:nvSpPr>
+          <p:cNvPr id="11" name="Shape 96"/>
+          <p:cNvSpPr txBox="1">
+            <a:spLocks noGrp="1"/>
+          </p:cNvSpPr>
+          <p:nvPr>
+            <p:ph type="body" idx="1"/>
+          </p:nvPr>
+        </p:nvSpPr>
+        <p:spPr>
+          <a:xfrm>
+            <a:off x="341167" y="937873"/>
+            <a:ext cx="8498033" cy="5024690"/>
+          </a:xfrm>
+          <a:prstGeom prst="rect">
+            <a:avLst/>
+          </a:prstGeom>
+          <a:noFill/>
+          <a:ln>
+            <a:noFill/>
+          </a:ln>
+        </p:spPr>
+        <p:txBody>
+          <a:bodyPr lIns="68569" tIns="34275" rIns="68569" bIns="34275" anchor="t" anchorCtr="0">
+            <a:noAutofit/>
+          </a:bodyPr>
+          <a:lstStyle/>
+          <a:p>
+            <a:pPr marL="355600" indent="-355600">
+              <a:lnSpc>
+                <a:spcPct val="90000"/>
+              </a:lnSpc>
+              <a:buClr>
+                <a:srgbClr val="2E3640"/>
+              </a:buClr>
+              <a:buSzPct val="100000"/>
+              <a:buBlip>
+                <a:blip r:embed="rId3"/>
+              </a:buBlip>
+            </a:pPr>
+            <a:r>
+              <a:rPr lang="en-US" sz="2400" dirty="0" smtClean="0"/>
+              <a:t>use "</a:t>
+            </a:r>
+            <a:r>
+              <a:rPr lang="en-US" sz="2400" dirty="0" err="1" smtClean="0"/>
+              <a:t>git</a:t>
+            </a:r>
+            <a:r>
+              <a:rPr lang="en-US" sz="2400" dirty="0" smtClean="0"/>
+              <a:t> clone" to "copy" a remote repository, to start work</a:t>
             </a:r>
           </a:p>
         </p:txBody>
       </p:sp>
       <p:pic>
         <p:nvPicPr>
-          <p:cNvPr id="4" name="Picture 3"/>
+          <p:cNvPr id="2" name="Picture 1"/>
           <p:cNvPicPr>
             <a:picLocks noChangeAspect="1"/>
           </p:cNvPicPr>
           <p:nvPr/>
         </p:nvPicPr>
         <p:blipFill>
-          <a:blip r:embed="rId3">
+          <a:blip r:embed="rId4">
             <a:extLst>
               <a:ext uri="{28A0092B-C50C-407E-A947-70E740481C1C}">
                 <a14:useLocalDpi xmlns:a14="http://schemas.microsoft.com/office/drawing/2010/main" val="0"/>
@@ -14215,7 +14392,7 @@
     </p:spTree>
     <p:extLst>
       <p:ext uri="{BB962C8B-B14F-4D97-AF65-F5344CB8AC3E}">
-        <p14:creationId xmlns:p14="http://schemas.microsoft.com/office/powerpoint/2010/main" val="712336581"/>
+        <p14:creationId xmlns:p14="http://schemas.microsoft.com/office/powerpoint/2010/main" val="695698909"/>
       </p:ext>
     </p:extLst>
   </p:cSld>
@@ -14328,14 +14505,14 @@
             </a:pPr>
             <a:r>
               <a:rPr lang="en-US" sz="3600" dirty="0" smtClean="0"/>
-              <a:t>GIT clone / 3 of 4</a:t>
+              <a:t>GIT clone / 2 of 4</a:t>
             </a:r>
           </a:p>
         </p:txBody>
       </p:sp>
       <p:pic>
         <p:nvPicPr>
-          <p:cNvPr id="2" name="Picture 1"/>
+          <p:cNvPr id="4" name="Picture 3"/>
           <p:cNvPicPr>
             <a:picLocks noChangeAspect="1"/>
           </p:cNvPicPr>
@@ -14366,7 +14543,7 @@
     </p:spTree>
     <p:extLst>
       <p:ext uri="{BB962C8B-B14F-4D97-AF65-F5344CB8AC3E}">
-        <p14:creationId xmlns:p14="http://schemas.microsoft.com/office/powerpoint/2010/main" val="81207464"/>
+        <p14:creationId xmlns:p14="http://schemas.microsoft.com/office/powerpoint/2010/main" val="712336581"/>
       </p:ext>
     </p:extLst>
   </p:cSld>
@@ -14479,7 +14656,7 @@
             </a:pPr>
             <a:r>
               <a:rPr lang="en-US" sz="3600" dirty="0" smtClean="0"/>
-              <a:t>GIT clone / 4 of 4</a:t>
+              <a:t>GIT clone / 3 of 4</a:t>
             </a:r>
           </a:p>
         </p:txBody>
@@ -14517,7 +14694,7 @@
     </p:spTree>
     <p:extLst>
       <p:ext uri="{BB962C8B-B14F-4D97-AF65-F5344CB8AC3E}">
-        <p14:creationId xmlns:p14="http://schemas.microsoft.com/office/powerpoint/2010/main" val="3708247386"/>
+        <p14:creationId xmlns:p14="http://schemas.microsoft.com/office/powerpoint/2010/main" val="81207464"/>
       </p:ext>
     </p:extLst>
   </p:cSld>
@@ -14595,18 +14772,18 @@
       </p:sp>
       <p:sp>
         <p:nvSpPr>
-          <p:cNvPr id="96" name="Shape 96"/>
+          <p:cNvPr id="97" name="Shape 97"/>
           <p:cNvSpPr txBox="1">
             <a:spLocks noGrp="1"/>
           </p:cNvSpPr>
           <p:nvPr>
-            <p:ph type="body" idx="1"/>
-          </p:nvPr>
-        </p:nvSpPr>
-        <p:spPr>
-          <a:xfrm>
-            <a:off x="341167" y="937873"/>
-            <a:ext cx="8498033" cy="5024690"/>
+            <p:ph type="body" idx="2"/>
+          </p:nvPr>
+        </p:nvSpPr>
+        <p:spPr>
+          <a:xfrm>
+            <a:off x="341168" y="228026"/>
+            <a:ext cx="8498032" cy="457199"/>
           </a:xfrm>
           <a:prstGeom prst="rect">
             <a:avLst/>
@@ -14622,100 +14799,6 @@
           </a:bodyPr>
           <a:lstStyle/>
           <a:p>
-            <a:pPr marL="355600" indent="-355600">
-              <a:lnSpc>
-                <a:spcPct val="90000"/>
-              </a:lnSpc>
-              <a:buClr>
-                <a:srgbClr val="2E3640"/>
-              </a:buClr>
-              <a:buSzPct val="100000"/>
-              <a:buBlip>
-                <a:blip r:embed="rId3"/>
-              </a:buBlip>
-            </a:pPr>
-            <a:r>
-              <a:rPr lang="en-US" sz="2400" dirty="0" smtClean="0"/>
-              <a:t>all commit/merge/rebase operations are local</a:t>
-            </a:r>
-          </a:p>
-          <a:p>
-            <a:pPr marL="355600" indent="-355600">
-              <a:lnSpc>
-                <a:spcPct val="90000"/>
-              </a:lnSpc>
-              <a:buClr>
-                <a:srgbClr val="2E3640"/>
-              </a:buClr>
-              <a:buSzPct val="100000"/>
-              <a:buBlip>
-                <a:blip r:embed="rId3"/>
-              </a:buBlip>
-            </a:pPr>
-            <a:r>
-              <a:rPr lang="en-US" sz="2400" dirty="0" smtClean="0">
-                <a:sym typeface="Wingdings" panose="05000000000000000000" pitchFamily="2" charset="2"/>
-              </a:rPr>
-              <a:t>"</a:t>
-            </a:r>
-            <a:r>
-              <a:rPr lang="en-US" sz="2400" dirty="0" err="1" smtClean="0">
-                <a:sym typeface="Wingdings" panose="05000000000000000000" pitchFamily="2" charset="2"/>
-              </a:rPr>
-              <a:t>git</a:t>
-            </a:r>
-            <a:r>
-              <a:rPr lang="en-US" sz="2400" dirty="0" smtClean="0">
-                <a:sym typeface="Wingdings" panose="05000000000000000000" pitchFamily="2" charset="2"/>
-              </a:rPr>
-              <a:t> push" sends the commits to another GIT repo</a:t>
-            </a:r>
-          </a:p>
-          <a:p>
-            <a:pPr>
-              <a:lnSpc>
-                <a:spcPct val="90000"/>
-              </a:lnSpc>
-              <a:buClr>
-                <a:srgbClr val="2E3640"/>
-              </a:buClr>
-              <a:buSzPct val="100000"/>
-            </a:pPr>
-            <a:endParaRPr lang="en-US" sz="2400" dirty="0">
-              <a:sym typeface="Wingdings" panose="05000000000000000000" pitchFamily="2" charset="2"/>
-            </a:endParaRPr>
-          </a:p>
-        </p:txBody>
-      </p:sp>
-      <p:sp>
-        <p:nvSpPr>
-          <p:cNvPr id="97" name="Shape 97"/>
-          <p:cNvSpPr txBox="1">
-            <a:spLocks noGrp="1"/>
-          </p:cNvSpPr>
-          <p:nvPr>
-            <p:ph type="body" idx="2"/>
-          </p:nvPr>
-        </p:nvSpPr>
-        <p:spPr>
-          <a:xfrm>
-            <a:off x="341168" y="228026"/>
-            <a:ext cx="8498032" cy="457199"/>
-          </a:xfrm>
-          <a:prstGeom prst="rect">
-            <a:avLst/>
-          </a:prstGeom>
-          <a:noFill/>
-          <a:ln>
-            <a:noFill/>
-          </a:ln>
-        </p:spPr>
-        <p:txBody>
-          <a:bodyPr lIns="68569" tIns="34275" rIns="68569" bIns="34275" anchor="t" anchorCtr="0">
-            <a:noAutofit/>
-          </a:bodyPr>
-          <a:lstStyle/>
-          <a:p>
             <a:pPr>
               <a:buClr>
                 <a:schemeClr val="accent2"/>
@@ -14724,22 +14807,21 @@
             </a:pPr>
             <a:r>
               <a:rPr lang="en-US" sz="3600" dirty="0" smtClean="0"/>
-              <a:t>GIT push / success case / 1 of 5</a:t>
-            </a:r>
-            <a:endParaRPr lang="en-US" sz="3600" dirty="0"/>
+              <a:t>GIT clone / 4 of 4</a:t>
+            </a:r>
           </a:p>
         </p:txBody>
       </p:sp>
       <p:pic>
         <p:nvPicPr>
-          <p:cNvPr id="5" name="Picture 4"/>
+          <p:cNvPr id="2" name="Picture 1"/>
           <p:cNvPicPr>
             <a:picLocks noChangeAspect="1"/>
           </p:cNvPicPr>
           <p:nvPr/>
         </p:nvPicPr>
         <p:blipFill>
-          <a:blip r:embed="rId4">
+          <a:blip r:embed="rId3">
             <a:extLst>
               <a:ext uri="{28A0092B-C50C-407E-A947-70E740481C1C}">
                 <a14:useLocalDpi xmlns:a14="http://schemas.microsoft.com/office/drawing/2010/main" val="0"/>
@@ -14763,7 +14845,7 @@
     </p:spTree>
     <p:extLst>
       <p:ext uri="{BB962C8B-B14F-4D97-AF65-F5344CB8AC3E}">
-        <p14:creationId xmlns:p14="http://schemas.microsoft.com/office/powerpoint/2010/main" val="396525421"/>
+        <p14:creationId xmlns:p14="http://schemas.microsoft.com/office/powerpoint/2010/main" val="3708247386"/>
       </p:ext>
     </p:extLst>
   </p:cSld>
@@ -14841,18 +14923,18 @@
       </p:sp>
       <p:sp>
         <p:nvSpPr>
-          <p:cNvPr id="97" name="Shape 97"/>
+          <p:cNvPr id="96" name="Shape 96"/>
           <p:cNvSpPr txBox="1">
             <a:spLocks noGrp="1"/>
           </p:cNvSpPr>
           <p:nvPr>
-            <p:ph type="body" idx="2"/>
-          </p:nvPr>
-        </p:nvSpPr>
-        <p:spPr>
-          <a:xfrm>
-            <a:off x="341168" y="228026"/>
-            <a:ext cx="8498032" cy="457199"/>
+            <p:ph type="body" idx="1"/>
+          </p:nvPr>
+        </p:nvSpPr>
+        <p:spPr>
+          <a:xfrm>
+            <a:off x="341167" y="937873"/>
+            <a:ext cx="8498033" cy="5024690"/>
           </a:xfrm>
           <a:prstGeom prst="rect">
             <a:avLst/>
@@ -14868,6 +14950,100 @@
           </a:bodyPr>
           <a:lstStyle/>
           <a:p>
+            <a:pPr marL="355600" indent="-355600">
+              <a:lnSpc>
+                <a:spcPct val="90000"/>
+              </a:lnSpc>
+              <a:buClr>
+                <a:srgbClr val="2E3640"/>
+              </a:buClr>
+              <a:buSzPct val="100000"/>
+              <a:buBlip>
+                <a:blip r:embed="rId3"/>
+              </a:buBlip>
+            </a:pPr>
+            <a:r>
+              <a:rPr lang="en-US" sz="2400" dirty="0" smtClean="0"/>
+              <a:t>all commit/merge/rebase operations are local</a:t>
+            </a:r>
+          </a:p>
+          <a:p>
+            <a:pPr marL="355600" indent="-355600">
+              <a:lnSpc>
+                <a:spcPct val="90000"/>
+              </a:lnSpc>
+              <a:buClr>
+                <a:srgbClr val="2E3640"/>
+              </a:buClr>
+              <a:buSzPct val="100000"/>
+              <a:buBlip>
+                <a:blip r:embed="rId3"/>
+              </a:buBlip>
+            </a:pPr>
+            <a:r>
+              <a:rPr lang="en-US" sz="2400" dirty="0" smtClean="0">
+                <a:sym typeface="Wingdings" panose="05000000000000000000" pitchFamily="2" charset="2"/>
+              </a:rPr>
+              <a:t>"</a:t>
+            </a:r>
+            <a:r>
+              <a:rPr lang="en-US" sz="2400" dirty="0" err="1" smtClean="0">
+                <a:sym typeface="Wingdings" panose="05000000000000000000" pitchFamily="2" charset="2"/>
+              </a:rPr>
+              <a:t>git</a:t>
+            </a:r>
+            <a:r>
+              <a:rPr lang="en-US" sz="2400" dirty="0" smtClean="0">
+                <a:sym typeface="Wingdings" panose="05000000000000000000" pitchFamily="2" charset="2"/>
+              </a:rPr>
+              <a:t> push" sends the commits to another GIT repo</a:t>
+            </a:r>
+          </a:p>
+          <a:p>
+            <a:pPr>
+              <a:lnSpc>
+                <a:spcPct val="90000"/>
+              </a:lnSpc>
+              <a:buClr>
+                <a:srgbClr val="2E3640"/>
+              </a:buClr>
+              <a:buSzPct val="100000"/>
+            </a:pPr>
+            <a:endParaRPr lang="en-US" sz="2400" dirty="0">
+              <a:sym typeface="Wingdings" panose="05000000000000000000" pitchFamily="2" charset="2"/>
+            </a:endParaRPr>
+          </a:p>
+        </p:txBody>
+      </p:sp>
+      <p:sp>
+        <p:nvSpPr>
+          <p:cNvPr id="97" name="Shape 97"/>
+          <p:cNvSpPr txBox="1">
+            <a:spLocks noGrp="1"/>
+          </p:cNvSpPr>
+          <p:nvPr>
+            <p:ph type="body" idx="2"/>
+          </p:nvPr>
+        </p:nvSpPr>
+        <p:spPr>
+          <a:xfrm>
+            <a:off x="341168" y="228026"/>
+            <a:ext cx="8498032" cy="457199"/>
+          </a:xfrm>
+          <a:prstGeom prst="rect">
+            <a:avLst/>
+          </a:prstGeom>
+          <a:noFill/>
+          <a:ln>
+            <a:noFill/>
+          </a:ln>
+        </p:spPr>
+        <p:txBody>
+          <a:bodyPr lIns="68569" tIns="34275" rIns="68569" bIns="34275" anchor="t" anchorCtr="0">
+            <a:noAutofit/>
+          </a:bodyPr>
+          <a:lstStyle/>
+          <a:p>
             <a:pPr>
               <a:buClr>
                 <a:schemeClr val="accent2"/>
@@ -14876,15 +15052,7 @@
             </a:pPr>
             <a:r>
               <a:rPr lang="en-US" sz="3600" dirty="0" smtClean="0"/>
-              <a:t>GIT push </a:t>
-            </a:r>
-            <a:r>
-              <a:rPr lang="en-US" sz="3600" dirty="0"/>
-              <a:t>/ success case / </a:t>
-            </a:r>
-            <a:r>
-              <a:rPr lang="en-US" sz="3600" dirty="0" smtClean="0"/>
-              <a:t>2 of 5</a:t>
+              <a:t>GIT push / success case / 1 of 5</a:t>
             </a:r>
             <a:endParaRPr lang="en-US" sz="3600" dirty="0"/>
           </a:p>
@@ -14892,14 +15060,14 @@
       </p:sp>
       <p:pic>
         <p:nvPicPr>
-          <p:cNvPr id="3" name="Picture 2"/>
+          <p:cNvPr id="5" name="Picture 4"/>
           <p:cNvPicPr>
             <a:picLocks noChangeAspect="1"/>
           </p:cNvPicPr>
           <p:nvPr/>
         </p:nvPicPr>
         <p:blipFill>
-          <a:blip r:embed="rId3">
+          <a:blip r:embed="rId4">
             <a:extLst>
               <a:ext uri="{28A0092B-C50C-407E-A947-70E740481C1C}">
                 <a14:useLocalDpi xmlns:a14="http://schemas.microsoft.com/office/drawing/2010/main" val="0"/>
@@ -14923,7 +15091,7 @@
     </p:spTree>
     <p:extLst>
       <p:ext uri="{BB962C8B-B14F-4D97-AF65-F5344CB8AC3E}">
-        <p14:creationId xmlns:p14="http://schemas.microsoft.com/office/powerpoint/2010/main" val="3838144171"/>
+        <p14:creationId xmlns:p14="http://schemas.microsoft.com/office/powerpoint/2010/main" val="396525421"/>
       </p:ext>
     </p:extLst>
   </p:cSld>
@@ -15044,7 +15212,7 @@
             </a:r>
             <a:r>
               <a:rPr lang="en-US" sz="3600" dirty="0" smtClean="0"/>
-              <a:t>3 of 5</a:t>
+              <a:t>2 of 5</a:t>
             </a:r>
             <a:endParaRPr lang="en-US" sz="3600" dirty="0"/>
           </a:p>
@@ -15052,7 +15220,7 @@
       </p:sp>
       <p:pic>
         <p:nvPicPr>
-          <p:cNvPr id="2" name="Picture 1"/>
+          <p:cNvPr id="3" name="Picture 2"/>
           <p:cNvPicPr>
             <a:picLocks noChangeAspect="1"/>
           </p:cNvPicPr>
@@ -15083,7 +15251,7 @@
     </p:spTree>
     <p:extLst>
       <p:ext uri="{BB962C8B-B14F-4D97-AF65-F5344CB8AC3E}">
-        <p14:creationId xmlns:p14="http://schemas.microsoft.com/office/powerpoint/2010/main" val="1930106349"/>
+        <p14:creationId xmlns:p14="http://schemas.microsoft.com/office/powerpoint/2010/main" val="3838144171"/>
       </p:ext>
     </p:extLst>
   </p:cSld>
@@ -15524,7 +15692,7 @@
             </a:r>
             <a:r>
               <a:rPr lang="en-US" sz="3600" dirty="0" smtClean="0"/>
-              <a:t>4 of 5</a:t>
+              <a:t>3 of 5</a:t>
             </a:r>
             <a:endParaRPr lang="en-US" sz="3600" dirty="0"/>
           </a:p>
@@ -15563,7 +15731,7 @@
     </p:spTree>
     <p:extLst>
       <p:ext uri="{BB962C8B-B14F-4D97-AF65-F5344CB8AC3E}">
-        <p14:creationId xmlns:p14="http://schemas.microsoft.com/office/powerpoint/2010/main" val="2165262458"/>
+        <p14:creationId xmlns:p14="http://schemas.microsoft.com/office/powerpoint/2010/main" val="1930106349"/>
       </p:ext>
     </p:extLst>
   </p:cSld>
@@ -15684,7 +15852,7 @@
             </a:r>
             <a:r>
               <a:rPr lang="en-US" sz="3600" dirty="0" smtClean="0"/>
-              <a:t>5 of 5</a:t>
+              <a:t>4 of 5</a:t>
             </a:r>
             <a:endParaRPr lang="en-US" sz="3600" dirty="0"/>
           </a:p>
@@ -15723,7 +15891,7 @@
     </p:spTree>
     <p:extLst>
       <p:ext uri="{BB962C8B-B14F-4D97-AF65-F5344CB8AC3E}">
-        <p14:creationId xmlns:p14="http://schemas.microsoft.com/office/powerpoint/2010/main" val="1440731541"/>
+        <p14:creationId xmlns:p14="http://schemas.microsoft.com/office/powerpoint/2010/main" val="2165262458"/>
       </p:ext>
     </p:extLst>
   </p:cSld>
@@ -15836,7 +16004,15 @@
             </a:pPr>
             <a:r>
               <a:rPr lang="en-US" sz="3600" dirty="0" smtClean="0"/>
-              <a:t>GIT push / error case / 1 of 4</a:t>
+              <a:t>GIT push </a:t>
+            </a:r>
+            <a:r>
+              <a:rPr lang="en-US" sz="3600" dirty="0"/>
+              <a:t>/ success case / </a:t>
+            </a:r>
+            <a:r>
+              <a:rPr lang="en-US" sz="3600" dirty="0" smtClean="0"/>
+              <a:t>5 of 5</a:t>
             </a:r>
             <a:endParaRPr lang="en-US" sz="3600" dirty="0"/>
           </a:p>
@@ -15844,7 +16020,7 @@
       </p:sp>
       <p:pic>
         <p:nvPicPr>
-          <p:cNvPr id="4" name="Picture 3"/>
+          <p:cNvPr id="2" name="Picture 1"/>
           <p:cNvPicPr>
             <a:picLocks noChangeAspect="1"/>
           </p:cNvPicPr>
@@ -15875,7 +16051,7 @@
     </p:spTree>
     <p:extLst>
       <p:ext uri="{BB962C8B-B14F-4D97-AF65-F5344CB8AC3E}">
-        <p14:creationId xmlns:p14="http://schemas.microsoft.com/office/powerpoint/2010/main" val="1283107897"/>
+        <p14:creationId xmlns:p14="http://schemas.microsoft.com/office/powerpoint/2010/main" val="1440731541"/>
       </p:ext>
     </p:extLst>
   </p:cSld>
@@ -15988,7 +16164,7 @@
             </a:pPr>
             <a:r>
               <a:rPr lang="en-US" sz="3600" dirty="0" smtClean="0"/>
-              <a:t>GIT push / error case / 2 of 4</a:t>
+              <a:t>GIT push / error case / 1 of 4</a:t>
             </a:r>
             <a:endParaRPr lang="en-US" sz="3600" dirty="0"/>
           </a:p>
@@ -15996,7 +16172,7 @@
       </p:sp>
       <p:pic>
         <p:nvPicPr>
-          <p:cNvPr id="2" name="Picture 1"/>
+          <p:cNvPr id="4" name="Picture 3"/>
           <p:cNvPicPr>
             <a:picLocks noChangeAspect="1"/>
           </p:cNvPicPr>
@@ -16027,7 +16203,7 @@
     </p:spTree>
     <p:extLst>
       <p:ext uri="{BB962C8B-B14F-4D97-AF65-F5344CB8AC3E}">
-        <p14:creationId xmlns:p14="http://schemas.microsoft.com/office/powerpoint/2010/main" val="306904486"/>
+        <p14:creationId xmlns:p14="http://schemas.microsoft.com/office/powerpoint/2010/main" val="1283107897"/>
       </p:ext>
     </p:extLst>
   </p:cSld>
@@ -16140,7 +16316,7 @@
             </a:pPr>
             <a:r>
               <a:rPr lang="en-US" sz="3600" dirty="0" smtClean="0"/>
-              <a:t>GIT push / error case / 3 of 4 / fetch</a:t>
+              <a:t>GIT push / error case / 2 of 4</a:t>
             </a:r>
             <a:endParaRPr lang="en-US" sz="3600" dirty="0"/>
           </a:p>
@@ -16179,7 +16355,7 @@
     </p:spTree>
     <p:extLst>
       <p:ext uri="{BB962C8B-B14F-4D97-AF65-F5344CB8AC3E}">
-        <p14:creationId xmlns:p14="http://schemas.microsoft.com/office/powerpoint/2010/main" val="2575623364"/>
+        <p14:creationId xmlns:p14="http://schemas.microsoft.com/office/powerpoint/2010/main" val="306904486"/>
       </p:ext>
     </p:extLst>
   </p:cSld>
@@ -16292,19 +16468,7 @@
             </a:pPr>
             <a:r>
               <a:rPr lang="en-US" sz="3600" dirty="0" smtClean="0"/>
-              <a:t>GIT push / error case / 4 of 4 /</a:t>
-            </a:r>
-          </a:p>
-          <a:p>
-            <a:pPr>
-              <a:buClr>
-                <a:schemeClr val="accent2"/>
-              </a:buClr>
-              <a:buSzPct val="25000"/>
-            </a:pPr>
-            <a:r>
-              <a:rPr lang="en-US" sz="3600" dirty="0" smtClean="0"/>
-              <a:t>merge 1 of 4</a:t>
+              <a:t>GIT push / error case / 3 of 4 / fetch</a:t>
             </a:r>
             <a:endParaRPr lang="en-US" sz="3600" dirty="0"/>
           </a:p>
@@ -16333,7 +16497,7 @@
         <p:spPr>
           <a:xfrm>
             <a:off x="4762" y="1548000"/>
-            <a:ext cx="9134475" cy="4772025"/>
+            <a:ext cx="9134475" cy="4733925"/>
           </a:xfrm>
           <a:prstGeom prst="rect">
             <a:avLst/>
@@ -16343,7 +16507,7 @@
     </p:spTree>
     <p:extLst>
       <p:ext uri="{BB962C8B-B14F-4D97-AF65-F5344CB8AC3E}">
-        <p14:creationId xmlns:p14="http://schemas.microsoft.com/office/powerpoint/2010/main" val="235751654"/>
+        <p14:creationId xmlns:p14="http://schemas.microsoft.com/office/powerpoint/2010/main" val="2575623364"/>
       </p:ext>
     </p:extLst>
   </p:cSld>
@@ -16468,7 +16632,7 @@
             </a:pPr>
             <a:r>
               <a:rPr lang="en-US" sz="3600" dirty="0" smtClean="0"/>
-              <a:t>merge 2 of 4</a:t>
+              <a:t>merge 1 of 4</a:t>
             </a:r>
             <a:endParaRPr lang="en-US" sz="3600" dirty="0"/>
           </a:p>
@@ -16476,7 +16640,7 @@
       </p:sp>
       <p:pic>
         <p:nvPicPr>
-          <p:cNvPr id="3" name="Picture 2"/>
+          <p:cNvPr id="2" name="Picture 1"/>
           <p:cNvPicPr>
             <a:picLocks noChangeAspect="1"/>
           </p:cNvPicPr>
@@ -16507,7 +16671,7 @@
     </p:spTree>
     <p:extLst>
       <p:ext uri="{BB962C8B-B14F-4D97-AF65-F5344CB8AC3E}">
-        <p14:creationId xmlns:p14="http://schemas.microsoft.com/office/powerpoint/2010/main" val="452585584"/>
+        <p14:creationId xmlns:p14="http://schemas.microsoft.com/office/powerpoint/2010/main" val="235751654"/>
       </p:ext>
     </p:extLst>
   </p:cSld>
@@ -16632,7 +16796,7 @@
             </a:pPr>
             <a:r>
               <a:rPr lang="en-US" sz="3600" dirty="0" smtClean="0"/>
-              <a:t>merge 3 of 4</a:t>
+              <a:t>merge 2 of 4</a:t>
             </a:r>
             <a:endParaRPr lang="en-US" sz="3600" dirty="0"/>
           </a:p>
@@ -16640,7 +16804,7 @@
       </p:sp>
       <p:pic>
         <p:nvPicPr>
-          <p:cNvPr id="2" name="Picture 1"/>
+          <p:cNvPr id="3" name="Picture 2"/>
           <p:cNvPicPr>
             <a:picLocks noChangeAspect="1"/>
           </p:cNvPicPr>
@@ -16671,7 +16835,7 @@
     </p:spTree>
     <p:extLst>
       <p:ext uri="{BB962C8B-B14F-4D97-AF65-F5344CB8AC3E}">
-        <p14:creationId xmlns:p14="http://schemas.microsoft.com/office/powerpoint/2010/main" val="1985920915"/>
+        <p14:creationId xmlns:p14="http://schemas.microsoft.com/office/powerpoint/2010/main" val="452585584"/>
       </p:ext>
     </p:extLst>
   </p:cSld>
@@ -16796,7 +16960,7 @@
             </a:pPr>
             <a:r>
               <a:rPr lang="en-US" sz="3600" dirty="0" smtClean="0"/>
-              <a:t>merge 4 of 4</a:t>
+              <a:t>merge 3 of 4</a:t>
             </a:r>
             <a:endParaRPr lang="en-US" sz="3600" dirty="0"/>
           </a:p>
@@ -16835,7 +16999,7 @@
     </p:spTree>
     <p:extLst>
       <p:ext uri="{BB962C8B-B14F-4D97-AF65-F5344CB8AC3E}">
-        <p14:creationId xmlns:p14="http://schemas.microsoft.com/office/powerpoint/2010/main" val="1214227318"/>
+        <p14:creationId xmlns:p14="http://schemas.microsoft.com/office/powerpoint/2010/main" val="1985920915"/>
       </p:ext>
     </p:extLst>
   </p:cSld>
@@ -16948,7 +17112,19 @@
             </a:pPr>
             <a:r>
               <a:rPr lang="en-US" sz="3600" dirty="0" smtClean="0"/>
-              <a:t>GIT push / error case / 2 of 4</a:t>
+              <a:t>GIT push / error case / 4 of 4 /</a:t>
+            </a:r>
+          </a:p>
+          <a:p>
+            <a:pPr>
+              <a:buClr>
+                <a:schemeClr val="accent2"/>
+              </a:buClr>
+              <a:buSzPct val="25000"/>
+            </a:pPr>
+            <a:r>
+              <a:rPr lang="en-US" sz="3600" dirty="0" smtClean="0"/>
+              <a:t>merge 4 of 4</a:t>
             </a:r>
             <a:endParaRPr lang="en-US" sz="3600" dirty="0"/>
           </a:p>
@@ -16977,7 +17153,7 @@
         <p:spPr>
           <a:xfrm>
             <a:off x="4762" y="1548000"/>
-            <a:ext cx="9134475" cy="4733925"/>
+            <a:ext cx="9134475" cy="4772025"/>
           </a:xfrm>
           <a:prstGeom prst="rect">
             <a:avLst/>
@@ -16987,7 +17163,7 @@
     </p:spTree>
     <p:extLst>
       <p:ext uri="{BB962C8B-B14F-4D97-AF65-F5344CB8AC3E}">
-        <p14:creationId xmlns:p14="http://schemas.microsoft.com/office/powerpoint/2010/main" val="216206225"/>
+        <p14:creationId xmlns:p14="http://schemas.microsoft.com/office/powerpoint/2010/main" val="1214227318"/>
       </p:ext>
     </p:extLst>
   </p:cSld>
@@ -17263,7 +17439,7 @@
             </a:pPr>
             <a:r>
               <a:rPr lang="en-US" sz="3600" dirty="0" smtClean="0"/>
-              <a:t>GIT push / error case / 3 of 4 / fetch</a:t>
+              <a:t>GIT push / error case / 2 of 4</a:t>
             </a:r>
             <a:endParaRPr lang="en-US" sz="3600" dirty="0"/>
           </a:p>
@@ -17302,7 +17478,7 @@
     </p:spTree>
     <p:extLst>
       <p:ext uri="{BB962C8B-B14F-4D97-AF65-F5344CB8AC3E}">
-        <p14:creationId xmlns:p14="http://schemas.microsoft.com/office/powerpoint/2010/main" val="10069048"/>
+        <p14:creationId xmlns:p14="http://schemas.microsoft.com/office/powerpoint/2010/main" val="216206225"/>
       </p:ext>
     </p:extLst>
   </p:cSld>
@@ -17415,19 +17591,7 @@
             </a:pPr>
             <a:r>
               <a:rPr lang="en-US" sz="3600" dirty="0" smtClean="0"/>
-              <a:t>GIT push / error case / 4 of 4 /</a:t>
-            </a:r>
-          </a:p>
-          <a:p>
-            <a:pPr>
-              <a:buClr>
-                <a:schemeClr val="accent2"/>
-              </a:buClr>
-              <a:buSzPct val="25000"/>
-            </a:pPr>
-            <a:r>
-              <a:rPr lang="en-US" sz="3600" dirty="0" smtClean="0"/>
-              <a:t>rebase 1 of 4</a:t>
+              <a:t>GIT push / error case / 3 of 4 / fetch</a:t>
             </a:r>
             <a:endParaRPr lang="en-US" sz="3600" dirty="0"/>
           </a:p>
@@ -17435,7 +17599,7 @@
       </p:sp>
       <p:pic>
         <p:nvPicPr>
-          <p:cNvPr id="3" name="Picture 2"/>
+          <p:cNvPr id="2" name="Picture 1"/>
           <p:cNvPicPr>
             <a:picLocks noChangeAspect="1"/>
           </p:cNvPicPr>
@@ -17466,7 +17630,7 @@
     </p:spTree>
     <p:extLst>
       <p:ext uri="{BB962C8B-B14F-4D97-AF65-F5344CB8AC3E}">
-        <p14:creationId xmlns:p14="http://schemas.microsoft.com/office/powerpoint/2010/main" val="3937416856"/>
+        <p14:creationId xmlns:p14="http://schemas.microsoft.com/office/powerpoint/2010/main" val="10069048"/>
       </p:ext>
     </p:extLst>
   </p:cSld>
@@ -17591,7 +17755,7 @@
             </a:pPr>
             <a:r>
               <a:rPr lang="en-US" sz="3600" dirty="0" smtClean="0"/>
-              <a:t>rebase 2 of 4</a:t>
+              <a:t>rebase 1 of 4</a:t>
             </a:r>
             <a:endParaRPr lang="en-US" sz="3600" dirty="0"/>
           </a:p>
@@ -17599,7 +17763,7 @@
       </p:sp>
       <p:pic>
         <p:nvPicPr>
-          <p:cNvPr id="2" name="Picture 1"/>
+          <p:cNvPr id="3" name="Picture 2"/>
           <p:cNvPicPr>
             <a:picLocks noChangeAspect="1"/>
           </p:cNvPicPr>
@@ -17630,7 +17794,7 @@
     </p:spTree>
     <p:extLst>
       <p:ext uri="{BB962C8B-B14F-4D97-AF65-F5344CB8AC3E}">
-        <p14:creationId xmlns:p14="http://schemas.microsoft.com/office/powerpoint/2010/main" val="4157545078"/>
+        <p14:creationId xmlns:p14="http://schemas.microsoft.com/office/powerpoint/2010/main" val="3937416856"/>
       </p:ext>
     </p:extLst>
   </p:cSld>
@@ -17755,7 +17919,7 @@
             </a:pPr>
             <a:r>
               <a:rPr lang="en-US" sz="3600" dirty="0" smtClean="0"/>
-              <a:t>rebase 3 of 4</a:t>
+              <a:t>rebase 2 of 4</a:t>
             </a:r>
             <a:endParaRPr lang="en-US" sz="3600" dirty="0"/>
           </a:p>
@@ -17794,7 +17958,7 @@
     </p:spTree>
     <p:extLst>
       <p:ext uri="{BB962C8B-B14F-4D97-AF65-F5344CB8AC3E}">
-        <p14:creationId xmlns:p14="http://schemas.microsoft.com/office/powerpoint/2010/main" val="4134685420"/>
+        <p14:creationId xmlns:p14="http://schemas.microsoft.com/office/powerpoint/2010/main" val="4157545078"/>
       </p:ext>
     </p:extLst>
   </p:cSld>
@@ -17919,7 +18083,7 @@
             </a:pPr>
             <a:r>
               <a:rPr lang="en-US" sz="3600" dirty="0" smtClean="0"/>
-              <a:t>rebase 4 of 4</a:t>
+              <a:t>rebase 3 of 4</a:t>
             </a:r>
             <a:endParaRPr lang="en-US" sz="3600" dirty="0"/>
           </a:p>
@@ -17958,7 +18122,7 @@
     </p:spTree>
     <p:extLst>
       <p:ext uri="{BB962C8B-B14F-4D97-AF65-F5344CB8AC3E}">
-        <p14:creationId xmlns:p14="http://schemas.microsoft.com/office/powerpoint/2010/main" val="422475972"/>
+        <p14:creationId xmlns:p14="http://schemas.microsoft.com/office/powerpoint/2010/main" val="4134685420"/>
       </p:ext>
     </p:extLst>
   </p:cSld>
@@ -18036,6 +18200,170 @@
       </p:sp>
       <p:sp>
         <p:nvSpPr>
+          <p:cNvPr id="97" name="Shape 97"/>
+          <p:cNvSpPr txBox="1">
+            <a:spLocks noGrp="1"/>
+          </p:cNvSpPr>
+          <p:nvPr>
+            <p:ph type="body" idx="2"/>
+          </p:nvPr>
+        </p:nvSpPr>
+        <p:spPr>
+          <a:xfrm>
+            <a:off x="341168" y="228026"/>
+            <a:ext cx="8498032" cy="457199"/>
+          </a:xfrm>
+          <a:prstGeom prst="rect">
+            <a:avLst/>
+          </a:prstGeom>
+          <a:noFill/>
+          <a:ln>
+            <a:noFill/>
+          </a:ln>
+        </p:spPr>
+        <p:txBody>
+          <a:bodyPr lIns="68569" tIns="34275" rIns="68569" bIns="34275" anchor="t" anchorCtr="0">
+            <a:noAutofit/>
+          </a:bodyPr>
+          <a:lstStyle/>
+          <a:p>
+            <a:pPr>
+              <a:buClr>
+                <a:schemeClr val="accent2"/>
+              </a:buClr>
+              <a:buSzPct val="25000"/>
+            </a:pPr>
+            <a:r>
+              <a:rPr lang="en-US" sz="3600" dirty="0" smtClean="0"/>
+              <a:t>GIT push / error case / 4 of 4 /</a:t>
+            </a:r>
+          </a:p>
+          <a:p>
+            <a:pPr>
+              <a:buClr>
+                <a:schemeClr val="accent2"/>
+              </a:buClr>
+              <a:buSzPct val="25000"/>
+            </a:pPr>
+            <a:r>
+              <a:rPr lang="en-US" sz="3600" dirty="0" smtClean="0"/>
+              <a:t>rebase 4 of 4</a:t>
+            </a:r>
+            <a:endParaRPr lang="en-US" sz="3600" dirty="0"/>
+          </a:p>
+        </p:txBody>
+      </p:sp>
+      <p:pic>
+        <p:nvPicPr>
+          <p:cNvPr id="2" name="Picture 1"/>
+          <p:cNvPicPr>
+            <a:picLocks noChangeAspect="1"/>
+          </p:cNvPicPr>
+          <p:nvPr/>
+        </p:nvPicPr>
+        <p:blipFill>
+          <a:blip r:embed="rId3">
+            <a:extLst>
+              <a:ext uri="{28A0092B-C50C-407E-A947-70E740481C1C}">
+                <a14:useLocalDpi xmlns:a14="http://schemas.microsoft.com/office/drawing/2010/main" val="0"/>
+              </a:ext>
+            </a:extLst>
+          </a:blip>
+          <a:stretch>
+            <a:fillRect/>
+          </a:stretch>
+        </p:blipFill>
+        <p:spPr>
+          <a:xfrm>
+            <a:off x="4762" y="1548000"/>
+            <a:ext cx="9134475" cy="4733925"/>
+          </a:xfrm>
+          <a:prstGeom prst="rect">
+            <a:avLst/>
+          </a:prstGeom>
+        </p:spPr>
+      </p:pic>
+    </p:spTree>
+    <p:extLst>
+      <p:ext uri="{BB962C8B-B14F-4D97-AF65-F5344CB8AC3E}">
+        <p14:creationId xmlns:p14="http://schemas.microsoft.com/office/powerpoint/2010/main" val="422475972"/>
+      </p:ext>
+    </p:extLst>
+  </p:cSld>
+  <p:clrMapOvr>
+    <a:masterClrMapping/>
+  </p:clrMapOvr>
+  <p:transition spd="slow">
+    <p:cut/>
+  </p:transition>
+  <p:timing>
+    <p:tnLst>
+      <p:par>
+        <p:cTn id="1" dur="indefinite" restart="never" nodeType="tmRoot"/>
+      </p:par>
+    </p:tnLst>
+  </p:timing>
+</p:sld>
+</file>
+
+<file path=ppt/slides/slide46.xml><?xml version="1.0" encoding="utf-8"?>
+<p:sld xmlns:a="http://schemas.openxmlformats.org/drawingml/2006/main" xmlns:r="http://schemas.openxmlformats.org/officeDocument/2006/relationships" xmlns:p="http://schemas.openxmlformats.org/presentationml/2006/main">
+  <p:cSld>
+    <p:spTree>
+      <p:nvGrpSpPr>
+        <p:cNvPr id="1" name="Shape 93"/>
+        <p:cNvGrpSpPr/>
+        <p:nvPr/>
+      </p:nvGrpSpPr>
+      <p:grpSpPr>
+        <a:xfrm>
+          <a:off x="0" y="0"/>
+          <a:ext cx="0" cy="0"/>
+          <a:chOff x="0" y="0"/>
+          <a:chExt cx="0" cy="0"/>
+        </a:xfrm>
+      </p:grpSpPr>
+      <p:sp>
+        <p:nvSpPr>
+          <p:cNvPr id="95" name="Shape 95"/>
+          <p:cNvSpPr txBox="1">
+            <a:spLocks noGrp="1"/>
+          </p:cNvSpPr>
+          <p:nvPr>
+            <p:ph type="sldNum" idx="12"/>
+          </p:nvPr>
+        </p:nvSpPr>
+        <p:spPr>
+          <a:xfrm>
+            <a:off x="7600950" y="5688719"/>
+            <a:ext cx="269142" cy="273844"/>
+          </a:xfrm>
+          <a:prstGeom prst="rect">
+            <a:avLst/>
+          </a:prstGeom>
+          <a:noFill/>
+          <a:ln>
+            <a:noFill/>
+          </a:ln>
+        </p:spPr>
+        <p:txBody>
+          <a:bodyPr lIns="68569" tIns="34275" rIns="68569" bIns="34275" anchor="ctr" anchorCtr="0">
+            <a:noAutofit/>
+          </a:bodyPr>
+          <a:lstStyle/>
+          <a:p>
+            <a:pPr>
+              <a:buSzPct val="25000"/>
+            </a:pPr>
+            <a:r>
+              <a:rPr lang="en-US"/>
+              <a:t> </a:t>
+            </a:r>
+          </a:p>
+        </p:txBody>
+      </p:sp>
+      <p:sp>
+        <p:nvSpPr>
           <p:cNvPr id="96" name="Shape 96"/>
           <p:cNvSpPr txBox="1">
             <a:spLocks noGrp="1"/>
@@ -18211,7 +18539,7 @@
 </p:sld>
 </file>
 
-<file path=ppt/slides/slide46.xml><?xml version="1.0" encoding="utf-8"?>
+<file path=ppt/slides/slide47.xml><?xml version="1.0" encoding="utf-8"?>
 <p:sld xmlns:a="http://schemas.openxmlformats.org/drawingml/2006/main" xmlns:r="http://schemas.openxmlformats.org/officeDocument/2006/relationships" xmlns:p="http://schemas.openxmlformats.org/presentationml/2006/main">
   <p:cSld>
     <p:spTree>

</xml_diff>

<commit_message>
add slide about pull
</commit_message>
<xml_diff>
--- a/GIT Presentation.pptx
+++ b/GIT Presentation.pptx
@@ -6,7 +6,7 @@
     <p:sldMasterId id="2147483665" r:id="rId2"/>
   </p:sldMasterIdLst>
   <p:notesMasterIdLst>
-    <p:notesMasterId r:id="rId50"/>
+    <p:notesMasterId r:id="rId51"/>
   </p:notesMasterIdLst>
   <p:sldIdLst>
     <p:sldId id="257" r:id="rId3"/>
@@ -54,8 +54,9 @@
     <p:sldId id="309" r:id="rId45"/>
     <p:sldId id="310" r:id="rId46"/>
     <p:sldId id="311" r:id="rId47"/>
-    <p:sldId id="273" r:id="rId48"/>
-    <p:sldId id="275" r:id="rId49"/>
+    <p:sldId id="314" r:id="rId48"/>
+    <p:sldId id="273" r:id="rId49"/>
+    <p:sldId id="275" r:id="rId50"/>
   </p:sldIdLst>
   <p:sldSz cx="9144000" cy="6858000" type="screen4x3"/>
   <p:notesSz cx="6858000" cy="9144000"/>
@@ -5616,45 +5617,23 @@
             </a:pPr>
             <a:r>
               <a:rPr lang="en-US" baseline="0" dirty="0" smtClean="0"/>
-              <a:t>install GIT</a:t>
-            </a:r>
-          </a:p>
-          <a:p>
-            <a:pPr marL="628650" lvl="1" indent="-171450">
+              <a:t>if your workflow is to commit everything to master (trunk in SVN), then you may want to use the "rebase" version of pull, otherwise the commit history will be polluted with merge commits that makes things harder to understand</a:t>
+            </a:r>
+          </a:p>
+          <a:p>
+            <a:pPr marL="171450" indent="-171450">
               <a:buFontTx/>
               <a:buChar char="-"/>
             </a:pPr>
             <a:r>
               <a:rPr lang="en-US" baseline="0" dirty="0" smtClean="0"/>
-              <a:t>Windows</a:t>
-            </a:r>
-          </a:p>
-          <a:p>
-            <a:pPr marL="628650" lvl="1" indent="-171450">
-              <a:buFontTx/>
-              <a:buChar char="-"/>
-            </a:pPr>
-            <a:r>
-              <a:rPr lang="en-US" baseline="0" dirty="0" smtClean="0"/>
-              <a:t>Mac</a:t>
-            </a:r>
-          </a:p>
-          <a:p>
-            <a:pPr marL="171450" lvl="0" indent="-171450">
-              <a:buFontTx/>
-              <a:buChar char="-"/>
-            </a:pPr>
-            <a:r>
-              <a:rPr lang="en-US" baseline="0" dirty="0" smtClean="0"/>
-              <a:t>setup username and email</a:t>
-            </a:r>
-          </a:p>
-          <a:p>
-            <a:pPr marL="171450" lvl="0" indent="-171450">
-              <a:buFontTx/>
-              <a:buChar char="-"/>
-            </a:pPr>
-            <a:endParaRPr dirty="0"/>
+              <a:t>I personally prefer to use fetch and then merge/rebase rather than pull, because that gives me a chance to take a look at the remote commits </a:t>
+            </a:r>
+            <a:r>
+              <a:rPr lang="en-US" baseline="0" smtClean="0"/>
+              <a:t>before merging/rebasing</a:t>
+            </a:r>
+            <a:endParaRPr lang="en-US" baseline="0" dirty="0" smtClean="0"/>
           </a:p>
         </p:txBody>
       </p:sp>
@@ -5702,6 +5681,150 @@
     </p:spTree>
     <p:extLst>
       <p:ext uri="{BB962C8B-B14F-4D97-AF65-F5344CB8AC3E}">
+        <p14:creationId xmlns:p14="http://schemas.microsoft.com/office/powerpoint/2010/main" val="1335446134"/>
+      </p:ext>
+    </p:extLst>
+  </p:cSld>
+  <p:clrMapOvr>
+    <a:masterClrMapping/>
+  </p:clrMapOvr>
+</p:notes>
+</file>
+
+<file path=ppt/notesSlides/notesSlide47.xml><?xml version="1.0" encoding="utf-8"?>
+<p:notes xmlns:a="http://schemas.openxmlformats.org/drawingml/2006/main" xmlns:r="http://schemas.openxmlformats.org/officeDocument/2006/relationships" xmlns:p="http://schemas.openxmlformats.org/presentationml/2006/main" showMasterSp="0" showMasterPhAnim="0">
+  <p:cSld>
+    <p:spTree>
+      <p:nvGrpSpPr>
+        <p:cNvPr id="1" name="Shape 98"/>
+        <p:cNvGrpSpPr/>
+        <p:nvPr/>
+      </p:nvGrpSpPr>
+      <p:grpSpPr>
+        <a:xfrm>
+          <a:off x="0" y="0"/>
+          <a:ext cx="0" cy="0"/>
+          <a:chOff x="0" y="0"/>
+          <a:chExt cx="0" cy="0"/>
+        </a:xfrm>
+      </p:grpSpPr>
+      <p:sp>
+        <p:nvSpPr>
+          <p:cNvPr id="99" name="Shape 99"/>
+          <p:cNvSpPr txBox="1">
+            <a:spLocks noGrp="1"/>
+          </p:cNvSpPr>
+          <p:nvPr>
+            <p:ph type="body" idx="1"/>
+          </p:nvPr>
+        </p:nvSpPr>
+        <p:spPr>
+          <a:xfrm>
+            <a:off x="685800" y="4343400"/>
+            <a:ext cx="5486399" cy="4114800"/>
+          </a:xfrm>
+          <a:prstGeom prst="rect">
+            <a:avLst/>
+          </a:prstGeom>
+        </p:spPr>
+        <p:txBody>
+          <a:bodyPr lIns="91425" tIns="91425" rIns="91425" bIns="91425" anchor="ctr" anchorCtr="0">
+            <a:noAutofit/>
+          </a:bodyPr>
+          <a:lstStyle/>
+          <a:p>
+            <a:pPr marL="171450" indent="-171450">
+              <a:buFontTx/>
+              <a:buChar char="-"/>
+            </a:pPr>
+            <a:r>
+              <a:rPr lang="en-US" baseline="0" dirty="0" smtClean="0"/>
+              <a:t>install GIT</a:t>
+            </a:r>
+          </a:p>
+          <a:p>
+            <a:pPr marL="628650" lvl="1" indent="-171450">
+              <a:buFontTx/>
+              <a:buChar char="-"/>
+            </a:pPr>
+            <a:r>
+              <a:rPr lang="en-US" baseline="0" dirty="0" smtClean="0"/>
+              <a:t>Windows</a:t>
+            </a:r>
+          </a:p>
+          <a:p>
+            <a:pPr marL="628650" lvl="1" indent="-171450">
+              <a:buFontTx/>
+              <a:buChar char="-"/>
+            </a:pPr>
+            <a:r>
+              <a:rPr lang="en-US" baseline="0" dirty="0" smtClean="0"/>
+              <a:t>Mac</a:t>
+            </a:r>
+          </a:p>
+          <a:p>
+            <a:pPr marL="171450" lvl="0" indent="-171450">
+              <a:buFontTx/>
+              <a:buChar char="-"/>
+            </a:pPr>
+            <a:r>
+              <a:rPr lang="en-US" baseline="0" dirty="0" smtClean="0"/>
+              <a:t>setup username and email</a:t>
+            </a:r>
+          </a:p>
+          <a:p>
+            <a:pPr marL="171450" lvl="0" indent="-171450">
+              <a:buFontTx/>
+              <a:buChar char="-"/>
+            </a:pPr>
+            <a:endParaRPr dirty="0"/>
+          </a:p>
+        </p:txBody>
+      </p:sp>
+      <p:sp>
+        <p:nvSpPr>
+          <p:cNvPr id="100" name="Shape 100"/>
+          <p:cNvSpPr>
+            <a:spLocks noGrp="1" noRot="1" noChangeAspect="1"/>
+          </p:cNvSpPr>
+          <p:nvPr>
+            <p:ph type="sldImg" idx="2"/>
+          </p:nvPr>
+        </p:nvSpPr>
+        <p:spPr>
+          <a:xfrm>
+            <a:off x="1143000" y="685800"/>
+            <a:ext cx="4572000" cy="3429000"/>
+          </a:xfrm>
+          <a:custGeom>
+            <a:avLst/>
+            <a:gdLst/>
+            <a:ahLst/>
+            <a:cxnLst/>
+            <a:rect l="0" t="0" r="0" b="0"/>
+            <a:pathLst>
+              <a:path w="120000" h="120000" extrusionOk="0">
+                <a:moveTo>
+                  <a:pt x="0" y="0"/>
+                </a:moveTo>
+                <a:lnTo>
+                  <a:pt x="120000" y="0"/>
+                </a:lnTo>
+                <a:lnTo>
+                  <a:pt x="120000" y="120000"/>
+                </a:lnTo>
+                <a:lnTo>
+                  <a:pt x="0" y="120000"/>
+                </a:lnTo>
+                <a:close/>
+              </a:path>
+            </a:pathLst>
+          </a:custGeom>
+        </p:spPr>
+      </p:sp>
+    </p:spTree>
+    <p:extLst>
+      <p:ext uri="{BB962C8B-B14F-4D97-AF65-F5344CB8AC3E}">
         <p14:creationId xmlns:p14="http://schemas.microsoft.com/office/powerpoint/2010/main" val="2666093823"/>
       </p:ext>
     </p:extLst>
@@ -5712,7 +5835,7 @@
 </p:notes>
 </file>
 
-<file path=ppt/notesSlides/notesSlide47.xml><?xml version="1.0" encoding="utf-8"?>
+<file path=ppt/notesSlides/notesSlide48.xml><?xml version="1.0" encoding="utf-8"?>
 <p:notes xmlns:a="http://schemas.openxmlformats.org/drawingml/2006/main" xmlns:r="http://schemas.openxmlformats.org/officeDocument/2006/relationships" xmlns:p="http://schemas.openxmlformats.org/presentationml/2006/main" showMasterSp="0" showMasterPhAnim="0">
   <p:cSld>
     <p:spTree>
@@ -11900,11 +12023,7 @@
             </a:pPr>
             <a:r>
               <a:rPr lang="en-US" sz="3600" dirty="0" smtClean="0"/>
-              <a:t>GIT checkout </a:t>
-            </a:r>
-            <a:r>
-              <a:rPr lang="en-US" sz="3600" dirty="0" smtClean="0"/>
-              <a:t>my-branch</a:t>
+              <a:t>GIT checkout my-branch</a:t>
             </a:r>
             <a:endParaRPr lang="en-US" sz="3600" dirty="0"/>
           </a:p>
@@ -12056,13 +12175,8 @@
             </a:pPr>
             <a:r>
               <a:rPr lang="en-US" sz="3600" dirty="0"/>
-              <a:t>GIT </a:t>
-            </a:r>
-            <a:r>
-              <a:rPr lang="en-US" sz="3600" dirty="0"/>
-              <a:t>unifying divergent histories</a:t>
-            </a:r>
-            <a:endParaRPr lang="en-US" sz="3600" dirty="0"/>
+              <a:t>GIT unifying divergent histories</a:t>
+            </a:r>
           </a:p>
         </p:txBody>
       </p:sp>
@@ -12147,7 +12261,6 @@
               <a:rPr lang="en-US" sz="2400" dirty="0" smtClean="0"/>
               <a:t>rebase</a:t>
             </a:r>
-            <a:endParaRPr lang="en-US" sz="2400" dirty="0" smtClean="0"/>
           </a:p>
         </p:txBody>
       </p:sp>
@@ -18364,6 +18477,336 @@
       </p:sp>
       <p:sp>
         <p:nvSpPr>
+          <p:cNvPr id="97" name="Shape 97"/>
+          <p:cNvSpPr txBox="1">
+            <a:spLocks noGrp="1"/>
+          </p:cNvSpPr>
+          <p:nvPr>
+            <p:ph type="body" idx="2"/>
+          </p:nvPr>
+        </p:nvSpPr>
+        <p:spPr>
+          <a:xfrm>
+            <a:off x="341168" y="228026"/>
+            <a:ext cx="8498032" cy="457199"/>
+          </a:xfrm>
+          <a:prstGeom prst="rect">
+            <a:avLst/>
+          </a:prstGeom>
+          <a:noFill/>
+          <a:ln>
+            <a:noFill/>
+          </a:ln>
+        </p:spPr>
+        <p:txBody>
+          <a:bodyPr lIns="68569" tIns="34275" rIns="68569" bIns="34275" anchor="t" anchorCtr="0">
+            <a:noAutofit/>
+          </a:bodyPr>
+          <a:lstStyle/>
+          <a:p>
+            <a:pPr>
+              <a:buClr>
+                <a:schemeClr val="accent2"/>
+              </a:buClr>
+              <a:buSzPct val="25000"/>
+            </a:pPr>
+            <a:r>
+              <a:rPr lang="en-US" sz="3600" dirty="0" smtClean="0"/>
+              <a:t>GIT </a:t>
+            </a:r>
+            <a:r>
+              <a:rPr lang="en-US" sz="3600" dirty="0" smtClean="0"/>
+              <a:t>pull vs. fetch</a:t>
+            </a:r>
+            <a:endParaRPr lang="en-US" sz="3600" dirty="0"/>
+          </a:p>
+        </p:txBody>
+      </p:sp>
+      <p:sp>
+        <p:nvSpPr>
+          <p:cNvPr id="5" name="Shape 96"/>
+          <p:cNvSpPr txBox="1">
+            <a:spLocks noGrp="1"/>
+          </p:cNvSpPr>
+          <p:nvPr>
+            <p:ph type="body" idx="1"/>
+          </p:nvPr>
+        </p:nvSpPr>
+        <p:spPr>
+          <a:xfrm>
+            <a:off x="341167" y="937873"/>
+            <a:ext cx="8498033" cy="5024690"/>
+          </a:xfrm>
+          <a:prstGeom prst="rect">
+            <a:avLst/>
+          </a:prstGeom>
+          <a:noFill/>
+          <a:ln>
+            <a:noFill/>
+          </a:ln>
+        </p:spPr>
+        <p:txBody>
+          <a:bodyPr lIns="68569" tIns="34275" rIns="68569" bIns="34275" anchor="t" anchorCtr="0">
+            <a:noAutofit/>
+          </a:bodyPr>
+          <a:lstStyle/>
+          <a:p>
+            <a:pPr marL="355600" indent="-355600">
+              <a:lnSpc>
+                <a:spcPct val="90000"/>
+              </a:lnSpc>
+              <a:buClr>
+                <a:srgbClr val="2E3640"/>
+              </a:buClr>
+              <a:buSzPct val="100000"/>
+              <a:buBlip>
+                <a:blip r:embed="rId3"/>
+              </a:buBlip>
+            </a:pPr>
+            <a:r>
+              <a:rPr lang="en-US" sz="2400" dirty="0" smtClean="0"/>
+              <a:t>"</a:t>
+            </a:r>
+            <a:r>
+              <a:rPr lang="en-US" sz="2400" dirty="0" err="1" smtClean="0">
+                <a:latin typeface="Bitstream Vera Sans" panose="020B0603030804020204" pitchFamily="34" charset="0"/>
+              </a:rPr>
+              <a:t>git</a:t>
+            </a:r>
+            <a:r>
+              <a:rPr lang="en-US" sz="2400" dirty="0" smtClean="0">
+                <a:latin typeface="Bitstream Vera Sans" panose="020B0603030804020204" pitchFamily="34" charset="0"/>
+              </a:rPr>
+              <a:t> fetch</a:t>
+            </a:r>
+            <a:r>
+              <a:rPr lang="en-US" sz="2400" dirty="0" smtClean="0"/>
+              <a:t>" brings commits from the remote repository into the local repository</a:t>
+            </a:r>
+          </a:p>
+          <a:p>
+            <a:pPr marL="355600" indent="-355600">
+              <a:lnSpc>
+                <a:spcPct val="90000"/>
+              </a:lnSpc>
+              <a:buClr>
+                <a:srgbClr val="2E3640"/>
+              </a:buClr>
+              <a:buSzPct val="100000"/>
+              <a:buBlip>
+                <a:blip r:embed="rId3"/>
+              </a:buBlip>
+            </a:pPr>
+            <a:r>
+              <a:rPr lang="en-US" sz="2400" dirty="0" smtClean="0">
+                <a:latin typeface="Bitstream Vera Sans" panose="020B0603030804020204" pitchFamily="34" charset="0"/>
+                <a:sym typeface="Wingdings" panose="05000000000000000000" pitchFamily="2" charset="2"/>
+              </a:rPr>
+              <a:t>"</a:t>
+            </a:r>
+            <a:r>
+              <a:rPr lang="en-US" sz="2400" dirty="0" err="1" smtClean="0">
+                <a:latin typeface="Bitstream Vera Sans" panose="020B0603030804020204" pitchFamily="34" charset="0"/>
+                <a:sym typeface="Wingdings" panose="05000000000000000000" pitchFamily="2" charset="2"/>
+              </a:rPr>
+              <a:t>git</a:t>
+            </a:r>
+            <a:r>
+              <a:rPr lang="en-US" sz="2400" dirty="0" smtClean="0">
+                <a:latin typeface="Bitstream Vera Sans" panose="020B0603030804020204" pitchFamily="34" charset="0"/>
+                <a:sym typeface="Wingdings" panose="05000000000000000000" pitchFamily="2" charset="2"/>
+              </a:rPr>
+              <a:t> pull"               == "</a:t>
+            </a:r>
+            <a:r>
+              <a:rPr lang="en-US" sz="2400" dirty="0" err="1" smtClean="0">
+                <a:latin typeface="Bitstream Vera Sans" panose="020B0603030804020204" pitchFamily="34" charset="0"/>
+                <a:sym typeface="Wingdings" panose="05000000000000000000" pitchFamily="2" charset="2"/>
+              </a:rPr>
+              <a:t>git</a:t>
+            </a:r>
+            <a:r>
+              <a:rPr lang="en-US" sz="2400" dirty="0" smtClean="0">
+                <a:latin typeface="Bitstream Vera Sans" panose="020B0603030804020204" pitchFamily="34" charset="0"/>
+                <a:sym typeface="Wingdings" panose="05000000000000000000" pitchFamily="2" charset="2"/>
+              </a:rPr>
+              <a:t> fetch" + "</a:t>
+            </a:r>
+            <a:r>
+              <a:rPr lang="en-US" sz="2400" dirty="0" err="1" smtClean="0">
+                <a:latin typeface="Bitstream Vera Sans" panose="020B0603030804020204" pitchFamily="34" charset="0"/>
+                <a:sym typeface="Wingdings" panose="05000000000000000000" pitchFamily="2" charset="2"/>
+              </a:rPr>
+              <a:t>git</a:t>
+            </a:r>
+            <a:r>
+              <a:rPr lang="en-US" sz="2400" dirty="0" smtClean="0">
+                <a:latin typeface="Bitstream Vera Sans" panose="020B0603030804020204" pitchFamily="34" charset="0"/>
+                <a:sym typeface="Wingdings" panose="05000000000000000000" pitchFamily="2" charset="2"/>
+              </a:rPr>
+              <a:t> merge"</a:t>
+            </a:r>
+          </a:p>
+          <a:p>
+            <a:pPr marL="355600" indent="-355600">
+              <a:lnSpc>
+                <a:spcPct val="90000"/>
+              </a:lnSpc>
+              <a:buClr>
+                <a:srgbClr val="2E3640"/>
+              </a:buClr>
+              <a:buSzPct val="100000"/>
+              <a:buBlip>
+                <a:blip r:embed="rId3"/>
+              </a:buBlip>
+            </a:pPr>
+            <a:r>
+              <a:rPr lang="en-US" sz="2400" dirty="0" smtClean="0">
+                <a:latin typeface="Bitstream Vera Sans" panose="020B0603030804020204" pitchFamily="34" charset="0"/>
+                <a:sym typeface="Wingdings" panose="05000000000000000000" pitchFamily="2" charset="2"/>
+              </a:rPr>
+              <a:t>"</a:t>
+            </a:r>
+            <a:r>
+              <a:rPr lang="en-US" sz="2400" dirty="0" err="1" smtClean="0">
+                <a:latin typeface="Bitstream Vera Sans" panose="020B0603030804020204" pitchFamily="34" charset="0"/>
+                <a:sym typeface="Wingdings" panose="05000000000000000000" pitchFamily="2" charset="2"/>
+              </a:rPr>
+              <a:t>git</a:t>
+            </a:r>
+            <a:r>
+              <a:rPr lang="en-US" sz="2400" dirty="0" smtClean="0">
+                <a:latin typeface="Bitstream Vera Sans" panose="020B0603030804020204" pitchFamily="34" charset="0"/>
+                <a:sym typeface="Wingdings" panose="05000000000000000000" pitchFamily="2" charset="2"/>
+              </a:rPr>
+              <a:t> pull --rebase" == "</a:t>
+            </a:r>
+            <a:r>
+              <a:rPr lang="en-US" sz="2400" dirty="0" err="1" smtClean="0">
+                <a:latin typeface="Bitstream Vera Sans" panose="020B0603030804020204" pitchFamily="34" charset="0"/>
+                <a:sym typeface="Wingdings" panose="05000000000000000000" pitchFamily="2" charset="2"/>
+              </a:rPr>
+              <a:t>git</a:t>
+            </a:r>
+            <a:r>
+              <a:rPr lang="en-US" sz="2400" dirty="0" smtClean="0">
+                <a:latin typeface="Bitstream Vera Sans" panose="020B0603030804020204" pitchFamily="34" charset="0"/>
+                <a:sym typeface="Wingdings" panose="05000000000000000000" pitchFamily="2" charset="2"/>
+              </a:rPr>
+              <a:t> fetch" + "</a:t>
+            </a:r>
+            <a:r>
+              <a:rPr lang="en-US" sz="2400" dirty="0" err="1" smtClean="0">
+                <a:latin typeface="Bitstream Vera Sans" panose="020B0603030804020204" pitchFamily="34" charset="0"/>
+                <a:sym typeface="Wingdings" panose="05000000000000000000" pitchFamily="2" charset="2"/>
+              </a:rPr>
+              <a:t>git</a:t>
+            </a:r>
+            <a:r>
+              <a:rPr lang="en-US" sz="2400" dirty="0" smtClean="0">
+                <a:latin typeface="Bitstream Vera Sans" panose="020B0603030804020204" pitchFamily="34" charset="0"/>
+                <a:sym typeface="Wingdings" panose="05000000000000000000" pitchFamily="2" charset="2"/>
+              </a:rPr>
+              <a:t> rebase"</a:t>
+            </a:r>
+          </a:p>
+          <a:p>
+            <a:pPr>
+              <a:lnSpc>
+                <a:spcPct val="90000"/>
+              </a:lnSpc>
+              <a:buClr>
+                <a:srgbClr val="2E3640"/>
+              </a:buClr>
+              <a:buSzPct val="100000"/>
+            </a:pPr>
+            <a:endParaRPr lang="en-US" sz="2400" dirty="0">
+              <a:sym typeface="Wingdings" panose="05000000000000000000" pitchFamily="2" charset="2"/>
+            </a:endParaRPr>
+          </a:p>
+        </p:txBody>
+      </p:sp>
+    </p:spTree>
+    <p:extLst>
+      <p:ext uri="{BB962C8B-B14F-4D97-AF65-F5344CB8AC3E}">
+        <p14:creationId xmlns:p14="http://schemas.microsoft.com/office/powerpoint/2010/main" val="1664253419"/>
+      </p:ext>
+    </p:extLst>
+  </p:cSld>
+  <p:clrMapOvr>
+    <a:masterClrMapping/>
+  </p:clrMapOvr>
+  <p:transition spd="slow">
+    <p:cut/>
+  </p:transition>
+  <p:timing>
+    <p:tnLst>
+      <p:par>
+        <p:cTn id="1" dur="indefinite" restart="never" nodeType="tmRoot"/>
+      </p:par>
+    </p:tnLst>
+  </p:timing>
+</p:sld>
+</file>
+
+<file path=ppt/slides/slide47.xml><?xml version="1.0" encoding="utf-8"?>
+<p:sld xmlns:a="http://schemas.openxmlformats.org/drawingml/2006/main" xmlns:r="http://schemas.openxmlformats.org/officeDocument/2006/relationships" xmlns:p="http://schemas.openxmlformats.org/presentationml/2006/main">
+  <p:cSld>
+    <p:spTree>
+      <p:nvGrpSpPr>
+        <p:cNvPr id="1" name="Shape 93"/>
+        <p:cNvGrpSpPr/>
+        <p:nvPr/>
+      </p:nvGrpSpPr>
+      <p:grpSpPr>
+        <a:xfrm>
+          <a:off x="0" y="0"/>
+          <a:ext cx="0" cy="0"/>
+          <a:chOff x="0" y="0"/>
+          <a:chExt cx="0" cy="0"/>
+        </a:xfrm>
+      </p:grpSpPr>
+      <p:sp>
+        <p:nvSpPr>
+          <p:cNvPr id="95" name="Shape 95"/>
+          <p:cNvSpPr txBox="1">
+            <a:spLocks noGrp="1"/>
+          </p:cNvSpPr>
+          <p:nvPr>
+            <p:ph type="sldNum" idx="12"/>
+          </p:nvPr>
+        </p:nvSpPr>
+        <p:spPr>
+          <a:xfrm>
+            <a:off x="7600950" y="5688719"/>
+            <a:ext cx="269142" cy="273844"/>
+          </a:xfrm>
+          <a:prstGeom prst="rect">
+            <a:avLst/>
+          </a:prstGeom>
+          <a:noFill/>
+          <a:ln>
+            <a:noFill/>
+          </a:ln>
+        </p:spPr>
+        <p:txBody>
+          <a:bodyPr lIns="68569" tIns="34275" rIns="68569" bIns="34275" anchor="ctr" anchorCtr="0">
+            <a:noAutofit/>
+          </a:bodyPr>
+          <a:lstStyle/>
+          <a:p>
+            <a:pPr>
+              <a:buSzPct val="25000"/>
+            </a:pPr>
+            <a:r>
+              <a:rPr lang="en-US"/>
+              <a:t> </a:t>
+            </a:r>
+          </a:p>
+        </p:txBody>
+      </p:sp>
+      <p:sp>
+        <p:nvSpPr>
           <p:cNvPr id="96" name="Shape 96"/>
           <p:cNvSpPr txBox="1">
             <a:spLocks noGrp="1"/>
@@ -18539,7 +18982,7 @@
 </p:sld>
 </file>
 
-<file path=ppt/slides/slide47.xml><?xml version="1.0" encoding="utf-8"?>
+<file path=ppt/slides/slide48.xml><?xml version="1.0" encoding="utf-8"?>
 <p:sld xmlns:a="http://schemas.openxmlformats.org/drawingml/2006/main" xmlns:r="http://schemas.openxmlformats.org/officeDocument/2006/relationships" xmlns:p="http://schemas.openxmlformats.org/presentationml/2006/main">
   <p:cSld>
     <p:spTree>

</xml_diff>

<commit_message>
add more advantages of having the whole repository locally
</commit_message>
<xml_diff>
--- a/GIT Presentation.pptx
+++ b/GIT Presentation.pptx
@@ -256,7 +256,7 @@
           <a:p>
             <a:fld id="{42C5866F-BF00-48DD-AC73-07692588090A}" type="datetimeFigureOut">
               <a:rPr lang="en-US" smtClean="0"/>
-              <a:t>11-06-2014</a:t>
+              <a:t>12-06-2014</a:t>
             </a:fld>
             <a:endParaRPr lang="en-US"/>
           </a:p>
@@ -6122,11 +6122,49 @@
             </a:pPr>
             <a:r>
               <a:rPr lang="en-US" baseline="0" dirty="0" smtClean="0"/>
-              <a:t>no need of a server. This can be quite useful. For example, I use it locally to version </a:t>
-            </a:r>
-            <a:r>
-              <a:rPr lang="en-US" baseline="0" smtClean="0"/>
-              <a:t>some documents.</a:t>
+              <a:t>no need of a server. This can be quite useful. For example, I use it locally to version some documents</a:t>
+            </a:r>
+            <a:r>
+              <a:rPr lang="en-US" baseline="0" dirty="0" smtClean="0"/>
+              <a:t>.</a:t>
+            </a:r>
+          </a:p>
+          <a:p>
+            <a:pPr marL="171450" lvl="0" indent="-171450">
+              <a:buFontTx/>
+              <a:buChar char="-"/>
+            </a:pPr>
+            <a:r>
+              <a:rPr lang="en-US" baseline="0" dirty="0" smtClean="0"/>
+              <a:t>having all history locally enables 2 features which would be too slow on SVN:</a:t>
+            </a:r>
+          </a:p>
+          <a:p>
+            <a:pPr marL="628650" lvl="1" indent="-171450">
+              <a:buFontTx/>
+              <a:buChar char="-"/>
+            </a:pPr>
+            <a:r>
+              <a:rPr lang="en-US" baseline="0" dirty="0" err="1" smtClean="0"/>
+              <a:t>git</a:t>
+            </a:r>
+            <a:r>
+              <a:rPr lang="en-US" baseline="0" dirty="0" smtClean="0"/>
+              <a:t> pickaxe</a:t>
+            </a:r>
+          </a:p>
+          <a:p>
+            <a:pPr marL="628650" lvl="1" indent="-171450">
+              <a:buFontTx/>
+              <a:buChar char="-"/>
+            </a:pPr>
+            <a:r>
+              <a:rPr lang="en-US" baseline="0" dirty="0" err="1" smtClean="0"/>
+              <a:t>git</a:t>
+            </a:r>
+            <a:r>
+              <a:rPr lang="en-US" baseline="0" dirty="0" smtClean="0"/>
+              <a:t> bisect</a:t>
             </a:r>
             <a:endParaRPr dirty="0"/>
           </a:p>
@@ -18512,11 +18550,7 @@
             </a:pPr>
             <a:r>
               <a:rPr lang="en-US" sz="3600" dirty="0" smtClean="0"/>
-              <a:t>GIT </a:t>
-            </a:r>
-            <a:r>
-              <a:rPr lang="en-US" sz="3600" dirty="0" smtClean="0"/>
-              <a:t>pull vs. fetch</a:t>
+              <a:t>GIT pull vs. fetch</a:t>
             </a:r>
             <a:endParaRPr lang="en-US" sz="3600" dirty="0"/>
           </a:p>

</xml_diff>

<commit_message>
workflows: fix bug: wrong start of hotfix branch
</commit_message>
<xml_diff>
--- a/GIT Presentation.pptx
+++ b/GIT Presentation.pptx
@@ -8370,46 +8370,6 @@
           </a:bodyPr>
           <a:lstStyle/>
           <a:p>
-            <a:pPr marL="171450" indent="-171450">
-              <a:buFontTx/>
-              <a:buChar char="-"/>
-            </a:pPr>
-            <a:r>
-              <a:rPr lang="en-US" baseline="0" dirty="0" smtClean="0"/>
-              <a:t>install GIT</a:t>
-            </a:r>
-          </a:p>
-          <a:p>
-            <a:pPr marL="628650" lvl="1" indent="-171450">
-              <a:buFontTx/>
-              <a:buChar char="-"/>
-            </a:pPr>
-            <a:r>
-              <a:rPr lang="en-US" baseline="0" dirty="0" smtClean="0"/>
-              <a:t>Windows</a:t>
-            </a:r>
-          </a:p>
-          <a:p>
-            <a:pPr marL="628650" lvl="1" indent="-171450">
-              <a:buFontTx/>
-              <a:buChar char="-"/>
-            </a:pPr>
-            <a:r>
-              <a:rPr lang="en-US" baseline="0" dirty="0" smtClean="0"/>
-              <a:t>Mac</a:t>
-            </a:r>
-          </a:p>
-          <a:p>
-            <a:pPr marL="171450" lvl="0" indent="-171450">
-              <a:buFontTx/>
-              <a:buChar char="-"/>
-            </a:pPr>
-            <a:r>
-              <a:rPr lang="en-US" baseline="0" dirty="0" smtClean="0"/>
-              <a:t>setup username and email</a:t>
-            </a:r>
-          </a:p>
-          <a:p>
             <a:pPr marL="171450" lvl="0" indent="-171450">
               <a:buFontTx/>
               <a:buChar char="-"/>
@@ -8672,11 +8632,7 @@
             </a:r>
             <a:r>
               <a:rPr lang="en-US" baseline="0" dirty="0" smtClean="0"/>
-              <a:t> </a:t>
-            </a:r>
-            <a:r>
-              <a:rPr lang="en-US" baseline="0" dirty="0" smtClean="0"/>
-              <a:t>branches simple</a:t>
+              <a:t> branches simple</a:t>
             </a:r>
           </a:p>
           <a:p>
@@ -8688,7 +8644,6 @@
               <a:rPr lang="en-US" baseline="0" dirty="0" smtClean="0"/>
               <a:t>like before, but without the stable release branch (master)</a:t>
             </a:r>
-            <a:endParaRPr lang="en-US" baseline="0" dirty="0" smtClean="0"/>
           </a:p>
           <a:p>
             <a:pPr marL="628650" lvl="1" indent="-171450">
@@ -8697,19 +8652,7 @@
             </a:pPr>
             <a:r>
               <a:rPr lang="en-US" dirty="0" smtClean="0"/>
-              <a:t>the </a:t>
-            </a:r>
-            <a:r>
-              <a:rPr lang="en-US" dirty="0" smtClean="0"/>
-              <a:t>release branch </a:t>
-            </a:r>
-            <a:r>
-              <a:rPr lang="en-US" dirty="0" smtClean="0"/>
-              <a:t>is also </a:t>
-            </a:r>
-            <a:r>
-              <a:rPr lang="en-US" dirty="0" smtClean="0"/>
-              <a:t>used for hotfixes</a:t>
+              <a:t>the release branch is also used for hotfixes</a:t>
             </a:r>
             <a:r>
               <a:rPr lang="en-US" baseline="0" dirty="0" smtClean="0"/>
@@ -8723,11 +8666,7 @@
             </a:pPr>
             <a:r>
               <a:rPr lang="en-US" baseline="0" dirty="0" smtClean="0"/>
-              <a:t>hotfixes also need to be merged into master, otherwise we lose </a:t>
-            </a:r>
-            <a:r>
-              <a:rPr lang="en-US" baseline="0" dirty="0" smtClean="0"/>
-              <a:t>them</a:t>
+              <a:t>hotfixes also need to be merged into master, otherwise we lose them</a:t>
             </a:r>
           </a:p>
           <a:p>
@@ -14060,11 +13999,7 @@
             </a:pPr>
             <a:r>
               <a:rPr lang="en-US" sz="3600" dirty="0" smtClean="0"/>
-              <a:t>Workflows / separate </a:t>
-            </a:r>
-            <a:r>
-              <a:rPr lang="en-US" sz="3600" dirty="0" smtClean="0"/>
-              <a:t>feature branches</a:t>
+              <a:t>Workflows / separate feature branches</a:t>
             </a:r>
             <a:endParaRPr lang="en-US" sz="3600" dirty="0"/>
           </a:p>
@@ -14216,11 +14151,7 @@
             </a:pPr>
             <a:r>
               <a:rPr lang="en-US" sz="3600" dirty="0" smtClean="0"/>
-              <a:t>Workflows / </a:t>
-            </a:r>
-            <a:r>
-              <a:rPr lang="en-US" sz="3600" dirty="0" smtClean="0"/>
-              <a:t>GIT Flow / diagram</a:t>
+              <a:t>Workflows / GIT Flow / diagram</a:t>
             </a:r>
             <a:endParaRPr lang="en-US" sz="3600" dirty="0"/>
           </a:p>
@@ -14372,11 +14303,7 @@
             </a:pPr>
             <a:r>
               <a:rPr lang="en-US" sz="3600" dirty="0" smtClean="0"/>
-              <a:t>Workflows / </a:t>
-            </a:r>
-            <a:r>
-              <a:rPr lang="en-US" sz="3600" dirty="0" smtClean="0"/>
-              <a:t>GIT Flow / resources</a:t>
+              <a:t>Workflows / GIT Flow / resources</a:t>
             </a:r>
             <a:endParaRPr lang="en-US" sz="3600" dirty="0"/>
           </a:p>
@@ -20286,7 +20213,6 @@
               <a:rPr lang="en-US" sz="2400" dirty="0" smtClean="0"/>
               <a:t>branch</a:t>
             </a:r>
-            <a:endParaRPr lang="en-US" sz="2400" dirty="0" smtClean="0"/>
           </a:p>
           <a:p>
             <a:pPr marL="342900" indent="-342900">
@@ -20303,11 +20229,7 @@
             </a:pPr>
             <a:r>
               <a:rPr lang="en-US" sz="2400" dirty="0" smtClean="0"/>
-              <a:t>separate hotfix </a:t>
-            </a:r>
-            <a:r>
-              <a:rPr lang="en-US" sz="2400" dirty="0" smtClean="0"/>
-              <a:t>branches</a:t>
+              <a:t>separate hotfix branches</a:t>
             </a:r>
           </a:p>
           <a:p>
@@ -20385,7 +20307,6 @@
               <a:rPr lang="en-US" sz="2400" dirty="0" smtClean="0"/>
               <a:t>resources</a:t>
             </a:r>
-            <a:endParaRPr lang="en-US" sz="2400" dirty="0" smtClean="0"/>
           </a:p>
         </p:txBody>
       </p:sp>
@@ -24219,11 +24140,7 @@
             </a:pPr>
             <a:r>
               <a:rPr lang="en-US" sz="3600" dirty="0" smtClean="0"/>
-              <a:t>Workflows </a:t>
-            </a:r>
-            <a:r>
-              <a:rPr lang="en-US" sz="3600" dirty="0" smtClean="0"/>
-              <a:t>/ one separate release (stable) branch</a:t>
+              <a:t>Workflows / one separate release (stable) branch</a:t>
             </a:r>
             <a:endParaRPr lang="en-US" sz="3600" dirty="0"/>
           </a:p>
@@ -25038,44 +24955,6 @@
               </a:buBlip>
             </a:pPr>
             <a:r>
-              <a:rPr lang="en-US" sz="2000" dirty="0" smtClean="0"/>
-              <a:t>install GIT</a:t>
-            </a:r>
-          </a:p>
-          <a:p>
-            <a:pPr marL="355600" indent="-355600">
-              <a:lnSpc>
-                <a:spcPct val="90000"/>
-              </a:lnSpc>
-              <a:buClr>
-                <a:srgbClr val="2E3640"/>
-              </a:buClr>
-              <a:buSzPct val="100000"/>
-              <a:buBlip>
-                <a:blip r:embed="rId3"/>
-              </a:buBlip>
-            </a:pPr>
-            <a:r>
-              <a:rPr lang="en-US" sz="2000" dirty="0" smtClean="0">
-                <a:sym typeface="Wingdings" panose="05000000000000000000" pitchFamily="2" charset="2"/>
-              </a:rPr>
-              <a:t>setup username, password, editor</a:t>
-            </a:r>
-          </a:p>
-          <a:p>
-            <a:pPr marL="355600" indent="-355600">
-              <a:lnSpc>
-                <a:spcPct val="90000"/>
-              </a:lnSpc>
-              <a:buClr>
-                <a:srgbClr val="2E3640"/>
-              </a:buClr>
-              <a:buSzPct val="100000"/>
-              <a:buBlip>
-                <a:blip r:embed="rId3"/>
-              </a:buBlip>
-            </a:pPr>
-            <a:r>
               <a:rPr lang="en-US" sz="2000" dirty="0" smtClean="0">
                 <a:sym typeface="Wingdings" panose="05000000000000000000" pitchFamily="2" charset="2"/>
               </a:rPr>
@@ -25855,11 +25734,7 @@
             </a:pPr>
             <a:r>
               <a:rPr lang="en-US" sz="3600" dirty="0" smtClean="0"/>
-              <a:t>Workflows / separate release </a:t>
-            </a:r>
-            <a:r>
-              <a:rPr lang="en-US" sz="3600" dirty="0" smtClean="0"/>
-              <a:t>branches without stable branch</a:t>
+              <a:t>Workflows / separate release branches without stable branch</a:t>
             </a:r>
           </a:p>
         </p:txBody>
@@ -26018,7 +25893,7 @@
       </p:sp>
       <p:pic>
         <p:nvPicPr>
-          <p:cNvPr id="4" name="Picture 3"/>
+          <p:cNvPr id="2" name="Picture 1"/>
           <p:cNvPicPr>
             <a:picLocks noChangeAspect="1"/>
           </p:cNvPicPr>
@@ -26038,8 +25913,8 @@
         </p:blipFill>
         <p:spPr>
           <a:xfrm>
-            <a:off x="163077" y="1175657"/>
-            <a:ext cx="8854213" cy="4346369"/>
+            <a:off x="3759" y="1201944"/>
+            <a:ext cx="9140241" cy="4486775"/>
           </a:xfrm>
           <a:prstGeom prst="rect">
             <a:avLst/>

</xml_diff>

<commit_message>
commit: fix type (should be "amend", not "ammend")
</commit_message>
<xml_diff>
--- a/GIT Presentation.pptx
+++ b/GIT Presentation.pptx
@@ -7844,11 +7844,7 @@
             </a:r>
             <a:r>
               <a:rPr lang="en-US" baseline="0" dirty="0" smtClean="0"/>
-              <a:t> </a:t>
-            </a:r>
-            <a:r>
-              <a:rPr lang="en-US" baseline="0" dirty="0" smtClean="0"/>
-              <a:t>convention</a:t>
+              <a:t> convention</a:t>
             </a:r>
           </a:p>
           <a:p>
@@ -14430,11 +14426,7 @@
             </a:r>
             <a:r>
               <a:rPr lang="en-US" sz="2400" smtClean="0"/>
-              <a:t>(</a:t>
-            </a:r>
-            <a:r>
-              <a:rPr lang="en-US" sz="2400" smtClean="0"/>
-              <a:t>adds "</a:t>
+              <a:t>(adds "</a:t>
             </a:r>
             <a:r>
               <a:rPr lang="en-US" sz="2400" dirty="0" err="1" smtClean="0"/>
@@ -25170,10 +25162,10 @@
               <a:t> commit [--</a:t>
             </a:r>
             <a:r>
-              <a:rPr lang="en-US" sz="2000" dirty="0" err="1" smtClean="0">
+              <a:rPr lang="en-US" sz="2000" dirty="0" smtClean="0">
                 <a:sym typeface="Wingdings" panose="05000000000000000000" pitchFamily="2" charset="2"/>
               </a:rPr>
-              <a:t>ammend</a:t>
+              <a:t>amend</a:t>
             </a:r>
             <a:r>
               <a:rPr lang="en-US" sz="2000" dirty="0">

</xml_diff>

<commit_message>
move diagrams to a more logical directory structure
</commit_message>
<xml_diff>
--- a/GIT Presentation.pptx
+++ b/GIT Presentation.pptx
@@ -23649,7 +23649,15 @@
             </a:pPr>
             <a:r>
               <a:rPr lang="en-US" sz="3600" dirty="0" smtClean="0"/>
-              <a:t>Workflows / separate release branches</a:t>
+              <a:t>Workflows / </a:t>
+            </a:r>
+            <a:r>
+              <a:rPr lang="en-US" sz="3600" dirty="0" smtClean="0"/>
+              <a:t>multiple release </a:t>
+            </a:r>
+            <a:r>
+              <a:rPr lang="en-US" sz="3600" dirty="0" smtClean="0"/>
+              <a:t>branches</a:t>
             </a:r>
             <a:endParaRPr lang="en-US" sz="3600" dirty="0"/>
           </a:p>

</xml_diff>